<commit_message>
Signed-off-by: Anubisc <christoph.blaesser@gmx.de> Änderungsmodus im Dokument aktiviert und erste Ergänzungen vorgenommen Signed-off-by: Anubisc <christoph.blaesser@gmx.de> Änderungen 2 Signed-off-by: Anubisc <christoph.blaesser@gmx.de>
</commit_message>
<xml_diff>
--- a/Päsi/Seminar Betriebssysteme.pptx
+++ b/Päsi/Seminar Betriebssysteme.pptx
@@ -6,20 +6,22 @@
     <p:sldMasterId id="2147483660" r:id="rId2"/>
   </p:sldMasterIdLst>
   <p:notesMasterIdLst>
-    <p:notesMasterId r:id="rId14"/>
+    <p:notesMasterId r:id="rId16"/>
   </p:notesMasterIdLst>
   <p:sldIdLst>
     <p:sldId id="256" r:id="rId3"/>
-    <p:sldId id="257" r:id="rId4"/>
-    <p:sldId id="261" r:id="rId5"/>
-    <p:sldId id="260" r:id="rId6"/>
-    <p:sldId id="265" r:id="rId7"/>
-    <p:sldId id="258" r:id="rId8"/>
-    <p:sldId id="266" r:id="rId9"/>
-    <p:sldId id="259" r:id="rId10"/>
-    <p:sldId id="262" r:id="rId11"/>
-    <p:sldId id="263" r:id="rId12"/>
-    <p:sldId id="264" r:id="rId13"/>
+    <p:sldId id="268" r:id="rId4"/>
+    <p:sldId id="257" r:id="rId5"/>
+    <p:sldId id="267" r:id="rId6"/>
+    <p:sldId id="261" r:id="rId7"/>
+    <p:sldId id="260" r:id="rId8"/>
+    <p:sldId id="265" r:id="rId9"/>
+    <p:sldId id="258" r:id="rId10"/>
+    <p:sldId id="266" r:id="rId11"/>
+    <p:sldId id="259" r:id="rId12"/>
+    <p:sldId id="262" r:id="rId13"/>
+    <p:sldId id="263" r:id="rId14"/>
+    <p:sldId id="264" r:id="rId15"/>
   </p:sldIdLst>
   <p:sldSz cx="12192000" cy="6858000"/>
   <p:notesSz cx="6858000" cy="9144000"/>
@@ -120,7 +122,7 @@
   </p:defaultTextStyle>
   <p:extLst>
     <p:ext uri="{EFAFB233-063F-42B5-8137-9DF3F51BA10A}">
-      <p15:sldGuideLst xmlns:p15="http://schemas.microsoft.com/office/powerpoint/2012/main"/>
+      <p15:sldGuideLst xmlns="" xmlns:p15="http://schemas.microsoft.com/office/powerpoint/2012/main"/>
     </p:ext>
   </p:extLst>
 </p:presentation>
@@ -212,6 +214,7 @@
           <a:p>
             <a:fld id="{28A20BDF-6A46-49EA-BE7C-D2960091BE3F}" type="datetimeFigureOut">
               <a:rPr lang="de-DE" smtClean="0"/>
+              <a:pPr/>
               <a:t>14.06.2017</a:t>
             </a:fld>
             <a:endParaRPr lang="de-DE"/>
@@ -370,6 +373,7 @@
           <a:p>
             <a:fld id="{538A8A5A-1CA9-4185-8FBD-30F9F425E83E}" type="slidenum">
               <a:rPr lang="de-DE" smtClean="0"/>
+              <a:pPr/>
               <a:t>‹Nr.›</a:t>
             </a:fld>
             <a:endParaRPr lang="de-DE"/>
@@ -379,7 +383,7 @@
     </p:spTree>
     <p:extLst>
       <p:ext uri="{BB962C8B-B14F-4D97-AF65-F5344CB8AC3E}">
-        <p14:creationId xmlns:p14="http://schemas.microsoft.com/office/powerpoint/2010/main" val="700791983"/>
+        <p14:creationId xmlns="" xmlns:p14="http://schemas.microsoft.com/office/powerpoint/2010/main" val="700791983"/>
       </p:ext>
     </p:extLst>
   </p:cSld>
@@ -654,6 +658,7 @@
           <a:p>
             <a:fld id="{F03B6250-0270-41C4-9B60-C2B21D3A18F7}" type="slidenum">
               <a:rPr lang="de-DE" smtClean="0"/>
+              <a:pPr/>
               <a:t>‹Nr.›</a:t>
             </a:fld>
             <a:endParaRPr lang="de-DE"/>
@@ -663,7 +668,7 @@
     </p:spTree>
     <p:extLst>
       <p:ext uri="{BB962C8B-B14F-4D97-AF65-F5344CB8AC3E}">
-        <p14:creationId xmlns:p14="http://schemas.microsoft.com/office/powerpoint/2010/main" val="2257791673"/>
+        <p14:creationId xmlns="" xmlns:p14="http://schemas.microsoft.com/office/powerpoint/2010/main" val="2257791673"/>
       </p:ext>
     </p:extLst>
   </p:cSld>
@@ -826,6 +831,7 @@
           <a:p>
             <a:fld id="{F03B6250-0270-41C4-9B60-C2B21D3A18F7}" type="slidenum">
               <a:rPr lang="de-DE" smtClean="0"/>
+              <a:pPr/>
               <a:t>‹Nr.›</a:t>
             </a:fld>
             <a:endParaRPr lang="de-DE"/>
@@ -835,7 +841,7 @@
     </p:spTree>
     <p:extLst>
       <p:ext uri="{BB962C8B-B14F-4D97-AF65-F5344CB8AC3E}">
-        <p14:creationId xmlns:p14="http://schemas.microsoft.com/office/powerpoint/2010/main" val="2527554667"/>
+        <p14:creationId xmlns="" xmlns:p14="http://schemas.microsoft.com/office/powerpoint/2010/main" val="2527554667"/>
       </p:ext>
     </p:extLst>
   </p:cSld>
@@ -1008,6 +1014,7 @@
           <a:p>
             <a:fld id="{F03B6250-0270-41C4-9B60-C2B21D3A18F7}" type="slidenum">
               <a:rPr lang="de-DE" smtClean="0"/>
+              <a:pPr/>
               <a:t>‹Nr.›</a:t>
             </a:fld>
             <a:endParaRPr lang="de-DE"/>
@@ -1017,7 +1024,7 @@
     </p:spTree>
     <p:extLst>
       <p:ext uri="{BB962C8B-B14F-4D97-AF65-F5344CB8AC3E}">
-        <p14:creationId xmlns:p14="http://schemas.microsoft.com/office/powerpoint/2010/main" val="621481477"/>
+        <p14:creationId xmlns="" xmlns:p14="http://schemas.microsoft.com/office/powerpoint/2010/main" val="621481477"/>
       </p:ext>
     </p:extLst>
   </p:cSld>
@@ -1202,6 +1209,7 @@
           <a:p>
             <a:fld id="{F03B6250-0270-41C4-9B60-C2B21D3A18F7}" type="slidenum">
               <a:rPr lang="de-DE" smtClean="0"/>
+              <a:pPr/>
               <a:t>‹Nr.›</a:t>
             </a:fld>
             <a:endParaRPr lang="de-DE"/>
@@ -1211,7 +1219,7 @@
     </p:spTree>
     <p:extLst>
       <p:ext uri="{BB962C8B-B14F-4D97-AF65-F5344CB8AC3E}">
-        <p14:creationId xmlns:p14="http://schemas.microsoft.com/office/powerpoint/2010/main" val="3661508634"/>
+        <p14:creationId xmlns="" xmlns:p14="http://schemas.microsoft.com/office/powerpoint/2010/main" val="3661508634"/>
       </p:ext>
     </p:extLst>
   </p:cSld>
@@ -1374,6 +1382,7 @@
           <a:p>
             <a:fld id="{F03B6250-0270-41C4-9B60-C2B21D3A18F7}" type="slidenum">
               <a:rPr lang="de-DE" smtClean="0"/>
+              <a:pPr/>
               <a:t>‹Nr.›</a:t>
             </a:fld>
             <a:endParaRPr lang="de-DE"/>
@@ -1383,7 +1392,7 @@
     </p:spTree>
     <p:extLst>
       <p:ext uri="{BB962C8B-B14F-4D97-AF65-F5344CB8AC3E}">
-        <p14:creationId xmlns:p14="http://schemas.microsoft.com/office/powerpoint/2010/main" val="4168060298"/>
+        <p14:creationId xmlns="" xmlns:p14="http://schemas.microsoft.com/office/powerpoint/2010/main" val="4168060298"/>
       </p:ext>
     </p:extLst>
   </p:cSld>
@@ -1600,6 +1609,7 @@
           <a:p>
             <a:fld id="{F03B6250-0270-41C4-9B60-C2B21D3A18F7}" type="slidenum">
               <a:rPr lang="de-DE" smtClean="0"/>
+              <a:pPr/>
               <a:t>‹Nr.›</a:t>
             </a:fld>
             <a:endParaRPr lang="de-DE"/>
@@ -1609,7 +1619,7 @@
     </p:spTree>
     <p:extLst>
       <p:ext uri="{BB962C8B-B14F-4D97-AF65-F5344CB8AC3E}">
-        <p14:creationId xmlns:p14="http://schemas.microsoft.com/office/powerpoint/2010/main" val="1794010729"/>
+        <p14:creationId xmlns="" xmlns:p14="http://schemas.microsoft.com/office/powerpoint/2010/main" val="1794010729"/>
       </p:ext>
     </p:extLst>
   </p:cSld>
@@ -1833,6 +1843,7 @@
           <a:p>
             <a:fld id="{F03B6250-0270-41C4-9B60-C2B21D3A18F7}" type="slidenum">
               <a:rPr lang="de-DE" smtClean="0"/>
+              <a:pPr/>
               <a:t>‹Nr.›</a:t>
             </a:fld>
             <a:endParaRPr lang="de-DE"/>
@@ -1842,7 +1853,7 @@
     </p:spTree>
     <p:extLst>
       <p:ext uri="{BB962C8B-B14F-4D97-AF65-F5344CB8AC3E}">
-        <p14:creationId xmlns:p14="http://schemas.microsoft.com/office/powerpoint/2010/main" val="4176995027"/>
+        <p14:creationId xmlns="" xmlns:p14="http://schemas.microsoft.com/office/powerpoint/2010/main" val="4176995027"/>
       </p:ext>
     </p:extLst>
   </p:cSld>
@@ -2201,6 +2212,7 @@
           <a:p>
             <a:fld id="{F03B6250-0270-41C4-9B60-C2B21D3A18F7}" type="slidenum">
               <a:rPr lang="de-DE" smtClean="0"/>
+              <a:pPr/>
               <a:t>‹Nr.›</a:t>
             </a:fld>
             <a:endParaRPr lang="de-DE"/>
@@ -2210,7 +2222,7 @@
     </p:spTree>
     <p:extLst>
       <p:ext uri="{BB962C8B-B14F-4D97-AF65-F5344CB8AC3E}">
-        <p14:creationId xmlns:p14="http://schemas.microsoft.com/office/powerpoint/2010/main" val="2740364737"/>
+        <p14:creationId xmlns="" xmlns:p14="http://schemas.microsoft.com/office/powerpoint/2010/main" val="2740364737"/>
       </p:ext>
     </p:extLst>
   </p:cSld>
@@ -2322,6 +2334,7 @@
           <a:p>
             <a:fld id="{F03B6250-0270-41C4-9B60-C2B21D3A18F7}" type="slidenum">
               <a:rPr lang="de-DE" smtClean="0"/>
+              <a:pPr/>
               <a:t>‹Nr.›</a:t>
             </a:fld>
             <a:endParaRPr lang="de-DE"/>
@@ -2331,7 +2344,7 @@
     </p:spTree>
     <p:extLst>
       <p:ext uri="{BB962C8B-B14F-4D97-AF65-F5344CB8AC3E}">
-        <p14:creationId xmlns:p14="http://schemas.microsoft.com/office/powerpoint/2010/main" val="2388727467"/>
+        <p14:creationId xmlns="" xmlns:p14="http://schemas.microsoft.com/office/powerpoint/2010/main" val="2388727467"/>
       </p:ext>
     </p:extLst>
   </p:cSld>
@@ -2421,6 +2434,7 @@
           <a:p>
             <a:fld id="{F03B6250-0270-41C4-9B60-C2B21D3A18F7}" type="slidenum">
               <a:rPr lang="de-DE" smtClean="0"/>
+              <a:pPr/>
               <a:t>‹Nr.›</a:t>
             </a:fld>
             <a:endParaRPr lang="de-DE"/>
@@ -2430,7 +2444,7 @@
     </p:spTree>
     <p:extLst>
       <p:ext uri="{BB962C8B-B14F-4D97-AF65-F5344CB8AC3E}">
-        <p14:creationId xmlns:p14="http://schemas.microsoft.com/office/powerpoint/2010/main" val="4144591651"/>
+        <p14:creationId xmlns="" xmlns:p14="http://schemas.microsoft.com/office/powerpoint/2010/main" val="4144591651"/>
       </p:ext>
     </p:extLst>
   </p:cSld>
@@ -2700,6 +2714,7 @@
           <a:p>
             <a:fld id="{F03B6250-0270-41C4-9B60-C2B21D3A18F7}" type="slidenum">
               <a:rPr lang="de-DE" smtClean="0"/>
+              <a:pPr/>
               <a:t>‹Nr.›</a:t>
             </a:fld>
             <a:endParaRPr lang="de-DE"/>
@@ -2709,7 +2724,7 @@
     </p:spTree>
     <p:extLst>
       <p:ext uri="{BB962C8B-B14F-4D97-AF65-F5344CB8AC3E}">
-        <p14:creationId xmlns:p14="http://schemas.microsoft.com/office/powerpoint/2010/main" val="3667714112"/>
+        <p14:creationId xmlns="" xmlns:p14="http://schemas.microsoft.com/office/powerpoint/2010/main" val="3667714112"/>
       </p:ext>
     </p:extLst>
   </p:cSld>
@@ -2872,6 +2887,7 @@
           <a:p>
             <a:fld id="{F03B6250-0270-41C4-9B60-C2B21D3A18F7}" type="slidenum">
               <a:rPr lang="de-DE" smtClean="0"/>
+              <a:pPr/>
               <a:t>‹Nr.›</a:t>
             </a:fld>
             <a:endParaRPr lang="de-DE"/>
@@ -2881,7 +2897,7 @@
     </p:spTree>
     <p:extLst>
       <p:ext uri="{BB962C8B-B14F-4D97-AF65-F5344CB8AC3E}">
-        <p14:creationId xmlns:p14="http://schemas.microsoft.com/office/powerpoint/2010/main" val="1332049413"/>
+        <p14:creationId xmlns="" xmlns:p14="http://schemas.microsoft.com/office/powerpoint/2010/main" val="1332049413"/>
       </p:ext>
     </p:extLst>
   </p:cSld>
@@ -3128,6 +3144,7 @@
           <a:p>
             <a:fld id="{F03B6250-0270-41C4-9B60-C2B21D3A18F7}" type="slidenum">
               <a:rPr lang="de-DE" smtClean="0"/>
+              <a:pPr/>
               <a:t>‹Nr.›</a:t>
             </a:fld>
             <a:endParaRPr lang="de-DE"/>
@@ -3137,7 +3154,7 @@
     </p:spTree>
     <p:extLst>
       <p:ext uri="{BB962C8B-B14F-4D97-AF65-F5344CB8AC3E}">
-        <p14:creationId xmlns:p14="http://schemas.microsoft.com/office/powerpoint/2010/main" val="190149329"/>
+        <p14:creationId xmlns="" xmlns:p14="http://schemas.microsoft.com/office/powerpoint/2010/main" val="190149329"/>
       </p:ext>
     </p:extLst>
   </p:cSld>
@@ -3300,6 +3317,7 @@
           <a:p>
             <a:fld id="{F03B6250-0270-41C4-9B60-C2B21D3A18F7}" type="slidenum">
               <a:rPr lang="de-DE" smtClean="0"/>
+              <a:pPr/>
               <a:t>‹Nr.›</a:t>
             </a:fld>
             <a:endParaRPr lang="de-DE"/>
@@ -3309,7 +3327,7 @@
     </p:spTree>
     <p:extLst>
       <p:ext uri="{BB962C8B-B14F-4D97-AF65-F5344CB8AC3E}">
-        <p14:creationId xmlns:p14="http://schemas.microsoft.com/office/powerpoint/2010/main" val="995635370"/>
+        <p14:creationId xmlns="" xmlns:p14="http://schemas.microsoft.com/office/powerpoint/2010/main" val="995635370"/>
       </p:ext>
     </p:extLst>
   </p:cSld>
@@ -3482,6 +3500,7 @@
           <a:p>
             <a:fld id="{F03B6250-0270-41C4-9B60-C2B21D3A18F7}" type="slidenum">
               <a:rPr lang="de-DE" smtClean="0"/>
+              <a:pPr/>
               <a:t>‹Nr.›</a:t>
             </a:fld>
             <a:endParaRPr lang="de-DE"/>
@@ -3491,7 +3510,7 @@
     </p:spTree>
     <p:extLst>
       <p:ext uri="{BB962C8B-B14F-4D97-AF65-F5344CB8AC3E}">
-        <p14:creationId xmlns:p14="http://schemas.microsoft.com/office/powerpoint/2010/main" val="655588613"/>
+        <p14:creationId xmlns="" xmlns:p14="http://schemas.microsoft.com/office/powerpoint/2010/main" val="655588613"/>
       </p:ext>
     </p:extLst>
   </p:cSld>
@@ -3708,6 +3727,7 @@
           <a:p>
             <a:fld id="{F03B6250-0270-41C4-9B60-C2B21D3A18F7}" type="slidenum">
               <a:rPr lang="de-DE" smtClean="0"/>
+              <a:pPr/>
               <a:t>‹Nr.›</a:t>
             </a:fld>
             <a:endParaRPr lang="de-DE"/>
@@ -3717,7 +3737,7 @@
     </p:spTree>
     <p:extLst>
       <p:ext uri="{BB962C8B-B14F-4D97-AF65-F5344CB8AC3E}">
-        <p14:creationId xmlns:p14="http://schemas.microsoft.com/office/powerpoint/2010/main" val="2853574932"/>
+        <p14:creationId xmlns="" xmlns:p14="http://schemas.microsoft.com/office/powerpoint/2010/main" val="2853574932"/>
       </p:ext>
     </p:extLst>
   </p:cSld>
@@ -3941,6 +3961,7 @@
           <a:p>
             <a:fld id="{F03B6250-0270-41C4-9B60-C2B21D3A18F7}" type="slidenum">
               <a:rPr lang="de-DE" smtClean="0"/>
+              <a:pPr/>
               <a:t>‹Nr.›</a:t>
             </a:fld>
             <a:endParaRPr lang="de-DE"/>
@@ -3950,7 +3971,7 @@
     </p:spTree>
     <p:extLst>
       <p:ext uri="{BB962C8B-B14F-4D97-AF65-F5344CB8AC3E}">
-        <p14:creationId xmlns:p14="http://schemas.microsoft.com/office/powerpoint/2010/main" val="2199095327"/>
+        <p14:creationId xmlns="" xmlns:p14="http://schemas.microsoft.com/office/powerpoint/2010/main" val="2199095327"/>
       </p:ext>
     </p:extLst>
   </p:cSld>
@@ -4309,6 +4330,7 @@
           <a:p>
             <a:fld id="{F03B6250-0270-41C4-9B60-C2B21D3A18F7}" type="slidenum">
               <a:rPr lang="de-DE" smtClean="0"/>
+              <a:pPr/>
               <a:t>‹Nr.›</a:t>
             </a:fld>
             <a:endParaRPr lang="de-DE"/>
@@ -4318,7 +4340,7 @@
     </p:spTree>
     <p:extLst>
       <p:ext uri="{BB962C8B-B14F-4D97-AF65-F5344CB8AC3E}">
-        <p14:creationId xmlns:p14="http://schemas.microsoft.com/office/powerpoint/2010/main" val="311317856"/>
+        <p14:creationId xmlns="" xmlns:p14="http://schemas.microsoft.com/office/powerpoint/2010/main" val="311317856"/>
       </p:ext>
     </p:extLst>
   </p:cSld>
@@ -4430,6 +4452,7 @@
           <a:p>
             <a:fld id="{F03B6250-0270-41C4-9B60-C2B21D3A18F7}" type="slidenum">
               <a:rPr lang="de-DE" smtClean="0"/>
+              <a:pPr/>
               <a:t>‹Nr.›</a:t>
             </a:fld>
             <a:endParaRPr lang="de-DE"/>
@@ -4439,7 +4462,7 @@
     </p:spTree>
     <p:extLst>
       <p:ext uri="{BB962C8B-B14F-4D97-AF65-F5344CB8AC3E}">
-        <p14:creationId xmlns:p14="http://schemas.microsoft.com/office/powerpoint/2010/main" val="227337858"/>
+        <p14:creationId xmlns="" xmlns:p14="http://schemas.microsoft.com/office/powerpoint/2010/main" val="227337858"/>
       </p:ext>
     </p:extLst>
   </p:cSld>
@@ -4529,6 +4552,7 @@
           <a:p>
             <a:fld id="{F03B6250-0270-41C4-9B60-C2B21D3A18F7}" type="slidenum">
               <a:rPr lang="de-DE" smtClean="0"/>
+              <a:pPr/>
               <a:t>‹Nr.›</a:t>
             </a:fld>
             <a:endParaRPr lang="de-DE"/>
@@ -4538,7 +4562,7 @@
     </p:spTree>
     <p:extLst>
       <p:ext uri="{BB962C8B-B14F-4D97-AF65-F5344CB8AC3E}">
-        <p14:creationId xmlns:p14="http://schemas.microsoft.com/office/powerpoint/2010/main" val="3239334008"/>
+        <p14:creationId xmlns="" xmlns:p14="http://schemas.microsoft.com/office/powerpoint/2010/main" val="3239334008"/>
       </p:ext>
     </p:extLst>
   </p:cSld>
@@ -4808,6 +4832,7 @@
           <a:p>
             <a:fld id="{F03B6250-0270-41C4-9B60-C2B21D3A18F7}" type="slidenum">
               <a:rPr lang="de-DE" smtClean="0"/>
+              <a:pPr/>
               <a:t>‹Nr.›</a:t>
             </a:fld>
             <a:endParaRPr lang="de-DE"/>
@@ -4817,7 +4842,7 @@
     </p:spTree>
     <p:extLst>
       <p:ext uri="{BB962C8B-B14F-4D97-AF65-F5344CB8AC3E}">
-        <p14:creationId xmlns:p14="http://schemas.microsoft.com/office/powerpoint/2010/main" val="466192376"/>
+        <p14:creationId xmlns="" xmlns:p14="http://schemas.microsoft.com/office/powerpoint/2010/main" val="466192376"/>
       </p:ext>
     </p:extLst>
   </p:cSld>
@@ -5064,6 +5089,7 @@
           <a:p>
             <a:fld id="{F03B6250-0270-41C4-9B60-C2B21D3A18F7}" type="slidenum">
               <a:rPr lang="de-DE" smtClean="0"/>
+              <a:pPr/>
               <a:t>‹Nr.›</a:t>
             </a:fld>
             <a:endParaRPr lang="de-DE"/>
@@ -5073,7 +5099,7 @@
     </p:spTree>
     <p:extLst>
       <p:ext uri="{BB962C8B-B14F-4D97-AF65-F5344CB8AC3E}">
-        <p14:creationId xmlns:p14="http://schemas.microsoft.com/office/powerpoint/2010/main" val="3466473767"/>
+        <p14:creationId xmlns="" xmlns:p14="http://schemas.microsoft.com/office/powerpoint/2010/main" val="3466473767"/>
       </p:ext>
     </p:extLst>
   </p:cSld>
@@ -5422,7 +5448,7 @@
           <a:blip r:embed="rId13" cstate="print">
             <a:extLst>
               <a:ext uri="{28A0092B-C50C-407E-A947-70E740481C1C}">
-                <a14:useLocalDpi xmlns:a14="http://schemas.microsoft.com/office/drawing/2010/main" val="0"/>
+                <a14:useLocalDpi xmlns="" xmlns:a14="http://schemas.microsoft.com/office/drawing/2010/main" val="0"/>
               </a:ext>
             </a:extLst>
           </a:blip>
@@ -5443,7 +5469,7 @@
     </p:spTree>
     <p:extLst>
       <p:ext uri="{BB962C8B-B14F-4D97-AF65-F5344CB8AC3E}">
-        <p14:creationId xmlns:p14="http://schemas.microsoft.com/office/powerpoint/2010/main" val="2300813328"/>
+        <p14:creationId xmlns="" xmlns:p14="http://schemas.microsoft.com/office/powerpoint/2010/main" val="2300813328"/>
       </p:ext>
     </p:extLst>
   </p:cSld>
@@ -6087,7 +6113,7 @@
           <a:blip r:embed="rId13" cstate="print">
             <a:extLst>
               <a:ext uri="{28A0092B-C50C-407E-A947-70E740481C1C}">
-                <a14:useLocalDpi xmlns:a14="http://schemas.microsoft.com/office/drawing/2010/main" val="0"/>
+                <a14:useLocalDpi xmlns="" xmlns:a14="http://schemas.microsoft.com/office/drawing/2010/main" val="0"/>
               </a:ext>
             </a:extLst>
           </a:blip>
@@ -6108,7 +6134,7 @@
     </p:spTree>
     <p:extLst>
       <p:ext uri="{BB962C8B-B14F-4D97-AF65-F5344CB8AC3E}">
-        <p14:creationId xmlns:p14="http://schemas.microsoft.com/office/powerpoint/2010/main" val="3437319758"/>
+        <p14:creationId xmlns="" xmlns:p14="http://schemas.microsoft.com/office/powerpoint/2010/main" val="3437319758"/>
       </p:ext>
     </p:extLst>
   </p:cSld>
@@ -6526,7 +6552,7 @@
     </p:spTree>
     <p:extLst>
       <p:ext uri="{BB962C8B-B14F-4D97-AF65-F5344CB8AC3E}">
-        <p14:creationId xmlns:p14="http://schemas.microsoft.com/office/powerpoint/2010/main" val="1475588890"/>
+        <p14:creationId xmlns="" xmlns:p14="http://schemas.microsoft.com/office/powerpoint/2010/main" val="1475588890"/>
       </p:ext>
     </p:extLst>
   </p:cSld>
@@ -6569,9 +6595,10 @@
           <a:lstStyle/>
           <a:p>
             <a:r>
-              <a:rPr lang="de-DE" dirty="0"/>
-              <a:t>Low Power</a:t>
-            </a:r>
+              <a:rPr lang="de-DE" dirty="0" err="1"/>
+              <a:t>Intertaskcommunication</a:t>
+            </a:r>
+            <a:endParaRPr lang="de-DE" dirty="0"/>
           </a:p>
         </p:txBody>
       </p:sp>
@@ -6616,7 +6643,7 @@
     </p:spTree>
     <p:extLst>
       <p:ext uri="{BB962C8B-B14F-4D97-AF65-F5344CB8AC3E}">
-        <p14:creationId xmlns:p14="http://schemas.microsoft.com/office/powerpoint/2010/main" val="4101144967"/>
+        <p14:creationId xmlns="" xmlns:p14="http://schemas.microsoft.com/office/powerpoint/2010/main" val="1993483113"/>
       </p:ext>
     </p:extLst>
   </p:cSld>
@@ -6660,7 +6687,7 @@
           <a:p>
             <a:r>
               <a:rPr lang="de-DE" dirty="0"/>
-              <a:t>Debugging</a:t>
+              <a:t>Interrupts</a:t>
             </a:r>
           </a:p>
         </p:txBody>
@@ -6706,7 +6733,187 @@
     </p:spTree>
     <p:extLst>
       <p:ext uri="{BB962C8B-B14F-4D97-AF65-F5344CB8AC3E}">
-        <p14:creationId xmlns:p14="http://schemas.microsoft.com/office/powerpoint/2010/main" val="326306677"/>
+        <p14:creationId xmlns="" xmlns:p14="http://schemas.microsoft.com/office/powerpoint/2010/main" val="3566154318"/>
+      </p:ext>
+    </p:extLst>
+  </p:cSld>
+  <p:clrMapOvr>
+    <a:masterClrMapping/>
+  </p:clrMapOvr>
+</p:sld>
+</file>
+
+<file path=ppt/slides/slide12.xml><?xml version="1.0" encoding="utf-8"?>
+<p:sld xmlns:a="http://schemas.openxmlformats.org/drawingml/2006/main" xmlns:r="http://schemas.openxmlformats.org/officeDocument/2006/relationships" xmlns:p="http://schemas.openxmlformats.org/presentationml/2006/main">
+  <p:cSld>
+    <p:spTree>
+      <p:nvGrpSpPr>
+        <p:cNvPr id="1" name=""/>
+        <p:cNvGrpSpPr/>
+        <p:nvPr/>
+      </p:nvGrpSpPr>
+      <p:grpSpPr>
+        <a:xfrm>
+          <a:off x="0" y="0"/>
+          <a:ext cx="0" cy="0"/>
+          <a:chOff x="0" y="0"/>
+          <a:chExt cx="0" cy="0"/>
+        </a:xfrm>
+      </p:grpSpPr>
+      <p:sp>
+        <p:nvSpPr>
+          <p:cNvPr id="2" name="Titel 1"/>
+          <p:cNvSpPr>
+            <a:spLocks noGrp="1"/>
+          </p:cNvSpPr>
+          <p:nvPr>
+            <p:ph type="title"/>
+          </p:nvPr>
+        </p:nvSpPr>
+        <p:spPr/>
+        <p:txBody>
+          <a:bodyPr/>
+          <a:lstStyle/>
+          <a:p>
+            <a:r>
+              <a:rPr lang="de-DE" dirty="0"/>
+              <a:t>Low Power</a:t>
+            </a:r>
+          </a:p>
+        </p:txBody>
+      </p:sp>
+      <p:sp>
+        <p:nvSpPr>
+          <p:cNvPr id="4" name="Textplatzhalter 3"/>
+          <p:cNvSpPr>
+            <a:spLocks noGrp="1"/>
+          </p:cNvSpPr>
+          <p:nvPr>
+            <p:ph type="body" idx="1"/>
+          </p:nvPr>
+        </p:nvSpPr>
+        <p:spPr/>
+        <p:txBody>
+          <a:bodyPr/>
+          <a:lstStyle/>
+          <a:p>
+            <a:endParaRPr lang="de-DE"/>
+          </a:p>
+        </p:txBody>
+      </p:sp>
+      <p:sp>
+        <p:nvSpPr>
+          <p:cNvPr id="5" name="Fußzeilenplatzhalter 4"/>
+          <p:cNvSpPr>
+            <a:spLocks noGrp="1"/>
+          </p:cNvSpPr>
+          <p:nvPr>
+            <p:ph type="ftr" sz="quarter" idx="11"/>
+          </p:nvPr>
+        </p:nvSpPr>
+        <p:spPr/>
+        <p:txBody>
+          <a:bodyPr/>
+          <a:lstStyle/>
+          <a:p>
+            <a:endParaRPr lang="de-DE"/>
+          </a:p>
+        </p:txBody>
+      </p:sp>
+    </p:spTree>
+    <p:extLst>
+      <p:ext uri="{BB962C8B-B14F-4D97-AF65-F5344CB8AC3E}">
+        <p14:creationId xmlns="" xmlns:p14="http://schemas.microsoft.com/office/powerpoint/2010/main" val="4101144967"/>
+      </p:ext>
+    </p:extLst>
+  </p:cSld>
+  <p:clrMapOvr>
+    <a:masterClrMapping/>
+  </p:clrMapOvr>
+</p:sld>
+</file>
+
+<file path=ppt/slides/slide13.xml><?xml version="1.0" encoding="utf-8"?>
+<p:sld xmlns:a="http://schemas.openxmlformats.org/drawingml/2006/main" xmlns:r="http://schemas.openxmlformats.org/officeDocument/2006/relationships" xmlns:p="http://schemas.openxmlformats.org/presentationml/2006/main">
+  <p:cSld>
+    <p:spTree>
+      <p:nvGrpSpPr>
+        <p:cNvPr id="1" name=""/>
+        <p:cNvGrpSpPr/>
+        <p:nvPr/>
+      </p:nvGrpSpPr>
+      <p:grpSpPr>
+        <a:xfrm>
+          <a:off x="0" y="0"/>
+          <a:ext cx="0" cy="0"/>
+          <a:chOff x="0" y="0"/>
+          <a:chExt cx="0" cy="0"/>
+        </a:xfrm>
+      </p:grpSpPr>
+      <p:sp>
+        <p:nvSpPr>
+          <p:cNvPr id="2" name="Titel 1"/>
+          <p:cNvSpPr>
+            <a:spLocks noGrp="1"/>
+          </p:cNvSpPr>
+          <p:nvPr>
+            <p:ph type="title"/>
+          </p:nvPr>
+        </p:nvSpPr>
+        <p:spPr/>
+        <p:txBody>
+          <a:bodyPr/>
+          <a:lstStyle/>
+          <a:p>
+            <a:r>
+              <a:rPr lang="de-DE" dirty="0"/>
+              <a:t>Debugging</a:t>
+            </a:r>
+          </a:p>
+        </p:txBody>
+      </p:sp>
+      <p:sp>
+        <p:nvSpPr>
+          <p:cNvPr id="4" name="Textplatzhalter 3"/>
+          <p:cNvSpPr>
+            <a:spLocks noGrp="1"/>
+          </p:cNvSpPr>
+          <p:nvPr>
+            <p:ph type="body" idx="1"/>
+          </p:nvPr>
+        </p:nvSpPr>
+        <p:spPr/>
+        <p:txBody>
+          <a:bodyPr/>
+          <a:lstStyle/>
+          <a:p>
+            <a:endParaRPr lang="de-DE"/>
+          </a:p>
+        </p:txBody>
+      </p:sp>
+      <p:sp>
+        <p:nvSpPr>
+          <p:cNvPr id="5" name="Fußzeilenplatzhalter 4"/>
+          <p:cNvSpPr>
+            <a:spLocks noGrp="1"/>
+          </p:cNvSpPr>
+          <p:nvPr>
+            <p:ph type="ftr" sz="quarter" idx="11"/>
+          </p:nvPr>
+        </p:nvSpPr>
+        <p:spPr/>
+        <p:txBody>
+          <a:bodyPr/>
+          <a:lstStyle/>
+          <a:p>
+            <a:endParaRPr lang="de-DE"/>
+          </a:p>
+        </p:txBody>
+      </p:sp>
+    </p:spTree>
+    <p:extLst>
+      <p:ext uri="{BB962C8B-B14F-4D97-AF65-F5344CB8AC3E}">
+        <p14:creationId xmlns="" xmlns:p14="http://schemas.microsoft.com/office/powerpoint/2010/main" val="326306677"/>
       </p:ext>
     </p:extLst>
   </p:cSld>
@@ -6743,15 +6950,21 @@
             <p:ph type="title"/>
           </p:nvPr>
         </p:nvSpPr>
-        <p:spPr/>
-        <p:txBody>
-          <a:bodyPr/>
-          <a:lstStyle/>
-          <a:p>
-            <a:r>
-              <a:rPr lang="de-DE" dirty="0"/>
-              <a:t>Echtzeit &amp; Echtzeitbetriebssysteme</a:t>
-            </a:r>
+        <p:spPr>
+          <a:xfrm>
+            <a:off x="829323" y="152061"/>
+            <a:ext cx="10515600" cy="1325563"/>
+          </a:xfrm>
+        </p:spPr>
+        <p:txBody>
+          <a:bodyPr/>
+          <a:lstStyle/>
+          <a:p>
+            <a:r>
+              <a:rPr lang="de-DE" dirty="0" smtClean="0"/>
+              <a:t>Inhalt</a:t>
+            </a:r>
+            <a:endParaRPr lang="de-DE" dirty="0"/>
           </a:p>
         </p:txBody>
       </p:sp>
@@ -6767,9 +6980,80 @@
         </p:nvSpPr>
         <p:spPr/>
         <p:txBody>
-          <a:bodyPr/>
-          <a:lstStyle/>
-          <a:p>
+          <a:bodyPr>
+            <a:normAutofit lnSpcReduction="10000"/>
+          </a:bodyPr>
+          <a:lstStyle/>
+          <a:p>
+            <a:r>
+              <a:rPr lang="de-DE" dirty="0" smtClean="0"/>
+              <a:t>Einleitung</a:t>
+            </a:r>
+          </a:p>
+          <a:p>
+            <a:r>
+              <a:rPr lang="de-DE" dirty="0" smtClean="0"/>
+              <a:t>Umgebung</a:t>
+            </a:r>
+          </a:p>
+          <a:p>
+            <a:r>
+              <a:rPr lang="de-DE" dirty="0" err="1" smtClean="0"/>
+              <a:t>FreeRTOS</a:t>
+            </a:r>
+            <a:endParaRPr lang="de-DE" dirty="0" smtClean="0"/>
+          </a:p>
+          <a:p>
+            <a:r>
+              <a:rPr lang="de-DE" dirty="0" smtClean="0"/>
+              <a:t>Memory </a:t>
+            </a:r>
+            <a:r>
+              <a:rPr lang="de-DE" dirty="0" err="1" smtClean="0"/>
+              <a:t>Allocation</a:t>
+            </a:r>
+            <a:endParaRPr lang="de-DE" dirty="0" smtClean="0"/>
+          </a:p>
+          <a:p>
+            <a:r>
+              <a:rPr lang="de-DE" dirty="0" err="1" smtClean="0"/>
+              <a:t>Scheduling</a:t>
+            </a:r>
+            <a:endParaRPr lang="de-DE" dirty="0" smtClean="0"/>
+          </a:p>
+          <a:p>
+            <a:r>
+              <a:rPr lang="de-DE" dirty="0" smtClean="0"/>
+              <a:t>Intertask </a:t>
+            </a:r>
+            <a:r>
+              <a:rPr lang="de-DE" dirty="0" err="1" smtClean="0"/>
+              <a:t>communication</a:t>
+            </a:r>
+            <a:endParaRPr lang="de-DE" dirty="0" smtClean="0"/>
+          </a:p>
+          <a:p>
+            <a:r>
+              <a:rPr lang="de-DE" dirty="0" smtClean="0"/>
+              <a:t>Interrupt </a:t>
+            </a:r>
+            <a:r>
+              <a:rPr lang="de-DE" dirty="0" err="1" smtClean="0"/>
+              <a:t>handling</a:t>
+            </a:r>
+            <a:endParaRPr lang="de-DE" dirty="0" smtClean="0"/>
+          </a:p>
+          <a:p>
+            <a:r>
+              <a:rPr lang="de-DE" dirty="0" smtClean="0"/>
+              <a:t>Low Power Modes</a:t>
+            </a:r>
+          </a:p>
+          <a:p>
+            <a:r>
+              <a:rPr lang="de-DE" dirty="0" smtClean="0"/>
+              <a:t>Tools</a:t>
+            </a:r>
             <a:endParaRPr lang="de-DE" dirty="0"/>
           </a:p>
         </p:txBody>
@@ -6784,22 +7068,171 @@
             <p:ph type="ftr" sz="quarter" idx="11"/>
           </p:nvPr>
         </p:nvSpPr>
-        <p:spPr/>
-        <p:txBody>
-          <a:bodyPr/>
-          <a:lstStyle/>
-          <a:p>
-            <a:r>
-              <a:rPr lang="de-DE" dirty="0"/>
-              <a:t>Echtzeit</a:t>
-            </a:r>
+        <p:spPr>
+          <a:xfrm>
+            <a:off x="10246658" y="1766656"/>
+            <a:ext cx="1906877" cy="4261281"/>
+          </a:xfrm>
+        </p:spPr>
+        <p:txBody>
+          <a:bodyPr/>
+          <a:lstStyle/>
+          <a:p>
+            <a:pPr>
+              <a:lnSpc>
+                <a:spcPct val="150000"/>
+              </a:lnSpc>
+            </a:pPr>
+            <a:r>
+              <a:rPr lang="de-DE" dirty="0" smtClean="0">
+                <a:solidFill>
+                  <a:schemeClr val="tx1"/>
+                </a:solidFill>
+              </a:rPr>
+              <a:t>Einleitung</a:t>
+            </a:r>
+          </a:p>
+          <a:p>
+            <a:pPr>
+              <a:lnSpc>
+                <a:spcPct val="150000"/>
+              </a:lnSpc>
+            </a:pPr>
+            <a:r>
+              <a:rPr lang="de-DE" dirty="0" smtClean="0">
+                <a:solidFill>
+                  <a:schemeClr val="tx1"/>
+                </a:solidFill>
+              </a:rPr>
+              <a:t> Umgebung </a:t>
+            </a:r>
+          </a:p>
+          <a:p>
+            <a:pPr>
+              <a:lnSpc>
+                <a:spcPct val="150000"/>
+              </a:lnSpc>
+            </a:pPr>
+            <a:r>
+              <a:rPr lang="de-DE" dirty="0" smtClean="0">
+                <a:solidFill>
+                  <a:schemeClr val="tx1"/>
+                </a:solidFill>
+              </a:rPr>
+              <a:t> </a:t>
+            </a:r>
+            <a:r>
+              <a:rPr lang="de-DE" dirty="0" err="1" smtClean="0">
+                <a:solidFill>
+                  <a:schemeClr val="tx1"/>
+                </a:solidFill>
+              </a:rPr>
+              <a:t>FreeRTOS</a:t>
+            </a:r>
+            <a:r>
+              <a:rPr lang="de-DE" dirty="0" smtClean="0">
+                <a:solidFill>
+                  <a:schemeClr val="tx1"/>
+                </a:solidFill>
+              </a:rPr>
+              <a:t> </a:t>
+            </a:r>
+          </a:p>
+          <a:p>
+            <a:r>
+              <a:rPr lang="de-DE" dirty="0" smtClean="0">
+                <a:solidFill>
+                  <a:schemeClr val="tx1"/>
+                </a:solidFill>
+              </a:rPr>
+              <a:t>Memory </a:t>
+            </a:r>
+            <a:r>
+              <a:rPr lang="de-DE" dirty="0" err="1" smtClean="0">
+                <a:solidFill>
+                  <a:schemeClr val="tx1"/>
+                </a:solidFill>
+              </a:rPr>
+              <a:t>Allocation</a:t>
+            </a:r>
+            <a:r>
+              <a:rPr lang="de-DE" dirty="0" smtClean="0">
+                <a:solidFill>
+                  <a:schemeClr val="tx1"/>
+                </a:solidFill>
+              </a:rPr>
+              <a:t> </a:t>
+            </a:r>
+            <a:r>
+              <a:rPr lang="de-DE" dirty="0" err="1" smtClean="0">
+                <a:solidFill>
+                  <a:schemeClr val="tx1"/>
+                </a:solidFill>
+              </a:rPr>
+              <a:t>Scheduling</a:t>
+            </a:r>
+            <a:r>
+              <a:rPr lang="de-DE" dirty="0" smtClean="0">
+                <a:solidFill>
+                  <a:schemeClr val="tx1"/>
+                </a:solidFill>
+              </a:rPr>
+              <a:t> Intertask-</a:t>
+            </a:r>
+            <a:r>
+              <a:rPr lang="de-DE" dirty="0" err="1" smtClean="0">
+                <a:solidFill>
+                  <a:schemeClr val="tx1"/>
+                </a:solidFill>
+              </a:rPr>
+              <a:t>kommunikation</a:t>
+            </a:r>
+            <a:r>
+              <a:rPr lang="de-DE" dirty="0" smtClean="0">
+                <a:solidFill>
+                  <a:schemeClr val="tx1"/>
+                </a:solidFill>
+              </a:rPr>
+              <a:t>  Interrupt </a:t>
+            </a:r>
+            <a:r>
+              <a:rPr lang="de-DE" dirty="0" err="1" smtClean="0">
+                <a:solidFill>
+                  <a:schemeClr val="tx1"/>
+                </a:solidFill>
+              </a:rPr>
+              <a:t>handling</a:t>
+            </a:r>
+            <a:r>
+              <a:rPr lang="de-DE" dirty="0" smtClean="0">
+                <a:solidFill>
+                  <a:schemeClr val="tx1"/>
+                </a:solidFill>
+              </a:rPr>
+              <a:t> </a:t>
+            </a:r>
+          </a:p>
+          <a:p>
+            <a:r>
+              <a:rPr lang="de-DE" dirty="0" smtClean="0">
+                <a:solidFill>
+                  <a:schemeClr val="tx1"/>
+                </a:solidFill>
+              </a:rPr>
+              <a:t> Low Power Modes Tools</a:t>
+            </a:r>
+            <a:endParaRPr lang="de-DE" dirty="0">
+              <a:solidFill>
+                <a:schemeClr val="tx1"/>
+              </a:solidFill>
+            </a:endParaRPr>
           </a:p>
         </p:txBody>
       </p:sp>
     </p:spTree>
     <p:extLst>
       <p:ext uri="{BB962C8B-B14F-4D97-AF65-F5344CB8AC3E}">
-        <p14:creationId xmlns:p14="http://schemas.microsoft.com/office/powerpoint/2010/main" val="3574650683"/>
+        <p14:creationId xmlns="" xmlns:p14="http://schemas.microsoft.com/office/powerpoint/2010/main" val="3574650683"/>
       </p:ext>
     </p:extLst>
   </p:cSld>
@@ -6842,79 +7275,50 @@
           <a:lstStyle/>
           <a:p>
             <a:r>
-              <a:rPr lang="de-DE" dirty="0" err="1"/>
-              <a:t>FreeRTOS</a:t>
-            </a:r>
+              <a:rPr lang="de-DE" dirty="0" smtClean="0"/>
+              <a:t>Einsatzbereiche</a:t>
+            </a:r>
+            <a:endParaRPr lang="de-DE" dirty="0"/>
+          </a:p>
+        </p:txBody>
+      </p:sp>
+      <p:sp>
+        <p:nvSpPr>
+          <p:cNvPr id="3" name="Inhaltsplatzhalter 2"/>
+          <p:cNvSpPr>
+            <a:spLocks noGrp="1"/>
+          </p:cNvSpPr>
+          <p:nvPr>
+            <p:ph idx="1"/>
+          </p:nvPr>
+        </p:nvSpPr>
+        <p:spPr/>
+        <p:txBody>
+          <a:bodyPr/>
+          <a:lstStyle/>
+          <a:p>
+            <a:endParaRPr lang="de-DE" dirty="0"/>
+          </a:p>
+        </p:txBody>
+      </p:sp>
+      <p:sp>
+        <p:nvSpPr>
+          <p:cNvPr id="5" name="Fußzeilenplatzhalter 4"/>
+          <p:cNvSpPr>
+            <a:spLocks noGrp="1"/>
+          </p:cNvSpPr>
+          <p:nvPr>
+            <p:ph type="ftr" sz="quarter" idx="11"/>
+          </p:nvPr>
+        </p:nvSpPr>
+        <p:spPr/>
+        <p:txBody>
+          <a:bodyPr/>
+          <a:lstStyle/>
+          <a:p>
             <a:r>
               <a:rPr lang="de-DE" dirty="0"/>
-              <a:t> </a:t>
-            </a:r>
-          </a:p>
-        </p:txBody>
-      </p:sp>
-      <p:sp>
-        <p:nvSpPr>
-          <p:cNvPr id="3" name="Inhaltsplatzhalter 2"/>
-          <p:cNvSpPr>
-            <a:spLocks noGrp="1"/>
-          </p:cNvSpPr>
-          <p:nvPr>
-            <p:ph idx="1"/>
-          </p:nvPr>
-        </p:nvSpPr>
-        <p:spPr/>
-        <p:txBody>
-          <a:bodyPr/>
-          <a:lstStyle/>
-          <a:p>
-            <a:r>
-              <a:rPr lang="de-DE" dirty="0"/>
-              <a:t>Geschichte</a:t>
-            </a:r>
-          </a:p>
-          <a:p>
-            <a:r>
-              <a:rPr lang="de-DE" dirty="0"/>
-              <a:t>File </a:t>
-            </a:r>
-            <a:r>
-              <a:rPr lang="de-DE" dirty="0" err="1"/>
-              <a:t>Structure</a:t>
-            </a:r>
-            <a:endParaRPr lang="de-DE" dirty="0"/>
-          </a:p>
-          <a:p>
-            <a:r>
-              <a:rPr lang="de-DE" dirty="0"/>
-              <a:t>Einrichten</a:t>
-            </a:r>
-          </a:p>
-          <a:p>
-            <a:r>
-              <a:rPr lang="de-DE" dirty="0"/>
-              <a:t>Entwicklungsumgebung</a:t>
-            </a:r>
-          </a:p>
-        </p:txBody>
-      </p:sp>
-      <p:sp>
-        <p:nvSpPr>
-          <p:cNvPr id="5" name="Fußzeilenplatzhalter 4"/>
-          <p:cNvSpPr>
-            <a:spLocks noGrp="1"/>
-          </p:cNvSpPr>
-          <p:nvPr>
-            <p:ph type="ftr" sz="quarter" idx="11"/>
-          </p:nvPr>
-        </p:nvSpPr>
-        <p:spPr/>
-        <p:txBody>
-          <a:bodyPr/>
-          <a:lstStyle/>
-          <a:p>
-            <a:r>
-              <a:rPr lang="de-DE" dirty="0"/>
-              <a:t>Einrichtung</a:t>
+              <a:t>Echtzeit</a:t>
             </a:r>
           </a:p>
         </p:txBody>
@@ -6922,7 +7326,7 @@
     </p:spTree>
     <p:extLst>
       <p:ext uri="{BB962C8B-B14F-4D97-AF65-F5344CB8AC3E}">
-        <p14:creationId xmlns:p14="http://schemas.microsoft.com/office/powerpoint/2010/main" val="1386685637"/>
+        <p14:creationId xmlns="" xmlns:p14="http://schemas.microsoft.com/office/powerpoint/2010/main" val="3574650683"/>
       </p:ext>
     </p:extLst>
   </p:cSld>
@@ -6966,19 +7370,19 @@
           <a:p>
             <a:r>
               <a:rPr lang="de-DE" dirty="0"/>
-              <a:t>Memorymanagement</a:t>
-            </a:r>
-          </a:p>
-        </p:txBody>
-      </p:sp>
-      <p:sp>
-        <p:nvSpPr>
-          <p:cNvPr id="5" name="Textplatzhalter 4"/>
-          <p:cNvSpPr>
-            <a:spLocks noGrp="1"/>
-          </p:cNvSpPr>
-          <p:nvPr>
-            <p:ph type="body" idx="1"/>
+              <a:t>Echtzeit &amp; Echtzeitbetriebssysteme</a:t>
+            </a:r>
+          </a:p>
+        </p:txBody>
+      </p:sp>
+      <p:sp>
+        <p:nvSpPr>
+          <p:cNvPr id="3" name="Inhaltsplatzhalter 2"/>
+          <p:cNvSpPr>
+            <a:spLocks noGrp="1"/>
+          </p:cNvSpPr>
+          <p:nvPr>
+            <p:ph idx="1"/>
           </p:nvPr>
         </p:nvSpPr>
         <p:spPr/>
@@ -6992,7 +7396,7 @@
       </p:sp>
       <p:sp>
         <p:nvSpPr>
-          <p:cNvPr id="7" name="Fußzeilenplatzhalter 6"/>
+          <p:cNvPr id="5" name="Fußzeilenplatzhalter 4"/>
           <p:cNvSpPr>
             <a:spLocks noGrp="1"/>
           </p:cNvSpPr>
@@ -7007,7 +7411,7 @@
           <a:p>
             <a:r>
               <a:rPr lang="de-DE" dirty="0"/>
-              <a:t>Memory Management</a:t>
+              <a:t>Echtzeit</a:t>
             </a:r>
           </a:p>
         </p:txBody>
@@ -7015,7 +7419,7 @@
     </p:spTree>
     <p:extLst>
       <p:ext uri="{BB962C8B-B14F-4D97-AF65-F5344CB8AC3E}">
-        <p14:creationId xmlns:p14="http://schemas.microsoft.com/office/powerpoint/2010/main" val="2996306764"/>
+        <p14:creationId xmlns="" xmlns:p14="http://schemas.microsoft.com/office/powerpoint/2010/main" val="3574650683"/>
       </p:ext>
     </p:extLst>
   </p:cSld>
@@ -7058,69 +7462,58 @@
           <a:lstStyle/>
           <a:p>
             <a:r>
-              <a:rPr lang="de-DE" dirty="0"/>
-              <a:t>Speicheralgorithmen</a:t>
-            </a:r>
-          </a:p>
-        </p:txBody>
-      </p:sp>
-      <p:sp>
-        <p:nvSpPr>
-          <p:cNvPr id="3" name="Inhaltsplatzhalter 2"/>
-          <p:cNvSpPr>
-            <a:spLocks noGrp="1"/>
-          </p:cNvSpPr>
-          <p:nvPr>
-            <p:ph idx="1"/>
-          </p:nvPr>
-        </p:nvSpPr>
-        <p:spPr/>
-        <p:txBody>
-          <a:bodyPr/>
-          <a:lstStyle/>
-          <a:p>
-            <a:r>
-              <a:rPr lang="de-DE" dirty="0" err="1"/>
-              <a:t>Malloc</a:t>
-            </a:r>
-            <a:r>
-              <a:rPr lang="de-DE" dirty="0"/>
-              <a:t> &amp; </a:t>
-            </a:r>
-            <a:r>
-              <a:rPr lang="de-DE" dirty="0" err="1"/>
-              <a:t>free</a:t>
-            </a:r>
-            <a:r>
-              <a:rPr lang="de-DE" dirty="0"/>
-              <a:t> (STD C Library)</a:t>
-            </a:r>
-          </a:p>
-          <a:p>
-            <a:r>
-              <a:rPr lang="de-DE" dirty="0"/>
-              <a:t>Struktur in </a:t>
-            </a:r>
-            <a:r>
               <a:rPr lang="de-DE" dirty="0" err="1"/>
               <a:t>FreeRTOS</a:t>
             </a:r>
+            <a:r>
+              <a:rPr lang="de-DE" dirty="0"/>
+              <a:t> </a:t>
+            </a:r>
+          </a:p>
+        </p:txBody>
+      </p:sp>
+      <p:sp>
+        <p:nvSpPr>
+          <p:cNvPr id="3" name="Inhaltsplatzhalter 2"/>
+          <p:cNvSpPr>
+            <a:spLocks noGrp="1"/>
+          </p:cNvSpPr>
+          <p:nvPr>
+            <p:ph idx="1"/>
+          </p:nvPr>
+        </p:nvSpPr>
+        <p:spPr/>
+        <p:txBody>
+          <a:bodyPr/>
+          <a:lstStyle/>
+          <a:p>
+            <a:r>
+              <a:rPr lang="de-DE" dirty="0"/>
+              <a:t>Geschichte</a:t>
+            </a:r>
+          </a:p>
+          <a:p>
+            <a:r>
+              <a:rPr lang="de-DE" dirty="0"/>
+              <a:t>File </a:t>
+            </a:r>
+            <a:r>
+              <a:rPr lang="de-DE" dirty="0" err="1"/>
+              <a:t>Structure</a:t>
+            </a:r>
             <a:endParaRPr lang="de-DE" dirty="0"/>
           </a:p>
           <a:p>
             <a:r>
               <a:rPr lang="de-DE" dirty="0"/>
-              <a:t>Probleme Fragmentierung</a:t>
+              <a:t>Einrichten</a:t>
             </a:r>
           </a:p>
           <a:p>
             <a:r>
               <a:rPr lang="de-DE" dirty="0"/>
-              <a:t>Eigene Speicherverwaltung</a:t>
-            </a:r>
-          </a:p>
-          <a:p>
-            <a:endParaRPr lang="de-DE" dirty="0"/>
+              <a:t>Entwicklungsumgebung</a:t>
+            </a:r>
           </a:p>
         </p:txBody>
       </p:sp>
@@ -7141,7 +7534,7 @@
           <a:p>
             <a:r>
               <a:rPr lang="de-DE" dirty="0"/>
-              <a:t>Memory Management</a:t>
+              <a:t>Einrichtung</a:t>
             </a:r>
           </a:p>
         </p:txBody>
@@ -7149,7 +7542,7 @@
     </p:spTree>
     <p:extLst>
       <p:ext uri="{BB962C8B-B14F-4D97-AF65-F5344CB8AC3E}">
-        <p14:creationId xmlns:p14="http://schemas.microsoft.com/office/powerpoint/2010/main" val="3377158169"/>
+        <p14:creationId xmlns="" xmlns:p14="http://schemas.microsoft.com/office/powerpoint/2010/main" val="1386685637"/>
       </p:ext>
     </p:extLst>
   </p:cSld>
@@ -7160,6 +7553,233 @@
 </file>
 
 <file path=ppt/slides/slide6.xml><?xml version="1.0" encoding="utf-8"?>
+<p:sld xmlns:a="http://schemas.openxmlformats.org/drawingml/2006/main" xmlns:r="http://schemas.openxmlformats.org/officeDocument/2006/relationships" xmlns:p="http://schemas.openxmlformats.org/presentationml/2006/main">
+  <p:cSld>
+    <p:spTree>
+      <p:nvGrpSpPr>
+        <p:cNvPr id="1" name=""/>
+        <p:cNvGrpSpPr/>
+        <p:nvPr/>
+      </p:nvGrpSpPr>
+      <p:grpSpPr>
+        <a:xfrm>
+          <a:off x="0" y="0"/>
+          <a:ext cx="0" cy="0"/>
+          <a:chOff x="0" y="0"/>
+          <a:chExt cx="0" cy="0"/>
+        </a:xfrm>
+      </p:grpSpPr>
+      <p:sp>
+        <p:nvSpPr>
+          <p:cNvPr id="2" name="Titel 1"/>
+          <p:cNvSpPr>
+            <a:spLocks noGrp="1"/>
+          </p:cNvSpPr>
+          <p:nvPr>
+            <p:ph type="title"/>
+          </p:nvPr>
+        </p:nvSpPr>
+        <p:spPr/>
+        <p:txBody>
+          <a:bodyPr/>
+          <a:lstStyle/>
+          <a:p>
+            <a:r>
+              <a:rPr lang="de-DE" dirty="0"/>
+              <a:t>Memorymanagement</a:t>
+            </a:r>
+          </a:p>
+        </p:txBody>
+      </p:sp>
+      <p:sp>
+        <p:nvSpPr>
+          <p:cNvPr id="5" name="Textplatzhalter 4"/>
+          <p:cNvSpPr>
+            <a:spLocks noGrp="1"/>
+          </p:cNvSpPr>
+          <p:nvPr>
+            <p:ph type="body" idx="1"/>
+          </p:nvPr>
+        </p:nvSpPr>
+        <p:spPr/>
+        <p:txBody>
+          <a:bodyPr/>
+          <a:lstStyle/>
+          <a:p>
+            <a:endParaRPr lang="de-DE" dirty="0"/>
+          </a:p>
+        </p:txBody>
+      </p:sp>
+      <p:sp>
+        <p:nvSpPr>
+          <p:cNvPr id="7" name="Fußzeilenplatzhalter 6"/>
+          <p:cNvSpPr>
+            <a:spLocks noGrp="1"/>
+          </p:cNvSpPr>
+          <p:nvPr>
+            <p:ph type="ftr" sz="quarter" idx="11"/>
+          </p:nvPr>
+        </p:nvSpPr>
+        <p:spPr/>
+        <p:txBody>
+          <a:bodyPr/>
+          <a:lstStyle/>
+          <a:p>
+            <a:r>
+              <a:rPr lang="de-DE" dirty="0"/>
+              <a:t>Memory Management</a:t>
+            </a:r>
+          </a:p>
+        </p:txBody>
+      </p:sp>
+    </p:spTree>
+    <p:extLst>
+      <p:ext uri="{BB962C8B-B14F-4D97-AF65-F5344CB8AC3E}">
+        <p14:creationId xmlns="" xmlns:p14="http://schemas.microsoft.com/office/powerpoint/2010/main" val="2996306764"/>
+      </p:ext>
+    </p:extLst>
+  </p:cSld>
+  <p:clrMapOvr>
+    <a:masterClrMapping/>
+  </p:clrMapOvr>
+</p:sld>
+</file>
+
+<file path=ppt/slides/slide7.xml><?xml version="1.0" encoding="utf-8"?>
+<p:sld xmlns:a="http://schemas.openxmlformats.org/drawingml/2006/main" xmlns:r="http://schemas.openxmlformats.org/officeDocument/2006/relationships" xmlns:p="http://schemas.openxmlformats.org/presentationml/2006/main">
+  <p:cSld>
+    <p:spTree>
+      <p:nvGrpSpPr>
+        <p:cNvPr id="1" name=""/>
+        <p:cNvGrpSpPr/>
+        <p:nvPr/>
+      </p:nvGrpSpPr>
+      <p:grpSpPr>
+        <a:xfrm>
+          <a:off x="0" y="0"/>
+          <a:ext cx="0" cy="0"/>
+          <a:chOff x="0" y="0"/>
+          <a:chExt cx="0" cy="0"/>
+        </a:xfrm>
+      </p:grpSpPr>
+      <p:sp>
+        <p:nvSpPr>
+          <p:cNvPr id="2" name="Titel 1"/>
+          <p:cNvSpPr>
+            <a:spLocks noGrp="1"/>
+          </p:cNvSpPr>
+          <p:nvPr>
+            <p:ph type="title"/>
+          </p:nvPr>
+        </p:nvSpPr>
+        <p:spPr/>
+        <p:txBody>
+          <a:bodyPr/>
+          <a:lstStyle/>
+          <a:p>
+            <a:r>
+              <a:rPr lang="de-DE" dirty="0"/>
+              <a:t>Speicheralgorithmen</a:t>
+            </a:r>
+          </a:p>
+        </p:txBody>
+      </p:sp>
+      <p:sp>
+        <p:nvSpPr>
+          <p:cNvPr id="3" name="Inhaltsplatzhalter 2"/>
+          <p:cNvSpPr>
+            <a:spLocks noGrp="1"/>
+          </p:cNvSpPr>
+          <p:nvPr>
+            <p:ph idx="1"/>
+          </p:nvPr>
+        </p:nvSpPr>
+        <p:spPr/>
+        <p:txBody>
+          <a:bodyPr/>
+          <a:lstStyle/>
+          <a:p>
+            <a:r>
+              <a:rPr lang="de-DE" dirty="0" err="1"/>
+              <a:t>Malloc</a:t>
+            </a:r>
+            <a:r>
+              <a:rPr lang="de-DE" dirty="0"/>
+              <a:t> &amp; </a:t>
+            </a:r>
+            <a:r>
+              <a:rPr lang="de-DE" dirty="0" err="1"/>
+              <a:t>free</a:t>
+            </a:r>
+            <a:r>
+              <a:rPr lang="de-DE" dirty="0"/>
+              <a:t> (STD C Library)</a:t>
+            </a:r>
+          </a:p>
+          <a:p>
+            <a:r>
+              <a:rPr lang="de-DE" dirty="0"/>
+              <a:t>Struktur in </a:t>
+            </a:r>
+            <a:r>
+              <a:rPr lang="de-DE" dirty="0" err="1"/>
+              <a:t>FreeRTOS</a:t>
+            </a:r>
+            <a:endParaRPr lang="de-DE" dirty="0"/>
+          </a:p>
+          <a:p>
+            <a:r>
+              <a:rPr lang="de-DE" dirty="0"/>
+              <a:t>Probleme Fragmentierung</a:t>
+            </a:r>
+          </a:p>
+          <a:p>
+            <a:r>
+              <a:rPr lang="de-DE" dirty="0"/>
+              <a:t>Eigene Speicherverwaltung</a:t>
+            </a:r>
+          </a:p>
+          <a:p>
+            <a:endParaRPr lang="de-DE" dirty="0"/>
+          </a:p>
+        </p:txBody>
+      </p:sp>
+      <p:sp>
+        <p:nvSpPr>
+          <p:cNvPr id="5" name="Fußzeilenplatzhalter 4"/>
+          <p:cNvSpPr>
+            <a:spLocks noGrp="1"/>
+          </p:cNvSpPr>
+          <p:nvPr>
+            <p:ph type="ftr" sz="quarter" idx="11"/>
+          </p:nvPr>
+        </p:nvSpPr>
+        <p:spPr/>
+        <p:txBody>
+          <a:bodyPr/>
+          <a:lstStyle/>
+          <a:p>
+            <a:r>
+              <a:rPr lang="de-DE" dirty="0"/>
+              <a:t>Memory Management</a:t>
+            </a:r>
+          </a:p>
+        </p:txBody>
+      </p:sp>
+    </p:spTree>
+    <p:extLst>
+      <p:ext uri="{BB962C8B-B14F-4D97-AF65-F5344CB8AC3E}">
+        <p14:creationId xmlns="" xmlns:p14="http://schemas.microsoft.com/office/powerpoint/2010/main" val="3377158169"/>
+      </p:ext>
+    </p:extLst>
+  </p:cSld>
+  <p:clrMapOvr>
+    <a:masterClrMapping/>
+  </p:clrMapOvr>
+</p:sld>
+</file>
+
+<file path=ppt/slides/slide8.xml><?xml version="1.0" encoding="utf-8"?>
 <p:sld xmlns:a="http://schemas.openxmlformats.org/drawingml/2006/main" xmlns:r="http://schemas.openxmlformats.org/officeDocument/2006/relationships" xmlns:p="http://schemas.openxmlformats.org/presentationml/2006/main">
   <p:cSld>
     <p:spTree>
@@ -7325,193 +7945,7 @@
     </p:spTree>
     <p:extLst>
       <p:ext uri="{BB962C8B-B14F-4D97-AF65-F5344CB8AC3E}">
-        <p14:creationId xmlns:p14="http://schemas.microsoft.com/office/powerpoint/2010/main" val="2952804254"/>
-      </p:ext>
-    </p:extLst>
-  </p:cSld>
-  <p:clrMapOvr>
-    <a:masterClrMapping/>
-  </p:clrMapOvr>
-</p:sld>
-</file>
-
-<file path=ppt/slides/slide7.xml><?xml version="1.0" encoding="utf-8"?>
-<p:sld xmlns:a="http://schemas.openxmlformats.org/drawingml/2006/main" xmlns:r="http://schemas.openxmlformats.org/officeDocument/2006/relationships" xmlns:p="http://schemas.openxmlformats.org/presentationml/2006/main">
-  <p:cSld>
-    <p:spTree>
-      <p:nvGrpSpPr>
-        <p:cNvPr id="1" name=""/>
-        <p:cNvGrpSpPr/>
-        <p:nvPr/>
-      </p:nvGrpSpPr>
-      <p:grpSpPr>
-        <a:xfrm>
-          <a:off x="0" y="0"/>
-          <a:ext cx="0" cy="0"/>
-          <a:chOff x="0" y="0"/>
-          <a:chExt cx="0" cy="0"/>
-        </a:xfrm>
-      </p:grpSpPr>
-      <p:sp>
-        <p:nvSpPr>
-          <p:cNvPr id="2" name="Titel 1"/>
-          <p:cNvSpPr>
-            <a:spLocks noGrp="1"/>
-          </p:cNvSpPr>
-          <p:nvPr>
-            <p:ph type="title"/>
-          </p:nvPr>
-        </p:nvSpPr>
-        <p:spPr/>
-        <p:txBody>
-          <a:bodyPr/>
-          <a:lstStyle/>
-          <a:p>
-            <a:r>
-              <a:rPr lang="de-DE" dirty="0" err="1"/>
-              <a:t>Scheduling</a:t>
-            </a:r>
-            <a:endParaRPr lang="de-DE" dirty="0"/>
-          </a:p>
-        </p:txBody>
-      </p:sp>
-      <p:sp>
-        <p:nvSpPr>
-          <p:cNvPr id="3" name="Textplatzhalter 2"/>
-          <p:cNvSpPr>
-            <a:spLocks noGrp="1"/>
-          </p:cNvSpPr>
-          <p:nvPr>
-            <p:ph type="body" idx="1"/>
-          </p:nvPr>
-        </p:nvSpPr>
-        <p:spPr/>
-        <p:txBody>
-          <a:bodyPr/>
-          <a:lstStyle/>
-          <a:p>
-            <a:endParaRPr lang="de-DE"/>
-          </a:p>
-        </p:txBody>
-      </p:sp>
-      <p:sp>
-        <p:nvSpPr>
-          <p:cNvPr id="5" name="Fußzeilenplatzhalter 4"/>
-          <p:cNvSpPr>
-            <a:spLocks noGrp="1"/>
-          </p:cNvSpPr>
-          <p:nvPr>
-            <p:ph type="ftr" sz="quarter" idx="11"/>
-          </p:nvPr>
-        </p:nvSpPr>
-        <p:spPr/>
-        <p:txBody>
-          <a:bodyPr/>
-          <a:lstStyle/>
-          <a:p>
-            <a:r>
-              <a:rPr lang="de-DE" dirty="0" err="1"/>
-              <a:t>Scheduling</a:t>
-            </a:r>
-            <a:endParaRPr lang="de-DE" dirty="0"/>
-          </a:p>
-        </p:txBody>
-      </p:sp>
-    </p:spTree>
-    <p:extLst>
-      <p:ext uri="{BB962C8B-B14F-4D97-AF65-F5344CB8AC3E}">
-        <p14:creationId xmlns:p14="http://schemas.microsoft.com/office/powerpoint/2010/main" val="2356009988"/>
-      </p:ext>
-    </p:extLst>
-  </p:cSld>
-  <p:clrMapOvr>
-    <a:masterClrMapping/>
-  </p:clrMapOvr>
-</p:sld>
-</file>
-
-<file path=ppt/slides/slide8.xml><?xml version="1.0" encoding="utf-8"?>
-<p:sld xmlns:a="http://schemas.openxmlformats.org/drawingml/2006/main" xmlns:r="http://schemas.openxmlformats.org/officeDocument/2006/relationships" xmlns:p="http://schemas.openxmlformats.org/presentationml/2006/main">
-  <p:cSld>
-    <p:spTree>
-      <p:nvGrpSpPr>
-        <p:cNvPr id="1" name=""/>
-        <p:cNvGrpSpPr/>
-        <p:nvPr/>
-      </p:nvGrpSpPr>
-      <p:grpSpPr>
-        <a:xfrm>
-          <a:off x="0" y="0"/>
-          <a:ext cx="0" cy="0"/>
-          <a:chOff x="0" y="0"/>
-          <a:chExt cx="0" cy="0"/>
-        </a:xfrm>
-      </p:grpSpPr>
-      <p:sp>
-        <p:nvSpPr>
-          <p:cNvPr id="2" name="Titel 1"/>
-          <p:cNvSpPr>
-            <a:spLocks noGrp="1"/>
-          </p:cNvSpPr>
-          <p:nvPr>
-            <p:ph type="title"/>
-          </p:nvPr>
-        </p:nvSpPr>
-        <p:spPr/>
-        <p:txBody>
-          <a:bodyPr/>
-          <a:lstStyle/>
-          <a:p>
-            <a:r>
-              <a:rPr lang="de-DE" dirty="0" err="1"/>
-              <a:t>Intertaskcommunication</a:t>
-            </a:r>
-            <a:endParaRPr lang="de-DE" dirty="0"/>
-          </a:p>
-        </p:txBody>
-      </p:sp>
-      <p:sp>
-        <p:nvSpPr>
-          <p:cNvPr id="4" name="Textplatzhalter 3"/>
-          <p:cNvSpPr>
-            <a:spLocks noGrp="1"/>
-          </p:cNvSpPr>
-          <p:nvPr>
-            <p:ph type="body" idx="1"/>
-          </p:nvPr>
-        </p:nvSpPr>
-        <p:spPr/>
-        <p:txBody>
-          <a:bodyPr/>
-          <a:lstStyle/>
-          <a:p>
-            <a:endParaRPr lang="de-DE"/>
-          </a:p>
-        </p:txBody>
-      </p:sp>
-      <p:sp>
-        <p:nvSpPr>
-          <p:cNvPr id="5" name="Fußzeilenplatzhalter 4"/>
-          <p:cNvSpPr>
-            <a:spLocks noGrp="1"/>
-          </p:cNvSpPr>
-          <p:nvPr>
-            <p:ph type="ftr" sz="quarter" idx="11"/>
-          </p:nvPr>
-        </p:nvSpPr>
-        <p:spPr/>
-        <p:txBody>
-          <a:bodyPr/>
-          <a:lstStyle/>
-          <a:p>
-            <a:endParaRPr lang="de-DE"/>
-          </a:p>
-        </p:txBody>
-      </p:sp>
-    </p:spTree>
-    <p:extLst>
-      <p:ext uri="{BB962C8B-B14F-4D97-AF65-F5344CB8AC3E}">
-        <p14:creationId xmlns:p14="http://schemas.microsoft.com/office/powerpoint/2010/main" val="1993483113"/>
+        <p14:creationId xmlns="" xmlns:p14="http://schemas.microsoft.com/office/powerpoint/2010/main" val="2952804254"/>
       </p:ext>
     </p:extLst>
   </p:cSld>
@@ -7554,15 +7988,16 @@
           <a:lstStyle/>
           <a:p>
             <a:r>
-              <a:rPr lang="de-DE" dirty="0"/>
-              <a:t>Interrupts</a:t>
-            </a:r>
-          </a:p>
-        </p:txBody>
-      </p:sp>
-      <p:sp>
-        <p:nvSpPr>
-          <p:cNvPr id="4" name="Textplatzhalter 3"/>
+              <a:rPr lang="de-DE" dirty="0" err="1"/>
+              <a:t>Scheduling</a:t>
+            </a:r>
+            <a:endParaRPr lang="de-DE" dirty="0"/>
+          </a:p>
+        </p:txBody>
+      </p:sp>
+      <p:sp>
+        <p:nvSpPr>
+          <p:cNvPr id="3" name="Textplatzhalter 2"/>
           <p:cNvSpPr>
             <a:spLocks noGrp="1"/>
           </p:cNvSpPr>
@@ -7594,14 +8029,18 @@
           <a:bodyPr/>
           <a:lstStyle/>
           <a:p>
-            <a:endParaRPr lang="de-DE"/>
+            <a:r>
+              <a:rPr lang="de-DE" dirty="0" err="1"/>
+              <a:t>Scheduling</a:t>
+            </a:r>
+            <a:endParaRPr lang="de-DE" dirty="0"/>
           </a:p>
         </p:txBody>
       </p:sp>
     </p:spTree>
     <p:extLst>
       <p:ext uri="{BB962C8B-B14F-4D97-AF65-F5344CB8AC3E}">
-        <p14:creationId xmlns:p14="http://schemas.microsoft.com/office/powerpoint/2010/main" val="3566154318"/>
+        <p14:creationId xmlns="" xmlns:p14="http://schemas.microsoft.com/office/powerpoint/2010/main" val="2356009988"/>
       </p:ext>
     </p:extLst>
   </p:cSld>
@@ -7654,7 +8093,7 @@
     </a:clrScheme>
     <a:fontScheme name="Office">
       <a:majorFont>
-        <a:latin typeface="Calibri Light" panose="020F0302020204030204"/>
+        <a:latin typeface="Calibri Light"/>
         <a:ea typeface=""/>
         <a:cs typeface=""/>
         <a:font script="Jpan" typeface="ＭＳ Ｐゴシック"/>
@@ -7689,7 +8128,7 @@
         <a:font script="Geor" typeface="Sylfaen"/>
       </a:majorFont>
       <a:minorFont>
-        <a:latin typeface="Calibri" panose="020F0502020204030204"/>
+        <a:latin typeface="Calibri"/>
         <a:ea typeface=""/>
         <a:cs typeface=""/>
         <a:font script="Jpan" typeface="ＭＳ Ｐゴシック"/>
@@ -7866,7 +8305,7 @@
   <a:extraClrSchemeLst/>
   <a:extLst>
     <a:ext uri="{05A4C25C-085E-4340-85A3-A5531E510DB2}">
-      <thm15:themeFamily xmlns:thm15="http://schemas.microsoft.com/office/thememl/2012/main" name="Office Theme" id="{62F939B6-93AF-4DB8-9C6B-D6C7DFDC589F}" vid="{4A3C46E8-61CC-4603-A589-7422A47A8E4A}"/>
+      <thm15:themeFamily xmlns="" xmlns:thm15="http://schemas.microsoft.com/office/thememl/2012/main" name="Office Theme" id="{62F939B6-93AF-4DB8-9C6B-D6C7DFDC589F}" vid="{4A3C46E8-61CC-4603-A589-7422A47A8E4A}"/>
     </a:ext>
   </a:extLst>
 </a:theme>
@@ -7915,7 +8354,7 @@
     </a:clrScheme>
     <a:fontScheme name="Office">
       <a:majorFont>
-        <a:latin typeface="Calibri Light" panose="020F0302020204030204"/>
+        <a:latin typeface="Calibri Light"/>
         <a:ea typeface=""/>
         <a:cs typeface=""/>
         <a:font script="Jpan" typeface="ＭＳ Ｐゴシック"/>
@@ -7950,7 +8389,7 @@
         <a:font script="Geor" typeface="Sylfaen"/>
       </a:majorFont>
       <a:minorFont>
-        <a:latin typeface="Calibri" panose="020F0502020204030204"/>
+        <a:latin typeface="Calibri"/>
         <a:ea typeface=""/>
         <a:cs typeface=""/>
         <a:font script="Jpan" typeface="ＭＳ Ｐゴシック"/>
@@ -8127,7 +8566,7 @@
   <a:extraClrSchemeLst/>
   <a:extLst>
     <a:ext uri="{05A4C25C-085E-4340-85A3-A5531E510DB2}">
-      <thm15:themeFamily xmlns:thm15="http://schemas.microsoft.com/office/thememl/2012/main" name="Office Theme" id="{62F939B6-93AF-4DB8-9C6B-D6C7DFDC589F}" vid="{4A3C46E8-61CC-4603-A589-7422A47A8E4A}"/>
+      <thm15:themeFamily xmlns="" xmlns:thm15="http://schemas.microsoft.com/office/thememl/2012/main" name="Office Theme" id="{62F939B6-93AF-4DB8-9C6B-D6C7DFDC589F}" vid="{4A3C46E8-61CC-4603-A589-7422A47A8E4A}"/>
     </a:ext>
   </a:extLst>
 </a:theme>
@@ -8176,7 +8615,7 @@
     </a:clrScheme>
     <a:fontScheme name="Office">
       <a:majorFont>
-        <a:latin typeface="Calibri Light" panose="020F0302020204030204"/>
+        <a:latin typeface="Calibri Light"/>
         <a:ea typeface=""/>
         <a:cs typeface=""/>
         <a:font script="Jpan" typeface="ＭＳ Ｐゴシック"/>
@@ -8211,7 +8650,7 @@
         <a:font script="Geor" typeface="Sylfaen"/>
       </a:majorFont>
       <a:minorFont>
-        <a:latin typeface="Calibri" panose="020F0502020204030204"/>
+        <a:latin typeface="Calibri"/>
         <a:ea typeface=""/>
         <a:cs typeface=""/>
         <a:font script="Jpan" typeface="ＭＳ Ｐゴシック"/>
@@ -8388,7 +8827,7 @@
   <a:extraClrSchemeLst/>
   <a:extLst>
     <a:ext uri="{05A4C25C-085E-4340-85A3-A5531E510DB2}">
-      <thm15:themeFamily xmlns:thm15="http://schemas.microsoft.com/office/thememl/2012/main" name="Office Theme" id="{62F939B6-93AF-4DB8-9C6B-D6C7DFDC589F}" vid="{4A3C46E8-61CC-4603-A589-7422A47A8E4A}"/>
+      <thm15:themeFamily xmlns="" xmlns:thm15="http://schemas.microsoft.com/office/thememl/2012/main" name="Office Theme" id="{62F939B6-93AF-4DB8-9C6B-D6C7DFDC589F}" vid="{4A3C46E8-61CC-4603-A589-7422A47A8E4A}"/>
     </a:ext>
   </a:extLst>
 </a:theme>

</xml_diff>

<commit_message>
Signed-off-by: Anubisc <christoph.blaesser@gmx.de>Ich habe jetzt eine zweite Präsentation angelegt. Ich würde vorschlagen, dass du das genauso machst. Dann knnen wir in die ursprüngliche die abgestimmten Folien übernehmen und in unseren eigenenen entwickeln.
</commit_message>
<xml_diff>
--- a/Päsi/Seminar Betriebssysteme.pptx
+++ b/Päsi/Seminar Betriebssysteme.pptx
@@ -122,7 +122,7 @@
   </p:defaultTextStyle>
   <p:extLst>
     <p:ext uri="{EFAFB233-063F-42B5-8137-9DF3F51BA10A}">
-      <p15:sldGuideLst xmlns="" xmlns:p15="http://schemas.microsoft.com/office/powerpoint/2012/main"/>
+      <p15:sldGuideLst xmlns:p15="http://schemas.microsoft.com/office/powerpoint/2012/main" xmlns=""/>
     </p:ext>
   </p:extLst>
 </p:presentation>
@@ -383,7 +383,7 @@
     </p:spTree>
     <p:extLst>
       <p:ext uri="{BB962C8B-B14F-4D97-AF65-F5344CB8AC3E}">
-        <p14:creationId xmlns="" xmlns:p14="http://schemas.microsoft.com/office/powerpoint/2010/main" val="700791983"/>
+        <p14:creationId xmlns:p14="http://schemas.microsoft.com/office/powerpoint/2010/main" xmlns="" val="700791983"/>
       </p:ext>
     </p:extLst>
   </p:cSld>
@@ -668,7 +668,7 @@
     </p:spTree>
     <p:extLst>
       <p:ext uri="{BB962C8B-B14F-4D97-AF65-F5344CB8AC3E}">
-        <p14:creationId xmlns="" xmlns:p14="http://schemas.microsoft.com/office/powerpoint/2010/main" val="2257791673"/>
+        <p14:creationId xmlns:p14="http://schemas.microsoft.com/office/powerpoint/2010/main" xmlns="" val="2257791673"/>
       </p:ext>
     </p:extLst>
   </p:cSld>
@@ -841,7 +841,7 @@
     </p:spTree>
     <p:extLst>
       <p:ext uri="{BB962C8B-B14F-4D97-AF65-F5344CB8AC3E}">
-        <p14:creationId xmlns="" xmlns:p14="http://schemas.microsoft.com/office/powerpoint/2010/main" val="2527554667"/>
+        <p14:creationId xmlns:p14="http://schemas.microsoft.com/office/powerpoint/2010/main" xmlns="" val="2527554667"/>
       </p:ext>
     </p:extLst>
   </p:cSld>
@@ -1024,7 +1024,7 @@
     </p:spTree>
     <p:extLst>
       <p:ext uri="{BB962C8B-B14F-4D97-AF65-F5344CB8AC3E}">
-        <p14:creationId xmlns="" xmlns:p14="http://schemas.microsoft.com/office/powerpoint/2010/main" val="621481477"/>
+        <p14:creationId xmlns:p14="http://schemas.microsoft.com/office/powerpoint/2010/main" xmlns="" val="621481477"/>
       </p:ext>
     </p:extLst>
   </p:cSld>
@@ -1219,7 +1219,7 @@
     </p:spTree>
     <p:extLst>
       <p:ext uri="{BB962C8B-B14F-4D97-AF65-F5344CB8AC3E}">
-        <p14:creationId xmlns="" xmlns:p14="http://schemas.microsoft.com/office/powerpoint/2010/main" val="3661508634"/>
+        <p14:creationId xmlns:p14="http://schemas.microsoft.com/office/powerpoint/2010/main" xmlns="" val="3661508634"/>
       </p:ext>
     </p:extLst>
   </p:cSld>
@@ -1392,7 +1392,7 @@
     </p:spTree>
     <p:extLst>
       <p:ext uri="{BB962C8B-B14F-4D97-AF65-F5344CB8AC3E}">
-        <p14:creationId xmlns="" xmlns:p14="http://schemas.microsoft.com/office/powerpoint/2010/main" val="4168060298"/>
+        <p14:creationId xmlns:p14="http://schemas.microsoft.com/office/powerpoint/2010/main" xmlns="" val="4168060298"/>
       </p:ext>
     </p:extLst>
   </p:cSld>
@@ -1619,7 +1619,7 @@
     </p:spTree>
     <p:extLst>
       <p:ext uri="{BB962C8B-B14F-4D97-AF65-F5344CB8AC3E}">
-        <p14:creationId xmlns="" xmlns:p14="http://schemas.microsoft.com/office/powerpoint/2010/main" val="1794010729"/>
+        <p14:creationId xmlns:p14="http://schemas.microsoft.com/office/powerpoint/2010/main" xmlns="" val="1794010729"/>
       </p:ext>
     </p:extLst>
   </p:cSld>
@@ -1853,7 +1853,7 @@
     </p:spTree>
     <p:extLst>
       <p:ext uri="{BB962C8B-B14F-4D97-AF65-F5344CB8AC3E}">
-        <p14:creationId xmlns="" xmlns:p14="http://schemas.microsoft.com/office/powerpoint/2010/main" val="4176995027"/>
+        <p14:creationId xmlns:p14="http://schemas.microsoft.com/office/powerpoint/2010/main" xmlns="" val="4176995027"/>
       </p:ext>
     </p:extLst>
   </p:cSld>
@@ -2222,7 +2222,7 @@
     </p:spTree>
     <p:extLst>
       <p:ext uri="{BB962C8B-B14F-4D97-AF65-F5344CB8AC3E}">
-        <p14:creationId xmlns="" xmlns:p14="http://schemas.microsoft.com/office/powerpoint/2010/main" val="2740364737"/>
+        <p14:creationId xmlns:p14="http://schemas.microsoft.com/office/powerpoint/2010/main" xmlns="" val="2740364737"/>
       </p:ext>
     </p:extLst>
   </p:cSld>
@@ -2344,7 +2344,7 @@
     </p:spTree>
     <p:extLst>
       <p:ext uri="{BB962C8B-B14F-4D97-AF65-F5344CB8AC3E}">
-        <p14:creationId xmlns="" xmlns:p14="http://schemas.microsoft.com/office/powerpoint/2010/main" val="2388727467"/>
+        <p14:creationId xmlns:p14="http://schemas.microsoft.com/office/powerpoint/2010/main" xmlns="" val="2388727467"/>
       </p:ext>
     </p:extLst>
   </p:cSld>
@@ -2444,7 +2444,7 @@
     </p:spTree>
     <p:extLst>
       <p:ext uri="{BB962C8B-B14F-4D97-AF65-F5344CB8AC3E}">
-        <p14:creationId xmlns="" xmlns:p14="http://schemas.microsoft.com/office/powerpoint/2010/main" val="4144591651"/>
+        <p14:creationId xmlns:p14="http://schemas.microsoft.com/office/powerpoint/2010/main" xmlns="" val="4144591651"/>
       </p:ext>
     </p:extLst>
   </p:cSld>
@@ -2724,7 +2724,7 @@
     </p:spTree>
     <p:extLst>
       <p:ext uri="{BB962C8B-B14F-4D97-AF65-F5344CB8AC3E}">
-        <p14:creationId xmlns="" xmlns:p14="http://schemas.microsoft.com/office/powerpoint/2010/main" val="3667714112"/>
+        <p14:creationId xmlns:p14="http://schemas.microsoft.com/office/powerpoint/2010/main" xmlns="" val="3667714112"/>
       </p:ext>
     </p:extLst>
   </p:cSld>
@@ -2897,7 +2897,7 @@
     </p:spTree>
     <p:extLst>
       <p:ext uri="{BB962C8B-B14F-4D97-AF65-F5344CB8AC3E}">
-        <p14:creationId xmlns="" xmlns:p14="http://schemas.microsoft.com/office/powerpoint/2010/main" val="1332049413"/>
+        <p14:creationId xmlns:p14="http://schemas.microsoft.com/office/powerpoint/2010/main" xmlns="" val="1332049413"/>
       </p:ext>
     </p:extLst>
   </p:cSld>
@@ -3154,7 +3154,7 @@
     </p:spTree>
     <p:extLst>
       <p:ext uri="{BB962C8B-B14F-4D97-AF65-F5344CB8AC3E}">
-        <p14:creationId xmlns="" xmlns:p14="http://schemas.microsoft.com/office/powerpoint/2010/main" val="190149329"/>
+        <p14:creationId xmlns:p14="http://schemas.microsoft.com/office/powerpoint/2010/main" xmlns="" val="190149329"/>
       </p:ext>
     </p:extLst>
   </p:cSld>
@@ -3327,7 +3327,7 @@
     </p:spTree>
     <p:extLst>
       <p:ext uri="{BB962C8B-B14F-4D97-AF65-F5344CB8AC3E}">
-        <p14:creationId xmlns="" xmlns:p14="http://schemas.microsoft.com/office/powerpoint/2010/main" val="995635370"/>
+        <p14:creationId xmlns:p14="http://schemas.microsoft.com/office/powerpoint/2010/main" xmlns="" val="995635370"/>
       </p:ext>
     </p:extLst>
   </p:cSld>
@@ -3510,7 +3510,7 @@
     </p:spTree>
     <p:extLst>
       <p:ext uri="{BB962C8B-B14F-4D97-AF65-F5344CB8AC3E}">
-        <p14:creationId xmlns="" xmlns:p14="http://schemas.microsoft.com/office/powerpoint/2010/main" val="655588613"/>
+        <p14:creationId xmlns:p14="http://schemas.microsoft.com/office/powerpoint/2010/main" xmlns="" val="655588613"/>
       </p:ext>
     </p:extLst>
   </p:cSld>
@@ -3737,7 +3737,7 @@
     </p:spTree>
     <p:extLst>
       <p:ext uri="{BB962C8B-B14F-4D97-AF65-F5344CB8AC3E}">
-        <p14:creationId xmlns="" xmlns:p14="http://schemas.microsoft.com/office/powerpoint/2010/main" val="2853574932"/>
+        <p14:creationId xmlns:p14="http://schemas.microsoft.com/office/powerpoint/2010/main" xmlns="" val="2853574932"/>
       </p:ext>
     </p:extLst>
   </p:cSld>
@@ -3971,7 +3971,7 @@
     </p:spTree>
     <p:extLst>
       <p:ext uri="{BB962C8B-B14F-4D97-AF65-F5344CB8AC3E}">
-        <p14:creationId xmlns="" xmlns:p14="http://schemas.microsoft.com/office/powerpoint/2010/main" val="2199095327"/>
+        <p14:creationId xmlns:p14="http://schemas.microsoft.com/office/powerpoint/2010/main" xmlns="" val="2199095327"/>
       </p:ext>
     </p:extLst>
   </p:cSld>
@@ -4340,7 +4340,7 @@
     </p:spTree>
     <p:extLst>
       <p:ext uri="{BB962C8B-B14F-4D97-AF65-F5344CB8AC3E}">
-        <p14:creationId xmlns="" xmlns:p14="http://schemas.microsoft.com/office/powerpoint/2010/main" val="311317856"/>
+        <p14:creationId xmlns:p14="http://schemas.microsoft.com/office/powerpoint/2010/main" xmlns="" val="311317856"/>
       </p:ext>
     </p:extLst>
   </p:cSld>
@@ -4462,7 +4462,7 @@
     </p:spTree>
     <p:extLst>
       <p:ext uri="{BB962C8B-B14F-4D97-AF65-F5344CB8AC3E}">
-        <p14:creationId xmlns="" xmlns:p14="http://schemas.microsoft.com/office/powerpoint/2010/main" val="227337858"/>
+        <p14:creationId xmlns:p14="http://schemas.microsoft.com/office/powerpoint/2010/main" xmlns="" val="227337858"/>
       </p:ext>
     </p:extLst>
   </p:cSld>
@@ -4562,7 +4562,7 @@
     </p:spTree>
     <p:extLst>
       <p:ext uri="{BB962C8B-B14F-4D97-AF65-F5344CB8AC3E}">
-        <p14:creationId xmlns="" xmlns:p14="http://schemas.microsoft.com/office/powerpoint/2010/main" val="3239334008"/>
+        <p14:creationId xmlns:p14="http://schemas.microsoft.com/office/powerpoint/2010/main" xmlns="" val="3239334008"/>
       </p:ext>
     </p:extLst>
   </p:cSld>
@@ -4842,7 +4842,7 @@
     </p:spTree>
     <p:extLst>
       <p:ext uri="{BB962C8B-B14F-4D97-AF65-F5344CB8AC3E}">
-        <p14:creationId xmlns="" xmlns:p14="http://schemas.microsoft.com/office/powerpoint/2010/main" val="466192376"/>
+        <p14:creationId xmlns:p14="http://schemas.microsoft.com/office/powerpoint/2010/main" xmlns="" val="466192376"/>
       </p:ext>
     </p:extLst>
   </p:cSld>
@@ -5099,7 +5099,7 @@
     </p:spTree>
     <p:extLst>
       <p:ext uri="{BB962C8B-B14F-4D97-AF65-F5344CB8AC3E}">
-        <p14:creationId xmlns="" xmlns:p14="http://schemas.microsoft.com/office/powerpoint/2010/main" val="3466473767"/>
+        <p14:creationId xmlns:p14="http://schemas.microsoft.com/office/powerpoint/2010/main" xmlns="" val="3466473767"/>
       </p:ext>
     </p:extLst>
   </p:cSld>
@@ -5448,7 +5448,7 @@
           <a:blip r:embed="rId13" cstate="print">
             <a:extLst>
               <a:ext uri="{28A0092B-C50C-407E-A947-70E740481C1C}">
-                <a14:useLocalDpi xmlns="" xmlns:a14="http://schemas.microsoft.com/office/drawing/2010/main" val="0"/>
+                <a14:useLocalDpi xmlns:a14="http://schemas.microsoft.com/office/drawing/2010/main" xmlns="" val="0"/>
               </a:ext>
             </a:extLst>
           </a:blip>
@@ -5469,7 +5469,7 @@
     </p:spTree>
     <p:extLst>
       <p:ext uri="{BB962C8B-B14F-4D97-AF65-F5344CB8AC3E}">
-        <p14:creationId xmlns="" xmlns:p14="http://schemas.microsoft.com/office/powerpoint/2010/main" val="2300813328"/>
+        <p14:creationId xmlns:p14="http://schemas.microsoft.com/office/powerpoint/2010/main" xmlns="" val="2300813328"/>
       </p:ext>
     </p:extLst>
   </p:cSld>
@@ -6113,7 +6113,7 @@
           <a:blip r:embed="rId13" cstate="print">
             <a:extLst>
               <a:ext uri="{28A0092B-C50C-407E-A947-70E740481C1C}">
-                <a14:useLocalDpi xmlns="" xmlns:a14="http://schemas.microsoft.com/office/drawing/2010/main" val="0"/>
+                <a14:useLocalDpi xmlns:a14="http://schemas.microsoft.com/office/drawing/2010/main" xmlns="" val="0"/>
               </a:ext>
             </a:extLst>
           </a:blip>
@@ -6134,7 +6134,7 @@
     </p:spTree>
     <p:extLst>
       <p:ext uri="{BB962C8B-B14F-4D97-AF65-F5344CB8AC3E}">
-        <p14:creationId xmlns="" xmlns:p14="http://schemas.microsoft.com/office/powerpoint/2010/main" val="3437319758"/>
+        <p14:creationId xmlns:p14="http://schemas.microsoft.com/office/powerpoint/2010/main" xmlns="" val="3437319758"/>
       </p:ext>
     </p:extLst>
   </p:cSld>
@@ -6552,7 +6552,7 @@
     </p:spTree>
     <p:extLst>
       <p:ext uri="{BB962C8B-B14F-4D97-AF65-F5344CB8AC3E}">
-        <p14:creationId xmlns="" xmlns:p14="http://schemas.microsoft.com/office/powerpoint/2010/main" val="1475588890"/>
+        <p14:creationId xmlns:p14="http://schemas.microsoft.com/office/powerpoint/2010/main" xmlns="" val="1475588890"/>
       </p:ext>
     </p:extLst>
   </p:cSld>
@@ -6643,13 +6643,20 @@
     </p:spTree>
     <p:extLst>
       <p:ext uri="{BB962C8B-B14F-4D97-AF65-F5344CB8AC3E}">
-        <p14:creationId xmlns="" xmlns:p14="http://schemas.microsoft.com/office/powerpoint/2010/main" val="1993483113"/>
+        <p14:creationId xmlns:p14="http://schemas.microsoft.com/office/powerpoint/2010/main" xmlns="" val="1993483113"/>
       </p:ext>
     </p:extLst>
   </p:cSld>
   <p:clrMapOvr>
     <a:masterClrMapping/>
   </p:clrMapOvr>
+  <p:timing>
+    <p:tnLst>
+      <p:par>
+        <p:cTn id="1" dur="indefinite" restart="never" nodeType="tmRoot"/>
+      </p:par>
+    </p:tnLst>
+  </p:timing>
 </p:sld>
 </file>
 
@@ -6733,13 +6740,20 @@
     </p:spTree>
     <p:extLst>
       <p:ext uri="{BB962C8B-B14F-4D97-AF65-F5344CB8AC3E}">
-        <p14:creationId xmlns="" xmlns:p14="http://schemas.microsoft.com/office/powerpoint/2010/main" val="3566154318"/>
+        <p14:creationId xmlns:p14="http://schemas.microsoft.com/office/powerpoint/2010/main" xmlns="" val="3566154318"/>
       </p:ext>
     </p:extLst>
   </p:cSld>
   <p:clrMapOvr>
     <a:masterClrMapping/>
   </p:clrMapOvr>
+  <p:timing>
+    <p:tnLst>
+      <p:par>
+        <p:cTn id="1" dur="indefinite" restart="never" nodeType="tmRoot"/>
+      </p:par>
+    </p:tnLst>
+  </p:timing>
 </p:sld>
 </file>
 
@@ -6823,13 +6837,20 @@
     </p:spTree>
     <p:extLst>
       <p:ext uri="{BB962C8B-B14F-4D97-AF65-F5344CB8AC3E}">
-        <p14:creationId xmlns="" xmlns:p14="http://schemas.microsoft.com/office/powerpoint/2010/main" val="4101144967"/>
+        <p14:creationId xmlns:p14="http://schemas.microsoft.com/office/powerpoint/2010/main" xmlns="" val="4101144967"/>
       </p:ext>
     </p:extLst>
   </p:cSld>
   <p:clrMapOvr>
     <a:masterClrMapping/>
   </p:clrMapOvr>
+  <p:timing>
+    <p:tnLst>
+      <p:par>
+        <p:cTn id="1" dur="indefinite" restart="never" nodeType="tmRoot"/>
+      </p:par>
+    </p:tnLst>
+  </p:timing>
 </p:sld>
 </file>
 
@@ -6913,13 +6934,20 @@
     </p:spTree>
     <p:extLst>
       <p:ext uri="{BB962C8B-B14F-4D97-AF65-F5344CB8AC3E}">
-        <p14:creationId xmlns="" xmlns:p14="http://schemas.microsoft.com/office/powerpoint/2010/main" val="326306677"/>
+        <p14:creationId xmlns:p14="http://schemas.microsoft.com/office/powerpoint/2010/main" xmlns="" val="326306677"/>
       </p:ext>
     </p:extLst>
   </p:cSld>
   <p:clrMapOvr>
     <a:masterClrMapping/>
   </p:clrMapOvr>
+  <p:timing>
+    <p:tnLst>
+      <p:par>
+        <p:cTn id="1" dur="indefinite" restart="never" nodeType="tmRoot"/>
+      </p:par>
+    </p:tnLst>
+  </p:timing>
 </p:sld>
 </file>
 
@@ -7177,7 +7205,15 @@
                   <a:schemeClr val="tx1"/>
                 </a:solidFill>
               </a:rPr>
-              <a:t> Intertask-</a:t>
+              <a:t> </a:t>
+            </a:r>
+            <a:r>
+              <a:rPr lang="de-DE" dirty="0" smtClean="0">
+                <a:solidFill>
+                  <a:schemeClr val="tx1"/>
+                </a:solidFill>
+              </a:rPr>
+              <a:t>Intertask-</a:t>
             </a:r>
             <a:r>
               <a:rPr lang="de-DE" dirty="0" err="1" smtClean="0">
@@ -7185,7 +7221,15 @@
                   <a:schemeClr val="tx1"/>
                 </a:solidFill>
               </a:rPr>
-              <a:t>kommunikation</a:t>
+              <a:t>c</a:t>
+            </a:r>
+            <a:r>
+              <a:rPr lang="de-DE" dirty="0" err="1" smtClean="0">
+                <a:solidFill>
+                  <a:schemeClr val="tx1"/>
+                </a:solidFill>
+              </a:rPr>
+              <a:t>ommunikation</a:t>
             </a:r>
             <a:r>
               <a:rPr lang="de-DE" dirty="0" smtClean="0">
@@ -7193,7 +7237,15 @@
                   <a:schemeClr val="tx1"/>
                 </a:solidFill>
               </a:rPr>
-              <a:t>  Interrupt </a:t>
+              <a:t>  </a:t>
+            </a:r>
+            <a:r>
+              <a:rPr lang="de-DE" dirty="0" smtClean="0">
+                <a:solidFill>
+                  <a:schemeClr val="tx1"/>
+                </a:solidFill>
+              </a:rPr>
+              <a:t>Interrupt </a:t>
             </a:r>
             <a:r>
               <a:rPr lang="de-DE" dirty="0" err="1" smtClean="0">
@@ -7232,13 +7284,398 @@
     </p:spTree>
     <p:extLst>
       <p:ext uri="{BB962C8B-B14F-4D97-AF65-F5344CB8AC3E}">
-        <p14:creationId xmlns="" xmlns:p14="http://schemas.microsoft.com/office/powerpoint/2010/main" val="3574650683"/>
+        <p14:creationId xmlns:p14="http://schemas.microsoft.com/office/powerpoint/2010/main" xmlns="" val="3574650683"/>
       </p:ext>
     </p:extLst>
   </p:cSld>
   <p:clrMapOvr>
     <a:masterClrMapping/>
   </p:clrMapOvr>
+  <p:timing>
+    <p:tnLst>
+      <p:par>
+        <p:cTn id="1" dur="indefinite" restart="never" nodeType="tmRoot">
+          <p:childTnLst>
+            <p:seq concurrent="1" nextAc="seek">
+              <p:cTn id="2" dur="indefinite" nodeType="mainSeq">
+                <p:childTnLst>
+                  <p:par>
+                    <p:cTn id="3" fill="hold">
+                      <p:stCondLst>
+                        <p:cond delay="indefinite"/>
+                      </p:stCondLst>
+                      <p:childTnLst>
+                        <p:par>
+                          <p:cTn id="4" fill="hold">
+                            <p:stCondLst>
+                              <p:cond delay="0"/>
+                            </p:stCondLst>
+                            <p:childTnLst>
+                              <p:par>
+                                <p:cTn id="5" presetID="3" presetClass="entr" presetSubtype="10" fill="hold" nodeType="clickEffect">
+                                  <p:stCondLst>
+                                    <p:cond delay="0"/>
+                                  </p:stCondLst>
+                                  <p:childTnLst>
+                                    <p:set>
+                                      <p:cBhvr>
+                                        <p:cTn id="6" dur="1" fill="hold">
+                                          <p:stCondLst>
+                                            <p:cond delay="0"/>
+                                          </p:stCondLst>
+                                        </p:cTn>
+                                        <p:tgtEl>
+                                          <p:spTgt spid="3">
+                                            <p:txEl>
+                                              <p:pRg st="2" end="2"/>
+                                            </p:txEl>
+                                          </p:spTgt>
+                                        </p:tgtEl>
+                                        <p:attrNameLst>
+                                          <p:attrName>style.visibility</p:attrName>
+                                        </p:attrNameLst>
+                                      </p:cBhvr>
+                                      <p:to>
+                                        <p:strVal val="visible"/>
+                                      </p:to>
+                                    </p:set>
+                                    <p:animEffect transition="in" filter="blinds(horizontal)">
+                                      <p:cBhvr>
+                                        <p:cTn id="7" dur="500"/>
+                                        <p:tgtEl>
+                                          <p:spTgt spid="3">
+                                            <p:txEl>
+                                              <p:pRg st="2" end="2"/>
+                                            </p:txEl>
+                                          </p:spTgt>
+                                        </p:tgtEl>
+                                      </p:cBhvr>
+                                    </p:animEffect>
+                                  </p:childTnLst>
+                                </p:cTn>
+                              </p:par>
+                              <p:par>
+                                <p:cTn id="8" presetID="3" presetClass="entr" presetSubtype="10" fill="hold" nodeType="withEffect">
+                                  <p:stCondLst>
+                                    <p:cond delay="0"/>
+                                  </p:stCondLst>
+                                  <p:childTnLst>
+                                    <p:set>
+                                      <p:cBhvr>
+                                        <p:cTn id="9" dur="1" fill="hold">
+                                          <p:stCondLst>
+                                            <p:cond delay="0"/>
+                                          </p:stCondLst>
+                                        </p:cTn>
+                                        <p:tgtEl>
+                                          <p:spTgt spid="3">
+                                            <p:txEl>
+                                              <p:pRg st="3" end="3"/>
+                                            </p:txEl>
+                                          </p:spTgt>
+                                        </p:tgtEl>
+                                        <p:attrNameLst>
+                                          <p:attrName>style.visibility</p:attrName>
+                                        </p:attrNameLst>
+                                      </p:cBhvr>
+                                      <p:to>
+                                        <p:strVal val="visible"/>
+                                      </p:to>
+                                    </p:set>
+                                    <p:animEffect transition="in" filter="blinds(horizontal)">
+                                      <p:cBhvr>
+                                        <p:cTn id="10" dur="500"/>
+                                        <p:tgtEl>
+                                          <p:spTgt spid="3">
+                                            <p:txEl>
+                                              <p:pRg st="3" end="3"/>
+                                            </p:txEl>
+                                          </p:spTgt>
+                                        </p:tgtEl>
+                                      </p:cBhvr>
+                                    </p:animEffect>
+                                  </p:childTnLst>
+                                </p:cTn>
+                              </p:par>
+                            </p:childTnLst>
+                          </p:cTn>
+                        </p:par>
+                      </p:childTnLst>
+                    </p:cTn>
+                  </p:par>
+                  <p:par>
+                    <p:cTn id="11" fill="hold">
+                      <p:stCondLst>
+                        <p:cond delay="indefinite"/>
+                      </p:stCondLst>
+                      <p:childTnLst>
+                        <p:par>
+                          <p:cTn id="12" fill="hold">
+                            <p:stCondLst>
+                              <p:cond delay="0"/>
+                            </p:stCondLst>
+                            <p:childTnLst>
+                              <p:par>
+                                <p:cTn id="13" presetID="3" presetClass="entr" presetSubtype="10" fill="hold" nodeType="clickEffect">
+                                  <p:stCondLst>
+                                    <p:cond delay="0"/>
+                                  </p:stCondLst>
+                                  <p:childTnLst>
+                                    <p:set>
+                                      <p:cBhvr>
+                                        <p:cTn id="14" dur="1" fill="hold">
+                                          <p:stCondLst>
+                                            <p:cond delay="0"/>
+                                          </p:stCondLst>
+                                        </p:cTn>
+                                        <p:tgtEl>
+                                          <p:spTgt spid="3">
+                                            <p:txEl>
+                                              <p:pRg st="4" end="4"/>
+                                            </p:txEl>
+                                          </p:spTgt>
+                                        </p:tgtEl>
+                                        <p:attrNameLst>
+                                          <p:attrName>style.visibility</p:attrName>
+                                        </p:attrNameLst>
+                                      </p:cBhvr>
+                                      <p:to>
+                                        <p:strVal val="visible"/>
+                                      </p:to>
+                                    </p:set>
+                                    <p:animEffect transition="in" filter="blinds(horizontal)">
+                                      <p:cBhvr>
+                                        <p:cTn id="15" dur="500"/>
+                                        <p:tgtEl>
+                                          <p:spTgt spid="3">
+                                            <p:txEl>
+                                              <p:pRg st="4" end="4"/>
+                                            </p:txEl>
+                                          </p:spTgt>
+                                        </p:tgtEl>
+                                      </p:cBhvr>
+                                    </p:animEffect>
+                                  </p:childTnLst>
+                                </p:cTn>
+                              </p:par>
+                              <p:par>
+                                <p:cTn id="16" presetID="3" presetClass="entr" presetSubtype="10" fill="hold" nodeType="withEffect">
+                                  <p:stCondLst>
+                                    <p:cond delay="0"/>
+                                  </p:stCondLst>
+                                  <p:childTnLst>
+                                    <p:set>
+                                      <p:cBhvr>
+                                        <p:cTn id="17" dur="1" fill="hold">
+                                          <p:stCondLst>
+                                            <p:cond delay="0"/>
+                                          </p:stCondLst>
+                                        </p:cTn>
+                                        <p:tgtEl>
+                                          <p:spTgt spid="3">
+                                            <p:txEl>
+                                              <p:pRg st="5" end="5"/>
+                                            </p:txEl>
+                                          </p:spTgt>
+                                        </p:tgtEl>
+                                        <p:attrNameLst>
+                                          <p:attrName>style.visibility</p:attrName>
+                                        </p:attrNameLst>
+                                      </p:cBhvr>
+                                      <p:to>
+                                        <p:strVal val="visible"/>
+                                      </p:to>
+                                    </p:set>
+                                    <p:animEffect transition="in" filter="blinds(horizontal)">
+                                      <p:cBhvr>
+                                        <p:cTn id="18" dur="500"/>
+                                        <p:tgtEl>
+                                          <p:spTgt spid="3">
+                                            <p:txEl>
+                                              <p:pRg st="5" end="5"/>
+                                            </p:txEl>
+                                          </p:spTgt>
+                                        </p:tgtEl>
+                                      </p:cBhvr>
+                                    </p:animEffect>
+                                  </p:childTnLst>
+                                </p:cTn>
+                              </p:par>
+                            </p:childTnLst>
+                          </p:cTn>
+                        </p:par>
+                      </p:childTnLst>
+                    </p:cTn>
+                  </p:par>
+                  <p:par>
+                    <p:cTn id="19" fill="hold">
+                      <p:stCondLst>
+                        <p:cond delay="indefinite"/>
+                      </p:stCondLst>
+                      <p:childTnLst>
+                        <p:par>
+                          <p:cTn id="20" fill="hold">
+                            <p:stCondLst>
+                              <p:cond delay="0"/>
+                            </p:stCondLst>
+                            <p:childTnLst>
+                              <p:par>
+                                <p:cTn id="21" presetID="3" presetClass="entr" presetSubtype="10" fill="hold" nodeType="clickEffect">
+                                  <p:stCondLst>
+                                    <p:cond delay="0"/>
+                                  </p:stCondLst>
+                                  <p:childTnLst>
+                                    <p:set>
+                                      <p:cBhvr>
+                                        <p:cTn id="22" dur="1" fill="hold">
+                                          <p:stCondLst>
+                                            <p:cond delay="0"/>
+                                          </p:stCondLst>
+                                        </p:cTn>
+                                        <p:tgtEl>
+                                          <p:spTgt spid="3">
+                                            <p:txEl>
+                                              <p:pRg st="6" end="6"/>
+                                            </p:txEl>
+                                          </p:spTgt>
+                                        </p:tgtEl>
+                                        <p:attrNameLst>
+                                          <p:attrName>style.visibility</p:attrName>
+                                        </p:attrNameLst>
+                                      </p:cBhvr>
+                                      <p:to>
+                                        <p:strVal val="visible"/>
+                                      </p:to>
+                                    </p:set>
+                                    <p:animEffect transition="in" filter="blinds(horizontal)">
+                                      <p:cBhvr>
+                                        <p:cTn id="23" dur="500"/>
+                                        <p:tgtEl>
+                                          <p:spTgt spid="3">
+                                            <p:txEl>
+                                              <p:pRg st="6" end="6"/>
+                                            </p:txEl>
+                                          </p:spTgt>
+                                        </p:tgtEl>
+                                      </p:cBhvr>
+                                    </p:animEffect>
+                                  </p:childTnLst>
+                                </p:cTn>
+                              </p:par>
+                              <p:par>
+                                <p:cTn id="24" presetID="3" presetClass="entr" presetSubtype="10" fill="hold" nodeType="withEffect">
+                                  <p:stCondLst>
+                                    <p:cond delay="0"/>
+                                  </p:stCondLst>
+                                  <p:childTnLst>
+                                    <p:set>
+                                      <p:cBhvr>
+                                        <p:cTn id="25" dur="1" fill="hold">
+                                          <p:stCondLst>
+                                            <p:cond delay="0"/>
+                                          </p:stCondLst>
+                                        </p:cTn>
+                                        <p:tgtEl>
+                                          <p:spTgt spid="3">
+                                            <p:txEl>
+                                              <p:pRg st="7" end="7"/>
+                                            </p:txEl>
+                                          </p:spTgt>
+                                        </p:tgtEl>
+                                        <p:attrNameLst>
+                                          <p:attrName>style.visibility</p:attrName>
+                                        </p:attrNameLst>
+                                      </p:cBhvr>
+                                      <p:to>
+                                        <p:strVal val="visible"/>
+                                      </p:to>
+                                    </p:set>
+                                    <p:animEffect transition="in" filter="blinds(horizontal)">
+                                      <p:cBhvr>
+                                        <p:cTn id="26" dur="500"/>
+                                        <p:tgtEl>
+                                          <p:spTgt spid="3">
+                                            <p:txEl>
+                                              <p:pRg st="7" end="7"/>
+                                            </p:txEl>
+                                          </p:spTgt>
+                                        </p:tgtEl>
+                                      </p:cBhvr>
+                                    </p:animEffect>
+                                  </p:childTnLst>
+                                </p:cTn>
+                              </p:par>
+                              <p:par>
+                                <p:cTn id="27" presetID="3" presetClass="entr" presetSubtype="10" fill="hold" nodeType="withEffect">
+                                  <p:stCondLst>
+                                    <p:cond delay="0"/>
+                                  </p:stCondLst>
+                                  <p:childTnLst>
+                                    <p:set>
+                                      <p:cBhvr>
+                                        <p:cTn id="28" dur="1" fill="hold">
+                                          <p:stCondLst>
+                                            <p:cond delay="0"/>
+                                          </p:stCondLst>
+                                        </p:cTn>
+                                        <p:tgtEl>
+                                          <p:spTgt spid="3">
+                                            <p:txEl>
+                                              <p:pRg st="8" end="8"/>
+                                            </p:txEl>
+                                          </p:spTgt>
+                                        </p:tgtEl>
+                                        <p:attrNameLst>
+                                          <p:attrName>style.visibility</p:attrName>
+                                        </p:attrNameLst>
+                                      </p:cBhvr>
+                                      <p:to>
+                                        <p:strVal val="visible"/>
+                                      </p:to>
+                                    </p:set>
+                                    <p:animEffect transition="in" filter="blinds(horizontal)">
+                                      <p:cBhvr>
+                                        <p:cTn id="29" dur="500"/>
+                                        <p:tgtEl>
+                                          <p:spTgt spid="3">
+                                            <p:txEl>
+                                              <p:pRg st="8" end="8"/>
+                                            </p:txEl>
+                                          </p:spTgt>
+                                        </p:tgtEl>
+                                      </p:cBhvr>
+                                    </p:animEffect>
+                                  </p:childTnLst>
+                                </p:cTn>
+                              </p:par>
+                            </p:childTnLst>
+                          </p:cTn>
+                        </p:par>
+                      </p:childTnLst>
+                    </p:cTn>
+                  </p:par>
+                </p:childTnLst>
+              </p:cTn>
+              <p:prevCondLst>
+                <p:cond evt="onPrev" delay="0">
+                  <p:tgtEl>
+                    <p:sldTgt/>
+                  </p:tgtEl>
+                </p:cond>
+              </p:prevCondLst>
+              <p:nextCondLst>
+                <p:cond evt="onNext" delay="0">
+                  <p:tgtEl>
+                    <p:sldTgt/>
+                  </p:tgtEl>
+                </p:cond>
+              </p:nextCondLst>
+            </p:seq>
+          </p:childTnLst>
+        </p:cTn>
+      </p:par>
+    </p:tnLst>
+  </p:timing>
 </p:sld>
 </file>
 
@@ -7284,25 +7721,6 @@
       </p:sp>
       <p:sp>
         <p:nvSpPr>
-          <p:cNvPr id="3" name="Inhaltsplatzhalter 2"/>
-          <p:cNvSpPr>
-            <a:spLocks noGrp="1"/>
-          </p:cNvSpPr>
-          <p:nvPr>
-            <p:ph idx="1"/>
-          </p:nvPr>
-        </p:nvSpPr>
-        <p:spPr/>
-        <p:txBody>
-          <a:bodyPr/>
-          <a:lstStyle/>
-          <a:p>
-            <a:endParaRPr lang="de-DE" dirty="0"/>
-          </a:p>
-        </p:txBody>
-      </p:sp>
-      <p:sp>
-        <p:nvSpPr>
           <p:cNvPr id="5" name="Fußzeilenplatzhalter 4"/>
           <p:cNvSpPr>
             <a:spLocks noGrp="1"/>
@@ -7320,19 +7738,45 @@
               <a:rPr lang="de-DE" dirty="0"/>
               <a:t>Echtzeit</a:t>
             </a:r>
+          </a:p>
+        </p:txBody>
+      </p:sp>
+      <p:sp>
+        <p:nvSpPr>
+          <p:cNvPr id="7" name="Inhaltsplatzhalter 6"/>
+          <p:cNvSpPr>
+            <a:spLocks noGrp="1"/>
+          </p:cNvSpPr>
+          <p:nvPr>
+            <p:ph idx="1"/>
+          </p:nvPr>
+        </p:nvSpPr>
+        <p:spPr/>
+        <p:txBody>
+          <a:bodyPr/>
+          <a:lstStyle/>
+          <a:p>
+            <a:endParaRPr lang="de-DE"/>
           </a:p>
         </p:txBody>
       </p:sp>
     </p:spTree>
     <p:extLst>
       <p:ext uri="{BB962C8B-B14F-4D97-AF65-F5344CB8AC3E}">
-        <p14:creationId xmlns="" xmlns:p14="http://schemas.microsoft.com/office/powerpoint/2010/main" val="3574650683"/>
+        <p14:creationId xmlns:p14="http://schemas.microsoft.com/office/powerpoint/2010/main" xmlns="" val="3574650683"/>
       </p:ext>
     </p:extLst>
   </p:cSld>
   <p:clrMapOvr>
     <a:masterClrMapping/>
   </p:clrMapOvr>
+  <p:timing>
+    <p:tnLst>
+      <p:par>
+        <p:cTn id="1" dur="indefinite" restart="never" nodeType="tmRoot"/>
+      </p:par>
+    </p:tnLst>
+  </p:timing>
 </p:sld>
 </file>
 
@@ -7419,13 +7863,20 @@
     </p:spTree>
     <p:extLst>
       <p:ext uri="{BB962C8B-B14F-4D97-AF65-F5344CB8AC3E}">
-        <p14:creationId xmlns="" xmlns:p14="http://schemas.microsoft.com/office/powerpoint/2010/main" val="3574650683"/>
+        <p14:creationId xmlns:p14="http://schemas.microsoft.com/office/powerpoint/2010/main" xmlns="" val="3574650683"/>
       </p:ext>
     </p:extLst>
   </p:cSld>
   <p:clrMapOvr>
     <a:masterClrMapping/>
   </p:clrMapOvr>
+  <p:timing>
+    <p:tnLst>
+      <p:par>
+        <p:cTn id="1" dur="indefinite" restart="never" nodeType="tmRoot"/>
+      </p:par>
+    </p:tnLst>
+  </p:timing>
 </p:sld>
 </file>
 
@@ -7542,7 +7993,7 @@
     </p:spTree>
     <p:extLst>
       <p:ext uri="{BB962C8B-B14F-4D97-AF65-F5344CB8AC3E}">
-        <p14:creationId xmlns="" xmlns:p14="http://schemas.microsoft.com/office/powerpoint/2010/main" val="1386685637"/>
+        <p14:creationId xmlns:p14="http://schemas.microsoft.com/office/powerpoint/2010/main" xmlns="" val="1386685637"/>
       </p:ext>
     </p:extLst>
   </p:cSld>
@@ -7635,7 +8086,7 @@
     </p:spTree>
     <p:extLst>
       <p:ext uri="{BB962C8B-B14F-4D97-AF65-F5344CB8AC3E}">
-        <p14:creationId xmlns="" xmlns:p14="http://schemas.microsoft.com/office/powerpoint/2010/main" val="2996306764"/>
+        <p14:creationId xmlns:p14="http://schemas.microsoft.com/office/powerpoint/2010/main" xmlns="" val="2996306764"/>
       </p:ext>
     </p:extLst>
   </p:cSld>
@@ -7769,7 +8220,7 @@
     </p:spTree>
     <p:extLst>
       <p:ext uri="{BB962C8B-B14F-4D97-AF65-F5344CB8AC3E}">
-        <p14:creationId xmlns="" xmlns:p14="http://schemas.microsoft.com/office/powerpoint/2010/main" val="3377158169"/>
+        <p14:creationId xmlns:p14="http://schemas.microsoft.com/office/powerpoint/2010/main" xmlns="" val="3377158169"/>
       </p:ext>
     </p:extLst>
   </p:cSld>
@@ -7945,13 +8396,20 @@
     </p:spTree>
     <p:extLst>
       <p:ext uri="{BB962C8B-B14F-4D97-AF65-F5344CB8AC3E}">
-        <p14:creationId xmlns="" xmlns:p14="http://schemas.microsoft.com/office/powerpoint/2010/main" val="2952804254"/>
+        <p14:creationId xmlns:p14="http://schemas.microsoft.com/office/powerpoint/2010/main" xmlns="" val="2952804254"/>
       </p:ext>
     </p:extLst>
   </p:cSld>
   <p:clrMapOvr>
     <a:masterClrMapping/>
   </p:clrMapOvr>
+  <p:timing>
+    <p:tnLst>
+      <p:par>
+        <p:cTn id="1" dur="indefinite" restart="never" nodeType="tmRoot"/>
+      </p:par>
+    </p:tnLst>
+  </p:timing>
 </p:sld>
 </file>
 
@@ -8040,13 +8498,20 @@
     </p:spTree>
     <p:extLst>
       <p:ext uri="{BB962C8B-B14F-4D97-AF65-F5344CB8AC3E}">
-        <p14:creationId xmlns="" xmlns:p14="http://schemas.microsoft.com/office/powerpoint/2010/main" val="2356009988"/>
+        <p14:creationId xmlns:p14="http://schemas.microsoft.com/office/powerpoint/2010/main" xmlns="" val="2356009988"/>
       </p:ext>
     </p:extLst>
   </p:cSld>
   <p:clrMapOvr>
     <a:masterClrMapping/>
   </p:clrMapOvr>
+  <p:timing>
+    <p:tnLst>
+      <p:par>
+        <p:cTn id="1" dur="indefinite" restart="never" nodeType="tmRoot"/>
+      </p:par>
+    </p:tnLst>
+  </p:timing>
 </p:sld>
 </file>
 
@@ -8305,7 +8770,7 @@
   <a:extraClrSchemeLst/>
   <a:extLst>
     <a:ext uri="{05A4C25C-085E-4340-85A3-A5531E510DB2}">
-      <thm15:themeFamily xmlns="" xmlns:thm15="http://schemas.microsoft.com/office/thememl/2012/main" name="Office Theme" id="{62F939B6-93AF-4DB8-9C6B-D6C7DFDC589F}" vid="{4A3C46E8-61CC-4603-A589-7422A47A8E4A}"/>
+      <thm15:themeFamily xmlns:thm15="http://schemas.microsoft.com/office/thememl/2012/main" xmlns="" name="Office Theme" id="{62F939B6-93AF-4DB8-9C6B-D6C7DFDC589F}" vid="{4A3C46E8-61CC-4603-A589-7422A47A8E4A}"/>
     </a:ext>
   </a:extLst>
 </a:theme>
@@ -8566,7 +9031,7 @@
   <a:extraClrSchemeLst/>
   <a:extLst>
     <a:ext uri="{05A4C25C-085E-4340-85A3-A5531E510DB2}">
-      <thm15:themeFamily xmlns="" xmlns:thm15="http://schemas.microsoft.com/office/thememl/2012/main" name="Office Theme" id="{62F939B6-93AF-4DB8-9C6B-D6C7DFDC589F}" vid="{4A3C46E8-61CC-4603-A589-7422A47A8E4A}"/>
+      <thm15:themeFamily xmlns:thm15="http://schemas.microsoft.com/office/thememl/2012/main" xmlns="" name="Office Theme" id="{62F939B6-93AF-4DB8-9C6B-D6C7DFDC589F}" vid="{4A3C46E8-61CC-4603-A589-7422A47A8E4A}"/>
     </a:ext>
   </a:extLst>
 </a:theme>
@@ -8827,7 +9292,7 @@
   <a:extraClrSchemeLst/>
   <a:extLst>
     <a:ext uri="{05A4C25C-085E-4340-85A3-A5531E510DB2}">
-      <thm15:themeFamily xmlns="" xmlns:thm15="http://schemas.microsoft.com/office/thememl/2012/main" name="Office Theme" id="{62F939B6-93AF-4DB8-9C6B-D6C7DFDC589F}" vid="{4A3C46E8-61CC-4603-A589-7422A47A8E4A}"/>
+      <thm15:themeFamily xmlns:thm15="http://schemas.microsoft.com/office/thememl/2012/main" xmlns="" name="Office Theme" id="{62F939B6-93AF-4DB8-9C6B-D6C7DFDC589F}" vid="{4A3C46E8-61CC-4603-A589-7422A47A8E4A}"/>
     </a:ext>
   </a:extLst>
 </a:theme>

</xml_diff>

<commit_message>
start working on scheduling
</commit_message>
<xml_diff>
--- a/Päsi/Seminar Betriebssysteme.pptx
+++ b/Päsi/Seminar Betriebssysteme.pptx
@@ -6,10 +6,10 @@
     <p:sldMasterId id="2147483660" r:id="rId2"/>
   </p:sldMasterIdLst>
   <p:notesMasterIdLst>
-    <p:notesMasterId r:id="rId10"/>
+    <p:notesMasterId r:id="rId14"/>
   </p:notesMasterIdLst>
   <p:handoutMasterIdLst>
-    <p:handoutMasterId r:id="rId11"/>
+    <p:handoutMasterId r:id="rId15"/>
   </p:handoutMasterIdLst>
   <p:sldIdLst>
     <p:sldId id="256" r:id="rId3"/>
@@ -19,6 +19,10 @@
     <p:sldId id="270" r:id="rId7"/>
     <p:sldId id="271" r:id="rId8"/>
     <p:sldId id="273" r:id="rId9"/>
+    <p:sldId id="277" r:id="rId10"/>
+    <p:sldId id="274" r:id="rId11"/>
+    <p:sldId id="276" r:id="rId12"/>
+    <p:sldId id="275" r:id="rId13"/>
   </p:sldIdLst>
   <p:sldSz cx="12192000" cy="6858000"/>
   <p:notesSz cx="6858000" cy="9144000"/>
@@ -7156,6 +7160,225 @@
     <p:extLst>
       <p:ext uri="{BB962C8B-B14F-4D97-AF65-F5344CB8AC3E}">
         <p14:creationId xmlns:p14="http://schemas.microsoft.com/office/powerpoint/2010/main" val="1475588890"/>
+      </p:ext>
+    </p:extLst>
+  </p:cSld>
+  <p:clrMapOvr>
+    <a:masterClrMapping/>
+  </p:clrMapOvr>
+</p:sld>
+</file>
+
+<file path=ppt/slides/slide10.xml><?xml version="1.0" encoding="utf-8"?>
+<p:sld xmlns:a="http://schemas.openxmlformats.org/drawingml/2006/main" xmlns:r="http://schemas.openxmlformats.org/officeDocument/2006/relationships" xmlns:p="http://schemas.openxmlformats.org/presentationml/2006/main">
+  <p:cSld>
+    <p:spTree>
+      <p:nvGrpSpPr>
+        <p:cNvPr id="1" name=""/>
+        <p:cNvGrpSpPr/>
+        <p:nvPr/>
+      </p:nvGrpSpPr>
+      <p:grpSpPr>
+        <a:xfrm>
+          <a:off x="0" y="0"/>
+          <a:ext cx="0" cy="0"/>
+          <a:chOff x="0" y="0"/>
+          <a:chExt cx="0" cy="0"/>
+        </a:xfrm>
+      </p:grpSpPr>
+      <p:sp>
+        <p:nvSpPr>
+          <p:cNvPr id="2" name="Titel 1">
+            <a:extLst>
+              <a:ext uri="{FF2B5EF4-FFF2-40B4-BE49-F238E27FC236}">
+                <a16:creationId xmlns:a16="http://schemas.microsoft.com/office/drawing/2014/main" id="{FA538962-AA10-4831-A21F-39427C91FBFE}"/>
+              </a:ext>
+            </a:extLst>
+          </p:cNvPr>
+          <p:cNvSpPr>
+            <a:spLocks noGrp="1"/>
+          </p:cNvSpPr>
+          <p:nvPr>
+            <p:ph type="title"/>
+          </p:nvPr>
+        </p:nvSpPr>
+        <p:spPr/>
+        <p:txBody>
+          <a:bodyPr/>
+          <a:lstStyle/>
+          <a:p>
+            <a:r>
+              <a:rPr lang="de-DE" dirty="0"/>
+              <a:t>Scheduling Algorithmen</a:t>
+            </a:r>
+          </a:p>
+        </p:txBody>
+      </p:sp>
+      <p:sp>
+        <p:nvSpPr>
+          <p:cNvPr id="3" name="Inhaltsplatzhalter 2">
+            <a:extLst>
+              <a:ext uri="{FF2B5EF4-FFF2-40B4-BE49-F238E27FC236}">
+                <a16:creationId xmlns:a16="http://schemas.microsoft.com/office/drawing/2014/main" id="{55333299-264B-4075-840B-4F2C3A8964C6}"/>
+              </a:ext>
+            </a:extLst>
+          </p:cNvPr>
+          <p:cNvSpPr>
+            <a:spLocks noGrp="1"/>
+          </p:cNvSpPr>
+          <p:nvPr>
+            <p:ph idx="1"/>
+          </p:nvPr>
+        </p:nvSpPr>
+        <p:spPr/>
+        <p:txBody>
+          <a:bodyPr/>
+          <a:lstStyle/>
+          <a:p>
+            <a:endParaRPr lang="de-DE"/>
+          </a:p>
+        </p:txBody>
+      </p:sp>
+      <p:sp>
+        <p:nvSpPr>
+          <p:cNvPr id="4" name="Fußzeilenplatzhalter 3">
+            <a:extLst>
+              <a:ext uri="{FF2B5EF4-FFF2-40B4-BE49-F238E27FC236}">
+                <a16:creationId xmlns:a16="http://schemas.microsoft.com/office/drawing/2014/main" id="{D5029D67-7C47-434B-83E3-5F74F5C05DED}"/>
+              </a:ext>
+            </a:extLst>
+          </p:cNvPr>
+          <p:cNvSpPr>
+            <a:spLocks noGrp="1"/>
+          </p:cNvSpPr>
+          <p:nvPr>
+            <p:ph type="ftr" sz="quarter" idx="11"/>
+          </p:nvPr>
+        </p:nvSpPr>
+        <p:spPr/>
+        <p:txBody>
+          <a:bodyPr/>
+          <a:lstStyle/>
+          <a:p>
+            <a:endParaRPr lang="de-DE"/>
+          </a:p>
+        </p:txBody>
+      </p:sp>
+    </p:spTree>
+    <p:extLst>
+      <p:ext uri="{BB962C8B-B14F-4D97-AF65-F5344CB8AC3E}">
+        <p14:creationId xmlns:p14="http://schemas.microsoft.com/office/powerpoint/2010/main" val="4266597995"/>
+      </p:ext>
+    </p:extLst>
+  </p:cSld>
+  <p:clrMapOvr>
+    <a:masterClrMapping/>
+  </p:clrMapOvr>
+</p:sld>
+</file>
+
+<file path=ppt/slides/slide11.xml><?xml version="1.0" encoding="utf-8"?>
+<p:sld xmlns:a="http://schemas.openxmlformats.org/drawingml/2006/main" xmlns:r="http://schemas.openxmlformats.org/officeDocument/2006/relationships" xmlns:p="http://schemas.openxmlformats.org/presentationml/2006/main">
+  <p:cSld>
+    <p:spTree>
+      <p:nvGrpSpPr>
+        <p:cNvPr id="1" name=""/>
+        <p:cNvGrpSpPr/>
+        <p:nvPr/>
+      </p:nvGrpSpPr>
+      <p:grpSpPr>
+        <a:xfrm>
+          <a:off x="0" y="0"/>
+          <a:ext cx="0" cy="0"/>
+          <a:chOff x="0" y="0"/>
+          <a:chExt cx="0" cy="0"/>
+        </a:xfrm>
+      </p:grpSpPr>
+      <p:sp>
+        <p:nvSpPr>
+          <p:cNvPr id="2" name="Titel 1">
+            <a:extLst>
+              <a:ext uri="{FF2B5EF4-FFF2-40B4-BE49-F238E27FC236}">
+                <a16:creationId xmlns:a16="http://schemas.microsoft.com/office/drawing/2014/main" id="{18CA0E69-D776-4AF9-8057-5D127456F54E}"/>
+              </a:ext>
+            </a:extLst>
+          </p:cNvPr>
+          <p:cNvSpPr>
+            <a:spLocks noGrp="1"/>
+          </p:cNvSpPr>
+          <p:nvPr>
+            <p:ph type="title"/>
+          </p:nvPr>
+        </p:nvSpPr>
+        <p:spPr/>
+        <p:txBody>
+          <a:bodyPr/>
+          <a:lstStyle/>
+          <a:p>
+            <a:r>
+              <a:rPr lang="de-DE" dirty="0"/>
+              <a:t>Low Power</a:t>
+            </a:r>
+          </a:p>
+        </p:txBody>
+      </p:sp>
+      <p:sp>
+        <p:nvSpPr>
+          <p:cNvPr id="3" name="Inhaltsplatzhalter 2">
+            <a:extLst>
+              <a:ext uri="{FF2B5EF4-FFF2-40B4-BE49-F238E27FC236}">
+                <a16:creationId xmlns:a16="http://schemas.microsoft.com/office/drawing/2014/main" id="{4435098B-CC40-45A4-806D-4883344EB5AC}"/>
+              </a:ext>
+            </a:extLst>
+          </p:cNvPr>
+          <p:cNvSpPr>
+            <a:spLocks noGrp="1"/>
+          </p:cNvSpPr>
+          <p:nvPr>
+            <p:ph idx="1"/>
+          </p:nvPr>
+        </p:nvSpPr>
+        <p:spPr/>
+        <p:txBody>
+          <a:bodyPr/>
+          <a:lstStyle/>
+          <a:p>
+            <a:endParaRPr lang="de-DE"/>
+          </a:p>
+        </p:txBody>
+      </p:sp>
+      <p:sp>
+        <p:nvSpPr>
+          <p:cNvPr id="4" name="Fußzeilenplatzhalter 3">
+            <a:extLst>
+              <a:ext uri="{FF2B5EF4-FFF2-40B4-BE49-F238E27FC236}">
+                <a16:creationId xmlns:a16="http://schemas.microsoft.com/office/drawing/2014/main" id="{E2BB61E0-1713-493C-865A-7D17DBF9085C}"/>
+              </a:ext>
+            </a:extLst>
+          </p:cNvPr>
+          <p:cNvSpPr>
+            <a:spLocks noGrp="1"/>
+          </p:cNvSpPr>
+          <p:nvPr>
+            <p:ph type="ftr" sz="quarter" idx="11"/>
+          </p:nvPr>
+        </p:nvSpPr>
+        <p:spPr/>
+        <p:txBody>
+          <a:bodyPr/>
+          <a:lstStyle/>
+          <a:p>
+            <a:r>
+              <a:rPr lang="de-DE" dirty="0"/>
+              <a:t>Low Power</a:t>
+            </a:r>
+          </a:p>
+        </p:txBody>
+      </p:sp>
+    </p:spTree>
+    <p:extLst>
+      <p:ext uri="{BB962C8B-B14F-4D97-AF65-F5344CB8AC3E}">
+        <p14:creationId xmlns:p14="http://schemas.microsoft.com/office/powerpoint/2010/main" val="1766240531"/>
       </p:ext>
     </p:extLst>
   </p:cSld>
@@ -12238,7 +12461,7 @@
           <a:p>
             <a:r>
               <a:rPr lang="de-DE" dirty="0"/>
-              <a:t>Gefahren der Speicherverwaltung</a:t>
+              <a:t>Sicherheit Speicherverwaltung</a:t>
             </a:r>
           </a:p>
         </p:txBody>
@@ -14107,6 +14330,394 @@
       <p:bldP spid="10" grpId="0"/>
     </p:bldLst>
   </p:timing>
+</p:sld>
+</file>
+
+<file path=ppt/slides/slide8.xml><?xml version="1.0" encoding="utf-8"?>
+<p:sld xmlns:a="http://schemas.openxmlformats.org/drawingml/2006/main" xmlns:r="http://schemas.openxmlformats.org/officeDocument/2006/relationships" xmlns:p="http://schemas.openxmlformats.org/presentationml/2006/main">
+  <p:cSld>
+    <p:spTree>
+      <p:nvGrpSpPr>
+        <p:cNvPr id="1" name=""/>
+        <p:cNvGrpSpPr/>
+        <p:nvPr/>
+      </p:nvGrpSpPr>
+      <p:grpSpPr>
+        <a:xfrm>
+          <a:off x="0" y="0"/>
+          <a:ext cx="0" cy="0"/>
+          <a:chOff x="0" y="0"/>
+          <a:chExt cx="0" cy="0"/>
+        </a:xfrm>
+      </p:grpSpPr>
+      <p:sp>
+        <p:nvSpPr>
+          <p:cNvPr id="2" name="Titel 1">
+            <a:extLst>
+              <a:ext uri="{FF2B5EF4-FFF2-40B4-BE49-F238E27FC236}">
+                <a16:creationId xmlns:a16="http://schemas.microsoft.com/office/drawing/2014/main" id="{D5BDABF4-6A95-439D-8D3A-DA3970FBB573}"/>
+              </a:ext>
+            </a:extLst>
+          </p:cNvPr>
+          <p:cNvSpPr>
+            <a:spLocks noGrp="1"/>
+          </p:cNvSpPr>
+          <p:nvPr>
+            <p:ph type="title"/>
+          </p:nvPr>
+        </p:nvSpPr>
+        <p:spPr/>
+        <p:txBody>
+          <a:bodyPr/>
+          <a:lstStyle/>
+          <a:p>
+            <a:r>
+              <a:rPr lang="de-DE" dirty="0"/>
+              <a:t>Ein(e) Task</a:t>
+            </a:r>
+          </a:p>
+        </p:txBody>
+      </p:sp>
+      <p:sp>
+        <p:nvSpPr>
+          <p:cNvPr id="3" name="Inhaltsplatzhalter 2">
+            <a:extLst>
+              <a:ext uri="{FF2B5EF4-FFF2-40B4-BE49-F238E27FC236}">
+                <a16:creationId xmlns:a16="http://schemas.microsoft.com/office/drawing/2014/main" id="{1176F6AC-791A-49A7-82E1-DD2C666CAC71}"/>
+              </a:ext>
+            </a:extLst>
+          </p:cNvPr>
+          <p:cNvSpPr>
+            <a:spLocks noGrp="1"/>
+          </p:cNvSpPr>
+          <p:nvPr>
+            <p:ph idx="1"/>
+          </p:nvPr>
+        </p:nvSpPr>
+        <p:spPr/>
+        <p:txBody>
+          <a:bodyPr>
+            <a:normAutofit fontScale="55000" lnSpcReduction="20000"/>
+          </a:bodyPr>
+          <a:lstStyle/>
+          <a:p>
+            <a:r>
+              <a:rPr lang="de-DE" dirty="0"/>
+              <a:t>ist eine eigenständige Programmeinheit</a:t>
+            </a:r>
+          </a:p>
+          <a:p>
+            <a:r>
+              <a:rPr lang="de-DE" dirty="0"/>
+              <a:t>Wird mit </a:t>
+            </a:r>
+            <a:r>
+              <a:rPr lang="de-DE" dirty="0" err="1"/>
+              <a:t>xTaskCreate</a:t>
+            </a:r>
+            <a:r>
+              <a:rPr lang="de-DE" dirty="0"/>
+              <a:t>() erzeugt</a:t>
+            </a:r>
+          </a:p>
+          <a:p>
+            <a:r>
+              <a:rPr lang="de-DE" dirty="0"/>
+              <a:t>Wird mit </a:t>
+            </a:r>
+            <a:r>
+              <a:rPr lang="de-DE" dirty="0" err="1"/>
+              <a:t>xTaskDelete</a:t>
+            </a:r>
+            <a:r>
+              <a:rPr lang="de-DE" dirty="0"/>
+              <a:t>() gelöscht</a:t>
+            </a:r>
+          </a:p>
+          <a:p>
+            <a:r>
+              <a:rPr lang="de-DE" dirty="0"/>
+              <a:t>Wird in einer Schleife ausgeführt</a:t>
+            </a:r>
+          </a:p>
+          <a:p>
+            <a:r>
+              <a:rPr lang="de-DE" dirty="0"/>
+              <a:t>Synchronisierung / Kommunikation</a:t>
+            </a:r>
+          </a:p>
+          <a:p>
+            <a:pPr lvl="1"/>
+            <a:r>
+              <a:rPr lang="de-DE" dirty="0"/>
+              <a:t>Interprozesskommunikation</a:t>
+            </a:r>
+          </a:p>
+          <a:p>
+            <a:pPr lvl="1"/>
+            <a:r>
+              <a:rPr lang="de-DE" dirty="0" err="1"/>
+              <a:t>Timerevent</a:t>
+            </a:r>
+            <a:endParaRPr lang="de-DE" dirty="0"/>
+          </a:p>
+          <a:p>
+            <a:r>
+              <a:rPr lang="de-DE" dirty="0"/>
+              <a:t>besteht aus</a:t>
+            </a:r>
+          </a:p>
+          <a:p>
+            <a:pPr lvl="1"/>
+            <a:r>
+              <a:rPr lang="de-DE" dirty="0"/>
+              <a:t>TCB (Task Control Block)</a:t>
+            </a:r>
+          </a:p>
+          <a:p>
+            <a:pPr lvl="1"/>
+            <a:r>
+              <a:rPr lang="de-DE" dirty="0"/>
+              <a:t>Stack</a:t>
+            </a:r>
+          </a:p>
+          <a:p>
+            <a:r>
+              <a:rPr lang="de-DE" dirty="0"/>
+              <a:t>hat eine Priorität</a:t>
+            </a:r>
+          </a:p>
+          <a:p>
+            <a:r>
+              <a:rPr lang="de-DE" dirty="0"/>
+              <a:t>wird in Listen verwaltet</a:t>
+            </a:r>
+          </a:p>
+          <a:p>
+            <a:r>
+              <a:rPr lang="de-DE" dirty="0"/>
+              <a:t>Kann folgende Zustände annehmen</a:t>
+            </a:r>
+          </a:p>
+          <a:p>
+            <a:r>
+              <a:rPr lang="de-DE" dirty="0"/>
+              <a:t>Einmalige Ausführung wird „Task </a:t>
+            </a:r>
+            <a:r>
+              <a:rPr lang="de-DE" dirty="0" err="1"/>
+              <a:t>job</a:t>
+            </a:r>
+            <a:r>
+              <a:rPr lang="de-DE" dirty="0"/>
+              <a:t>“ genannt </a:t>
+            </a:r>
+          </a:p>
+          <a:p>
+            <a:pPr marL="0" indent="0">
+              <a:buNone/>
+            </a:pPr>
+            <a:endParaRPr lang="de-DE" dirty="0"/>
+          </a:p>
+          <a:p>
+            <a:pPr marL="0" indent="0">
+              <a:buNone/>
+            </a:pPr>
+            <a:r>
+              <a:rPr lang="de-DE" dirty="0"/>
+              <a:t> </a:t>
+            </a:r>
+          </a:p>
+          <a:p>
+            <a:endParaRPr lang="de-DE" dirty="0"/>
+          </a:p>
+        </p:txBody>
+      </p:sp>
+      <p:sp>
+        <p:nvSpPr>
+          <p:cNvPr id="4" name="Fußzeilenplatzhalter 3">
+            <a:extLst>
+              <a:ext uri="{FF2B5EF4-FFF2-40B4-BE49-F238E27FC236}">
+                <a16:creationId xmlns:a16="http://schemas.microsoft.com/office/drawing/2014/main" id="{B464372B-5773-4BFE-BE11-02BCA11506D7}"/>
+              </a:ext>
+            </a:extLst>
+          </p:cNvPr>
+          <p:cNvSpPr>
+            <a:spLocks noGrp="1"/>
+          </p:cNvSpPr>
+          <p:nvPr>
+            <p:ph type="ftr" sz="quarter" idx="11"/>
+          </p:nvPr>
+        </p:nvSpPr>
+        <p:spPr/>
+        <p:txBody>
+          <a:bodyPr/>
+          <a:lstStyle/>
+          <a:p>
+            <a:r>
+              <a:rPr lang="de-DE" dirty="0"/>
+              <a:t>Scheduling</a:t>
+            </a:r>
+          </a:p>
+        </p:txBody>
+      </p:sp>
+      <p:pic>
+        <p:nvPicPr>
+          <p:cNvPr id="6" name="Grafik 5">
+            <a:extLst>
+              <a:ext uri="{FF2B5EF4-FFF2-40B4-BE49-F238E27FC236}">
+                <a16:creationId xmlns:a16="http://schemas.microsoft.com/office/drawing/2014/main" id="{BC87AE50-277B-460C-B301-52F1A5226F10}"/>
+              </a:ext>
+            </a:extLst>
+          </p:cNvPr>
+          <p:cNvPicPr>
+            <a:picLocks noChangeAspect="1"/>
+          </p:cNvPicPr>
+          <p:nvPr/>
+        </p:nvPicPr>
+        <p:blipFill>
+          <a:blip r:embed="rId2">
+            <a:extLst>
+              <a:ext uri="{28A0092B-C50C-407E-A947-70E740481C1C}">
+                <a14:useLocalDpi xmlns:a14="http://schemas.microsoft.com/office/drawing/2010/main" val="0"/>
+              </a:ext>
+            </a:extLst>
+          </a:blip>
+          <a:stretch>
+            <a:fillRect/>
+          </a:stretch>
+        </p:blipFill>
+        <p:spPr>
+          <a:xfrm>
+            <a:off x="6794512" y="1754696"/>
+            <a:ext cx="3467584" cy="4353533"/>
+          </a:xfrm>
+          <a:prstGeom prst="rect">
+            <a:avLst/>
+          </a:prstGeom>
+        </p:spPr>
+      </p:pic>
+    </p:spTree>
+    <p:extLst>
+      <p:ext uri="{BB962C8B-B14F-4D97-AF65-F5344CB8AC3E}">
+        <p14:creationId xmlns:p14="http://schemas.microsoft.com/office/powerpoint/2010/main" val="2861433211"/>
+      </p:ext>
+    </p:extLst>
+  </p:cSld>
+  <p:clrMapOvr>
+    <a:masterClrMapping/>
+  </p:clrMapOvr>
+</p:sld>
+</file>
+
+<file path=ppt/slides/slide9.xml><?xml version="1.0" encoding="utf-8"?>
+<p:sld xmlns:a="http://schemas.openxmlformats.org/drawingml/2006/main" xmlns:r="http://schemas.openxmlformats.org/officeDocument/2006/relationships" xmlns:p="http://schemas.openxmlformats.org/presentationml/2006/main">
+  <p:cSld>
+    <p:spTree>
+      <p:nvGrpSpPr>
+        <p:cNvPr id="1" name=""/>
+        <p:cNvGrpSpPr/>
+        <p:nvPr/>
+      </p:nvGrpSpPr>
+      <p:grpSpPr>
+        <a:xfrm>
+          <a:off x="0" y="0"/>
+          <a:ext cx="0" cy="0"/>
+          <a:chOff x="0" y="0"/>
+          <a:chExt cx="0" cy="0"/>
+        </a:xfrm>
+      </p:grpSpPr>
+      <p:sp>
+        <p:nvSpPr>
+          <p:cNvPr id="2" name="Titel 1">
+            <a:extLst>
+              <a:ext uri="{FF2B5EF4-FFF2-40B4-BE49-F238E27FC236}">
+                <a16:creationId xmlns:a16="http://schemas.microsoft.com/office/drawing/2014/main" id="{221CF949-CF1B-490E-893D-2B8A7798265D}"/>
+              </a:ext>
+            </a:extLst>
+          </p:cNvPr>
+          <p:cNvSpPr>
+            <a:spLocks noGrp="1"/>
+          </p:cNvSpPr>
+          <p:nvPr>
+            <p:ph type="title"/>
+          </p:nvPr>
+        </p:nvSpPr>
+        <p:spPr/>
+        <p:txBody>
+          <a:bodyPr/>
+          <a:lstStyle/>
+          <a:p>
+            <a:r>
+              <a:rPr lang="de-DE" dirty="0"/>
+              <a:t>Scheduling</a:t>
+            </a:r>
+          </a:p>
+        </p:txBody>
+      </p:sp>
+      <p:sp>
+        <p:nvSpPr>
+          <p:cNvPr id="3" name="Inhaltsplatzhalter 2">
+            <a:extLst>
+              <a:ext uri="{FF2B5EF4-FFF2-40B4-BE49-F238E27FC236}">
+                <a16:creationId xmlns:a16="http://schemas.microsoft.com/office/drawing/2014/main" id="{932B521A-1D5A-4820-8FB2-654536C7E2D7}"/>
+              </a:ext>
+            </a:extLst>
+          </p:cNvPr>
+          <p:cNvSpPr>
+            <a:spLocks noGrp="1"/>
+          </p:cNvSpPr>
+          <p:nvPr>
+            <p:ph idx="1"/>
+          </p:nvPr>
+        </p:nvSpPr>
+        <p:spPr/>
+        <p:txBody>
+          <a:bodyPr/>
+          <a:lstStyle/>
+          <a:p>
+            <a:endParaRPr lang="de-DE" dirty="0"/>
+          </a:p>
+        </p:txBody>
+      </p:sp>
+      <p:sp>
+        <p:nvSpPr>
+          <p:cNvPr id="4" name="Fußzeilenplatzhalter 3">
+            <a:extLst>
+              <a:ext uri="{FF2B5EF4-FFF2-40B4-BE49-F238E27FC236}">
+                <a16:creationId xmlns:a16="http://schemas.microsoft.com/office/drawing/2014/main" id="{6B53F700-6CB7-4CB8-AD2C-F7C794AFF551}"/>
+              </a:ext>
+            </a:extLst>
+          </p:cNvPr>
+          <p:cNvSpPr>
+            <a:spLocks noGrp="1"/>
+          </p:cNvSpPr>
+          <p:nvPr>
+            <p:ph type="ftr" sz="quarter" idx="11"/>
+          </p:nvPr>
+        </p:nvSpPr>
+        <p:spPr/>
+        <p:txBody>
+          <a:bodyPr/>
+          <a:lstStyle/>
+          <a:p>
+            <a:r>
+              <a:rPr lang="de-DE" dirty="0"/>
+              <a:t>Scheduling</a:t>
+            </a:r>
+          </a:p>
+        </p:txBody>
+      </p:sp>
+    </p:spTree>
+    <p:extLst>
+      <p:ext uri="{BB962C8B-B14F-4D97-AF65-F5344CB8AC3E}">
+        <p14:creationId xmlns:p14="http://schemas.microsoft.com/office/powerpoint/2010/main" val="2825290779"/>
+      </p:ext>
+    </p:extLst>
+  </p:cSld>
+  <p:clrMapOvr>
+    <a:masterClrMapping/>
+  </p:clrMapOvr>
 </p:sld>
 </file>
 

</xml_diff>

<commit_message>
further working on scheduling
</commit_message>
<xml_diff>
--- a/Päsi/Seminar Betriebssysteme.pptx
+++ b/Päsi/Seminar Betriebssysteme.pptx
@@ -6,10 +6,10 @@
     <p:sldMasterId id="2147483660" r:id="rId2"/>
   </p:sldMasterIdLst>
   <p:notesMasterIdLst>
-    <p:notesMasterId r:id="rId14"/>
+    <p:notesMasterId r:id="rId17"/>
   </p:notesMasterIdLst>
   <p:handoutMasterIdLst>
-    <p:handoutMasterId r:id="rId15"/>
+    <p:handoutMasterId r:id="rId18"/>
   </p:handoutMasterIdLst>
   <p:sldIdLst>
     <p:sldId id="256" r:id="rId3"/>
@@ -20,9 +20,12 @@
     <p:sldId id="271" r:id="rId8"/>
     <p:sldId id="273" r:id="rId9"/>
     <p:sldId id="277" r:id="rId10"/>
-    <p:sldId id="274" r:id="rId11"/>
+    <p:sldId id="278" r:id="rId11"/>
     <p:sldId id="276" r:id="rId12"/>
-    <p:sldId id="275" r:id="rId13"/>
+    <p:sldId id="279" r:id="rId13"/>
+    <p:sldId id="280" r:id="rId14"/>
+    <p:sldId id="281" r:id="rId15"/>
+    <p:sldId id="282" r:id="rId16"/>
   </p:sldIdLst>
   <p:sldSz cx="12192000" cy="6858000"/>
   <p:notesSz cx="6858000" cy="9144000"/>
@@ -241,7 +244,7 @@
           <a:p>
             <a:fld id="{4F336489-14E1-462A-B32E-B31B9D8DDB1E}" type="datetimeFigureOut">
               <a:rPr lang="de-DE" smtClean="0"/>
-              <a:t>24.06.2017</a:t>
+              <a:t>26.06.2017</a:t>
             </a:fld>
             <a:endParaRPr lang="de-DE"/>
           </a:p>
@@ -419,7 +422,7 @@
             <a:fld id="{28A20BDF-6A46-49EA-BE7C-D2960091BE3F}" type="datetimeFigureOut">
               <a:rPr lang="de-DE" smtClean="0"/>
               <a:pPr/>
-              <a:t>24.06.2017</a:t>
+              <a:t>26.06.2017</a:t>
             </a:fld>
             <a:endParaRPr lang="de-DE"/>
           </a:p>
@@ -1081,6 +1084,91 @@
     <p:extLst>
       <p:ext uri="{BB962C8B-B14F-4D97-AF65-F5344CB8AC3E}">
         <p14:creationId xmlns:p14="http://schemas.microsoft.com/office/powerpoint/2010/main" val="752562685"/>
+      </p:ext>
+    </p:extLst>
+  </p:cSld>
+  <p:clrMapOvr>
+    <a:masterClrMapping/>
+  </p:clrMapOvr>
+</p:notes>
+</file>
+
+<file path=ppt/notesSlides/notesSlide5.xml><?xml version="1.0" encoding="utf-8"?>
+<p:notes xmlns:a="http://schemas.openxmlformats.org/drawingml/2006/main" xmlns:r="http://schemas.openxmlformats.org/officeDocument/2006/relationships" xmlns:p="http://schemas.openxmlformats.org/presentationml/2006/main">
+  <p:cSld>
+    <p:spTree>
+      <p:nvGrpSpPr>
+        <p:cNvPr id="1" name=""/>
+        <p:cNvGrpSpPr/>
+        <p:nvPr/>
+      </p:nvGrpSpPr>
+      <p:grpSpPr>
+        <a:xfrm>
+          <a:off x="0" y="0"/>
+          <a:ext cx="0" cy="0"/>
+          <a:chOff x="0" y="0"/>
+          <a:chExt cx="0" cy="0"/>
+        </a:xfrm>
+      </p:grpSpPr>
+      <p:sp>
+        <p:nvSpPr>
+          <p:cNvPr id="2" name="Folienbildplatzhalter 1"/>
+          <p:cNvSpPr>
+            <a:spLocks noGrp="1" noRot="1" noChangeAspect="1"/>
+          </p:cNvSpPr>
+          <p:nvPr>
+            <p:ph type="sldImg"/>
+          </p:nvPr>
+        </p:nvSpPr>
+        <p:spPr/>
+      </p:sp>
+      <p:sp>
+        <p:nvSpPr>
+          <p:cNvPr id="3" name="Notizenplatzhalter 2"/>
+          <p:cNvSpPr>
+            <a:spLocks noGrp="1"/>
+          </p:cNvSpPr>
+          <p:nvPr>
+            <p:ph type="body" idx="1"/>
+          </p:nvPr>
+        </p:nvSpPr>
+        <p:spPr/>
+        <p:txBody>
+          <a:bodyPr/>
+          <a:lstStyle/>
+          <a:p>
+            <a:endParaRPr lang="de-DE" dirty="0"/>
+          </a:p>
+        </p:txBody>
+      </p:sp>
+      <p:sp>
+        <p:nvSpPr>
+          <p:cNvPr id="4" name="Foliennummernplatzhalter 3"/>
+          <p:cNvSpPr>
+            <a:spLocks noGrp="1"/>
+          </p:cNvSpPr>
+          <p:nvPr>
+            <p:ph type="sldNum" sz="quarter" idx="10"/>
+          </p:nvPr>
+        </p:nvSpPr>
+        <p:spPr/>
+        <p:txBody>
+          <a:bodyPr/>
+          <a:lstStyle/>
+          <a:p>
+            <a:fld id="{538A8A5A-1CA9-4185-8FBD-30F9F425E83E}" type="slidenum">
+              <a:rPr lang="de-DE" smtClean="0"/>
+              <a:pPr/>
+              <a:t>8</a:t>
+            </a:fld>
+            <a:endParaRPr lang="de-DE"/>
+          </a:p>
+        </p:txBody>
+      </p:sp>
+    </p:spTree>
+    <p:extLst>
+      <p:ext uri="{BB962C8B-B14F-4D97-AF65-F5344CB8AC3E}">
+        <p14:creationId xmlns:p14="http://schemas.microsoft.com/office/powerpoint/2010/main" val="2431211418"/>
       </p:ext>
     </p:extLst>
   </p:cSld>
@@ -7209,33 +7297,8 @@
           <a:p>
             <a:r>
               <a:rPr lang="de-DE" dirty="0"/>
-              <a:t>Scheduling Algorithmen</a:t>
-            </a:r>
-          </a:p>
-        </p:txBody>
-      </p:sp>
-      <p:sp>
-        <p:nvSpPr>
-          <p:cNvPr id="3" name="Inhaltsplatzhalter 2">
-            <a:extLst>
-              <a:ext uri="{FF2B5EF4-FFF2-40B4-BE49-F238E27FC236}">
-                <a16:creationId xmlns:a16="http://schemas.microsoft.com/office/drawing/2014/main" id="{55333299-264B-4075-840B-4F2C3A8964C6}"/>
-              </a:ext>
-            </a:extLst>
-          </p:cNvPr>
-          <p:cNvSpPr>
-            <a:spLocks noGrp="1"/>
-          </p:cNvSpPr>
-          <p:nvPr>
-            <p:ph idx="1"/>
-          </p:nvPr>
-        </p:nvSpPr>
-        <p:spPr/>
-        <p:txBody>
-          <a:bodyPr/>
-          <a:lstStyle/>
-          <a:p>
-            <a:endParaRPr lang="de-DE"/>
+              <a:t>Scheduler</a:t>
+            </a:r>
           </a:p>
         </p:txBody>
       </p:sp>
@@ -7260,10 +7323,300 @@
           <a:bodyPr/>
           <a:lstStyle/>
           <a:p>
-            <a:endParaRPr lang="de-DE"/>
-          </a:p>
-        </p:txBody>
-      </p:sp>
+            <a:r>
+              <a:rPr lang="de-DE" dirty="0"/>
+              <a:t>Scheduling</a:t>
+            </a:r>
+          </a:p>
+        </p:txBody>
+      </p:sp>
+      <p:sp>
+        <p:nvSpPr>
+          <p:cNvPr id="8" name="Textfeld 7">
+            <a:extLst>
+              <a:ext uri="{FF2B5EF4-FFF2-40B4-BE49-F238E27FC236}">
+                <a16:creationId xmlns:a16="http://schemas.microsoft.com/office/drawing/2014/main" id="{85CE94F3-710B-4ED5-BB05-5AC8534A09D0}"/>
+              </a:ext>
+            </a:extLst>
+          </p:cNvPr>
+          <p:cNvSpPr txBox="1"/>
+          <p:nvPr/>
+        </p:nvSpPr>
+        <p:spPr>
+          <a:xfrm>
+            <a:off x="5878441" y="1982933"/>
+            <a:ext cx="6085064" cy="5724644"/>
+          </a:xfrm>
+          <a:prstGeom prst="rect">
+            <a:avLst/>
+          </a:prstGeom>
+          <a:noFill/>
+        </p:spPr>
+        <p:txBody>
+          <a:bodyPr wrap="none" rtlCol="0">
+            <a:spAutoFit/>
+          </a:bodyPr>
+          <a:lstStyle/>
+          <a:p>
+            <a:pPr marL="285750" indent="-285750">
+              <a:buFont typeface="Wingdings" panose="05000000000000000000" pitchFamily="2" charset="2"/>
+              <a:buChar char="§"/>
+            </a:pPr>
+            <a:r>
+              <a:rPr lang="de-DE" sz="2400" dirty="0"/>
+              <a:t>Alle Algorithmen basieren auf Round-Robin</a:t>
+            </a:r>
+          </a:p>
+          <a:p>
+            <a:pPr marL="285750" indent="-285750">
+              <a:buFont typeface="Wingdings" panose="05000000000000000000" pitchFamily="2" charset="2"/>
+              <a:buChar char="§"/>
+            </a:pPr>
+            <a:r>
+              <a:rPr lang="de-DE" sz="2400" dirty="0"/>
+              <a:t>Fixed </a:t>
+            </a:r>
+            <a:r>
+              <a:rPr lang="de-DE" sz="2400" dirty="0" err="1"/>
+              <a:t>Priority</a:t>
+            </a:r>
+            <a:r>
+              <a:rPr lang="de-DE" sz="2400" dirty="0"/>
+              <a:t> Scheduling</a:t>
+            </a:r>
+          </a:p>
+          <a:p>
+            <a:pPr marL="285750" indent="-285750">
+              <a:buFont typeface="Wingdings" panose="05000000000000000000" pitchFamily="2" charset="2"/>
+              <a:buChar char="§"/>
+            </a:pPr>
+            <a:r>
+              <a:rPr lang="de-DE" sz="2400" dirty="0"/>
+              <a:t>Einfache Konfiguration über </a:t>
+            </a:r>
+            <a:r>
+              <a:rPr lang="de-DE" sz="2400" dirty="0" err="1"/>
+              <a:t>FreeRTOS</a:t>
+            </a:r>
+            <a:r>
+              <a:rPr lang="de-DE" sz="2400" dirty="0"/>
+              <a:t> </a:t>
+            </a:r>
+            <a:r>
+              <a:rPr lang="de-DE" sz="2400" dirty="0" err="1"/>
+              <a:t>Config</a:t>
+            </a:r>
+            <a:endParaRPr lang="de-DE" sz="2400" dirty="0"/>
+          </a:p>
+          <a:p>
+            <a:pPr marL="285750" indent="-285750">
+              <a:buFont typeface="Wingdings" panose="05000000000000000000" pitchFamily="2" charset="2"/>
+              <a:buChar char="§"/>
+            </a:pPr>
+            <a:r>
+              <a:rPr lang="de-DE" sz="2400" dirty="0"/>
+              <a:t>1 CPU Kern = 1 </a:t>
+            </a:r>
+            <a:r>
+              <a:rPr lang="de-DE" sz="2400" dirty="0" err="1"/>
+              <a:t>max</a:t>
+            </a:r>
+            <a:r>
+              <a:rPr lang="de-DE" sz="2400" dirty="0"/>
+              <a:t> Task im Running State</a:t>
+            </a:r>
+          </a:p>
+          <a:p>
+            <a:pPr marL="285750" indent="-285750">
+              <a:buFont typeface="Wingdings" panose="05000000000000000000" pitchFamily="2" charset="2"/>
+              <a:buChar char="§"/>
+            </a:pPr>
+            <a:endParaRPr lang="de-DE" sz="2400" dirty="0"/>
+          </a:p>
+          <a:p>
+            <a:pPr marL="285750" indent="-285750">
+              <a:buFont typeface="Wingdings" panose="05000000000000000000" pitchFamily="2" charset="2"/>
+              <a:buChar char="§"/>
+            </a:pPr>
+            <a:endParaRPr lang="de-DE" sz="2400" dirty="0"/>
+          </a:p>
+          <a:p>
+            <a:pPr marL="285750" indent="-285750">
+              <a:buFont typeface="Wingdings" panose="05000000000000000000" pitchFamily="2" charset="2"/>
+              <a:buChar char="§"/>
+            </a:pPr>
+            <a:endParaRPr lang="de-DE" sz="2400" dirty="0"/>
+          </a:p>
+          <a:p>
+            <a:pPr marL="285750" indent="-285750">
+              <a:buFont typeface="Wingdings" panose="05000000000000000000" pitchFamily="2" charset="2"/>
+              <a:buChar char="§"/>
+            </a:pPr>
+            <a:r>
+              <a:rPr lang="de-DE" sz="2400" dirty="0"/>
+              <a:t>3 Scheduling Optionen</a:t>
+            </a:r>
+          </a:p>
+          <a:p>
+            <a:pPr marL="285750" indent="-285750">
+              <a:buFont typeface="Wingdings" panose="05000000000000000000" pitchFamily="2" charset="2"/>
+              <a:buChar char="§"/>
+            </a:pPr>
+            <a:r>
+              <a:rPr lang="de-DE" sz="2400" dirty="0" err="1"/>
+              <a:t>Cooperative</a:t>
+            </a:r>
+            <a:r>
+              <a:rPr lang="de-DE" sz="2400" dirty="0"/>
+              <a:t> Mode</a:t>
+            </a:r>
+          </a:p>
+          <a:p>
+            <a:pPr marL="285750" indent="-285750">
+              <a:buFont typeface="Wingdings" panose="05000000000000000000" pitchFamily="2" charset="2"/>
+              <a:buChar char="§"/>
+            </a:pPr>
+            <a:r>
+              <a:rPr lang="de-DE" sz="2400" dirty="0" err="1"/>
+              <a:t>Preemptive</a:t>
+            </a:r>
+            <a:r>
+              <a:rPr lang="de-DE" sz="2400" dirty="0"/>
+              <a:t> Mode</a:t>
+            </a:r>
+          </a:p>
+          <a:p>
+            <a:pPr marL="285750" indent="-285750">
+              <a:buFont typeface="Wingdings" panose="05000000000000000000" pitchFamily="2" charset="2"/>
+              <a:buChar char="§"/>
+            </a:pPr>
+            <a:r>
+              <a:rPr lang="de-DE" sz="2400" dirty="0" err="1"/>
+              <a:t>Preemptive</a:t>
+            </a:r>
+            <a:r>
+              <a:rPr lang="de-DE" sz="2400" dirty="0"/>
+              <a:t>  Mode </a:t>
+            </a:r>
+            <a:r>
+              <a:rPr lang="de-DE" sz="2400" dirty="0" err="1"/>
+              <a:t>with</a:t>
+            </a:r>
+            <a:r>
+              <a:rPr lang="de-DE" sz="2400" dirty="0"/>
+              <a:t> Time </a:t>
+            </a:r>
+            <a:r>
+              <a:rPr lang="de-DE" sz="2400" dirty="0" err="1"/>
+              <a:t>Slicing</a:t>
+            </a:r>
+            <a:endParaRPr lang="de-DE" sz="2400" dirty="0"/>
+          </a:p>
+          <a:p>
+            <a:pPr marL="285750" indent="-285750">
+              <a:buFont typeface="Wingdings" panose="05000000000000000000" pitchFamily="2" charset="2"/>
+              <a:buChar char="§"/>
+            </a:pPr>
+            <a:endParaRPr lang="de-DE" sz="2400" dirty="0"/>
+          </a:p>
+          <a:p>
+            <a:pPr marL="285750" indent="-285750">
+              <a:buFont typeface="Wingdings" panose="05000000000000000000" pitchFamily="2" charset="2"/>
+              <a:buChar char="§"/>
+            </a:pPr>
+            <a:endParaRPr lang="de-DE" sz="2400" dirty="0"/>
+          </a:p>
+          <a:p>
+            <a:pPr marL="285750" indent="-285750">
+              <a:buFont typeface="Wingdings" panose="05000000000000000000" pitchFamily="2" charset="2"/>
+              <a:buChar char="§"/>
+            </a:pPr>
+            <a:endParaRPr lang="de-DE" dirty="0"/>
+          </a:p>
+          <a:p>
+            <a:pPr marL="285750" indent="-285750">
+              <a:buFont typeface="Wingdings" panose="05000000000000000000" pitchFamily="2" charset="2"/>
+              <a:buChar char="§"/>
+            </a:pPr>
+            <a:endParaRPr lang="de-DE" dirty="0"/>
+          </a:p>
+          <a:p>
+            <a:endParaRPr lang="de-DE" dirty="0"/>
+          </a:p>
+        </p:txBody>
+      </p:sp>
+      <p:pic>
+        <p:nvPicPr>
+          <p:cNvPr id="10" name="Grafik 9">
+            <a:extLst>
+              <a:ext uri="{FF2B5EF4-FFF2-40B4-BE49-F238E27FC236}">
+                <a16:creationId xmlns:a16="http://schemas.microsoft.com/office/drawing/2014/main" id="{B92E8399-6E1E-470E-BBA4-7805A508029F}"/>
+              </a:ext>
+            </a:extLst>
+          </p:cNvPr>
+          <p:cNvPicPr>
+            <a:picLocks noChangeAspect="1"/>
+          </p:cNvPicPr>
+          <p:nvPr/>
+        </p:nvPicPr>
+        <p:blipFill>
+          <a:blip r:embed="rId2">
+            <a:extLst>
+              <a:ext uri="{28A0092B-C50C-407E-A947-70E740481C1C}">
+                <a14:useLocalDpi xmlns:a14="http://schemas.microsoft.com/office/drawing/2010/main" val="0"/>
+              </a:ext>
+            </a:extLst>
+          </a:blip>
+          <a:stretch>
+            <a:fillRect/>
+          </a:stretch>
+        </p:blipFill>
+        <p:spPr>
+          <a:xfrm>
+            <a:off x="460292" y="2283935"/>
+            <a:ext cx="4856901" cy="2885690"/>
+          </a:xfrm>
+          <a:prstGeom prst="rect">
+            <a:avLst/>
+          </a:prstGeom>
+        </p:spPr>
+      </p:pic>
+      <p:pic>
+        <p:nvPicPr>
+          <p:cNvPr id="9" name="Grafik 8">
+            <a:extLst>
+              <a:ext uri="{FF2B5EF4-FFF2-40B4-BE49-F238E27FC236}">
+                <a16:creationId xmlns:a16="http://schemas.microsoft.com/office/drawing/2014/main" id="{E4EB05B5-0B7D-4339-8E3C-781ADB4506E3}"/>
+              </a:ext>
+            </a:extLst>
+          </p:cNvPr>
+          <p:cNvPicPr>
+            <a:picLocks noChangeAspect="1"/>
+          </p:cNvPicPr>
+          <p:nvPr/>
+        </p:nvPicPr>
+        <p:blipFill>
+          <a:blip r:embed="rId3">
+            <a:extLst>
+              <a:ext uri="{28A0092B-C50C-407E-A947-70E740481C1C}">
+                <a14:useLocalDpi xmlns:a14="http://schemas.microsoft.com/office/drawing/2010/main" val="0"/>
+              </a:ext>
+            </a:extLst>
+          </a:blip>
+          <a:stretch>
+            <a:fillRect/>
+          </a:stretch>
+        </p:blipFill>
+        <p:spPr>
+          <a:xfrm>
+            <a:off x="6531087" y="3589620"/>
+            <a:ext cx="3996653" cy="739106"/>
+          </a:xfrm>
+          <a:prstGeom prst="rect">
+            <a:avLst/>
+          </a:prstGeom>
+        </p:spPr>
+      </p:pic>
     </p:spTree>
     <p:extLst>
       <p:ext uri="{BB962C8B-B14F-4D97-AF65-F5344CB8AC3E}">
@@ -7274,6 +7627,81 @@
   <p:clrMapOvr>
     <a:masterClrMapping/>
   </p:clrMapOvr>
+  <p:timing>
+    <p:tnLst>
+      <p:par>
+        <p:cTn id="1" dur="indefinite" restart="never" nodeType="tmRoot">
+          <p:childTnLst>
+            <p:seq concurrent="1" nextAc="seek">
+              <p:cTn id="2" dur="indefinite" nodeType="mainSeq">
+                <p:childTnLst>
+                  <p:par>
+                    <p:cTn id="3" fill="hold">
+                      <p:stCondLst>
+                        <p:cond delay="indefinite"/>
+                      </p:stCondLst>
+                      <p:childTnLst>
+                        <p:par>
+                          <p:cTn id="4" fill="hold">
+                            <p:stCondLst>
+                              <p:cond delay="0"/>
+                            </p:stCondLst>
+                            <p:childTnLst>
+                              <p:par>
+                                <p:cTn id="5" presetID="1" presetClass="entr" presetSubtype="0" fill="hold" nodeType="clickEffect">
+                                  <p:stCondLst>
+                                    <p:cond delay="0"/>
+                                  </p:stCondLst>
+                                  <p:childTnLst>
+                                    <p:set>
+                                      <p:cBhvr>
+                                        <p:cTn id="6" dur="1" fill="hold">
+                                          <p:stCondLst>
+                                            <p:cond delay="0"/>
+                                          </p:stCondLst>
+                                        </p:cTn>
+                                        <p:tgtEl>
+                                          <p:spTgt spid="10"/>
+                                        </p:tgtEl>
+                                        <p:attrNameLst>
+                                          <p:attrName>style.visibility</p:attrName>
+                                        </p:attrNameLst>
+                                      </p:cBhvr>
+                                      <p:to>
+                                        <p:strVal val="visible"/>
+                                      </p:to>
+                                    </p:set>
+                                  </p:childTnLst>
+                                </p:cTn>
+                              </p:par>
+                            </p:childTnLst>
+                          </p:cTn>
+                        </p:par>
+                      </p:childTnLst>
+                    </p:cTn>
+                  </p:par>
+                </p:childTnLst>
+              </p:cTn>
+              <p:prevCondLst>
+                <p:cond evt="onPrev" delay="0">
+                  <p:tgtEl>
+                    <p:sldTgt/>
+                  </p:tgtEl>
+                </p:cond>
+              </p:prevCondLst>
+              <p:nextCondLst>
+                <p:cond evt="onNext" delay="0">
+                  <p:tgtEl>
+                    <p:sldTgt/>
+                  </p:tgtEl>
+                </p:cond>
+              </p:nextCondLst>
+            </p:seq>
+          </p:childTnLst>
+        </p:cTn>
+      </p:par>
+    </p:tnLst>
+  </p:timing>
 </p:sld>
 </file>
 
@@ -7299,7 +7727,7 @@
           <p:cNvPr id="2" name="Titel 1">
             <a:extLst>
               <a:ext uri="{FF2B5EF4-FFF2-40B4-BE49-F238E27FC236}">
-                <a16:creationId xmlns:a16="http://schemas.microsoft.com/office/drawing/2014/main" id="{18CA0E69-D776-4AF9-8057-5D127456F54E}"/>
+                <a16:creationId xmlns:a16="http://schemas.microsoft.com/office/drawing/2014/main" id="{1D7DF3BA-93D7-43E7-82CA-DEEB8031D74B}"/>
               </a:ext>
             </a:extLst>
           </p:cNvPr>
@@ -7316,8 +7744,779 @@
           <a:lstStyle/>
           <a:p>
             <a:r>
+              <a:rPr lang="de-DE" dirty="0" err="1"/>
+              <a:t>Cooperative</a:t>
+            </a:r>
+            <a:r>
               <a:rPr lang="de-DE" dirty="0"/>
-              <a:t>Low Power</a:t>
+              <a:t> Mode</a:t>
+            </a:r>
+          </a:p>
+        </p:txBody>
+      </p:sp>
+      <p:sp>
+        <p:nvSpPr>
+          <p:cNvPr id="4" name="Fußzeilenplatzhalter 3">
+            <a:extLst>
+              <a:ext uri="{FF2B5EF4-FFF2-40B4-BE49-F238E27FC236}">
+                <a16:creationId xmlns:a16="http://schemas.microsoft.com/office/drawing/2014/main" id="{E8A6171D-17AF-4DB6-972C-AA843CF54D0F}"/>
+              </a:ext>
+            </a:extLst>
+          </p:cNvPr>
+          <p:cNvSpPr>
+            <a:spLocks noGrp="1"/>
+          </p:cNvSpPr>
+          <p:nvPr>
+            <p:ph type="ftr" sz="quarter" idx="11"/>
+          </p:nvPr>
+        </p:nvSpPr>
+        <p:spPr/>
+        <p:txBody>
+          <a:bodyPr/>
+          <a:lstStyle/>
+          <a:p>
+            <a:r>
+              <a:rPr lang="de-DE" dirty="0"/>
+              <a:t>Scheduling</a:t>
+            </a:r>
+          </a:p>
+        </p:txBody>
+      </p:sp>
+      <p:pic>
+        <p:nvPicPr>
+          <p:cNvPr id="5" name="Grafik 4">
+            <a:extLst>
+              <a:ext uri="{FF2B5EF4-FFF2-40B4-BE49-F238E27FC236}">
+                <a16:creationId xmlns:a16="http://schemas.microsoft.com/office/drawing/2014/main" id="{92A9E71F-8875-4FBF-BCFB-43FC72A0F63A}"/>
+              </a:ext>
+            </a:extLst>
+          </p:cNvPr>
+          <p:cNvPicPr>
+            <a:picLocks noChangeAspect="1"/>
+          </p:cNvPicPr>
+          <p:nvPr/>
+        </p:nvPicPr>
+        <p:blipFill>
+          <a:blip r:embed="rId2"/>
+          <a:stretch>
+            <a:fillRect/>
+          </a:stretch>
+        </p:blipFill>
+        <p:spPr>
+          <a:xfrm>
+            <a:off x="0" y="2384294"/>
+            <a:ext cx="6638037" cy="2457268"/>
+          </a:xfrm>
+          <a:prstGeom prst="rect">
+            <a:avLst/>
+          </a:prstGeom>
+        </p:spPr>
+      </p:pic>
+      <p:sp>
+        <p:nvSpPr>
+          <p:cNvPr id="6" name="Rechteck 5">
+            <a:extLst>
+              <a:ext uri="{FF2B5EF4-FFF2-40B4-BE49-F238E27FC236}">
+                <a16:creationId xmlns:a16="http://schemas.microsoft.com/office/drawing/2014/main" id="{F0EA15AE-3A19-4008-9E2C-B9B664F69BC6}"/>
+              </a:ext>
+            </a:extLst>
+          </p:cNvPr>
+          <p:cNvSpPr/>
+          <p:nvPr/>
+        </p:nvSpPr>
+        <p:spPr>
+          <a:xfrm>
+            <a:off x="3285744" y="5583936"/>
+            <a:ext cx="2164080" cy="438912"/>
+          </a:xfrm>
+          <a:prstGeom prst="rect">
+            <a:avLst/>
+          </a:prstGeom>
+          <a:solidFill>
+            <a:schemeClr val="bg1"/>
+          </a:solidFill>
+          <a:ln>
+            <a:solidFill>
+              <a:schemeClr val="bg1"/>
+            </a:solidFill>
+          </a:ln>
+        </p:spPr>
+        <p:style>
+          <a:lnRef idx="2">
+            <a:schemeClr val="accent1">
+              <a:shade val="50000"/>
+            </a:schemeClr>
+          </a:lnRef>
+          <a:fillRef idx="1">
+            <a:schemeClr val="accent1"/>
+          </a:fillRef>
+          <a:effectRef idx="0">
+            <a:schemeClr val="accent1"/>
+          </a:effectRef>
+          <a:fontRef idx="minor">
+            <a:schemeClr val="lt1"/>
+          </a:fontRef>
+        </p:style>
+        <p:txBody>
+          <a:bodyPr rtlCol="0" anchor="ctr"/>
+          <a:lstStyle/>
+          <a:p>
+            <a:pPr algn="ctr"/>
+            <a:endParaRPr lang="de-DE"/>
+          </a:p>
+        </p:txBody>
+      </p:sp>
+      <p:sp>
+        <p:nvSpPr>
+          <p:cNvPr id="10" name="Rechteck 9">
+            <a:extLst>
+              <a:ext uri="{FF2B5EF4-FFF2-40B4-BE49-F238E27FC236}">
+                <a16:creationId xmlns:a16="http://schemas.microsoft.com/office/drawing/2014/main" id="{AF427544-5025-40C2-90C4-BFF017665F94}"/>
+              </a:ext>
+            </a:extLst>
+          </p:cNvPr>
+          <p:cNvSpPr/>
+          <p:nvPr/>
+        </p:nvSpPr>
+        <p:spPr>
+          <a:xfrm>
+            <a:off x="5565648" y="5535168"/>
+            <a:ext cx="2791968" cy="438912"/>
+          </a:xfrm>
+          <a:prstGeom prst="rect">
+            <a:avLst/>
+          </a:prstGeom>
+          <a:solidFill>
+            <a:schemeClr val="bg1"/>
+          </a:solidFill>
+          <a:ln>
+            <a:solidFill>
+              <a:schemeClr val="bg1"/>
+            </a:solidFill>
+          </a:ln>
+        </p:spPr>
+        <p:style>
+          <a:lnRef idx="2">
+            <a:schemeClr val="accent1">
+              <a:shade val="50000"/>
+            </a:schemeClr>
+          </a:lnRef>
+          <a:fillRef idx="1">
+            <a:schemeClr val="accent1"/>
+          </a:fillRef>
+          <a:effectRef idx="0">
+            <a:schemeClr val="accent1"/>
+          </a:effectRef>
+          <a:fontRef idx="minor">
+            <a:schemeClr val="lt1"/>
+          </a:fontRef>
+        </p:style>
+        <p:txBody>
+          <a:bodyPr rtlCol="0" anchor="ctr"/>
+          <a:lstStyle/>
+          <a:p>
+            <a:pPr algn="ctr"/>
+            <a:endParaRPr lang="de-DE"/>
+          </a:p>
+        </p:txBody>
+      </p:sp>
+      <p:sp>
+        <p:nvSpPr>
+          <p:cNvPr id="12" name="Textfeld 11">
+            <a:extLst>
+              <a:ext uri="{FF2B5EF4-FFF2-40B4-BE49-F238E27FC236}">
+                <a16:creationId xmlns:a16="http://schemas.microsoft.com/office/drawing/2014/main" id="{22CC0027-EB22-4F54-A686-52F98ACA376A}"/>
+              </a:ext>
+            </a:extLst>
+          </p:cNvPr>
+          <p:cNvSpPr txBox="1"/>
+          <p:nvPr/>
+        </p:nvSpPr>
+        <p:spPr>
+          <a:xfrm>
+            <a:off x="6961632" y="2384294"/>
+            <a:ext cx="4270248" cy="2215991"/>
+          </a:xfrm>
+          <a:prstGeom prst="rect">
+            <a:avLst/>
+          </a:prstGeom>
+          <a:noFill/>
+        </p:spPr>
+        <p:txBody>
+          <a:bodyPr wrap="square" rtlCol="0">
+            <a:spAutoFit/>
+          </a:bodyPr>
+          <a:lstStyle/>
+          <a:p>
+            <a:pPr marL="285750" indent="-285750">
+              <a:buFont typeface="Wingdings" panose="05000000000000000000" pitchFamily="2" charset="2"/>
+              <a:buChar char="§"/>
+            </a:pPr>
+            <a:r>
+              <a:rPr lang="de-DE" sz="2400" dirty="0"/>
+              <a:t>Kontextwechsel nur durch</a:t>
+            </a:r>
+          </a:p>
+          <a:p>
+            <a:pPr marL="742950" lvl="1" indent="-285750">
+              <a:buFont typeface="Wingdings" panose="05000000000000000000" pitchFamily="2" charset="2"/>
+              <a:buChar char="§"/>
+            </a:pPr>
+            <a:r>
+              <a:rPr lang="de-DE" sz="2400" dirty="0" err="1"/>
+              <a:t>taskYield</a:t>
+            </a:r>
+            <a:r>
+              <a:rPr lang="de-DE" sz="2400" dirty="0"/>
+              <a:t>() </a:t>
+            </a:r>
+          </a:p>
+          <a:p>
+            <a:pPr marL="742950" lvl="1" indent="-285750">
+              <a:buFont typeface="Wingdings" panose="05000000000000000000" pitchFamily="2" charset="2"/>
+              <a:buChar char="§"/>
+            </a:pPr>
+            <a:r>
+              <a:rPr lang="de-DE" sz="2400" dirty="0" err="1"/>
+              <a:t>blocked</a:t>
+            </a:r>
+            <a:r>
+              <a:rPr lang="de-DE" sz="2400" dirty="0"/>
+              <a:t> API </a:t>
+            </a:r>
+            <a:r>
+              <a:rPr lang="de-DE" sz="2400" dirty="0" err="1"/>
+              <a:t>call</a:t>
+            </a:r>
+            <a:endParaRPr lang="de-DE" sz="2400" dirty="0"/>
+          </a:p>
+          <a:p>
+            <a:pPr marL="285750" indent="-285750">
+              <a:buFont typeface="Wingdings" panose="05000000000000000000" pitchFamily="2" charset="2"/>
+              <a:buChar char="§"/>
+            </a:pPr>
+            <a:r>
+              <a:rPr lang="de-DE" sz="2400" dirty="0"/>
+              <a:t>Praktisch bei externen Ressourcen</a:t>
+            </a:r>
+          </a:p>
+          <a:p>
+            <a:endParaRPr lang="de-DE" dirty="0"/>
+          </a:p>
+        </p:txBody>
+      </p:sp>
+    </p:spTree>
+    <p:extLst>
+      <p:ext uri="{BB962C8B-B14F-4D97-AF65-F5344CB8AC3E}">
+        <p14:creationId xmlns:p14="http://schemas.microsoft.com/office/powerpoint/2010/main" val="2999870621"/>
+      </p:ext>
+    </p:extLst>
+  </p:cSld>
+  <p:clrMapOvr>
+    <a:masterClrMapping/>
+  </p:clrMapOvr>
+</p:sld>
+</file>
+
+<file path=ppt/slides/slide12.xml><?xml version="1.0" encoding="utf-8"?>
+<p:sld xmlns:a="http://schemas.openxmlformats.org/drawingml/2006/main" xmlns:r="http://schemas.openxmlformats.org/officeDocument/2006/relationships" xmlns:p="http://schemas.openxmlformats.org/presentationml/2006/main">
+  <p:cSld>
+    <p:spTree>
+      <p:nvGrpSpPr>
+        <p:cNvPr id="1" name=""/>
+        <p:cNvGrpSpPr/>
+        <p:nvPr/>
+      </p:nvGrpSpPr>
+      <p:grpSpPr>
+        <a:xfrm>
+          <a:off x="0" y="0"/>
+          <a:ext cx="0" cy="0"/>
+          <a:chOff x="0" y="0"/>
+          <a:chExt cx="0" cy="0"/>
+        </a:xfrm>
+      </p:grpSpPr>
+      <p:sp>
+        <p:nvSpPr>
+          <p:cNvPr id="2" name="Titel 1">
+            <a:extLst>
+              <a:ext uri="{FF2B5EF4-FFF2-40B4-BE49-F238E27FC236}">
+                <a16:creationId xmlns:a16="http://schemas.microsoft.com/office/drawing/2014/main" id="{83BA0C1A-5C57-4903-BCAC-8EF4B7B6E061}"/>
+              </a:ext>
+            </a:extLst>
+          </p:cNvPr>
+          <p:cNvSpPr>
+            <a:spLocks noGrp="1"/>
+          </p:cNvSpPr>
+          <p:nvPr>
+            <p:ph type="title"/>
+          </p:nvPr>
+        </p:nvSpPr>
+        <p:spPr/>
+        <p:txBody>
+          <a:bodyPr/>
+          <a:lstStyle/>
+          <a:p>
+            <a:r>
+              <a:rPr lang="de-DE" dirty="0" err="1"/>
+              <a:t>Preemptive</a:t>
+            </a:r>
+            <a:r>
+              <a:rPr lang="de-DE" dirty="0"/>
+              <a:t> Mode</a:t>
+            </a:r>
+          </a:p>
+        </p:txBody>
+      </p:sp>
+      <p:sp>
+        <p:nvSpPr>
+          <p:cNvPr id="4" name="Fußzeilenplatzhalter 3">
+            <a:extLst>
+              <a:ext uri="{FF2B5EF4-FFF2-40B4-BE49-F238E27FC236}">
+                <a16:creationId xmlns:a16="http://schemas.microsoft.com/office/drawing/2014/main" id="{B0E7112C-1805-4AB3-95F5-679174C76857}"/>
+              </a:ext>
+            </a:extLst>
+          </p:cNvPr>
+          <p:cNvSpPr>
+            <a:spLocks noGrp="1"/>
+          </p:cNvSpPr>
+          <p:nvPr>
+            <p:ph type="ftr" sz="quarter" idx="11"/>
+          </p:nvPr>
+        </p:nvSpPr>
+        <p:spPr/>
+        <p:txBody>
+          <a:bodyPr/>
+          <a:lstStyle/>
+          <a:p>
+            <a:r>
+              <a:rPr lang="de-DE" dirty="0"/>
+              <a:t>Scheduling</a:t>
+            </a:r>
+          </a:p>
+        </p:txBody>
+      </p:sp>
+      <p:pic>
+        <p:nvPicPr>
+          <p:cNvPr id="5" name="Grafik 4">
+            <a:extLst>
+              <a:ext uri="{FF2B5EF4-FFF2-40B4-BE49-F238E27FC236}">
+                <a16:creationId xmlns:a16="http://schemas.microsoft.com/office/drawing/2014/main" id="{E5E9BD3A-4987-4A32-A202-D5460725CD7D}"/>
+              </a:ext>
+            </a:extLst>
+          </p:cNvPr>
+          <p:cNvPicPr>
+            <a:picLocks noChangeAspect="1"/>
+          </p:cNvPicPr>
+          <p:nvPr/>
+        </p:nvPicPr>
+        <p:blipFill rotWithShape="1">
+          <a:blip r:embed="rId2"/>
+          <a:srcRect l="2669"/>
+          <a:stretch/>
+        </p:blipFill>
+        <p:spPr>
+          <a:xfrm>
+            <a:off x="0" y="2431404"/>
+            <a:ext cx="6592824" cy="2538213"/>
+          </a:xfrm>
+          <a:prstGeom prst="rect">
+            <a:avLst/>
+          </a:prstGeom>
+        </p:spPr>
+      </p:pic>
+      <p:sp>
+        <p:nvSpPr>
+          <p:cNvPr id="6" name="Textfeld 5">
+            <a:extLst>
+              <a:ext uri="{FF2B5EF4-FFF2-40B4-BE49-F238E27FC236}">
+                <a16:creationId xmlns:a16="http://schemas.microsoft.com/office/drawing/2014/main" id="{86F6093D-DCC7-493F-AD35-4E0486367A3E}"/>
+              </a:ext>
+            </a:extLst>
+          </p:cNvPr>
+          <p:cNvSpPr txBox="1"/>
+          <p:nvPr/>
+        </p:nvSpPr>
+        <p:spPr>
+          <a:xfrm>
+            <a:off x="6547104" y="2431404"/>
+            <a:ext cx="5532120" cy="2954655"/>
+          </a:xfrm>
+          <a:prstGeom prst="rect">
+            <a:avLst/>
+          </a:prstGeom>
+          <a:noFill/>
+        </p:spPr>
+        <p:txBody>
+          <a:bodyPr wrap="square" rtlCol="0">
+            <a:spAutoFit/>
+          </a:bodyPr>
+          <a:lstStyle/>
+          <a:p>
+            <a:pPr marL="285750" indent="-285750">
+              <a:buFont typeface="Wingdings" panose="05000000000000000000" pitchFamily="2" charset="2"/>
+              <a:buChar char="§"/>
+            </a:pPr>
+            <a:r>
+              <a:rPr lang="de-DE" sz="2400" dirty="0"/>
+              <a:t>Task mit high </a:t>
+            </a:r>
+            <a:r>
+              <a:rPr lang="de-DE" sz="2400" dirty="0" err="1"/>
+              <a:t>Prio</a:t>
+            </a:r>
+            <a:r>
+              <a:rPr lang="de-DE" sz="2400" dirty="0"/>
+              <a:t> verdrängt Task mit </a:t>
+            </a:r>
+            <a:r>
+              <a:rPr lang="de-DE" sz="2400" dirty="0" err="1"/>
+              <a:t>low</a:t>
+            </a:r>
+            <a:r>
+              <a:rPr lang="de-DE" sz="2400" dirty="0"/>
+              <a:t> </a:t>
+            </a:r>
+            <a:r>
+              <a:rPr lang="de-DE" sz="2400" dirty="0" err="1"/>
+              <a:t>Prio</a:t>
+            </a:r>
+            <a:endParaRPr lang="de-DE" sz="2400" dirty="0"/>
+          </a:p>
+          <a:p>
+            <a:pPr marL="285750" indent="-285750">
+              <a:buFont typeface="Wingdings" panose="05000000000000000000" pitchFamily="2" charset="2"/>
+              <a:buChar char="§"/>
+            </a:pPr>
+            <a:r>
+              <a:rPr lang="de-DE" sz="2400" dirty="0"/>
+              <a:t>Task gleicher Priorität wechseln sich ab</a:t>
+            </a:r>
+          </a:p>
+          <a:p>
+            <a:pPr marL="285750" indent="-285750">
+              <a:buFont typeface="Wingdings" panose="05000000000000000000" pitchFamily="2" charset="2"/>
+              <a:buChar char="§"/>
+            </a:pPr>
+            <a:r>
+              <a:rPr lang="de-DE" sz="2400" dirty="0"/>
+              <a:t>Timing basieren auf dem </a:t>
+            </a:r>
+            <a:r>
+              <a:rPr lang="de-DE" sz="2400" dirty="0" err="1"/>
+              <a:t>Systick</a:t>
+            </a:r>
+            <a:endParaRPr lang="de-DE" sz="2400" dirty="0"/>
+          </a:p>
+          <a:p>
+            <a:pPr marL="285750" indent="-285750">
+              <a:buFont typeface="Wingdings" panose="05000000000000000000" pitchFamily="2" charset="2"/>
+              <a:buChar char="§"/>
+            </a:pPr>
+            <a:r>
+              <a:rPr lang="de-DE" sz="2400" dirty="0"/>
+              <a:t>Gewöhnlich zwischen 1 und 100 </a:t>
+            </a:r>
+            <a:r>
+              <a:rPr lang="de-DE" sz="2400" dirty="0" err="1"/>
+              <a:t>ms</a:t>
+            </a:r>
+            <a:r>
+              <a:rPr lang="de-DE" sz="2400" dirty="0"/>
+              <a:t> Tick</a:t>
+            </a:r>
+          </a:p>
+          <a:p>
+            <a:pPr marL="285750" indent="-285750">
+              <a:buFont typeface="Wingdings" panose="05000000000000000000" pitchFamily="2" charset="2"/>
+              <a:buChar char="§"/>
+            </a:pPr>
+            <a:r>
+              <a:rPr lang="de-DE" sz="2400" dirty="0"/>
+              <a:t>Die wohl am häufigsten verwendete Konfiguration</a:t>
+            </a:r>
+          </a:p>
+          <a:p>
+            <a:endParaRPr lang="de-DE" dirty="0"/>
+          </a:p>
+        </p:txBody>
+      </p:sp>
+    </p:spTree>
+    <p:extLst>
+      <p:ext uri="{BB962C8B-B14F-4D97-AF65-F5344CB8AC3E}">
+        <p14:creationId xmlns:p14="http://schemas.microsoft.com/office/powerpoint/2010/main" val="3699201216"/>
+      </p:ext>
+    </p:extLst>
+  </p:cSld>
+  <p:clrMapOvr>
+    <a:masterClrMapping/>
+  </p:clrMapOvr>
+</p:sld>
+</file>
+
+<file path=ppt/slides/slide13.xml><?xml version="1.0" encoding="utf-8"?>
+<p:sld xmlns:a="http://schemas.openxmlformats.org/drawingml/2006/main" xmlns:r="http://schemas.openxmlformats.org/officeDocument/2006/relationships" xmlns:p="http://schemas.openxmlformats.org/presentationml/2006/main">
+  <p:cSld>
+    <p:spTree>
+      <p:nvGrpSpPr>
+        <p:cNvPr id="1" name=""/>
+        <p:cNvGrpSpPr/>
+        <p:nvPr/>
+      </p:nvGrpSpPr>
+      <p:grpSpPr>
+        <a:xfrm>
+          <a:off x="0" y="0"/>
+          <a:ext cx="0" cy="0"/>
+          <a:chOff x="0" y="0"/>
+          <a:chExt cx="0" cy="0"/>
+        </a:xfrm>
+      </p:grpSpPr>
+      <p:sp>
+        <p:nvSpPr>
+          <p:cNvPr id="2" name="Titel 1">
+            <a:extLst>
+              <a:ext uri="{FF2B5EF4-FFF2-40B4-BE49-F238E27FC236}">
+                <a16:creationId xmlns:a16="http://schemas.microsoft.com/office/drawing/2014/main" id="{58ADEC9F-BEB8-403E-B5B2-21FB12CBD397}"/>
+              </a:ext>
+            </a:extLst>
+          </p:cNvPr>
+          <p:cNvSpPr>
+            <a:spLocks noGrp="1"/>
+          </p:cNvSpPr>
+          <p:nvPr>
+            <p:ph type="title"/>
+          </p:nvPr>
+        </p:nvSpPr>
+        <p:spPr/>
+        <p:txBody>
+          <a:bodyPr/>
+          <a:lstStyle/>
+          <a:p>
+            <a:r>
+              <a:rPr lang="de-DE" dirty="0"/>
+              <a:t>Time </a:t>
+            </a:r>
+            <a:r>
+              <a:rPr lang="de-DE" dirty="0" err="1"/>
+              <a:t>Slicing</a:t>
+            </a:r>
+            <a:endParaRPr lang="de-DE" dirty="0"/>
+          </a:p>
+        </p:txBody>
+      </p:sp>
+      <p:sp>
+        <p:nvSpPr>
+          <p:cNvPr id="4" name="Fußzeilenplatzhalter 3">
+            <a:extLst>
+              <a:ext uri="{FF2B5EF4-FFF2-40B4-BE49-F238E27FC236}">
+                <a16:creationId xmlns:a16="http://schemas.microsoft.com/office/drawing/2014/main" id="{0CE2668C-D1E6-4735-8A01-AC8511ED42F9}"/>
+              </a:ext>
+            </a:extLst>
+          </p:cNvPr>
+          <p:cNvSpPr>
+            <a:spLocks noGrp="1"/>
+          </p:cNvSpPr>
+          <p:nvPr>
+            <p:ph type="ftr" sz="quarter" idx="11"/>
+          </p:nvPr>
+        </p:nvSpPr>
+        <p:spPr/>
+        <p:txBody>
+          <a:bodyPr/>
+          <a:lstStyle/>
+          <a:p>
+            <a:r>
+              <a:rPr lang="de-DE" dirty="0"/>
+              <a:t>Scheduling</a:t>
+            </a:r>
+          </a:p>
+        </p:txBody>
+      </p:sp>
+      <p:pic>
+        <p:nvPicPr>
+          <p:cNvPr id="5" name="Grafik 4">
+            <a:extLst>
+              <a:ext uri="{FF2B5EF4-FFF2-40B4-BE49-F238E27FC236}">
+                <a16:creationId xmlns:a16="http://schemas.microsoft.com/office/drawing/2014/main" id="{B9F5065B-2E9D-498C-BA83-A908F5070135}"/>
+              </a:ext>
+            </a:extLst>
+          </p:cNvPr>
+          <p:cNvPicPr>
+            <a:picLocks noChangeAspect="1"/>
+          </p:cNvPicPr>
+          <p:nvPr/>
+        </p:nvPicPr>
+        <p:blipFill rotWithShape="1">
+          <a:blip r:embed="rId2"/>
+          <a:srcRect l="1982" b="27106"/>
+          <a:stretch/>
+        </p:blipFill>
+        <p:spPr>
+          <a:xfrm>
+            <a:off x="23575" y="2487169"/>
+            <a:ext cx="6331505" cy="2145334"/>
+          </a:xfrm>
+          <a:prstGeom prst="rect">
+            <a:avLst/>
+          </a:prstGeom>
+        </p:spPr>
+      </p:pic>
+      <p:sp>
+        <p:nvSpPr>
+          <p:cNvPr id="6" name="Textfeld 5">
+            <a:extLst>
+              <a:ext uri="{FF2B5EF4-FFF2-40B4-BE49-F238E27FC236}">
+                <a16:creationId xmlns:a16="http://schemas.microsoft.com/office/drawing/2014/main" id="{31FAE22D-5880-4263-A828-EC45E634728F}"/>
+              </a:ext>
+            </a:extLst>
+          </p:cNvPr>
+          <p:cNvSpPr txBox="1"/>
+          <p:nvPr/>
+        </p:nvSpPr>
+        <p:spPr>
+          <a:xfrm>
+            <a:off x="6355080" y="2384294"/>
+            <a:ext cx="5532120" cy="2585323"/>
+          </a:xfrm>
+          <a:prstGeom prst="rect">
+            <a:avLst/>
+          </a:prstGeom>
+          <a:noFill/>
+        </p:spPr>
+        <p:txBody>
+          <a:bodyPr wrap="square" rtlCol="0">
+            <a:spAutoFit/>
+          </a:bodyPr>
+          <a:lstStyle/>
+          <a:p>
+            <a:pPr marL="285750" indent="-285750">
+              <a:buFont typeface="Wingdings" panose="05000000000000000000" pitchFamily="2" charset="2"/>
+              <a:buChar char="§"/>
+            </a:pPr>
+            <a:r>
+              <a:rPr lang="de-DE" sz="2400" dirty="0"/>
+              <a:t>Option für </a:t>
+            </a:r>
+            <a:r>
+              <a:rPr lang="de-DE" sz="2400" dirty="0" err="1"/>
+              <a:t>Preemptive</a:t>
+            </a:r>
+            <a:r>
+              <a:rPr lang="de-DE" sz="2400" dirty="0"/>
+              <a:t> Mode</a:t>
+            </a:r>
+          </a:p>
+          <a:p>
+            <a:pPr marL="285750" indent="-285750">
+              <a:buFont typeface="Wingdings" panose="05000000000000000000" pitchFamily="2" charset="2"/>
+              <a:buChar char="§"/>
+            </a:pPr>
+            <a:r>
+              <a:rPr lang="de-DE" sz="2400" dirty="0"/>
+              <a:t>Task gleicher Priorität wechseln sich ab</a:t>
+            </a:r>
+          </a:p>
+          <a:p>
+            <a:pPr marL="285750" indent="-285750">
+              <a:buFont typeface="Wingdings" panose="05000000000000000000" pitchFamily="2" charset="2"/>
+              <a:buChar char="§"/>
+            </a:pPr>
+            <a:r>
+              <a:rPr lang="de-DE" sz="2400" dirty="0"/>
+              <a:t>Timing basieren auf dem </a:t>
+            </a:r>
+            <a:r>
+              <a:rPr lang="de-DE" sz="2400" dirty="0" err="1"/>
+              <a:t>Systick</a:t>
+            </a:r>
+            <a:endParaRPr lang="de-DE" sz="2400" dirty="0"/>
+          </a:p>
+          <a:p>
+            <a:pPr marL="285750" indent="-285750">
+              <a:buFont typeface="Wingdings" panose="05000000000000000000" pitchFamily="2" charset="2"/>
+              <a:buChar char="§"/>
+            </a:pPr>
+            <a:r>
+              <a:rPr lang="de-DE" sz="2400" dirty="0"/>
+              <a:t>Gewöhnlich zwischen 1 und 100 </a:t>
+            </a:r>
+            <a:r>
+              <a:rPr lang="de-DE" sz="2400" dirty="0" err="1"/>
+              <a:t>ms</a:t>
+            </a:r>
+            <a:r>
+              <a:rPr lang="de-DE" sz="2400" dirty="0"/>
+              <a:t> Tick</a:t>
+            </a:r>
+          </a:p>
+          <a:p>
+            <a:pPr marL="285750" indent="-285750">
+              <a:buFont typeface="Wingdings" panose="05000000000000000000" pitchFamily="2" charset="2"/>
+              <a:buChar char="§"/>
+            </a:pPr>
+            <a:r>
+              <a:rPr lang="de-DE" sz="2400" dirty="0"/>
+              <a:t>Die wohl am häufigsten verwendete Konfiguration</a:t>
+            </a:r>
+          </a:p>
+          <a:p>
+            <a:endParaRPr lang="de-DE" dirty="0"/>
+          </a:p>
+        </p:txBody>
+      </p:sp>
+    </p:spTree>
+    <p:extLst>
+      <p:ext uri="{BB962C8B-B14F-4D97-AF65-F5344CB8AC3E}">
+        <p14:creationId xmlns:p14="http://schemas.microsoft.com/office/powerpoint/2010/main" val="2493996157"/>
+      </p:ext>
+    </p:extLst>
+  </p:cSld>
+  <p:clrMapOvr>
+    <a:masterClrMapping/>
+  </p:clrMapOvr>
+</p:sld>
+</file>
+
+<file path=ppt/slides/slide14.xml><?xml version="1.0" encoding="utf-8"?>
+<p:sld xmlns:a="http://schemas.openxmlformats.org/drawingml/2006/main" xmlns:r="http://schemas.openxmlformats.org/officeDocument/2006/relationships" xmlns:p="http://schemas.openxmlformats.org/presentationml/2006/main">
+  <p:cSld>
+    <p:spTree>
+      <p:nvGrpSpPr>
+        <p:cNvPr id="1" name=""/>
+        <p:cNvGrpSpPr/>
+        <p:nvPr/>
+      </p:nvGrpSpPr>
+      <p:grpSpPr>
+        <a:xfrm>
+          <a:off x="0" y="0"/>
+          <a:ext cx="0" cy="0"/>
+          <a:chOff x="0" y="0"/>
+          <a:chExt cx="0" cy="0"/>
+        </a:xfrm>
+      </p:grpSpPr>
+      <p:sp>
+        <p:nvSpPr>
+          <p:cNvPr id="2" name="Titel 1">
+            <a:extLst>
+              <a:ext uri="{FF2B5EF4-FFF2-40B4-BE49-F238E27FC236}">
+                <a16:creationId xmlns:a16="http://schemas.microsoft.com/office/drawing/2014/main" id="{6084AF4F-AC12-4EDD-9431-0C1B33265C9C}"/>
+              </a:ext>
+            </a:extLst>
+          </p:cNvPr>
+          <p:cNvSpPr>
+            <a:spLocks noGrp="1"/>
+          </p:cNvSpPr>
+          <p:nvPr>
+            <p:ph type="title"/>
+          </p:nvPr>
+        </p:nvSpPr>
+        <p:spPr/>
+        <p:txBody>
+          <a:bodyPr/>
+          <a:lstStyle/>
+          <a:p>
+            <a:r>
+              <a:rPr lang="de-DE" dirty="0"/>
+              <a:t>Echtzeit</a:t>
             </a:r>
           </a:p>
         </p:txBody>
@@ -7327,7 +8526,7 @@
           <p:cNvPr id="3" name="Inhaltsplatzhalter 2">
             <a:extLst>
               <a:ext uri="{FF2B5EF4-FFF2-40B4-BE49-F238E27FC236}">
-                <a16:creationId xmlns:a16="http://schemas.microsoft.com/office/drawing/2014/main" id="{4435098B-CC40-45A4-806D-4883344EB5AC}"/>
+                <a16:creationId xmlns:a16="http://schemas.microsoft.com/office/drawing/2014/main" id="{0DC7E254-5A7C-4A51-A0E0-C85013CBBC26}"/>
               </a:ext>
             </a:extLst>
           </p:cNvPr>
@@ -7352,7 +8551,7 @@
           <p:cNvPr id="4" name="Fußzeilenplatzhalter 3">
             <a:extLst>
               <a:ext uri="{FF2B5EF4-FFF2-40B4-BE49-F238E27FC236}">
-                <a16:creationId xmlns:a16="http://schemas.microsoft.com/office/drawing/2014/main" id="{E2BB61E0-1713-493C-865A-7D17DBF9085C}"/>
+                <a16:creationId xmlns:a16="http://schemas.microsoft.com/office/drawing/2014/main" id="{87065097-734D-4D6C-AEBD-B7B912DAE6A5}"/>
               </a:ext>
             </a:extLst>
           </p:cNvPr>
@@ -7370,7 +8569,7 @@
           <a:p>
             <a:r>
               <a:rPr lang="de-DE" dirty="0"/>
-              <a:t>Low Power</a:t>
+              <a:t>Scheduling</a:t>
             </a:r>
           </a:p>
         </p:txBody>
@@ -7378,7 +8577,7 @@
     </p:spTree>
     <p:extLst>
       <p:ext uri="{BB962C8B-B14F-4D97-AF65-F5344CB8AC3E}">
-        <p14:creationId xmlns:p14="http://schemas.microsoft.com/office/powerpoint/2010/main" val="1766240531"/>
+        <p14:creationId xmlns:p14="http://schemas.microsoft.com/office/powerpoint/2010/main" val="2335887233"/>
       </p:ext>
     </p:extLst>
   </p:cSld>
@@ -14373,7 +15572,7 @@
           <a:p>
             <a:r>
               <a:rPr lang="de-DE" dirty="0"/>
-              <a:t>Ein(e) Task</a:t>
+              <a:t>Tasks</a:t>
             </a:r>
           </a:p>
         </p:txBody>
@@ -14397,120 +15596,108 @@
         <p:spPr/>
         <p:txBody>
           <a:bodyPr>
-            <a:normAutofit fontScale="55000" lnSpcReduction="20000"/>
+            <a:normAutofit fontScale="25000" lnSpcReduction="20000"/>
           </a:bodyPr>
           <a:lstStyle/>
           <a:p>
             <a:r>
-              <a:rPr lang="de-DE" dirty="0"/>
-              <a:t>ist eine eigenständige Programmeinheit</a:t>
-            </a:r>
-          </a:p>
-          <a:p>
-            <a:r>
-              <a:rPr lang="de-DE" dirty="0"/>
-              <a:t>Wird mit </a:t>
-            </a:r>
-            <a:r>
-              <a:rPr lang="de-DE" dirty="0" err="1"/>
+              <a:rPr lang="de-DE" sz="8000" dirty="0"/>
+              <a:t>sind eigenständige Programmeinheiten</a:t>
+            </a:r>
+          </a:p>
+          <a:p>
+            <a:r>
+              <a:rPr lang="de-DE" sz="8000" dirty="0"/>
+              <a:t>werden mit </a:t>
+            </a:r>
+            <a:r>
+              <a:rPr lang="de-DE" sz="8000" dirty="0" err="1"/>
               <a:t>xTaskCreate</a:t>
             </a:r>
             <a:r>
-              <a:rPr lang="de-DE" dirty="0"/>
+              <a:rPr lang="de-DE" sz="8000" dirty="0"/>
               <a:t>() erzeugt</a:t>
             </a:r>
           </a:p>
           <a:p>
             <a:r>
-              <a:rPr lang="de-DE" dirty="0"/>
-              <a:t>Wird mit </a:t>
-            </a:r>
-            <a:r>
-              <a:rPr lang="de-DE" dirty="0" err="1"/>
+              <a:rPr lang="de-DE" sz="8000" dirty="0"/>
+              <a:t>werden mit </a:t>
+            </a:r>
+            <a:r>
+              <a:rPr lang="de-DE" sz="8000" dirty="0" err="1"/>
               <a:t>xTaskDelete</a:t>
             </a:r>
             <a:r>
-              <a:rPr lang="de-DE" dirty="0"/>
+              <a:rPr lang="de-DE" sz="8000" dirty="0"/>
               <a:t>() gelöscht</a:t>
             </a:r>
           </a:p>
           <a:p>
             <a:r>
-              <a:rPr lang="de-DE" dirty="0"/>
-              <a:t>Wird in einer Schleife ausgeführt</a:t>
-            </a:r>
-          </a:p>
-          <a:p>
-            <a:r>
-              <a:rPr lang="de-DE" dirty="0"/>
-              <a:t>Synchronisierung / Kommunikation</a:t>
+              <a:rPr lang="de-DE" sz="8000" dirty="0"/>
+              <a:t>werden in einer Schleife ausgeführt</a:t>
+            </a:r>
+          </a:p>
+          <a:p>
+            <a:r>
+              <a:rPr lang="de-DE" sz="8000" dirty="0"/>
+              <a:t>sind Event gesteuert </a:t>
             </a:r>
           </a:p>
           <a:p>
             <a:pPr lvl="1"/>
             <a:r>
-              <a:rPr lang="de-DE" dirty="0"/>
+              <a:rPr lang="de-DE" sz="8000" dirty="0"/>
               <a:t>Interprozesskommunikation</a:t>
             </a:r>
           </a:p>
           <a:p>
             <a:pPr lvl="1"/>
             <a:r>
-              <a:rPr lang="de-DE" dirty="0" err="1"/>
+              <a:rPr lang="de-DE" sz="8000" dirty="0" err="1"/>
               <a:t>Timerevent</a:t>
             </a:r>
-            <a:endParaRPr lang="de-DE" dirty="0"/>
-          </a:p>
-          <a:p>
-            <a:r>
-              <a:rPr lang="de-DE" dirty="0"/>
+            <a:endParaRPr lang="de-DE" sz="8000" dirty="0"/>
+          </a:p>
+          <a:p>
+            <a:r>
+              <a:rPr lang="de-DE" sz="8000" dirty="0"/>
               <a:t>besteht aus</a:t>
             </a:r>
           </a:p>
           <a:p>
             <a:pPr lvl="1"/>
             <a:r>
-              <a:rPr lang="de-DE" dirty="0"/>
+              <a:rPr lang="de-DE" sz="8000" dirty="0"/>
               <a:t>TCB (Task Control Block)</a:t>
             </a:r>
           </a:p>
           <a:p>
             <a:pPr lvl="1"/>
             <a:r>
-              <a:rPr lang="de-DE" dirty="0"/>
+              <a:rPr lang="de-DE" sz="8000" dirty="0"/>
               <a:t>Stack</a:t>
             </a:r>
           </a:p>
           <a:p>
             <a:r>
-              <a:rPr lang="de-DE" dirty="0"/>
-              <a:t>hat eine Priorität</a:t>
-            </a:r>
-          </a:p>
-          <a:p>
-            <a:r>
-              <a:rPr lang="de-DE" dirty="0"/>
-              <a:t>wird in Listen verwaltet</a:t>
-            </a:r>
-          </a:p>
-          <a:p>
-            <a:r>
-              <a:rPr lang="de-DE" dirty="0"/>
-              <a:t>Kann folgende Zustände annehmen</a:t>
-            </a:r>
-          </a:p>
-          <a:p>
-            <a:r>
-              <a:rPr lang="de-DE" dirty="0"/>
-              <a:t>Einmalige Ausführung wird „Task </a:t>
-            </a:r>
-            <a:r>
-              <a:rPr lang="de-DE" dirty="0" err="1"/>
-              <a:t>job</a:t>
-            </a:r>
-            <a:r>
-              <a:rPr lang="de-DE" dirty="0"/>
-              <a:t>“ genannt </a:t>
+              <a:rPr lang="de-DE" sz="8000" dirty="0"/>
+              <a:t>haben eine Priorität</a:t>
+            </a:r>
+          </a:p>
+          <a:p>
+            <a:r>
+              <a:rPr lang="de-DE" sz="8000" dirty="0"/>
+              <a:t>Die </a:t>
+            </a:r>
+            <a:r>
+              <a:rPr lang="de-DE" sz="8000" dirty="0" err="1"/>
+              <a:t>Idle</a:t>
+            </a:r>
+            <a:r>
+              <a:rPr lang="de-DE" sz="8000" dirty="0"/>
+              <a:t> Task </a:t>
             </a:r>
           </a:p>
           <a:p>
@@ -14563,10 +15750,10 @@
       </p:sp>
       <p:pic>
         <p:nvPicPr>
-          <p:cNvPr id="6" name="Grafik 5">
+          <p:cNvPr id="7" name="Grafik 6">
             <a:extLst>
               <a:ext uri="{FF2B5EF4-FFF2-40B4-BE49-F238E27FC236}">
-                <a16:creationId xmlns:a16="http://schemas.microsoft.com/office/drawing/2014/main" id="{BC87AE50-277B-460C-B301-52F1A5226F10}"/>
+                <a16:creationId xmlns:a16="http://schemas.microsoft.com/office/drawing/2014/main" id="{FE0623CE-4406-41FF-BA93-CF12837C4CE8}"/>
               </a:ext>
             </a:extLst>
           </p:cNvPr>
@@ -14576,7 +15763,7 @@
           <p:nvPr/>
         </p:nvPicPr>
         <p:blipFill>
-          <a:blip r:embed="rId2">
+          <a:blip r:embed="rId3">
             <a:extLst>
               <a:ext uri="{28A0092B-C50C-407E-A947-70E740481C1C}">
                 <a14:useLocalDpi xmlns:a14="http://schemas.microsoft.com/office/drawing/2010/main" val="0"/>
@@ -14589,7 +15776,7 @@
         </p:blipFill>
         <p:spPr>
           <a:xfrm>
-            <a:off x="6794512" y="1754696"/>
+            <a:off x="7057160" y="1823430"/>
             <a:ext cx="3467584" cy="4353533"/>
           </a:xfrm>
           <a:prstGeom prst="rect">
@@ -14607,6 +15794,561 @@
   <p:clrMapOvr>
     <a:masterClrMapping/>
   </p:clrMapOvr>
+  <p:timing>
+    <p:tnLst>
+      <p:par>
+        <p:cTn id="1" dur="indefinite" restart="never" nodeType="tmRoot">
+          <p:childTnLst>
+            <p:seq concurrent="1" nextAc="seek">
+              <p:cTn id="2" dur="indefinite" nodeType="mainSeq">
+                <p:childTnLst>
+                  <p:par>
+                    <p:cTn id="3" fill="hold">
+                      <p:stCondLst>
+                        <p:cond delay="indefinite"/>
+                      </p:stCondLst>
+                      <p:childTnLst>
+                        <p:par>
+                          <p:cTn id="4" fill="hold">
+                            <p:stCondLst>
+                              <p:cond delay="0"/>
+                            </p:stCondLst>
+                            <p:childTnLst>
+                              <p:par>
+                                <p:cTn id="5" presetID="1" presetClass="entr" presetSubtype="0" fill="hold" nodeType="clickEffect">
+                                  <p:stCondLst>
+                                    <p:cond delay="0"/>
+                                  </p:stCondLst>
+                                  <p:childTnLst>
+                                    <p:set>
+                                      <p:cBhvr>
+                                        <p:cTn id="6" dur="1" fill="hold">
+                                          <p:stCondLst>
+                                            <p:cond delay="0"/>
+                                          </p:stCondLst>
+                                        </p:cTn>
+                                        <p:tgtEl>
+                                          <p:spTgt spid="3">
+                                            <p:txEl>
+                                              <p:pRg st="0" end="0"/>
+                                            </p:txEl>
+                                          </p:spTgt>
+                                        </p:tgtEl>
+                                        <p:attrNameLst>
+                                          <p:attrName>style.visibility</p:attrName>
+                                        </p:attrNameLst>
+                                      </p:cBhvr>
+                                      <p:to>
+                                        <p:strVal val="visible"/>
+                                      </p:to>
+                                    </p:set>
+                                  </p:childTnLst>
+                                </p:cTn>
+                              </p:par>
+                            </p:childTnLst>
+                          </p:cTn>
+                        </p:par>
+                      </p:childTnLst>
+                    </p:cTn>
+                  </p:par>
+                  <p:par>
+                    <p:cTn id="7" fill="hold">
+                      <p:stCondLst>
+                        <p:cond delay="indefinite"/>
+                      </p:stCondLst>
+                      <p:childTnLst>
+                        <p:par>
+                          <p:cTn id="8" fill="hold">
+                            <p:stCondLst>
+                              <p:cond delay="0"/>
+                            </p:stCondLst>
+                            <p:childTnLst>
+                              <p:par>
+                                <p:cTn id="9" presetID="1" presetClass="entr" presetSubtype="0" fill="hold" nodeType="clickEffect">
+                                  <p:stCondLst>
+                                    <p:cond delay="0"/>
+                                  </p:stCondLst>
+                                  <p:childTnLst>
+                                    <p:set>
+                                      <p:cBhvr>
+                                        <p:cTn id="10" dur="1" fill="hold">
+                                          <p:stCondLst>
+                                            <p:cond delay="0"/>
+                                          </p:stCondLst>
+                                        </p:cTn>
+                                        <p:tgtEl>
+                                          <p:spTgt spid="3">
+                                            <p:txEl>
+                                              <p:pRg st="1" end="1"/>
+                                            </p:txEl>
+                                          </p:spTgt>
+                                        </p:tgtEl>
+                                        <p:attrNameLst>
+                                          <p:attrName>style.visibility</p:attrName>
+                                        </p:attrNameLst>
+                                      </p:cBhvr>
+                                      <p:to>
+                                        <p:strVal val="visible"/>
+                                      </p:to>
+                                    </p:set>
+                                  </p:childTnLst>
+                                </p:cTn>
+                              </p:par>
+                              <p:par>
+                                <p:cTn id="11" presetID="1" presetClass="entr" presetSubtype="0" fill="hold" nodeType="withEffect">
+                                  <p:stCondLst>
+                                    <p:cond delay="0"/>
+                                  </p:stCondLst>
+                                  <p:childTnLst>
+                                    <p:set>
+                                      <p:cBhvr>
+                                        <p:cTn id="12" dur="1" fill="hold">
+                                          <p:stCondLst>
+                                            <p:cond delay="0"/>
+                                          </p:stCondLst>
+                                        </p:cTn>
+                                        <p:tgtEl>
+                                          <p:spTgt spid="3">
+                                            <p:txEl>
+                                              <p:pRg st="2" end="2"/>
+                                            </p:txEl>
+                                          </p:spTgt>
+                                        </p:tgtEl>
+                                        <p:attrNameLst>
+                                          <p:attrName>style.visibility</p:attrName>
+                                        </p:attrNameLst>
+                                      </p:cBhvr>
+                                      <p:to>
+                                        <p:strVal val="visible"/>
+                                      </p:to>
+                                    </p:set>
+                                  </p:childTnLst>
+                                </p:cTn>
+                              </p:par>
+                            </p:childTnLst>
+                          </p:cTn>
+                        </p:par>
+                      </p:childTnLst>
+                    </p:cTn>
+                  </p:par>
+                  <p:par>
+                    <p:cTn id="13" fill="hold">
+                      <p:stCondLst>
+                        <p:cond delay="indefinite"/>
+                      </p:stCondLst>
+                      <p:childTnLst>
+                        <p:par>
+                          <p:cTn id="14" fill="hold">
+                            <p:stCondLst>
+                              <p:cond delay="0"/>
+                            </p:stCondLst>
+                            <p:childTnLst>
+                              <p:par>
+                                <p:cTn id="15" presetID="1" presetClass="entr" presetSubtype="0" fill="hold" nodeType="clickEffect">
+                                  <p:stCondLst>
+                                    <p:cond delay="0"/>
+                                  </p:stCondLst>
+                                  <p:childTnLst>
+                                    <p:set>
+                                      <p:cBhvr>
+                                        <p:cTn id="16" dur="1" fill="hold">
+                                          <p:stCondLst>
+                                            <p:cond delay="0"/>
+                                          </p:stCondLst>
+                                        </p:cTn>
+                                        <p:tgtEl>
+                                          <p:spTgt spid="3">
+                                            <p:txEl>
+                                              <p:pRg st="3" end="3"/>
+                                            </p:txEl>
+                                          </p:spTgt>
+                                        </p:tgtEl>
+                                        <p:attrNameLst>
+                                          <p:attrName>style.visibility</p:attrName>
+                                        </p:attrNameLst>
+                                      </p:cBhvr>
+                                      <p:to>
+                                        <p:strVal val="visible"/>
+                                      </p:to>
+                                    </p:set>
+                                  </p:childTnLst>
+                                </p:cTn>
+                              </p:par>
+                              <p:par>
+                                <p:cTn id="17" presetID="1" presetClass="entr" presetSubtype="0" fill="hold" nodeType="withEffect">
+                                  <p:stCondLst>
+                                    <p:cond delay="0"/>
+                                  </p:stCondLst>
+                                  <p:childTnLst>
+                                    <p:set>
+                                      <p:cBhvr>
+                                        <p:cTn id="18" dur="1" fill="hold">
+                                          <p:stCondLst>
+                                            <p:cond delay="0"/>
+                                          </p:stCondLst>
+                                        </p:cTn>
+                                        <p:tgtEl>
+                                          <p:spTgt spid="3">
+                                            <p:txEl>
+                                              <p:pRg st="4" end="4"/>
+                                            </p:txEl>
+                                          </p:spTgt>
+                                        </p:tgtEl>
+                                        <p:attrNameLst>
+                                          <p:attrName>style.visibility</p:attrName>
+                                        </p:attrNameLst>
+                                      </p:cBhvr>
+                                      <p:to>
+                                        <p:strVal val="visible"/>
+                                      </p:to>
+                                    </p:set>
+                                  </p:childTnLst>
+                                </p:cTn>
+                              </p:par>
+                              <p:par>
+                                <p:cTn id="19" presetID="1" presetClass="entr" presetSubtype="0" fill="hold" nodeType="withEffect">
+                                  <p:stCondLst>
+                                    <p:cond delay="0"/>
+                                  </p:stCondLst>
+                                  <p:childTnLst>
+                                    <p:set>
+                                      <p:cBhvr>
+                                        <p:cTn id="20" dur="1" fill="hold">
+                                          <p:stCondLst>
+                                            <p:cond delay="0"/>
+                                          </p:stCondLst>
+                                        </p:cTn>
+                                        <p:tgtEl>
+                                          <p:spTgt spid="3">
+                                            <p:txEl>
+                                              <p:pRg st="5" end="5"/>
+                                            </p:txEl>
+                                          </p:spTgt>
+                                        </p:tgtEl>
+                                        <p:attrNameLst>
+                                          <p:attrName>style.visibility</p:attrName>
+                                        </p:attrNameLst>
+                                      </p:cBhvr>
+                                      <p:to>
+                                        <p:strVal val="visible"/>
+                                      </p:to>
+                                    </p:set>
+                                  </p:childTnLst>
+                                </p:cTn>
+                              </p:par>
+                              <p:par>
+                                <p:cTn id="21" presetID="1" presetClass="entr" presetSubtype="0" fill="hold" nodeType="withEffect">
+                                  <p:stCondLst>
+                                    <p:cond delay="0"/>
+                                  </p:stCondLst>
+                                  <p:childTnLst>
+                                    <p:set>
+                                      <p:cBhvr>
+                                        <p:cTn id="22" dur="1" fill="hold">
+                                          <p:stCondLst>
+                                            <p:cond delay="0"/>
+                                          </p:stCondLst>
+                                        </p:cTn>
+                                        <p:tgtEl>
+                                          <p:spTgt spid="3">
+                                            <p:txEl>
+                                              <p:pRg st="6" end="6"/>
+                                            </p:txEl>
+                                          </p:spTgt>
+                                        </p:tgtEl>
+                                        <p:attrNameLst>
+                                          <p:attrName>style.visibility</p:attrName>
+                                        </p:attrNameLst>
+                                      </p:cBhvr>
+                                      <p:to>
+                                        <p:strVal val="visible"/>
+                                      </p:to>
+                                    </p:set>
+                                  </p:childTnLst>
+                                </p:cTn>
+                              </p:par>
+                            </p:childTnLst>
+                          </p:cTn>
+                        </p:par>
+                      </p:childTnLst>
+                    </p:cTn>
+                  </p:par>
+                  <p:par>
+                    <p:cTn id="23" fill="hold">
+                      <p:stCondLst>
+                        <p:cond delay="indefinite"/>
+                      </p:stCondLst>
+                      <p:childTnLst>
+                        <p:par>
+                          <p:cTn id="24" fill="hold">
+                            <p:stCondLst>
+                              <p:cond delay="0"/>
+                            </p:stCondLst>
+                            <p:childTnLst>
+                              <p:par>
+                                <p:cTn id="25" presetID="1" presetClass="entr" presetSubtype="0" fill="hold" nodeType="clickEffect">
+                                  <p:stCondLst>
+                                    <p:cond delay="0"/>
+                                  </p:stCondLst>
+                                  <p:childTnLst>
+                                    <p:set>
+                                      <p:cBhvr>
+                                        <p:cTn id="26" dur="1" fill="hold">
+                                          <p:stCondLst>
+                                            <p:cond delay="0"/>
+                                          </p:stCondLst>
+                                        </p:cTn>
+                                        <p:tgtEl>
+                                          <p:spTgt spid="3">
+                                            <p:txEl>
+                                              <p:pRg st="7" end="7"/>
+                                            </p:txEl>
+                                          </p:spTgt>
+                                        </p:tgtEl>
+                                        <p:attrNameLst>
+                                          <p:attrName>style.visibility</p:attrName>
+                                        </p:attrNameLst>
+                                      </p:cBhvr>
+                                      <p:to>
+                                        <p:strVal val="visible"/>
+                                      </p:to>
+                                    </p:set>
+                                  </p:childTnLst>
+                                </p:cTn>
+                              </p:par>
+                              <p:par>
+                                <p:cTn id="27" presetID="1" presetClass="entr" presetSubtype="0" fill="hold" nodeType="withEffect">
+                                  <p:stCondLst>
+                                    <p:cond delay="0"/>
+                                  </p:stCondLst>
+                                  <p:childTnLst>
+                                    <p:set>
+                                      <p:cBhvr>
+                                        <p:cTn id="28" dur="1" fill="hold">
+                                          <p:stCondLst>
+                                            <p:cond delay="0"/>
+                                          </p:stCondLst>
+                                        </p:cTn>
+                                        <p:tgtEl>
+                                          <p:spTgt spid="3">
+                                            <p:txEl>
+                                              <p:pRg st="8" end="8"/>
+                                            </p:txEl>
+                                          </p:spTgt>
+                                        </p:tgtEl>
+                                        <p:attrNameLst>
+                                          <p:attrName>style.visibility</p:attrName>
+                                        </p:attrNameLst>
+                                      </p:cBhvr>
+                                      <p:to>
+                                        <p:strVal val="visible"/>
+                                      </p:to>
+                                    </p:set>
+                                  </p:childTnLst>
+                                </p:cTn>
+                              </p:par>
+                              <p:par>
+                                <p:cTn id="29" presetID="1" presetClass="entr" presetSubtype="0" fill="hold" nodeType="withEffect">
+                                  <p:stCondLst>
+                                    <p:cond delay="0"/>
+                                  </p:stCondLst>
+                                  <p:childTnLst>
+                                    <p:set>
+                                      <p:cBhvr>
+                                        <p:cTn id="30" dur="1" fill="hold">
+                                          <p:stCondLst>
+                                            <p:cond delay="0"/>
+                                          </p:stCondLst>
+                                        </p:cTn>
+                                        <p:tgtEl>
+                                          <p:spTgt spid="3">
+                                            <p:txEl>
+                                              <p:pRg st="9" end="9"/>
+                                            </p:txEl>
+                                          </p:spTgt>
+                                        </p:tgtEl>
+                                        <p:attrNameLst>
+                                          <p:attrName>style.visibility</p:attrName>
+                                        </p:attrNameLst>
+                                      </p:cBhvr>
+                                      <p:to>
+                                        <p:strVal val="visible"/>
+                                      </p:to>
+                                    </p:set>
+                                  </p:childTnLst>
+                                </p:cTn>
+                              </p:par>
+                            </p:childTnLst>
+                          </p:cTn>
+                        </p:par>
+                      </p:childTnLst>
+                    </p:cTn>
+                  </p:par>
+                  <p:par>
+                    <p:cTn id="31" fill="hold">
+                      <p:stCondLst>
+                        <p:cond delay="indefinite"/>
+                      </p:stCondLst>
+                      <p:childTnLst>
+                        <p:par>
+                          <p:cTn id="32" fill="hold">
+                            <p:stCondLst>
+                              <p:cond delay="0"/>
+                            </p:stCondLst>
+                            <p:childTnLst>
+                              <p:par>
+                                <p:cTn id="33" presetID="1" presetClass="entr" presetSubtype="0" fill="hold" nodeType="clickEffect">
+                                  <p:stCondLst>
+                                    <p:cond delay="0"/>
+                                  </p:stCondLst>
+                                  <p:childTnLst>
+                                    <p:set>
+                                      <p:cBhvr>
+                                        <p:cTn id="34" dur="1" fill="hold">
+                                          <p:stCondLst>
+                                            <p:cond delay="0"/>
+                                          </p:stCondLst>
+                                        </p:cTn>
+                                        <p:tgtEl>
+                                          <p:spTgt spid="3">
+                                            <p:txEl>
+                                              <p:pRg st="10" end="10"/>
+                                            </p:txEl>
+                                          </p:spTgt>
+                                        </p:tgtEl>
+                                        <p:attrNameLst>
+                                          <p:attrName>style.visibility</p:attrName>
+                                        </p:attrNameLst>
+                                      </p:cBhvr>
+                                      <p:to>
+                                        <p:strVal val="visible"/>
+                                      </p:to>
+                                    </p:set>
+                                  </p:childTnLst>
+                                </p:cTn>
+                              </p:par>
+                            </p:childTnLst>
+                          </p:cTn>
+                        </p:par>
+                      </p:childTnLst>
+                    </p:cTn>
+                  </p:par>
+                  <p:par>
+                    <p:cTn id="35" fill="hold">
+                      <p:stCondLst>
+                        <p:cond delay="indefinite"/>
+                      </p:stCondLst>
+                      <p:childTnLst>
+                        <p:par>
+                          <p:cTn id="36" fill="hold">
+                            <p:stCondLst>
+                              <p:cond delay="0"/>
+                            </p:stCondLst>
+                            <p:childTnLst>
+                              <p:par>
+                                <p:cTn id="37" presetID="1" presetClass="entr" presetSubtype="0" fill="hold" nodeType="clickEffect">
+                                  <p:stCondLst>
+                                    <p:cond delay="0"/>
+                                  </p:stCondLst>
+                                  <p:childTnLst>
+                                    <p:set>
+                                      <p:cBhvr>
+                                        <p:cTn id="38" dur="1" fill="hold">
+                                          <p:stCondLst>
+                                            <p:cond delay="0"/>
+                                          </p:stCondLst>
+                                        </p:cTn>
+                                        <p:tgtEl>
+                                          <p:spTgt spid="3">
+                                            <p:txEl>
+                                              <p:pRg st="11" end="11"/>
+                                            </p:txEl>
+                                          </p:spTgt>
+                                        </p:tgtEl>
+                                        <p:attrNameLst>
+                                          <p:attrName>style.visibility</p:attrName>
+                                        </p:attrNameLst>
+                                      </p:cBhvr>
+                                      <p:to>
+                                        <p:strVal val="visible"/>
+                                      </p:to>
+                                    </p:set>
+                                  </p:childTnLst>
+                                </p:cTn>
+                              </p:par>
+                            </p:childTnLst>
+                          </p:cTn>
+                        </p:par>
+                      </p:childTnLst>
+                    </p:cTn>
+                  </p:par>
+                  <p:par>
+                    <p:cTn id="39" fill="hold">
+                      <p:stCondLst>
+                        <p:cond delay="indefinite"/>
+                      </p:stCondLst>
+                      <p:childTnLst>
+                        <p:par>
+                          <p:cTn id="40" fill="hold">
+                            <p:stCondLst>
+                              <p:cond delay="0"/>
+                            </p:stCondLst>
+                            <p:childTnLst>
+                              <p:par>
+                                <p:cTn id="41" presetID="1" presetClass="entr" presetSubtype="0" fill="hold" nodeType="clickEffect">
+                                  <p:stCondLst>
+                                    <p:cond delay="0"/>
+                                  </p:stCondLst>
+                                  <p:childTnLst>
+                                    <p:set>
+                                      <p:cBhvr>
+                                        <p:cTn id="42" dur="1" fill="hold">
+                                          <p:stCondLst>
+                                            <p:cond delay="0"/>
+                                          </p:stCondLst>
+                                        </p:cTn>
+                                        <p:tgtEl>
+                                          <p:spTgt spid="7"/>
+                                        </p:tgtEl>
+                                        <p:attrNameLst>
+                                          <p:attrName>style.visibility</p:attrName>
+                                        </p:attrNameLst>
+                                      </p:cBhvr>
+                                      <p:to>
+                                        <p:strVal val="visible"/>
+                                      </p:to>
+                                    </p:set>
+                                  </p:childTnLst>
+                                </p:cTn>
+                              </p:par>
+                            </p:childTnLst>
+                          </p:cTn>
+                        </p:par>
+                      </p:childTnLst>
+                    </p:cTn>
+                  </p:par>
+                </p:childTnLst>
+              </p:cTn>
+              <p:prevCondLst>
+                <p:cond evt="onPrev" delay="0">
+                  <p:tgtEl>
+                    <p:sldTgt/>
+                  </p:tgtEl>
+                </p:cond>
+              </p:prevCondLst>
+              <p:nextCondLst>
+                <p:cond evt="onNext" delay="0">
+                  <p:tgtEl>
+                    <p:sldTgt/>
+                  </p:tgtEl>
+                </p:cond>
+              </p:nextCondLst>
+            </p:seq>
+          </p:childTnLst>
+        </p:cTn>
+      </p:par>
+    </p:tnLst>
+  </p:timing>
 </p:sld>
 </file>
 
@@ -14632,7 +16374,7 @@
           <p:cNvPr id="2" name="Titel 1">
             <a:extLst>
               <a:ext uri="{FF2B5EF4-FFF2-40B4-BE49-F238E27FC236}">
-                <a16:creationId xmlns:a16="http://schemas.microsoft.com/office/drawing/2014/main" id="{221CF949-CF1B-490E-893D-2B8A7798265D}"/>
+                <a16:creationId xmlns:a16="http://schemas.microsoft.com/office/drawing/2014/main" id="{FE3C0AE2-86CB-4560-BAE0-3C6E74F44C68}"/>
               </a:ext>
             </a:extLst>
           </p:cNvPr>
@@ -14650,33 +16392,8 @@
           <a:p>
             <a:r>
               <a:rPr lang="de-DE" dirty="0"/>
-              <a:t>Scheduling</a:t>
-            </a:r>
-          </a:p>
-        </p:txBody>
-      </p:sp>
-      <p:sp>
-        <p:nvSpPr>
-          <p:cNvPr id="3" name="Inhaltsplatzhalter 2">
-            <a:extLst>
-              <a:ext uri="{FF2B5EF4-FFF2-40B4-BE49-F238E27FC236}">
-                <a16:creationId xmlns:a16="http://schemas.microsoft.com/office/drawing/2014/main" id="{932B521A-1D5A-4820-8FB2-654536C7E2D7}"/>
-              </a:ext>
-            </a:extLst>
-          </p:cNvPr>
-          <p:cNvSpPr>
-            <a:spLocks noGrp="1"/>
-          </p:cNvSpPr>
-          <p:nvPr>
-            <p:ph idx="1"/>
-          </p:nvPr>
-        </p:nvSpPr>
-        <p:spPr/>
-        <p:txBody>
-          <a:bodyPr/>
-          <a:lstStyle/>
-          <a:p>
-            <a:endParaRPr lang="de-DE" dirty="0"/>
+              <a:t>Task</a:t>
+            </a:r>
           </a:p>
         </p:txBody>
       </p:sp>
@@ -14685,7 +16402,7 @@
           <p:cNvPr id="4" name="Fußzeilenplatzhalter 3">
             <a:extLst>
               <a:ext uri="{FF2B5EF4-FFF2-40B4-BE49-F238E27FC236}">
-                <a16:creationId xmlns:a16="http://schemas.microsoft.com/office/drawing/2014/main" id="{6B53F700-6CB7-4CB8-AD2C-F7C794AFF551}"/>
+                <a16:creationId xmlns:a16="http://schemas.microsoft.com/office/drawing/2014/main" id="{80667F35-857F-4032-9459-725107F3825F}"/>
               </a:ext>
             </a:extLst>
           </p:cNvPr>
@@ -14701,17 +16418,749 @@
           <a:bodyPr/>
           <a:lstStyle/>
           <a:p>
-            <a:r>
-              <a:rPr lang="de-DE" dirty="0"/>
-              <a:t>Scheduling</a:t>
-            </a:r>
+            <a:endParaRPr lang="de-DE"/>
+          </a:p>
+        </p:txBody>
+      </p:sp>
+      <p:sp>
+        <p:nvSpPr>
+          <p:cNvPr id="5" name="Textfeld 4">
+            <a:extLst>
+              <a:ext uri="{FF2B5EF4-FFF2-40B4-BE49-F238E27FC236}">
+                <a16:creationId xmlns:a16="http://schemas.microsoft.com/office/drawing/2014/main" id="{5A1B8FA5-8FBE-41AE-862A-C9E60E51426B}"/>
+              </a:ext>
+            </a:extLst>
+          </p:cNvPr>
+          <p:cNvSpPr txBox="1"/>
+          <p:nvPr/>
+        </p:nvSpPr>
+        <p:spPr>
+          <a:xfrm>
+            <a:off x="1836576" y="5316769"/>
+            <a:ext cx="3614928" cy="3328416"/>
+          </a:xfrm>
+          <a:prstGeom prst="rect">
+            <a:avLst/>
+          </a:prstGeom>
+          <a:noFill/>
+        </p:spPr>
+        <p:txBody>
+          <a:bodyPr wrap="square" rtlCol="0">
+            <a:spAutoFit/>
+          </a:bodyPr>
+          <a:lstStyle/>
+          <a:p>
+            <a:endParaRPr lang="de-DE" dirty="0"/>
+          </a:p>
+        </p:txBody>
+      </p:sp>
+      <p:sp>
+        <p:nvSpPr>
+          <p:cNvPr id="7" name="Rectangle 2">
+            <a:extLst>
+              <a:ext uri="{FF2B5EF4-FFF2-40B4-BE49-F238E27FC236}">
+                <a16:creationId xmlns:a16="http://schemas.microsoft.com/office/drawing/2014/main" id="{2C9205B6-708C-4E75-B9B3-A967B23423A1}"/>
+              </a:ext>
+            </a:extLst>
+          </p:cNvPr>
+          <p:cNvSpPr>
+            <a:spLocks noChangeArrowheads="1"/>
+          </p:cNvSpPr>
+          <p:nvPr/>
+        </p:nvSpPr>
+        <p:spPr bwMode="auto">
+          <a:xfrm>
+            <a:off x="831379" y="5036214"/>
+            <a:ext cx="9921965" cy="369332"/>
+          </a:xfrm>
+          <a:prstGeom prst="rect">
+            <a:avLst/>
+          </a:prstGeom>
+          <a:solidFill>
+            <a:schemeClr val="accent1">
+              <a:lumMod val="40000"/>
+              <a:lumOff val="60000"/>
+            </a:schemeClr>
+          </a:solidFill>
+          <a:ln>
+            <a:noFill/>
+          </a:ln>
+          <a:effectLst/>
+        </p:spPr>
+        <p:txBody>
+          <a:bodyPr vert="horz" wrap="square" lIns="91440" tIns="45720" rIns="91440" bIns="45720" numCol="1" anchor="ctr" anchorCtr="0" compatLnSpc="1">
+            <a:prstTxWarp prst="textNoShape">
+              <a:avLst/>
+            </a:prstTxWarp>
+            <a:spAutoFit/>
+          </a:bodyPr>
+          <a:lstStyle/>
+          <a:p>
+            <a:pPr marL="0" marR="0" lvl="0" indent="0" algn="l" defTabSz="914400" rtl="0" eaLnBrk="0" fontAlgn="base" latinLnBrk="0" hangingPunct="0">
+              <a:lnSpc>
+                <a:spcPct val="100000"/>
+              </a:lnSpc>
+              <a:spcBef>
+                <a:spcPct val="0"/>
+              </a:spcBef>
+              <a:spcAft>
+                <a:spcPct val="0"/>
+              </a:spcAft>
+              <a:buClrTx/>
+              <a:buSzTx/>
+              <a:buFontTx/>
+              <a:buNone/>
+              <a:tabLst/>
+            </a:pPr>
+            <a:r>
+              <a:rPr kumimoji="0" lang="de-DE" altLang="de-DE" b="1" i="0" u="none" strike="noStrike" cap="none" normalizeH="0" baseline="0" dirty="0" err="1">
+                <a:ln>
+                  <a:noFill/>
+                </a:ln>
+                <a:solidFill>
+                  <a:srgbClr val="202020"/>
+                </a:solidFill>
+                <a:effectLst/>
+                <a:latin typeface="Arial Unicode MS" panose="020B0604020202020204" pitchFamily="34" charset="-128"/>
+                <a:ea typeface="Arial Unicode MS" panose="020B0604020202020204" pitchFamily="34" charset="-128"/>
+                <a:cs typeface="Arial Unicode MS" panose="020B0604020202020204" pitchFamily="34" charset="-128"/>
+              </a:rPr>
+              <a:t>xTaskCreate</a:t>
+            </a:r>
+            <a:r>
+              <a:rPr kumimoji="0" lang="de-DE" altLang="de-DE" b="1" i="0" u="none" strike="noStrike" cap="none" normalizeH="0" baseline="0" dirty="0">
+                <a:ln>
+                  <a:noFill/>
+                </a:ln>
+                <a:solidFill>
+                  <a:srgbClr val="202020"/>
+                </a:solidFill>
+                <a:effectLst/>
+                <a:latin typeface="Arial Unicode MS" panose="020B0604020202020204" pitchFamily="34" charset="-128"/>
+                <a:ea typeface="Arial Unicode MS" panose="020B0604020202020204" pitchFamily="34" charset="-128"/>
+                <a:cs typeface="Arial Unicode MS" panose="020B0604020202020204" pitchFamily="34" charset="-128"/>
+              </a:rPr>
+              <a:t>( </a:t>
+            </a:r>
+            <a:r>
+              <a:rPr kumimoji="0" lang="de-DE" altLang="de-DE" b="1" i="0" u="none" strike="noStrike" cap="none" normalizeH="0" baseline="0" dirty="0" err="1">
+                <a:ln>
+                  <a:noFill/>
+                </a:ln>
+                <a:solidFill>
+                  <a:srgbClr val="202020"/>
+                </a:solidFill>
+                <a:effectLst/>
+                <a:latin typeface="Arial Unicode MS" panose="020B0604020202020204" pitchFamily="34" charset="-128"/>
+                <a:ea typeface="Arial Unicode MS" panose="020B0604020202020204" pitchFamily="34" charset="-128"/>
+                <a:cs typeface="Arial Unicode MS" panose="020B0604020202020204" pitchFamily="34" charset="-128"/>
+              </a:rPr>
+              <a:t>vTaskCode</a:t>
+            </a:r>
+            <a:r>
+              <a:rPr kumimoji="0" lang="de-DE" altLang="de-DE" b="1" i="0" u="none" strike="noStrike" cap="none" normalizeH="0" baseline="0" dirty="0">
+                <a:ln>
+                  <a:noFill/>
+                </a:ln>
+                <a:solidFill>
+                  <a:srgbClr val="202020"/>
+                </a:solidFill>
+                <a:effectLst/>
+                <a:latin typeface="Arial Unicode MS" panose="020B0604020202020204" pitchFamily="34" charset="-128"/>
+                <a:ea typeface="Arial Unicode MS" panose="020B0604020202020204" pitchFamily="34" charset="-128"/>
+                <a:cs typeface="Arial Unicode MS" panose="020B0604020202020204" pitchFamily="34" charset="-128"/>
+              </a:rPr>
+              <a:t>,</a:t>
+            </a:r>
+            <a:r>
+              <a:rPr lang="de-DE" altLang="de-DE" b="1" dirty="0">
+                <a:solidFill>
+                  <a:srgbClr val="202020"/>
+                </a:solidFill>
+                <a:latin typeface="Arial Unicode MS" panose="020B0604020202020204" pitchFamily="34" charset="-128"/>
+                <a:ea typeface="Arial Unicode MS" panose="020B0604020202020204" pitchFamily="34" charset="-128"/>
+                <a:cs typeface="Arial Unicode MS" panose="020B0604020202020204" pitchFamily="34" charset="-128"/>
+              </a:rPr>
+              <a:t> </a:t>
+            </a:r>
+            <a:r>
+              <a:rPr kumimoji="0" lang="de-DE" altLang="de-DE" b="1" i="0" u="none" strike="noStrike" cap="none" normalizeH="0" baseline="0" dirty="0">
+                <a:ln>
+                  <a:noFill/>
+                </a:ln>
+                <a:solidFill>
+                  <a:srgbClr val="202020"/>
+                </a:solidFill>
+                <a:effectLst/>
+                <a:latin typeface="Arial Unicode MS" panose="020B0604020202020204" pitchFamily="34" charset="-128"/>
+                <a:ea typeface="Arial Unicode MS" panose="020B0604020202020204" pitchFamily="34" charset="-128"/>
+                <a:cs typeface="Arial Unicode MS" panose="020B0604020202020204" pitchFamily="34" charset="-128"/>
+              </a:rPr>
+              <a:t>"NAME, STACK_SIZE, ( </a:t>
+            </a:r>
+            <a:r>
+              <a:rPr kumimoji="0" lang="de-DE" altLang="de-DE" b="1" i="0" u="none" strike="noStrike" cap="none" normalizeH="0" baseline="0" dirty="0" err="1">
+                <a:ln>
+                  <a:noFill/>
+                </a:ln>
+                <a:solidFill>
+                  <a:srgbClr val="202020"/>
+                </a:solidFill>
+                <a:effectLst/>
+                <a:latin typeface="Arial Unicode MS" panose="020B0604020202020204" pitchFamily="34" charset="-128"/>
+                <a:ea typeface="Arial Unicode MS" panose="020B0604020202020204" pitchFamily="34" charset="-128"/>
+                <a:cs typeface="Arial Unicode MS" panose="020B0604020202020204" pitchFamily="34" charset="-128"/>
+              </a:rPr>
+              <a:t>void</a:t>
+            </a:r>
+            <a:r>
+              <a:rPr kumimoji="0" lang="de-DE" altLang="de-DE" b="1" i="0" u="none" strike="noStrike" cap="none" normalizeH="0" baseline="0" dirty="0">
+                <a:ln>
+                  <a:noFill/>
+                </a:ln>
+                <a:solidFill>
+                  <a:srgbClr val="202020"/>
+                </a:solidFill>
+                <a:effectLst/>
+                <a:latin typeface="Arial Unicode MS" panose="020B0604020202020204" pitchFamily="34" charset="-128"/>
+                <a:ea typeface="Arial Unicode MS" panose="020B0604020202020204" pitchFamily="34" charset="-128"/>
+                <a:cs typeface="Arial Unicode MS" panose="020B0604020202020204" pitchFamily="34" charset="-128"/>
+              </a:rPr>
+              <a:t> * ) 1,  </a:t>
+            </a:r>
+            <a:r>
+              <a:rPr kumimoji="0" lang="de-DE" altLang="de-DE" b="1" i="0" u="none" strike="noStrike" cap="none" normalizeH="0" baseline="0" dirty="0" err="1">
+                <a:ln>
+                  <a:noFill/>
+                </a:ln>
+                <a:solidFill>
+                  <a:srgbClr val="202020"/>
+                </a:solidFill>
+                <a:effectLst/>
+                <a:latin typeface="Arial Unicode MS" panose="020B0604020202020204" pitchFamily="34" charset="-128"/>
+                <a:ea typeface="Arial Unicode MS" panose="020B0604020202020204" pitchFamily="34" charset="-128"/>
+                <a:cs typeface="Arial Unicode MS" panose="020B0604020202020204" pitchFamily="34" charset="-128"/>
+              </a:rPr>
+              <a:t>tskIDLE_PRIORITY</a:t>
+            </a:r>
+            <a:r>
+              <a:rPr kumimoji="0" lang="de-DE" altLang="de-DE" b="1" i="0" u="none" strike="noStrike" cap="none" normalizeH="0" baseline="0" dirty="0">
+                <a:ln>
+                  <a:noFill/>
+                </a:ln>
+                <a:solidFill>
+                  <a:srgbClr val="202020"/>
+                </a:solidFill>
+                <a:effectLst/>
+                <a:latin typeface="Arial Unicode MS" panose="020B0604020202020204" pitchFamily="34" charset="-128"/>
+                <a:ea typeface="Arial Unicode MS" panose="020B0604020202020204" pitchFamily="34" charset="-128"/>
+                <a:cs typeface="Arial Unicode MS" panose="020B0604020202020204" pitchFamily="34" charset="-128"/>
+              </a:rPr>
+              <a:t>,</a:t>
+            </a:r>
+            <a:r>
+              <a:rPr kumimoji="0" lang="de-DE" altLang="de-DE" b="1" i="0" u="none" strike="noStrike" cap="none" normalizeH="0" baseline="0" dirty="0">
+                <a:ln>
+                  <a:noFill/>
+                </a:ln>
+                <a:solidFill>
+                  <a:srgbClr val="008000"/>
+                </a:solidFill>
+                <a:effectLst/>
+                <a:latin typeface="Arial Unicode MS" panose="020B0604020202020204" pitchFamily="34" charset="-128"/>
+                <a:ea typeface="Arial Unicode MS" panose="020B0604020202020204" pitchFamily="34" charset="-128"/>
+                <a:cs typeface="Arial Unicode MS" panose="020B0604020202020204" pitchFamily="34" charset="-128"/>
+              </a:rPr>
+              <a:t> </a:t>
+            </a:r>
+            <a:r>
+              <a:rPr kumimoji="0" lang="de-DE" altLang="de-DE" b="1" i="0" u="none" strike="noStrike" cap="none" normalizeH="0" baseline="0" dirty="0">
+                <a:ln>
+                  <a:noFill/>
+                </a:ln>
+                <a:solidFill>
+                  <a:srgbClr val="202020"/>
+                </a:solidFill>
+                <a:effectLst/>
+                <a:latin typeface="Arial Unicode MS" panose="020B0604020202020204" pitchFamily="34" charset="-128"/>
+                <a:ea typeface="Arial Unicode MS" panose="020B0604020202020204" pitchFamily="34" charset="-128"/>
+                <a:cs typeface="Arial Unicode MS" panose="020B0604020202020204" pitchFamily="34" charset="-128"/>
+              </a:rPr>
+              <a:t>&amp;</a:t>
+            </a:r>
+            <a:r>
+              <a:rPr kumimoji="0" lang="de-DE" altLang="de-DE" b="1" i="0" u="none" strike="noStrike" cap="none" normalizeH="0" baseline="0" dirty="0" err="1">
+                <a:ln>
+                  <a:noFill/>
+                </a:ln>
+                <a:solidFill>
+                  <a:srgbClr val="202020"/>
+                </a:solidFill>
+                <a:effectLst/>
+                <a:latin typeface="Arial Unicode MS" panose="020B0604020202020204" pitchFamily="34" charset="-128"/>
+                <a:ea typeface="Arial Unicode MS" panose="020B0604020202020204" pitchFamily="34" charset="-128"/>
+                <a:cs typeface="Arial Unicode MS" panose="020B0604020202020204" pitchFamily="34" charset="-128"/>
+              </a:rPr>
+              <a:t>xHandle</a:t>
+            </a:r>
+            <a:r>
+              <a:rPr kumimoji="0" lang="de-DE" altLang="de-DE" b="1" i="0" u="none" strike="noStrike" cap="none" normalizeH="0" baseline="0" dirty="0">
+                <a:ln>
+                  <a:noFill/>
+                </a:ln>
+                <a:solidFill>
+                  <a:srgbClr val="202020"/>
+                </a:solidFill>
+                <a:effectLst/>
+                <a:latin typeface="Arial Unicode MS" panose="020B0604020202020204" pitchFamily="34" charset="-128"/>
+                <a:ea typeface="Arial Unicode MS" panose="020B0604020202020204" pitchFamily="34" charset="-128"/>
+                <a:cs typeface="Arial Unicode MS" panose="020B0604020202020204" pitchFamily="34" charset="-128"/>
+              </a:rPr>
+              <a:t> );</a:t>
+            </a:r>
+            <a:endParaRPr kumimoji="0" lang="de-DE" altLang="de-DE" sz="1800" b="0" i="0" u="none" strike="noStrike" cap="none" normalizeH="0" baseline="0" dirty="0">
+              <a:ln>
+                <a:noFill/>
+              </a:ln>
+              <a:solidFill>
+                <a:schemeClr val="tx1"/>
+              </a:solidFill>
+              <a:effectLst/>
+              <a:latin typeface="Arial Unicode MS" panose="020B0604020202020204" pitchFamily="34" charset="-128"/>
+              <a:ea typeface="Arial Unicode MS" panose="020B0604020202020204" pitchFamily="34" charset="-128"/>
+              <a:cs typeface="Arial Unicode MS" panose="020B0604020202020204" pitchFamily="34" charset="-128"/>
+            </a:endParaRPr>
+          </a:p>
+        </p:txBody>
+      </p:sp>
+      <p:sp>
+        <p:nvSpPr>
+          <p:cNvPr id="10" name="Rectangle 4">
+            <a:extLst>
+              <a:ext uri="{FF2B5EF4-FFF2-40B4-BE49-F238E27FC236}">
+                <a16:creationId xmlns:a16="http://schemas.microsoft.com/office/drawing/2014/main" id="{DAFA3FE8-BCD0-4E86-BD4B-08700FE7B0E8}"/>
+              </a:ext>
+            </a:extLst>
+          </p:cNvPr>
+          <p:cNvSpPr>
+            <a:spLocks noChangeArrowheads="1"/>
+          </p:cNvSpPr>
+          <p:nvPr/>
+        </p:nvSpPr>
+        <p:spPr bwMode="auto">
+          <a:xfrm>
+            <a:off x="831379" y="2103112"/>
+            <a:ext cx="5729454" cy="2308324"/>
+          </a:xfrm>
+          <a:prstGeom prst="rect">
+            <a:avLst/>
+          </a:prstGeom>
+          <a:solidFill>
+            <a:schemeClr val="accent1">
+              <a:lumMod val="40000"/>
+              <a:lumOff val="60000"/>
+            </a:schemeClr>
+          </a:solidFill>
+          <a:ln>
+            <a:noFill/>
+          </a:ln>
+          <a:effectLst/>
+        </p:spPr>
+        <p:txBody>
+          <a:bodyPr vert="horz" wrap="none" lIns="91440" tIns="45720" rIns="91440" bIns="45720" numCol="1" anchor="ctr" anchorCtr="0" compatLnSpc="1">
+            <a:prstTxWarp prst="textNoShape">
+              <a:avLst/>
+            </a:prstTxWarp>
+            <a:spAutoFit/>
+          </a:bodyPr>
+          <a:lstStyle/>
+          <a:p>
+            <a:pPr marL="0" marR="0" lvl="0" indent="0" algn="l" defTabSz="914400" rtl="0" eaLnBrk="0" fontAlgn="base" latinLnBrk="0" hangingPunct="0">
+              <a:lnSpc>
+                <a:spcPct val="100000"/>
+              </a:lnSpc>
+              <a:spcBef>
+                <a:spcPct val="0"/>
+              </a:spcBef>
+              <a:spcAft>
+                <a:spcPct val="0"/>
+              </a:spcAft>
+              <a:buClrTx/>
+              <a:buSzTx/>
+              <a:buFontTx/>
+              <a:buNone/>
+              <a:tabLst/>
+            </a:pPr>
+            <a:r>
+              <a:rPr kumimoji="0" lang="de-DE" altLang="de-DE" sz="2400" b="1" i="0" u="none" strike="noStrike" cap="none" normalizeH="0" baseline="0" dirty="0" err="1">
+                <a:ln>
+                  <a:noFill/>
+                </a:ln>
+                <a:solidFill>
+                  <a:srgbClr val="202020"/>
+                </a:solidFill>
+                <a:effectLst/>
+                <a:latin typeface="Arial Unicode MS" panose="020B0604020202020204" pitchFamily="34" charset="-128"/>
+              </a:rPr>
+              <a:t>void</a:t>
+            </a:r>
+            <a:r>
+              <a:rPr kumimoji="0" lang="de-DE" altLang="de-DE" sz="2400" b="1" i="0" u="none" strike="noStrike" cap="none" normalizeH="0" baseline="0" dirty="0">
+                <a:ln>
+                  <a:noFill/>
+                </a:ln>
+                <a:solidFill>
+                  <a:srgbClr val="202020"/>
+                </a:solidFill>
+                <a:effectLst/>
+                <a:latin typeface="Arial Unicode MS" panose="020B0604020202020204" pitchFamily="34" charset="-128"/>
+              </a:rPr>
+              <a:t> </a:t>
+            </a:r>
+            <a:r>
+              <a:rPr kumimoji="0" lang="de-DE" altLang="de-DE" sz="2400" b="1" i="0" u="none" strike="noStrike" cap="none" normalizeH="0" baseline="0" dirty="0" err="1">
+                <a:ln>
+                  <a:noFill/>
+                </a:ln>
+                <a:solidFill>
+                  <a:srgbClr val="202020"/>
+                </a:solidFill>
+                <a:effectLst/>
+                <a:latin typeface="Arial Unicode MS" panose="020B0604020202020204" pitchFamily="34" charset="-128"/>
+              </a:rPr>
+              <a:t>vTaskCode</a:t>
+            </a:r>
+            <a:r>
+              <a:rPr kumimoji="0" lang="de-DE" altLang="de-DE" sz="2400" b="1" i="0" u="none" strike="noStrike" cap="none" normalizeH="0" baseline="0" dirty="0">
+                <a:ln>
+                  <a:noFill/>
+                </a:ln>
+                <a:solidFill>
+                  <a:srgbClr val="202020"/>
+                </a:solidFill>
+                <a:effectLst/>
+                <a:latin typeface="Arial Unicode MS" panose="020B0604020202020204" pitchFamily="34" charset="-128"/>
+              </a:rPr>
+              <a:t>( </a:t>
+            </a:r>
+            <a:r>
+              <a:rPr kumimoji="0" lang="de-DE" altLang="de-DE" sz="2400" b="1" i="0" u="none" strike="noStrike" cap="none" normalizeH="0" baseline="0" dirty="0" err="1">
+                <a:ln>
+                  <a:noFill/>
+                </a:ln>
+                <a:solidFill>
+                  <a:srgbClr val="202020"/>
+                </a:solidFill>
+                <a:effectLst/>
+                <a:latin typeface="Arial Unicode MS" panose="020B0604020202020204" pitchFamily="34" charset="-128"/>
+              </a:rPr>
+              <a:t>void</a:t>
+            </a:r>
+            <a:r>
+              <a:rPr kumimoji="0" lang="de-DE" altLang="de-DE" sz="2400" b="1" i="0" u="none" strike="noStrike" cap="none" normalizeH="0" baseline="0" dirty="0">
+                <a:ln>
+                  <a:noFill/>
+                </a:ln>
+                <a:solidFill>
+                  <a:srgbClr val="202020"/>
+                </a:solidFill>
+                <a:effectLst/>
+                <a:latin typeface="Arial Unicode MS" panose="020B0604020202020204" pitchFamily="34" charset="-128"/>
+              </a:rPr>
+              <a:t> * </a:t>
+            </a:r>
+            <a:r>
+              <a:rPr kumimoji="0" lang="de-DE" altLang="de-DE" sz="2400" b="1" i="0" u="none" strike="noStrike" cap="none" normalizeH="0" baseline="0" dirty="0" err="1">
+                <a:ln>
+                  <a:noFill/>
+                </a:ln>
+                <a:solidFill>
+                  <a:srgbClr val="202020"/>
+                </a:solidFill>
+                <a:effectLst/>
+                <a:latin typeface="Arial Unicode MS" panose="020B0604020202020204" pitchFamily="34" charset="-128"/>
+              </a:rPr>
+              <a:t>pvParameters</a:t>
+            </a:r>
+            <a:r>
+              <a:rPr kumimoji="0" lang="de-DE" altLang="de-DE" sz="2400" b="1" i="0" u="none" strike="noStrike" cap="none" normalizeH="0" baseline="0" dirty="0">
+                <a:ln>
+                  <a:noFill/>
+                </a:ln>
+                <a:solidFill>
+                  <a:srgbClr val="202020"/>
+                </a:solidFill>
+                <a:effectLst/>
+                <a:latin typeface="Arial Unicode MS" panose="020B0604020202020204" pitchFamily="34" charset="-128"/>
+              </a:rPr>
+              <a:t> ) {</a:t>
+            </a:r>
+          </a:p>
+          <a:p>
+            <a:pPr marL="0" marR="0" lvl="0" indent="0" algn="l" defTabSz="914400" rtl="0" eaLnBrk="0" fontAlgn="base" latinLnBrk="0" hangingPunct="0">
+              <a:lnSpc>
+                <a:spcPct val="100000"/>
+              </a:lnSpc>
+              <a:spcBef>
+                <a:spcPct val="0"/>
+              </a:spcBef>
+              <a:spcAft>
+                <a:spcPct val="0"/>
+              </a:spcAft>
+              <a:buClrTx/>
+              <a:buSzTx/>
+              <a:buFontTx/>
+              <a:buNone/>
+              <a:tabLst/>
+            </a:pPr>
+            <a:r>
+              <a:rPr lang="de-DE" altLang="de-DE" sz="2400" b="1" dirty="0">
+                <a:solidFill>
+                  <a:srgbClr val="202020"/>
+                </a:solidFill>
+                <a:latin typeface="Arial Unicode MS" panose="020B0604020202020204" pitchFamily="34" charset="-128"/>
+              </a:rPr>
+              <a:t>       </a:t>
+            </a:r>
+            <a:r>
+              <a:rPr lang="de-DE" altLang="de-DE" sz="2400" b="1" dirty="0" err="1">
+                <a:solidFill>
+                  <a:srgbClr val="202020"/>
+                </a:solidFill>
+                <a:latin typeface="Arial Unicode MS" panose="020B0604020202020204" pitchFamily="34" charset="-128"/>
+              </a:rPr>
+              <a:t>while</a:t>
+            </a:r>
+            <a:r>
+              <a:rPr kumimoji="0" lang="de-DE" altLang="de-DE" sz="2400" b="1" i="0" u="none" strike="noStrike" cap="none" normalizeH="0" baseline="0" dirty="0">
+                <a:ln>
+                  <a:noFill/>
+                </a:ln>
+                <a:solidFill>
+                  <a:srgbClr val="202020"/>
+                </a:solidFill>
+                <a:effectLst/>
+                <a:latin typeface="Arial Unicode MS" panose="020B0604020202020204" pitchFamily="34" charset="-128"/>
+              </a:rPr>
+              <a:t>( </a:t>
+            </a:r>
+            <a:r>
+              <a:rPr kumimoji="0" lang="de-DE" altLang="de-DE" sz="2400" b="1" i="0" u="none" strike="noStrike" cap="none" normalizeH="0" baseline="0" dirty="0" err="1">
+                <a:ln>
+                  <a:noFill/>
+                </a:ln>
+                <a:solidFill>
+                  <a:srgbClr val="202020"/>
+                </a:solidFill>
+                <a:effectLst/>
+                <a:latin typeface="Arial Unicode MS" panose="020B0604020202020204" pitchFamily="34" charset="-128"/>
+              </a:rPr>
+              <a:t>true</a:t>
+            </a:r>
+            <a:r>
+              <a:rPr kumimoji="0" lang="de-DE" altLang="de-DE" sz="2400" b="1" i="0" u="none" strike="noStrike" cap="none" normalizeH="0" baseline="0" dirty="0">
+                <a:ln>
+                  <a:noFill/>
+                </a:ln>
+                <a:solidFill>
+                  <a:srgbClr val="202020"/>
+                </a:solidFill>
+                <a:effectLst/>
+                <a:latin typeface="Arial Unicode MS" panose="020B0604020202020204" pitchFamily="34" charset="-128"/>
+              </a:rPr>
+              <a:t> ) {</a:t>
+            </a:r>
+          </a:p>
+          <a:p>
+            <a:pPr marL="0" marR="0" lvl="0" indent="0" algn="l" defTabSz="914400" rtl="0" eaLnBrk="0" fontAlgn="base" latinLnBrk="0" hangingPunct="0">
+              <a:lnSpc>
+                <a:spcPct val="100000"/>
+              </a:lnSpc>
+              <a:spcBef>
+                <a:spcPct val="0"/>
+              </a:spcBef>
+              <a:spcAft>
+                <a:spcPct val="0"/>
+              </a:spcAft>
+              <a:buClrTx/>
+              <a:buSzTx/>
+              <a:buFontTx/>
+              <a:buNone/>
+              <a:tabLst/>
+            </a:pPr>
+            <a:r>
+              <a:rPr lang="de-DE" altLang="de-DE" sz="2400" b="1" dirty="0">
+                <a:solidFill>
+                  <a:srgbClr val="202020"/>
+                </a:solidFill>
+                <a:latin typeface="Arial Unicode MS" panose="020B0604020202020204" pitchFamily="34" charset="-128"/>
+              </a:rPr>
+              <a:t>	</a:t>
+            </a:r>
+            <a:r>
+              <a:rPr lang="de-DE" altLang="de-DE" sz="2400" b="1" dirty="0" err="1">
+                <a:solidFill>
+                  <a:srgbClr val="202020"/>
+                </a:solidFill>
+                <a:latin typeface="Arial Unicode MS" panose="020B0604020202020204" pitchFamily="34" charset="-128"/>
+              </a:rPr>
+              <a:t>waitForTimerOrSyncEvent</a:t>
+            </a:r>
+            <a:r>
+              <a:rPr lang="de-DE" altLang="de-DE" sz="2400" b="1" dirty="0">
+                <a:solidFill>
+                  <a:srgbClr val="202020"/>
+                </a:solidFill>
+                <a:latin typeface="Arial Unicode MS" panose="020B0604020202020204" pitchFamily="34" charset="-128"/>
+              </a:rPr>
+              <a:t>();</a:t>
+            </a:r>
+          </a:p>
+          <a:p>
+            <a:pPr marL="0" marR="0" lvl="0" indent="0" algn="l" defTabSz="914400" rtl="0" eaLnBrk="0" fontAlgn="base" latinLnBrk="0" hangingPunct="0">
+              <a:lnSpc>
+                <a:spcPct val="100000"/>
+              </a:lnSpc>
+              <a:spcBef>
+                <a:spcPct val="0"/>
+              </a:spcBef>
+              <a:spcAft>
+                <a:spcPct val="0"/>
+              </a:spcAft>
+              <a:buClrTx/>
+              <a:buSzTx/>
+              <a:buFontTx/>
+              <a:buNone/>
+              <a:tabLst/>
+            </a:pPr>
+            <a:r>
+              <a:rPr kumimoji="0" lang="de-DE" altLang="de-DE" sz="2400" b="1" i="0" u="none" strike="noStrike" cap="none" normalizeH="0" baseline="0" dirty="0">
+                <a:ln>
+                  <a:noFill/>
+                </a:ln>
+                <a:solidFill>
+                  <a:srgbClr val="202020"/>
+                </a:solidFill>
+                <a:effectLst/>
+                <a:latin typeface="Arial Unicode MS" panose="020B0604020202020204" pitchFamily="34" charset="-128"/>
+              </a:rPr>
+              <a:t>	</a:t>
+            </a:r>
+            <a:r>
+              <a:rPr kumimoji="0" lang="de-DE" altLang="de-DE" sz="2400" b="1" i="0" u="none" strike="noStrike" cap="none" normalizeH="0" baseline="0" dirty="0" err="1">
+                <a:ln>
+                  <a:noFill/>
+                </a:ln>
+                <a:solidFill>
+                  <a:srgbClr val="202020"/>
+                </a:solidFill>
+                <a:effectLst/>
+                <a:latin typeface="Arial Unicode MS" panose="020B0604020202020204" pitchFamily="34" charset="-128"/>
+              </a:rPr>
+              <a:t>foo</a:t>
+            </a:r>
+            <a:r>
+              <a:rPr lang="de-DE" altLang="de-DE" sz="2400" b="1" dirty="0">
+                <a:solidFill>
+                  <a:srgbClr val="202020"/>
+                </a:solidFill>
+                <a:latin typeface="Arial Unicode MS" panose="020B0604020202020204" pitchFamily="34" charset="-128"/>
+              </a:rPr>
+              <a:t>();</a:t>
+            </a:r>
+            <a:endParaRPr kumimoji="0" lang="de-DE" altLang="de-DE" sz="2400" b="1" i="0" u="none" strike="noStrike" cap="none" normalizeH="0" baseline="0" dirty="0">
+              <a:ln>
+                <a:noFill/>
+              </a:ln>
+              <a:solidFill>
+                <a:srgbClr val="202020"/>
+              </a:solidFill>
+              <a:effectLst/>
+              <a:latin typeface="Arial Unicode MS" panose="020B0604020202020204" pitchFamily="34" charset="-128"/>
+            </a:endParaRPr>
+          </a:p>
+          <a:p>
+            <a:pPr lvl="1" eaLnBrk="0" fontAlgn="base" hangingPunct="0">
+              <a:spcBef>
+                <a:spcPct val="0"/>
+              </a:spcBef>
+              <a:spcAft>
+                <a:spcPct val="0"/>
+              </a:spcAft>
+            </a:pPr>
+            <a:r>
+              <a:rPr kumimoji="0" lang="de-DE" altLang="de-DE" sz="2400" b="1" i="0" u="none" strike="noStrike" cap="none" normalizeH="0" baseline="0" dirty="0">
+                <a:ln>
+                  <a:noFill/>
+                </a:ln>
+                <a:solidFill>
+                  <a:srgbClr val="202020"/>
+                </a:solidFill>
+                <a:effectLst/>
+                <a:latin typeface="Arial Unicode MS" panose="020B0604020202020204" pitchFamily="34" charset="-128"/>
+              </a:rPr>
+              <a:t>} </a:t>
+            </a:r>
+          </a:p>
+          <a:p>
+            <a:pPr marL="0" marR="0" lvl="0" indent="0" algn="l" defTabSz="914400" rtl="0" eaLnBrk="0" fontAlgn="base" latinLnBrk="0" hangingPunct="0">
+              <a:lnSpc>
+                <a:spcPct val="100000"/>
+              </a:lnSpc>
+              <a:spcBef>
+                <a:spcPct val="0"/>
+              </a:spcBef>
+              <a:spcAft>
+                <a:spcPct val="0"/>
+              </a:spcAft>
+              <a:buClrTx/>
+              <a:buSzTx/>
+              <a:buFontTx/>
+              <a:buNone/>
+              <a:tabLst/>
+            </a:pPr>
+            <a:r>
+              <a:rPr kumimoji="0" lang="de-DE" altLang="de-DE" sz="2400" b="1" i="0" u="none" strike="noStrike" cap="none" normalizeH="0" baseline="0" dirty="0">
+                <a:ln>
+                  <a:noFill/>
+                </a:ln>
+                <a:solidFill>
+                  <a:srgbClr val="202020"/>
+                </a:solidFill>
+                <a:effectLst/>
+                <a:latin typeface="Arial Unicode MS" panose="020B0604020202020204" pitchFamily="34" charset="-128"/>
+              </a:rPr>
+              <a:t>}</a:t>
+            </a:r>
+            <a:r>
+              <a:rPr kumimoji="0" lang="de-DE" altLang="de-DE" sz="2400" b="0" i="0" u="none" strike="noStrike" cap="none" normalizeH="0" baseline="0" dirty="0">
+                <a:ln>
+                  <a:noFill/>
+                </a:ln>
+                <a:solidFill>
+                  <a:schemeClr val="tx1"/>
+                </a:solidFill>
+                <a:effectLst/>
+              </a:rPr>
+              <a:t> </a:t>
+            </a:r>
+            <a:endParaRPr kumimoji="0" lang="de-DE" altLang="de-DE" sz="2400" b="0" i="0" u="none" strike="noStrike" cap="none" normalizeH="0" baseline="0" dirty="0">
+              <a:ln>
+                <a:noFill/>
+              </a:ln>
+              <a:solidFill>
+                <a:schemeClr val="tx1"/>
+              </a:solidFill>
+              <a:effectLst/>
+              <a:latin typeface="Arial" panose="020B0604020202020204" pitchFamily="34" charset="0"/>
+            </a:endParaRPr>
           </a:p>
         </p:txBody>
       </p:sp>
     </p:spTree>
     <p:extLst>
       <p:ext uri="{BB962C8B-B14F-4D97-AF65-F5344CB8AC3E}">
-        <p14:creationId xmlns:p14="http://schemas.microsoft.com/office/powerpoint/2010/main" val="2825290779"/>
+        <p14:creationId xmlns:p14="http://schemas.microsoft.com/office/powerpoint/2010/main" val="1367592145"/>
       </p:ext>
     </p:extLst>
   </p:cSld>

</xml_diff>

<commit_message>
further work on scheduling
</commit_message>
<xml_diff>
--- a/Päsi/Seminar Betriebssysteme.pptx
+++ b/Päsi/Seminar Betriebssysteme.pptx
@@ -6,10 +6,10 @@
     <p:sldMasterId id="2147483660" r:id="rId2"/>
   </p:sldMasterIdLst>
   <p:notesMasterIdLst>
-    <p:notesMasterId r:id="rId28"/>
+    <p:notesMasterId r:id="rId27"/>
   </p:notesMasterIdLst>
   <p:handoutMasterIdLst>
-    <p:handoutMasterId r:id="rId29"/>
+    <p:handoutMasterId r:id="rId28"/>
   </p:handoutMasterIdLst>
   <p:sldIdLst>
     <p:sldId id="256" r:id="rId3"/>
@@ -28,15 +28,14 @@
     <p:sldId id="271" r:id="rId16"/>
     <p:sldId id="273" r:id="rId17"/>
     <p:sldId id="277" r:id="rId18"/>
-    <p:sldId id="278" r:id="rId19"/>
-    <p:sldId id="276" r:id="rId20"/>
-    <p:sldId id="279" r:id="rId21"/>
-    <p:sldId id="280" r:id="rId22"/>
-    <p:sldId id="281" r:id="rId23"/>
-    <p:sldId id="282" r:id="rId24"/>
-    <p:sldId id="292" r:id="rId25"/>
-    <p:sldId id="293" r:id="rId26"/>
-    <p:sldId id="294" r:id="rId27"/>
+    <p:sldId id="276" r:id="rId19"/>
+    <p:sldId id="279" r:id="rId20"/>
+    <p:sldId id="280" r:id="rId21"/>
+    <p:sldId id="281" r:id="rId22"/>
+    <p:sldId id="282" r:id="rId23"/>
+    <p:sldId id="292" r:id="rId24"/>
+    <p:sldId id="293" r:id="rId25"/>
+    <p:sldId id="294" r:id="rId26"/>
   </p:sldIdLst>
   <p:sldSz cx="12192000" cy="6858000"/>
   <p:notesSz cx="6858000" cy="9144000"/>
@@ -255,7 +254,7 @@
           <a:p>
             <a:fld id="{4F336489-14E1-462A-B32E-B31B9D8DDB1E}" type="datetimeFigureOut">
               <a:rPr lang="de-DE" smtClean="0"/>
-              <a:t>26.06.2017</a:t>
+              <a:t>29.06.2017</a:t>
             </a:fld>
             <a:endParaRPr lang="de-DE"/>
           </a:p>
@@ -433,7 +432,7 @@
             <a:fld id="{28A20BDF-6A46-49EA-BE7C-D2960091BE3F}" type="datetimeFigureOut">
               <a:rPr lang="de-DE" smtClean="0"/>
               <a:pPr/>
-              <a:t>26.06.2017</a:t>
+              <a:t>29.06.2017</a:t>
             </a:fld>
             <a:endParaRPr lang="de-DE"/>
           </a:p>
@@ -1309,6 +1308,144 @@
     <p:extLst>
       <p:ext uri="{BB962C8B-B14F-4D97-AF65-F5344CB8AC3E}">
         <p14:creationId xmlns:p14="http://schemas.microsoft.com/office/powerpoint/2010/main" val="2431211418"/>
+      </p:ext>
+    </p:extLst>
+  </p:cSld>
+  <p:clrMapOvr>
+    <a:masterClrMapping/>
+  </p:clrMapOvr>
+</p:notes>
+</file>
+
+<file path=ppt/notesSlides/notesSlide7.xml><?xml version="1.0" encoding="utf-8"?>
+<p:notes xmlns:a="http://schemas.openxmlformats.org/drawingml/2006/main" xmlns:r="http://schemas.openxmlformats.org/officeDocument/2006/relationships" xmlns:p="http://schemas.openxmlformats.org/presentationml/2006/main">
+  <p:cSld>
+    <p:spTree>
+      <p:nvGrpSpPr>
+        <p:cNvPr id="1" name=""/>
+        <p:cNvGrpSpPr/>
+        <p:nvPr/>
+      </p:nvGrpSpPr>
+      <p:grpSpPr>
+        <a:xfrm>
+          <a:off x="0" y="0"/>
+          <a:ext cx="0" cy="0"/>
+          <a:chOff x="0" y="0"/>
+          <a:chExt cx="0" cy="0"/>
+        </a:xfrm>
+      </p:grpSpPr>
+      <p:sp>
+        <p:nvSpPr>
+          <p:cNvPr id="2" name="Folienbildplatzhalter 1"/>
+          <p:cNvSpPr>
+            <a:spLocks noGrp="1" noRot="1" noChangeAspect="1"/>
+          </p:cNvSpPr>
+          <p:nvPr>
+            <p:ph type="sldImg"/>
+          </p:nvPr>
+        </p:nvSpPr>
+        <p:spPr/>
+      </p:sp>
+      <p:sp>
+        <p:nvSpPr>
+          <p:cNvPr id="3" name="Notizenplatzhalter 2"/>
+          <p:cNvSpPr>
+            <a:spLocks noGrp="1"/>
+          </p:cNvSpPr>
+          <p:nvPr>
+            <p:ph type="body" idx="1"/>
+          </p:nvPr>
+        </p:nvSpPr>
+        <p:spPr/>
+        <p:txBody>
+          <a:bodyPr/>
+          <a:lstStyle/>
+          <a:p>
+            <a:r>
+              <a:rPr lang="de-DE" dirty="0"/>
+              <a:t>Erklärung zu </a:t>
+            </a:r>
+            <a:r>
+              <a:rPr lang="de-DE" dirty="0" err="1"/>
+              <a:t>Scheduleraufgabe</a:t>
+            </a:r>
+            <a:endParaRPr lang="de-DE" dirty="0"/>
+          </a:p>
+          <a:p>
+            <a:r>
+              <a:rPr lang="de-DE" dirty="0"/>
+              <a:t>Einmalige Task Ausführung wird Job </a:t>
+            </a:r>
+            <a:r>
+              <a:rPr lang="de-DE" dirty="0" err="1"/>
+              <a:t>geannt</a:t>
+            </a:r>
+            <a:r>
+              <a:rPr lang="de-DE" dirty="0"/>
+              <a:t>.</a:t>
+            </a:r>
+          </a:p>
+          <a:p>
+            <a:r>
+              <a:rPr lang="de-DE" dirty="0"/>
+              <a:t>Sequenzielle </a:t>
+            </a:r>
+            <a:r>
+              <a:rPr lang="de-DE" dirty="0" err="1"/>
+              <a:t>ausführung</a:t>
+            </a:r>
+            <a:r>
+              <a:rPr lang="de-DE" dirty="0"/>
+              <a:t> von Task </a:t>
+            </a:r>
+            <a:r>
+              <a:rPr lang="de-DE" dirty="0" err="1"/>
+              <a:t>jobs</a:t>
+            </a:r>
+            <a:endParaRPr lang="de-DE" dirty="0"/>
+          </a:p>
+          <a:p>
+            <a:r>
+              <a:rPr lang="de-DE" dirty="0"/>
+              <a:t>Taskwechsel  =Kontextswitch</a:t>
+            </a:r>
+          </a:p>
+          <a:p>
+            <a:r>
+              <a:rPr lang="de-DE" dirty="0"/>
+              <a:t>Instruktionsfolge wird nicht beeinflusst</a:t>
+            </a:r>
+          </a:p>
+        </p:txBody>
+      </p:sp>
+      <p:sp>
+        <p:nvSpPr>
+          <p:cNvPr id="4" name="Foliennummernplatzhalter 3"/>
+          <p:cNvSpPr>
+            <a:spLocks noGrp="1"/>
+          </p:cNvSpPr>
+          <p:nvPr>
+            <p:ph type="sldNum" sz="quarter" idx="10"/>
+          </p:nvPr>
+        </p:nvSpPr>
+        <p:spPr/>
+        <p:txBody>
+          <a:bodyPr/>
+          <a:lstStyle/>
+          <a:p>
+            <a:fld id="{538A8A5A-1CA9-4185-8FBD-30F9F425E83E}" type="slidenum">
+              <a:rPr lang="de-DE" smtClean="0"/>
+              <a:pPr/>
+              <a:t>17</a:t>
+            </a:fld>
+            <a:endParaRPr lang="de-DE"/>
+          </a:p>
+        </p:txBody>
+      </p:sp>
+    </p:spTree>
+    <p:extLst>
+      <p:ext uri="{BB962C8B-B14F-4D97-AF65-F5344CB8AC3E}">
+        <p14:creationId xmlns:p14="http://schemas.microsoft.com/office/powerpoint/2010/main" val="2883045047"/>
       </p:ext>
     </p:extLst>
   </p:cSld>
@@ -14014,7 +14151,18 @@
           <a:p>
             <a:r>
               <a:rPr lang="de-DE" sz="8000" dirty="0"/>
-              <a:t>Die </a:t>
+              <a:t>Einmalige Ausführung  = Task </a:t>
+            </a:r>
+            <a:r>
+              <a:rPr lang="de-DE" sz="8000" dirty="0" err="1"/>
+              <a:t>job</a:t>
+            </a:r>
+            <a:endParaRPr lang="de-DE" sz="8000" dirty="0"/>
+          </a:p>
+          <a:p>
+            <a:r>
+              <a:rPr lang="de-DE" sz="8000" dirty="0"/>
+              <a:t>Systemtask : Die </a:t>
             </a:r>
             <a:r>
               <a:rPr lang="de-DE" sz="8000" dirty="0" err="1"/>
@@ -14101,7 +14249,7 @@
         </p:blipFill>
         <p:spPr>
           <a:xfrm>
-            <a:off x="7057160" y="1823430"/>
+            <a:off x="6225056" y="1823430"/>
             <a:ext cx="3467584" cy="4353533"/>
           </a:xfrm>
           <a:prstGeom prst="rect">
@@ -14633,6 +14781,55 @@
                                           </p:stCondLst>
                                         </p:cTn>
                                         <p:tgtEl>
+                                          <p:spTgt spid="3">
+                                            <p:txEl>
+                                              <p:pRg st="12" end="12"/>
+                                            </p:txEl>
+                                          </p:spTgt>
+                                        </p:tgtEl>
+                                        <p:attrNameLst>
+                                          <p:attrName>style.visibility</p:attrName>
+                                        </p:attrNameLst>
+                                      </p:cBhvr>
+                                      <p:to>
+                                        <p:strVal val="visible"/>
+                                      </p:to>
+                                    </p:set>
+                                  </p:childTnLst>
+                                </p:cTn>
+                              </p:par>
+                            </p:childTnLst>
+                          </p:cTn>
+                        </p:par>
+                      </p:childTnLst>
+                    </p:cTn>
+                  </p:par>
+                  <p:par>
+                    <p:cTn id="43" fill="hold">
+                      <p:stCondLst>
+                        <p:cond delay="indefinite"/>
+                      </p:stCondLst>
+                      <p:childTnLst>
+                        <p:par>
+                          <p:cTn id="44" fill="hold">
+                            <p:stCondLst>
+                              <p:cond delay="0"/>
+                            </p:stCondLst>
+                            <p:childTnLst>
+                              <p:par>
+                                <p:cTn id="45" presetID="1" presetClass="entr" presetSubtype="0" fill="hold" nodeType="clickEffect">
+                                  <p:stCondLst>
+                                    <p:cond delay="0"/>
+                                  </p:stCondLst>
+                                  <p:childTnLst>
+                                    <p:set>
+                                      <p:cBhvr>
+                                        <p:cTn id="46" dur="1" fill="hold">
+                                          <p:stCondLst>
+                                            <p:cond delay="0"/>
+                                          </p:stCondLst>
+                                        </p:cTn>
+                                        <p:tgtEl>
                                           <p:spTgt spid="7"/>
                                         </p:tgtEl>
                                         <p:attrNameLst>
@@ -14699,824 +14896,6 @@
           <p:cNvPr id="2" name="Titel 1">
             <a:extLst>
               <a:ext uri="{FF2B5EF4-FFF2-40B4-BE49-F238E27FC236}">
-                <a16:creationId xmlns:a16="http://schemas.microsoft.com/office/drawing/2014/main" id="{FE3C0AE2-86CB-4560-BAE0-3C6E74F44C68}"/>
-              </a:ext>
-            </a:extLst>
-          </p:cNvPr>
-          <p:cNvSpPr>
-            <a:spLocks noGrp="1"/>
-          </p:cNvSpPr>
-          <p:nvPr>
-            <p:ph type="title"/>
-          </p:nvPr>
-        </p:nvSpPr>
-        <p:spPr/>
-        <p:txBody>
-          <a:bodyPr/>
-          <a:lstStyle/>
-          <a:p>
-            <a:r>
-              <a:rPr lang="de-DE" dirty="0"/>
-              <a:t>Task</a:t>
-            </a:r>
-          </a:p>
-        </p:txBody>
-      </p:sp>
-      <p:sp>
-        <p:nvSpPr>
-          <p:cNvPr id="4" name="Fußzeilenplatzhalter 3">
-            <a:extLst>
-              <a:ext uri="{FF2B5EF4-FFF2-40B4-BE49-F238E27FC236}">
-                <a16:creationId xmlns:a16="http://schemas.microsoft.com/office/drawing/2014/main" id="{80667F35-857F-4032-9459-725107F3825F}"/>
-              </a:ext>
-            </a:extLst>
-          </p:cNvPr>
-          <p:cNvSpPr>
-            <a:spLocks noGrp="1"/>
-          </p:cNvSpPr>
-          <p:nvPr>
-            <p:ph type="ftr" sz="quarter" idx="11"/>
-          </p:nvPr>
-        </p:nvSpPr>
-        <p:spPr/>
-        <p:txBody>
-          <a:bodyPr/>
-          <a:lstStyle/>
-          <a:p>
-            <a:endParaRPr lang="de-DE"/>
-          </a:p>
-        </p:txBody>
-      </p:sp>
-      <p:sp>
-        <p:nvSpPr>
-          <p:cNvPr id="5" name="Textfeld 4">
-            <a:extLst>
-              <a:ext uri="{FF2B5EF4-FFF2-40B4-BE49-F238E27FC236}">
-                <a16:creationId xmlns:a16="http://schemas.microsoft.com/office/drawing/2014/main" id="{5A1B8FA5-8FBE-41AE-862A-C9E60E51426B}"/>
-              </a:ext>
-            </a:extLst>
-          </p:cNvPr>
-          <p:cNvSpPr txBox="1"/>
-          <p:nvPr/>
-        </p:nvSpPr>
-        <p:spPr>
-          <a:xfrm>
-            <a:off x="1836576" y="5316769"/>
-            <a:ext cx="3614928" cy="3328416"/>
-          </a:xfrm>
-          <a:prstGeom prst="rect">
-            <a:avLst/>
-          </a:prstGeom>
-          <a:noFill/>
-        </p:spPr>
-        <p:txBody>
-          <a:bodyPr wrap="square" rtlCol="0">
-            <a:spAutoFit/>
-          </a:bodyPr>
-          <a:lstStyle/>
-          <a:p>
-            <a:endParaRPr lang="de-DE" dirty="0"/>
-          </a:p>
-        </p:txBody>
-      </p:sp>
-      <p:sp>
-        <p:nvSpPr>
-          <p:cNvPr id="7" name="Rectangle 2">
-            <a:extLst>
-              <a:ext uri="{FF2B5EF4-FFF2-40B4-BE49-F238E27FC236}">
-                <a16:creationId xmlns:a16="http://schemas.microsoft.com/office/drawing/2014/main" id="{2C9205B6-708C-4E75-B9B3-A967B23423A1}"/>
-              </a:ext>
-            </a:extLst>
-          </p:cNvPr>
-          <p:cNvSpPr>
-            <a:spLocks noChangeArrowheads="1"/>
-          </p:cNvSpPr>
-          <p:nvPr/>
-        </p:nvSpPr>
-        <p:spPr bwMode="auto">
-          <a:xfrm>
-            <a:off x="831379" y="5036214"/>
-            <a:ext cx="9921965" cy="369332"/>
-          </a:xfrm>
-          <a:prstGeom prst="rect">
-            <a:avLst/>
-          </a:prstGeom>
-          <a:solidFill>
-            <a:schemeClr val="accent1">
-              <a:lumMod val="40000"/>
-              <a:lumOff val="60000"/>
-            </a:schemeClr>
-          </a:solidFill>
-          <a:ln>
-            <a:noFill/>
-          </a:ln>
-          <a:effectLst/>
-        </p:spPr>
-        <p:txBody>
-          <a:bodyPr vert="horz" wrap="square" lIns="91440" tIns="45720" rIns="91440" bIns="45720" numCol="1" anchor="ctr" anchorCtr="0" compatLnSpc="1">
-            <a:prstTxWarp prst="textNoShape">
-              <a:avLst/>
-            </a:prstTxWarp>
-            <a:spAutoFit/>
-          </a:bodyPr>
-          <a:lstStyle/>
-          <a:p>
-            <a:pPr marL="0" marR="0" lvl="0" indent="0" algn="l" defTabSz="914400" rtl="0" eaLnBrk="0" fontAlgn="base" latinLnBrk="0" hangingPunct="0">
-              <a:lnSpc>
-                <a:spcPct val="100000"/>
-              </a:lnSpc>
-              <a:spcBef>
-                <a:spcPct val="0"/>
-              </a:spcBef>
-              <a:spcAft>
-                <a:spcPct val="0"/>
-              </a:spcAft>
-              <a:buClrTx/>
-              <a:buSzTx/>
-              <a:buFontTx/>
-              <a:buNone/>
-              <a:tabLst/>
-            </a:pPr>
-            <a:r>
-              <a:rPr kumimoji="0" lang="de-DE" altLang="de-DE" b="1" i="0" u="none" strike="noStrike" cap="none" normalizeH="0" baseline="0" dirty="0" err="1">
-                <a:ln>
-                  <a:noFill/>
-                </a:ln>
-                <a:solidFill>
-                  <a:srgbClr val="202020"/>
-                </a:solidFill>
-                <a:effectLst/>
-                <a:latin typeface="Arial Unicode MS" panose="020B0604020202020204" pitchFamily="34" charset="-128"/>
-                <a:ea typeface="Arial Unicode MS" panose="020B0604020202020204" pitchFamily="34" charset="-128"/>
-                <a:cs typeface="Arial Unicode MS" panose="020B0604020202020204" pitchFamily="34" charset="-128"/>
-              </a:rPr>
-              <a:t>xTaskCreate</a:t>
-            </a:r>
-            <a:r>
-              <a:rPr kumimoji="0" lang="de-DE" altLang="de-DE" b="1" i="0" u="none" strike="noStrike" cap="none" normalizeH="0" baseline="0" dirty="0">
-                <a:ln>
-                  <a:noFill/>
-                </a:ln>
-                <a:solidFill>
-                  <a:srgbClr val="202020"/>
-                </a:solidFill>
-                <a:effectLst/>
-                <a:latin typeface="Arial Unicode MS" panose="020B0604020202020204" pitchFamily="34" charset="-128"/>
-                <a:ea typeface="Arial Unicode MS" panose="020B0604020202020204" pitchFamily="34" charset="-128"/>
-                <a:cs typeface="Arial Unicode MS" panose="020B0604020202020204" pitchFamily="34" charset="-128"/>
-              </a:rPr>
-              <a:t>( </a:t>
-            </a:r>
-            <a:r>
-              <a:rPr kumimoji="0" lang="de-DE" altLang="de-DE" b="1" i="0" u="none" strike="noStrike" cap="none" normalizeH="0" baseline="0" dirty="0" err="1">
-                <a:ln>
-                  <a:noFill/>
-                </a:ln>
-                <a:solidFill>
-                  <a:srgbClr val="202020"/>
-                </a:solidFill>
-                <a:effectLst/>
-                <a:latin typeface="Arial Unicode MS" panose="020B0604020202020204" pitchFamily="34" charset="-128"/>
-                <a:ea typeface="Arial Unicode MS" panose="020B0604020202020204" pitchFamily="34" charset="-128"/>
-                <a:cs typeface="Arial Unicode MS" panose="020B0604020202020204" pitchFamily="34" charset="-128"/>
-              </a:rPr>
-              <a:t>vTaskCode</a:t>
-            </a:r>
-            <a:r>
-              <a:rPr kumimoji="0" lang="de-DE" altLang="de-DE" b="1" i="0" u="none" strike="noStrike" cap="none" normalizeH="0" baseline="0" dirty="0">
-                <a:ln>
-                  <a:noFill/>
-                </a:ln>
-                <a:solidFill>
-                  <a:srgbClr val="202020"/>
-                </a:solidFill>
-                <a:effectLst/>
-                <a:latin typeface="Arial Unicode MS" panose="020B0604020202020204" pitchFamily="34" charset="-128"/>
-                <a:ea typeface="Arial Unicode MS" panose="020B0604020202020204" pitchFamily="34" charset="-128"/>
-                <a:cs typeface="Arial Unicode MS" panose="020B0604020202020204" pitchFamily="34" charset="-128"/>
-              </a:rPr>
-              <a:t>,</a:t>
-            </a:r>
-            <a:r>
-              <a:rPr lang="de-DE" altLang="de-DE" b="1" dirty="0">
-                <a:solidFill>
-                  <a:srgbClr val="202020"/>
-                </a:solidFill>
-                <a:latin typeface="Arial Unicode MS" panose="020B0604020202020204" pitchFamily="34" charset="-128"/>
-                <a:ea typeface="Arial Unicode MS" panose="020B0604020202020204" pitchFamily="34" charset="-128"/>
-                <a:cs typeface="Arial Unicode MS" panose="020B0604020202020204" pitchFamily="34" charset="-128"/>
-              </a:rPr>
-              <a:t> </a:t>
-            </a:r>
-            <a:r>
-              <a:rPr kumimoji="0" lang="de-DE" altLang="de-DE" b="1" i="0" u="none" strike="noStrike" cap="none" normalizeH="0" baseline="0" dirty="0">
-                <a:ln>
-                  <a:noFill/>
-                </a:ln>
-                <a:solidFill>
-                  <a:srgbClr val="202020"/>
-                </a:solidFill>
-                <a:effectLst/>
-                <a:latin typeface="Arial Unicode MS" panose="020B0604020202020204" pitchFamily="34" charset="-128"/>
-                <a:ea typeface="Arial Unicode MS" panose="020B0604020202020204" pitchFamily="34" charset="-128"/>
-                <a:cs typeface="Arial Unicode MS" panose="020B0604020202020204" pitchFamily="34" charset="-128"/>
-              </a:rPr>
-              <a:t>"NAME, STACK_SIZE, ( </a:t>
-            </a:r>
-            <a:r>
-              <a:rPr kumimoji="0" lang="de-DE" altLang="de-DE" b="1" i="0" u="none" strike="noStrike" cap="none" normalizeH="0" baseline="0" dirty="0" err="1">
-                <a:ln>
-                  <a:noFill/>
-                </a:ln>
-                <a:solidFill>
-                  <a:srgbClr val="202020"/>
-                </a:solidFill>
-                <a:effectLst/>
-                <a:latin typeface="Arial Unicode MS" panose="020B0604020202020204" pitchFamily="34" charset="-128"/>
-                <a:ea typeface="Arial Unicode MS" panose="020B0604020202020204" pitchFamily="34" charset="-128"/>
-                <a:cs typeface="Arial Unicode MS" panose="020B0604020202020204" pitchFamily="34" charset="-128"/>
-              </a:rPr>
-              <a:t>void</a:t>
-            </a:r>
-            <a:r>
-              <a:rPr kumimoji="0" lang="de-DE" altLang="de-DE" b="1" i="0" u="none" strike="noStrike" cap="none" normalizeH="0" baseline="0" dirty="0">
-                <a:ln>
-                  <a:noFill/>
-                </a:ln>
-                <a:solidFill>
-                  <a:srgbClr val="202020"/>
-                </a:solidFill>
-                <a:effectLst/>
-                <a:latin typeface="Arial Unicode MS" panose="020B0604020202020204" pitchFamily="34" charset="-128"/>
-                <a:ea typeface="Arial Unicode MS" panose="020B0604020202020204" pitchFamily="34" charset="-128"/>
-                <a:cs typeface="Arial Unicode MS" panose="020B0604020202020204" pitchFamily="34" charset="-128"/>
-              </a:rPr>
-              <a:t> * ) 1,  </a:t>
-            </a:r>
-            <a:r>
-              <a:rPr kumimoji="0" lang="de-DE" altLang="de-DE" b="1" i="0" u="none" strike="noStrike" cap="none" normalizeH="0" baseline="0" dirty="0" err="1">
-                <a:ln>
-                  <a:noFill/>
-                </a:ln>
-                <a:solidFill>
-                  <a:srgbClr val="202020"/>
-                </a:solidFill>
-                <a:effectLst/>
-                <a:latin typeface="Arial Unicode MS" panose="020B0604020202020204" pitchFamily="34" charset="-128"/>
-                <a:ea typeface="Arial Unicode MS" panose="020B0604020202020204" pitchFamily="34" charset="-128"/>
-                <a:cs typeface="Arial Unicode MS" panose="020B0604020202020204" pitchFamily="34" charset="-128"/>
-              </a:rPr>
-              <a:t>tskIDLE_PRIORITY</a:t>
-            </a:r>
-            <a:r>
-              <a:rPr kumimoji="0" lang="de-DE" altLang="de-DE" b="1" i="0" u="none" strike="noStrike" cap="none" normalizeH="0" baseline="0" dirty="0">
-                <a:ln>
-                  <a:noFill/>
-                </a:ln>
-                <a:solidFill>
-                  <a:srgbClr val="202020"/>
-                </a:solidFill>
-                <a:effectLst/>
-                <a:latin typeface="Arial Unicode MS" panose="020B0604020202020204" pitchFamily="34" charset="-128"/>
-                <a:ea typeface="Arial Unicode MS" panose="020B0604020202020204" pitchFamily="34" charset="-128"/>
-                <a:cs typeface="Arial Unicode MS" panose="020B0604020202020204" pitchFamily="34" charset="-128"/>
-              </a:rPr>
-              <a:t>,</a:t>
-            </a:r>
-            <a:r>
-              <a:rPr kumimoji="0" lang="de-DE" altLang="de-DE" b="1" i="0" u="none" strike="noStrike" cap="none" normalizeH="0" baseline="0" dirty="0">
-                <a:ln>
-                  <a:noFill/>
-                </a:ln>
-                <a:solidFill>
-                  <a:srgbClr val="008000"/>
-                </a:solidFill>
-                <a:effectLst/>
-                <a:latin typeface="Arial Unicode MS" panose="020B0604020202020204" pitchFamily="34" charset="-128"/>
-                <a:ea typeface="Arial Unicode MS" panose="020B0604020202020204" pitchFamily="34" charset="-128"/>
-                <a:cs typeface="Arial Unicode MS" panose="020B0604020202020204" pitchFamily="34" charset="-128"/>
-              </a:rPr>
-              <a:t> </a:t>
-            </a:r>
-            <a:r>
-              <a:rPr kumimoji="0" lang="de-DE" altLang="de-DE" b="1" i="0" u="none" strike="noStrike" cap="none" normalizeH="0" baseline="0" dirty="0">
-                <a:ln>
-                  <a:noFill/>
-                </a:ln>
-                <a:solidFill>
-                  <a:srgbClr val="202020"/>
-                </a:solidFill>
-                <a:effectLst/>
-                <a:latin typeface="Arial Unicode MS" panose="020B0604020202020204" pitchFamily="34" charset="-128"/>
-                <a:ea typeface="Arial Unicode MS" panose="020B0604020202020204" pitchFamily="34" charset="-128"/>
-                <a:cs typeface="Arial Unicode MS" panose="020B0604020202020204" pitchFamily="34" charset="-128"/>
-              </a:rPr>
-              <a:t>&amp;</a:t>
-            </a:r>
-            <a:r>
-              <a:rPr kumimoji="0" lang="de-DE" altLang="de-DE" b="1" i="0" u="none" strike="noStrike" cap="none" normalizeH="0" baseline="0" dirty="0" err="1">
-                <a:ln>
-                  <a:noFill/>
-                </a:ln>
-                <a:solidFill>
-                  <a:srgbClr val="202020"/>
-                </a:solidFill>
-                <a:effectLst/>
-                <a:latin typeface="Arial Unicode MS" panose="020B0604020202020204" pitchFamily="34" charset="-128"/>
-                <a:ea typeface="Arial Unicode MS" panose="020B0604020202020204" pitchFamily="34" charset="-128"/>
-                <a:cs typeface="Arial Unicode MS" panose="020B0604020202020204" pitchFamily="34" charset="-128"/>
-              </a:rPr>
-              <a:t>xHandle</a:t>
-            </a:r>
-            <a:r>
-              <a:rPr kumimoji="0" lang="de-DE" altLang="de-DE" b="1" i="0" u="none" strike="noStrike" cap="none" normalizeH="0" baseline="0" dirty="0">
-                <a:ln>
-                  <a:noFill/>
-                </a:ln>
-                <a:solidFill>
-                  <a:srgbClr val="202020"/>
-                </a:solidFill>
-                <a:effectLst/>
-                <a:latin typeface="Arial Unicode MS" panose="020B0604020202020204" pitchFamily="34" charset="-128"/>
-                <a:ea typeface="Arial Unicode MS" panose="020B0604020202020204" pitchFamily="34" charset="-128"/>
-                <a:cs typeface="Arial Unicode MS" panose="020B0604020202020204" pitchFamily="34" charset="-128"/>
-              </a:rPr>
-              <a:t> );</a:t>
-            </a:r>
-            <a:endParaRPr kumimoji="0" lang="de-DE" altLang="de-DE" sz="1800" b="0" i="0" u="none" strike="noStrike" cap="none" normalizeH="0" baseline="0" dirty="0">
-              <a:ln>
-                <a:noFill/>
-              </a:ln>
-              <a:solidFill>
-                <a:schemeClr val="tx1"/>
-              </a:solidFill>
-              <a:effectLst/>
-              <a:latin typeface="Arial Unicode MS" panose="020B0604020202020204" pitchFamily="34" charset="-128"/>
-              <a:ea typeface="Arial Unicode MS" panose="020B0604020202020204" pitchFamily="34" charset="-128"/>
-              <a:cs typeface="Arial Unicode MS" panose="020B0604020202020204" pitchFamily="34" charset="-128"/>
-            </a:endParaRPr>
-          </a:p>
-        </p:txBody>
-      </p:sp>
-      <p:sp>
-        <p:nvSpPr>
-          <p:cNvPr id="10" name="Rectangle 4">
-            <a:extLst>
-              <a:ext uri="{FF2B5EF4-FFF2-40B4-BE49-F238E27FC236}">
-                <a16:creationId xmlns:a16="http://schemas.microsoft.com/office/drawing/2014/main" id="{DAFA3FE8-BCD0-4E86-BD4B-08700FE7B0E8}"/>
-              </a:ext>
-            </a:extLst>
-          </p:cNvPr>
-          <p:cNvSpPr>
-            <a:spLocks noChangeArrowheads="1"/>
-          </p:cNvSpPr>
-          <p:nvPr/>
-        </p:nvSpPr>
-        <p:spPr bwMode="auto">
-          <a:xfrm>
-            <a:off x="831379" y="2103112"/>
-            <a:ext cx="5729454" cy="2308324"/>
-          </a:xfrm>
-          <a:prstGeom prst="rect">
-            <a:avLst/>
-          </a:prstGeom>
-          <a:solidFill>
-            <a:schemeClr val="accent1">
-              <a:lumMod val="40000"/>
-              <a:lumOff val="60000"/>
-            </a:schemeClr>
-          </a:solidFill>
-          <a:ln>
-            <a:noFill/>
-          </a:ln>
-          <a:effectLst/>
-        </p:spPr>
-        <p:txBody>
-          <a:bodyPr vert="horz" wrap="none" lIns="91440" tIns="45720" rIns="91440" bIns="45720" numCol="1" anchor="ctr" anchorCtr="0" compatLnSpc="1">
-            <a:prstTxWarp prst="textNoShape">
-              <a:avLst/>
-            </a:prstTxWarp>
-            <a:spAutoFit/>
-          </a:bodyPr>
-          <a:lstStyle/>
-          <a:p>
-            <a:pPr marL="0" marR="0" lvl="0" indent="0" algn="l" defTabSz="914400" rtl="0" eaLnBrk="0" fontAlgn="base" latinLnBrk="0" hangingPunct="0">
-              <a:lnSpc>
-                <a:spcPct val="100000"/>
-              </a:lnSpc>
-              <a:spcBef>
-                <a:spcPct val="0"/>
-              </a:spcBef>
-              <a:spcAft>
-                <a:spcPct val="0"/>
-              </a:spcAft>
-              <a:buClrTx/>
-              <a:buSzTx/>
-              <a:buFontTx/>
-              <a:buNone/>
-              <a:tabLst/>
-            </a:pPr>
-            <a:r>
-              <a:rPr kumimoji="0" lang="de-DE" altLang="de-DE" sz="2400" b="1" i="0" u="none" strike="noStrike" cap="none" normalizeH="0" baseline="0" dirty="0" err="1">
-                <a:ln>
-                  <a:noFill/>
-                </a:ln>
-                <a:solidFill>
-                  <a:srgbClr val="202020"/>
-                </a:solidFill>
-                <a:effectLst/>
-                <a:latin typeface="Arial Unicode MS" panose="020B0604020202020204" pitchFamily="34" charset="-128"/>
-              </a:rPr>
-              <a:t>void</a:t>
-            </a:r>
-            <a:r>
-              <a:rPr kumimoji="0" lang="de-DE" altLang="de-DE" sz="2400" b="1" i="0" u="none" strike="noStrike" cap="none" normalizeH="0" baseline="0" dirty="0">
-                <a:ln>
-                  <a:noFill/>
-                </a:ln>
-                <a:solidFill>
-                  <a:srgbClr val="202020"/>
-                </a:solidFill>
-                <a:effectLst/>
-                <a:latin typeface="Arial Unicode MS" panose="020B0604020202020204" pitchFamily="34" charset="-128"/>
-              </a:rPr>
-              <a:t> </a:t>
-            </a:r>
-            <a:r>
-              <a:rPr kumimoji="0" lang="de-DE" altLang="de-DE" sz="2400" b="1" i="0" u="none" strike="noStrike" cap="none" normalizeH="0" baseline="0" dirty="0" err="1">
-                <a:ln>
-                  <a:noFill/>
-                </a:ln>
-                <a:solidFill>
-                  <a:srgbClr val="202020"/>
-                </a:solidFill>
-                <a:effectLst/>
-                <a:latin typeface="Arial Unicode MS" panose="020B0604020202020204" pitchFamily="34" charset="-128"/>
-              </a:rPr>
-              <a:t>vTaskCode</a:t>
-            </a:r>
-            <a:r>
-              <a:rPr kumimoji="0" lang="de-DE" altLang="de-DE" sz="2400" b="1" i="0" u="none" strike="noStrike" cap="none" normalizeH="0" baseline="0" dirty="0">
-                <a:ln>
-                  <a:noFill/>
-                </a:ln>
-                <a:solidFill>
-                  <a:srgbClr val="202020"/>
-                </a:solidFill>
-                <a:effectLst/>
-                <a:latin typeface="Arial Unicode MS" panose="020B0604020202020204" pitchFamily="34" charset="-128"/>
-              </a:rPr>
-              <a:t>( </a:t>
-            </a:r>
-            <a:r>
-              <a:rPr kumimoji="0" lang="de-DE" altLang="de-DE" sz="2400" b="1" i="0" u="none" strike="noStrike" cap="none" normalizeH="0" baseline="0" dirty="0" err="1">
-                <a:ln>
-                  <a:noFill/>
-                </a:ln>
-                <a:solidFill>
-                  <a:srgbClr val="202020"/>
-                </a:solidFill>
-                <a:effectLst/>
-                <a:latin typeface="Arial Unicode MS" panose="020B0604020202020204" pitchFamily="34" charset="-128"/>
-              </a:rPr>
-              <a:t>void</a:t>
-            </a:r>
-            <a:r>
-              <a:rPr kumimoji="0" lang="de-DE" altLang="de-DE" sz="2400" b="1" i="0" u="none" strike="noStrike" cap="none" normalizeH="0" baseline="0" dirty="0">
-                <a:ln>
-                  <a:noFill/>
-                </a:ln>
-                <a:solidFill>
-                  <a:srgbClr val="202020"/>
-                </a:solidFill>
-                <a:effectLst/>
-                <a:latin typeface="Arial Unicode MS" panose="020B0604020202020204" pitchFamily="34" charset="-128"/>
-              </a:rPr>
-              <a:t> * </a:t>
-            </a:r>
-            <a:r>
-              <a:rPr kumimoji="0" lang="de-DE" altLang="de-DE" sz="2400" b="1" i="0" u="none" strike="noStrike" cap="none" normalizeH="0" baseline="0" dirty="0" err="1">
-                <a:ln>
-                  <a:noFill/>
-                </a:ln>
-                <a:solidFill>
-                  <a:srgbClr val="202020"/>
-                </a:solidFill>
-                <a:effectLst/>
-                <a:latin typeface="Arial Unicode MS" panose="020B0604020202020204" pitchFamily="34" charset="-128"/>
-              </a:rPr>
-              <a:t>pvParameters</a:t>
-            </a:r>
-            <a:r>
-              <a:rPr kumimoji="0" lang="de-DE" altLang="de-DE" sz="2400" b="1" i="0" u="none" strike="noStrike" cap="none" normalizeH="0" baseline="0" dirty="0">
-                <a:ln>
-                  <a:noFill/>
-                </a:ln>
-                <a:solidFill>
-                  <a:srgbClr val="202020"/>
-                </a:solidFill>
-                <a:effectLst/>
-                <a:latin typeface="Arial Unicode MS" panose="020B0604020202020204" pitchFamily="34" charset="-128"/>
-              </a:rPr>
-              <a:t> ) {</a:t>
-            </a:r>
-          </a:p>
-          <a:p>
-            <a:pPr marL="0" marR="0" lvl="0" indent="0" algn="l" defTabSz="914400" rtl="0" eaLnBrk="0" fontAlgn="base" latinLnBrk="0" hangingPunct="0">
-              <a:lnSpc>
-                <a:spcPct val="100000"/>
-              </a:lnSpc>
-              <a:spcBef>
-                <a:spcPct val="0"/>
-              </a:spcBef>
-              <a:spcAft>
-                <a:spcPct val="0"/>
-              </a:spcAft>
-              <a:buClrTx/>
-              <a:buSzTx/>
-              <a:buFontTx/>
-              <a:buNone/>
-              <a:tabLst/>
-            </a:pPr>
-            <a:r>
-              <a:rPr lang="de-DE" altLang="de-DE" sz="2400" b="1" dirty="0">
-                <a:solidFill>
-                  <a:srgbClr val="202020"/>
-                </a:solidFill>
-                <a:latin typeface="Arial Unicode MS" panose="020B0604020202020204" pitchFamily="34" charset="-128"/>
-              </a:rPr>
-              <a:t>       </a:t>
-            </a:r>
-            <a:r>
-              <a:rPr lang="de-DE" altLang="de-DE" sz="2400" b="1" dirty="0" err="1">
-                <a:solidFill>
-                  <a:srgbClr val="202020"/>
-                </a:solidFill>
-                <a:latin typeface="Arial Unicode MS" panose="020B0604020202020204" pitchFamily="34" charset="-128"/>
-              </a:rPr>
-              <a:t>while</a:t>
-            </a:r>
-            <a:r>
-              <a:rPr kumimoji="0" lang="de-DE" altLang="de-DE" sz="2400" b="1" i="0" u="none" strike="noStrike" cap="none" normalizeH="0" baseline="0" dirty="0">
-                <a:ln>
-                  <a:noFill/>
-                </a:ln>
-                <a:solidFill>
-                  <a:srgbClr val="202020"/>
-                </a:solidFill>
-                <a:effectLst/>
-                <a:latin typeface="Arial Unicode MS" panose="020B0604020202020204" pitchFamily="34" charset="-128"/>
-              </a:rPr>
-              <a:t>( </a:t>
-            </a:r>
-            <a:r>
-              <a:rPr kumimoji="0" lang="de-DE" altLang="de-DE" sz="2400" b="1" i="0" u="none" strike="noStrike" cap="none" normalizeH="0" baseline="0" dirty="0" err="1">
-                <a:ln>
-                  <a:noFill/>
-                </a:ln>
-                <a:solidFill>
-                  <a:srgbClr val="202020"/>
-                </a:solidFill>
-                <a:effectLst/>
-                <a:latin typeface="Arial Unicode MS" panose="020B0604020202020204" pitchFamily="34" charset="-128"/>
-              </a:rPr>
-              <a:t>true</a:t>
-            </a:r>
-            <a:r>
-              <a:rPr kumimoji="0" lang="de-DE" altLang="de-DE" sz="2400" b="1" i="0" u="none" strike="noStrike" cap="none" normalizeH="0" baseline="0" dirty="0">
-                <a:ln>
-                  <a:noFill/>
-                </a:ln>
-                <a:solidFill>
-                  <a:srgbClr val="202020"/>
-                </a:solidFill>
-                <a:effectLst/>
-                <a:latin typeface="Arial Unicode MS" panose="020B0604020202020204" pitchFamily="34" charset="-128"/>
-              </a:rPr>
-              <a:t> ) {</a:t>
-            </a:r>
-          </a:p>
-          <a:p>
-            <a:pPr marL="0" marR="0" lvl="0" indent="0" algn="l" defTabSz="914400" rtl="0" eaLnBrk="0" fontAlgn="base" latinLnBrk="0" hangingPunct="0">
-              <a:lnSpc>
-                <a:spcPct val="100000"/>
-              </a:lnSpc>
-              <a:spcBef>
-                <a:spcPct val="0"/>
-              </a:spcBef>
-              <a:spcAft>
-                <a:spcPct val="0"/>
-              </a:spcAft>
-              <a:buClrTx/>
-              <a:buSzTx/>
-              <a:buFontTx/>
-              <a:buNone/>
-              <a:tabLst/>
-            </a:pPr>
-            <a:r>
-              <a:rPr lang="de-DE" altLang="de-DE" sz="2400" b="1" dirty="0">
-                <a:solidFill>
-                  <a:srgbClr val="202020"/>
-                </a:solidFill>
-                <a:latin typeface="Arial Unicode MS" panose="020B0604020202020204" pitchFamily="34" charset="-128"/>
-              </a:rPr>
-              <a:t>	</a:t>
-            </a:r>
-            <a:r>
-              <a:rPr lang="de-DE" altLang="de-DE" sz="2400" b="1" dirty="0" err="1">
-                <a:solidFill>
-                  <a:srgbClr val="202020"/>
-                </a:solidFill>
-                <a:latin typeface="Arial Unicode MS" panose="020B0604020202020204" pitchFamily="34" charset="-128"/>
-              </a:rPr>
-              <a:t>waitForTimerOrSyncEvent</a:t>
-            </a:r>
-            <a:r>
-              <a:rPr lang="de-DE" altLang="de-DE" sz="2400" b="1" dirty="0">
-                <a:solidFill>
-                  <a:srgbClr val="202020"/>
-                </a:solidFill>
-                <a:latin typeface="Arial Unicode MS" panose="020B0604020202020204" pitchFamily="34" charset="-128"/>
-              </a:rPr>
-              <a:t>();</a:t>
-            </a:r>
-          </a:p>
-          <a:p>
-            <a:pPr marL="0" marR="0" lvl="0" indent="0" algn="l" defTabSz="914400" rtl="0" eaLnBrk="0" fontAlgn="base" latinLnBrk="0" hangingPunct="0">
-              <a:lnSpc>
-                <a:spcPct val="100000"/>
-              </a:lnSpc>
-              <a:spcBef>
-                <a:spcPct val="0"/>
-              </a:spcBef>
-              <a:spcAft>
-                <a:spcPct val="0"/>
-              </a:spcAft>
-              <a:buClrTx/>
-              <a:buSzTx/>
-              <a:buFontTx/>
-              <a:buNone/>
-              <a:tabLst/>
-            </a:pPr>
-            <a:r>
-              <a:rPr kumimoji="0" lang="de-DE" altLang="de-DE" sz="2400" b="1" i="0" u="none" strike="noStrike" cap="none" normalizeH="0" baseline="0" dirty="0">
-                <a:ln>
-                  <a:noFill/>
-                </a:ln>
-                <a:solidFill>
-                  <a:srgbClr val="202020"/>
-                </a:solidFill>
-                <a:effectLst/>
-                <a:latin typeface="Arial Unicode MS" panose="020B0604020202020204" pitchFamily="34" charset="-128"/>
-              </a:rPr>
-              <a:t>	</a:t>
-            </a:r>
-            <a:r>
-              <a:rPr kumimoji="0" lang="de-DE" altLang="de-DE" sz="2400" b="1" i="0" u="none" strike="noStrike" cap="none" normalizeH="0" baseline="0" dirty="0" err="1">
-                <a:ln>
-                  <a:noFill/>
-                </a:ln>
-                <a:solidFill>
-                  <a:srgbClr val="202020"/>
-                </a:solidFill>
-                <a:effectLst/>
-                <a:latin typeface="Arial Unicode MS" panose="020B0604020202020204" pitchFamily="34" charset="-128"/>
-              </a:rPr>
-              <a:t>foo</a:t>
-            </a:r>
-            <a:r>
-              <a:rPr lang="de-DE" altLang="de-DE" sz="2400" b="1" dirty="0">
-                <a:solidFill>
-                  <a:srgbClr val="202020"/>
-                </a:solidFill>
-                <a:latin typeface="Arial Unicode MS" panose="020B0604020202020204" pitchFamily="34" charset="-128"/>
-              </a:rPr>
-              <a:t>();</a:t>
-            </a:r>
-            <a:endParaRPr kumimoji="0" lang="de-DE" altLang="de-DE" sz="2400" b="1" i="0" u="none" strike="noStrike" cap="none" normalizeH="0" baseline="0" dirty="0">
-              <a:ln>
-                <a:noFill/>
-              </a:ln>
-              <a:solidFill>
-                <a:srgbClr val="202020"/>
-              </a:solidFill>
-              <a:effectLst/>
-              <a:latin typeface="Arial Unicode MS" panose="020B0604020202020204" pitchFamily="34" charset="-128"/>
-            </a:endParaRPr>
-          </a:p>
-          <a:p>
-            <a:pPr lvl="1" eaLnBrk="0" fontAlgn="base" hangingPunct="0">
-              <a:spcBef>
-                <a:spcPct val="0"/>
-              </a:spcBef>
-              <a:spcAft>
-                <a:spcPct val="0"/>
-              </a:spcAft>
-            </a:pPr>
-            <a:r>
-              <a:rPr kumimoji="0" lang="de-DE" altLang="de-DE" sz="2400" b="1" i="0" u="none" strike="noStrike" cap="none" normalizeH="0" baseline="0" dirty="0">
-                <a:ln>
-                  <a:noFill/>
-                </a:ln>
-                <a:solidFill>
-                  <a:srgbClr val="202020"/>
-                </a:solidFill>
-                <a:effectLst/>
-                <a:latin typeface="Arial Unicode MS" panose="020B0604020202020204" pitchFamily="34" charset="-128"/>
-              </a:rPr>
-              <a:t>} </a:t>
-            </a:r>
-          </a:p>
-          <a:p>
-            <a:pPr marL="0" marR="0" lvl="0" indent="0" algn="l" defTabSz="914400" rtl="0" eaLnBrk="0" fontAlgn="base" latinLnBrk="0" hangingPunct="0">
-              <a:lnSpc>
-                <a:spcPct val="100000"/>
-              </a:lnSpc>
-              <a:spcBef>
-                <a:spcPct val="0"/>
-              </a:spcBef>
-              <a:spcAft>
-                <a:spcPct val="0"/>
-              </a:spcAft>
-              <a:buClrTx/>
-              <a:buSzTx/>
-              <a:buFontTx/>
-              <a:buNone/>
-              <a:tabLst/>
-            </a:pPr>
-            <a:r>
-              <a:rPr kumimoji="0" lang="de-DE" altLang="de-DE" sz="2400" b="1" i="0" u="none" strike="noStrike" cap="none" normalizeH="0" baseline="0" dirty="0">
-                <a:ln>
-                  <a:noFill/>
-                </a:ln>
-                <a:solidFill>
-                  <a:srgbClr val="202020"/>
-                </a:solidFill>
-                <a:effectLst/>
-                <a:latin typeface="Arial Unicode MS" panose="020B0604020202020204" pitchFamily="34" charset="-128"/>
-              </a:rPr>
-              <a:t>}</a:t>
-            </a:r>
-            <a:r>
-              <a:rPr kumimoji="0" lang="de-DE" altLang="de-DE" sz="2400" b="0" i="0" u="none" strike="noStrike" cap="none" normalizeH="0" baseline="0" dirty="0">
-                <a:ln>
-                  <a:noFill/>
-                </a:ln>
-                <a:solidFill>
-                  <a:schemeClr val="tx1"/>
-                </a:solidFill>
-                <a:effectLst/>
-              </a:rPr>
-              <a:t> </a:t>
-            </a:r>
-            <a:endParaRPr kumimoji="0" lang="de-DE" altLang="de-DE" sz="2400" b="0" i="0" u="none" strike="noStrike" cap="none" normalizeH="0" baseline="0" dirty="0">
-              <a:ln>
-                <a:noFill/>
-              </a:ln>
-              <a:solidFill>
-                <a:schemeClr val="tx1"/>
-              </a:solidFill>
-              <a:effectLst/>
-              <a:latin typeface="Arial" panose="020B0604020202020204" pitchFamily="34" charset="0"/>
-            </a:endParaRPr>
-          </a:p>
-        </p:txBody>
-      </p:sp>
-    </p:spTree>
-    <p:extLst>
-      <p:ext uri="{BB962C8B-B14F-4D97-AF65-F5344CB8AC3E}">
-        <p14:creationId xmlns:p14="http://schemas.microsoft.com/office/powerpoint/2010/main" val="1367592145"/>
-      </p:ext>
-    </p:extLst>
-  </p:cSld>
-  <p:clrMapOvr>
-    <a:masterClrMapping/>
-  </p:clrMapOvr>
-</p:sld>
-</file>
-
-<file path=ppt/slides/slide18.xml><?xml version="1.0" encoding="utf-8"?>
-<p:sld xmlns:a="http://schemas.openxmlformats.org/drawingml/2006/main" xmlns:r="http://schemas.openxmlformats.org/officeDocument/2006/relationships" xmlns:p="http://schemas.openxmlformats.org/presentationml/2006/main">
-  <p:cSld>
-    <p:spTree>
-      <p:nvGrpSpPr>
-        <p:cNvPr id="1" name=""/>
-        <p:cNvGrpSpPr/>
-        <p:nvPr/>
-      </p:nvGrpSpPr>
-      <p:grpSpPr>
-        <a:xfrm>
-          <a:off x="0" y="0"/>
-          <a:ext cx="0" cy="0"/>
-          <a:chOff x="0" y="0"/>
-          <a:chExt cx="0" cy="0"/>
-        </a:xfrm>
-      </p:grpSpPr>
-      <p:sp>
-        <p:nvSpPr>
-          <p:cNvPr id="2" name="Titel 1">
-            <a:extLst>
-              <a:ext uri="{FF2B5EF4-FFF2-40B4-BE49-F238E27FC236}">
                 <a16:creationId xmlns:a16="http://schemas.microsoft.com/office/drawing/2014/main" id="{FA538962-AA10-4831-A21F-39427C91FBFE}"/>
               </a:ext>
             </a:extLst>
@@ -15583,7 +14962,7 @@
         <p:spPr>
           <a:xfrm>
             <a:off x="5878441" y="1982933"/>
-            <a:ext cx="6085064" cy="5724644"/>
+            <a:ext cx="6142772" cy="5724644"/>
           </a:xfrm>
           <a:prstGeom prst="rect">
             <a:avLst/>
@@ -15630,38 +15009,7 @@
             </a:pPr>
             <a:r>
               <a:rPr lang="de-DE" sz="2400" dirty="0"/>
-              <a:t>Einfache Konfiguration über </a:t>
-            </a:r>
-            <a:r>
-              <a:rPr lang="de-DE" sz="2400" dirty="0" err="1"/>
-              <a:t>FreeRTOS</a:t>
-            </a:r>
-            <a:r>
-              <a:rPr lang="de-DE" sz="2400" dirty="0"/>
-              <a:t> </a:t>
-            </a:r>
-            <a:r>
-              <a:rPr lang="de-DE" sz="2400" dirty="0" err="1"/>
-              <a:t>Config</a:t>
-            </a:r>
-            <a:endParaRPr lang="de-DE" sz="2400" dirty="0"/>
-          </a:p>
-          <a:p>
-            <a:pPr marL="285750" indent="-285750">
-              <a:buFont typeface="Wingdings" panose="05000000000000000000" pitchFamily="2" charset="2"/>
-              <a:buChar char="§"/>
-            </a:pPr>
-            <a:r>
-              <a:rPr lang="de-DE" sz="2400" dirty="0"/>
-              <a:t>1 CPU Kern = 1 </a:t>
-            </a:r>
-            <a:r>
-              <a:rPr lang="de-DE" sz="2400" dirty="0" err="1"/>
-              <a:t>max</a:t>
-            </a:r>
-            <a:r>
-              <a:rPr lang="de-DE" sz="2400" dirty="0"/>
-              <a:t> Task im Running State</a:t>
+              <a:t>1 CPU Kern = 1 max. Task im Running State</a:t>
             </a:r>
           </a:p>
           <a:p>
@@ -15679,30 +15027,63 @@
             <a:endParaRPr lang="de-DE" sz="2400" dirty="0"/>
           </a:p>
           <a:p>
+            <a:endParaRPr lang="de-DE" sz="2400" dirty="0"/>
+          </a:p>
+          <a:p>
+            <a:pPr marL="342900" indent="-342900">
+              <a:buFont typeface="Wingdings" panose="05000000000000000000" pitchFamily="2" charset="2"/>
+              <a:buChar char="§"/>
+            </a:pPr>
+            <a:r>
+              <a:rPr lang="de-DE" sz="2400" dirty="0"/>
+              <a:t>Einfache Konfiguration über </a:t>
+            </a:r>
+            <a:r>
+              <a:rPr lang="de-DE" sz="2400" dirty="0" err="1"/>
+              <a:t>FreeRTOS</a:t>
+            </a:r>
+            <a:r>
+              <a:rPr lang="de-DE" sz="2400" dirty="0"/>
+              <a:t> </a:t>
+            </a:r>
+            <a:r>
+              <a:rPr lang="de-DE" sz="2400" dirty="0" err="1"/>
+              <a:t>Config</a:t>
+            </a:r>
+            <a:endParaRPr lang="de-DE" sz="2400" dirty="0"/>
+          </a:p>
+          <a:p>
             <a:pPr marL="285750" indent="-285750">
               <a:buFont typeface="Wingdings" panose="05000000000000000000" pitchFamily="2" charset="2"/>
               <a:buChar char="§"/>
             </a:pPr>
-            <a:endParaRPr lang="de-DE" sz="2400" dirty="0"/>
-          </a:p>
-          <a:p>
-            <a:pPr marL="285750" indent="-285750">
+            <a:r>
+              <a:rPr lang="de-DE" sz="2400" dirty="0"/>
+              <a:t>3 Scheduling Optionen</a:t>
+            </a:r>
+          </a:p>
+          <a:p>
+            <a:pPr marL="742950" lvl="1" indent="-285750">
               <a:buFont typeface="Wingdings" panose="05000000000000000000" pitchFamily="2" charset="2"/>
               <a:buChar char="§"/>
             </a:pPr>
             <a:r>
+              <a:rPr lang="de-DE" sz="2400" dirty="0" err="1"/>
+              <a:t>Cooperative</a:t>
+            </a:r>
+            <a:r>
               <a:rPr lang="de-DE" sz="2400" dirty="0"/>
-              <a:t>3 Scheduling Optionen</a:t>
-            </a:r>
-          </a:p>
-          <a:p>
-            <a:pPr marL="285750" indent="-285750">
+              <a:t> Mode</a:t>
+            </a:r>
+          </a:p>
+          <a:p>
+            <a:pPr marL="742950" lvl="1" indent="-285750">
               <a:buFont typeface="Wingdings" panose="05000000000000000000" pitchFamily="2" charset="2"/>
               <a:buChar char="§"/>
             </a:pPr>
             <a:r>
               <a:rPr lang="de-DE" sz="2400" dirty="0" err="1"/>
-              <a:t>Cooperative</a:t>
+              <a:t>Preemptive</a:t>
             </a:r>
             <a:r>
               <a:rPr lang="de-DE" sz="2400" dirty="0"/>
@@ -15710,21 +15091,7 @@
             </a:r>
           </a:p>
           <a:p>
-            <a:pPr marL="285750" indent="-285750">
-              <a:buFont typeface="Wingdings" panose="05000000000000000000" pitchFamily="2" charset="2"/>
-              <a:buChar char="§"/>
-            </a:pPr>
-            <a:r>
-              <a:rPr lang="de-DE" sz="2400" dirty="0" err="1"/>
-              <a:t>Preemptive</a:t>
-            </a:r>
-            <a:r>
-              <a:rPr lang="de-DE" sz="2400" dirty="0"/>
-              <a:t> Mode</a:t>
-            </a:r>
-          </a:p>
-          <a:p>
-            <a:pPr marL="285750" indent="-285750">
+            <a:pPr marL="742950" lvl="1" indent="-285750">
               <a:buFont typeface="Wingdings" panose="05000000000000000000" pitchFamily="2" charset="2"/>
               <a:buChar char="§"/>
             </a:pPr>
@@ -15798,7 +15165,7 @@
           <p:nvPr/>
         </p:nvPicPr>
         <p:blipFill>
-          <a:blip r:embed="rId2">
+          <a:blip r:embed="rId3">
             <a:extLst>
               <a:ext uri="{28A0092B-C50C-407E-A947-70E740481C1C}">
                 <a14:useLocalDpi xmlns:a14="http://schemas.microsoft.com/office/drawing/2010/main" val="0"/>
@@ -15811,7 +15178,7 @@
         </p:blipFill>
         <p:spPr>
           <a:xfrm>
-            <a:off x="460292" y="2283935"/>
+            <a:off x="579164" y="2274791"/>
             <a:ext cx="4856901" cy="2885690"/>
           </a:xfrm>
           <a:prstGeom prst="rect">
@@ -15834,7 +15201,7 @@
           <p:nvPr/>
         </p:nvPicPr>
         <p:blipFill>
-          <a:blip r:embed="rId3">
+          <a:blip r:embed="rId4">
             <a:extLst>
               <a:ext uri="{28A0092B-C50C-407E-A947-70E740481C1C}">
                 <a14:useLocalDpi xmlns:a14="http://schemas.microsoft.com/office/drawing/2010/main" val="0"/>
@@ -15847,7 +15214,7 @@
         </p:blipFill>
         <p:spPr>
           <a:xfrm>
-            <a:off x="6531087" y="3589620"/>
+            <a:off x="6521943" y="3348083"/>
             <a:ext cx="3996653" cy="739106"/>
           </a:xfrm>
           <a:prstGeom prst="rect">
@@ -15943,7 +15310,7 @@
 </p:sld>
 </file>
 
-<file path=ppt/slides/slide19.xml><?xml version="1.0" encoding="utf-8"?>
+<file path=ppt/slides/slide18.xml><?xml version="1.0" encoding="utf-8"?>
 <p:sld xmlns:a="http://schemas.openxmlformats.org/drawingml/2006/main" xmlns:r="http://schemas.openxmlformats.org/officeDocument/2006/relationships" xmlns:p="http://schemas.openxmlformats.org/presentationml/2006/main">
   <p:cSld>
     <p:spTree>
@@ -16042,7 +15409,7 @@
         </p:blipFill>
         <p:spPr>
           <a:xfrm>
-            <a:off x="0" y="2384294"/>
+            <a:off x="0" y="2594606"/>
             <a:ext cx="6638037" cy="2457268"/>
           </a:xfrm>
           <a:prstGeom prst="rect">
@@ -16172,8 +15539,8 @@
         </p:nvSpPr>
         <p:spPr>
           <a:xfrm>
-            <a:off x="6961632" y="2384294"/>
-            <a:ext cx="4270248" cy="2215991"/>
+            <a:off x="6961632" y="2080252"/>
+            <a:ext cx="4270248" cy="4062651"/>
           </a:xfrm>
           <a:prstGeom prst="rect">
             <a:avLst/>
@@ -16235,8 +15602,39 @@
             </a:pPr>
             <a:r>
               <a:rPr lang="de-DE" sz="2400" dirty="0"/>
+              <a:t>Taskwechsel -Task mit höchster </a:t>
+            </a:r>
+            <a:r>
+              <a:rPr lang="de-DE" sz="2400" dirty="0" err="1"/>
+              <a:t>Prio</a:t>
+            </a:r>
+            <a:r>
+              <a:rPr lang="de-DE" sz="2400" dirty="0"/>
+              <a:t> wird gewählt. </a:t>
+            </a:r>
+          </a:p>
+          <a:p>
+            <a:pPr marL="285750" indent="-285750">
+              <a:buFont typeface="Wingdings" panose="05000000000000000000" pitchFamily="2" charset="2"/>
+              <a:buChar char="§"/>
+            </a:pPr>
+            <a:r>
+              <a:rPr lang="de-DE" sz="2400" dirty="0"/>
+              <a:t>Task gleicher Priorität wechseln sich ab (RR)</a:t>
+            </a:r>
+          </a:p>
+          <a:p>
+            <a:pPr marL="285750" indent="-285750">
+              <a:buFont typeface="Wingdings" panose="05000000000000000000" pitchFamily="2" charset="2"/>
+              <a:buChar char="§"/>
+            </a:pPr>
+            <a:r>
+              <a:rPr lang="de-DE" sz="2400" dirty="0"/>
               <a:t>Praktisch bei externen Ressourcen</a:t>
             </a:r>
+          </a:p>
+          <a:p>
+            <a:endParaRPr lang="de-DE" sz="2400" dirty="0"/>
           </a:p>
           <a:p>
             <a:endParaRPr lang="de-DE" dirty="0"/>
@@ -16253,6 +15651,712 @@
   <p:clrMapOvr>
     <a:masterClrMapping/>
   </p:clrMapOvr>
+  <p:timing>
+    <p:tnLst>
+      <p:par>
+        <p:cTn id="1" dur="indefinite" restart="never" nodeType="tmRoot">
+          <p:childTnLst>
+            <p:seq concurrent="1" nextAc="seek">
+              <p:cTn id="2" dur="indefinite" nodeType="mainSeq">
+                <p:childTnLst>
+                  <p:par>
+                    <p:cTn id="3" fill="hold">
+                      <p:stCondLst>
+                        <p:cond delay="indefinite"/>
+                      </p:stCondLst>
+                      <p:childTnLst>
+                        <p:par>
+                          <p:cTn id="4" fill="hold">
+                            <p:stCondLst>
+                              <p:cond delay="0"/>
+                            </p:stCondLst>
+                            <p:childTnLst>
+                              <p:par>
+                                <p:cTn id="5" presetID="1" presetClass="entr" presetSubtype="0" fill="hold" nodeType="clickEffect">
+                                  <p:stCondLst>
+                                    <p:cond delay="0"/>
+                                  </p:stCondLst>
+                                  <p:childTnLst>
+                                    <p:set>
+                                      <p:cBhvr>
+                                        <p:cTn id="6" dur="1" fill="hold">
+                                          <p:stCondLst>
+                                            <p:cond delay="0"/>
+                                          </p:stCondLst>
+                                        </p:cTn>
+                                        <p:tgtEl>
+                                          <p:spTgt spid="12">
+                                            <p:txEl>
+                                              <p:pRg st="0" end="0"/>
+                                            </p:txEl>
+                                          </p:spTgt>
+                                        </p:tgtEl>
+                                        <p:attrNameLst>
+                                          <p:attrName>style.visibility</p:attrName>
+                                        </p:attrNameLst>
+                                      </p:cBhvr>
+                                      <p:to>
+                                        <p:strVal val="visible"/>
+                                      </p:to>
+                                    </p:set>
+                                  </p:childTnLst>
+                                </p:cTn>
+                              </p:par>
+                              <p:par>
+                                <p:cTn id="7" presetID="1" presetClass="entr" presetSubtype="0" fill="hold" nodeType="withEffect">
+                                  <p:stCondLst>
+                                    <p:cond delay="0"/>
+                                  </p:stCondLst>
+                                  <p:childTnLst>
+                                    <p:set>
+                                      <p:cBhvr>
+                                        <p:cTn id="8" dur="1" fill="hold">
+                                          <p:stCondLst>
+                                            <p:cond delay="0"/>
+                                          </p:stCondLst>
+                                        </p:cTn>
+                                        <p:tgtEl>
+                                          <p:spTgt spid="12">
+                                            <p:txEl>
+                                              <p:pRg st="1" end="1"/>
+                                            </p:txEl>
+                                          </p:spTgt>
+                                        </p:tgtEl>
+                                        <p:attrNameLst>
+                                          <p:attrName>style.visibility</p:attrName>
+                                        </p:attrNameLst>
+                                      </p:cBhvr>
+                                      <p:to>
+                                        <p:strVal val="visible"/>
+                                      </p:to>
+                                    </p:set>
+                                  </p:childTnLst>
+                                </p:cTn>
+                              </p:par>
+                              <p:par>
+                                <p:cTn id="9" presetID="1" presetClass="entr" presetSubtype="0" fill="hold" nodeType="withEffect">
+                                  <p:stCondLst>
+                                    <p:cond delay="0"/>
+                                  </p:stCondLst>
+                                  <p:childTnLst>
+                                    <p:set>
+                                      <p:cBhvr>
+                                        <p:cTn id="10" dur="1" fill="hold">
+                                          <p:stCondLst>
+                                            <p:cond delay="0"/>
+                                          </p:stCondLst>
+                                        </p:cTn>
+                                        <p:tgtEl>
+                                          <p:spTgt spid="12">
+                                            <p:txEl>
+                                              <p:pRg st="2" end="2"/>
+                                            </p:txEl>
+                                          </p:spTgt>
+                                        </p:tgtEl>
+                                        <p:attrNameLst>
+                                          <p:attrName>style.visibility</p:attrName>
+                                        </p:attrNameLst>
+                                      </p:cBhvr>
+                                      <p:to>
+                                        <p:strVal val="visible"/>
+                                      </p:to>
+                                    </p:set>
+                                  </p:childTnLst>
+                                </p:cTn>
+                              </p:par>
+                            </p:childTnLst>
+                          </p:cTn>
+                        </p:par>
+                      </p:childTnLst>
+                    </p:cTn>
+                  </p:par>
+                  <p:par>
+                    <p:cTn id="11" fill="hold">
+                      <p:stCondLst>
+                        <p:cond delay="indefinite"/>
+                      </p:stCondLst>
+                      <p:childTnLst>
+                        <p:par>
+                          <p:cTn id="12" fill="hold">
+                            <p:stCondLst>
+                              <p:cond delay="0"/>
+                            </p:stCondLst>
+                            <p:childTnLst>
+                              <p:par>
+                                <p:cTn id="13" presetID="1" presetClass="entr" presetSubtype="0" fill="hold" nodeType="clickEffect">
+                                  <p:stCondLst>
+                                    <p:cond delay="0"/>
+                                  </p:stCondLst>
+                                  <p:childTnLst>
+                                    <p:set>
+                                      <p:cBhvr>
+                                        <p:cTn id="14" dur="1" fill="hold">
+                                          <p:stCondLst>
+                                            <p:cond delay="0"/>
+                                          </p:stCondLst>
+                                        </p:cTn>
+                                        <p:tgtEl>
+                                          <p:spTgt spid="12">
+                                            <p:txEl>
+                                              <p:pRg st="3" end="3"/>
+                                            </p:txEl>
+                                          </p:spTgt>
+                                        </p:tgtEl>
+                                        <p:attrNameLst>
+                                          <p:attrName>style.visibility</p:attrName>
+                                        </p:attrNameLst>
+                                      </p:cBhvr>
+                                      <p:to>
+                                        <p:strVal val="visible"/>
+                                      </p:to>
+                                    </p:set>
+                                  </p:childTnLst>
+                                </p:cTn>
+                              </p:par>
+                            </p:childTnLst>
+                          </p:cTn>
+                        </p:par>
+                      </p:childTnLst>
+                    </p:cTn>
+                  </p:par>
+                  <p:par>
+                    <p:cTn id="15" fill="hold">
+                      <p:stCondLst>
+                        <p:cond delay="indefinite"/>
+                      </p:stCondLst>
+                      <p:childTnLst>
+                        <p:par>
+                          <p:cTn id="16" fill="hold">
+                            <p:stCondLst>
+                              <p:cond delay="0"/>
+                            </p:stCondLst>
+                            <p:childTnLst>
+                              <p:par>
+                                <p:cTn id="17" presetID="1" presetClass="entr" presetSubtype="0" fill="hold" nodeType="clickEffect">
+                                  <p:stCondLst>
+                                    <p:cond delay="0"/>
+                                  </p:stCondLst>
+                                  <p:childTnLst>
+                                    <p:set>
+                                      <p:cBhvr>
+                                        <p:cTn id="18" dur="1" fill="hold">
+                                          <p:stCondLst>
+                                            <p:cond delay="0"/>
+                                          </p:stCondLst>
+                                        </p:cTn>
+                                        <p:tgtEl>
+                                          <p:spTgt spid="12">
+                                            <p:txEl>
+                                              <p:pRg st="4" end="4"/>
+                                            </p:txEl>
+                                          </p:spTgt>
+                                        </p:tgtEl>
+                                        <p:attrNameLst>
+                                          <p:attrName>style.visibility</p:attrName>
+                                        </p:attrNameLst>
+                                      </p:cBhvr>
+                                      <p:to>
+                                        <p:strVal val="visible"/>
+                                      </p:to>
+                                    </p:set>
+                                  </p:childTnLst>
+                                </p:cTn>
+                              </p:par>
+                            </p:childTnLst>
+                          </p:cTn>
+                        </p:par>
+                      </p:childTnLst>
+                    </p:cTn>
+                  </p:par>
+                  <p:par>
+                    <p:cTn id="19" fill="hold">
+                      <p:stCondLst>
+                        <p:cond delay="indefinite"/>
+                      </p:stCondLst>
+                      <p:childTnLst>
+                        <p:par>
+                          <p:cTn id="20" fill="hold">
+                            <p:stCondLst>
+                              <p:cond delay="0"/>
+                            </p:stCondLst>
+                            <p:childTnLst>
+                              <p:par>
+                                <p:cTn id="21" presetID="1" presetClass="entr" presetSubtype="0" fill="hold" nodeType="clickEffect">
+                                  <p:stCondLst>
+                                    <p:cond delay="0"/>
+                                  </p:stCondLst>
+                                  <p:childTnLst>
+                                    <p:set>
+                                      <p:cBhvr>
+                                        <p:cTn id="22" dur="1" fill="hold">
+                                          <p:stCondLst>
+                                            <p:cond delay="0"/>
+                                          </p:stCondLst>
+                                        </p:cTn>
+                                        <p:tgtEl>
+                                          <p:spTgt spid="5"/>
+                                        </p:tgtEl>
+                                        <p:attrNameLst>
+                                          <p:attrName>style.visibility</p:attrName>
+                                        </p:attrNameLst>
+                                      </p:cBhvr>
+                                      <p:to>
+                                        <p:strVal val="visible"/>
+                                      </p:to>
+                                    </p:set>
+                                  </p:childTnLst>
+                                </p:cTn>
+                              </p:par>
+                            </p:childTnLst>
+                          </p:cTn>
+                        </p:par>
+                      </p:childTnLst>
+                    </p:cTn>
+                  </p:par>
+                  <p:par>
+                    <p:cTn id="23" fill="hold">
+                      <p:stCondLst>
+                        <p:cond delay="indefinite"/>
+                      </p:stCondLst>
+                      <p:childTnLst>
+                        <p:par>
+                          <p:cTn id="24" fill="hold">
+                            <p:stCondLst>
+                              <p:cond delay="0"/>
+                            </p:stCondLst>
+                            <p:childTnLst>
+                              <p:par>
+                                <p:cTn id="25" presetID="1" presetClass="entr" presetSubtype="0" fill="hold" nodeType="clickEffect">
+                                  <p:stCondLst>
+                                    <p:cond delay="0"/>
+                                  </p:stCondLst>
+                                  <p:childTnLst>
+                                    <p:set>
+                                      <p:cBhvr>
+                                        <p:cTn id="26" dur="1" fill="hold">
+                                          <p:stCondLst>
+                                            <p:cond delay="0"/>
+                                          </p:stCondLst>
+                                        </p:cTn>
+                                        <p:tgtEl>
+                                          <p:spTgt spid="12">
+                                            <p:txEl>
+                                              <p:pRg st="5" end="5"/>
+                                            </p:txEl>
+                                          </p:spTgt>
+                                        </p:tgtEl>
+                                        <p:attrNameLst>
+                                          <p:attrName>style.visibility</p:attrName>
+                                        </p:attrNameLst>
+                                      </p:cBhvr>
+                                      <p:to>
+                                        <p:strVal val="visible"/>
+                                      </p:to>
+                                    </p:set>
+                                  </p:childTnLst>
+                                </p:cTn>
+                              </p:par>
+                            </p:childTnLst>
+                          </p:cTn>
+                        </p:par>
+                      </p:childTnLst>
+                    </p:cTn>
+                  </p:par>
+                </p:childTnLst>
+              </p:cTn>
+              <p:prevCondLst>
+                <p:cond evt="onPrev" delay="0">
+                  <p:tgtEl>
+                    <p:sldTgt/>
+                  </p:tgtEl>
+                </p:cond>
+              </p:prevCondLst>
+              <p:nextCondLst>
+                <p:cond evt="onNext" delay="0">
+                  <p:tgtEl>
+                    <p:sldTgt/>
+                  </p:tgtEl>
+                </p:cond>
+              </p:nextCondLst>
+            </p:seq>
+          </p:childTnLst>
+        </p:cTn>
+      </p:par>
+    </p:tnLst>
+  </p:timing>
+</p:sld>
+</file>
+
+<file path=ppt/slides/slide19.xml><?xml version="1.0" encoding="utf-8"?>
+<p:sld xmlns:a="http://schemas.openxmlformats.org/drawingml/2006/main" xmlns:r="http://schemas.openxmlformats.org/officeDocument/2006/relationships" xmlns:p="http://schemas.openxmlformats.org/presentationml/2006/main">
+  <p:cSld>
+    <p:spTree>
+      <p:nvGrpSpPr>
+        <p:cNvPr id="1" name=""/>
+        <p:cNvGrpSpPr/>
+        <p:nvPr/>
+      </p:nvGrpSpPr>
+      <p:grpSpPr>
+        <a:xfrm>
+          <a:off x="0" y="0"/>
+          <a:ext cx="0" cy="0"/>
+          <a:chOff x="0" y="0"/>
+          <a:chExt cx="0" cy="0"/>
+        </a:xfrm>
+      </p:grpSpPr>
+      <p:sp>
+        <p:nvSpPr>
+          <p:cNvPr id="2" name="Titel 1">
+            <a:extLst>
+              <a:ext uri="{FF2B5EF4-FFF2-40B4-BE49-F238E27FC236}">
+                <a16:creationId xmlns:a16="http://schemas.microsoft.com/office/drawing/2014/main" id="{83BA0C1A-5C57-4903-BCAC-8EF4B7B6E061}"/>
+              </a:ext>
+            </a:extLst>
+          </p:cNvPr>
+          <p:cNvSpPr>
+            <a:spLocks noGrp="1"/>
+          </p:cNvSpPr>
+          <p:nvPr>
+            <p:ph type="title"/>
+          </p:nvPr>
+        </p:nvSpPr>
+        <p:spPr/>
+        <p:txBody>
+          <a:bodyPr/>
+          <a:lstStyle/>
+          <a:p>
+            <a:r>
+              <a:rPr lang="de-DE" dirty="0" err="1"/>
+              <a:t>Preemptive</a:t>
+            </a:r>
+            <a:r>
+              <a:rPr lang="de-DE" dirty="0"/>
+              <a:t> Mode</a:t>
+            </a:r>
+          </a:p>
+        </p:txBody>
+      </p:sp>
+      <p:sp>
+        <p:nvSpPr>
+          <p:cNvPr id="4" name="Fußzeilenplatzhalter 3">
+            <a:extLst>
+              <a:ext uri="{FF2B5EF4-FFF2-40B4-BE49-F238E27FC236}">
+                <a16:creationId xmlns:a16="http://schemas.microsoft.com/office/drawing/2014/main" id="{B0E7112C-1805-4AB3-95F5-679174C76857}"/>
+              </a:ext>
+            </a:extLst>
+          </p:cNvPr>
+          <p:cNvSpPr>
+            <a:spLocks noGrp="1"/>
+          </p:cNvSpPr>
+          <p:nvPr>
+            <p:ph type="ftr" sz="quarter" idx="11"/>
+          </p:nvPr>
+        </p:nvSpPr>
+        <p:spPr/>
+        <p:txBody>
+          <a:bodyPr/>
+          <a:lstStyle/>
+          <a:p>
+            <a:r>
+              <a:rPr lang="de-DE" dirty="0"/>
+              <a:t>Scheduling</a:t>
+            </a:r>
+          </a:p>
+        </p:txBody>
+      </p:sp>
+      <p:pic>
+        <p:nvPicPr>
+          <p:cNvPr id="5" name="Grafik 4">
+            <a:extLst>
+              <a:ext uri="{FF2B5EF4-FFF2-40B4-BE49-F238E27FC236}">
+                <a16:creationId xmlns:a16="http://schemas.microsoft.com/office/drawing/2014/main" id="{E5E9BD3A-4987-4A32-A202-D5460725CD7D}"/>
+              </a:ext>
+            </a:extLst>
+          </p:cNvPr>
+          <p:cNvPicPr>
+            <a:picLocks noChangeAspect="1"/>
+          </p:cNvPicPr>
+          <p:nvPr/>
+        </p:nvPicPr>
+        <p:blipFill rotWithShape="1">
+          <a:blip r:embed="rId2"/>
+          <a:srcRect l="2669"/>
+          <a:stretch/>
+        </p:blipFill>
+        <p:spPr>
+          <a:xfrm>
+            <a:off x="100584" y="2403881"/>
+            <a:ext cx="6592824" cy="2538213"/>
+          </a:xfrm>
+          <a:prstGeom prst="rect">
+            <a:avLst/>
+          </a:prstGeom>
+        </p:spPr>
+      </p:pic>
+      <p:sp>
+        <p:nvSpPr>
+          <p:cNvPr id="6" name="Textfeld 5">
+            <a:extLst>
+              <a:ext uri="{FF2B5EF4-FFF2-40B4-BE49-F238E27FC236}">
+                <a16:creationId xmlns:a16="http://schemas.microsoft.com/office/drawing/2014/main" id="{86F6093D-DCC7-493F-AD35-4E0486367A3E}"/>
+              </a:ext>
+            </a:extLst>
+          </p:cNvPr>
+          <p:cNvSpPr txBox="1"/>
+          <p:nvPr/>
+        </p:nvSpPr>
+        <p:spPr>
+          <a:xfrm>
+            <a:off x="6556248" y="2934324"/>
+            <a:ext cx="5532120" cy="1846659"/>
+          </a:xfrm>
+          <a:prstGeom prst="rect">
+            <a:avLst/>
+          </a:prstGeom>
+          <a:noFill/>
+        </p:spPr>
+        <p:txBody>
+          <a:bodyPr wrap="square" rtlCol="0">
+            <a:spAutoFit/>
+          </a:bodyPr>
+          <a:lstStyle/>
+          <a:p>
+            <a:pPr marL="285750" indent="-285750">
+              <a:buFont typeface="Wingdings" panose="05000000000000000000" pitchFamily="2" charset="2"/>
+              <a:buChar char="§"/>
+            </a:pPr>
+            <a:r>
+              <a:rPr lang="de-DE" sz="2400" dirty="0"/>
+              <a:t>Ready Task mit high </a:t>
+            </a:r>
+            <a:r>
+              <a:rPr lang="de-DE" sz="2400" dirty="0" err="1"/>
+              <a:t>Prio</a:t>
+            </a:r>
+            <a:r>
+              <a:rPr lang="de-DE" sz="2400" dirty="0"/>
+              <a:t> verdrängt </a:t>
+            </a:r>
+            <a:r>
+              <a:rPr lang="de-DE" sz="2400" b="1" dirty="0"/>
+              <a:t>sofort</a:t>
+            </a:r>
+            <a:r>
+              <a:rPr lang="de-DE" sz="2400" dirty="0"/>
+              <a:t> Running Task mit </a:t>
+            </a:r>
+            <a:r>
+              <a:rPr lang="de-DE" sz="2400" dirty="0" err="1"/>
+              <a:t>low</a:t>
+            </a:r>
+            <a:r>
+              <a:rPr lang="de-DE" sz="2400" dirty="0"/>
+              <a:t> </a:t>
+            </a:r>
+            <a:r>
+              <a:rPr lang="de-DE" sz="2400" dirty="0" err="1"/>
+              <a:t>Prio</a:t>
+            </a:r>
+            <a:endParaRPr lang="de-DE" sz="2400" dirty="0"/>
+          </a:p>
+          <a:p>
+            <a:pPr marL="285750" indent="-285750">
+              <a:buFont typeface="Wingdings" panose="05000000000000000000" pitchFamily="2" charset="2"/>
+              <a:buChar char="§"/>
+            </a:pPr>
+            <a:r>
+              <a:rPr lang="de-DE" sz="2400" dirty="0"/>
+              <a:t>Task gleicher Priorität wechseln sich ab (RR)</a:t>
+            </a:r>
+          </a:p>
+          <a:p>
+            <a:endParaRPr lang="de-DE" dirty="0"/>
+          </a:p>
+        </p:txBody>
+      </p:sp>
+    </p:spTree>
+    <p:extLst>
+      <p:ext uri="{BB962C8B-B14F-4D97-AF65-F5344CB8AC3E}">
+        <p14:creationId xmlns:p14="http://schemas.microsoft.com/office/powerpoint/2010/main" val="3699201216"/>
+      </p:ext>
+    </p:extLst>
+  </p:cSld>
+  <p:clrMapOvr>
+    <a:masterClrMapping/>
+  </p:clrMapOvr>
+  <p:timing>
+    <p:tnLst>
+      <p:par>
+        <p:cTn id="1" dur="indefinite" restart="never" nodeType="tmRoot">
+          <p:childTnLst>
+            <p:seq concurrent="1" nextAc="seek">
+              <p:cTn id="2" dur="indefinite" nodeType="mainSeq">
+                <p:childTnLst>
+                  <p:par>
+                    <p:cTn id="3" fill="hold">
+                      <p:stCondLst>
+                        <p:cond delay="indefinite"/>
+                      </p:stCondLst>
+                      <p:childTnLst>
+                        <p:par>
+                          <p:cTn id="4" fill="hold">
+                            <p:stCondLst>
+                              <p:cond delay="0"/>
+                            </p:stCondLst>
+                            <p:childTnLst>
+                              <p:par>
+                                <p:cTn id="5" presetID="1" presetClass="entr" presetSubtype="0" fill="hold" nodeType="clickEffect">
+                                  <p:stCondLst>
+                                    <p:cond delay="0"/>
+                                  </p:stCondLst>
+                                  <p:childTnLst>
+                                    <p:set>
+                                      <p:cBhvr>
+                                        <p:cTn id="6" dur="1" fill="hold">
+                                          <p:stCondLst>
+                                            <p:cond delay="0"/>
+                                          </p:stCondLst>
+                                        </p:cTn>
+                                        <p:tgtEl>
+                                          <p:spTgt spid="6">
+                                            <p:txEl>
+                                              <p:pRg st="0" end="0"/>
+                                            </p:txEl>
+                                          </p:spTgt>
+                                        </p:tgtEl>
+                                        <p:attrNameLst>
+                                          <p:attrName>style.visibility</p:attrName>
+                                        </p:attrNameLst>
+                                      </p:cBhvr>
+                                      <p:to>
+                                        <p:strVal val="visible"/>
+                                      </p:to>
+                                    </p:set>
+                                  </p:childTnLst>
+                                </p:cTn>
+                              </p:par>
+                            </p:childTnLst>
+                          </p:cTn>
+                        </p:par>
+                      </p:childTnLst>
+                    </p:cTn>
+                  </p:par>
+                  <p:par>
+                    <p:cTn id="7" fill="hold">
+                      <p:stCondLst>
+                        <p:cond delay="indefinite"/>
+                      </p:stCondLst>
+                      <p:childTnLst>
+                        <p:par>
+                          <p:cTn id="8" fill="hold">
+                            <p:stCondLst>
+                              <p:cond delay="0"/>
+                            </p:stCondLst>
+                            <p:childTnLst>
+                              <p:par>
+                                <p:cTn id="9" presetID="1" presetClass="entr" presetSubtype="0" fill="hold" nodeType="clickEffect">
+                                  <p:stCondLst>
+                                    <p:cond delay="0"/>
+                                  </p:stCondLst>
+                                  <p:childTnLst>
+                                    <p:set>
+                                      <p:cBhvr>
+                                        <p:cTn id="10" dur="1" fill="hold">
+                                          <p:stCondLst>
+                                            <p:cond delay="0"/>
+                                          </p:stCondLst>
+                                        </p:cTn>
+                                        <p:tgtEl>
+                                          <p:spTgt spid="6">
+                                            <p:txEl>
+                                              <p:pRg st="1" end="1"/>
+                                            </p:txEl>
+                                          </p:spTgt>
+                                        </p:tgtEl>
+                                        <p:attrNameLst>
+                                          <p:attrName>style.visibility</p:attrName>
+                                        </p:attrNameLst>
+                                      </p:cBhvr>
+                                      <p:to>
+                                        <p:strVal val="visible"/>
+                                      </p:to>
+                                    </p:set>
+                                  </p:childTnLst>
+                                </p:cTn>
+                              </p:par>
+                            </p:childTnLst>
+                          </p:cTn>
+                        </p:par>
+                      </p:childTnLst>
+                    </p:cTn>
+                  </p:par>
+                  <p:par>
+                    <p:cTn id="11" fill="hold">
+                      <p:stCondLst>
+                        <p:cond delay="indefinite"/>
+                      </p:stCondLst>
+                      <p:childTnLst>
+                        <p:par>
+                          <p:cTn id="12" fill="hold">
+                            <p:stCondLst>
+                              <p:cond delay="0"/>
+                            </p:stCondLst>
+                            <p:childTnLst>
+                              <p:par>
+                                <p:cTn id="13" presetID="1" presetClass="entr" presetSubtype="0" fill="hold" nodeType="clickEffect">
+                                  <p:stCondLst>
+                                    <p:cond delay="0"/>
+                                  </p:stCondLst>
+                                  <p:childTnLst>
+                                    <p:set>
+                                      <p:cBhvr>
+                                        <p:cTn id="14" dur="1" fill="hold">
+                                          <p:stCondLst>
+                                            <p:cond delay="0"/>
+                                          </p:stCondLst>
+                                        </p:cTn>
+                                        <p:tgtEl>
+                                          <p:spTgt spid="5"/>
+                                        </p:tgtEl>
+                                        <p:attrNameLst>
+                                          <p:attrName>style.visibility</p:attrName>
+                                        </p:attrNameLst>
+                                      </p:cBhvr>
+                                      <p:to>
+                                        <p:strVal val="visible"/>
+                                      </p:to>
+                                    </p:set>
+                                  </p:childTnLst>
+                                </p:cTn>
+                              </p:par>
+                            </p:childTnLst>
+                          </p:cTn>
+                        </p:par>
+                      </p:childTnLst>
+                    </p:cTn>
+                  </p:par>
+                </p:childTnLst>
+              </p:cTn>
+              <p:prevCondLst>
+                <p:cond evt="onPrev" delay="0">
+                  <p:tgtEl>
+                    <p:sldTgt/>
+                  </p:tgtEl>
+                </p:cond>
+              </p:prevCondLst>
+              <p:nextCondLst>
+                <p:cond evt="onNext" delay="0">
+                  <p:tgtEl>
+                    <p:sldTgt/>
+                  </p:tgtEl>
+                </p:cond>
+              </p:nextCondLst>
+            </p:seq>
+          </p:childTnLst>
+        </p:cTn>
+      </p:par>
+    </p:tnLst>
+  </p:timing>
 </p:sld>
 </file>
 
@@ -16313,13 +16417,13 @@
         <p:spPr/>
         <p:txBody>
           <a:bodyPr>
-            <a:normAutofit lnSpcReduction="10000"/>
+            <a:normAutofit/>
           </a:bodyPr>
           <a:lstStyle/>
           <a:p>
             <a:r>
               <a:rPr lang="de-DE" dirty="0"/>
-              <a:t>Einleitung</a:t>
+              <a:t>Echtzeitsysteme</a:t>
             </a:r>
           </a:p>
           <a:p>
@@ -16379,12 +16483,6 @@
             <a:r>
               <a:rPr lang="de-DE" dirty="0"/>
               <a:t>Low Power Modes</a:t>
-            </a:r>
-          </a:p>
-          <a:p>
-            <a:r>
-              <a:rPr lang="de-DE" dirty="0"/>
-              <a:t>Tools</a:t>
             </a:r>
           </a:p>
         </p:txBody>
@@ -16756,49 +16854,6 @@
                                   </p:childTnLst>
                                 </p:cTn>
                               </p:par>
-                              <p:par>
-                                <p:cTn id="30" presetID="3" presetClass="entr" presetSubtype="10" fill="hold" nodeType="withEffect">
-                                  <p:stCondLst>
-                                    <p:cond delay="0"/>
-                                  </p:stCondLst>
-                                  <p:childTnLst>
-                                    <p:set>
-                                      <p:cBhvr>
-                                        <p:cTn id="31" dur="1" fill="hold">
-                                          <p:stCondLst>
-                                            <p:cond delay="0"/>
-                                          </p:stCondLst>
-                                        </p:cTn>
-                                        <p:tgtEl>
-                                          <p:spTgt spid="3">
-                                            <p:txEl>
-                                              <p:pRg st="8" end="8"/>
-                                            </p:txEl>
-                                          </p:spTgt>
-                                        </p:tgtEl>
-                                        <p:attrNameLst>
-                                          <p:attrName>style.visibility</p:attrName>
-                                        </p:attrNameLst>
-                                      </p:cBhvr>
-                                      <p:to>
-                                        <p:strVal val="visible"/>
-                                      </p:to>
-                                    </p:set>
-                                    <p:animEffect transition="in" filter="blinds(horizontal)">
-                                      <p:cBhvr>
-                                        <p:cTn id="32" dur="500"/>
-                                        <p:tgtEl>
-                                          <p:spTgt spid="3">
-                                            <p:txEl>
-                                              <p:pRg st="8" end="8"/>
-                                            </p:txEl>
-                                          </p:spTgt>
-                                        </p:tgtEl>
-                                      </p:cBhvr>
-                                    </p:animEffect>
-                                  </p:childTnLst>
-                                </p:cTn>
-                              </p:par>
                             </p:childTnLst>
                           </p:cTn>
                         </p:par>
@@ -16852,241 +16907,6 @@
           <p:cNvPr id="2" name="Titel 1">
             <a:extLst>
               <a:ext uri="{FF2B5EF4-FFF2-40B4-BE49-F238E27FC236}">
-                <a16:creationId xmlns:a16="http://schemas.microsoft.com/office/drawing/2014/main" id="{83BA0C1A-5C57-4903-BCAC-8EF4B7B6E061}"/>
-              </a:ext>
-            </a:extLst>
-          </p:cNvPr>
-          <p:cNvSpPr>
-            <a:spLocks noGrp="1"/>
-          </p:cNvSpPr>
-          <p:nvPr>
-            <p:ph type="title"/>
-          </p:nvPr>
-        </p:nvSpPr>
-        <p:spPr/>
-        <p:txBody>
-          <a:bodyPr/>
-          <a:lstStyle/>
-          <a:p>
-            <a:r>
-              <a:rPr lang="de-DE" dirty="0" err="1"/>
-              <a:t>Preemptive</a:t>
-            </a:r>
-            <a:r>
-              <a:rPr lang="de-DE" dirty="0"/>
-              <a:t> Mode</a:t>
-            </a:r>
-          </a:p>
-        </p:txBody>
-      </p:sp>
-      <p:sp>
-        <p:nvSpPr>
-          <p:cNvPr id="4" name="Fußzeilenplatzhalter 3">
-            <a:extLst>
-              <a:ext uri="{FF2B5EF4-FFF2-40B4-BE49-F238E27FC236}">
-                <a16:creationId xmlns:a16="http://schemas.microsoft.com/office/drawing/2014/main" id="{B0E7112C-1805-4AB3-95F5-679174C76857}"/>
-              </a:ext>
-            </a:extLst>
-          </p:cNvPr>
-          <p:cNvSpPr>
-            <a:spLocks noGrp="1"/>
-          </p:cNvSpPr>
-          <p:nvPr>
-            <p:ph type="ftr" sz="quarter" idx="11"/>
-          </p:nvPr>
-        </p:nvSpPr>
-        <p:spPr/>
-        <p:txBody>
-          <a:bodyPr/>
-          <a:lstStyle/>
-          <a:p>
-            <a:r>
-              <a:rPr lang="de-DE" dirty="0"/>
-              <a:t>Scheduling</a:t>
-            </a:r>
-          </a:p>
-        </p:txBody>
-      </p:sp>
-      <p:pic>
-        <p:nvPicPr>
-          <p:cNvPr id="5" name="Grafik 4">
-            <a:extLst>
-              <a:ext uri="{FF2B5EF4-FFF2-40B4-BE49-F238E27FC236}">
-                <a16:creationId xmlns:a16="http://schemas.microsoft.com/office/drawing/2014/main" id="{E5E9BD3A-4987-4A32-A202-D5460725CD7D}"/>
-              </a:ext>
-            </a:extLst>
-          </p:cNvPr>
-          <p:cNvPicPr>
-            <a:picLocks noChangeAspect="1"/>
-          </p:cNvPicPr>
-          <p:nvPr/>
-        </p:nvPicPr>
-        <p:blipFill rotWithShape="1">
-          <a:blip r:embed="rId2"/>
-          <a:srcRect l="2669"/>
-          <a:stretch/>
-        </p:blipFill>
-        <p:spPr>
-          <a:xfrm>
-            <a:off x="0" y="2431404"/>
-            <a:ext cx="6592824" cy="2538213"/>
-          </a:xfrm>
-          <a:prstGeom prst="rect">
-            <a:avLst/>
-          </a:prstGeom>
-        </p:spPr>
-      </p:pic>
-      <p:sp>
-        <p:nvSpPr>
-          <p:cNvPr id="6" name="Textfeld 5">
-            <a:extLst>
-              <a:ext uri="{FF2B5EF4-FFF2-40B4-BE49-F238E27FC236}">
-                <a16:creationId xmlns:a16="http://schemas.microsoft.com/office/drawing/2014/main" id="{86F6093D-DCC7-493F-AD35-4E0486367A3E}"/>
-              </a:ext>
-            </a:extLst>
-          </p:cNvPr>
-          <p:cNvSpPr txBox="1"/>
-          <p:nvPr/>
-        </p:nvSpPr>
-        <p:spPr>
-          <a:xfrm>
-            <a:off x="6547104" y="2431404"/>
-            <a:ext cx="5532120" cy="2954655"/>
-          </a:xfrm>
-          <a:prstGeom prst="rect">
-            <a:avLst/>
-          </a:prstGeom>
-          <a:noFill/>
-        </p:spPr>
-        <p:txBody>
-          <a:bodyPr wrap="square" rtlCol="0">
-            <a:spAutoFit/>
-          </a:bodyPr>
-          <a:lstStyle/>
-          <a:p>
-            <a:pPr marL="285750" indent="-285750">
-              <a:buFont typeface="Wingdings" panose="05000000000000000000" pitchFamily="2" charset="2"/>
-              <a:buChar char="§"/>
-            </a:pPr>
-            <a:r>
-              <a:rPr lang="de-DE" sz="2400" dirty="0"/>
-              <a:t>Task mit high </a:t>
-            </a:r>
-            <a:r>
-              <a:rPr lang="de-DE" sz="2400" dirty="0" err="1"/>
-              <a:t>Prio</a:t>
-            </a:r>
-            <a:r>
-              <a:rPr lang="de-DE" sz="2400" dirty="0"/>
-              <a:t> verdrängt Task mit </a:t>
-            </a:r>
-            <a:r>
-              <a:rPr lang="de-DE" sz="2400" dirty="0" err="1"/>
-              <a:t>low</a:t>
-            </a:r>
-            <a:r>
-              <a:rPr lang="de-DE" sz="2400" dirty="0"/>
-              <a:t> </a:t>
-            </a:r>
-            <a:r>
-              <a:rPr lang="de-DE" sz="2400" dirty="0" err="1"/>
-              <a:t>Prio</a:t>
-            </a:r>
-            <a:endParaRPr lang="de-DE" sz="2400" dirty="0"/>
-          </a:p>
-          <a:p>
-            <a:pPr marL="285750" indent="-285750">
-              <a:buFont typeface="Wingdings" panose="05000000000000000000" pitchFamily="2" charset="2"/>
-              <a:buChar char="§"/>
-            </a:pPr>
-            <a:r>
-              <a:rPr lang="de-DE" sz="2400" dirty="0"/>
-              <a:t>Task gleicher Priorität wechseln sich ab</a:t>
-            </a:r>
-          </a:p>
-          <a:p>
-            <a:pPr marL="285750" indent="-285750">
-              <a:buFont typeface="Wingdings" panose="05000000000000000000" pitchFamily="2" charset="2"/>
-              <a:buChar char="§"/>
-            </a:pPr>
-            <a:r>
-              <a:rPr lang="de-DE" sz="2400" dirty="0"/>
-              <a:t>Timing basieren auf dem </a:t>
-            </a:r>
-            <a:r>
-              <a:rPr lang="de-DE" sz="2400" dirty="0" err="1"/>
-              <a:t>Systick</a:t>
-            </a:r>
-            <a:endParaRPr lang="de-DE" sz="2400" dirty="0"/>
-          </a:p>
-          <a:p>
-            <a:pPr marL="285750" indent="-285750">
-              <a:buFont typeface="Wingdings" panose="05000000000000000000" pitchFamily="2" charset="2"/>
-              <a:buChar char="§"/>
-            </a:pPr>
-            <a:r>
-              <a:rPr lang="de-DE" sz="2400" dirty="0"/>
-              <a:t>Gewöhnlich zwischen 1 und 100 </a:t>
-            </a:r>
-            <a:r>
-              <a:rPr lang="de-DE" sz="2400" dirty="0" err="1"/>
-              <a:t>ms</a:t>
-            </a:r>
-            <a:r>
-              <a:rPr lang="de-DE" sz="2400" dirty="0"/>
-              <a:t> Tick</a:t>
-            </a:r>
-          </a:p>
-          <a:p>
-            <a:pPr marL="285750" indent="-285750">
-              <a:buFont typeface="Wingdings" panose="05000000000000000000" pitchFamily="2" charset="2"/>
-              <a:buChar char="§"/>
-            </a:pPr>
-            <a:r>
-              <a:rPr lang="de-DE" sz="2400" dirty="0"/>
-              <a:t>Die wohl am häufigsten verwendete Konfiguration</a:t>
-            </a:r>
-          </a:p>
-          <a:p>
-            <a:endParaRPr lang="de-DE" dirty="0"/>
-          </a:p>
-        </p:txBody>
-      </p:sp>
-    </p:spTree>
-    <p:extLst>
-      <p:ext uri="{BB962C8B-B14F-4D97-AF65-F5344CB8AC3E}">
-        <p14:creationId xmlns:p14="http://schemas.microsoft.com/office/powerpoint/2010/main" val="3699201216"/>
-      </p:ext>
-    </p:extLst>
-  </p:cSld>
-  <p:clrMapOvr>
-    <a:masterClrMapping/>
-  </p:clrMapOvr>
-</p:sld>
-</file>
-
-<file path=ppt/slides/slide21.xml><?xml version="1.0" encoding="utf-8"?>
-<p:sld xmlns:a="http://schemas.openxmlformats.org/drawingml/2006/main" xmlns:r="http://schemas.openxmlformats.org/officeDocument/2006/relationships" xmlns:p="http://schemas.openxmlformats.org/presentationml/2006/main">
-  <p:cSld>
-    <p:spTree>
-      <p:nvGrpSpPr>
-        <p:cNvPr id="1" name=""/>
-        <p:cNvGrpSpPr/>
-        <p:nvPr/>
-      </p:nvGrpSpPr>
-      <p:grpSpPr>
-        <a:xfrm>
-          <a:off x="0" y="0"/>
-          <a:ext cx="0" cy="0"/>
-          <a:chOff x="0" y="0"/>
-          <a:chExt cx="0" cy="0"/>
-        </a:xfrm>
-      </p:grpSpPr>
-      <p:sp>
-        <p:nvSpPr>
-          <p:cNvPr id="2" name="Titel 1">
-            <a:extLst>
-              <a:ext uri="{FF2B5EF4-FFF2-40B4-BE49-F238E27FC236}">
                 <a16:creationId xmlns:a16="http://schemas.microsoft.com/office/drawing/2014/main" id="{58ADEC9F-BEB8-403E-B5B2-21FB12CBD397}"/>
               </a:ext>
             </a:extLst>
@@ -17164,7 +16984,7 @@
         </p:blipFill>
         <p:spPr>
           <a:xfrm>
-            <a:off x="23575" y="2487169"/>
+            <a:off x="0" y="1690688"/>
             <a:ext cx="6331505" cy="2145334"/>
           </a:xfrm>
           <a:prstGeom prst="rect">
@@ -17186,8 +17006,8 @@
         </p:nvSpPr>
         <p:spPr>
           <a:xfrm>
-            <a:off x="6355080" y="2384294"/>
-            <a:ext cx="5532120" cy="2585323"/>
+            <a:off x="6331505" y="2439158"/>
+            <a:ext cx="5532120" cy="2954655"/>
           </a:xfrm>
           <a:prstGeom prst="rect">
             <a:avLst/>
@@ -17234,11 +17054,11 @@
             </a:pPr>
             <a:r>
               <a:rPr lang="de-DE" sz="2400" dirty="0"/>
-              <a:t>Timing basieren auf dem </a:t>
+              <a:t>Feste </a:t>
             </a:r>
             <a:r>
               <a:rPr lang="de-DE" sz="2400" dirty="0" err="1"/>
-              <a:t>Systick</a:t>
+              <a:t>Schedulingintervalle</a:t>
             </a:r>
             <a:endParaRPr lang="de-DE" sz="2400" dirty="0"/>
           </a:p>
@@ -17267,6 +17087,21 @@
             </a:pPr>
             <a:r>
               <a:rPr lang="de-DE" sz="2400" dirty="0"/>
+              <a:t>Timing basieren auf dem </a:t>
+            </a:r>
+            <a:r>
+              <a:rPr lang="de-DE" sz="2400" dirty="0" err="1"/>
+              <a:t>Systick</a:t>
+            </a:r>
+            <a:endParaRPr lang="de-DE" sz="2400" dirty="0"/>
+          </a:p>
+          <a:p>
+            <a:pPr marL="285750" indent="-285750">
+              <a:buFont typeface="Wingdings" panose="05000000000000000000" pitchFamily="2" charset="2"/>
+              <a:buChar char="§"/>
+            </a:pPr>
+            <a:r>
+              <a:rPr lang="de-DE" sz="2400" dirty="0"/>
               <a:t>Die wohl am häufigsten verwendete Konfiguration</a:t>
             </a:r>
           </a:p>
@@ -17275,6 +17110,42 @@
           </a:p>
         </p:txBody>
       </p:sp>
+      <p:pic>
+        <p:nvPicPr>
+          <p:cNvPr id="7" name="Grafik 6">
+            <a:extLst>
+              <a:ext uri="{FF2B5EF4-FFF2-40B4-BE49-F238E27FC236}">
+                <a16:creationId xmlns:a16="http://schemas.microsoft.com/office/drawing/2014/main" id="{D829BEF9-9AB3-4B0A-A7B1-BCC8900D9E73}"/>
+              </a:ext>
+            </a:extLst>
+          </p:cNvPr>
+          <p:cNvPicPr>
+            <a:picLocks noChangeAspect="1"/>
+          </p:cNvPicPr>
+          <p:nvPr/>
+        </p:nvPicPr>
+        <p:blipFill>
+          <a:blip r:embed="rId3">
+            <a:extLst>
+              <a:ext uri="{28A0092B-C50C-407E-A947-70E740481C1C}">
+                <a14:useLocalDpi xmlns:a14="http://schemas.microsoft.com/office/drawing/2010/main" val="0"/>
+              </a:ext>
+            </a:extLst>
+          </a:blip>
+          <a:stretch>
+            <a:fillRect/>
+          </a:stretch>
+        </p:blipFill>
+        <p:spPr>
+          <a:xfrm>
+            <a:off x="916296" y="4027087"/>
+            <a:ext cx="5037257" cy="1912786"/>
+          </a:xfrm>
+          <a:prstGeom prst="rect">
+            <a:avLst/>
+          </a:prstGeom>
+        </p:spPr>
+      </p:pic>
     </p:spTree>
     <p:extLst>
       <p:ext uri="{BB962C8B-B14F-4D97-AF65-F5344CB8AC3E}">
@@ -17288,7 +17159,7 @@
 </p:sld>
 </file>
 
-<file path=ppt/slides/slide22.xml><?xml version="1.0" encoding="utf-8"?>
+<file path=ppt/slides/slide21.xml><?xml version="1.0" encoding="utf-8"?>
 <p:sld xmlns:a="http://schemas.openxmlformats.org/drawingml/2006/main" xmlns:r="http://schemas.openxmlformats.org/officeDocument/2006/relationships" xmlns:p="http://schemas.openxmlformats.org/presentationml/2006/main">
   <p:cSld>
     <p:spTree>
@@ -17328,7 +17199,7 @@
           <a:p>
             <a:r>
               <a:rPr lang="de-DE" dirty="0"/>
-              <a:t>Echtzeit</a:t>
+              <a:t>Echtzeitfähigkeit</a:t>
             </a:r>
           </a:p>
         </p:txBody>
@@ -17351,10 +17222,148 @@
         </p:nvSpPr>
         <p:spPr/>
         <p:txBody>
-          <a:bodyPr/>
+          <a:bodyPr>
+            <a:normAutofit fontScale="92500" lnSpcReduction="20000"/>
+          </a:bodyPr>
           <a:lstStyle/>
           <a:p>
-            <a:endParaRPr lang="de-DE"/>
+            <a:r>
+              <a:rPr lang="de-DE" dirty="0"/>
+              <a:t>Eintreffendes Ereignisse  </a:t>
+            </a:r>
+            <a:r>
+              <a:rPr lang="de-DE" dirty="0">
+                <a:sym typeface="Wingdings" panose="05000000000000000000" pitchFamily="2" charset="2"/>
+              </a:rPr>
+              <a:t> deterministische Antwort</a:t>
+            </a:r>
+          </a:p>
+          <a:p>
+            <a:r>
+              <a:rPr lang="de-DE" dirty="0">
+                <a:sym typeface="Wingdings" panose="05000000000000000000" pitchFamily="2" charset="2"/>
+              </a:rPr>
+              <a:t>Wie?</a:t>
+            </a:r>
+          </a:p>
+          <a:p>
+            <a:pPr lvl="1"/>
+            <a:r>
+              <a:rPr lang="de-DE" dirty="0">
+                <a:sym typeface="Wingdings" panose="05000000000000000000" pitchFamily="2" charset="2"/>
+              </a:rPr>
+              <a:t>Geeignete Scheduling Algorithmen (z.B. Fixed </a:t>
+            </a:r>
+            <a:r>
+              <a:rPr lang="de-DE" dirty="0" err="1">
+                <a:sym typeface="Wingdings" panose="05000000000000000000" pitchFamily="2" charset="2"/>
+              </a:rPr>
+              <a:t>Preemtive</a:t>
+            </a:r>
+            <a:r>
+              <a:rPr lang="de-DE" dirty="0">
+                <a:sym typeface="Wingdings" panose="05000000000000000000" pitchFamily="2" charset="2"/>
+              </a:rPr>
+              <a:t> Scheduling)</a:t>
+            </a:r>
+          </a:p>
+          <a:p>
+            <a:pPr lvl="1"/>
+            <a:r>
+              <a:rPr lang="de-DE" dirty="0"/>
+              <a:t>Nichtblockierende Intertaskkommunikation</a:t>
+            </a:r>
+          </a:p>
+          <a:p>
+            <a:r>
+              <a:rPr lang="de-DE" dirty="0" err="1"/>
+              <a:t>Schedulinganalyse</a:t>
+            </a:r>
+            <a:endParaRPr lang="de-DE" dirty="0"/>
+          </a:p>
+          <a:p>
+            <a:pPr lvl="1"/>
+            <a:r>
+              <a:rPr lang="de-DE" dirty="0"/>
+              <a:t>Design Phase</a:t>
+            </a:r>
+          </a:p>
+          <a:p>
+            <a:pPr lvl="1"/>
+            <a:r>
+              <a:rPr lang="de-DE" dirty="0" err="1"/>
+              <a:t>Worst</a:t>
+            </a:r>
+            <a:r>
+              <a:rPr lang="de-DE" dirty="0"/>
+              <a:t> Case </a:t>
+            </a:r>
+            <a:r>
+              <a:rPr lang="de-DE" dirty="0" err="1"/>
+              <a:t>Runtime</a:t>
+            </a:r>
+            <a:r>
+              <a:rPr lang="de-DE" dirty="0"/>
+              <a:t> / </a:t>
+            </a:r>
+            <a:r>
+              <a:rPr lang="de-DE" dirty="0" err="1"/>
+              <a:t>Worst</a:t>
+            </a:r>
+            <a:r>
+              <a:rPr lang="de-DE" dirty="0"/>
+              <a:t> Case Response Times</a:t>
+            </a:r>
+          </a:p>
+          <a:p>
+            <a:pPr lvl="1"/>
+            <a:r>
+              <a:rPr lang="de-DE" dirty="0"/>
+              <a:t>RMA / DMA</a:t>
+            </a:r>
+          </a:p>
+          <a:p>
+            <a:r>
+              <a:rPr lang="de-DE" dirty="0"/>
+              <a:t>Für welche System ist </a:t>
+            </a:r>
+            <a:r>
+              <a:rPr lang="de-DE" dirty="0" err="1"/>
+              <a:t>FreeRTOS</a:t>
+            </a:r>
+            <a:r>
+              <a:rPr lang="de-DE" dirty="0"/>
+              <a:t> geeignet ?</a:t>
+            </a:r>
+          </a:p>
+          <a:p>
+            <a:pPr lvl="1"/>
+            <a:r>
+              <a:rPr lang="de-DE" dirty="0"/>
+              <a:t>Für weiche Echtzeitsystem</a:t>
+            </a:r>
+          </a:p>
+          <a:p>
+            <a:pPr lvl="1"/>
+            <a:r>
+              <a:rPr lang="de-DE" dirty="0"/>
+              <a:t>Für harte Echtzeitsysteme von den Anforderungen / Kontext abhängig</a:t>
+            </a:r>
+          </a:p>
+          <a:p>
+            <a:pPr lvl="1"/>
+            <a:r>
+              <a:rPr lang="de-DE" dirty="0"/>
+              <a:t>Für harte Echtzeitmessung erforderlich</a:t>
+            </a:r>
+          </a:p>
+          <a:p>
+            <a:pPr lvl="1"/>
+            <a:endParaRPr lang="de-DE" dirty="0"/>
+          </a:p>
+          <a:p>
+            <a:pPr lvl="1"/>
+            <a:endParaRPr lang="de-DE" dirty="0"/>
           </a:p>
         </p:txBody>
       </p:sp>
@@ -17396,10 +17405,484 @@
   <p:clrMapOvr>
     <a:masterClrMapping/>
   </p:clrMapOvr>
+  <p:timing>
+    <p:tnLst>
+      <p:par>
+        <p:cTn id="1" dur="indefinite" restart="never" nodeType="tmRoot">
+          <p:childTnLst>
+            <p:seq concurrent="1" nextAc="seek">
+              <p:cTn id="2" dur="indefinite" nodeType="mainSeq">
+                <p:childTnLst>
+                  <p:par>
+                    <p:cTn id="3" fill="hold">
+                      <p:stCondLst>
+                        <p:cond delay="indefinite"/>
+                      </p:stCondLst>
+                      <p:childTnLst>
+                        <p:par>
+                          <p:cTn id="4" fill="hold">
+                            <p:stCondLst>
+                              <p:cond delay="0"/>
+                            </p:stCondLst>
+                            <p:childTnLst>
+                              <p:par>
+                                <p:cTn id="5" presetID="1" presetClass="entr" presetSubtype="0" fill="hold" nodeType="clickEffect">
+                                  <p:stCondLst>
+                                    <p:cond delay="0"/>
+                                  </p:stCondLst>
+                                  <p:childTnLst>
+                                    <p:set>
+                                      <p:cBhvr>
+                                        <p:cTn id="6" dur="1" fill="hold">
+                                          <p:stCondLst>
+                                            <p:cond delay="0"/>
+                                          </p:stCondLst>
+                                        </p:cTn>
+                                        <p:tgtEl>
+                                          <p:spTgt spid="3">
+                                            <p:txEl>
+                                              <p:pRg st="0" end="0"/>
+                                            </p:txEl>
+                                          </p:spTgt>
+                                        </p:tgtEl>
+                                        <p:attrNameLst>
+                                          <p:attrName>style.visibility</p:attrName>
+                                        </p:attrNameLst>
+                                      </p:cBhvr>
+                                      <p:to>
+                                        <p:strVal val="visible"/>
+                                      </p:to>
+                                    </p:set>
+                                  </p:childTnLst>
+                                </p:cTn>
+                              </p:par>
+                            </p:childTnLst>
+                          </p:cTn>
+                        </p:par>
+                      </p:childTnLst>
+                    </p:cTn>
+                  </p:par>
+                  <p:par>
+                    <p:cTn id="7" fill="hold">
+                      <p:stCondLst>
+                        <p:cond delay="indefinite"/>
+                      </p:stCondLst>
+                      <p:childTnLst>
+                        <p:par>
+                          <p:cTn id="8" fill="hold">
+                            <p:stCondLst>
+                              <p:cond delay="0"/>
+                            </p:stCondLst>
+                            <p:childTnLst>
+                              <p:par>
+                                <p:cTn id="9" presetID="1" presetClass="entr" presetSubtype="0" fill="hold" nodeType="clickEffect">
+                                  <p:stCondLst>
+                                    <p:cond delay="0"/>
+                                  </p:stCondLst>
+                                  <p:childTnLst>
+                                    <p:set>
+                                      <p:cBhvr>
+                                        <p:cTn id="10" dur="1" fill="hold">
+                                          <p:stCondLst>
+                                            <p:cond delay="0"/>
+                                          </p:stCondLst>
+                                        </p:cTn>
+                                        <p:tgtEl>
+                                          <p:spTgt spid="3">
+                                            <p:txEl>
+                                              <p:pRg st="1" end="1"/>
+                                            </p:txEl>
+                                          </p:spTgt>
+                                        </p:tgtEl>
+                                        <p:attrNameLst>
+                                          <p:attrName>style.visibility</p:attrName>
+                                        </p:attrNameLst>
+                                      </p:cBhvr>
+                                      <p:to>
+                                        <p:strVal val="visible"/>
+                                      </p:to>
+                                    </p:set>
+                                  </p:childTnLst>
+                                </p:cTn>
+                              </p:par>
+                              <p:par>
+                                <p:cTn id="11" presetID="1" presetClass="entr" presetSubtype="0" fill="hold" nodeType="withEffect">
+                                  <p:stCondLst>
+                                    <p:cond delay="0"/>
+                                  </p:stCondLst>
+                                  <p:childTnLst>
+                                    <p:set>
+                                      <p:cBhvr>
+                                        <p:cTn id="12" dur="1" fill="hold">
+                                          <p:stCondLst>
+                                            <p:cond delay="0"/>
+                                          </p:stCondLst>
+                                        </p:cTn>
+                                        <p:tgtEl>
+                                          <p:spTgt spid="3">
+                                            <p:txEl>
+                                              <p:pRg st="2" end="2"/>
+                                            </p:txEl>
+                                          </p:spTgt>
+                                        </p:tgtEl>
+                                        <p:attrNameLst>
+                                          <p:attrName>style.visibility</p:attrName>
+                                        </p:attrNameLst>
+                                      </p:cBhvr>
+                                      <p:to>
+                                        <p:strVal val="visible"/>
+                                      </p:to>
+                                    </p:set>
+                                  </p:childTnLst>
+                                </p:cTn>
+                              </p:par>
+                              <p:par>
+                                <p:cTn id="13" presetID="1" presetClass="entr" presetSubtype="0" fill="hold" nodeType="withEffect">
+                                  <p:stCondLst>
+                                    <p:cond delay="0"/>
+                                  </p:stCondLst>
+                                  <p:childTnLst>
+                                    <p:set>
+                                      <p:cBhvr>
+                                        <p:cTn id="14" dur="1" fill="hold">
+                                          <p:stCondLst>
+                                            <p:cond delay="0"/>
+                                          </p:stCondLst>
+                                        </p:cTn>
+                                        <p:tgtEl>
+                                          <p:spTgt spid="3">
+                                            <p:txEl>
+                                              <p:pRg st="3" end="3"/>
+                                            </p:txEl>
+                                          </p:spTgt>
+                                        </p:tgtEl>
+                                        <p:attrNameLst>
+                                          <p:attrName>style.visibility</p:attrName>
+                                        </p:attrNameLst>
+                                      </p:cBhvr>
+                                      <p:to>
+                                        <p:strVal val="visible"/>
+                                      </p:to>
+                                    </p:set>
+                                  </p:childTnLst>
+                                </p:cTn>
+                              </p:par>
+                            </p:childTnLst>
+                          </p:cTn>
+                        </p:par>
+                      </p:childTnLst>
+                    </p:cTn>
+                  </p:par>
+                  <p:par>
+                    <p:cTn id="15" fill="hold">
+                      <p:stCondLst>
+                        <p:cond delay="indefinite"/>
+                      </p:stCondLst>
+                      <p:childTnLst>
+                        <p:par>
+                          <p:cTn id="16" fill="hold">
+                            <p:stCondLst>
+                              <p:cond delay="0"/>
+                            </p:stCondLst>
+                            <p:childTnLst>
+                              <p:par>
+                                <p:cTn id="17" presetID="1" presetClass="entr" presetSubtype="0" fill="hold" nodeType="clickEffect">
+                                  <p:stCondLst>
+                                    <p:cond delay="0"/>
+                                  </p:stCondLst>
+                                  <p:childTnLst>
+                                    <p:set>
+                                      <p:cBhvr>
+                                        <p:cTn id="18" dur="1" fill="hold">
+                                          <p:stCondLst>
+                                            <p:cond delay="0"/>
+                                          </p:stCondLst>
+                                        </p:cTn>
+                                        <p:tgtEl>
+                                          <p:spTgt spid="3">
+                                            <p:txEl>
+                                              <p:pRg st="4" end="4"/>
+                                            </p:txEl>
+                                          </p:spTgt>
+                                        </p:tgtEl>
+                                        <p:attrNameLst>
+                                          <p:attrName>style.visibility</p:attrName>
+                                        </p:attrNameLst>
+                                      </p:cBhvr>
+                                      <p:to>
+                                        <p:strVal val="visible"/>
+                                      </p:to>
+                                    </p:set>
+                                  </p:childTnLst>
+                                </p:cTn>
+                              </p:par>
+                              <p:par>
+                                <p:cTn id="19" presetID="1" presetClass="entr" presetSubtype="0" fill="hold" nodeType="withEffect">
+                                  <p:stCondLst>
+                                    <p:cond delay="0"/>
+                                  </p:stCondLst>
+                                  <p:childTnLst>
+                                    <p:set>
+                                      <p:cBhvr>
+                                        <p:cTn id="20" dur="1" fill="hold">
+                                          <p:stCondLst>
+                                            <p:cond delay="0"/>
+                                          </p:stCondLst>
+                                        </p:cTn>
+                                        <p:tgtEl>
+                                          <p:spTgt spid="3">
+                                            <p:txEl>
+                                              <p:pRg st="5" end="5"/>
+                                            </p:txEl>
+                                          </p:spTgt>
+                                        </p:tgtEl>
+                                        <p:attrNameLst>
+                                          <p:attrName>style.visibility</p:attrName>
+                                        </p:attrNameLst>
+                                      </p:cBhvr>
+                                      <p:to>
+                                        <p:strVal val="visible"/>
+                                      </p:to>
+                                    </p:set>
+                                  </p:childTnLst>
+                                </p:cTn>
+                              </p:par>
+                              <p:par>
+                                <p:cTn id="21" presetID="1" presetClass="entr" presetSubtype="0" fill="hold" nodeType="withEffect">
+                                  <p:stCondLst>
+                                    <p:cond delay="0"/>
+                                  </p:stCondLst>
+                                  <p:childTnLst>
+                                    <p:set>
+                                      <p:cBhvr>
+                                        <p:cTn id="22" dur="1" fill="hold">
+                                          <p:stCondLst>
+                                            <p:cond delay="0"/>
+                                          </p:stCondLst>
+                                        </p:cTn>
+                                        <p:tgtEl>
+                                          <p:spTgt spid="3">
+                                            <p:txEl>
+                                              <p:pRg st="6" end="6"/>
+                                            </p:txEl>
+                                          </p:spTgt>
+                                        </p:tgtEl>
+                                        <p:attrNameLst>
+                                          <p:attrName>style.visibility</p:attrName>
+                                        </p:attrNameLst>
+                                      </p:cBhvr>
+                                      <p:to>
+                                        <p:strVal val="visible"/>
+                                      </p:to>
+                                    </p:set>
+                                  </p:childTnLst>
+                                </p:cTn>
+                              </p:par>
+                              <p:par>
+                                <p:cTn id="23" presetID="1" presetClass="entr" presetSubtype="0" fill="hold" nodeType="withEffect">
+                                  <p:stCondLst>
+                                    <p:cond delay="0"/>
+                                  </p:stCondLst>
+                                  <p:childTnLst>
+                                    <p:set>
+                                      <p:cBhvr>
+                                        <p:cTn id="24" dur="1" fill="hold">
+                                          <p:stCondLst>
+                                            <p:cond delay="0"/>
+                                          </p:stCondLst>
+                                        </p:cTn>
+                                        <p:tgtEl>
+                                          <p:spTgt spid="3">
+                                            <p:txEl>
+                                              <p:pRg st="7" end="7"/>
+                                            </p:txEl>
+                                          </p:spTgt>
+                                        </p:tgtEl>
+                                        <p:attrNameLst>
+                                          <p:attrName>style.visibility</p:attrName>
+                                        </p:attrNameLst>
+                                      </p:cBhvr>
+                                      <p:to>
+                                        <p:strVal val="visible"/>
+                                      </p:to>
+                                    </p:set>
+                                  </p:childTnLst>
+                                </p:cTn>
+                              </p:par>
+                            </p:childTnLst>
+                          </p:cTn>
+                        </p:par>
+                      </p:childTnLst>
+                    </p:cTn>
+                  </p:par>
+                  <p:par>
+                    <p:cTn id="25" fill="hold">
+                      <p:stCondLst>
+                        <p:cond delay="indefinite"/>
+                      </p:stCondLst>
+                      <p:childTnLst>
+                        <p:par>
+                          <p:cTn id="26" fill="hold">
+                            <p:stCondLst>
+                              <p:cond delay="0"/>
+                            </p:stCondLst>
+                            <p:childTnLst>
+                              <p:par>
+                                <p:cTn id="27" presetID="1" presetClass="entr" presetSubtype="0" fill="hold" nodeType="clickEffect">
+                                  <p:stCondLst>
+                                    <p:cond delay="0"/>
+                                  </p:stCondLst>
+                                  <p:childTnLst>
+                                    <p:set>
+                                      <p:cBhvr>
+                                        <p:cTn id="28" dur="1" fill="hold">
+                                          <p:stCondLst>
+                                            <p:cond delay="0"/>
+                                          </p:stCondLst>
+                                        </p:cTn>
+                                        <p:tgtEl>
+                                          <p:spTgt spid="3">
+                                            <p:txEl>
+                                              <p:pRg st="8" end="8"/>
+                                            </p:txEl>
+                                          </p:spTgt>
+                                        </p:tgtEl>
+                                        <p:attrNameLst>
+                                          <p:attrName>style.visibility</p:attrName>
+                                        </p:attrNameLst>
+                                      </p:cBhvr>
+                                      <p:to>
+                                        <p:strVal val="visible"/>
+                                      </p:to>
+                                    </p:set>
+                                  </p:childTnLst>
+                                </p:cTn>
+                              </p:par>
+                              <p:par>
+                                <p:cTn id="29" presetID="1" presetClass="entr" presetSubtype="0" fill="hold" nodeType="withEffect">
+                                  <p:stCondLst>
+                                    <p:cond delay="0"/>
+                                  </p:stCondLst>
+                                  <p:childTnLst>
+                                    <p:set>
+                                      <p:cBhvr>
+                                        <p:cTn id="30" dur="1" fill="hold">
+                                          <p:stCondLst>
+                                            <p:cond delay="0"/>
+                                          </p:stCondLst>
+                                        </p:cTn>
+                                        <p:tgtEl>
+                                          <p:spTgt spid="3">
+                                            <p:txEl>
+                                              <p:pRg st="9" end="9"/>
+                                            </p:txEl>
+                                          </p:spTgt>
+                                        </p:tgtEl>
+                                        <p:attrNameLst>
+                                          <p:attrName>style.visibility</p:attrName>
+                                        </p:attrNameLst>
+                                      </p:cBhvr>
+                                      <p:to>
+                                        <p:strVal val="visible"/>
+                                      </p:to>
+                                    </p:set>
+                                  </p:childTnLst>
+                                </p:cTn>
+                              </p:par>
+                              <p:par>
+                                <p:cTn id="31" presetID="1" presetClass="entr" presetSubtype="0" fill="hold" nodeType="withEffect">
+                                  <p:stCondLst>
+                                    <p:cond delay="0"/>
+                                  </p:stCondLst>
+                                  <p:childTnLst>
+                                    <p:set>
+                                      <p:cBhvr>
+                                        <p:cTn id="32" dur="1" fill="hold">
+                                          <p:stCondLst>
+                                            <p:cond delay="0"/>
+                                          </p:stCondLst>
+                                        </p:cTn>
+                                        <p:tgtEl>
+                                          <p:spTgt spid="3">
+                                            <p:txEl>
+                                              <p:pRg st="10" end="10"/>
+                                            </p:txEl>
+                                          </p:spTgt>
+                                        </p:tgtEl>
+                                        <p:attrNameLst>
+                                          <p:attrName>style.visibility</p:attrName>
+                                        </p:attrNameLst>
+                                      </p:cBhvr>
+                                      <p:to>
+                                        <p:strVal val="visible"/>
+                                      </p:to>
+                                    </p:set>
+                                  </p:childTnLst>
+                                </p:cTn>
+                              </p:par>
+                              <p:par>
+                                <p:cTn id="33" presetID="1" presetClass="entr" presetSubtype="0" fill="hold" nodeType="withEffect">
+                                  <p:stCondLst>
+                                    <p:cond delay="0"/>
+                                  </p:stCondLst>
+                                  <p:childTnLst>
+                                    <p:set>
+                                      <p:cBhvr>
+                                        <p:cTn id="34" dur="1" fill="hold">
+                                          <p:stCondLst>
+                                            <p:cond delay="0"/>
+                                          </p:stCondLst>
+                                        </p:cTn>
+                                        <p:tgtEl>
+                                          <p:spTgt spid="3">
+                                            <p:txEl>
+                                              <p:pRg st="11" end="11"/>
+                                            </p:txEl>
+                                          </p:spTgt>
+                                        </p:tgtEl>
+                                        <p:attrNameLst>
+                                          <p:attrName>style.visibility</p:attrName>
+                                        </p:attrNameLst>
+                                      </p:cBhvr>
+                                      <p:to>
+                                        <p:strVal val="visible"/>
+                                      </p:to>
+                                    </p:set>
+                                  </p:childTnLst>
+                                </p:cTn>
+                              </p:par>
+                            </p:childTnLst>
+                          </p:cTn>
+                        </p:par>
+                      </p:childTnLst>
+                    </p:cTn>
+                  </p:par>
+                </p:childTnLst>
+              </p:cTn>
+              <p:prevCondLst>
+                <p:cond evt="onPrev" delay="0">
+                  <p:tgtEl>
+                    <p:sldTgt/>
+                  </p:tgtEl>
+                </p:cond>
+              </p:prevCondLst>
+              <p:nextCondLst>
+                <p:cond evt="onNext" delay="0">
+                  <p:tgtEl>
+                    <p:sldTgt/>
+                  </p:tgtEl>
+                </p:cond>
+              </p:nextCondLst>
+            </p:seq>
+          </p:childTnLst>
+        </p:cTn>
+      </p:par>
+    </p:tnLst>
+  </p:timing>
 </p:sld>
 </file>
 
-<file path=ppt/slides/slide23.xml><?xml version="1.0" encoding="utf-8"?>
+<file path=ppt/slides/slide22.xml><?xml version="1.0" encoding="utf-8"?>
 <p:sld xmlns:a="http://schemas.openxmlformats.org/drawingml/2006/main" xmlns:r="http://schemas.openxmlformats.org/officeDocument/2006/relationships" xmlns:p="http://schemas.openxmlformats.org/presentationml/2006/main">
   <p:cSld>
     <p:spTree>
@@ -18437,7 +18920,7 @@
 </p:sld>
 </file>
 
-<file path=ppt/slides/slide24.xml><?xml version="1.0" encoding="utf-8"?>
+<file path=ppt/slides/slide23.xml><?xml version="1.0" encoding="utf-8"?>
 <p:sld xmlns:a="http://schemas.openxmlformats.org/drawingml/2006/main" xmlns:r="http://schemas.openxmlformats.org/officeDocument/2006/relationships" xmlns:p="http://schemas.openxmlformats.org/presentationml/2006/main">
   <p:cSld>
     <p:spTree>
@@ -22802,7 +23285,7 @@
 </p:sld>
 </file>
 
-<file path=ppt/slides/slide25.xml><?xml version="1.0" encoding="utf-8"?>
+<file path=ppt/slides/slide24.xml><?xml version="1.0" encoding="utf-8"?>
 <p:sld xmlns:a="http://schemas.openxmlformats.org/drawingml/2006/main" xmlns:r="http://schemas.openxmlformats.org/officeDocument/2006/relationships" xmlns:p="http://schemas.openxmlformats.org/presentationml/2006/main">
   <p:cSld>
     <p:spTree>
@@ -22887,7 +23370,10 @@
           <a:bodyPr/>
           <a:lstStyle/>
           <a:p>
-            <a:endParaRPr lang="de-DE"/>
+            <a:r>
+              <a:rPr lang="de-DE" dirty="0"/>
+              <a:t>Ende</a:t>
+            </a:r>
           </a:p>
         </p:txBody>
       </p:sp>
@@ -25454,7 +25940,7 @@
               <a:defRPr/>
             </a:pPr>
             <a:r>
-              <a:rPr kumimoji="0" lang="de-DE" sz="1400" b="1" i="0" u="none" strike="noStrike" kern="1200" cap="none" spc="0" normalizeH="0" baseline="0" noProof="0" dirty="0">
+              <a:rPr kumimoji="0" lang="de-DE" sz="1400" i="0" u="none" strike="noStrike" kern="1200" cap="none" spc="0" normalizeH="0" baseline="0" noProof="0" dirty="0">
                 <a:ln>
                   <a:noFill/>
                 </a:ln>
@@ -25526,7 +26012,7 @@
               <a:defRPr/>
             </a:pPr>
             <a:r>
-              <a:rPr kumimoji="0" lang="de-DE" sz="1400" b="0" i="0" u="none" strike="noStrike" kern="1200" cap="none" spc="0" normalizeH="0" baseline="0" noProof="0" dirty="0" err="1">
+              <a:rPr kumimoji="0" lang="de-DE" sz="1400" b="1" i="0" u="none" strike="noStrike" kern="1200" cap="none" spc="0" normalizeH="0" baseline="0" noProof="0" dirty="0" err="1">
                 <a:ln>
                   <a:noFill/>
                 </a:ln>

</xml_diff>

<commit_message>
Signed-off-by: Anubisc <christoph.blaesser@gmx.de>Meine Folien ergänzt
</commit_message>
<xml_diff>
--- a/Päsi/Seminar Betriebssysteme.pptx
+++ b/Päsi/Seminar Betriebssysteme.pptx
@@ -137,7 +137,7 @@
   </p:defaultTextStyle>
   <p:extLst>
     <p:ext uri="{EFAFB233-063F-42B5-8137-9DF3F51BA10A}">
-      <p15:sldGuideLst xmlns:p15="http://schemas.microsoft.com/office/powerpoint/2012/main">
+      <p15:sldGuideLst xmlns:p15="http://schemas.microsoft.com/office/powerpoint/2012/main" xmlns="">
         <p15:guide id="1" orient="horz" pos="2160">
           <p15:clr>
             <a:srgbClr val="A4A3A4"/>
@@ -151,7 +151,7 @@
       </p15:sldGuideLst>
     </p:ext>
     <p:ext uri="{2D200454-40CA-4A62-9FC3-DE9A4176ACB9}">
-      <p15:notesGuideLst xmlns:p15="http://schemas.microsoft.com/office/powerpoint/2012/main"/>
+      <p15:notesGuideLst xmlns:p15="http://schemas.microsoft.com/office/powerpoint/2012/main" xmlns=""/>
     </p:ext>
   </p:extLst>
 </p:presentation>
@@ -188,7 +188,7 @@
           <p:cNvPr id="2" name="Kopfzeilenplatzhalter 1">
             <a:extLst>
               <a:ext uri="{FF2B5EF4-FFF2-40B4-BE49-F238E27FC236}">
-                <a16:creationId xmlns:a16="http://schemas.microsoft.com/office/drawing/2014/main" id="{79677087-83A3-4454-81D0-8574E90505DF}"/>
+                <a16:creationId xmlns:a16="http://schemas.microsoft.com/office/drawing/2014/main" xmlns="" id="{79677087-83A3-4454-81D0-8574E90505DF}"/>
               </a:ext>
             </a:extLst>
           </p:cNvPr>
@@ -225,7 +225,7 @@
           <p:cNvPr id="3" name="Datumsplatzhalter 2">
             <a:extLst>
               <a:ext uri="{FF2B5EF4-FFF2-40B4-BE49-F238E27FC236}">
-                <a16:creationId xmlns:a16="http://schemas.microsoft.com/office/drawing/2014/main" id="{544817FC-7EC0-4090-84C4-8F2F13CBD903}"/>
+                <a16:creationId xmlns:a16="http://schemas.microsoft.com/office/drawing/2014/main" xmlns="" id="{544817FC-7EC0-4090-84C4-8F2F13CBD903}"/>
               </a:ext>
             </a:extLst>
           </p:cNvPr>
@@ -255,6 +255,7 @@
           <a:p>
             <a:fld id="{4F336489-14E1-462A-B32E-B31B9D8DDB1E}" type="datetimeFigureOut">
               <a:rPr lang="de-DE" smtClean="0"/>
+              <a:pPr/>
               <a:t>30.06.2017</a:t>
             </a:fld>
             <a:endParaRPr lang="de-DE"/>
@@ -266,7 +267,7 @@
           <p:cNvPr id="4" name="Fußzeilenplatzhalter 3">
             <a:extLst>
               <a:ext uri="{FF2B5EF4-FFF2-40B4-BE49-F238E27FC236}">
-                <a16:creationId xmlns:a16="http://schemas.microsoft.com/office/drawing/2014/main" id="{BDB34D94-50DC-44DF-8C2B-60940B0DBD32}"/>
+                <a16:creationId xmlns:a16="http://schemas.microsoft.com/office/drawing/2014/main" xmlns="" id="{BDB34D94-50DC-44DF-8C2B-60940B0DBD32}"/>
               </a:ext>
             </a:extLst>
           </p:cNvPr>
@@ -303,7 +304,7 @@
           <p:cNvPr id="5" name="Foliennummernplatzhalter 4">
             <a:extLst>
               <a:ext uri="{FF2B5EF4-FFF2-40B4-BE49-F238E27FC236}">
-                <a16:creationId xmlns:a16="http://schemas.microsoft.com/office/drawing/2014/main" id="{41B3D724-41FE-4065-B0DD-2D6B29A7BDC6}"/>
+                <a16:creationId xmlns:a16="http://schemas.microsoft.com/office/drawing/2014/main" xmlns="" id="{41B3D724-41FE-4065-B0DD-2D6B29A7BDC6}"/>
               </a:ext>
             </a:extLst>
           </p:cNvPr>
@@ -333,6 +334,7 @@
           <a:p>
             <a:fld id="{2D28DBF4-B2E8-4916-9B8A-FDCA134AC74D}" type="slidenum">
               <a:rPr lang="de-DE" smtClean="0"/>
+              <a:pPr/>
               <a:t>‹Nr.›</a:t>
             </a:fld>
             <a:endParaRPr lang="de-DE"/>
@@ -342,7 +344,7 @@
     </p:spTree>
     <p:extLst>
       <p:ext uri="{BB962C8B-B14F-4D97-AF65-F5344CB8AC3E}">
-        <p14:creationId xmlns:p14="http://schemas.microsoft.com/office/powerpoint/2010/main" val="3824691718"/>
+        <p14:creationId xmlns:p14="http://schemas.microsoft.com/office/powerpoint/2010/main" xmlns="" val="3824691718"/>
       </p:ext>
     </p:extLst>
   </p:cSld>
@@ -601,7 +603,7 @@
     </p:spTree>
     <p:extLst>
       <p:ext uri="{BB962C8B-B14F-4D97-AF65-F5344CB8AC3E}">
-        <p14:creationId xmlns:p14="http://schemas.microsoft.com/office/powerpoint/2010/main" val="700791983"/>
+        <p14:creationId xmlns:p14="http://schemas.microsoft.com/office/powerpoint/2010/main" xmlns="" val="700791983"/>
       </p:ext>
     </p:extLst>
   </p:cSld>
@@ -779,7 +781,7 @@
     </p:spTree>
     <p:extLst>
       <p:ext uri="{BB962C8B-B14F-4D97-AF65-F5344CB8AC3E}">
-        <p14:creationId xmlns:p14="http://schemas.microsoft.com/office/powerpoint/2010/main" val="3668134686"/>
+        <p14:creationId xmlns:p14="http://schemas.microsoft.com/office/powerpoint/2010/main" xmlns="" val="3668134686"/>
       </p:ext>
     </p:extLst>
   </p:cSld>
@@ -910,7 +912,7 @@
     </p:spTree>
     <p:extLst>
       <p:ext uri="{BB962C8B-B14F-4D97-AF65-F5344CB8AC3E}">
-        <p14:creationId xmlns:p14="http://schemas.microsoft.com/office/powerpoint/2010/main" val="805831359"/>
+        <p14:creationId xmlns:p14="http://schemas.microsoft.com/office/powerpoint/2010/main" xmlns="" val="805831359"/>
       </p:ext>
     </p:extLst>
   </p:cSld>
@@ -1039,7 +1041,7 @@
     </p:spTree>
     <p:extLst>
       <p:ext uri="{BB962C8B-B14F-4D97-AF65-F5344CB8AC3E}">
-        <p14:creationId xmlns:p14="http://schemas.microsoft.com/office/powerpoint/2010/main" val="758588964"/>
+        <p14:creationId xmlns:p14="http://schemas.microsoft.com/office/powerpoint/2010/main" xmlns="" val="758588964"/>
       </p:ext>
     </p:extLst>
   </p:cSld>
@@ -1127,7 +1129,7 @@
     </p:spTree>
     <p:extLst>
       <p:ext uri="{BB962C8B-B14F-4D97-AF65-F5344CB8AC3E}">
-        <p14:creationId xmlns:p14="http://schemas.microsoft.com/office/powerpoint/2010/main" val="2503663228"/>
+        <p14:creationId xmlns:p14="http://schemas.microsoft.com/office/powerpoint/2010/main" xmlns="" val="2503663228"/>
       </p:ext>
     </p:extLst>
   </p:cSld>
@@ -1223,7 +1225,7 @@
     </p:spTree>
     <p:extLst>
       <p:ext uri="{BB962C8B-B14F-4D97-AF65-F5344CB8AC3E}">
-        <p14:creationId xmlns:p14="http://schemas.microsoft.com/office/powerpoint/2010/main" val="752562685"/>
+        <p14:creationId xmlns:p14="http://schemas.microsoft.com/office/powerpoint/2010/main" xmlns="" val="752562685"/>
       </p:ext>
     </p:extLst>
   </p:cSld>
@@ -1308,7 +1310,7 @@
     </p:spTree>
     <p:extLst>
       <p:ext uri="{BB962C8B-B14F-4D97-AF65-F5344CB8AC3E}">
-        <p14:creationId xmlns:p14="http://schemas.microsoft.com/office/powerpoint/2010/main" val="2431211418"/>
+        <p14:creationId xmlns:p14="http://schemas.microsoft.com/office/powerpoint/2010/main" xmlns="" val="2431211418"/>
       </p:ext>
     </p:extLst>
   </p:cSld>
@@ -1446,7 +1448,7 @@
     </p:spTree>
     <p:extLst>
       <p:ext uri="{BB962C8B-B14F-4D97-AF65-F5344CB8AC3E}">
-        <p14:creationId xmlns:p14="http://schemas.microsoft.com/office/powerpoint/2010/main" val="2883045047"/>
+        <p14:creationId xmlns:p14="http://schemas.microsoft.com/office/powerpoint/2010/main" xmlns="" val="2883045047"/>
       </p:ext>
     </p:extLst>
   </p:cSld>
@@ -1641,7 +1643,7 @@
     </p:spTree>
     <p:extLst>
       <p:ext uri="{BB962C8B-B14F-4D97-AF65-F5344CB8AC3E}">
-        <p14:creationId xmlns:p14="http://schemas.microsoft.com/office/powerpoint/2010/main" val="2257791673"/>
+        <p14:creationId xmlns:p14="http://schemas.microsoft.com/office/powerpoint/2010/main" xmlns="" val="2257791673"/>
       </p:ext>
     </p:extLst>
   </p:cSld>
@@ -1814,7 +1816,7 @@
     </p:spTree>
     <p:extLst>
       <p:ext uri="{BB962C8B-B14F-4D97-AF65-F5344CB8AC3E}">
-        <p14:creationId xmlns:p14="http://schemas.microsoft.com/office/powerpoint/2010/main" val="2527554667"/>
+        <p14:creationId xmlns:p14="http://schemas.microsoft.com/office/powerpoint/2010/main" xmlns="" val="2527554667"/>
       </p:ext>
     </p:extLst>
   </p:cSld>
@@ -1997,7 +1999,7 @@
     </p:spTree>
     <p:extLst>
       <p:ext uri="{BB962C8B-B14F-4D97-AF65-F5344CB8AC3E}">
-        <p14:creationId xmlns:p14="http://schemas.microsoft.com/office/powerpoint/2010/main" val="621481477"/>
+        <p14:creationId xmlns:p14="http://schemas.microsoft.com/office/powerpoint/2010/main" xmlns="" val="621481477"/>
       </p:ext>
     </p:extLst>
   </p:cSld>
@@ -2192,7 +2194,7 @@
     </p:spTree>
     <p:extLst>
       <p:ext uri="{BB962C8B-B14F-4D97-AF65-F5344CB8AC3E}">
-        <p14:creationId xmlns:p14="http://schemas.microsoft.com/office/powerpoint/2010/main" val="3661508634"/>
+        <p14:creationId xmlns:p14="http://schemas.microsoft.com/office/powerpoint/2010/main" xmlns="" val="3661508634"/>
       </p:ext>
     </p:extLst>
   </p:cSld>
@@ -2365,7 +2367,7 @@
     </p:spTree>
     <p:extLst>
       <p:ext uri="{BB962C8B-B14F-4D97-AF65-F5344CB8AC3E}">
-        <p14:creationId xmlns:p14="http://schemas.microsoft.com/office/powerpoint/2010/main" val="4168060298"/>
+        <p14:creationId xmlns:p14="http://schemas.microsoft.com/office/powerpoint/2010/main" xmlns="" val="4168060298"/>
       </p:ext>
     </p:extLst>
   </p:cSld>
@@ -2592,7 +2594,7 @@
     </p:spTree>
     <p:extLst>
       <p:ext uri="{BB962C8B-B14F-4D97-AF65-F5344CB8AC3E}">
-        <p14:creationId xmlns:p14="http://schemas.microsoft.com/office/powerpoint/2010/main" val="1794010729"/>
+        <p14:creationId xmlns:p14="http://schemas.microsoft.com/office/powerpoint/2010/main" xmlns="" val="1794010729"/>
       </p:ext>
     </p:extLst>
   </p:cSld>
@@ -2826,7 +2828,7 @@
     </p:spTree>
     <p:extLst>
       <p:ext uri="{BB962C8B-B14F-4D97-AF65-F5344CB8AC3E}">
-        <p14:creationId xmlns:p14="http://schemas.microsoft.com/office/powerpoint/2010/main" val="4176995027"/>
+        <p14:creationId xmlns:p14="http://schemas.microsoft.com/office/powerpoint/2010/main" xmlns="" val="4176995027"/>
       </p:ext>
     </p:extLst>
   </p:cSld>
@@ -3195,7 +3197,7 @@
     </p:spTree>
     <p:extLst>
       <p:ext uri="{BB962C8B-B14F-4D97-AF65-F5344CB8AC3E}">
-        <p14:creationId xmlns:p14="http://schemas.microsoft.com/office/powerpoint/2010/main" val="2740364737"/>
+        <p14:creationId xmlns:p14="http://schemas.microsoft.com/office/powerpoint/2010/main" xmlns="" val="2740364737"/>
       </p:ext>
     </p:extLst>
   </p:cSld>
@@ -3317,7 +3319,7 @@
     </p:spTree>
     <p:extLst>
       <p:ext uri="{BB962C8B-B14F-4D97-AF65-F5344CB8AC3E}">
-        <p14:creationId xmlns:p14="http://schemas.microsoft.com/office/powerpoint/2010/main" val="2388727467"/>
+        <p14:creationId xmlns:p14="http://schemas.microsoft.com/office/powerpoint/2010/main" xmlns="" val="2388727467"/>
       </p:ext>
     </p:extLst>
   </p:cSld>
@@ -3417,7 +3419,7 @@
     </p:spTree>
     <p:extLst>
       <p:ext uri="{BB962C8B-B14F-4D97-AF65-F5344CB8AC3E}">
-        <p14:creationId xmlns:p14="http://schemas.microsoft.com/office/powerpoint/2010/main" val="4144591651"/>
+        <p14:creationId xmlns:p14="http://schemas.microsoft.com/office/powerpoint/2010/main" xmlns="" val="4144591651"/>
       </p:ext>
     </p:extLst>
   </p:cSld>
@@ -3697,7 +3699,7 @@
     </p:spTree>
     <p:extLst>
       <p:ext uri="{BB962C8B-B14F-4D97-AF65-F5344CB8AC3E}">
-        <p14:creationId xmlns:p14="http://schemas.microsoft.com/office/powerpoint/2010/main" val="3667714112"/>
+        <p14:creationId xmlns:p14="http://schemas.microsoft.com/office/powerpoint/2010/main" xmlns="" val="3667714112"/>
       </p:ext>
     </p:extLst>
   </p:cSld>
@@ -3870,7 +3872,7 @@
     </p:spTree>
     <p:extLst>
       <p:ext uri="{BB962C8B-B14F-4D97-AF65-F5344CB8AC3E}">
-        <p14:creationId xmlns:p14="http://schemas.microsoft.com/office/powerpoint/2010/main" val="1332049413"/>
+        <p14:creationId xmlns:p14="http://schemas.microsoft.com/office/powerpoint/2010/main" xmlns="" val="1332049413"/>
       </p:ext>
     </p:extLst>
   </p:cSld>
@@ -4127,7 +4129,7 @@
     </p:spTree>
     <p:extLst>
       <p:ext uri="{BB962C8B-B14F-4D97-AF65-F5344CB8AC3E}">
-        <p14:creationId xmlns:p14="http://schemas.microsoft.com/office/powerpoint/2010/main" val="190149329"/>
+        <p14:creationId xmlns:p14="http://schemas.microsoft.com/office/powerpoint/2010/main" xmlns="" val="190149329"/>
       </p:ext>
     </p:extLst>
   </p:cSld>
@@ -4300,7 +4302,7 @@
     </p:spTree>
     <p:extLst>
       <p:ext uri="{BB962C8B-B14F-4D97-AF65-F5344CB8AC3E}">
-        <p14:creationId xmlns:p14="http://schemas.microsoft.com/office/powerpoint/2010/main" val="995635370"/>
+        <p14:creationId xmlns:p14="http://schemas.microsoft.com/office/powerpoint/2010/main" xmlns="" val="995635370"/>
       </p:ext>
     </p:extLst>
   </p:cSld>
@@ -4483,7 +4485,7 @@
     </p:spTree>
     <p:extLst>
       <p:ext uri="{BB962C8B-B14F-4D97-AF65-F5344CB8AC3E}">
-        <p14:creationId xmlns:p14="http://schemas.microsoft.com/office/powerpoint/2010/main" val="655588613"/>
+        <p14:creationId xmlns:p14="http://schemas.microsoft.com/office/powerpoint/2010/main" xmlns="" val="655588613"/>
       </p:ext>
     </p:extLst>
   </p:cSld>
@@ -4710,7 +4712,7 @@
     </p:spTree>
     <p:extLst>
       <p:ext uri="{BB962C8B-B14F-4D97-AF65-F5344CB8AC3E}">
-        <p14:creationId xmlns:p14="http://schemas.microsoft.com/office/powerpoint/2010/main" val="2853574932"/>
+        <p14:creationId xmlns:p14="http://schemas.microsoft.com/office/powerpoint/2010/main" xmlns="" val="2853574932"/>
       </p:ext>
     </p:extLst>
   </p:cSld>
@@ -4944,7 +4946,7 @@
     </p:spTree>
     <p:extLst>
       <p:ext uri="{BB962C8B-B14F-4D97-AF65-F5344CB8AC3E}">
-        <p14:creationId xmlns:p14="http://schemas.microsoft.com/office/powerpoint/2010/main" val="2199095327"/>
+        <p14:creationId xmlns:p14="http://schemas.microsoft.com/office/powerpoint/2010/main" xmlns="" val="2199095327"/>
       </p:ext>
     </p:extLst>
   </p:cSld>
@@ -5313,7 +5315,7 @@
     </p:spTree>
     <p:extLst>
       <p:ext uri="{BB962C8B-B14F-4D97-AF65-F5344CB8AC3E}">
-        <p14:creationId xmlns:p14="http://schemas.microsoft.com/office/powerpoint/2010/main" val="311317856"/>
+        <p14:creationId xmlns:p14="http://schemas.microsoft.com/office/powerpoint/2010/main" xmlns="" val="311317856"/>
       </p:ext>
     </p:extLst>
   </p:cSld>
@@ -5435,7 +5437,7 @@
     </p:spTree>
     <p:extLst>
       <p:ext uri="{BB962C8B-B14F-4D97-AF65-F5344CB8AC3E}">
-        <p14:creationId xmlns:p14="http://schemas.microsoft.com/office/powerpoint/2010/main" val="227337858"/>
+        <p14:creationId xmlns:p14="http://schemas.microsoft.com/office/powerpoint/2010/main" xmlns="" val="227337858"/>
       </p:ext>
     </p:extLst>
   </p:cSld>
@@ -5535,7 +5537,7 @@
     </p:spTree>
     <p:extLst>
       <p:ext uri="{BB962C8B-B14F-4D97-AF65-F5344CB8AC3E}">
-        <p14:creationId xmlns:p14="http://schemas.microsoft.com/office/powerpoint/2010/main" val="3239334008"/>
+        <p14:creationId xmlns:p14="http://schemas.microsoft.com/office/powerpoint/2010/main" xmlns="" val="3239334008"/>
       </p:ext>
     </p:extLst>
   </p:cSld>
@@ -5815,7 +5817,7 @@
     </p:spTree>
     <p:extLst>
       <p:ext uri="{BB962C8B-B14F-4D97-AF65-F5344CB8AC3E}">
-        <p14:creationId xmlns:p14="http://schemas.microsoft.com/office/powerpoint/2010/main" val="466192376"/>
+        <p14:creationId xmlns:p14="http://schemas.microsoft.com/office/powerpoint/2010/main" xmlns="" val="466192376"/>
       </p:ext>
     </p:extLst>
   </p:cSld>
@@ -6072,7 +6074,7 @@
     </p:spTree>
     <p:extLst>
       <p:ext uri="{BB962C8B-B14F-4D97-AF65-F5344CB8AC3E}">
-        <p14:creationId xmlns:p14="http://schemas.microsoft.com/office/powerpoint/2010/main" val="3466473767"/>
+        <p14:creationId xmlns:p14="http://schemas.microsoft.com/office/powerpoint/2010/main" xmlns="" val="3466473767"/>
       </p:ext>
     </p:extLst>
   </p:cSld>
@@ -6421,7 +6423,7 @@
           <a:blip r:embed="rId13" cstate="print">
             <a:extLst>
               <a:ext uri="{28A0092B-C50C-407E-A947-70E740481C1C}">
-                <a14:useLocalDpi xmlns:a14="http://schemas.microsoft.com/office/drawing/2010/main" val="0"/>
+                <a14:useLocalDpi xmlns:a14="http://schemas.microsoft.com/office/drawing/2010/main" xmlns="" val="0"/>
               </a:ext>
             </a:extLst>
           </a:blip>
@@ -6442,7 +6444,7 @@
     </p:spTree>
     <p:extLst>
       <p:ext uri="{BB962C8B-B14F-4D97-AF65-F5344CB8AC3E}">
-        <p14:creationId xmlns:p14="http://schemas.microsoft.com/office/powerpoint/2010/main" val="2300813328"/>
+        <p14:creationId xmlns:p14="http://schemas.microsoft.com/office/powerpoint/2010/main" xmlns="" val="2300813328"/>
       </p:ext>
     </p:extLst>
   </p:cSld>
@@ -7086,7 +7088,7 @@
           <a:blip r:embed="rId13" cstate="print">
             <a:extLst>
               <a:ext uri="{28A0092B-C50C-407E-A947-70E740481C1C}">
-                <a14:useLocalDpi xmlns:a14="http://schemas.microsoft.com/office/drawing/2010/main" val="0"/>
+                <a14:useLocalDpi xmlns:a14="http://schemas.microsoft.com/office/drawing/2010/main" xmlns="" val="0"/>
               </a:ext>
             </a:extLst>
           </a:blip>
@@ -7107,7 +7109,7 @@
     </p:spTree>
     <p:extLst>
       <p:ext uri="{BB962C8B-B14F-4D97-AF65-F5344CB8AC3E}">
-        <p14:creationId xmlns:p14="http://schemas.microsoft.com/office/powerpoint/2010/main" val="3437319758"/>
+        <p14:creationId xmlns:p14="http://schemas.microsoft.com/office/powerpoint/2010/main" xmlns="" val="3437319758"/>
       </p:ext>
     </p:extLst>
   </p:cSld>
@@ -7525,7 +7527,7 @@
     </p:spTree>
     <p:extLst>
       <p:ext uri="{BB962C8B-B14F-4D97-AF65-F5344CB8AC3E}">
-        <p14:creationId xmlns:p14="http://schemas.microsoft.com/office/powerpoint/2010/main" val="1475588890"/>
+        <p14:creationId xmlns:p14="http://schemas.microsoft.com/office/powerpoint/2010/main" xmlns="" val="1475588890"/>
       </p:ext>
     </p:extLst>
   </p:cSld>
@@ -7690,7 +7692,7 @@
           <p:cNvPr id="9" name="Fußzeilenplatzhalter 4">
             <a:extLst>
               <a:ext uri="{FF2B5EF4-FFF2-40B4-BE49-F238E27FC236}">
-                <a16:creationId xmlns:a16="http://schemas.microsoft.com/office/drawing/2014/main" id="{3C19E46F-96A4-42F0-9ADE-8A642B595B58}"/>
+                <a16:creationId xmlns:a16="http://schemas.microsoft.com/office/drawing/2014/main" xmlns="" id="{3C19E46F-96A4-42F0-9ADE-8A642B595B58}"/>
               </a:ext>
             </a:extLst>
           </p:cNvPr>
@@ -7721,13 +7723,235 @@
     </p:spTree>
     <p:extLst>
       <p:ext uri="{BB962C8B-B14F-4D97-AF65-F5344CB8AC3E}">
-        <p14:creationId xmlns:p14="http://schemas.microsoft.com/office/powerpoint/2010/main" val="3455316977"/>
+        <p14:creationId xmlns:p14="http://schemas.microsoft.com/office/powerpoint/2010/main" xmlns="" val="3455316977"/>
       </p:ext>
     </p:extLst>
   </p:cSld>
   <p:clrMapOvr>
     <a:masterClrMapping/>
   </p:clrMapOvr>
+  <p:timing>
+    <p:tnLst>
+      <p:par>
+        <p:cTn id="1" dur="indefinite" restart="never" nodeType="tmRoot">
+          <p:childTnLst>
+            <p:seq concurrent="1" nextAc="seek">
+              <p:cTn id="2" dur="indefinite" nodeType="mainSeq">
+                <p:childTnLst>
+                  <p:par>
+                    <p:cTn id="3" fill="hold">
+                      <p:stCondLst>
+                        <p:cond delay="indefinite"/>
+                      </p:stCondLst>
+                      <p:childTnLst>
+                        <p:par>
+                          <p:cTn id="4" fill="hold">
+                            <p:stCondLst>
+                              <p:cond delay="0"/>
+                            </p:stCondLst>
+                            <p:childTnLst>
+                              <p:par>
+                                <p:cTn id="5" presetID="3" presetClass="entr" presetSubtype="10" fill="hold" nodeType="clickEffect">
+                                  <p:stCondLst>
+                                    <p:cond delay="0"/>
+                                  </p:stCondLst>
+                                  <p:childTnLst>
+                                    <p:set>
+                                      <p:cBhvr>
+                                        <p:cTn id="6" dur="1" fill="hold">
+                                          <p:stCondLst>
+                                            <p:cond delay="0"/>
+                                          </p:stCondLst>
+                                        </p:cTn>
+                                        <p:tgtEl>
+                                          <p:spTgt spid="11">
+                                            <p:txEl>
+                                              <p:pRg st="1" end="1"/>
+                                            </p:txEl>
+                                          </p:spTgt>
+                                        </p:tgtEl>
+                                        <p:attrNameLst>
+                                          <p:attrName>style.visibility</p:attrName>
+                                        </p:attrNameLst>
+                                      </p:cBhvr>
+                                      <p:to>
+                                        <p:strVal val="visible"/>
+                                      </p:to>
+                                    </p:set>
+                                    <p:animEffect transition="in" filter="blinds(horizontal)">
+                                      <p:cBhvr>
+                                        <p:cTn id="7" dur="500"/>
+                                        <p:tgtEl>
+                                          <p:spTgt spid="11">
+                                            <p:txEl>
+                                              <p:pRg st="1" end="1"/>
+                                            </p:txEl>
+                                          </p:spTgt>
+                                        </p:tgtEl>
+                                      </p:cBhvr>
+                                    </p:animEffect>
+                                  </p:childTnLst>
+                                </p:cTn>
+                              </p:par>
+                              <p:par>
+                                <p:cTn id="8" presetID="3" presetClass="entr" presetSubtype="10" fill="hold" nodeType="withEffect">
+                                  <p:stCondLst>
+                                    <p:cond delay="0"/>
+                                  </p:stCondLst>
+                                  <p:childTnLst>
+                                    <p:set>
+                                      <p:cBhvr>
+                                        <p:cTn id="9" dur="1" fill="hold">
+                                          <p:stCondLst>
+                                            <p:cond delay="0"/>
+                                          </p:stCondLst>
+                                        </p:cTn>
+                                        <p:tgtEl>
+                                          <p:spTgt spid="1026"/>
+                                        </p:tgtEl>
+                                        <p:attrNameLst>
+                                          <p:attrName>style.visibility</p:attrName>
+                                        </p:attrNameLst>
+                                      </p:cBhvr>
+                                      <p:to>
+                                        <p:strVal val="visible"/>
+                                      </p:to>
+                                    </p:set>
+                                    <p:animEffect transition="in" filter="blinds(horizontal)">
+                                      <p:cBhvr>
+                                        <p:cTn id="10" dur="500"/>
+                                        <p:tgtEl>
+                                          <p:spTgt spid="1026"/>
+                                        </p:tgtEl>
+                                      </p:cBhvr>
+                                    </p:animEffect>
+                                  </p:childTnLst>
+                                </p:cTn>
+                              </p:par>
+                            </p:childTnLst>
+                          </p:cTn>
+                        </p:par>
+                      </p:childTnLst>
+                    </p:cTn>
+                  </p:par>
+                  <p:par>
+                    <p:cTn id="11" fill="hold">
+                      <p:stCondLst>
+                        <p:cond delay="indefinite"/>
+                      </p:stCondLst>
+                      <p:childTnLst>
+                        <p:par>
+                          <p:cTn id="12" fill="hold">
+                            <p:stCondLst>
+                              <p:cond delay="0"/>
+                            </p:stCondLst>
+                            <p:childTnLst>
+                              <p:par>
+                                <p:cTn id="13" presetID="3" presetClass="entr" presetSubtype="10" fill="hold" nodeType="clickEffect">
+                                  <p:stCondLst>
+                                    <p:cond delay="0"/>
+                                  </p:stCondLst>
+                                  <p:childTnLst>
+                                    <p:set>
+                                      <p:cBhvr>
+                                        <p:cTn id="14" dur="1" fill="hold">
+                                          <p:stCondLst>
+                                            <p:cond delay="0"/>
+                                          </p:stCondLst>
+                                        </p:cTn>
+                                        <p:tgtEl>
+                                          <p:spTgt spid="11">
+                                            <p:txEl>
+                                              <p:pRg st="2" end="2"/>
+                                            </p:txEl>
+                                          </p:spTgt>
+                                        </p:tgtEl>
+                                        <p:attrNameLst>
+                                          <p:attrName>style.visibility</p:attrName>
+                                        </p:attrNameLst>
+                                      </p:cBhvr>
+                                      <p:to>
+                                        <p:strVal val="visible"/>
+                                      </p:to>
+                                    </p:set>
+                                    <p:animEffect transition="in" filter="blinds(horizontal)">
+                                      <p:cBhvr>
+                                        <p:cTn id="15" dur="500"/>
+                                        <p:tgtEl>
+                                          <p:spTgt spid="11">
+                                            <p:txEl>
+                                              <p:pRg st="2" end="2"/>
+                                            </p:txEl>
+                                          </p:spTgt>
+                                        </p:tgtEl>
+                                      </p:cBhvr>
+                                    </p:animEffect>
+                                  </p:childTnLst>
+                                </p:cTn>
+                              </p:par>
+                              <p:par>
+                                <p:cTn id="16" presetID="3" presetClass="entr" presetSubtype="10" fill="hold" nodeType="withEffect">
+                                  <p:stCondLst>
+                                    <p:cond delay="0"/>
+                                  </p:stCondLst>
+                                  <p:childTnLst>
+                                    <p:set>
+                                      <p:cBhvr>
+                                        <p:cTn id="17" dur="1" fill="hold">
+                                          <p:stCondLst>
+                                            <p:cond delay="0"/>
+                                          </p:stCondLst>
+                                        </p:cTn>
+                                        <p:tgtEl>
+                                          <p:spTgt spid="1027"/>
+                                        </p:tgtEl>
+                                        <p:attrNameLst>
+                                          <p:attrName>style.visibility</p:attrName>
+                                        </p:attrNameLst>
+                                      </p:cBhvr>
+                                      <p:to>
+                                        <p:strVal val="visible"/>
+                                      </p:to>
+                                    </p:set>
+                                    <p:animEffect transition="in" filter="blinds(horizontal)">
+                                      <p:cBhvr>
+                                        <p:cTn id="18" dur="500"/>
+                                        <p:tgtEl>
+                                          <p:spTgt spid="1027"/>
+                                        </p:tgtEl>
+                                      </p:cBhvr>
+                                    </p:animEffect>
+                                  </p:childTnLst>
+                                </p:cTn>
+                              </p:par>
+                            </p:childTnLst>
+                          </p:cTn>
+                        </p:par>
+                      </p:childTnLst>
+                    </p:cTn>
+                  </p:par>
+                </p:childTnLst>
+              </p:cTn>
+              <p:prevCondLst>
+                <p:cond evt="onPrev" delay="0">
+                  <p:tgtEl>
+                    <p:sldTgt/>
+                  </p:tgtEl>
+                </p:cond>
+              </p:prevCondLst>
+              <p:nextCondLst>
+                <p:cond evt="onNext" delay="0">
+                  <p:tgtEl>
+                    <p:sldTgt/>
+                  </p:tgtEl>
+                </p:cond>
+              </p:nextCondLst>
+            </p:seq>
+          </p:childTnLst>
+        </p:cTn>
+      </p:par>
+    </p:tnLst>
+  </p:timing>
 </p:sld>
 </file>
 
@@ -7953,7 +8177,7 @@
     </p:spTree>
     <p:extLst>
       <p:ext uri="{BB962C8B-B14F-4D97-AF65-F5344CB8AC3E}">
-        <p14:creationId xmlns:p14="http://schemas.microsoft.com/office/powerpoint/2010/main" val="148473633"/>
+        <p14:creationId xmlns:p14="http://schemas.microsoft.com/office/powerpoint/2010/main" xmlns="" val="148473633"/>
       </p:ext>
     </p:extLst>
   </p:cSld>
@@ -8570,7 +8794,7 @@
           <p:cNvPr id="2" name="Titel 1">
             <a:extLst>
               <a:ext uri="{FF2B5EF4-FFF2-40B4-BE49-F238E27FC236}">
-                <a16:creationId xmlns:a16="http://schemas.microsoft.com/office/drawing/2014/main" id="{A7AFEDD9-CD28-4FAE-80F4-FE24693A1C4B}"/>
+                <a16:creationId xmlns:a16="http://schemas.microsoft.com/office/drawing/2014/main" xmlns="" id="{A7AFEDD9-CD28-4FAE-80F4-FE24693A1C4B}"/>
               </a:ext>
             </a:extLst>
           </p:cNvPr>
@@ -8598,7 +8822,7 @@
           <p:cNvPr id="4" name="Fußzeilenplatzhalter 3">
             <a:extLst>
               <a:ext uri="{FF2B5EF4-FFF2-40B4-BE49-F238E27FC236}">
-                <a16:creationId xmlns:a16="http://schemas.microsoft.com/office/drawing/2014/main" id="{49FD879F-9FAD-4393-ADC7-6AC52CE6692D}"/>
+                <a16:creationId xmlns:a16="http://schemas.microsoft.com/office/drawing/2014/main" xmlns="" id="{49FD879F-9FAD-4393-ADC7-6AC52CE6692D}"/>
               </a:ext>
             </a:extLst>
           </p:cNvPr>
@@ -8626,7 +8850,7 @@
           <p:cNvPr id="6" name="Textfeld 5">
             <a:extLst>
               <a:ext uri="{FF2B5EF4-FFF2-40B4-BE49-F238E27FC236}">
-                <a16:creationId xmlns:a16="http://schemas.microsoft.com/office/drawing/2014/main" id="{3292FCF7-0BF7-4E46-AE45-4C1BC1753637}"/>
+                <a16:creationId xmlns:a16="http://schemas.microsoft.com/office/drawing/2014/main" xmlns="" id="{3292FCF7-0BF7-4E46-AE45-4C1BC1753637}"/>
               </a:ext>
             </a:extLst>
           </p:cNvPr>
@@ -8686,7 +8910,7 @@
           <p:cNvPr id="9" name="Textfeld 8">
             <a:extLst>
               <a:ext uri="{FF2B5EF4-FFF2-40B4-BE49-F238E27FC236}">
-                <a16:creationId xmlns:a16="http://schemas.microsoft.com/office/drawing/2014/main" id="{8CDFD2E7-9BE5-48A9-8A34-8124EFDDC387}"/>
+                <a16:creationId xmlns:a16="http://schemas.microsoft.com/office/drawing/2014/main" xmlns="" id="{8CDFD2E7-9BE5-48A9-8A34-8124EFDDC387}"/>
               </a:ext>
             </a:extLst>
           </p:cNvPr>
@@ -8773,7 +8997,7 @@
           <p:cNvPr id="10" name="Textfeld 9">
             <a:extLst>
               <a:ext uri="{FF2B5EF4-FFF2-40B4-BE49-F238E27FC236}">
-                <a16:creationId xmlns:a16="http://schemas.microsoft.com/office/drawing/2014/main" id="{51ABE4D3-BB27-4ACC-84C4-16047217F7CE}"/>
+                <a16:creationId xmlns:a16="http://schemas.microsoft.com/office/drawing/2014/main" xmlns="" id="{51ABE4D3-BB27-4ACC-84C4-16047217F7CE}"/>
               </a:ext>
             </a:extLst>
           </p:cNvPr>
@@ -8857,7 +9081,7 @@
           <p:cNvPr id="11" name="Rechteck: abgerundete Ecken 10">
             <a:extLst>
               <a:ext uri="{FF2B5EF4-FFF2-40B4-BE49-F238E27FC236}">
-                <a16:creationId xmlns:a16="http://schemas.microsoft.com/office/drawing/2014/main" id="{9C2BD50F-2AC7-4AA9-9B0D-2BBFFB49CE70}"/>
+                <a16:creationId xmlns:a16="http://schemas.microsoft.com/office/drawing/2014/main" xmlns="" id="{9C2BD50F-2AC7-4AA9-9B0D-2BBFFB49CE70}"/>
               </a:ext>
             </a:extLst>
           </p:cNvPr>
@@ -8912,7 +9136,7 @@
           <p:cNvPr id="13" name="Textfeld 12">
             <a:extLst>
               <a:ext uri="{FF2B5EF4-FFF2-40B4-BE49-F238E27FC236}">
-                <a16:creationId xmlns:a16="http://schemas.microsoft.com/office/drawing/2014/main" id="{5125CB82-FADD-414A-84CA-5B41F4ED476B}"/>
+                <a16:creationId xmlns:a16="http://schemas.microsoft.com/office/drawing/2014/main" xmlns="" id="{5125CB82-FADD-414A-84CA-5B41F4ED476B}"/>
               </a:ext>
             </a:extLst>
           </p:cNvPr>
@@ -9014,7 +9238,7 @@
           <p:cNvPr id="15" name="Gerader Verbinder 14">
             <a:extLst>
               <a:ext uri="{FF2B5EF4-FFF2-40B4-BE49-F238E27FC236}">
-                <a16:creationId xmlns:a16="http://schemas.microsoft.com/office/drawing/2014/main" id="{24E6EF1B-BA0D-4CBA-B55D-2F90C6EB2EB3}"/>
+                <a16:creationId xmlns:a16="http://schemas.microsoft.com/office/drawing/2014/main" xmlns="" id="{24E6EF1B-BA0D-4CBA-B55D-2F90C6EB2EB3}"/>
               </a:ext>
             </a:extLst>
           </p:cNvPr>
@@ -9057,7 +9281,7 @@
           <p:cNvPr id="14" name="Fußzeilenplatzhalter 4">
             <a:extLst>
               <a:ext uri="{FF2B5EF4-FFF2-40B4-BE49-F238E27FC236}">
-                <a16:creationId xmlns:a16="http://schemas.microsoft.com/office/drawing/2014/main" id="{08CC590C-874E-4B76-9273-4EDAE071DA13}"/>
+                <a16:creationId xmlns:a16="http://schemas.microsoft.com/office/drawing/2014/main" xmlns="" id="{08CC590C-874E-4B76-9273-4EDAE071DA13}"/>
               </a:ext>
             </a:extLst>
           </p:cNvPr>
@@ -9437,7 +9661,7 @@
           <p:cNvPr id="16" name="Gerade Verbindung 7">
             <a:extLst>
               <a:ext uri="{FF2B5EF4-FFF2-40B4-BE49-F238E27FC236}">
-                <a16:creationId xmlns:a16="http://schemas.microsoft.com/office/drawing/2014/main" id="{1A32E0AC-1C3B-499C-8BF3-EEB9B045EF38}"/>
+                <a16:creationId xmlns:a16="http://schemas.microsoft.com/office/drawing/2014/main" xmlns="" id="{1A32E0AC-1C3B-499C-8BF3-EEB9B045EF38}"/>
               </a:ext>
             </a:extLst>
           </p:cNvPr>
@@ -9506,7 +9730,7 @@
           <p:cNvPr id="17" name="Rechteck: abgerundete Ecken 16">
             <a:extLst>
               <a:ext uri="{FF2B5EF4-FFF2-40B4-BE49-F238E27FC236}">
-                <a16:creationId xmlns:a16="http://schemas.microsoft.com/office/drawing/2014/main" id="{A45CB1FD-522F-4CF2-B9FA-B94EF5517E81}"/>
+                <a16:creationId xmlns:a16="http://schemas.microsoft.com/office/drawing/2014/main" xmlns="" id="{A45CB1FD-522F-4CF2-B9FA-B94EF5517E81}"/>
               </a:ext>
             </a:extLst>
           </p:cNvPr>
@@ -9561,7 +9785,7 @@
           <p:cNvPr id="5" name="Pfeil: nach rechts 4">
             <a:extLst>
               <a:ext uri="{FF2B5EF4-FFF2-40B4-BE49-F238E27FC236}">
-                <a16:creationId xmlns:a16="http://schemas.microsoft.com/office/drawing/2014/main" id="{9B0702B1-7159-4ED2-B7D9-6B9C306A3B62}"/>
+                <a16:creationId xmlns:a16="http://schemas.microsoft.com/office/drawing/2014/main" xmlns="" id="{9B0702B1-7159-4ED2-B7D9-6B9C306A3B62}"/>
               </a:ext>
             </a:extLst>
           </p:cNvPr>
@@ -9608,7 +9832,7 @@
     </p:spTree>
     <p:extLst>
       <p:ext uri="{BB962C8B-B14F-4D97-AF65-F5344CB8AC3E}">
-        <p14:creationId xmlns:p14="http://schemas.microsoft.com/office/powerpoint/2010/main" val="3444159518"/>
+        <p14:creationId xmlns:p14="http://schemas.microsoft.com/office/powerpoint/2010/main" xmlns="" val="3444159518"/>
       </p:ext>
     </p:extLst>
   </p:cSld>
@@ -10049,7 +10273,7 @@
           <p:cNvPr id="2" name="Titel 1">
             <a:extLst>
               <a:ext uri="{FF2B5EF4-FFF2-40B4-BE49-F238E27FC236}">
-                <a16:creationId xmlns:a16="http://schemas.microsoft.com/office/drawing/2014/main" id="{C773FAA8-F163-4AD1-8576-9C8F0058A786}"/>
+                <a16:creationId xmlns:a16="http://schemas.microsoft.com/office/drawing/2014/main" xmlns="" id="{C773FAA8-F163-4AD1-8576-9C8F0058A786}"/>
               </a:ext>
             </a:extLst>
           </p:cNvPr>
@@ -10077,7 +10301,7 @@
           <p:cNvPr id="4" name="Fußzeilenplatzhalter 3">
             <a:extLst>
               <a:ext uri="{FF2B5EF4-FFF2-40B4-BE49-F238E27FC236}">
-                <a16:creationId xmlns:a16="http://schemas.microsoft.com/office/drawing/2014/main" id="{21D47380-A749-437A-8E08-FF26679768D9}"/>
+                <a16:creationId xmlns:a16="http://schemas.microsoft.com/office/drawing/2014/main" xmlns="" id="{21D47380-A749-437A-8E08-FF26679768D9}"/>
               </a:ext>
             </a:extLst>
           </p:cNvPr>
@@ -10105,7 +10329,7 @@
           <p:cNvPr id="14" name="Textfeld 13">
             <a:extLst>
               <a:ext uri="{FF2B5EF4-FFF2-40B4-BE49-F238E27FC236}">
-                <a16:creationId xmlns:a16="http://schemas.microsoft.com/office/drawing/2014/main" id="{471CC193-BF67-4D7B-9944-69EF9D5E06CF}"/>
+                <a16:creationId xmlns:a16="http://schemas.microsoft.com/office/drawing/2014/main" xmlns="" id="{471CC193-BF67-4D7B-9944-69EF9D5E06CF}"/>
               </a:ext>
             </a:extLst>
           </p:cNvPr>
@@ -10189,7 +10413,7 @@
           <p:cNvPr id="17" name="Rechteck 16">
             <a:extLst>
               <a:ext uri="{FF2B5EF4-FFF2-40B4-BE49-F238E27FC236}">
-                <a16:creationId xmlns:a16="http://schemas.microsoft.com/office/drawing/2014/main" id="{D13F363D-59AE-415D-9A9E-BCF8093C6D7E}"/>
+                <a16:creationId xmlns:a16="http://schemas.microsoft.com/office/drawing/2014/main" xmlns="" id="{D13F363D-59AE-415D-9A9E-BCF8093C6D7E}"/>
               </a:ext>
             </a:extLst>
           </p:cNvPr>
@@ -10235,7 +10459,7 @@
           <p:cNvPr id="18" name="Textfeld 17">
             <a:extLst>
               <a:ext uri="{FF2B5EF4-FFF2-40B4-BE49-F238E27FC236}">
-                <a16:creationId xmlns:a16="http://schemas.microsoft.com/office/drawing/2014/main" id="{678756D6-B56D-4EF2-9DE1-6E72F551D96E}"/>
+                <a16:creationId xmlns:a16="http://schemas.microsoft.com/office/drawing/2014/main" xmlns="" id="{678756D6-B56D-4EF2-9DE1-6E72F551D96E}"/>
               </a:ext>
             </a:extLst>
           </p:cNvPr>
@@ -10271,7 +10495,7 @@
           <p:cNvPr id="16" name="Rechteck 15">
             <a:extLst>
               <a:ext uri="{FF2B5EF4-FFF2-40B4-BE49-F238E27FC236}">
-                <a16:creationId xmlns:a16="http://schemas.microsoft.com/office/drawing/2014/main" id="{8D4D5FC0-6002-4CA3-9779-A96C43486676}"/>
+                <a16:creationId xmlns:a16="http://schemas.microsoft.com/office/drawing/2014/main" xmlns="" id="{8D4D5FC0-6002-4CA3-9779-A96C43486676}"/>
               </a:ext>
             </a:extLst>
           </p:cNvPr>
@@ -10317,7 +10541,7 @@
           <p:cNvPr id="19" name="Textfeld 18">
             <a:extLst>
               <a:ext uri="{FF2B5EF4-FFF2-40B4-BE49-F238E27FC236}">
-                <a16:creationId xmlns:a16="http://schemas.microsoft.com/office/drawing/2014/main" id="{387F2AD1-1CB1-42CD-82DF-027DDFC38308}"/>
+                <a16:creationId xmlns:a16="http://schemas.microsoft.com/office/drawing/2014/main" xmlns="" id="{387F2AD1-1CB1-42CD-82DF-027DDFC38308}"/>
               </a:ext>
             </a:extLst>
           </p:cNvPr>
@@ -10356,7 +10580,7 @@
           <p:cNvPr id="3" name="Stack2">
             <a:extLst>
               <a:ext uri="{FF2B5EF4-FFF2-40B4-BE49-F238E27FC236}">
-                <a16:creationId xmlns:a16="http://schemas.microsoft.com/office/drawing/2014/main" id="{18C4F205-192E-45A7-AA4E-564A52280944}"/>
+                <a16:creationId xmlns:a16="http://schemas.microsoft.com/office/drawing/2014/main" xmlns="" id="{18C4F205-192E-45A7-AA4E-564A52280944}"/>
               </a:ext>
             </a:extLst>
           </p:cNvPr>
@@ -10376,7 +10600,7 @@
             <p:cNvPr id="33" name="Flussdiagramm: Dokument 32">
               <a:extLst>
                 <a:ext uri="{FF2B5EF4-FFF2-40B4-BE49-F238E27FC236}">
-                  <a16:creationId xmlns:a16="http://schemas.microsoft.com/office/drawing/2014/main" id="{5D37606C-86D4-400B-8E5B-1E7773E9597E}"/>
+                  <a16:creationId xmlns:a16="http://schemas.microsoft.com/office/drawing/2014/main" xmlns="" id="{5D37606C-86D4-400B-8E5B-1E7773E9597E}"/>
                 </a:ext>
               </a:extLst>
             </p:cNvPr>
@@ -10429,7 +10653,7 @@
             <p:cNvPr id="34" name="Flussdiagramm: Dokument 33">
               <a:extLst>
                 <a:ext uri="{FF2B5EF4-FFF2-40B4-BE49-F238E27FC236}">
-                  <a16:creationId xmlns:a16="http://schemas.microsoft.com/office/drawing/2014/main" id="{4738961D-1BE6-42B2-8490-D5EE6B430DF1}"/>
+                  <a16:creationId xmlns:a16="http://schemas.microsoft.com/office/drawing/2014/main" xmlns="" id="{4738961D-1BE6-42B2-8490-D5EE6B430DF1}"/>
                 </a:ext>
               </a:extLst>
             </p:cNvPr>
@@ -10482,7 +10706,7 @@
             <p:cNvPr id="35" name="Textfeld 34">
               <a:extLst>
                 <a:ext uri="{FF2B5EF4-FFF2-40B4-BE49-F238E27FC236}">
-                  <a16:creationId xmlns:a16="http://schemas.microsoft.com/office/drawing/2014/main" id="{A11A284B-D537-4997-A1CF-D9EE29FD658D}"/>
+                  <a16:creationId xmlns:a16="http://schemas.microsoft.com/office/drawing/2014/main" xmlns="" id="{A11A284B-D537-4997-A1CF-D9EE29FD658D}"/>
                 </a:ext>
               </a:extLst>
             </p:cNvPr>
@@ -10525,7 +10749,7 @@
             <p:cNvPr id="36" name="Textfeld 35">
               <a:extLst>
                 <a:ext uri="{FF2B5EF4-FFF2-40B4-BE49-F238E27FC236}">
-                  <a16:creationId xmlns:a16="http://schemas.microsoft.com/office/drawing/2014/main" id="{F27CD3AA-4659-4879-838E-A38E2068E191}"/>
+                  <a16:creationId xmlns:a16="http://schemas.microsoft.com/office/drawing/2014/main" xmlns="" id="{F27CD3AA-4659-4879-838E-A38E2068E191}"/>
                 </a:ext>
               </a:extLst>
             </p:cNvPr>
@@ -10568,7 +10792,7 @@
             <p:cNvPr id="37" name="Textfeld 36">
               <a:extLst>
                 <a:ext uri="{FF2B5EF4-FFF2-40B4-BE49-F238E27FC236}">
-                  <a16:creationId xmlns:a16="http://schemas.microsoft.com/office/drawing/2014/main" id="{2A582C8B-3193-492E-AA05-5CA958480D7D}"/>
+                  <a16:creationId xmlns:a16="http://schemas.microsoft.com/office/drawing/2014/main" xmlns="" id="{2A582C8B-3193-492E-AA05-5CA958480D7D}"/>
                 </a:ext>
               </a:extLst>
             </p:cNvPr>
@@ -10614,7 +10838,7 @@
             <p:cNvPr id="38" name="Textfeld 37">
               <a:extLst>
                 <a:ext uri="{FF2B5EF4-FFF2-40B4-BE49-F238E27FC236}">
-                  <a16:creationId xmlns:a16="http://schemas.microsoft.com/office/drawing/2014/main" id="{29C10D75-4241-4862-A582-B41B29A6D397}"/>
+                  <a16:creationId xmlns:a16="http://schemas.microsoft.com/office/drawing/2014/main" xmlns="" id="{29C10D75-4241-4862-A582-B41B29A6D397}"/>
                 </a:ext>
               </a:extLst>
             </p:cNvPr>
@@ -10656,7 +10880,7 @@
             <p:cNvPr id="40" name="Textfeld 39">
               <a:extLst>
                 <a:ext uri="{FF2B5EF4-FFF2-40B4-BE49-F238E27FC236}">
-                  <a16:creationId xmlns:a16="http://schemas.microsoft.com/office/drawing/2014/main" id="{918BD300-19F3-4F52-A56B-EAB9FD3B5041}"/>
+                  <a16:creationId xmlns:a16="http://schemas.microsoft.com/office/drawing/2014/main" xmlns="" id="{918BD300-19F3-4F52-A56B-EAB9FD3B5041}"/>
                 </a:ext>
               </a:extLst>
             </p:cNvPr>
@@ -10698,7 +10922,7 @@
             <p:cNvPr id="41" name="Textfeld 40">
               <a:extLst>
                 <a:ext uri="{FF2B5EF4-FFF2-40B4-BE49-F238E27FC236}">
-                  <a16:creationId xmlns:a16="http://schemas.microsoft.com/office/drawing/2014/main" id="{2EE87C73-3E28-4986-BB17-CB576E765C29}"/>
+                  <a16:creationId xmlns:a16="http://schemas.microsoft.com/office/drawing/2014/main" xmlns="" id="{2EE87C73-3E28-4986-BB17-CB576E765C29}"/>
                 </a:ext>
               </a:extLst>
             </p:cNvPr>
@@ -10741,7 +10965,7 @@
           <p:cNvPr id="22" name="Stack1">
             <a:extLst>
               <a:ext uri="{FF2B5EF4-FFF2-40B4-BE49-F238E27FC236}">
-                <a16:creationId xmlns:a16="http://schemas.microsoft.com/office/drawing/2014/main" id="{07C774FE-0421-461F-81FE-A9686F8EA1F6}"/>
+                <a16:creationId xmlns:a16="http://schemas.microsoft.com/office/drawing/2014/main" xmlns="" id="{07C774FE-0421-461F-81FE-A9686F8EA1F6}"/>
               </a:ext>
             </a:extLst>
           </p:cNvPr>
@@ -10761,7 +10985,7 @@
             <p:cNvPr id="24" name="Flussdiagramm: Dokument 23">
               <a:extLst>
                 <a:ext uri="{FF2B5EF4-FFF2-40B4-BE49-F238E27FC236}">
-                  <a16:creationId xmlns:a16="http://schemas.microsoft.com/office/drawing/2014/main" id="{3B0254FD-1241-4D3F-A905-617890D9BDB7}"/>
+                  <a16:creationId xmlns:a16="http://schemas.microsoft.com/office/drawing/2014/main" xmlns="" id="{3B0254FD-1241-4D3F-A905-617890D9BDB7}"/>
                 </a:ext>
               </a:extLst>
             </p:cNvPr>
@@ -10814,7 +11038,7 @@
             <p:cNvPr id="26" name="Flussdiagramm: Dokument 25">
               <a:extLst>
                 <a:ext uri="{FF2B5EF4-FFF2-40B4-BE49-F238E27FC236}">
-                  <a16:creationId xmlns:a16="http://schemas.microsoft.com/office/drawing/2014/main" id="{A541AAC5-F7A6-4D45-95FC-B3270014879A}"/>
+                  <a16:creationId xmlns:a16="http://schemas.microsoft.com/office/drawing/2014/main" xmlns="" id="{A541AAC5-F7A6-4D45-95FC-B3270014879A}"/>
                 </a:ext>
               </a:extLst>
             </p:cNvPr>
@@ -10867,7 +11091,7 @@
             <p:cNvPr id="27" name="Textfeld 26">
               <a:extLst>
                 <a:ext uri="{FF2B5EF4-FFF2-40B4-BE49-F238E27FC236}">
-                  <a16:creationId xmlns:a16="http://schemas.microsoft.com/office/drawing/2014/main" id="{194F4F25-91D7-4DFB-B7A2-12497EDE933F}"/>
+                  <a16:creationId xmlns:a16="http://schemas.microsoft.com/office/drawing/2014/main" xmlns="" id="{194F4F25-91D7-4DFB-B7A2-12497EDE933F}"/>
                 </a:ext>
               </a:extLst>
             </p:cNvPr>
@@ -10910,7 +11134,7 @@
             <p:cNvPr id="29" name="Textfeld 28">
               <a:extLst>
                 <a:ext uri="{FF2B5EF4-FFF2-40B4-BE49-F238E27FC236}">
-                  <a16:creationId xmlns:a16="http://schemas.microsoft.com/office/drawing/2014/main" id="{03C0E7DE-0FEE-415C-86B3-EA813E4ED989}"/>
+                  <a16:creationId xmlns:a16="http://schemas.microsoft.com/office/drawing/2014/main" xmlns="" id="{03C0E7DE-0FEE-415C-86B3-EA813E4ED989}"/>
                 </a:ext>
               </a:extLst>
             </p:cNvPr>
@@ -10956,7 +11180,7 @@
             <p:cNvPr id="30" name="Textfeld 29">
               <a:extLst>
                 <a:ext uri="{FF2B5EF4-FFF2-40B4-BE49-F238E27FC236}">
-                  <a16:creationId xmlns:a16="http://schemas.microsoft.com/office/drawing/2014/main" id="{FF30B90D-055D-4555-8B4D-F052DD1DC1A6}"/>
+                  <a16:creationId xmlns:a16="http://schemas.microsoft.com/office/drawing/2014/main" xmlns="" id="{FF30B90D-055D-4555-8B4D-F052DD1DC1A6}"/>
                 </a:ext>
               </a:extLst>
             </p:cNvPr>
@@ -10999,7 +11223,7 @@
             <p:cNvPr id="31" name="Textfeld 30">
               <a:extLst>
                 <a:ext uri="{FF2B5EF4-FFF2-40B4-BE49-F238E27FC236}">
-                  <a16:creationId xmlns:a16="http://schemas.microsoft.com/office/drawing/2014/main" id="{7CC6C5F7-D76E-4CD6-8E6D-93EF7D99116B}"/>
+                  <a16:creationId xmlns:a16="http://schemas.microsoft.com/office/drawing/2014/main" xmlns="" id="{7CC6C5F7-D76E-4CD6-8E6D-93EF7D99116B}"/>
                 </a:ext>
               </a:extLst>
             </p:cNvPr>
@@ -11043,7 +11267,7 @@
           <p:cNvPr id="15" name="Pfeil: nach rechts 14">
             <a:extLst>
               <a:ext uri="{FF2B5EF4-FFF2-40B4-BE49-F238E27FC236}">
-                <a16:creationId xmlns:a16="http://schemas.microsoft.com/office/drawing/2014/main" id="{28FD6023-536B-4507-B186-32031DDCA1CD}"/>
+                <a16:creationId xmlns:a16="http://schemas.microsoft.com/office/drawing/2014/main" xmlns="" id="{28FD6023-536B-4507-B186-32031DDCA1CD}"/>
               </a:ext>
             </a:extLst>
           </p:cNvPr>
@@ -11096,7 +11320,7 @@
           <p:cNvPr id="20" name="Pfeil: nach rechts 19">
             <a:extLst>
               <a:ext uri="{FF2B5EF4-FFF2-40B4-BE49-F238E27FC236}">
-                <a16:creationId xmlns:a16="http://schemas.microsoft.com/office/drawing/2014/main" id="{2BAA150E-DEB2-49F2-9B41-DC2C6658D9D4}"/>
+                <a16:creationId xmlns:a16="http://schemas.microsoft.com/office/drawing/2014/main" xmlns="" id="{2BAA150E-DEB2-49F2-9B41-DC2C6658D9D4}"/>
               </a:ext>
             </a:extLst>
           </p:cNvPr>
@@ -11149,7 +11373,7 @@
           <p:cNvPr id="21" name="Pfeil: delete">
             <a:extLst>
               <a:ext uri="{FF2B5EF4-FFF2-40B4-BE49-F238E27FC236}">
-                <a16:creationId xmlns:a16="http://schemas.microsoft.com/office/drawing/2014/main" id="{ACA347FB-8677-4E22-B4F7-186B44D7F5F6}"/>
+                <a16:creationId xmlns:a16="http://schemas.microsoft.com/office/drawing/2014/main" xmlns="" id="{ACA347FB-8677-4E22-B4F7-186B44D7F5F6}"/>
               </a:ext>
             </a:extLst>
           </p:cNvPr>
@@ -11202,7 +11426,7 @@
           <p:cNvPr id="23" name="Pfeil: free">
             <a:extLst>
               <a:ext uri="{FF2B5EF4-FFF2-40B4-BE49-F238E27FC236}">
-                <a16:creationId xmlns:a16="http://schemas.microsoft.com/office/drawing/2014/main" id="{787D0162-99F6-42D0-B5C2-864ABF802358}"/>
+                <a16:creationId xmlns:a16="http://schemas.microsoft.com/office/drawing/2014/main" xmlns="" id="{787D0162-99F6-42D0-B5C2-864ABF802358}"/>
               </a:ext>
             </a:extLst>
           </p:cNvPr>
@@ -11255,7 +11479,7 @@
           <p:cNvPr id="42" name="Textfeld 41">
             <a:extLst>
               <a:ext uri="{FF2B5EF4-FFF2-40B4-BE49-F238E27FC236}">
-                <a16:creationId xmlns:a16="http://schemas.microsoft.com/office/drawing/2014/main" id="{A676F32B-652C-4325-B6B0-7228F008881D}"/>
+                <a16:creationId xmlns:a16="http://schemas.microsoft.com/office/drawing/2014/main" xmlns="" id="{A676F32B-652C-4325-B6B0-7228F008881D}"/>
               </a:ext>
             </a:extLst>
           </p:cNvPr>
@@ -11296,7 +11520,7 @@
     </p:spTree>
     <p:extLst>
       <p:ext uri="{BB962C8B-B14F-4D97-AF65-F5344CB8AC3E}">
-        <p14:creationId xmlns:p14="http://schemas.microsoft.com/office/powerpoint/2010/main" val="210037210"/>
+        <p14:creationId xmlns:p14="http://schemas.microsoft.com/office/powerpoint/2010/main" xmlns="" val="210037210"/>
       </p:ext>
     </p:extLst>
   </p:cSld>
@@ -11704,7 +11928,7 @@
           <p:cNvPr id="2" name="Titel 1">
             <a:extLst>
               <a:ext uri="{FF2B5EF4-FFF2-40B4-BE49-F238E27FC236}">
-                <a16:creationId xmlns:a16="http://schemas.microsoft.com/office/drawing/2014/main" id="{A3E335E8-731E-46CF-8190-7196335FDB02}"/>
+                <a16:creationId xmlns:a16="http://schemas.microsoft.com/office/drawing/2014/main" xmlns="" id="{A3E335E8-731E-46CF-8190-7196335FDB02}"/>
               </a:ext>
             </a:extLst>
           </p:cNvPr>
@@ -11737,7 +11961,7 @@
           <p:cNvPr id="4" name="Fußzeilenplatzhalter 3">
             <a:extLst>
               <a:ext uri="{FF2B5EF4-FFF2-40B4-BE49-F238E27FC236}">
-                <a16:creationId xmlns:a16="http://schemas.microsoft.com/office/drawing/2014/main" id="{8BC3581A-FFB1-42DE-86BE-E38404BA74A3}"/>
+                <a16:creationId xmlns:a16="http://schemas.microsoft.com/office/drawing/2014/main" xmlns="" id="{8BC3581A-FFB1-42DE-86BE-E38404BA74A3}"/>
               </a:ext>
             </a:extLst>
           </p:cNvPr>
@@ -11765,7 +11989,7 @@
           <p:cNvPr id="41" name="Stack1">
             <a:extLst>
               <a:ext uri="{FF2B5EF4-FFF2-40B4-BE49-F238E27FC236}">
-                <a16:creationId xmlns:a16="http://schemas.microsoft.com/office/drawing/2014/main" id="{2CC81243-22EA-4326-A8D2-B93A841EAA67}"/>
+                <a16:creationId xmlns:a16="http://schemas.microsoft.com/office/drawing/2014/main" xmlns="" id="{2CC81243-22EA-4326-A8D2-B93A841EAA67}"/>
               </a:ext>
             </a:extLst>
           </p:cNvPr>
@@ -11785,7 +12009,7 @@
             <p:cNvPr id="31" name="Flussdiagramm: Dokument 30">
               <a:extLst>
                 <a:ext uri="{FF2B5EF4-FFF2-40B4-BE49-F238E27FC236}">
-                  <a16:creationId xmlns:a16="http://schemas.microsoft.com/office/drawing/2014/main" id="{36CE3746-679B-49E2-9780-1AF51286F92D}"/>
+                  <a16:creationId xmlns:a16="http://schemas.microsoft.com/office/drawing/2014/main" xmlns="" id="{36CE3746-679B-49E2-9780-1AF51286F92D}"/>
                 </a:ext>
               </a:extLst>
             </p:cNvPr>
@@ -11838,7 +12062,7 @@
             <p:cNvPr id="32" name="Flussdiagramm: Dokument 31">
               <a:extLst>
                 <a:ext uri="{FF2B5EF4-FFF2-40B4-BE49-F238E27FC236}">
-                  <a16:creationId xmlns:a16="http://schemas.microsoft.com/office/drawing/2014/main" id="{48211D39-C8EF-4F6B-8A60-898524E97625}"/>
+                  <a16:creationId xmlns:a16="http://schemas.microsoft.com/office/drawing/2014/main" xmlns="" id="{48211D39-C8EF-4F6B-8A60-898524E97625}"/>
                 </a:ext>
               </a:extLst>
             </p:cNvPr>
@@ -11891,7 +12115,7 @@
             <p:cNvPr id="35" name="Textfeld 34">
               <a:extLst>
                 <a:ext uri="{FF2B5EF4-FFF2-40B4-BE49-F238E27FC236}">
-                  <a16:creationId xmlns:a16="http://schemas.microsoft.com/office/drawing/2014/main" id="{4C866636-E777-425F-89AF-4BFB70D54A21}"/>
+                  <a16:creationId xmlns:a16="http://schemas.microsoft.com/office/drawing/2014/main" xmlns="" id="{4C866636-E777-425F-89AF-4BFB70D54A21}"/>
                 </a:ext>
               </a:extLst>
             </p:cNvPr>
@@ -11934,7 +12158,7 @@
             <p:cNvPr id="37" name="Textfeld 36">
               <a:extLst>
                 <a:ext uri="{FF2B5EF4-FFF2-40B4-BE49-F238E27FC236}">
-                  <a16:creationId xmlns:a16="http://schemas.microsoft.com/office/drawing/2014/main" id="{F5EA097D-E5C1-40C4-A363-50B2723FCFC5}"/>
+                  <a16:creationId xmlns:a16="http://schemas.microsoft.com/office/drawing/2014/main" xmlns="" id="{F5EA097D-E5C1-40C4-A363-50B2723FCFC5}"/>
                 </a:ext>
               </a:extLst>
             </p:cNvPr>
@@ -11977,7 +12201,7 @@
             <p:cNvPr id="38" name="Textfeld 37">
               <a:extLst>
                 <a:ext uri="{FF2B5EF4-FFF2-40B4-BE49-F238E27FC236}">
-                  <a16:creationId xmlns:a16="http://schemas.microsoft.com/office/drawing/2014/main" id="{AECECD28-014D-44CE-B776-DE02FCE2BC1C}"/>
+                  <a16:creationId xmlns:a16="http://schemas.microsoft.com/office/drawing/2014/main" xmlns="" id="{AECECD28-014D-44CE-B776-DE02FCE2BC1C}"/>
                 </a:ext>
               </a:extLst>
             </p:cNvPr>
@@ -12023,7 +12247,7 @@
             <p:cNvPr id="39" name="Textfeld 38">
               <a:extLst>
                 <a:ext uri="{FF2B5EF4-FFF2-40B4-BE49-F238E27FC236}">
-                  <a16:creationId xmlns:a16="http://schemas.microsoft.com/office/drawing/2014/main" id="{86DB0DE1-7D71-4AF6-93BB-656BE3527D7E}"/>
+                  <a16:creationId xmlns:a16="http://schemas.microsoft.com/office/drawing/2014/main" xmlns="" id="{86DB0DE1-7D71-4AF6-93BB-656BE3527D7E}"/>
                 </a:ext>
               </a:extLst>
             </p:cNvPr>
@@ -12066,7 +12290,7 @@
             <p:cNvPr id="40" name="Textfeld 39">
               <a:extLst>
                 <a:ext uri="{FF2B5EF4-FFF2-40B4-BE49-F238E27FC236}">
-                  <a16:creationId xmlns:a16="http://schemas.microsoft.com/office/drawing/2014/main" id="{6B3BDB3D-F5B6-4E86-9D82-495AB0E8E36D}"/>
+                  <a16:creationId xmlns:a16="http://schemas.microsoft.com/office/drawing/2014/main" xmlns="" id="{6B3BDB3D-F5B6-4E86-9D82-495AB0E8E36D}"/>
                 </a:ext>
               </a:extLst>
             </p:cNvPr>
@@ -12110,7 +12334,7 @@
           <p:cNvPr id="52" name="Stack 2">
             <a:extLst>
               <a:ext uri="{FF2B5EF4-FFF2-40B4-BE49-F238E27FC236}">
-                <a16:creationId xmlns:a16="http://schemas.microsoft.com/office/drawing/2014/main" id="{AD091ACE-09A4-47B1-8087-0836739E417F}"/>
+                <a16:creationId xmlns:a16="http://schemas.microsoft.com/office/drawing/2014/main" xmlns="" id="{AD091ACE-09A4-47B1-8087-0836739E417F}"/>
               </a:ext>
             </a:extLst>
           </p:cNvPr>
@@ -12130,7 +12354,7 @@
             <p:cNvPr id="43" name="Flussdiagramm: Dokument 42">
               <a:extLst>
                 <a:ext uri="{FF2B5EF4-FFF2-40B4-BE49-F238E27FC236}">
-                  <a16:creationId xmlns:a16="http://schemas.microsoft.com/office/drawing/2014/main" id="{0AF68594-CF07-4B95-B037-60C7E21A46B9}"/>
+                  <a16:creationId xmlns:a16="http://schemas.microsoft.com/office/drawing/2014/main" xmlns="" id="{0AF68594-CF07-4B95-B037-60C7E21A46B9}"/>
                 </a:ext>
               </a:extLst>
             </p:cNvPr>
@@ -12183,7 +12407,7 @@
             <p:cNvPr id="44" name="Flussdiagramm: Dokument 43">
               <a:extLst>
                 <a:ext uri="{FF2B5EF4-FFF2-40B4-BE49-F238E27FC236}">
-                  <a16:creationId xmlns:a16="http://schemas.microsoft.com/office/drawing/2014/main" id="{C7CE26FB-3391-4BCD-AF17-1DD4CEE488AC}"/>
+                  <a16:creationId xmlns:a16="http://schemas.microsoft.com/office/drawing/2014/main" xmlns="" id="{C7CE26FB-3391-4BCD-AF17-1DD4CEE488AC}"/>
                 </a:ext>
               </a:extLst>
             </p:cNvPr>
@@ -12236,7 +12460,7 @@
             <p:cNvPr id="45" name="Textfeld 44">
               <a:extLst>
                 <a:ext uri="{FF2B5EF4-FFF2-40B4-BE49-F238E27FC236}">
-                  <a16:creationId xmlns:a16="http://schemas.microsoft.com/office/drawing/2014/main" id="{3AE9DB08-ED8D-421E-A37F-4B17A29A7313}"/>
+                  <a16:creationId xmlns:a16="http://schemas.microsoft.com/office/drawing/2014/main" xmlns="" id="{3AE9DB08-ED8D-421E-A37F-4B17A29A7313}"/>
                 </a:ext>
               </a:extLst>
             </p:cNvPr>
@@ -12279,7 +12503,7 @@
             <p:cNvPr id="46" name="Textfeld 45">
               <a:extLst>
                 <a:ext uri="{FF2B5EF4-FFF2-40B4-BE49-F238E27FC236}">
-                  <a16:creationId xmlns:a16="http://schemas.microsoft.com/office/drawing/2014/main" id="{46B09944-2BE5-43F6-9AAC-24012C1CBFE8}"/>
+                  <a16:creationId xmlns:a16="http://schemas.microsoft.com/office/drawing/2014/main" xmlns="" id="{46B09944-2BE5-43F6-9AAC-24012C1CBFE8}"/>
                 </a:ext>
               </a:extLst>
             </p:cNvPr>
@@ -12322,7 +12546,7 @@
             <p:cNvPr id="47" name="Textfeld 46">
               <a:extLst>
                 <a:ext uri="{FF2B5EF4-FFF2-40B4-BE49-F238E27FC236}">
-                  <a16:creationId xmlns:a16="http://schemas.microsoft.com/office/drawing/2014/main" id="{89C3D818-E772-49D8-84E7-FE6974836245}"/>
+                  <a16:creationId xmlns:a16="http://schemas.microsoft.com/office/drawing/2014/main" xmlns="" id="{89C3D818-E772-49D8-84E7-FE6974836245}"/>
                 </a:ext>
               </a:extLst>
             </p:cNvPr>
@@ -12368,7 +12592,7 @@
             <p:cNvPr id="48" name="Textfeld 47">
               <a:extLst>
                 <a:ext uri="{FF2B5EF4-FFF2-40B4-BE49-F238E27FC236}">
-                  <a16:creationId xmlns:a16="http://schemas.microsoft.com/office/drawing/2014/main" id="{65AAD603-CCDF-4DA8-9D60-EE72357DDC3C}"/>
+                  <a16:creationId xmlns:a16="http://schemas.microsoft.com/office/drawing/2014/main" xmlns="" id="{65AAD603-CCDF-4DA8-9D60-EE72357DDC3C}"/>
                 </a:ext>
               </a:extLst>
             </p:cNvPr>
@@ -12411,7 +12635,7 @@
             <p:cNvPr id="49" name="Textfeld 48">
               <a:extLst>
                 <a:ext uri="{FF2B5EF4-FFF2-40B4-BE49-F238E27FC236}">
-                  <a16:creationId xmlns:a16="http://schemas.microsoft.com/office/drawing/2014/main" id="{3D72182E-434E-4DB6-AA96-A7E7FCB40223}"/>
+                  <a16:creationId xmlns:a16="http://schemas.microsoft.com/office/drawing/2014/main" xmlns="" id="{3D72182E-434E-4DB6-AA96-A7E7FCB40223}"/>
                 </a:ext>
               </a:extLst>
             </p:cNvPr>
@@ -12454,7 +12678,7 @@
             <p:cNvPr id="50" name="Textfeld 49">
               <a:extLst>
                 <a:ext uri="{FF2B5EF4-FFF2-40B4-BE49-F238E27FC236}">
-                  <a16:creationId xmlns:a16="http://schemas.microsoft.com/office/drawing/2014/main" id="{58840F64-6E6B-4869-8566-574E8EECEAB7}"/>
+                  <a16:creationId xmlns:a16="http://schemas.microsoft.com/office/drawing/2014/main" xmlns="" id="{58840F64-6E6B-4869-8566-574E8EECEAB7}"/>
                 </a:ext>
               </a:extLst>
             </p:cNvPr>
@@ -12500,7 +12724,7 @@
             <p:cNvPr id="51" name="Explosion: 8 Zacken 50">
               <a:extLst>
                 <a:ext uri="{FF2B5EF4-FFF2-40B4-BE49-F238E27FC236}">
-                  <a16:creationId xmlns:a16="http://schemas.microsoft.com/office/drawing/2014/main" id="{F2C96439-139F-4FC5-A6FE-BF5395FE020C}"/>
+                  <a16:creationId xmlns:a16="http://schemas.microsoft.com/office/drawing/2014/main" xmlns="" id="{F2C96439-139F-4FC5-A6FE-BF5395FE020C}"/>
                 </a:ext>
               </a:extLst>
             </p:cNvPr>
@@ -12550,7 +12774,7 @@
           <p:cNvPr id="53" name="Textfeld 52">
             <a:extLst>
               <a:ext uri="{FF2B5EF4-FFF2-40B4-BE49-F238E27FC236}">
-                <a16:creationId xmlns:a16="http://schemas.microsoft.com/office/drawing/2014/main" id="{91FE440D-8245-4030-91C3-2AE5519CBC7B}"/>
+                <a16:creationId xmlns:a16="http://schemas.microsoft.com/office/drawing/2014/main" xmlns="" id="{91FE440D-8245-4030-91C3-2AE5519CBC7B}"/>
               </a:ext>
             </a:extLst>
           </p:cNvPr>
@@ -12599,7 +12823,7 @@
           <p:cNvPr id="56" name="Textfeld 55">
             <a:extLst>
               <a:ext uri="{FF2B5EF4-FFF2-40B4-BE49-F238E27FC236}">
-                <a16:creationId xmlns:a16="http://schemas.microsoft.com/office/drawing/2014/main" id="{B34478A4-3DF0-4DA3-BFBF-F327822B9EB6}"/>
+                <a16:creationId xmlns:a16="http://schemas.microsoft.com/office/drawing/2014/main" xmlns="" id="{B34478A4-3DF0-4DA3-BFBF-F327822B9EB6}"/>
               </a:ext>
             </a:extLst>
           </p:cNvPr>
@@ -12679,7 +12903,7 @@
           <p:cNvPr id="58" name="Textfeld 57">
             <a:extLst>
               <a:ext uri="{FF2B5EF4-FFF2-40B4-BE49-F238E27FC236}">
-                <a16:creationId xmlns:a16="http://schemas.microsoft.com/office/drawing/2014/main" id="{565823B4-253F-4861-8B8B-E51D328A6FDD}"/>
+                <a16:creationId xmlns:a16="http://schemas.microsoft.com/office/drawing/2014/main" xmlns="" id="{565823B4-253F-4861-8B8B-E51D328A6FDD}"/>
               </a:ext>
             </a:extLst>
           </p:cNvPr>
@@ -12748,7 +12972,7 @@
     </p:spTree>
     <p:extLst>
       <p:ext uri="{BB962C8B-B14F-4D97-AF65-F5344CB8AC3E}">
-        <p14:creationId xmlns:p14="http://schemas.microsoft.com/office/powerpoint/2010/main" val="1878060479"/>
+        <p14:creationId xmlns:p14="http://schemas.microsoft.com/office/powerpoint/2010/main" xmlns="" val="1878060479"/>
       </p:ext>
     </p:extLst>
   </p:cSld>
@@ -13038,7 +13262,7 @@
           <p:cNvPr id="2" name="Titel 1">
             <a:extLst>
               <a:ext uri="{FF2B5EF4-FFF2-40B4-BE49-F238E27FC236}">
-                <a16:creationId xmlns:a16="http://schemas.microsoft.com/office/drawing/2014/main" id="{E778F88D-0F67-4D0B-B549-3B5E3648C829}"/>
+                <a16:creationId xmlns:a16="http://schemas.microsoft.com/office/drawing/2014/main" xmlns="" id="{E778F88D-0F67-4D0B-B549-3B5E3648C829}"/>
               </a:ext>
             </a:extLst>
           </p:cNvPr>
@@ -13066,7 +13290,7 @@
           <p:cNvPr id="4" name="Fußzeilenplatzhalter 3">
             <a:extLst>
               <a:ext uri="{FF2B5EF4-FFF2-40B4-BE49-F238E27FC236}">
-                <a16:creationId xmlns:a16="http://schemas.microsoft.com/office/drawing/2014/main" id="{D2AB996B-5BC3-4B38-AEEA-75C080DA9857}"/>
+                <a16:creationId xmlns:a16="http://schemas.microsoft.com/office/drawing/2014/main" xmlns="" id="{D2AB996B-5BC3-4B38-AEEA-75C080DA9857}"/>
               </a:ext>
             </a:extLst>
           </p:cNvPr>
@@ -13094,7 +13318,7 @@
           <p:cNvPr id="5" name="Textfeld 4">
             <a:extLst>
               <a:ext uri="{FF2B5EF4-FFF2-40B4-BE49-F238E27FC236}">
-                <a16:creationId xmlns:a16="http://schemas.microsoft.com/office/drawing/2014/main" id="{B3825782-9CEE-406B-B21E-1A7A91A4371A}"/>
+                <a16:creationId xmlns:a16="http://schemas.microsoft.com/office/drawing/2014/main" xmlns="" id="{B3825782-9CEE-406B-B21E-1A7A91A4371A}"/>
               </a:ext>
             </a:extLst>
           </p:cNvPr>
@@ -13132,7 +13356,7 @@
           <p:cNvPr id="7" name="shared2">
             <a:extLst>
               <a:ext uri="{FF2B5EF4-FFF2-40B4-BE49-F238E27FC236}">
-                <a16:creationId xmlns:a16="http://schemas.microsoft.com/office/drawing/2014/main" id="{C60C41F0-CA20-47FD-B246-094DAD5CB0D1}"/>
+                <a16:creationId xmlns:a16="http://schemas.microsoft.com/office/drawing/2014/main" xmlns="" id="{C60C41F0-CA20-47FD-B246-094DAD5CB0D1}"/>
               </a:ext>
             </a:extLst>
           </p:cNvPr>
@@ -13142,10 +13366,10 @@
           <p:nvPr/>
         </p:nvPicPr>
         <p:blipFill>
-          <a:blip r:embed="rId2">
+          <a:blip r:embed="rId2" cstate="print">
             <a:extLst>
               <a:ext uri="{28A0092B-C50C-407E-A947-70E740481C1C}">
-                <a14:useLocalDpi xmlns:a14="http://schemas.microsoft.com/office/drawing/2010/main" val="0"/>
+                <a14:useLocalDpi xmlns:a14="http://schemas.microsoft.com/office/drawing/2010/main" xmlns="" val="0"/>
               </a:ext>
             </a:extLst>
           </a:blip>
@@ -13168,7 +13392,7 @@
           <p:cNvPr id="8" name="shared3">
             <a:extLst>
               <a:ext uri="{FF2B5EF4-FFF2-40B4-BE49-F238E27FC236}">
-                <a16:creationId xmlns:a16="http://schemas.microsoft.com/office/drawing/2014/main" id="{DEDE43A7-3739-46DB-9881-BB5827FECD0F}"/>
+                <a16:creationId xmlns:a16="http://schemas.microsoft.com/office/drawing/2014/main" xmlns="" id="{DEDE43A7-3739-46DB-9881-BB5827FECD0F}"/>
               </a:ext>
             </a:extLst>
           </p:cNvPr>
@@ -13178,10 +13402,10 @@
           <p:nvPr/>
         </p:nvPicPr>
         <p:blipFill>
-          <a:blip r:embed="rId3">
+          <a:blip r:embed="rId3" cstate="print">
             <a:extLst>
               <a:ext uri="{28A0092B-C50C-407E-A947-70E740481C1C}">
-                <a14:useLocalDpi xmlns:a14="http://schemas.microsoft.com/office/drawing/2010/main" val="0"/>
+                <a14:useLocalDpi xmlns:a14="http://schemas.microsoft.com/office/drawing/2010/main" xmlns="" val="0"/>
               </a:ext>
             </a:extLst>
           </a:blip>
@@ -13204,7 +13428,7 @@
           <p:cNvPr id="9" name="Textfeld 8">
             <a:extLst>
               <a:ext uri="{FF2B5EF4-FFF2-40B4-BE49-F238E27FC236}">
-                <a16:creationId xmlns:a16="http://schemas.microsoft.com/office/drawing/2014/main" id="{D9F35F86-5C04-40CA-A5F6-057A7F23E8B9}"/>
+                <a16:creationId xmlns:a16="http://schemas.microsoft.com/office/drawing/2014/main" xmlns="" id="{D9F35F86-5C04-40CA-A5F6-057A7F23E8B9}"/>
               </a:ext>
             </a:extLst>
           </p:cNvPr>
@@ -13275,7 +13499,7 @@
           <p:cNvPr id="10" name="Textfeld 9">
             <a:extLst>
               <a:ext uri="{FF2B5EF4-FFF2-40B4-BE49-F238E27FC236}">
-                <a16:creationId xmlns:a16="http://schemas.microsoft.com/office/drawing/2014/main" id="{B18EAD15-ECD9-470F-86E0-F0C36D525318}"/>
+                <a16:creationId xmlns:a16="http://schemas.microsoft.com/office/drawing/2014/main" xmlns="" id="{B18EAD15-ECD9-470F-86E0-F0C36D525318}"/>
               </a:ext>
             </a:extLst>
           </p:cNvPr>
@@ -13354,7 +13578,7 @@
     </p:spTree>
     <p:extLst>
       <p:ext uri="{BB962C8B-B14F-4D97-AF65-F5344CB8AC3E}">
-        <p14:creationId xmlns:p14="http://schemas.microsoft.com/office/powerpoint/2010/main" val="4169362409"/>
+        <p14:creationId xmlns:p14="http://schemas.microsoft.com/office/powerpoint/2010/main" xmlns="" val="4169362409"/>
       </p:ext>
     </p:extLst>
   </p:cSld>
@@ -13635,7 +13859,7 @@
           <p:cNvPr id="2" name="Titel 1">
             <a:extLst>
               <a:ext uri="{FF2B5EF4-FFF2-40B4-BE49-F238E27FC236}">
-                <a16:creationId xmlns:a16="http://schemas.microsoft.com/office/drawing/2014/main" id="{D5BDABF4-6A95-439D-8D3A-DA3970FBB573}"/>
+                <a16:creationId xmlns:a16="http://schemas.microsoft.com/office/drawing/2014/main" xmlns="" id="{D5BDABF4-6A95-439D-8D3A-DA3970FBB573}"/>
               </a:ext>
             </a:extLst>
           </p:cNvPr>
@@ -13663,7 +13887,7 @@
           <p:cNvPr id="3" name="Inhaltsplatzhalter 2">
             <a:extLst>
               <a:ext uri="{FF2B5EF4-FFF2-40B4-BE49-F238E27FC236}">
-                <a16:creationId xmlns:a16="http://schemas.microsoft.com/office/drawing/2014/main" id="{1176F6AC-791A-49A7-82E1-DD2C666CAC71}"/>
+                <a16:creationId xmlns:a16="http://schemas.microsoft.com/office/drawing/2014/main" xmlns="" id="{1176F6AC-791A-49A7-82E1-DD2C666CAC71}"/>
               </a:ext>
             </a:extLst>
           </p:cNvPr>
@@ -13817,7 +14041,7 @@
           <p:cNvPr id="4" name="Fußzeilenplatzhalter 3">
             <a:extLst>
               <a:ext uri="{FF2B5EF4-FFF2-40B4-BE49-F238E27FC236}">
-                <a16:creationId xmlns:a16="http://schemas.microsoft.com/office/drawing/2014/main" id="{B464372B-5773-4BFE-BE11-02BCA11506D7}"/>
+                <a16:creationId xmlns:a16="http://schemas.microsoft.com/office/drawing/2014/main" xmlns="" id="{B464372B-5773-4BFE-BE11-02BCA11506D7}"/>
               </a:ext>
             </a:extLst>
           </p:cNvPr>
@@ -13845,7 +14069,7 @@
           <p:cNvPr id="7" name="Grafik 6">
             <a:extLst>
               <a:ext uri="{FF2B5EF4-FFF2-40B4-BE49-F238E27FC236}">
-                <a16:creationId xmlns:a16="http://schemas.microsoft.com/office/drawing/2014/main" id="{FE0623CE-4406-41FF-BA93-CF12837C4CE8}"/>
+                <a16:creationId xmlns:a16="http://schemas.microsoft.com/office/drawing/2014/main" xmlns="" id="{FE0623CE-4406-41FF-BA93-CF12837C4CE8}"/>
               </a:ext>
             </a:extLst>
           </p:cNvPr>
@@ -13855,10 +14079,10 @@
           <p:nvPr/>
         </p:nvPicPr>
         <p:blipFill>
-          <a:blip r:embed="rId3">
+          <a:blip r:embed="rId3" cstate="print">
             <a:extLst>
               <a:ext uri="{28A0092B-C50C-407E-A947-70E740481C1C}">
-                <a14:useLocalDpi xmlns:a14="http://schemas.microsoft.com/office/drawing/2010/main" val="0"/>
+                <a14:useLocalDpi xmlns:a14="http://schemas.microsoft.com/office/drawing/2010/main" xmlns="" val="0"/>
               </a:ext>
             </a:extLst>
           </a:blip>
@@ -13881,7 +14105,7 @@
           <p:cNvPr id="6" name="Fußzeilenplatzhalter 4">
             <a:extLst>
               <a:ext uri="{FF2B5EF4-FFF2-40B4-BE49-F238E27FC236}">
-                <a16:creationId xmlns:a16="http://schemas.microsoft.com/office/drawing/2014/main" id="{54D9A601-C368-4E43-BB5D-767AD05ED3A8}"/>
+                <a16:creationId xmlns:a16="http://schemas.microsoft.com/office/drawing/2014/main" xmlns="" id="{54D9A601-C368-4E43-BB5D-767AD05ED3A8}"/>
               </a:ext>
             </a:extLst>
           </p:cNvPr>
@@ -14228,7 +14452,7 @@
           <p:cNvPr id="8" name="Gerade Verbindung 7">
             <a:extLst>
               <a:ext uri="{FF2B5EF4-FFF2-40B4-BE49-F238E27FC236}">
-                <a16:creationId xmlns:a16="http://schemas.microsoft.com/office/drawing/2014/main" id="{C461B434-F8B8-4802-822E-BFA54862EE43}"/>
+                <a16:creationId xmlns:a16="http://schemas.microsoft.com/office/drawing/2014/main" xmlns="" id="{C461B434-F8B8-4802-822E-BFA54862EE43}"/>
               </a:ext>
             </a:extLst>
           </p:cNvPr>
@@ -14295,7 +14519,7 @@
     </p:spTree>
     <p:extLst>
       <p:ext uri="{BB962C8B-B14F-4D97-AF65-F5344CB8AC3E}">
-        <p14:creationId xmlns:p14="http://schemas.microsoft.com/office/powerpoint/2010/main" val="2861433211"/>
+        <p14:creationId xmlns:p14="http://schemas.microsoft.com/office/powerpoint/2010/main" xmlns="" val="2861433211"/>
       </p:ext>
     </p:extLst>
   </p:cSld>
@@ -15077,7 +15301,7 @@
           <p:cNvPr id="2" name="Titel 1">
             <a:extLst>
               <a:ext uri="{FF2B5EF4-FFF2-40B4-BE49-F238E27FC236}">
-                <a16:creationId xmlns:a16="http://schemas.microsoft.com/office/drawing/2014/main" id="{FA538962-AA10-4831-A21F-39427C91FBFE}"/>
+                <a16:creationId xmlns:a16="http://schemas.microsoft.com/office/drawing/2014/main" xmlns="" id="{FA538962-AA10-4831-A21F-39427C91FBFE}"/>
               </a:ext>
             </a:extLst>
           </p:cNvPr>
@@ -15105,7 +15329,7 @@
           <p:cNvPr id="4" name="Fußzeilenplatzhalter 3">
             <a:extLst>
               <a:ext uri="{FF2B5EF4-FFF2-40B4-BE49-F238E27FC236}">
-                <a16:creationId xmlns:a16="http://schemas.microsoft.com/office/drawing/2014/main" id="{D5029D67-7C47-434B-83E3-5F74F5C05DED}"/>
+                <a16:creationId xmlns:a16="http://schemas.microsoft.com/office/drawing/2014/main" xmlns="" id="{D5029D67-7C47-434B-83E3-5F74F5C05DED}"/>
               </a:ext>
             </a:extLst>
           </p:cNvPr>
@@ -15133,7 +15357,7 @@
           <p:cNvPr id="8" name="Textfeld 7">
             <a:extLst>
               <a:ext uri="{FF2B5EF4-FFF2-40B4-BE49-F238E27FC236}">
-                <a16:creationId xmlns:a16="http://schemas.microsoft.com/office/drawing/2014/main" id="{85CE94F3-710B-4ED5-BB05-5AC8534A09D0}"/>
+                <a16:creationId xmlns:a16="http://schemas.microsoft.com/office/drawing/2014/main" xmlns="" id="{85CE94F3-710B-4ED5-BB05-5AC8534A09D0}"/>
               </a:ext>
             </a:extLst>
           </p:cNvPr>
@@ -15336,7 +15560,7 @@
           <p:cNvPr id="10" name="Grafik 9">
             <a:extLst>
               <a:ext uri="{FF2B5EF4-FFF2-40B4-BE49-F238E27FC236}">
-                <a16:creationId xmlns:a16="http://schemas.microsoft.com/office/drawing/2014/main" id="{B92E8399-6E1E-470E-BBA4-7805A508029F}"/>
+                <a16:creationId xmlns:a16="http://schemas.microsoft.com/office/drawing/2014/main" xmlns="" id="{B92E8399-6E1E-470E-BBA4-7805A508029F}"/>
               </a:ext>
             </a:extLst>
           </p:cNvPr>
@@ -15346,10 +15570,10 @@
           <p:nvPr/>
         </p:nvPicPr>
         <p:blipFill>
-          <a:blip r:embed="rId3">
+          <a:blip r:embed="rId3" cstate="print">
             <a:extLst>
               <a:ext uri="{28A0092B-C50C-407E-A947-70E740481C1C}">
-                <a14:useLocalDpi xmlns:a14="http://schemas.microsoft.com/office/drawing/2010/main" val="0"/>
+                <a14:useLocalDpi xmlns:a14="http://schemas.microsoft.com/office/drawing/2010/main" xmlns="" val="0"/>
               </a:ext>
             </a:extLst>
           </a:blip>
@@ -15372,7 +15596,7 @@
           <p:cNvPr id="9" name="Grafik 8">
             <a:extLst>
               <a:ext uri="{FF2B5EF4-FFF2-40B4-BE49-F238E27FC236}">
-                <a16:creationId xmlns:a16="http://schemas.microsoft.com/office/drawing/2014/main" id="{E4EB05B5-0B7D-4339-8E3C-781ADB4506E3}"/>
+                <a16:creationId xmlns:a16="http://schemas.microsoft.com/office/drawing/2014/main" xmlns="" id="{E4EB05B5-0B7D-4339-8E3C-781ADB4506E3}"/>
               </a:ext>
             </a:extLst>
           </p:cNvPr>
@@ -15382,10 +15606,10 @@
           <p:nvPr/>
         </p:nvPicPr>
         <p:blipFill>
-          <a:blip r:embed="rId4">
+          <a:blip r:embed="rId4" cstate="print">
             <a:extLst>
               <a:ext uri="{28A0092B-C50C-407E-A947-70E740481C1C}">
-                <a14:useLocalDpi xmlns:a14="http://schemas.microsoft.com/office/drawing/2010/main" val="0"/>
+                <a14:useLocalDpi xmlns:a14="http://schemas.microsoft.com/office/drawing/2010/main" xmlns="" val="0"/>
               </a:ext>
             </a:extLst>
           </a:blip>
@@ -15406,7 +15630,7 @@
     </p:spTree>
     <p:extLst>
       <p:ext uri="{BB962C8B-B14F-4D97-AF65-F5344CB8AC3E}">
-        <p14:creationId xmlns:p14="http://schemas.microsoft.com/office/powerpoint/2010/main" val="4266597995"/>
+        <p14:creationId xmlns:p14="http://schemas.microsoft.com/office/powerpoint/2010/main" xmlns="" val="4266597995"/>
       </p:ext>
     </p:extLst>
   </p:cSld>
@@ -15834,7 +16058,7 @@
           <p:cNvPr id="2" name="Titel 1">
             <a:extLst>
               <a:ext uri="{FF2B5EF4-FFF2-40B4-BE49-F238E27FC236}">
-                <a16:creationId xmlns:a16="http://schemas.microsoft.com/office/drawing/2014/main" id="{1D7DF3BA-93D7-43E7-82CA-DEEB8031D74B}"/>
+                <a16:creationId xmlns:a16="http://schemas.microsoft.com/office/drawing/2014/main" xmlns="" id="{1D7DF3BA-93D7-43E7-82CA-DEEB8031D74B}"/>
               </a:ext>
             </a:extLst>
           </p:cNvPr>
@@ -15866,7 +16090,7 @@
           <p:cNvPr id="4" name="Fußzeilenplatzhalter 3">
             <a:extLst>
               <a:ext uri="{FF2B5EF4-FFF2-40B4-BE49-F238E27FC236}">
-                <a16:creationId xmlns:a16="http://schemas.microsoft.com/office/drawing/2014/main" id="{E8A6171D-17AF-4DB6-972C-AA843CF54D0F}"/>
+                <a16:creationId xmlns:a16="http://schemas.microsoft.com/office/drawing/2014/main" xmlns="" id="{E8A6171D-17AF-4DB6-972C-AA843CF54D0F}"/>
               </a:ext>
             </a:extLst>
           </p:cNvPr>
@@ -15894,7 +16118,7 @@
           <p:cNvPr id="5" name="Grafik 4">
             <a:extLst>
               <a:ext uri="{FF2B5EF4-FFF2-40B4-BE49-F238E27FC236}">
-                <a16:creationId xmlns:a16="http://schemas.microsoft.com/office/drawing/2014/main" id="{92A9E71F-8875-4FBF-BCFB-43FC72A0F63A}"/>
+                <a16:creationId xmlns:a16="http://schemas.microsoft.com/office/drawing/2014/main" xmlns="" id="{92A9E71F-8875-4FBF-BCFB-43FC72A0F63A}"/>
               </a:ext>
             </a:extLst>
           </p:cNvPr>
@@ -15904,7 +16128,7 @@
           <p:nvPr/>
         </p:nvPicPr>
         <p:blipFill>
-          <a:blip r:embed="rId2"/>
+          <a:blip r:embed="rId2" cstate="print"/>
           <a:stretch>
             <a:fillRect/>
           </a:stretch>
@@ -15924,7 +16148,7 @@
           <p:cNvPr id="6" name="Rechteck 5">
             <a:extLst>
               <a:ext uri="{FF2B5EF4-FFF2-40B4-BE49-F238E27FC236}">
-                <a16:creationId xmlns:a16="http://schemas.microsoft.com/office/drawing/2014/main" id="{F0EA15AE-3A19-4008-9E2C-B9B664F69BC6}"/>
+                <a16:creationId xmlns:a16="http://schemas.microsoft.com/office/drawing/2014/main" xmlns="" id="{F0EA15AE-3A19-4008-9E2C-B9B664F69BC6}"/>
               </a:ext>
             </a:extLst>
           </p:cNvPr>
@@ -15978,7 +16202,7 @@
           <p:cNvPr id="10" name="Rechteck 9">
             <a:extLst>
               <a:ext uri="{FF2B5EF4-FFF2-40B4-BE49-F238E27FC236}">
-                <a16:creationId xmlns:a16="http://schemas.microsoft.com/office/drawing/2014/main" id="{AF427544-5025-40C2-90C4-BFF017665F94}"/>
+                <a16:creationId xmlns:a16="http://schemas.microsoft.com/office/drawing/2014/main" xmlns="" id="{AF427544-5025-40C2-90C4-BFF017665F94}"/>
               </a:ext>
             </a:extLst>
           </p:cNvPr>
@@ -16032,7 +16256,7 @@
           <p:cNvPr id="12" name="Textfeld 11">
             <a:extLst>
               <a:ext uri="{FF2B5EF4-FFF2-40B4-BE49-F238E27FC236}">
-                <a16:creationId xmlns:a16="http://schemas.microsoft.com/office/drawing/2014/main" id="{22CC0027-EB22-4F54-A686-52F98ACA376A}"/>
+                <a16:creationId xmlns:a16="http://schemas.microsoft.com/office/drawing/2014/main" xmlns="" id="{22CC0027-EB22-4F54-A686-52F98ACA376A}"/>
               </a:ext>
             </a:extLst>
           </p:cNvPr>
@@ -16146,7 +16370,7 @@
     </p:spTree>
     <p:extLst>
       <p:ext uri="{BB962C8B-B14F-4D97-AF65-F5344CB8AC3E}">
-        <p14:creationId xmlns:p14="http://schemas.microsoft.com/office/powerpoint/2010/main" val="2999870621"/>
+        <p14:creationId xmlns:p14="http://schemas.microsoft.com/office/powerpoint/2010/main" xmlns="" val="2999870621"/>
       </p:ext>
     </p:extLst>
   </p:cSld>
@@ -16591,7 +16815,7 @@
           <p:cNvPr id="2" name="Titel 1">
             <a:extLst>
               <a:ext uri="{FF2B5EF4-FFF2-40B4-BE49-F238E27FC236}">
-                <a16:creationId xmlns:a16="http://schemas.microsoft.com/office/drawing/2014/main" id="{83BA0C1A-5C57-4903-BCAC-8EF4B7B6E061}"/>
+                <a16:creationId xmlns:a16="http://schemas.microsoft.com/office/drawing/2014/main" xmlns="" id="{83BA0C1A-5C57-4903-BCAC-8EF4B7B6E061}"/>
               </a:ext>
             </a:extLst>
           </p:cNvPr>
@@ -16623,7 +16847,7 @@
           <p:cNvPr id="4" name="Fußzeilenplatzhalter 3">
             <a:extLst>
               <a:ext uri="{FF2B5EF4-FFF2-40B4-BE49-F238E27FC236}">
-                <a16:creationId xmlns:a16="http://schemas.microsoft.com/office/drawing/2014/main" id="{B0E7112C-1805-4AB3-95F5-679174C76857}"/>
+                <a16:creationId xmlns:a16="http://schemas.microsoft.com/office/drawing/2014/main" xmlns="" id="{B0E7112C-1805-4AB3-95F5-679174C76857}"/>
               </a:ext>
             </a:extLst>
           </p:cNvPr>
@@ -16651,7 +16875,7 @@
           <p:cNvPr id="5" name="Grafik 4">
             <a:extLst>
               <a:ext uri="{FF2B5EF4-FFF2-40B4-BE49-F238E27FC236}">
-                <a16:creationId xmlns:a16="http://schemas.microsoft.com/office/drawing/2014/main" id="{E5E9BD3A-4987-4A32-A202-D5460725CD7D}"/>
+                <a16:creationId xmlns:a16="http://schemas.microsoft.com/office/drawing/2014/main" xmlns="" id="{E5E9BD3A-4987-4A32-A202-D5460725CD7D}"/>
               </a:ext>
             </a:extLst>
           </p:cNvPr>
@@ -16661,7 +16885,7 @@
           <p:nvPr/>
         </p:nvPicPr>
         <p:blipFill rotWithShape="1">
-          <a:blip r:embed="rId2"/>
+          <a:blip r:embed="rId2" cstate="print"/>
           <a:srcRect l="2669"/>
           <a:stretch/>
         </p:blipFill>
@@ -16680,7 +16904,7 @@
           <p:cNvPr id="6" name="Textfeld 5">
             <a:extLst>
               <a:ext uri="{FF2B5EF4-FFF2-40B4-BE49-F238E27FC236}">
-                <a16:creationId xmlns:a16="http://schemas.microsoft.com/office/drawing/2014/main" id="{86F6093D-DCC7-493F-AD35-4E0486367A3E}"/>
+                <a16:creationId xmlns:a16="http://schemas.microsoft.com/office/drawing/2014/main" xmlns="" id="{86F6093D-DCC7-493F-AD35-4E0486367A3E}"/>
               </a:ext>
             </a:extLst>
           </p:cNvPr>
@@ -16759,7 +16983,7 @@
     </p:spTree>
     <p:extLst>
       <p:ext uri="{BB962C8B-B14F-4D97-AF65-F5344CB8AC3E}">
-        <p14:creationId xmlns:p14="http://schemas.microsoft.com/office/powerpoint/2010/main" val="3699201216"/>
+        <p14:creationId xmlns:p14="http://schemas.microsoft.com/office/powerpoint/2010/main" xmlns="" val="3699201216"/>
       </p:ext>
     </p:extLst>
   </p:cSld>
@@ -17104,7 +17328,7 @@
     </p:spTree>
     <p:extLst>
       <p:ext uri="{BB962C8B-B14F-4D97-AF65-F5344CB8AC3E}">
-        <p14:creationId xmlns:p14="http://schemas.microsoft.com/office/powerpoint/2010/main" val="36633376"/>
+        <p14:creationId xmlns:p14="http://schemas.microsoft.com/office/powerpoint/2010/main" xmlns="" val="36633376"/>
       </p:ext>
     </p:extLst>
   </p:cSld>
@@ -17136,7 +17360,7 @@
           <p:cNvPr id="2" name="Titel 1">
             <a:extLst>
               <a:ext uri="{FF2B5EF4-FFF2-40B4-BE49-F238E27FC236}">
-                <a16:creationId xmlns:a16="http://schemas.microsoft.com/office/drawing/2014/main" id="{58ADEC9F-BEB8-403E-B5B2-21FB12CBD397}"/>
+                <a16:creationId xmlns:a16="http://schemas.microsoft.com/office/drawing/2014/main" xmlns="" id="{58ADEC9F-BEB8-403E-B5B2-21FB12CBD397}"/>
               </a:ext>
             </a:extLst>
           </p:cNvPr>
@@ -17169,7 +17393,7 @@
           <p:cNvPr id="4" name="Fußzeilenplatzhalter 3">
             <a:extLst>
               <a:ext uri="{FF2B5EF4-FFF2-40B4-BE49-F238E27FC236}">
-                <a16:creationId xmlns:a16="http://schemas.microsoft.com/office/drawing/2014/main" id="{0CE2668C-D1E6-4735-8A01-AC8511ED42F9}"/>
+                <a16:creationId xmlns:a16="http://schemas.microsoft.com/office/drawing/2014/main" xmlns="" id="{0CE2668C-D1E6-4735-8A01-AC8511ED42F9}"/>
               </a:ext>
             </a:extLst>
           </p:cNvPr>
@@ -17197,7 +17421,7 @@
           <p:cNvPr id="5" name="Grafik 4">
             <a:extLst>
               <a:ext uri="{FF2B5EF4-FFF2-40B4-BE49-F238E27FC236}">
-                <a16:creationId xmlns:a16="http://schemas.microsoft.com/office/drawing/2014/main" id="{B9F5065B-2E9D-498C-BA83-A908F5070135}"/>
+                <a16:creationId xmlns:a16="http://schemas.microsoft.com/office/drawing/2014/main" xmlns="" id="{B9F5065B-2E9D-498C-BA83-A908F5070135}"/>
               </a:ext>
             </a:extLst>
           </p:cNvPr>
@@ -17207,7 +17431,7 @@
           <p:nvPr/>
         </p:nvPicPr>
         <p:blipFill rotWithShape="1">
-          <a:blip r:embed="rId2"/>
+          <a:blip r:embed="rId2" cstate="print"/>
           <a:srcRect l="1982" b="27106"/>
           <a:stretch/>
         </p:blipFill>
@@ -17226,7 +17450,7 @@
           <p:cNvPr id="6" name="Textfeld 5">
             <a:extLst>
               <a:ext uri="{FF2B5EF4-FFF2-40B4-BE49-F238E27FC236}">
-                <a16:creationId xmlns:a16="http://schemas.microsoft.com/office/drawing/2014/main" id="{31FAE22D-5880-4263-A828-EC45E634728F}"/>
+                <a16:creationId xmlns:a16="http://schemas.microsoft.com/office/drawing/2014/main" xmlns="" id="{31FAE22D-5880-4263-A828-EC45E634728F}"/>
               </a:ext>
             </a:extLst>
           </p:cNvPr>
@@ -17344,7 +17568,7 @@
           <p:cNvPr id="7" name="Grafik 6">
             <a:extLst>
               <a:ext uri="{FF2B5EF4-FFF2-40B4-BE49-F238E27FC236}">
-                <a16:creationId xmlns:a16="http://schemas.microsoft.com/office/drawing/2014/main" id="{D829BEF9-9AB3-4B0A-A7B1-BCC8900D9E73}"/>
+                <a16:creationId xmlns:a16="http://schemas.microsoft.com/office/drawing/2014/main" xmlns="" id="{D829BEF9-9AB3-4B0A-A7B1-BCC8900D9E73}"/>
               </a:ext>
             </a:extLst>
           </p:cNvPr>
@@ -17354,10 +17578,10 @@
           <p:nvPr/>
         </p:nvPicPr>
         <p:blipFill>
-          <a:blip r:embed="rId3">
+          <a:blip r:embed="rId3" cstate="print">
             <a:extLst>
               <a:ext uri="{28A0092B-C50C-407E-A947-70E740481C1C}">
-                <a14:useLocalDpi xmlns:a14="http://schemas.microsoft.com/office/drawing/2010/main" val="0"/>
+                <a14:useLocalDpi xmlns:a14="http://schemas.microsoft.com/office/drawing/2010/main" xmlns="" val="0"/>
               </a:ext>
             </a:extLst>
           </a:blip>
@@ -17378,7 +17602,7 @@
     </p:spTree>
     <p:extLst>
       <p:ext uri="{BB962C8B-B14F-4D97-AF65-F5344CB8AC3E}">
-        <p14:creationId xmlns:p14="http://schemas.microsoft.com/office/powerpoint/2010/main" val="2493996157"/>
+        <p14:creationId xmlns:p14="http://schemas.microsoft.com/office/powerpoint/2010/main" xmlns="" val="2493996157"/>
       </p:ext>
     </p:extLst>
   </p:cSld>
@@ -17530,7 +17754,7 @@
           <p:cNvPr id="2" name="Titel 1">
             <a:extLst>
               <a:ext uri="{FF2B5EF4-FFF2-40B4-BE49-F238E27FC236}">
-                <a16:creationId xmlns:a16="http://schemas.microsoft.com/office/drawing/2014/main" id="{6084AF4F-AC12-4EDD-9431-0C1B33265C9C}"/>
+                <a16:creationId xmlns:a16="http://schemas.microsoft.com/office/drawing/2014/main" xmlns="" id="{6084AF4F-AC12-4EDD-9431-0C1B33265C9C}"/>
               </a:ext>
             </a:extLst>
           </p:cNvPr>
@@ -17558,7 +17782,7 @@
           <p:cNvPr id="3" name="Inhaltsplatzhalter 2">
             <a:extLst>
               <a:ext uri="{FF2B5EF4-FFF2-40B4-BE49-F238E27FC236}">
-                <a16:creationId xmlns:a16="http://schemas.microsoft.com/office/drawing/2014/main" id="{0DC7E254-5A7C-4A51-A0E0-C85013CBBC26}"/>
+                <a16:creationId xmlns:a16="http://schemas.microsoft.com/office/drawing/2014/main" xmlns="" id="{0DC7E254-5A7C-4A51-A0E0-C85013CBBC26}"/>
               </a:ext>
             </a:extLst>
           </p:cNvPr>
@@ -17721,7 +17945,7 @@
           <p:cNvPr id="4" name="Fußzeilenplatzhalter 3">
             <a:extLst>
               <a:ext uri="{FF2B5EF4-FFF2-40B4-BE49-F238E27FC236}">
-                <a16:creationId xmlns:a16="http://schemas.microsoft.com/office/drawing/2014/main" id="{87065097-734D-4D6C-AEBD-B7B912DAE6A5}"/>
+                <a16:creationId xmlns:a16="http://schemas.microsoft.com/office/drawing/2014/main" xmlns="" id="{87065097-734D-4D6C-AEBD-B7B912DAE6A5}"/>
               </a:ext>
             </a:extLst>
           </p:cNvPr>
@@ -17747,7 +17971,7 @@
     </p:spTree>
     <p:extLst>
       <p:ext uri="{BB962C8B-B14F-4D97-AF65-F5344CB8AC3E}">
-        <p14:creationId xmlns:p14="http://schemas.microsoft.com/office/powerpoint/2010/main" val="2335887233"/>
+        <p14:creationId xmlns:p14="http://schemas.microsoft.com/office/powerpoint/2010/main" xmlns="" val="2335887233"/>
       </p:ext>
     </p:extLst>
   </p:cSld>
@@ -18429,21 +18653,21 @@
                 <a:gridCol w="2948045">
                   <a:extLst>
                     <a:ext uri="{9D8B030D-6E8A-4147-A177-3AD203B41FA5}">
-                      <a16:colId xmlns:a16="http://schemas.microsoft.com/office/drawing/2014/main" val="20000"/>
+                      <a16:colId xmlns:a16="http://schemas.microsoft.com/office/drawing/2014/main" xmlns="" val="20000"/>
                     </a:ext>
                   </a:extLst>
                 </a:gridCol>
                 <a:gridCol w="2948045">
                   <a:extLst>
                     <a:ext uri="{9D8B030D-6E8A-4147-A177-3AD203B41FA5}">
-                      <a16:colId xmlns:a16="http://schemas.microsoft.com/office/drawing/2014/main" val="20001"/>
+                      <a16:colId xmlns:a16="http://schemas.microsoft.com/office/drawing/2014/main" xmlns="" val="20001"/>
                     </a:ext>
                   </a:extLst>
                 </a:gridCol>
                 <a:gridCol w="2948045">
                   <a:extLst>
                     <a:ext uri="{9D8B030D-6E8A-4147-A177-3AD203B41FA5}">
-                      <a16:colId xmlns:a16="http://schemas.microsoft.com/office/drawing/2014/main" val="20002"/>
+                      <a16:colId xmlns:a16="http://schemas.microsoft.com/office/drawing/2014/main" xmlns="" val="20002"/>
                     </a:ext>
                   </a:extLst>
                 </a:gridCol>
@@ -18543,7 +18767,7 @@
                 </a:tc>
                 <a:extLst>
                   <a:ext uri="{0D108BD9-81ED-4DB2-BD59-A6C34878D82A}">
-                    <a16:rowId xmlns:a16="http://schemas.microsoft.com/office/drawing/2014/main" val="10000"/>
+                    <a16:rowId xmlns:a16="http://schemas.microsoft.com/office/drawing/2014/main" xmlns="" val="10000"/>
                   </a:ext>
                 </a:extLst>
               </a:tr>
@@ -18773,7 +18997,7 @@
                 </a:tc>
                 <a:extLst>
                   <a:ext uri="{0D108BD9-81ED-4DB2-BD59-A6C34878D82A}">
-                    <a16:rowId xmlns:a16="http://schemas.microsoft.com/office/drawing/2014/main" val="10001"/>
+                    <a16:rowId xmlns:a16="http://schemas.microsoft.com/office/drawing/2014/main" xmlns="" val="10001"/>
                   </a:ext>
                 </a:extLst>
               </a:tr>
@@ -18786,7 +19010,7 @@
           <p:cNvPr id="9" name="Fußzeilenplatzhalter 4">
             <a:extLst>
               <a:ext uri="{FF2B5EF4-FFF2-40B4-BE49-F238E27FC236}">
-                <a16:creationId xmlns:a16="http://schemas.microsoft.com/office/drawing/2014/main" id="{58747079-608B-4AFA-8078-48F04CFA1DE0}"/>
+                <a16:creationId xmlns:a16="http://schemas.microsoft.com/office/drawing/2014/main" xmlns="" id="{58747079-608B-4AFA-8078-48F04CFA1DE0}"/>
               </a:ext>
             </a:extLst>
           </p:cNvPr>
@@ -19133,7 +19357,7 @@
           <p:cNvPr id="10" name="Gerade Verbindung 7">
             <a:extLst>
               <a:ext uri="{FF2B5EF4-FFF2-40B4-BE49-F238E27FC236}">
-                <a16:creationId xmlns:a16="http://schemas.microsoft.com/office/drawing/2014/main" id="{BC63F1A0-1B96-41B0-8879-307260B3DFDF}"/>
+                <a16:creationId xmlns:a16="http://schemas.microsoft.com/office/drawing/2014/main" xmlns="" id="{BC63F1A0-1B96-41B0-8879-307260B3DFDF}"/>
               </a:ext>
             </a:extLst>
           </p:cNvPr>
@@ -19200,7 +19424,7 @@
     </p:spTree>
     <p:extLst>
       <p:ext uri="{BB962C8B-B14F-4D97-AF65-F5344CB8AC3E}">
-        <p14:creationId xmlns:p14="http://schemas.microsoft.com/office/powerpoint/2010/main" val="3377158169"/>
+        <p14:creationId xmlns:p14="http://schemas.microsoft.com/office/powerpoint/2010/main" xmlns="" val="3377158169"/>
       </p:ext>
     </p:extLst>
   </p:cSld>
@@ -19518,28 +19742,28 @@
                 <a:gridCol w="819809">
                   <a:extLst>
                     <a:ext uri="{9D8B030D-6E8A-4147-A177-3AD203B41FA5}">
-                      <a16:colId xmlns:a16="http://schemas.microsoft.com/office/drawing/2014/main" val="20000"/>
+                      <a16:colId xmlns:a16="http://schemas.microsoft.com/office/drawing/2014/main" xmlns="" val="20000"/>
                     </a:ext>
                   </a:extLst>
                 </a:gridCol>
                 <a:gridCol w="809296">
                   <a:extLst>
                     <a:ext uri="{9D8B030D-6E8A-4147-A177-3AD203B41FA5}">
-                      <a16:colId xmlns:a16="http://schemas.microsoft.com/office/drawing/2014/main" val="20001"/>
+                      <a16:colId xmlns:a16="http://schemas.microsoft.com/office/drawing/2014/main" xmlns="" val="20001"/>
                     </a:ext>
                   </a:extLst>
                 </a:gridCol>
                 <a:gridCol w="987973">
                   <a:extLst>
                     <a:ext uri="{9D8B030D-6E8A-4147-A177-3AD203B41FA5}">
-                      <a16:colId xmlns:a16="http://schemas.microsoft.com/office/drawing/2014/main" val="20002"/>
+                      <a16:colId xmlns:a16="http://schemas.microsoft.com/office/drawing/2014/main" xmlns="" val="20002"/>
                     </a:ext>
                   </a:extLst>
                 </a:gridCol>
                 <a:gridCol w="1898866">
                   <a:extLst>
                     <a:ext uri="{9D8B030D-6E8A-4147-A177-3AD203B41FA5}">
-                      <a16:colId xmlns:a16="http://schemas.microsoft.com/office/drawing/2014/main" val="20003"/>
+                      <a16:colId xmlns:a16="http://schemas.microsoft.com/office/drawing/2014/main" xmlns="" val="20003"/>
                     </a:ext>
                   </a:extLst>
                 </a:gridCol>
@@ -19602,7 +19826,7 @@
                 </a:tc>
                 <a:extLst>
                   <a:ext uri="{0D108BD9-81ED-4DB2-BD59-A6C34878D82A}">
-                    <a16:rowId xmlns:a16="http://schemas.microsoft.com/office/drawing/2014/main" val="10000"/>
+                    <a16:rowId xmlns:a16="http://schemas.microsoft.com/office/drawing/2014/main" xmlns="" val="10000"/>
                   </a:ext>
                 </a:extLst>
               </a:tr>
@@ -19652,7 +19876,7 @@
                 </a:tc>
                 <a:extLst>
                   <a:ext uri="{0D108BD9-81ED-4DB2-BD59-A6C34878D82A}">
-                    <a16:rowId xmlns:a16="http://schemas.microsoft.com/office/drawing/2014/main" val="10001"/>
+                    <a16:rowId xmlns:a16="http://schemas.microsoft.com/office/drawing/2014/main" xmlns="" val="10001"/>
                   </a:ext>
                 </a:extLst>
               </a:tr>
@@ -19702,7 +19926,7 @@
                 </a:tc>
                 <a:extLst>
                   <a:ext uri="{0D108BD9-81ED-4DB2-BD59-A6C34878D82A}">
-                    <a16:rowId xmlns:a16="http://schemas.microsoft.com/office/drawing/2014/main" val="10002"/>
+                    <a16:rowId xmlns:a16="http://schemas.microsoft.com/office/drawing/2014/main" xmlns="" val="10002"/>
                   </a:ext>
                 </a:extLst>
               </a:tr>
@@ -19752,7 +19976,7 @@
                 </a:tc>
                 <a:extLst>
                   <a:ext uri="{0D108BD9-81ED-4DB2-BD59-A6C34878D82A}">
-                    <a16:rowId xmlns:a16="http://schemas.microsoft.com/office/drawing/2014/main" val="10003"/>
+                    <a16:rowId xmlns:a16="http://schemas.microsoft.com/office/drawing/2014/main" xmlns="" val="10003"/>
                   </a:ext>
                 </a:extLst>
               </a:tr>
@@ -20531,7 +20755,7 @@
           <p:cNvPr id="33" name="Fußzeilenplatzhalter 4">
             <a:extLst>
               <a:ext uri="{FF2B5EF4-FFF2-40B4-BE49-F238E27FC236}">
-                <a16:creationId xmlns:a16="http://schemas.microsoft.com/office/drawing/2014/main" id="{2E42A4B8-D462-4D24-B630-C4E715160015}"/>
+                <a16:creationId xmlns:a16="http://schemas.microsoft.com/office/drawing/2014/main" xmlns="" id="{2E42A4B8-D462-4D24-B630-C4E715160015}"/>
               </a:ext>
             </a:extLst>
           </p:cNvPr>
@@ -20878,7 +21102,7 @@
           <p:cNvPr id="35" name="Gerade Verbindung 7">
             <a:extLst>
               <a:ext uri="{FF2B5EF4-FFF2-40B4-BE49-F238E27FC236}">
-                <a16:creationId xmlns:a16="http://schemas.microsoft.com/office/drawing/2014/main" id="{B75D970B-D834-48EE-8C58-99CF4EEB87D7}"/>
+                <a16:creationId xmlns:a16="http://schemas.microsoft.com/office/drawing/2014/main" xmlns="" id="{B75D970B-D834-48EE-8C58-99CF4EEB87D7}"/>
               </a:ext>
             </a:extLst>
           </p:cNvPr>
@@ -20945,7 +21169,7 @@
     </p:spTree>
     <p:extLst>
       <p:ext uri="{BB962C8B-B14F-4D97-AF65-F5344CB8AC3E}">
-        <p14:creationId xmlns:p14="http://schemas.microsoft.com/office/powerpoint/2010/main" val="2061272255"/>
+        <p14:creationId xmlns:p14="http://schemas.microsoft.com/office/powerpoint/2010/main" xmlns="" val="2061272255"/>
       </p:ext>
     </p:extLst>
   </p:cSld>
@@ -23612,7 +23836,7 @@
           <p:cNvPr id="2" name="Titel 1">
             <a:extLst>
               <a:ext uri="{FF2B5EF4-FFF2-40B4-BE49-F238E27FC236}">
-                <a16:creationId xmlns:a16="http://schemas.microsoft.com/office/drawing/2014/main" id="{34677269-BD45-472F-A32F-497C999081B0}"/>
+                <a16:creationId xmlns:a16="http://schemas.microsoft.com/office/drawing/2014/main" xmlns="" id="{34677269-BD45-472F-A32F-497C999081B0}"/>
               </a:ext>
             </a:extLst>
           </p:cNvPr>
@@ -23640,7 +23864,7 @@
           <p:cNvPr id="3" name="Inhaltsplatzhalter 2">
             <a:extLst>
               <a:ext uri="{FF2B5EF4-FFF2-40B4-BE49-F238E27FC236}">
-                <a16:creationId xmlns:a16="http://schemas.microsoft.com/office/drawing/2014/main" id="{D4E39441-B7A4-4B71-9B65-C1BD85E49B51}"/>
+                <a16:creationId xmlns:a16="http://schemas.microsoft.com/office/drawing/2014/main" xmlns="" id="{D4E39441-B7A4-4B71-9B65-C1BD85E49B51}"/>
               </a:ext>
             </a:extLst>
           </p:cNvPr>
@@ -23698,7 +23922,7 @@
           <p:cNvPr id="4" name="Fußzeilenplatzhalter 3">
             <a:extLst>
               <a:ext uri="{FF2B5EF4-FFF2-40B4-BE49-F238E27FC236}">
-                <a16:creationId xmlns:a16="http://schemas.microsoft.com/office/drawing/2014/main" id="{F4052868-27D0-499C-A552-D665E8752DCE}"/>
+                <a16:creationId xmlns:a16="http://schemas.microsoft.com/office/drawing/2014/main" xmlns="" id="{F4052868-27D0-499C-A552-D665E8752DCE}"/>
               </a:ext>
             </a:extLst>
           </p:cNvPr>
@@ -23726,7 +23950,7 @@
           <p:cNvPr id="5" name="Fußzeilenplatzhalter 4">
             <a:extLst>
               <a:ext uri="{FF2B5EF4-FFF2-40B4-BE49-F238E27FC236}">
-                <a16:creationId xmlns:a16="http://schemas.microsoft.com/office/drawing/2014/main" id="{7D74A15B-8566-4918-BDC9-B33BA34E2438}"/>
+                <a16:creationId xmlns:a16="http://schemas.microsoft.com/office/drawing/2014/main" xmlns="" id="{7D74A15B-8566-4918-BDC9-B33BA34E2438}"/>
               </a:ext>
             </a:extLst>
           </p:cNvPr>
@@ -24073,7 +24297,7 @@
           <p:cNvPr id="6" name="Gerade Verbindung 7">
             <a:extLst>
               <a:ext uri="{FF2B5EF4-FFF2-40B4-BE49-F238E27FC236}">
-                <a16:creationId xmlns:a16="http://schemas.microsoft.com/office/drawing/2014/main" id="{7E9DAF63-0285-447B-A3B5-4A8A5ACFD5E7}"/>
+                <a16:creationId xmlns:a16="http://schemas.microsoft.com/office/drawing/2014/main" xmlns="" id="{7E9DAF63-0285-447B-A3B5-4A8A5ACFD5E7}"/>
               </a:ext>
             </a:extLst>
           </p:cNvPr>
@@ -24140,7 +24364,7 @@
     </p:spTree>
     <p:extLst>
       <p:ext uri="{BB962C8B-B14F-4D97-AF65-F5344CB8AC3E}">
-        <p14:creationId xmlns:p14="http://schemas.microsoft.com/office/powerpoint/2010/main" val="4130749313"/>
+        <p14:creationId xmlns:p14="http://schemas.microsoft.com/office/powerpoint/2010/main" xmlns="" val="4130749313"/>
       </p:ext>
     </p:extLst>
   </p:cSld>
@@ -24223,7 +24447,7 @@
     </p:spTree>
     <p:extLst>
       <p:ext uri="{BB962C8B-B14F-4D97-AF65-F5344CB8AC3E}">
-        <p14:creationId xmlns:p14="http://schemas.microsoft.com/office/powerpoint/2010/main" val="3075409766"/>
+        <p14:creationId xmlns:p14="http://schemas.microsoft.com/office/powerpoint/2010/main" xmlns="" val="3075409766"/>
       </p:ext>
     </p:extLst>
   </p:cSld>
@@ -24352,7 +24576,7 @@
           <p:cNvPr id="1026" name="Picture 2" descr="Bildergebnis für cnc maschine">
             <a:extLst>
               <a:ext uri="{FF2B5EF4-FFF2-40B4-BE49-F238E27FC236}">
-                <a16:creationId xmlns:a16="http://schemas.microsoft.com/office/drawing/2014/main" id="{7C297552-9A5C-430F-B7BF-4ECB71FB5555}"/>
+                <a16:creationId xmlns:a16="http://schemas.microsoft.com/office/drawing/2014/main" xmlns="" id="{7C297552-9A5C-430F-B7BF-4ECB71FB5555}"/>
               </a:ext>
             </a:extLst>
           </p:cNvPr>
@@ -24362,10 +24586,10 @@
           <p:nvPr/>
         </p:nvPicPr>
         <p:blipFill>
-          <a:blip r:embed="rId3">
+          <a:blip r:embed="rId3" cstate="print">
             <a:extLst>
               <a:ext uri="{28A0092B-C50C-407E-A947-70E740481C1C}">
-                <a14:useLocalDpi xmlns:a14="http://schemas.microsoft.com/office/drawing/2010/main" val="0"/>
+                <a14:useLocalDpi xmlns:a14="http://schemas.microsoft.com/office/drawing/2010/main" xmlns="" val="0"/>
               </a:ext>
             </a:extLst>
           </a:blip>
@@ -24385,7 +24609,7 @@
           <a:noFill/>
           <a:extLst>
             <a:ext uri="{909E8E84-426E-40DD-AFC4-6F175D3DCCD1}">
-              <a14:hiddenFill xmlns:a14="http://schemas.microsoft.com/office/drawing/2010/main">
+              <a14:hiddenFill xmlns:a14="http://schemas.microsoft.com/office/drawing/2010/main" xmlns="">
                 <a:solidFill>
                   <a:srgbClr val="FFFFFF"/>
                 </a:solidFill>
@@ -24399,7 +24623,7 @@
           <p:cNvPr id="1030" name="Picture 6" descr="Bildergebnis für Tastatur commodore">
             <a:extLst>
               <a:ext uri="{FF2B5EF4-FFF2-40B4-BE49-F238E27FC236}">
-                <a16:creationId xmlns:a16="http://schemas.microsoft.com/office/drawing/2014/main" id="{0661ED3C-9466-48C3-85C7-632E138ADAF6}"/>
+                <a16:creationId xmlns:a16="http://schemas.microsoft.com/office/drawing/2014/main" xmlns="" id="{0661ED3C-9466-48C3-85C7-632E138ADAF6}"/>
               </a:ext>
             </a:extLst>
           </p:cNvPr>
@@ -24409,10 +24633,10 @@
           <p:nvPr/>
         </p:nvPicPr>
         <p:blipFill>
-          <a:blip r:embed="rId4">
+          <a:blip r:embed="rId4" cstate="print">
             <a:extLst>
               <a:ext uri="{28A0092B-C50C-407E-A947-70E740481C1C}">
-                <a14:useLocalDpi xmlns:a14="http://schemas.microsoft.com/office/drawing/2010/main" val="0"/>
+                <a14:useLocalDpi xmlns:a14="http://schemas.microsoft.com/office/drawing/2010/main" xmlns="" val="0"/>
               </a:ext>
             </a:extLst>
           </a:blip>
@@ -24432,7 +24656,7 @@
           <a:noFill/>
           <a:extLst>
             <a:ext uri="{909E8E84-426E-40DD-AFC4-6F175D3DCCD1}">
-              <a14:hiddenFill xmlns:a14="http://schemas.microsoft.com/office/drawing/2010/main">
+              <a14:hiddenFill xmlns:a14="http://schemas.microsoft.com/office/drawing/2010/main" xmlns="">
                 <a:solidFill>
                   <a:srgbClr val="FFFFFF"/>
                 </a:solidFill>
@@ -24446,7 +24670,7 @@
           <p:cNvPr id="1036" name="Picture 12" descr="Bildergebnis für Airbag">
             <a:extLst>
               <a:ext uri="{FF2B5EF4-FFF2-40B4-BE49-F238E27FC236}">
-                <a16:creationId xmlns:a16="http://schemas.microsoft.com/office/drawing/2014/main" id="{F003E738-F5CA-4F6E-856F-942AF1C420BB}"/>
+                <a16:creationId xmlns:a16="http://schemas.microsoft.com/office/drawing/2014/main" xmlns="" id="{F003E738-F5CA-4F6E-856F-942AF1C420BB}"/>
               </a:ext>
             </a:extLst>
           </p:cNvPr>
@@ -24459,7 +24683,7 @@
           <a:blip r:embed="rId5" cstate="print">
             <a:extLst>
               <a:ext uri="{28A0092B-C50C-407E-A947-70E740481C1C}">
-                <a14:useLocalDpi xmlns:a14="http://schemas.microsoft.com/office/drawing/2010/main" val="0"/>
+                <a14:useLocalDpi xmlns:a14="http://schemas.microsoft.com/office/drawing/2010/main" xmlns="" val="0"/>
               </a:ext>
             </a:extLst>
           </a:blip>
@@ -24479,7 +24703,7 @@
           <a:noFill/>
           <a:extLst>
             <a:ext uri="{909E8E84-426E-40DD-AFC4-6F175D3DCCD1}">
-              <a14:hiddenFill xmlns:a14="http://schemas.microsoft.com/office/drawing/2010/main">
+              <a14:hiddenFill xmlns:a14="http://schemas.microsoft.com/office/drawing/2010/main" xmlns="">
                 <a:solidFill>
                   <a:srgbClr val="FFFFFF"/>
                 </a:solidFill>
@@ -24493,7 +24717,7 @@
           <p:cNvPr id="9" name="Tabelle 8">
             <a:extLst>
               <a:ext uri="{FF2B5EF4-FFF2-40B4-BE49-F238E27FC236}">
-                <a16:creationId xmlns:a16="http://schemas.microsoft.com/office/drawing/2014/main" id="{446DB9A0-D12E-420E-852C-6E155F1944D2}"/>
+                <a16:creationId xmlns:a16="http://schemas.microsoft.com/office/drawing/2014/main" xmlns="" id="{446DB9A0-D12E-420E-852C-6E155F1944D2}"/>
               </a:ext>
             </a:extLst>
           </p:cNvPr>
@@ -24503,7 +24727,7 @@
           <p:nvPr>
             <p:extLst>
               <p:ext uri="{D42A27DB-BD31-4B8C-83A1-F6EECF244321}">
-                <p14:modId xmlns:p14="http://schemas.microsoft.com/office/powerpoint/2010/main" val="4205881844"/>
+                <p14:modId xmlns:p14="http://schemas.microsoft.com/office/powerpoint/2010/main" xmlns="" val="4205881844"/>
               </p:ext>
             </p:extLst>
           </p:nvPr>
@@ -24522,14 +24746,14 @@
                 <a:gridCol w="4064000">
                   <a:extLst>
                     <a:ext uri="{9D8B030D-6E8A-4147-A177-3AD203B41FA5}">
-                      <a16:colId xmlns:a16="http://schemas.microsoft.com/office/drawing/2014/main" val="1869085196"/>
+                      <a16:colId xmlns:a16="http://schemas.microsoft.com/office/drawing/2014/main" xmlns="" val="1869085196"/>
                     </a:ext>
                   </a:extLst>
                 </a:gridCol>
                 <a:gridCol w="4064000">
                   <a:extLst>
                     <a:ext uri="{9D8B030D-6E8A-4147-A177-3AD203B41FA5}">
-                      <a16:colId xmlns:a16="http://schemas.microsoft.com/office/drawing/2014/main" val="291479846"/>
+                      <a16:colId xmlns:a16="http://schemas.microsoft.com/office/drawing/2014/main" xmlns="" val="291479846"/>
                     </a:ext>
                   </a:extLst>
                 </a:gridCol>
@@ -24563,7 +24787,7 @@
                 </a:tc>
                 <a:extLst>
                   <a:ext uri="{0D108BD9-81ED-4DB2-BD59-A6C34878D82A}">
-                    <a16:rowId xmlns:a16="http://schemas.microsoft.com/office/drawing/2014/main" val="4185157901"/>
+                    <a16:rowId xmlns:a16="http://schemas.microsoft.com/office/drawing/2014/main" xmlns="" val="4185157901"/>
                   </a:ext>
                 </a:extLst>
               </a:tr>
@@ -24596,7 +24820,7 @@
                 </a:tc>
                 <a:extLst>
                   <a:ext uri="{0D108BD9-81ED-4DB2-BD59-A6C34878D82A}">
-                    <a16:rowId xmlns:a16="http://schemas.microsoft.com/office/drawing/2014/main" val="513013316"/>
+                    <a16:rowId xmlns:a16="http://schemas.microsoft.com/office/drawing/2014/main" xmlns="" val="513013316"/>
                   </a:ext>
                 </a:extLst>
               </a:tr>
@@ -24609,7 +24833,7 @@
           <p:cNvPr id="12" name="Pfeil: gebogen 11">
             <a:extLst>
               <a:ext uri="{FF2B5EF4-FFF2-40B4-BE49-F238E27FC236}">
-                <a16:creationId xmlns:a16="http://schemas.microsoft.com/office/drawing/2014/main" id="{F1C95A13-217D-4152-AFB1-470E8652EFBD}"/>
+                <a16:creationId xmlns:a16="http://schemas.microsoft.com/office/drawing/2014/main" xmlns="" id="{F1C95A13-217D-4152-AFB1-470E8652EFBD}"/>
               </a:ext>
             </a:extLst>
           </p:cNvPr>
@@ -24664,7 +24888,7 @@
           <p:cNvPr id="19" name="Pfeil: gebogen 18">
             <a:extLst>
               <a:ext uri="{FF2B5EF4-FFF2-40B4-BE49-F238E27FC236}">
-                <a16:creationId xmlns:a16="http://schemas.microsoft.com/office/drawing/2014/main" id="{02795F1E-AB43-4E76-848F-6C65791D5B84}"/>
+                <a16:creationId xmlns:a16="http://schemas.microsoft.com/office/drawing/2014/main" xmlns="" id="{02795F1E-AB43-4E76-848F-6C65791D5B84}"/>
               </a:ext>
             </a:extLst>
           </p:cNvPr>
@@ -24719,7 +24943,7 @@
           <p:cNvPr id="20" name="Pfeil: gebogen 19">
             <a:extLst>
               <a:ext uri="{FF2B5EF4-FFF2-40B4-BE49-F238E27FC236}">
-                <a16:creationId xmlns:a16="http://schemas.microsoft.com/office/drawing/2014/main" id="{CC3418D8-C68E-46BF-B1A9-3CEED33A66CA}"/>
+                <a16:creationId xmlns:a16="http://schemas.microsoft.com/office/drawing/2014/main" xmlns="" id="{CC3418D8-C68E-46BF-B1A9-3CEED33A66CA}"/>
               </a:ext>
             </a:extLst>
           </p:cNvPr>
@@ -24774,7 +24998,7 @@
           <p:cNvPr id="13" name="Textfeld 12">
             <a:extLst>
               <a:ext uri="{FF2B5EF4-FFF2-40B4-BE49-F238E27FC236}">
-                <a16:creationId xmlns:a16="http://schemas.microsoft.com/office/drawing/2014/main" id="{8DD7928B-E8B2-4C94-A8A5-213E52E0FB49}"/>
+                <a16:creationId xmlns:a16="http://schemas.microsoft.com/office/drawing/2014/main" xmlns="" id="{8DD7928B-E8B2-4C94-A8A5-213E52E0FB49}"/>
               </a:ext>
             </a:extLst>
           </p:cNvPr>
@@ -24834,7 +25058,7 @@
           <p:cNvPr id="14" name="Fußzeilenplatzhalter 4">
             <a:extLst>
               <a:ext uri="{FF2B5EF4-FFF2-40B4-BE49-F238E27FC236}">
-                <a16:creationId xmlns:a16="http://schemas.microsoft.com/office/drawing/2014/main" id="{7FD7D624-FBCB-480D-9D8B-AF8D994B841C}"/>
+                <a16:creationId xmlns:a16="http://schemas.microsoft.com/office/drawing/2014/main" xmlns="" id="{7FD7D624-FBCB-480D-9D8B-AF8D994B841C}"/>
               </a:ext>
             </a:extLst>
           </p:cNvPr>
@@ -25269,7 +25493,7 @@
           <p:cNvPr id="15" name="Gerade Verbindung 11">
             <a:extLst>
               <a:ext uri="{FF2B5EF4-FFF2-40B4-BE49-F238E27FC236}">
-                <a16:creationId xmlns:a16="http://schemas.microsoft.com/office/drawing/2014/main" id="{65C03E83-5C7D-4D4B-A513-BECC2DC96FAE}"/>
+                <a16:creationId xmlns:a16="http://schemas.microsoft.com/office/drawing/2014/main" xmlns="" id="{65C03E83-5C7D-4D4B-A513-BECC2DC96FAE}"/>
               </a:ext>
             </a:extLst>
           </p:cNvPr>
@@ -25336,7 +25560,7 @@
     </p:spTree>
     <p:extLst>
       <p:ext uri="{BB962C8B-B14F-4D97-AF65-F5344CB8AC3E}">
-        <p14:creationId xmlns:p14="http://schemas.microsoft.com/office/powerpoint/2010/main" val="3574650683"/>
+        <p14:creationId xmlns:p14="http://schemas.microsoft.com/office/powerpoint/2010/main" xmlns="" val="3574650683"/>
       </p:ext>
     </p:extLst>
   </p:cSld>
@@ -26004,7 +26228,7 @@
     </p:spTree>
     <p:extLst>
       <p:ext uri="{BB962C8B-B14F-4D97-AF65-F5344CB8AC3E}">
-        <p14:creationId xmlns:p14="http://schemas.microsoft.com/office/powerpoint/2010/main" val="981857726"/>
+        <p14:creationId xmlns:p14="http://schemas.microsoft.com/office/powerpoint/2010/main" xmlns="" val="981857726"/>
       </p:ext>
     </p:extLst>
   </p:cSld>
@@ -26036,7 +26260,7 @@
           <p:cNvPr id="17" name="Textfeld 16">
             <a:extLst>
               <a:ext uri="{FF2B5EF4-FFF2-40B4-BE49-F238E27FC236}">
-                <a16:creationId xmlns:a16="http://schemas.microsoft.com/office/drawing/2014/main" id="{507A5837-4FCD-4FFF-87E2-F5C3086BB529}"/>
+                <a16:creationId xmlns:a16="http://schemas.microsoft.com/office/drawing/2014/main" xmlns="" id="{507A5837-4FCD-4FFF-87E2-F5C3086BB529}"/>
               </a:ext>
             </a:extLst>
           </p:cNvPr>
@@ -26186,7 +26410,7 @@
           <p:cNvPr id="18" name="Textfeld 17">
             <a:extLst>
               <a:ext uri="{FF2B5EF4-FFF2-40B4-BE49-F238E27FC236}">
-                <a16:creationId xmlns:a16="http://schemas.microsoft.com/office/drawing/2014/main" id="{BD8BDF0F-1DCC-4293-B702-67BB52F0ADC5}"/>
+                <a16:creationId xmlns:a16="http://schemas.microsoft.com/office/drawing/2014/main" xmlns="" id="{BD8BDF0F-1DCC-4293-B702-67BB52F0ADC5}"/>
               </a:ext>
             </a:extLst>
           </p:cNvPr>
@@ -26339,7 +26563,7 @@
           <p:cNvPr id="2" name="Titel 1">
             <a:extLst>
               <a:ext uri="{FF2B5EF4-FFF2-40B4-BE49-F238E27FC236}">
-                <a16:creationId xmlns:a16="http://schemas.microsoft.com/office/drawing/2014/main" id="{34CE8BCC-3048-47F3-90AD-801FD6E5C7F8}"/>
+                <a16:creationId xmlns:a16="http://schemas.microsoft.com/office/drawing/2014/main" xmlns="" id="{34CE8BCC-3048-47F3-90AD-801FD6E5C7F8}"/>
               </a:ext>
             </a:extLst>
           </p:cNvPr>
@@ -26372,7 +26596,7 @@
           <p:cNvPr id="9" name="Inhaltsplatzhalter 8">
             <a:extLst>
               <a:ext uri="{FF2B5EF4-FFF2-40B4-BE49-F238E27FC236}">
-                <a16:creationId xmlns:a16="http://schemas.microsoft.com/office/drawing/2014/main" id="{3E34CD5D-112F-4598-83DD-A1B842D0B98C}"/>
+                <a16:creationId xmlns:a16="http://schemas.microsoft.com/office/drawing/2014/main" xmlns="" id="{3E34CD5D-112F-4598-83DD-A1B842D0B98C}"/>
               </a:ext>
             </a:extLst>
           </p:cNvPr>
@@ -26384,7 +26608,7 @@
           </p:nvPr>
         </p:nvPicPr>
         <p:blipFill rotWithShape="1">
-          <a:blip r:embed="rId3"/>
+          <a:blip r:embed="rId3" cstate="print"/>
           <a:srcRect t="6105"/>
           <a:stretch/>
         </p:blipFill>
@@ -26403,7 +26627,7 @@
           <p:cNvPr id="4" name="Fußzeilenplatzhalter 3">
             <a:extLst>
               <a:ext uri="{FF2B5EF4-FFF2-40B4-BE49-F238E27FC236}">
-                <a16:creationId xmlns:a16="http://schemas.microsoft.com/office/drawing/2014/main" id="{280E2FE0-B75F-4FD9-97B5-135DEFE6A271}"/>
+                <a16:creationId xmlns:a16="http://schemas.microsoft.com/office/drawing/2014/main" xmlns="" id="{280E2FE0-B75F-4FD9-97B5-135DEFE6A271}"/>
               </a:ext>
             </a:extLst>
           </p:cNvPr>
@@ -26431,7 +26655,7 @@
           <p:cNvPr id="8" name="Grafik 7">
             <a:extLst>
               <a:ext uri="{FF2B5EF4-FFF2-40B4-BE49-F238E27FC236}">
-                <a16:creationId xmlns:a16="http://schemas.microsoft.com/office/drawing/2014/main" id="{A47251C5-73A7-4903-A34E-93FEF8FA3CC7}"/>
+                <a16:creationId xmlns:a16="http://schemas.microsoft.com/office/drawing/2014/main" xmlns="" id="{A47251C5-73A7-4903-A34E-93FEF8FA3CC7}"/>
               </a:ext>
             </a:extLst>
           </p:cNvPr>
@@ -26441,7 +26665,7 @@
           <p:nvPr/>
         </p:nvPicPr>
         <p:blipFill rotWithShape="1">
-          <a:blip r:embed="rId4"/>
+          <a:blip r:embed="rId4" cstate="print"/>
           <a:srcRect t="8205"/>
           <a:stretch/>
         </p:blipFill>
@@ -26460,7 +26684,7 @@
           <p:cNvPr id="12" name="Rechteck: abgerundete Ecken 11">
             <a:extLst>
               <a:ext uri="{FF2B5EF4-FFF2-40B4-BE49-F238E27FC236}">
-                <a16:creationId xmlns:a16="http://schemas.microsoft.com/office/drawing/2014/main" id="{F5F39E6D-09D6-4D67-B425-274B5D53B1E8}"/>
+                <a16:creationId xmlns:a16="http://schemas.microsoft.com/office/drawing/2014/main" xmlns="" id="{F5F39E6D-09D6-4D67-B425-274B5D53B1E8}"/>
               </a:ext>
             </a:extLst>
           </p:cNvPr>
@@ -26515,7 +26739,7 @@
           <p:cNvPr id="13" name="Rechteck: abgerundete Ecken 12">
             <a:extLst>
               <a:ext uri="{FF2B5EF4-FFF2-40B4-BE49-F238E27FC236}">
-                <a16:creationId xmlns:a16="http://schemas.microsoft.com/office/drawing/2014/main" id="{0D36CC96-73EF-4D79-BC40-AEE569964664}"/>
+                <a16:creationId xmlns:a16="http://schemas.microsoft.com/office/drawing/2014/main" xmlns="" id="{0D36CC96-73EF-4D79-BC40-AEE569964664}"/>
               </a:ext>
             </a:extLst>
           </p:cNvPr>
@@ -26570,7 +26794,7 @@
           <p:cNvPr id="14" name="Textfeld 13">
             <a:extLst>
               <a:ext uri="{FF2B5EF4-FFF2-40B4-BE49-F238E27FC236}">
-                <a16:creationId xmlns:a16="http://schemas.microsoft.com/office/drawing/2014/main" id="{B62CE119-7A38-425E-9A44-739FCCC01AA1}"/>
+                <a16:creationId xmlns:a16="http://schemas.microsoft.com/office/drawing/2014/main" xmlns="" id="{B62CE119-7A38-425E-9A44-739FCCC01AA1}"/>
               </a:ext>
             </a:extLst>
           </p:cNvPr>
@@ -26615,7 +26839,7 @@
           <p:cNvPr id="15" name="Textfeld 14">
             <a:extLst>
               <a:ext uri="{FF2B5EF4-FFF2-40B4-BE49-F238E27FC236}">
-                <a16:creationId xmlns:a16="http://schemas.microsoft.com/office/drawing/2014/main" id="{79F25965-7A5A-4D4B-8D4C-701BCFB5C65B}"/>
+                <a16:creationId xmlns:a16="http://schemas.microsoft.com/office/drawing/2014/main" xmlns="" id="{79F25965-7A5A-4D4B-8D4C-701BCFB5C65B}"/>
               </a:ext>
             </a:extLst>
           </p:cNvPr>
@@ -26653,7 +26877,7 @@
           <p:cNvPr id="16" name="Textfeld 15">
             <a:extLst>
               <a:ext uri="{FF2B5EF4-FFF2-40B4-BE49-F238E27FC236}">
-                <a16:creationId xmlns:a16="http://schemas.microsoft.com/office/drawing/2014/main" id="{E2525275-D888-41A9-B23C-63593F8A837B}"/>
+                <a16:creationId xmlns:a16="http://schemas.microsoft.com/office/drawing/2014/main" xmlns="" id="{E2525275-D888-41A9-B23C-63593F8A837B}"/>
               </a:ext>
             </a:extLst>
           </p:cNvPr>
@@ -26689,7 +26913,7 @@
     </p:spTree>
     <p:extLst>
       <p:ext uri="{BB962C8B-B14F-4D97-AF65-F5344CB8AC3E}">
-        <p14:creationId xmlns:p14="http://schemas.microsoft.com/office/powerpoint/2010/main" val="4043006265"/>
+        <p14:creationId xmlns:p14="http://schemas.microsoft.com/office/powerpoint/2010/main" xmlns="" val="4043006265"/>
       </p:ext>
     </p:extLst>
   </p:cSld>
@@ -27772,7 +27996,7 @@
           <p:cNvPr id="9" name="Fußzeilenplatzhalter 4">
             <a:extLst>
               <a:ext uri="{FF2B5EF4-FFF2-40B4-BE49-F238E27FC236}">
-                <a16:creationId xmlns:a16="http://schemas.microsoft.com/office/drawing/2014/main" id="{74D35B47-CC21-43CE-AF04-6505B70667C5}"/>
+                <a16:creationId xmlns:a16="http://schemas.microsoft.com/office/drawing/2014/main" xmlns="" id="{74D35B47-CC21-43CE-AF04-6505B70667C5}"/>
               </a:ext>
             </a:extLst>
           </p:cNvPr>
@@ -28161,7 +28385,7 @@
           <p:cNvPr id="10" name="Gerade Verbindung 11">
             <a:extLst>
               <a:ext uri="{FF2B5EF4-FFF2-40B4-BE49-F238E27FC236}">
-                <a16:creationId xmlns:a16="http://schemas.microsoft.com/office/drawing/2014/main" id="{6FB4D23B-EF86-488F-8772-CBB7EE842FB1}"/>
+                <a16:creationId xmlns:a16="http://schemas.microsoft.com/office/drawing/2014/main" xmlns="" id="{6FB4D23B-EF86-488F-8772-CBB7EE842FB1}"/>
               </a:ext>
             </a:extLst>
           </p:cNvPr>
@@ -28228,7 +28452,7 @@
     </p:spTree>
     <p:extLst>
       <p:ext uri="{BB962C8B-B14F-4D97-AF65-F5344CB8AC3E}">
-        <p14:creationId xmlns:p14="http://schemas.microsoft.com/office/powerpoint/2010/main" val="1386685637"/>
+        <p14:creationId xmlns:p14="http://schemas.microsoft.com/office/powerpoint/2010/main" xmlns="" val="1386685637"/>
       </p:ext>
     </p:extLst>
   </p:cSld>
@@ -28621,7 +28845,7 @@
     </p:spTree>
     <p:extLst>
       <p:ext uri="{BB962C8B-B14F-4D97-AF65-F5344CB8AC3E}">
-        <p14:creationId xmlns:p14="http://schemas.microsoft.com/office/powerpoint/2010/main" val="4224054763"/>
+        <p14:creationId xmlns:p14="http://schemas.microsoft.com/office/powerpoint/2010/main" xmlns="" val="4224054763"/>
       </p:ext>
     </p:extLst>
   </p:cSld>
@@ -28995,6 +29219,10 @@
               <a:rPr lang="de-DE" dirty="0" err="1"/>
               <a:t>Structure</a:t>
             </a:r>
+            <a:r>
+              <a:rPr lang="de-DE" dirty="0"/>
+              <a:t/>
+            </a:r>
             <a:br>
               <a:rPr lang="de-DE" dirty="0"/>
             </a:br>
@@ -29137,16 +29365,1109 @@
           </a:ln>
         </p:spPr>
       </p:pic>
+      <p:cxnSp>
+        <p:nvCxnSpPr>
+          <p:cNvPr id="7" name="Gerade Verbindung 6"/>
+          <p:cNvCxnSpPr/>
+          <p:nvPr/>
+        </p:nvCxnSpPr>
+        <p:spPr>
+          <a:xfrm flipH="1" flipV="1">
+            <a:off x="1857080" y="1904214"/>
+            <a:ext cx="1960776" cy="160256"/>
+          </a:xfrm>
+          <a:prstGeom prst="line">
+            <a:avLst/>
+          </a:prstGeom>
+        </p:spPr>
+        <p:style>
+          <a:lnRef idx="3">
+            <a:schemeClr val="dk1"/>
+          </a:lnRef>
+          <a:fillRef idx="0">
+            <a:schemeClr val="dk1"/>
+          </a:fillRef>
+          <a:effectRef idx="2">
+            <a:schemeClr val="dk1"/>
+          </a:effectRef>
+          <a:fontRef idx="minor">
+            <a:schemeClr val="tx1"/>
+          </a:fontRef>
+        </p:style>
+      </p:cxnSp>
+      <p:cxnSp>
+        <p:nvCxnSpPr>
+          <p:cNvPr id="9" name="Gerade Verbindung 8"/>
+          <p:cNvCxnSpPr/>
+          <p:nvPr/>
+        </p:nvCxnSpPr>
+        <p:spPr>
+          <a:xfrm flipH="1">
+            <a:off x="2007909" y="2554664"/>
+            <a:ext cx="1866507" cy="2036190"/>
+          </a:xfrm>
+          <a:prstGeom prst="line">
+            <a:avLst/>
+          </a:prstGeom>
+        </p:spPr>
+        <p:style>
+          <a:lnRef idx="3">
+            <a:schemeClr val="dk1"/>
+          </a:lnRef>
+          <a:fillRef idx="0">
+            <a:schemeClr val="dk1"/>
+          </a:fillRef>
+          <a:effectRef idx="2">
+            <a:schemeClr val="dk1"/>
+          </a:effectRef>
+          <a:fontRef idx="minor">
+            <a:schemeClr val="tx1"/>
+          </a:fontRef>
+        </p:style>
+      </p:cxnSp>
+      <p:cxnSp>
+        <p:nvCxnSpPr>
+          <p:cNvPr id="12" name="Gerade Verbindung 11"/>
+          <p:cNvCxnSpPr/>
+          <p:nvPr/>
+        </p:nvCxnSpPr>
+        <p:spPr>
+          <a:xfrm flipH="1" flipV="1">
+            <a:off x="2045616" y="2582944"/>
+            <a:ext cx="1857081" cy="461914"/>
+          </a:xfrm>
+          <a:prstGeom prst="line">
+            <a:avLst/>
+          </a:prstGeom>
+        </p:spPr>
+        <p:style>
+          <a:lnRef idx="3">
+            <a:schemeClr val="dk1"/>
+          </a:lnRef>
+          <a:fillRef idx="0">
+            <a:schemeClr val="dk1"/>
+          </a:fillRef>
+          <a:effectRef idx="2">
+            <a:schemeClr val="dk1"/>
+          </a:effectRef>
+          <a:fontRef idx="minor">
+            <a:schemeClr val="tx1"/>
+          </a:fontRef>
+        </p:style>
+      </p:cxnSp>
+      <p:cxnSp>
+        <p:nvCxnSpPr>
+          <p:cNvPr id="15" name="Gerade Verbindung 14"/>
+          <p:cNvCxnSpPr/>
+          <p:nvPr/>
+        </p:nvCxnSpPr>
+        <p:spPr>
+          <a:xfrm flipH="1">
+            <a:off x="1960775" y="3129699"/>
+            <a:ext cx="1960776" cy="1819373"/>
+          </a:xfrm>
+          <a:prstGeom prst="line">
+            <a:avLst/>
+          </a:prstGeom>
+        </p:spPr>
+        <p:style>
+          <a:lnRef idx="3">
+            <a:schemeClr val="dk1"/>
+          </a:lnRef>
+          <a:fillRef idx="0">
+            <a:schemeClr val="dk1"/>
+          </a:fillRef>
+          <a:effectRef idx="2">
+            <a:schemeClr val="dk1"/>
+          </a:effectRef>
+          <a:fontRef idx="minor">
+            <a:schemeClr val="tx1"/>
+          </a:fontRef>
+        </p:style>
+      </p:cxnSp>
+      <p:cxnSp>
+        <p:nvCxnSpPr>
+          <p:cNvPr id="17" name="Gerade Verbindung 16"/>
+          <p:cNvCxnSpPr/>
+          <p:nvPr/>
+        </p:nvCxnSpPr>
+        <p:spPr>
+          <a:xfrm flipH="1" flipV="1">
+            <a:off x="1838227" y="2271860"/>
+            <a:ext cx="2064470" cy="1319752"/>
+          </a:xfrm>
+          <a:prstGeom prst="line">
+            <a:avLst/>
+          </a:prstGeom>
+        </p:spPr>
+        <p:style>
+          <a:lnRef idx="3">
+            <a:schemeClr val="dk1"/>
+          </a:lnRef>
+          <a:fillRef idx="0">
+            <a:schemeClr val="dk1"/>
+          </a:fillRef>
+          <a:effectRef idx="2">
+            <a:schemeClr val="dk1"/>
+          </a:effectRef>
+          <a:fontRef idx="minor">
+            <a:schemeClr val="tx1"/>
+          </a:fontRef>
+        </p:style>
+      </p:cxnSp>
+      <p:cxnSp>
+        <p:nvCxnSpPr>
+          <p:cNvPr id="19" name="Gerade Verbindung 18"/>
+          <p:cNvCxnSpPr/>
+          <p:nvPr/>
+        </p:nvCxnSpPr>
+        <p:spPr>
+          <a:xfrm flipH="1">
+            <a:off x="1847654" y="3648173"/>
+            <a:ext cx="2073897" cy="1140643"/>
+          </a:xfrm>
+          <a:prstGeom prst="line">
+            <a:avLst/>
+          </a:prstGeom>
+        </p:spPr>
+        <p:style>
+          <a:lnRef idx="3">
+            <a:schemeClr val="dk1"/>
+          </a:lnRef>
+          <a:fillRef idx="0">
+            <a:schemeClr val="dk1"/>
+          </a:fillRef>
+          <a:effectRef idx="2">
+            <a:schemeClr val="dk1"/>
+          </a:effectRef>
+          <a:fontRef idx="minor">
+            <a:schemeClr val="tx1"/>
+          </a:fontRef>
+        </p:style>
+      </p:cxnSp>
+      <p:cxnSp>
+        <p:nvCxnSpPr>
+          <p:cNvPr id="21" name="Gerade Verbindung 20"/>
+          <p:cNvCxnSpPr/>
+          <p:nvPr/>
+        </p:nvCxnSpPr>
+        <p:spPr>
+          <a:xfrm flipH="1" flipV="1">
+            <a:off x="2090057" y="2754086"/>
+            <a:ext cx="1785257" cy="1382485"/>
+          </a:xfrm>
+          <a:prstGeom prst="line">
+            <a:avLst/>
+          </a:prstGeom>
+        </p:spPr>
+        <p:style>
+          <a:lnRef idx="3">
+            <a:schemeClr val="dk1"/>
+          </a:lnRef>
+          <a:fillRef idx="0">
+            <a:schemeClr val="dk1"/>
+          </a:fillRef>
+          <a:effectRef idx="2">
+            <a:schemeClr val="dk1"/>
+          </a:effectRef>
+          <a:fontRef idx="minor">
+            <a:schemeClr val="tx1"/>
+          </a:fontRef>
+        </p:style>
+      </p:cxnSp>
+      <p:cxnSp>
+        <p:nvCxnSpPr>
+          <p:cNvPr id="23" name="Gerade Verbindung 22"/>
+          <p:cNvCxnSpPr/>
+          <p:nvPr/>
+        </p:nvCxnSpPr>
+        <p:spPr>
+          <a:xfrm flipH="1" flipV="1">
+            <a:off x="2079171" y="2917371"/>
+            <a:ext cx="1883229" cy="2046515"/>
+          </a:xfrm>
+          <a:prstGeom prst="line">
+            <a:avLst/>
+          </a:prstGeom>
+        </p:spPr>
+        <p:style>
+          <a:lnRef idx="3">
+            <a:schemeClr val="dk1"/>
+          </a:lnRef>
+          <a:fillRef idx="0">
+            <a:schemeClr val="dk1"/>
+          </a:fillRef>
+          <a:effectRef idx="2">
+            <a:schemeClr val="dk1"/>
+          </a:effectRef>
+          <a:fontRef idx="minor">
+            <a:schemeClr val="tx1"/>
+          </a:fontRef>
+        </p:style>
+      </p:cxnSp>
     </p:spTree>
     <p:extLst>
       <p:ext uri="{BB962C8B-B14F-4D97-AF65-F5344CB8AC3E}">
-        <p14:creationId xmlns:p14="http://schemas.microsoft.com/office/powerpoint/2010/main" val="3394471292"/>
+        <p14:creationId xmlns:p14="http://schemas.microsoft.com/office/powerpoint/2010/main" xmlns="" val="3394471292"/>
       </p:ext>
     </p:extLst>
   </p:cSld>
   <p:clrMapOvr>
     <a:masterClrMapping/>
   </p:clrMapOvr>
+  <p:timing>
+    <p:tnLst>
+      <p:par>
+        <p:cTn id="1" dur="indefinite" restart="never" nodeType="tmRoot">
+          <p:childTnLst>
+            <p:seq concurrent="1" nextAc="seek">
+              <p:cTn id="2" dur="indefinite" nodeType="mainSeq">
+                <p:childTnLst>
+                  <p:par>
+                    <p:cTn id="3" fill="hold">
+                      <p:stCondLst>
+                        <p:cond delay="indefinite"/>
+                      </p:stCondLst>
+                      <p:childTnLst>
+                        <p:par>
+                          <p:cTn id="4" fill="hold">
+                            <p:stCondLst>
+                              <p:cond delay="0"/>
+                            </p:stCondLst>
+                            <p:childTnLst>
+                              <p:par>
+                                <p:cTn id="5" presetID="3" presetClass="entr" presetSubtype="10" fill="hold" nodeType="clickEffect">
+                                  <p:stCondLst>
+                                    <p:cond delay="0"/>
+                                  </p:stCondLst>
+                                  <p:childTnLst>
+                                    <p:set>
+                                      <p:cBhvr>
+                                        <p:cTn id="6" dur="1" fill="hold">
+                                          <p:stCondLst>
+                                            <p:cond delay="0"/>
+                                          </p:stCondLst>
+                                        </p:cTn>
+                                        <p:tgtEl>
+                                          <p:spTgt spid="11">
+                                            <p:txEl>
+                                              <p:pRg st="0" end="0"/>
+                                            </p:txEl>
+                                          </p:spTgt>
+                                        </p:tgtEl>
+                                        <p:attrNameLst>
+                                          <p:attrName>style.visibility</p:attrName>
+                                        </p:attrNameLst>
+                                      </p:cBhvr>
+                                      <p:to>
+                                        <p:strVal val="visible"/>
+                                      </p:to>
+                                    </p:set>
+                                    <p:animEffect transition="in" filter="blinds(horizontal)">
+                                      <p:cBhvr>
+                                        <p:cTn id="7" dur="500"/>
+                                        <p:tgtEl>
+                                          <p:spTgt spid="11">
+                                            <p:txEl>
+                                              <p:pRg st="0" end="0"/>
+                                            </p:txEl>
+                                          </p:spTgt>
+                                        </p:tgtEl>
+                                      </p:cBhvr>
+                                    </p:animEffect>
+                                  </p:childTnLst>
+                                </p:cTn>
+                              </p:par>
+                              <p:par>
+                                <p:cTn id="8" presetID="3" presetClass="entr" presetSubtype="10" fill="hold" nodeType="withEffect">
+                                  <p:stCondLst>
+                                    <p:cond delay="0"/>
+                                  </p:stCondLst>
+                                  <p:childTnLst>
+                                    <p:set>
+                                      <p:cBhvr>
+                                        <p:cTn id="9" dur="1" fill="hold">
+                                          <p:stCondLst>
+                                            <p:cond delay="0"/>
+                                          </p:stCondLst>
+                                        </p:cTn>
+                                        <p:tgtEl>
+                                          <p:spTgt spid="11">
+                                            <p:txEl>
+                                              <p:pRg st="1" end="1"/>
+                                            </p:txEl>
+                                          </p:spTgt>
+                                        </p:tgtEl>
+                                        <p:attrNameLst>
+                                          <p:attrName>style.visibility</p:attrName>
+                                        </p:attrNameLst>
+                                      </p:cBhvr>
+                                      <p:to>
+                                        <p:strVal val="visible"/>
+                                      </p:to>
+                                    </p:set>
+                                    <p:animEffect transition="in" filter="blinds(horizontal)">
+                                      <p:cBhvr>
+                                        <p:cTn id="10" dur="500"/>
+                                        <p:tgtEl>
+                                          <p:spTgt spid="11">
+                                            <p:txEl>
+                                              <p:pRg st="1" end="1"/>
+                                            </p:txEl>
+                                          </p:spTgt>
+                                        </p:tgtEl>
+                                      </p:cBhvr>
+                                    </p:animEffect>
+                                  </p:childTnLst>
+                                </p:cTn>
+                              </p:par>
+                              <p:par>
+                                <p:cTn id="11" presetID="3" presetClass="entr" presetSubtype="10" fill="hold" nodeType="withEffect">
+                                  <p:stCondLst>
+                                    <p:cond delay="0"/>
+                                  </p:stCondLst>
+                                  <p:childTnLst>
+                                    <p:set>
+                                      <p:cBhvr>
+                                        <p:cTn id="12" dur="1" fill="hold">
+                                          <p:stCondLst>
+                                            <p:cond delay="0"/>
+                                          </p:stCondLst>
+                                        </p:cTn>
+                                        <p:tgtEl>
+                                          <p:spTgt spid="7"/>
+                                        </p:tgtEl>
+                                        <p:attrNameLst>
+                                          <p:attrName>style.visibility</p:attrName>
+                                        </p:attrNameLst>
+                                      </p:cBhvr>
+                                      <p:to>
+                                        <p:strVal val="visible"/>
+                                      </p:to>
+                                    </p:set>
+                                    <p:animEffect transition="in" filter="blinds(horizontal)">
+                                      <p:cBhvr>
+                                        <p:cTn id="13" dur="500"/>
+                                        <p:tgtEl>
+                                          <p:spTgt spid="7"/>
+                                        </p:tgtEl>
+                                      </p:cBhvr>
+                                    </p:animEffect>
+                                  </p:childTnLst>
+                                </p:cTn>
+                              </p:par>
+                              <p:par>
+                                <p:cTn id="14" presetID="3" presetClass="entr" presetSubtype="10" fill="hold" nodeType="withEffect">
+                                  <p:stCondLst>
+                                    <p:cond delay="0"/>
+                                  </p:stCondLst>
+                                  <p:childTnLst>
+                                    <p:set>
+                                      <p:cBhvr>
+                                        <p:cTn id="15" dur="1" fill="hold">
+                                          <p:stCondLst>
+                                            <p:cond delay="0"/>
+                                          </p:stCondLst>
+                                        </p:cTn>
+                                        <p:tgtEl>
+                                          <p:spTgt spid="9"/>
+                                        </p:tgtEl>
+                                        <p:attrNameLst>
+                                          <p:attrName>style.visibility</p:attrName>
+                                        </p:attrNameLst>
+                                      </p:cBhvr>
+                                      <p:to>
+                                        <p:strVal val="visible"/>
+                                      </p:to>
+                                    </p:set>
+                                    <p:animEffect transition="in" filter="blinds(horizontal)">
+                                      <p:cBhvr>
+                                        <p:cTn id="16" dur="500"/>
+                                        <p:tgtEl>
+                                          <p:spTgt spid="9"/>
+                                        </p:tgtEl>
+                                      </p:cBhvr>
+                                    </p:animEffect>
+                                  </p:childTnLst>
+                                </p:cTn>
+                              </p:par>
+                              <p:par>
+                                <p:cTn id="17" presetID="3" presetClass="exit" presetSubtype="10" fill="hold" nodeType="withEffect">
+                                  <p:stCondLst>
+                                    <p:cond delay="0"/>
+                                  </p:stCondLst>
+                                  <p:childTnLst>
+                                    <p:animEffect transition="out" filter="blinds(horizontal)">
+                                      <p:cBhvr>
+                                        <p:cTn id="18" dur="500"/>
+                                        <p:tgtEl>
+                                          <p:spTgt spid="7"/>
+                                        </p:tgtEl>
+                                      </p:cBhvr>
+                                    </p:animEffect>
+                                    <p:set>
+                                      <p:cBhvr>
+                                        <p:cTn id="19" dur="1" fill="hold">
+                                          <p:stCondLst>
+                                            <p:cond delay="499"/>
+                                          </p:stCondLst>
+                                        </p:cTn>
+                                        <p:tgtEl>
+                                          <p:spTgt spid="7"/>
+                                        </p:tgtEl>
+                                        <p:attrNameLst>
+                                          <p:attrName>style.visibility</p:attrName>
+                                        </p:attrNameLst>
+                                      </p:cBhvr>
+                                      <p:to>
+                                        <p:strVal val="hidden"/>
+                                      </p:to>
+                                    </p:set>
+                                  </p:childTnLst>
+                                </p:cTn>
+                              </p:par>
+                              <p:par>
+                                <p:cTn id="20" presetID="3" presetClass="exit" presetSubtype="10" fill="hold" nodeType="withEffect">
+                                  <p:stCondLst>
+                                    <p:cond delay="0"/>
+                                  </p:stCondLst>
+                                  <p:childTnLst>
+                                    <p:animEffect transition="out" filter="blinds(horizontal)">
+                                      <p:cBhvr>
+                                        <p:cTn id="21" dur="500"/>
+                                        <p:tgtEl>
+                                          <p:spTgt spid="9"/>
+                                        </p:tgtEl>
+                                      </p:cBhvr>
+                                    </p:animEffect>
+                                    <p:set>
+                                      <p:cBhvr>
+                                        <p:cTn id="22" dur="1" fill="hold">
+                                          <p:stCondLst>
+                                            <p:cond delay="499"/>
+                                          </p:stCondLst>
+                                        </p:cTn>
+                                        <p:tgtEl>
+                                          <p:spTgt spid="9"/>
+                                        </p:tgtEl>
+                                        <p:attrNameLst>
+                                          <p:attrName>style.visibility</p:attrName>
+                                        </p:attrNameLst>
+                                      </p:cBhvr>
+                                      <p:to>
+                                        <p:strVal val="hidden"/>
+                                      </p:to>
+                                    </p:set>
+                                  </p:childTnLst>
+                                </p:cTn>
+                              </p:par>
+                            </p:childTnLst>
+                          </p:cTn>
+                        </p:par>
+                      </p:childTnLst>
+                    </p:cTn>
+                  </p:par>
+                  <p:par>
+                    <p:cTn id="23" fill="hold">
+                      <p:stCondLst>
+                        <p:cond delay="indefinite"/>
+                      </p:stCondLst>
+                      <p:childTnLst>
+                        <p:par>
+                          <p:cTn id="24" fill="hold">
+                            <p:stCondLst>
+                              <p:cond delay="0"/>
+                            </p:stCondLst>
+                            <p:childTnLst>
+                              <p:par>
+                                <p:cTn id="25" presetID="3" presetClass="entr" presetSubtype="10" fill="hold" grpId="0" nodeType="clickEffect">
+                                  <p:stCondLst>
+                                    <p:cond delay="0"/>
+                                  </p:stCondLst>
+                                  <p:childTnLst>
+                                    <p:set>
+                                      <p:cBhvr>
+                                        <p:cTn id="26" dur="1" fill="hold">
+                                          <p:stCondLst>
+                                            <p:cond delay="0"/>
+                                          </p:stCondLst>
+                                        </p:cTn>
+                                        <p:tgtEl>
+                                          <p:spTgt spid="11">
+                                            <p:txEl>
+                                              <p:pRg st="2" end="2"/>
+                                            </p:txEl>
+                                          </p:spTgt>
+                                        </p:tgtEl>
+                                        <p:attrNameLst>
+                                          <p:attrName>style.visibility</p:attrName>
+                                        </p:attrNameLst>
+                                      </p:cBhvr>
+                                      <p:to>
+                                        <p:strVal val="visible"/>
+                                      </p:to>
+                                    </p:set>
+                                    <p:animEffect transition="in" filter="blinds(horizontal)">
+                                      <p:cBhvr>
+                                        <p:cTn id="27" dur="500"/>
+                                        <p:tgtEl>
+                                          <p:spTgt spid="11">
+                                            <p:txEl>
+                                              <p:pRg st="2" end="2"/>
+                                            </p:txEl>
+                                          </p:spTgt>
+                                        </p:tgtEl>
+                                      </p:cBhvr>
+                                    </p:animEffect>
+                                  </p:childTnLst>
+                                </p:cTn>
+                              </p:par>
+                              <p:par>
+                                <p:cTn id="28" presetID="3" presetClass="entr" presetSubtype="10" fill="hold" nodeType="withEffect">
+                                  <p:stCondLst>
+                                    <p:cond delay="0"/>
+                                  </p:stCondLst>
+                                  <p:childTnLst>
+                                    <p:set>
+                                      <p:cBhvr>
+                                        <p:cTn id="29" dur="1" fill="hold">
+                                          <p:stCondLst>
+                                            <p:cond delay="0"/>
+                                          </p:stCondLst>
+                                        </p:cTn>
+                                        <p:tgtEl>
+                                          <p:spTgt spid="12"/>
+                                        </p:tgtEl>
+                                        <p:attrNameLst>
+                                          <p:attrName>style.visibility</p:attrName>
+                                        </p:attrNameLst>
+                                      </p:cBhvr>
+                                      <p:to>
+                                        <p:strVal val="visible"/>
+                                      </p:to>
+                                    </p:set>
+                                    <p:animEffect transition="in" filter="blinds(horizontal)">
+                                      <p:cBhvr>
+                                        <p:cTn id="30" dur="500"/>
+                                        <p:tgtEl>
+                                          <p:spTgt spid="12"/>
+                                        </p:tgtEl>
+                                      </p:cBhvr>
+                                    </p:animEffect>
+                                  </p:childTnLst>
+                                </p:cTn>
+                              </p:par>
+                              <p:par>
+                                <p:cTn id="31" presetID="3" presetClass="entr" presetSubtype="10" fill="hold" nodeType="withEffect">
+                                  <p:stCondLst>
+                                    <p:cond delay="0"/>
+                                  </p:stCondLst>
+                                  <p:childTnLst>
+                                    <p:set>
+                                      <p:cBhvr>
+                                        <p:cTn id="32" dur="1" fill="hold">
+                                          <p:stCondLst>
+                                            <p:cond delay="0"/>
+                                          </p:stCondLst>
+                                        </p:cTn>
+                                        <p:tgtEl>
+                                          <p:spTgt spid="15"/>
+                                        </p:tgtEl>
+                                        <p:attrNameLst>
+                                          <p:attrName>style.visibility</p:attrName>
+                                        </p:attrNameLst>
+                                      </p:cBhvr>
+                                      <p:to>
+                                        <p:strVal val="visible"/>
+                                      </p:to>
+                                    </p:set>
+                                    <p:animEffect transition="in" filter="blinds(horizontal)">
+                                      <p:cBhvr>
+                                        <p:cTn id="33" dur="500"/>
+                                        <p:tgtEl>
+                                          <p:spTgt spid="15"/>
+                                        </p:tgtEl>
+                                      </p:cBhvr>
+                                    </p:animEffect>
+                                  </p:childTnLst>
+                                </p:cTn>
+                              </p:par>
+                              <p:par>
+                                <p:cTn id="34" presetID="3" presetClass="exit" presetSubtype="10" fill="hold" nodeType="withEffect">
+                                  <p:stCondLst>
+                                    <p:cond delay="0"/>
+                                  </p:stCondLst>
+                                  <p:childTnLst>
+                                    <p:animEffect transition="out" filter="blinds(horizontal)">
+                                      <p:cBhvr>
+                                        <p:cTn id="35" dur="500"/>
+                                        <p:tgtEl>
+                                          <p:spTgt spid="12"/>
+                                        </p:tgtEl>
+                                      </p:cBhvr>
+                                    </p:animEffect>
+                                    <p:set>
+                                      <p:cBhvr>
+                                        <p:cTn id="36" dur="1" fill="hold">
+                                          <p:stCondLst>
+                                            <p:cond delay="499"/>
+                                          </p:stCondLst>
+                                        </p:cTn>
+                                        <p:tgtEl>
+                                          <p:spTgt spid="12"/>
+                                        </p:tgtEl>
+                                        <p:attrNameLst>
+                                          <p:attrName>style.visibility</p:attrName>
+                                        </p:attrNameLst>
+                                      </p:cBhvr>
+                                      <p:to>
+                                        <p:strVal val="hidden"/>
+                                      </p:to>
+                                    </p:set>
+                                  </p:childTnLst>
+                                </p:cTn>
+                              </p:par>
+                              <p:par>
+                                <p:cTn id="37" presetID="3" presetClass="exit" presetSubtype="10" fill="hold" nodeType="withEffect">
+                                  <p:stCondLst>
+                                    <p:cond delay="0"/>
+                                  </p:stCondLst>
+                                  <p:childTnLst>
+                                    <p:animEffect transition="out" filter="blinds(horizontal)">
+                                      <p:cBhvr>
+                                        <p:cTn id="38" dur="500"/>
+                                        <p:tgtEl>
+                                          <p:spTgt spid="15"/>
+                                        </p:tgtEl>
+                                      </p:cBhvr>
+                                    </p:animEffect>
+                                    <p:set>
+                                      <p:cBhvr>
+                                        <p:cTn id="39" dur="1" fill="hold">
+                                          <p:stCondLst>
+                                            <p:cond delay="499"/>
+                                          </p:stCondLst>
+                                        </p:cTn>
+                                        <p:tgtEl>
+                                          <p:spTgt spid="15"/>
+                                        </p:tgtEl>
+                                        <p:attrNameLst>
+                                          <p:attrName>style.visibility</p:attrName>
+                                        </p:attrNameLst>
+                                      </p:cBhvr>
+                                      <p:to>
+                                        <p:strVal val="hidden"/>
+                                      </p:to>
+                                    </p:set>
+                                  </p:childTnLst>
+                                </p:cTn>
+                              </p:par>
+                            </p:childTnLst>
+                          </p:cTn>
+                        </p:par>
+                      </p:childTnLst>
+                    </p:cTn>
+                  </p:par>
+                  <p:par>
+                    <p:cTn id="40" fill="hold">
+                      <p:stCondLst>
+                        <p:cond delay="indefinite"/>
+                      </p:stCondLst>
+                      <p:childTnLst>
+                        <p:par>
+                          <p:cTn id="41" fill="hold">
+                            <p:stCondLst>
+                              <p:cond delay="0"/>
+                            </p:stCondLst>
+                            <p:childTnLst>
+                              <p:par>
+                                <p:cTn id="42" presetID="3" presetClass="entr" presetSubtype="10" fill="hold" nodeType="clickEffect">
+                                  <p:stCondLst>
+                                    <p:cond delay="0"/>
+                                  </p:stCondLst>
+                                  <p:childTnLst>
+                                    <p:set>
+                                      <p:cBhvr>
+                                        <p:cTn id="43" dur="1" fill="hold">
+                                          <p:stCondLst>
+                                            <p:cond delay="0"/>
+                                          </p:stCondLst>
+                                        </p:cTn>
+                                        <p:tgtEl>
+                                          <p:spTgt spid="11">
+                                            <p:txEl>
+                                              <p:pRg st="3" end="3"/>
+                                            </p:txEl>
+                                          </p:spTgt>
+                                        </p:tgtEl>
+                                        <p:attrNameLst>
+                                          <p:attrName>style.visibility</p:attrName>
+                                        </p:attrNameLst>
+                                      </p:cBhvr>
+                                      <p:to>
+                                        <p:strVal val="visible"/>
+                                      </p:to>
+                                    </p:set>
+                                    <p:animEffect transition="in" filter="blinds(horizontal)">
+                                      <p:cBhvr>
+                                        <p:cTn id="44" dur="500"/>
+                                        <p:tgtEl>
+                                          <p:spTgt spid="11">
+                                            <p:txEl>
+                                              <p:pRg st="3" end="3"/>
+                                            </p:txEl>
+                                          </p:spTgt>
+                                        </p:tgtEl>
+                                      </p:cBhvr>
+                                    </p:animEffect>
+                                  </p:childTnLst>
+                                </p:cTn>
+                              </p:par>
+                              <p:par>
+                                <p:cTn id="45" presetID="3" presetClass="entr" presetSubtype="10" fill="hold" nodeType="withEffect">
+                                  <p:stCondLst>
+                                    <p:cond delay="0"/>
+                                  </p:stCondLst>
+                                  <p:childTnLst>
+                                    <p:set>
+                                      <p:cBhvr>
+                                        <p:cTn id="46" dur="1" fill="hold">
+                                          <p:stCondLst>
+                                            <p:cond delay="0"/>
+                                          </p:stCondLst>
+                                        </p:cTn>
+                                        <p:tgtEl>
+                                          <p:spTgt spid="19"/>
+                                        </p:tgtEl>
+                                        <p:attrNameLst>
+                                          <p:attrName>style.visibility</p:attrName>
+                                        </p:attrNameLst>
+                                      </p:cBhvr>
+                                      <p:to>
+                                        <p:strVal val="visible"/>
+                                      </p:to>
+                                    </p:set>
+                                    <p:animEffect transition="in" filter="blinds(horizontal)">
+                                      <p:cBhvr>
+                                        <p:cTn id="47" dur="500"/>
+                                        <p:tgtEl>
+                                          <p:spTgt spid="19"/>
+                                        </p:tgtEl>
+                                      </p:cBhvr>
+                                    </p:animEffect>
+                                  </p:childTnLst>
+                                </p:cTn>
+                              </p:par>
+                              <p:par>
+                                <p:cTn id="48" presetID="3" presetClass="entr" presetSubtype="10" fill="hold" nodeType="withEffect">
+                                  <p:stCondLst>
+                                    <p:cond delay="0"/>
+                                  </p:stCondLst>
+                                  <p:childTnLst>
+                                    <p:set>
+                                      <p:cBhvr>
+                                        <p:cTn id="49" dur="1" fill="hold">
+                                          <p:stCondLst>
+                                            <p:cond delay="0"/>
+                                          </p:stCondLst>
+                                        </p:cTn>
+                                        <p:tgtEl>
+                                          <p:spTgt spid="17"/>
+                                        </p:tgtEl>
+                                        <p:attrNameLst>
+                                          <p:attrName>style.visibility</p:attrName>
+                                        </p:attrNameLst>
+                                      </p:cBhvr>
+                                      <p:to>
+                                        <p:strVal val="visible"/>
+                                      </p:to>
+                                    </p:set>
+                                    <p:animEffect transition="in" filter="blinds(horizontal)">
+                                      <p:cBhvr>
+                                        <p:cTn id="50" dur="500"/>
+                                        <p:tgtEl>
+                                          <p:spTgt spid="17"/>
+                                        </p:tgtEl>
+                                      </p:cBhvr>
+                                    </p:animEffect>
+                                  </p:childTnLst>
+                                </p:cTn>
+                              </p:par>
+                              <p:par>
+                                <p:cTn id="51" presetID="3" presetClass="exit" presetSubtype="10" fill="hold" nodeType="withEffect">
+                                  <p:stCondLst>
+                                    <p:cond delay="0"/>
+                                  </p:stCondLst>
+                                  <p:childTnLst>
+                                    <p:animEffect transition="out" filter="blinds(horizontal)">
+                                      <p:cBhvr>
+                                        <p:cTn id="52" dur="500"/>
+                                        <p:tgtEl>
+                                          <p:spTgt spid="19"/>
+                                        </p:tgtEl>
+                                      </p:cBhvr>
+                                    </p:animEffect>
+                                    <p:set>
+                                      <p:cBhvr>
+                                        <p:cTn id="53" dur="1" fill="hold">
+                                          <p:stCondLst>
+                                            <p:cond delay="499"/>
+                                          </p:stCondLst>
+                                        </p:cTn>
+                                        <p:tgtEl>
+                                          <p:spTgt spid="19"/>
+                                        </p:tgtEl>
+                                        <p:attrNameLst>
+                                          <p:attrName>style.visibility</p:attrName>
+                                        </p:attrNameLst>
+                                      </p:cBhvr>
+                                      <p:to>
+                                        <p:strVal val="hidden"/>
+                                      </p:to>
+                                    </p:set>
+                                  </p:childTnLst>
+                                </p:cTn>
+                              </p:par>
+                              <p:par>
+                                <p:cTn id="54" presetID="3" presetClass="exit" presetSubtype="10" fill="hold" nodeType="withEffect">
+                                  <p:stCondLst>
+                                    <p:cond delay="0"/>
+                                  </p:stCondLst>
+                                  <p:childTnLst>
+                                    <p:animEffect transition="out" filter="blinds(horizontal)">
+                                      <p:cBhvr>
+                                        <p:cTn id="55" dur="500"/>
+                                        <p:tgtEl>
+                                          <p:spTgt spid="17"/>
+                                        </p:tgtEl>
+                                      </p:cBhvr>
+                                    </p:animEffect>
+                                    <p:set>
+                                      <p:cBhvr>
+                                        <p:cTn id="56" dur="1" fill="hold">
+                                          <p:stCondLst>
+                                            <p:cond delay="499"/>
+                                          </p:stCondLst>
+                                        </p:cTn>
+                                        <p:tgtEl>
+                                          <p:spTgt spid="17"/>
+                                        </p:tgtEl>
+                                        <p:attrNameLst>
+                                          <p:attrName>style.visibility</p:attrName>
+                                        </p:attrNameLst>
+                                      </p:cBhvr>
+                                      <p:to>
+                                        <p:strVal val="hidden"/>
+                                      </p:to>
+                                    </p:set>
+                                  </p:childTnLst>
+                                </p:cTn>
+                              </p:par>
+                            </p:childTnLst>
+                          </p:cTn>
+                        </p:par>
+                      </p:childTnLst>
+                    </p:cTn>
+                  </p:par>
+                  <p:par>
+                    <p:cTn id="57" fill="hold">
+                      <p:stCondLst>
+                        <p:cond delay="indefinite"/>
+                      </p:stCondLst>
+                      <p:childTnLst>
+                        <p:par>
+                          <p:cTn id="58" fill="hold">
+                            <p:stCondLst>
+                              <p:cond delay="0"/>
+                            </p:stCondLst>
+                            <p:childTnLst>
+                              <p:par>
+                                <p:cTn id="59" presetID="3" presetClass="entr" presetSubtype="10" fill="hold" nodeType="clickEffect">
+                                  <p:stCondLst>
+                                    <p:cond delay="0"/>
+                                  </p:stCondLst>
+                                  <p:childTnLst>
+                                    <p:set>
+                                      <p:cBhvr>
+                                        <p:cTn id="60" dur="1" fill="hold">
+                                          <p:stCondLst>
+                                            <p:cond delay="0"/>
+                                          </p:stCondLst>
+                                        </p:cTn>
+                                        <p:tgtEl>
+                                          <p:spTgt spid="11">
+                                            <p:txEl>
+                                              <p:pRg st="4" end="4"/>
+                                            </p:txEl>
+                                          </p:spTgt>
+                                        </p:tgtEl>
+                                        <p:attrNameLst>
+                                          <p:attrName>style.visibility</p:attrName>
+                                        </p:attrNameLst>
+                                      </p:cBhvr>
+                                      <p:to>
+                                        <p:strVal val="visible"/>
+                                      </p:to>
+                                    </p:set>
+                                    <p:animEffect transition="in" filter="blinds(horizontal)">
+                                      <p:cBhvr>
+                                        <p:cTn id="61" dur="500"/>
+                                        <p:tgtEl>
+                                          <p:spTgt spid="11">
+                                            <p:txEl>
+                                              <p:pRg st="4" end="4"/>
+                                            </p:txEl>
+                                          </p:spTgt>
+                                        </p:tgtEl>
+                                      </p:cBhvr>
+                                    </p:animEffect>
+                                  </p:childTnLst>
+                                </p:cTn>
+                              </p:par>
+                              <p:par>
+                                <p:cTn id="62" presetID="3" presetClass="entr" presetSubtype="10" fill="hold" nodeType="withEffect">
+                                  <p:stCondLst>
+                                    <p:cond delay="0"/>
+                                  </p:stCondLst>
+                                  <p:childTnLst>
+                                    <p:set>
+                                      <p:cBhvr>
+                                        <p:cTn id="63" dur="1" fill="hold">
+                                          <p:stCondLst>
+                                            <p:cond delay="0"/>
+                                          </p:stCondLst>
+                                        </p:cTn>
+                                        <p:tgtEl>
+                                          <p:spTgt spid="11">
+                                            <p:txEl>
+                                              <p:pRg st="5" end="5"/>
+                                            </p:txEl>
+                                          </p:spTgt>
+                                        </p:tgtEl>
+                                        <p:attrNameLst>
+                                          <p:attrName>style.visibility</p:attrName>
+                                        </p:attrNameLst>
+                                      </p:cBhvr>
+                                      <p:to>
+                                        <p:strVal val="visible"/>
+                                      </p:to>
+                                    </p:set>
+                                    <p:animEffect transition="in" filter="blinds(horizontal)">
+                                      <p:cBhvr>
+                                        <p:cTn id="64" dur="500"/>
+                                        <p:tgtEl>
+                                          <p:spTgt spid="11">
+                                            <p:txEl>
+                                              <p:pRg st="5" end="5"/>
+                                            </p:txEl>
+                                          </p:spTgt>
+                                        </p:tgtEl>
+                                      </p:cBhvr>
+                                    </p:animEffect>
+                                  </p:childTnLst>
+                                </p:cTn>
+                              </p:par>
+                              <p:par>
+                                <p:cTn id="65" presetID="3" presetClass="entr" presetSubtype="10" fill="hold" nodeType="withEffect">
+                                  <p:stCondLst>
+                                    <p:cond delay="0"/>
+                                  </p:stCondLst>
+                                  <p:childTnLst>
+                                    <p:set>
+                                      <p:cBhvr>
+                                        <p:cTn id="66" dur="1" fill="hold">
+                                          <p:stCondLst>
+                                            <p:cond delay="0"/>
+                                          </p:stCondLst>
+                                        </p:cTn>
+                                        <p:tgtEl>
+                                          <p:spTgt spid="23"/>
+                                        </p:tgtEl>
+                                        <p:attrNameLst>
+                                          <p:attrName>style.visibility</p:attrName>
+                                        </p:attrNameLst>
+                                      </p:cBhvr>
+                                      <p:to>
+                                        <p:strVal val="visible"/>
+                                      </p:to>
+                                    </p:set>
+                                    <p:animEffect transition="in" filter="blinds(horizontal)">
+                                      <p:cBhvr>
+                                        <p:cTn id="67" dur="500"/>
+                                        <p:tgtEl>
+                                          <p:spTgt spid="23"/>
+                                        </p:tgtEl>
+                                      </p:cBhvr>
+                                    </p:animEffect>
+                                  </p:childTnLst>
+                                </p:cTn>
+                              </p:par>
+                              <p:par>
+                                <p:cTn id="68" presetID="3" presetClass="entr" presetSubtype="10" fill="hold" nodeType="withEffect">
+                                  <p:stCondLst>
+                                    <p:cond delay="0"/>
+                                  </p:stCondLst>
+                                  <p:childTnLst>
+                                    <p:set>
+                                      <p:cBhvr>
+                                        <p:cTn id="69" dur="1" fill="hold">
+                                          <p:stCondLst>
+                                            <p:cond delay="0"/>
+                                          </p:stCondLst>
+                                        </p:cTn>
+                                        <p:tgtEl>
+                                          <p:spTgt spid="21"/>
+                                        </p:tgtEl>
+                                        <p:attrNameLst>
+                                          <p:attrName>style.visibility</p:attrName>
+                                        </p:attrNameLst>
+                                      </p:cBhvr>
+                                      <p:to>
+                                        <p:strVal val="visible"/>
+                                      </p:to>
+                                    </p:set>
+                                    <p:animEffect transition="in" filter="blinds(horizontal)">
+                                      <p:cBhvr>
+                                        <p:cTn id="70" dur="500"/>
+                                        <p:tgtEl>
+                                          <p:spTgt spid="21"/>
+                                        </p:tgtEl>
+                                      </p:cBhvr>
+                                    </p:animEffect>
+                                  </p:childTnLst>
+                                </p:cTn>
+                              </p:par>
+                            </p:childTnLst>
+                          </p:cTn>
+                        </p:par>
+                      </p:childTnLst>
+                    </p:cTn>
+                  </p:par>
+                </p:childTnLst>
+              </p:cTn>
+              <p:prevCondLst>
+                <p:cond evt="onPrev" delay="0">
+                  <p:tgtEl>
+                    <p:sldTgt/>
+                  </p:tgtEl>
+                </p:cond>
+              </p:prevCondLst>
+              <p:nextCondLst>
+                <p:cond evt="onNext" delay="0">
+                  <p:tgtEl>
+                    <p:sldTgt/>
+                  </p:tgtEl>
+                </p:cond>
+              </p:nextCondLst>
+            </p:seq>
+          </p:childTnLst>
+        </p:cTn>
+      </p:par>
+    </p:tnLst>
+    <p:bldLst>
+      <p:bldP spid="11" grpId="0" uiExpand="1" build="p"/>
+    </p:bldLst>
+  </p:timing>
 </p:sld>
 </file>
 
@@ -29717,13 +31038,312 @@
     </p:spTree>
     <p:extLst>
       <p:ext uri="{BB962C8B-B14F-4D97-AF65-F5344CB8AC3E}">
-        <p14:creationId xmlns:p14="http://schemas.microsoft.com/office/powerpoint/2010/main" val="2925006958"/>
+        <p14:creationId xmlns:p14="http://schemas.microsoft.com/office/powerpoint/2010/main" xmlns="" val="2925006958"/>
       </p:ext>
     </p:extLst>
   </p:cSld>
   <p:clrMapOvr>
     <a:masterClrMapping/>
   </p:clrMapOvr>
+  <p:timing>
+    <p:tnLst>
+      <p:par>
+        <p:cTn id="1" dur="indefinite" restart="never" nodeType="tmRoot">
+          <p:childTnLst>
+            <p:seq concurrent="1" nextAc="seek">
+              <p:cTn id="2" dur="indefinite" nodeType="mainSeq">
+                <p:childTnLst>
+                  <p:par>
+                    <p:cTn id="3" fill="hold">
+                      <p:stCondLst>
+                        <p:cond delay="indefinite"/>
+                      </p:stCondLst>
+                      <p:childTnLst>
+                        <p:par>
+                          <p:cTn id="4" fill="hold">
+                            <p:stCondLst>
+                              <p:cond delay="0"/>
+                            </p:stCondLst>
+                            <p:childTnLst>
+                              <p:par>
+                                <p:cTn id="5" presetID="3" presetClass="entr" presetSubtype="10" fill="hold" nodeType="clickEffect">
+                                  <p:stCondLst>
+                                    <p:cond delay="0"/>
+                                  </p:stCondLst>
+                                  <p:childTnLst>
+                                    <p:set>
+                                      <p:cBhvr>
+                                        <p:cTn id="6" dur="1" fill="hold">
+                                          <p:stCondLst>
+                                            <p:cond delay="0"/>
+                                          </p:stCondLst>
+                                        </p:cTn>
+                                        <p:tgtEl>
+                                          <p:spTgt spid="11">
+                                            <p:txEl>
+                                              <p:pRg st="2" end="2"/>
+                                            </p:txEl>
+                                          </p:spTgt>
+                                        </p:tgtEl>
+                                        <p:attrNameLst>
+                                          <p:attrName>style.visibility</p:attrName>
+                                        </p:attrNameLst>
+                                      </p:cBhvr>
+                                      <p:to>
+                                        <p:strVal val="visible"/>
+                                      </p:to>
+                                    </p:set>
+                                    <p:animEffect transition="in" filter="blinds(horizontal)">
+                                      <p:cBhvr>
+                                        <p:cTn id="7" dur="500"/>
+                                        <p:tgtEl>
+                                          <p:spTgt spid="11">
+                                            <p:txEl>
+                                              <p:pRg st="2" end="2"/>
+                                            </p:txEl>
+                                          </p:spTgt>
+                                        </p:tgtEl>
+                                      </p:cBhvr>
+                                    </p:animEffect>
+                                  </p:childTnLst>
+                                </p:cTn>
+                              </p:par>
+                              <p:par>
+                                <p:cTn id="8" presetID="3" presetClass="entr" presetSubtype="10" fill="hold" nodeType="withEffect">
+                                  <p:stCondLst>
+                                    <p:cond delay="0"/>
+                                  </p:stCondLst>
+                                  <p:childTnLst>
+                                    <p:set>
+                                      <p:cBhvr>
+                                        <p:cTn id="9" dur="1" fill="hold">
+                                          <p:stCondLst>
+                                            <p:cond delay="0"/>
+                                          </p:stCondLst>
+                                        </p:cTn>
+                                        <p:tgtEl>
+                                          <p:spTgt spid="11">
+                                            <p:txEl>
+                                              <p:pRg st="3" end="3"/>
+                                            </p:txEl>
+                                          </p:spTgt>
+                                        </p:tgtEl>
+                                        <p:attrNameLst>
+                                          <p:attrName>style.visibility</p:attrName>
+                                        </p:attrNameLst>
+                                      </p:cBhvr>
+                                      <p:to>
+                                        <p:strVal val="visible"/>
+                                      </p:to>
+                                    </p:set>
+                                    <p:animEffect transition="in" filter="blinds(horizontal)">
+                                      <p:cBhvr>
+                                        <p:cTn id="10" dur="500"/>
+                                        <p:tgtEl>
+                                          <p:spTgt spid="11">
+                                            <p:txEl>
+                                              <p:pRg st="3" end="3"/>
+                                            </p:txEl>
+                                          </p:spTgt>
+                                        </p:tgtEl>
+                                      </p:cBhvr>
+                                    </p:animEffect>
+                                  </p:childTnLst>
+                                </p:cTn>
+                              </p:par>
+                            </p:childTnLst>
+                          </p:cTn>
+                        </p:par>
+                      </p:childTnLst>
+                    </p:cTn>
+                  </p:par>
+                  <p:par>
+                    <p:cTn id="11" fill="hold">
+                      <p:stCondLst>
+                        <p:cond delay="indefinite"/>
+                      </p:stCondLst>
+                      <p:childTnLst>
+                        <p:par>
+                          <p:cTn id="12" fill="hold">
+                            <p:stCondLst>
+                              <p:cond delay="0"/>
+                            </p:stCondLst>
+                            <p:childTnLst>
+                              <p:par>
+                                <p:cTn id="13" presetID="3" presetClass="entr" presetSubtype="10" fill="hold" nodeType="clickEffect">
+                                  <p:stCondLst>
+                                    <p:cond delay="0"/>
+                                  </p:stCondLst>
+                                  <p:childTnLst>
+                                    <p:set>
+                                      <p:cBhvr>
+                                        <p:cTn id="14" dur="1" fill="hold">
+                                          <p:stCondLst>
+                                            <p:cond delay="0"/>
+                                          </p:stCondLst>
+                                        </p:cTn>
+                                        <p:tgtEl>
+                                          <p:spTgt spid="11">
+                                            <p:txEl>
+                                              <p:pRg st="4" end="4"/>
+                                            </p:txEl>
+                                          </p:spTgt>
+                                        </p:tgtEl>
+                                        <p:attrNameLst>
+                                          <p:attrName>style.visibility</p:attrName>
+                                        </p:attrNameLst>
+                                      </p:cBhvr>
+                                      <p:to>
+                                        <p:strVal val="visible"/>
+                                      </p:to>
+                                    </p:set>
+                                    <p:animEffect transition="in" filter="blinds(horizontal)">
+                                      <p:cBhvr>
+                                        <p:cTn id="15" dur="500"/>
+                                        <p:tgtEl>
+                                          <p:spTgt spid="11">
+                                            <p:txEl>
+                                              <p:pRg st="4" end="4"/>
+                                            </p:txEl>
+                                          </p:spTgt>
+                                        </p:tgtEl>
+                                      </p:cBhvr>
+                                    </p:animEffect>
+                                  </p:childTnLst>
+                                </p:cTn>
+                              </p:par>
+                              <p:par>
+                                <p:cTn id="16" presetID="3" presetClass="entr" presetSubtype="10" fill="hold" nodeType="withEffect">
+                                  <p:stCondLst>
+                                    <p:cond delay="0"/>
+                                  </p:stCondLst>
+                                  <p:childTnLst>
+                                    <p:set>
+                                      <p:cBhvr>
+                                        <p:cTn id="17" dur="1" fill="hold">
+                                          <p:stCondLst>
+                                            <p:cond delay="0"/>
+                                          </p:stCondLst>
+                                        </p:cTn>
+                                        <p:tgtEl>
+                                          <p:spTgt spid="11">
+                                            <p:txEl>
+                                              <p:pRg st="5" end="5"/>
+                                            </p:txEl>
+                                          </p:spTgt>
+                                        </p:tgtEl>
+                                        <p:attrNameLst>
+                                          <p:attrName>style.visibility</p:attrName>
+                                        </p:attrNameLst>
+                                      </p:cBhvr>
+                                      <p:to>
+                                        <p:strVal val="visible"/>
+                                      </p:to>
+                                    </p:set>
+                                    <p:animEffect transition="in" filter="blinds(horizontal)">
+                                      <p:cBhvr>
+                                        <p:cTn id="18" dur="500"/>
+                                        <p:tgtEl>
+                                          <p:spTgt spid="11">
+                                            <p:txEl>
+                                              <p:pRg st="5" end="5"/>
+                                            </p:txEl>
+                                          </p:spTgt>
+                                        </p:tgtEl>
+                                      </p:cBhvr>
+                                    </p:animEffect>
+                                  </p:childTnLst>
+                                </p:cTn>
+                              </p:par>
+                            </p:childTnLst>
+                          </p:cTn>
+                        </p:par>
+                      </p:childTnLst>
+                    </p:cTn>
+                  </p:par>
+                  <p:par>
+                    <p:cTn id="19" fill="hold">
+                      <p:stCondLst>
+                        <p:cond delay="indefinite"/>
+                      </p:stCondLst>
+                      <p:childTnLst>
+                        <p:par>
+                          <p:cTn id="20" fill="hold">
+                            <p:stCondLst>
+                              <p:cond delay="0"/>
+                            </p:stCondLst>
+                            <p:childTnLst>
+                              <p:par>
+                                <p:cTn id="21" presetID="3" presetClass="entr" presetSubtype="10" fill="hold" nodeType="clickEffect">
+                                  <p:stCondLst>
+                                    <p:cond delay="0"/>
+                                  </p:stCondLst>
+                                  <p:childTnLst>
+                                    <p:set>
+                                      <p:cBhvr>
+                                        <p:cTn id="22" dur="1" fill="hold">
+                                          <p:stCondLst>
+                                            <p:cond delay="0"/>
+                                          </p:stCondLst>
+                                        </p:cTn>
+                                        <p:tgtEl>
+                                          <p:spTgt spid="11">
+                                            <p:txEl>
+                                              <p:pRg st="6" end="6"/>
+                                            </p:txEl>
+                                          </p:spTgt>
+                                        </p:tgtEl>
+                                        <p:attrNameLst>
+                                          <p:attrName>style.visibility</p:attrName>
+                                        </p:attrNameLst>
+                                      </p:cBhvr>
+                                      <p:to>
+                                        <p:strVal val="visible"/>
+                                      </p:to>
+                                    </p:set>
+                                    <p:animEffect transition="in" filter="blinds(horizontal)">
+                                      <p:cBhvr>
+                                        <p:cTn id="23" dur="500"/>
+                                        <p:tgtEl>
+                                          <p:spTgt spid="11">
+                                            <p:txEl>
+                                              <p:pRg st="6" end="6"/>
+                                            </p:txEl>
+                                          </p:spTgt>
+                                        </p:tgtEl>
+                                      </p:cBhvr>
+                                    </p:animEffect>
+                                  </p:childTnLst>
+                                </p:cTn>
+                              </p:par>
+                            </p:childTnLst>
+                          </p:cTn>
+                        </p:par>
+                      </p:childTnLst>
+                    </p:cTn>
+                  </p:par>
+                </p:childTnLst>
+              </p:cTn>
+              <p:prevCondLst>
+                <p:cond evt="onPrev" delay="0">
+                  <p:tgtEl>
+                    <p:sldTgt/>
+                  </p:tgtEl>
+                </p:cond>
+              </p:prevCondLst>
+              <p:nextCondLst>
+                <p:cond evt="onNext" delay="0">
+                  <p:tgtEl>
+                    <p:sldTgt/>
+                  </p:tgtEl>
+                </p:cond>
+              </p:nextCondLst>
+            </p:seq>
+          </p:childTnLst>
+        </p:cTn>
+      </p:par>
+    </p:tnLst>
+  </p:timing>
 </p:sld>
 </file>
 
@@ -29982,7 +31602,7 @@
   <a:extraClrSchemeLst/>
   <a:extLst>
     <a:ext uri="{05A4C25C-085E-4340-85A3-A5531E510DB2}">
-      <thm15:themeFamily xmlns:thm15="http://schemas.microsoft.com/office/thememl/2012/main" name="Office Theme" id="{62F939B6-93AF-4DB8-9C6B-D6C7DFDC589F}" vid="{4A3C46E8-61CC-4603-A589-7422A47A8E4A}"/>
+      <thm15:themeFamily xmlns:thm15="http://schemas.microsoft.com/office/thememl/2012/main" xmlns="" name="Office Theme" id="{62F939B6-93AF-4DB8-9C6B-D6C7DFDC589F}" vid="{4A3C46E8-61CC-4603-A589-7422A47A8E4A}"/>
     </a:ext>
   </a:extLst>
 </a:theme>
@@ -30243,7 +31863,7 @@
   <a:extraClrSchemeLst/>
   <a:extLst>
     <a:ext uri="{05A4C25C-085E-4340-85A3-A5531E510DB2}">
-      <thm15:themeFamily xmlns:thm15="http://schemas.microsoft.com/office/thememl/2012/main" name="Office Theme" id="{62F939B6-93AF-4DB8-9C6B-D6C7DFDC589F}" vid="{4A3C46E8-61CC-4603-A589-7422A47A8E4A}"/>
+      <thm15:themeFamily xmlns:thm15="http://schemas.microsoft.com/office/thememl/2012/main" xmlns="" name="Office Theme" id="{62F939B6-93AF-4DB8-9C6B-D6C7DFDC589F}" vid="{4A3C46E8-61CC-4603-A589-7422A47A8E4A}"/>
     </a:ext>
   </a:extLst>
 </a:theme>
@@ -30504,7 +32124,7 @@
   <a:extraClrSchemeLst/>
   <a:extLst>
     <a:ext uri="{05A4C25C-085E-4340-85A3-A5531E510DB2}">
-      <thm15:themeFamily xmlns:thm15="http://schemas.microsoft.com/office/thememl/2012/main" name="Office Theme" id="{62F939B6-93AF-4DB8-9C6B-D6C7DFDC589F}" vid="{4A3C46E8-61CC-4603-A589-7422A47A8E4A}"/>
+      <thm15:themeFamily xmlns:thm15="http://schemas.microsoft.com/office/thememl/2012/main" xmlns="" name="Office Theme" id="{62F939B6-93AF-4DB8-9C6B-D6C7DFDC589F}" vid="{4A3C46E8-61CC-4603-A589-7422A47A8E4A}"/>
     </a:ext>
   </a:extLst>
 </a:theme>
@@ -30553,7 +32173,7 @@
     </a:clrScheme>
     <a:fontScheme name="Office">
       <a:majorFont>
-        <a:latin typeface="Calibri Light" panose="020F0302020204030204"/>
+        <a:latin typeface="Calibri Light"/>
         <a:ea typeface=""/>
         <a:cs typeface=""/>
         <a:font script="Jpan" typeface="游ゴシック Light"/>
@@ -30605,7 +32225,7 @@
         <a:font script="Tfng" typeface="Ebrima"/>
       </a:majorFont>
       <a:minorFont>
-        <a:latin typeface="Calibri" panose="020F0502020204030204"/>
+        <a:latin typeface="Calibri"/>
         <a:ea typeface=""/>
         <a:cs typeface=""/>
         <a:font script="Jpan" typeface="游ゴシック"/>
@@ -30799,7 +32419,7 @@
   <a:extraClrSchemeLst/>
   <a:extLst>
     <a:ext uri="{05A4C25C-085E-4340-85A3-A5531E510DB2}">
-      <thm15:themeFamily xmlns:thm15="http://schemas.microsoft.com/office/thememl/2012/main" name="Office Theme" id="{62F939B6-93AF-4DB8-9C6B-D6C7DFDC589F}" vid="{4A3C46E8-61CC-4603-A589-7422A47A8E4A}"/>
+      <thm15:themeFamily xmlns:thm15="http://schemas.microsoft.com/office/thememl/2012/main" xmlns="" name="Office Theme" id="{62F939B6-93AF-4DB8-9C6B-D6C7DFDC589F}" vid="{4A3C46E8-61CC-4603-A589-7422A47A8E4A}"/>
     </a:ext>
   </a:extLst>
 </a:theme>

</xml_diff>

<commit_message>
some work on scheduling
</commit_message>
<xml_diff>
--- a/Päsi/Seminar Betriebssysteme.pptx
+++ b/Päsi/Seminar Betriebssysteme.pptx
@@ -6,10 +6,10 @@
     <p:sldMasterId id="2147483660" r:id="rId2"/>
   </p:sldMasterIdLst>
   <p:notesMasterIdLst>
-    <p:notesMasterId r:id="rId28"/>
+    <p:notesMasterId r:id="rId27"/>
   </p:notesMasterIdLst>
   <p:handoutMasterIdLst>
-    <p:handoutMasterId r:id="rId29"/>
+    <p:handoutMasterId r:id="rId28"/>
   </p:handoutMasterIdLst>
   <p:sldIdLst>
     <p:sldId id="256" r:id="rId3"/>
@@ -31,12 +31,11 @@
     <p:sldId id="276" r:id="rId19"/>
     <p:sldId id="279" r:id="rId20"/>
     <p:sldId id="280" r:id="rId21"/>
-    <p:sldId id="281" r:id="rId22"/>
-    <p:sldId id="282" r:id="rId23"/>
-    <p:sldId id="292" r:id="rId24"/>
-    <p:sldId id="293" r:id="rId25"/>
-    <p:sldId id="295" r:id="rId26"/>
-    <p:sldId id="294" r:id="rId27"/>
+    <p:sldId id="282" r:id="rId22"/>
+    <p:sldId id="292" r:id="rId23"/>
+    <p:sldId id="293" r:id="rId24"/>
+    <p:sldId id="295" r:id="rId25"/>
+    <p:sldId id="294" r:id="rId26"/>
   </p:sldIdLst>
   <p:sldSz cx="12192000" cy="6858000"/>
   <p:notesSz cx="6797675" cy="9926638"/>
@@ -256,7 +255,7 @@
             <a:fld id="{4F336489-14E1-462A-B32E-B31B9D8DDB1E}" type="datetimeFigureOut">
               <a:rPr lang="de-DE" smtClean="0"/>
               <a:pPr/>
-              <a:t>01.07.2017</a:t>
+              <a:t>02.07.2017</a:t>
             </a:fld>
             <a:endParaRPr lang="de-DE"/>
           </a:p>
@@ -435,7 +434,7 @@
             <a:fld id="{28A20BDF-6A46-49EA-BE7C-D2960091BE3F}" type="datetimeFigureOut">
               <a:rPr lang="de-DE" smtClean="0"/>
               <a:pPr/>
-              <a:t>01.07.2017</a:t>
+              <a:t>02.07.2017</a:t>
             </a:fld>
             <a:endParaRPr lang="de-DE"/>
           </a:p>
@@ -7538,7 +7537,7 @@
 </file>
 
 <file path=ppt/slides/slide10.xml><?xml version="1.0" encoding="utf-8"?>
-<p:sld xmlns:a="http://schemas.openxmlformats.org/drawingml/2006/main" xmlns:r="http://schemas.openxmlformats.org/officeDocument/2006/relationships" xmlns:p="http://schemas.openxmlformats.org/presentationml/2006/main">
+<p:sld xmlns:a="http://schemas.openxmlformats.org/drawingml/2006/main" xmlns:r="http://schemas.openxmlformats.org/officeDocument/2006/relationships" xmlns:p="http://schemas.openxmlformats.org/presentationml/2006/main" show="0">
   <p:cSld>
     <p:spTree>
       <p:nvGrpSpPr>
@@ -7956,7 +7955,7 @@
 </file>
 
 <file path=ppt/slides/slide11.xml><?xml version="1.0" encoding="utf-8"?>
-<p:sld xmlns:a="http://schemas.openxmlformats.org/drawingml/2006/main" xmlns:r="http://schemas.openxmlformats.org/officeDocument/2006/relationships" xmlns:p="http://schemas.openxmlformats.org/presentationml/2006/main">
+<p:sld xmlns:a="http://schemas.openxmlformats.org/drawingml/2006/main" xmlns:r="http://schemas.openxmlformats.org/officeDocument/2006/relationships" xmlns:p="http://schemas.openxmlformats.org/presentationml/2006/main" show="0">
   <p:cSld>
     <p:spTree>
       <p:nvGrpSpPr>
@@ -9830,6 +9829,9 @@
         </p:txBody>
       </p:sp>
     </p:spTree>
+    <p:custDataLst>
+      <p:tags r:id="rId1"/>
+    </p:custDataLst>
     <p:extLst>
       <p:ext uri="{BB962C8B-B14F-4D97-AF65-F5344CB8AC3E}">
         <p14:creationId xmlns:p14="http://schemas.microsoft.com/office/powerpoint/2010/main" val="3444159518"/>
@@ -10338,8 +10340,8 @@
         </p:nvSpPr>
         <p:spPr>
           <a:xfrm rot="16200000">
-            <a:off x="-600584" y="3560022"/>
-            <a:ext cx="3474455" cy="523220"/>
+            <a:off x="-369109" y="3609843"/>
+            <a:ext cx="3574097" cy="523220"/>
           </a:xfrm>
           <a:prstGeom prst="rect">
             <a:avLst/>
@@ -10364,7 +10366,7 @@
                   </a:outerShdw>
                 </a:effectLst>
               </a:rPr>
-              <a:t>uHeap</a:t>
+              <a:t>ucHeap</a:t>
             </a:r>
             <a:r>
               <a:rPr lang="de-DE" sz="2800" dirty="0">
@@ -10408,173 +10410,201 @@
           </a:p>
         </p:txBody>
       </p:sp>
-      <p:sp>
-        <p:nvSpPr>
-          <p:cNvPr id="17" name="Rechteck 16">
+      <p:grpSp>
+        <p:nvGrpSpPr>
+          <p:cNvPr id="8" name="Gruppieren 7">
             <a:extLst>
               <a:ext uri="{FF2B5EF4-FFF2-40B4-BE49-F238E27FC236}">
-                <a16:creationId xmlns:a16="http://schemas.microsoft.com/office/drawing/2014/main" id="{D13F363D-59AE-415D-9A9E-BCF8093C6D7E}"/>
+                <a16:creationId xmlns:a16="http://schemas.microsoft.com/office/drawing/2014/main" id="{5D72CC4B-574F-4332-B8BB-78197CFA5CB2}"/>
               </a:ext>
             </a:extLst>
           </p:cNvPr>
-          <p:cNvSpPr/>
+          <p:cNvGrpSpPr/>
           <p:nvPr/>
-        </p:nvSpPr>
-        <p:spPr>
+        </p:nvGrpSpPr>
+        <p:grpSpPr>
           <a:xfrm>
-            <a:off x="5580211" y="2091776"/>
-            <a:ext cx="1872149" cy="3566726"/>
+            <a:off x="5580211" y="2084405"/>
+            <a:ext cx="5802483" cy="3574097"/>
+            <a:chOff x="5580211" y="2084405"/>
+            <a:chExt cx="5802483" cy="3574097"/>
           </a:xfrm>
-          <a:prstGeom prst="rect">
-            <a:avLst/>
-          </a:prstGeom>
-        </p:spPr>
-        <p:style>
-          <a:lnRef idx="2">
-            <a:schemeClr val="accent4">
-              <a:shade val="50000"/>
-            </a:schemeClr>
-          </a:lnRef>
-          <a:fillRef idx="1">
-            <a:schemeClr val="accent4"/>
-          </a:fillRef>
-          <a:effectRef idx="0">
-            <a:schemeClr val="accent4"/>
-          </a:effectRef>
-          <a:fontRef idx="minor">
-            <a:schemeClr val="lt1"/>
-          </a:fontRef>
-        </p:style>
-        <p:txBody>
-          <a:bodyPr rtlCol="0" anchor="ctr"/>
-          <a:lstStyle/>
-          <a:p>
-            <a:pPr algn="ctr"/>
-            <a:endParaRPr lang="de-DE" sz="2800" dirty="0"/>
-          </a:p>
-        </p:txBody>
-      </p:sp>
-      <p:sp>
-        <p:nvSpPr>
-          <p:cNvPr id="18" name="Textfeld 17">
-            <a:extLst>
-              <a:ext uri="{FF2B5EF4-FFF2-40B4-BE49-F238E27FC236}">
-                <a16:creationId xmlns:a16="http://schemas.microsoft.com/office/drawing/2014/main" id="{678756D6-B56D-4EF2-9DE1-6E72F551D96E}"/>
-              </a:ext>
-            </a:extLst>
-          </p:cNvPr>
-          <p:cNvSpPr txBox="1"/>
-          <p:nvPr/>
-        </p:nvSpPr>
-        <p:spPr>
-          <a:xfrm rot="16200000">
-            <a:off x="4927645" y="3609843"/>
-            <a:ext cx="3177280" cy="523220"/>
-          </a:xfrm>
-          <a:prstGeom prst="rect">
-            <a:avLst/>
-          </a:prstGeom>
-          <a:noFill/>
-        </p:spPr>
-        <p:txBody>
-          <a:bodyPr wrap="none" rtlCol="0">
-            <a:spAutoFit/>
-          </a:bodyPr>
-          <a:lstStyle/>
-          <a:p>
-            <a:pPr algn="ctr"/>
-            <a:r>
-              <a:rPr lang="de-DE" sz="2800" dirty="0"/>
-              <a:t>Speicheralgorithmus</a:t>
-            </a:r>
-          </a:p>
-        </p:txBody>
-      </p:sp>
-      <p:sp>
-        <p:nvSpPr>
-          <p:cNvPr id="16" name="Rechteck 15">
-            <a:extLst>
-              <a:ext uri="{FF2B5EF4-FFF2-40B4-BE49-F238E27FC236}">
-                <a16:creationId xmlns:a16="http://schemas.microsoft.com/office/drawing/2014/main" id="{8D4D5FC0-6002-4CA3-9779-A96C43486676}"/>
-              </a:ext>
-            </a:extLst>
-          </p:cNvPr>
-          <p:cNvSpPr/>
-          <p:nvPr/>
-        </p:nvSpPr>
-        <p:spPr>
-          <a:xfrm>
-            <a:off x="9510545" y="2084405"/>
-            <a:ext cx="1872149" cy="3574097"/>
-          </a:xfrm>
-          <a:prstGeom prst="rect">
-            <a:avLst/>
-          </a:prstGeom>
-        </p:spPr>
-        <p:style>
-          <a:lnRef idx="2">
-            <a:schemeClr val="accent4">
-              <a:shade val="50000"/>
-            </a:schemeClr>
-          </a:lnRef>
-          <a:fillRef idx="1">
-            <a:schemeClr val="accent4"/>
-          </a:fillRef>
-          <a:effectRef idx="0">
-            <a:schemeClr val="accent4"/>
-          </a:effectRef>
-          <a:fontRef idx="minor">
-            <a:schemeClr val="lt1"/>
-          </a:fontRef>
-        </p:style>
-        <p:txBody>
-          <a:bodyPr rtlCol="0" anchor="ctr"/>
-          <a:lstStyle/>
-          <a:p>
-            <a:pPr algn="ctr"/>
-            <a:endParaRPr lang="de-DE" sz="2800" dirty="0"/>
-          </a:p>
-        </p:txBody>
-      </p:sp>
-      <p:sp>
-        <p:nvSpPr>
-          <p:cNvPr id="19" name="Textfeld 18">
-            <a:extLst>
-              <a:ext uri="{FF2B5EF4-FFF2-40B4-BE49-F238E27FC236}">
-                <a16:creationId xmlns:a16="http://schemas.microsoft.com/office/drawing/2014/main" id="{387F2AD1-1CB1-42CD-82DF-027DDFC38308}"/>
-              </a:ext>
-            </a:extLst>
-          </p:cNvPr>
-          <p:cNvSpPr txBox="1"/>
-          <p:nvPr/>
-        </p:nvSpPr>
-        <p:spPr>
-          <a:xfrm rot="16200000">
-            <a:off x="9371261" y="3560021"/>
-            <a:ext cx="2150717" cy="523220"/>
-          </a:xfrm>
-          <a:prstGeom prst="rect">
-            <a:avLst/>
-          </a:prstGeom>
-          <a:noFill/>
-        </p:spPr>
-        <p:txBody>
-          <a:bodyPr wrap="none" rtlCol="0">
-            <a:spAutoFit/>
-          </a:bodyPr>
-          <a:lstStyle/>
-          <a:p>
-            <a:r>
-              <a:rPr lang="de-DE" sz="2800" dirty="0" err="1"/>
-              <a:t>FreeRTOS</a:t>
-            </a:r>
-            <a:r>
-              <a:rPr lang="de-DE" sz="2800" dirty="0"/>
-              <a:t> API</a:t>
-            </a:r>
-          </a:p>
-        </p:txBody>
-      </p:sp>
+        </p:grpSpPr>
+        <p:sp>
+          <p:nvSpPr>
+            <p:cNvPr id="17" name="Rechteck 16">
+              <a:extLst>
+                <a:ext uri="{FF2B5EF4-FFF2-40B4-BE49-F238E27FC236}">
+                  <a16:creationId xmlns:a16="http://schemas.microsoft.com/office/drawing/2014/main" id="{D13F363D-59AE-415D-9A9E-BCF8093C6D7E}"/>
+                </a:ext>
+              </a:extLst>
+            </p:cNvPr>
+            <p:cNvSpPr/>
+            <p:nvPr/>
+          </p:nvSpPr>
+          <p:spPr>
+            <a:xfrm>
+              <a:off x="5580211" y="2091776"/>
+              <a:ext cx="1872149" cy="3566726"/>
+            </a:xfrm>
+            <a:prstGeom prst="rect">
+              <a:avLst/>
+            </a:prstGeom>
+          </p:spPr>
+          <p:style>
+            <a:lnRef idx="2">
+              <a:schemeClr val="accent4">
+                <a:shade val="50000"/>
+              </a:schemeClr>
+            </a:lnRef>
+            <a:fillRef idx="1">
+              <a:schemeClr val="accent4"/>
+            </a:fillRef>
+            <a:effectRef idx="0">
+              <a:schemeClr val="accent4"/>
+            </a:effectRef>
+            <a:fontRef idx="minor">
+              <a:schemeClr val="lt1"/>
+            </a:fontRef>
+          </p:style>
+          <p:txBody>
+            <a:bodyPr rtlCol="0" anchor="ctr"/>
+            <a:lstStyle/>
+            <a:p>
+              <a:pPr algn="ctr"/>
+              <a:endParaRPr lang="de-DE" sz="2800" dirty="0"/>
+            </a:p>
+          </p:txBody>
+        </p:sp>
+        <p:sp>
+          <p:nvSpPr>
+            <p:cNvPr id="18" name="Textfeld 17">
+              <a:extLst>
+                <a:ext uri="{FF2B5EF4-FFF2-40B4-BE49-F238E27FC236}">
+                  <a16:creationId xmlns:a16="http://schemas.microsoft.com/office/drawing/2014/main" id="{678756D6-B56D-4EF2-9DE1-6E72F551D96E}"/>
+                </a:ext>
+              </a:extLst>
+            </p:cNvPr>
+            <p:cNvSpPr txBox="1"/>
+            <p:nvPr/>
+          </p:nvSpPr>
+          <p:spPr>
+            <a:xfrm rot="16200000">
+              <a:off x="4927645" y="3394400"/>
+              <a:ext cx="3177280" cy="954107"/>
+            </a:xfrm>
+            <a:prstGeom prst="rect">
+              <a:avLst/>
+            </a:prstGeom>
+            <a:noFill/>
+          </p:spPr>
+          <p:txBody>
+            <a:bodyPr wrap="none" rtlCol="0">
+              <a:spAutoFit/>
+            </a:bodyPr>
+            <a:lstStyle/>
+            <a:p>
+              <a:pPr algn="ctr"/>
+              <a:r>
+                <a:rPr lang="de-DE" sz="2800" dirty="0"/>
+                <a:t>Speicheralgorithmus</a:t>
+              </a:r>
+            </a:p>
+            <a:p>
+              <a:pPr algn="ctr"/>
+              <a:r>
+                <a:rPr lang="de-DE" sz="2800" dirty="0"/>
+                <a:t>z.B. Heap 1 – Heap 5</a:t>
+              </a:r>
+            </a:p>
+          </p:txBody>
+        </p:sp>
+        <p:sp>
+          <p:nvSpPr>
+            <p:cNvPr id="16" name="Rechteck 15">
+              <a:extLst>
+                <a:ext uri="{FF2B5EF4-FFF2-40B4-BE49-F238E27FC236}">
+                  <a16:creationId xmlns:a16="http://schemas.microsoft.com/office/drawing/2014/main" id="{8D4D5FC0-6002-4CA3-9779-A96C43486676}"/>
+                </a:ext>
+              </a:extLst>
+            </p:cNvPr>
+            <p:cNvSpPr/>
+            <p:nvPr/>
+          </p:nvSpPr>
+          <p:spPr>
+            <a:xfrm>
+              <a:off x="9510545" y="2084405"/>
+              <a:ext cx="1872149" cy="3574097"/>
+            </a:xfrm>
+            <a:prstGeom prst="rect">
+              <a:avLst/>
+            </a:prstGeom>
+          </p:spPr>
+          <p:style>
+            <a:lnRef idx="2">
+              <a:schemeClr val="accent4">
+                <a:shade val="50000"/>
+              </a:schemeClr>
+            </a:lnRef>
+            <a:fillRef idx="1">
+              <a:schemeClr val="accent4"/>
+            </a:fillRef>
+            <a:effectRef idx="0">
+              <a:schemeClr val="accent4"/>
+            </a:effectRef>
+            <a:fontRef idx="minor">
+              <a:schemeClr val="lt1"/>
+            </a:fontRef>
+          </p:style>
+          <p:txBody>
+            <a:bodyPr rtlCol="0" anchor="ctr"/>
+            <a:lstStyle/>
+            <a:p>
+              <a:pPr algn="ctr"/>
+              <a:endParaRPr lang="de-DE" sz="2800" dirty="0"/>
+            </a:p>
+          </p:txBody>
+        </p:sp>
+        <p:sp>
+          <p:nvSpPr>
+            <p:cNvPr id="19" name="Textfeld 18">
+              <a:extLst>
+                <a:ext uri="{FF2B5EF4-FFF2-40B4-BE49-F238E27FC236}">
+                  <a16:creationId xmlns:a16="http://schemas.microsoft.com/office/drawing/2014/main" id="{387F2AD1-1CB1-42CD-82DF-027DDFC38308}"/>
+                </a:ext>
+              </a:extLst>
+            </p:cNvPr>
+            <p:cNvSpPr txBox="1"/>
+            <p:nvPr/>
+          </p:nvSpPr>
+          <p:spPr>
+            <a:xfrm rot="16200000">
+              <a:off x="9371261" y="3560021"/>
+              <a:ext cx="2150717" cy="523220"/>
+            </a:xfrm>
+            <a:prstGeom prst="rect">
+              <a:avLst/>
+            </a:prstGeom>
+            <a:noFill/>
+          </p:spPr>
+          <p:txBody>
+            <a:bodyPr wrap="none" rtlCol="0">
+              <a:spAutoFit/>
+            </a:bodyPr>
+            <a:lstStyle/>
+            <a:p>
+              <a:r>
+                <a:rPr lang="de-DE" sz="2800" dirty="0" err="1"/>
+                <a:t>FreeRTOS</a:t>
+              </a:r>
+              <a:r>
+                <a:rPr lang="de-DE" sz="2800" dirty="0"/>
+                <a:t> API</a:t>
+              </a:r>
+            </a:p>
+          </p:txBody>
+        </p:sp>
+      </p:grpSp>
       <p:grpSp>
         <p:nvGrpSpPr>
           <p:cNvPr id="3" name="Stack2">
@@ -10589,7 +10619,7 @@
         </p:nvGrpSpPr>
         <p:grpSpPr>
           <a:xfrm>
-            <a:off x="1706150" y="2109821"/>
+            <a:off x="1725725" y="2134127"/>
             <a:ext cx="1188721" cy="3548681"/>
             <a:chOff x="3318830" y="2222252"/>
             <a:chExt cx="1188721" cy="3548681"/>
@@ -10962,10 +10992,10 @@
       </p:grpSp>
       <p:grpSp>
         <p:nvGrpSpPr>
-          <p:cNvPr id="22" name="Stack1">
+          <p:cNvPr id="7" name="Stack 1">
             <a:extLst>
               <a:ext uri="{FF2B5EF4-FFF2-40B4-BE49-F238E27FC236}">
-                <a16:creationId xmlns:a16="http://schemas.microsoft.com/office/drawing/2014/main" id="{07C774FE-0421-461F-81FE-A9686F8EA1F6}"/>
+                <a16:creationId xmlns:a16="http://schemas.microsoft.com/office/drawing/2014/main" id="{396E6619-BDA8-4983-B636-BC38CF2DA7D0}"/>
               </a:ext>
             </a:extLst>
           </p:cNvPr>
@@ -10974,124 +11004,320 @@
         </p:nvGrpSpPr>
         <p:grpSpPr>
           <a:xfrm>
-            <a:off x="1706151" y="2112609"/>
+            <a:off x="1727784" y="2134127"/>
             <a:ext cx="1188721" cy="3548681"/>
-            <a:chOff x="1453896" y="2084404"/>
+            <a:chOff x="3755385" y="2282813"/>
             <a:chExt cx="1188721" cy="3548681"/>
           </a:xfrm>
         </p:grpSpPr>
-        <p:sp>
-          <p:nvSpPr>
-            <p:cNvPr id="24" name="Flussdiagramm: Dokument 23">
+        <p:grpSp>
+          <p:nvGrpSpPr>
+            <p:cNvPr id="6" name="Gruppieren 5">
               <a:extLst>
                 <a:ext uri="{FF2B5EF4-FFF2-40B4-BE49-F238E27FC236}">
-                  <a16:creationId xmlns:a16="http://schemas.microsoft.com/office/drawing/2014/main" id="{3B0254FD-1241-4D3F-A905-617890D9BDB7}"/>
+                  <a16:creationId xmlns:a16="http://schemas.microsoft.com/office/drawing/2014/main" id="{64A560FD-BDB8-40F0-ACBF-4FD4A96D5A79}"/>
                 </a:ext>
               </a:extLst>
             </p:cNvPr>
-            <p:cNvSpPr/>
+            <p:cNvGrpSpPr/>
             <p:nvPr/>
-          </p:nvSpPr>
-          <p:spPr>
+          </p:nvGrpSpPr>
+          <p:grpSpPr>
             <a:xfrm>
-              <a:off x="1453897" y="2084404"/>
-              <a:ext cx="1188720" cy="2041922"/>
+              <a:off x="3755385" y="2282813"/>
+              <a:ext cx="1188721" cy="3548681"/>
+              <a:chOff x="3755385" y="2282813"/>
+              <a:chExt cx="1188721" cy="3548681"/>
             </a:xfrm>
-            <a:prstGeom prst="flowChartDocument">
-              <a:avLst/>
-            </a:prstGeom>
-            <a:effectLst>
-              <a:outerShdw blurRad="63500" sx="102000" sy="102000" algn="ctr" rotWithShape="0">
-                <a:prstClr val="black">
-                  <a:alpha val="40000"/>
-                </a:prstClr>
-              </a:outerShdw>
-            </a:effectLst>
-          </p:spPr>
-          <p:style>
-            <a:lnRef idx="2">
-              <a:schemeClr val="accent1">
-                <a:shade val="50000"/>
-              </a:schemeClr>
-            </a:lnRef>
-            <a:fillRef idx="1">
-              <a:schemeClr val="accent1"/>
-            </a:fillRef>
-            <a:effectRef idx="0">
-              <a:schemeClr val="accent1"/>
-            </a:effectRef>
-            <a:fontRef idx="minor">
-              <a:schemeClr val="lt1"/>
-            </a:fontRef>
-          </p:style>
-          <p:txBody>
-            <a:bodyPr rtlCol="0" anchor="ctr"/>
-            <a:lstStyle/>
-            <a:p>
-              <a:pPr algn="ctr"/>
-              <a:endParaRPr lang="de-DE" sz="2800"/>
-            </a:p>
-          </p:txBody>
-        </p:sp>
+          </p:grpSpPr>
+          <p:sp>
+            <p:nvSpPr>
+              <p:cNvPr id="24" name="Flussdiagramm: Dokument 23">
+                <a:extLst>
+                  <a:ext uri="{FF2B5EF4-FFF2-40B4-BE49-F238E27FC236}">
+                    <a16:creationId xmlns:a16="http://schemas.microsoft.com/office/drawing/2014/main" id="{3B0254FD-1241-4D3F-A905-617890D9BDB7}"/>
+                  </a:ext>
+                </a:extLst>
+              </p:cNvPr>
+              <p:cNvSpPr/>
+              <p:nvPr/>
+            </p:nvSpPr>
+            <p:spPr>
+              <a:xfrm>
+                <a:off x="3755386" y="2282813"/>
+                <a:ext cx="1188720" cy="2041922"/>
+              </a:xfrm>
+              <a:prstGeom prst="flowChartDocument">
+                <a:avLst/>
+              </a:prstGeom>
+              <a:effectLst>
+                <a:outerShdw blurRad="63500" sx="102000" sy="102000" algn="ctr" rotWithShape="0">
+                  <a:prstClr val="black">
+                    <a:alpha val="40000"/>
+                  </a:prstClr>
+                </a:outerShdw>
+              </a:effectLst>
+            </p:spPr>
+            <p:style>
+              <a:lnRef idx="2">
+                <a:schemeClr val="accent1">
+                  <a:shade val="50000"/>
+                </a:schemeClr>
+              </a:lnRef>
+              <a:fillRef idx="1">
+                <a:schemeClr val="accent1"/>
+              </a:fillRef>
+              <a:effectRef idx="0">
+                <a:schemeClr val="accent1"/>
+              </a:effectRef>
+              <a:fontRef idx="minor">
+                <a:schemeClr val="lt1"/>
+              </a:fontRef>
+            </p:style>
+            <p:txBody>
+              <a:bodyPr rtlCol="0" anchor="ctr"/>
+              <a:lstStyle/>
+              <a:p>
+                <a:pPr algn="ctr"/>
+                <a:endParaRPr lang="de-DE" sz="2800"/>
+              </a:p>
+            </p:txBody>
+          </p:sp>
+          <p:sp>
+            <p:nvSpPr>
+              <p:cNvPr id="26" name="Flussdiagramm: Dokument 25">
+                <a:extLst>
+                  <a:ext uri="{FF2B5EF4-FFF2-40B4-BE49-F238E27FC236}">
+                    <a16:creationId xmlns:a16="http://schemas.microsoft.com/office/drawing/2014/main" id="{A541AAC5-F7A6-4D45-95FC-B3270014879A}"/>
+                  </a:ext>
+                </a:extLst>
+              </p:cNvPr>
+              <p:cNvSpPr/>
+              <p:nvPr/>
+            </p:nvSpPr>
+            <p:spPr>
+              <a:xfrm rot="10800000">
+                <a:off x="3755385" y="4249582"/>
+                <a:ext cx="1188720" cy="1581912"/>
+              </a:xfrm>
+              <a:prstGeom prst="flowChartDocument">
+                <a:avLst/>
+              </a:prstGeom>
+              <a:effectLst>
+                <a:outerShdw blurRad="63500" sx="102000" sy="102000" algn="ctr" rotWithShape="0">
+                  <a:prstClr val="black">
+                    <a:alpha val="40000"/>
+                  </a:prstClr>
+                </a:outerShdw>
+              </a:effectLst>
+            </p:spPr>
+            <p:style>
+              <a:lnRef idx="2">
+                <a:schemeClr val="accent1">
+                  <a:shade val="50000"/>
+                </a:schemeClr>
+              </a:lnRef>
+              <a:fillRef idx="1">
+                <a:schemeClr val="accent1"/>
+              </a:fillRef>
+              <a:effectRef idx="0">
+                <a:schemeClr val="accent1"/>
+              </a:effectRef>
+              <a:fontRef idx="minor">
+                <a:schemeClr val="lt1"/>
+              </a:fontRef>
+            </p:style>
+            <p:txBody>
+              <a:bodyPr rtlCol="0" anchor="ctr"/>
+              <a:lstStyle/>
+              <a:p>
+                <a:pPr algn="ctr"/>
+                <a:endParaRPr lang="de-DE" sz="2800" dirty="0"/>
+              </a:p>
+            </p:txBody>
+          </p:sp>
+          <p:sp>
+            <p:nvSpPr>
+              <p:cNvPr id="27" name="Textfeld 26">
+                <a:extLst>
+                  <a:ext uri="{FF2B5EF4-FFF2-40B4-BE49-F238E27FC236}">
+                    <a16:creationId xmlns:a16="http://schemas.microsoft.com/office/drawing/2014/main" id="{194F4F25-91D7-4DFB-B7A2-12497EDE933F}"/>
+                  </a:ext>
+                </a:extLst>
+              </p:cNvPr>
+              <p:cNvSpPr txBox="1"/>
+              <p:nvPr/>
+            </p:nvSpPr>
+            <p:spPr>
+              <a:xfrm>
+                <a:off x="3860459" y="5367025"/>
+                <a:ext cx="978571" cy="369332"/>
+              </a:xfrm>
+              <a:prstGeom prst="rect">
+                <a:avLst/>
+              </a:prstGeom>
+              <a:solidFill>
+                <a:srgbClr val="FFFF00"/>
+              </a:solidFill>
+              <a:ln>
+                <a:solidFill>
+                  <a:schemeClr val="tx1"/>
+                </a:solidFill>
+              </a:ln>
+            </p:spPr>
+            <p:txBody>
+              <a:bodyPr wrap="square" rtlCol="0" anchor="ctr">
+                <a:spAutoFit/>
+              </a:bodyPr>
+              <a:lstStyle/>
+              <a:p>
+                <a:pPr algn="ctr"/>
+                <a:r>
+                  <a:rPr lang="de-DE" dirty="0"/>
+                  <a:t>TCB1</a:t>
+                </a:r>
+              </a:p>
+            </p:txBody>
+          </p:sp>
+          <p:sp>
+            <p:nvSpPr>
+              <p:cNvPr id="29" name="Textfeld 28">
+                <a:extLst>
+                  <a:ext uri="{FF2B5EF4-FFF2-40B4-BE49-F238E27FC236}">
+                    <a16:creationId xmlns:a16="http://schemas.microsoft.com/office/drawing/2014/main" id="{03C0E7DE-0FEE-415C-86B3-EA813E4ED989}"/>
+                  </a:ext>
+                </a:extLst>
+              </p:cNvPr>
+              <p:cNvSpPr txBox="1"/>
+              <p:nvPr/>
+            </p:nvSpPr>
+            <p:spPr>
+              <a:xfrm>
+                <a:off x="3860457" y="3432047"/>
+                <a:ext cx="978571" cy="369332"/>
+              </a:xfrm>
+              <a:prstGeom prst="rect">
+                <a:avLst/>
+              </a:prstGeom>
+              <a:solidFill>
+                <a:schemeClr val="accent1">
+                  <a:lumMod val="60000"/>
+                  <a:lumOff val="40000"/>
+                </a:schemeClr>
+              </a:solidFill>
+              <a:ln>
+                <a:solidFill>
+                  <a:schemeClr val="tx1"/>
+                </a:solidFill>
+              </a:ln>
+            </p:spPr>
+            <p:txBody>
+              <a:bodyPr wrap="square" rtlCol="0" anchor="ctr">
+                <a:spAutoFit/>
+              </a:bodyPr>
+              <a:lstStyle/>
+              <a:p>
+                <a:pPr algn="ctr"/>
+                <a:r>
+                  <a:rPr lang="de-DE" dirty="0"/>
+                  <a:t>Sem 1</a:t>
+                </a:r>
+              </a:p>
+            </p:txBody>
+          </p:sp>
+          <p:sp>
+            <p:nvSpPr>
+              <p:cNvPr id="30" name="Textfeld 29">
+                <a:extLst>
+                  <a:ext uri="{FF2B5EF4-FFF2-40B4-BE49-F238E27FC236}">
+                    <a16:creationId xmlns:a16="http://schemas.microsoft.com/office/drawing/2014/main" id="{FF30B90D-055D-4555-8B4D-F052DD1DC1A6}"/>
+                  </a:ext>
+                </a:extLst>
+              </p:cNvPr>
+              <p:cNvSpPr txBox="1"/>
+              <p:nvPr/>
+            </p:nvSpPr>
+            <p:spPr>
+              <a:xfrm>
+                <a:off x="3860458" y="3068614"/>
+                <a:ext cx="978571" cy="369332"/>
+              </a:xfrm>
+              <a:prstGeom prst="rect">
+                <a:avLst/>
+              </a:prstGeom>
+              <a:solidFill>
+                <a:srgbClr val="FFFF00"/>
+              </a:solidFill>
+              <a:ln>
+                <a:solidFill>
+                  <a:schemeClr val="tx1"/>
+                </a:solidFill>
+              </a:ln>
+            </p:spPr>
+            <p:txBody>
+              <a:bodyPr wrap="square" rtlCol="0" anchor="ctr">
+                <a:spAutoFit/>
+              </a:bodyPr>
+              <a:lstStyle/>
+              <a:p>
+                <a:pPr algn="ctr"/>
+                <a:r>
+                  <a:rPr lang="de-DE" dirty="0"/>
+                  <a:t>TCB X</a:t>
+                </a:r>
+              </a:p>
+            </p:txBody>
+          </p:sp>
+          <p:sp>
+            <p:nvSpPr>
+              <p:cNvPr id="31" name="Textfeld 30">
+                <a:extLst>
+                  <a:ext uri="{FF2B5EF4-FFF2-40B4-BE49-F238E27FC236}">
+                    <a16:creationId xmlns:a16="http://schemas.microsoft.com/office/drawing/2014/main" id="{7CC6C5F7-D76E-4CD6-8E6D-93EF7D99116B}"/>
+                  </a:ext>
+                </a:extLst>
+              </p:cNvPr>
+              <p:cNvSpPr txBox="1"/>
+              <p:nvPr/>
+            </p:nvSpPr>
+            <p:spPr>
+              <a:xfrm>
+                <a:off x="3860453" y="2366684"/>
+                <a:ext cx="978571" cy="720000"/>
+              </a:xfrm>
+              <a:prstGeom prst="rect">
+                <a:avLst/>
+              </a:prstGeom>
+              <a:solidFill>
+                <a:srgbClr val="FFFF00"/>
+              </a:solidFill>
+              <a:ln>
+                <a:solidFill>
+                  <a:schemeClr val="tx1"/>
+                </a:solidFill>
+              </a:ln>
+            </p:spPr>
+            <p:txBody>
+              <a:bodyPr wrap="square" rtlCol="0" anchor="ctr">
+                <a:spAutoFit/>
+              </a:bodyPr>
+              <a:lstStyle/>
+              <a:p>
+                <a:pPr algn="ctr"/>
+                <a:r>
+                  <a:rPr lang="de-DE" dirty="0"/>
+                  <a:t>Stack X</a:t>
+                </a:r>
+              </a:p>
+            </p:txBody>
+          </p:sp>
+        </p:grpSp>
         <p:sp>
           <p:nvSpPr>
-            <p:cNvPr id="26" name="Flussdiagramm: Dokument 25">
+            <p:cNvPr id="32" name="Textfeld 31">
               <a:extLst>
                 <a:ext uri="{FF2B5EF4-FFF2-40B4-BE49-F238E27FC236}">
-                  <a16:creationId xmlns:a16="http://schemas.microsoft.com/office/drawing/2014/main" id="{A541AAC5-F7A6-4D45-95FC-B3270014879A}"/>
-                </a:ext>
-              </a:extLst>
-            </p:cNvPr>
-            <p:cNvSpPr/>
-            <p:nvPr/>
-          </p:nvSpPr>
-          <p:spPr>
-            <a:xfrm rot="10800000">
-              <a:off x="1453896" y="4051173"/>
-              <a:ext cx="1188720" cy="1581912"/>
-            </a:xfrm>
-            <a:prstGeom prst="flowChartDocument">
-              <a:avLst/>
-            </a:prstGeom>
-            <a:effectLst>
-              <a:outerShdw blurRad="63500" sx="102000" sy="102000" algn="ctr" rotWithShape="0">
-                <a:prstClr val="black">
-                  <a:alpha val="40000"/>
-                </a:prstClr>
-              </a:outerShdw>
-            </a:effectLst>
-          </p:spPr>
-          <p:style>
-            <a:lnRef idx="2">
-              <a:schemeClr val="accent1">
-                <a:shade val="50000"/>
-              </a:schemeClr>
-            </a:lnRef>
-            <a:fillRef idx="1">
-              <a:schemeClr val="accent1"/>
-            </a:fillRef>
-            <a:effectRef idx="0">
-              <a:schemeClr val="accent1"/>
-            </a:effectRef>
-            <a:fontRef idx="minor">
-              <a:schemeClr val="lt1"/>
-            </a:fontRef>
-          </p:style>
-          <p:txBody>
-            <a:bodyPr rtlCol="0" anchor="ctr"/>
-            <a:lstStyle/>
-            <a:p>
-              <a:pPr algn="ctr"/>
-              <a:endParaRPr lang="de-DE" sz="2800"/>
-            </a:p>
-          </p:txBody>
-        </p:sp>
-        <p:sp>
-          <p:nvSpPr>
-            <p:cNvPr id="27" name="Textfeld 26">
-              <a:extLst>
-                <a:ext uri="{FF2B5EF4-FFF2-40B4-BE49-F238E27FC236}">
-                  <a16:creationId xmlns:a16="http://schemas.microsoft.com/office/drawing/2014/main" id="{194F4F25-91D7-4DFB-B7A2-12497EDE933F}"/>
+                  <a16:creationId xmlns:a16="http://schemas.microsoft.com/office/drawing/2014/main" id="{A27BE5DD-FD0D-420A-A079-AC46367F1CC3}"/>
                 </a:ext>
               </a:extLst>
             </p:cNvPr>
@@ -11100,139 +11326,7 @@
           </p:nvSpPr>
           <p:spPr>
             <a:xfrm>
-              <a:off x="1558970" y="5168616"/>
-              <a:ext cx="978571" cy="369332"/>
-            </a:xfrm>
-            <a:prstGeom prst="rect">
-              <a:avLst/>
-            </a:prstGeom>
-            <a:solidFill>
-              <a:srgbClr val="FFFF00"/>
-            </a:solidFill>
-            <a:ln>
-              <a:solidFill>
-                <a:schemeClr val="tx1"/>
-              </a:solidFill>
-            </a:ln>
-          </p:spPr>
-          <p:txBody>
-            <a:bodyPr wrap="square" rtlCol="0" anchor="ctr">
-              <a:spAutoFit/>
-            </a:bodyPr>
-            <a:lstStyle/>
-            <a:p>
-              <a:pPr algn="ctr"/>
-              <a:r>
-                <a:rPr lang="de-DE" dirty="0"/>
-                <a:t>TCB1</a:t>
-              </a:r>
-            </a:p>
-          </p:txBody>
-        </p:sp>
-        <p:sp>
-          <p:nvSpPr>
-            <p:cNvPr id="29" name="Textfeld 28">
-              <a:extLst>
-                <a:ext uri="{FF2B5EF4-FFF2-40B4-BE49-F238E27FC236}">
-                  <a16:creationId xmlns:a16="http://schemas.microsoft.com/office/drawing/2014/main" id="{03C0E7DE-0FEE-415C-86B3-EA813E4ED989}"/>
-                </a:ext>
-              </a:extLst>
-            </p:cNvPr>
-            <p:cNvSpPr txBox="1"/>
-            <p:nvPr/>
-          </p:nvSpPr>
-          <p:spPr>
-            <a:xfrm>
-              <a:off x="1558968" y="3233638"/>
-              <a:ext cx="978571" cy="369332"/>
-            </a:xfrm>
-            <a:prstGeom prst="rect">
-              <a:avLst/>
-            </a:prstGeom>
-            <a:solidFill>
-              <a:schemeClr val="accent1">
-                <a:lumMod val="60000"/>
-                <a:lumOff val="40000"/>
-              </a:schemeClr>
-            </a:solidFill>
-            <a:ln>
-              <a:solidFill>
-                <a:schemeClr val="tx1"/>
-              </a:solidFill>
-            </a:ln>
-          </p:spPr>
-          <p:txBody>
-            <a:bodyPr wrap="square" rtlCol="0" anchor="ctr">
-              <a:spAutoFit/>
-            </a:bodyPr>
-            <a:lstStyle/>
-            <a:p>
-              <a:pPr algn="ctr"/>
-              <a:r>
-                <a:rPr lang="de-DE" dirty="0"/>
-                <a:t>Sem 1</a:t>
-              </a:r>
-            </a:p>
-          </p:txBody>
-        </p:sp>
-        <p:sp>
-          <p:nvSpPr>
-            <p:cNvPr id="30" name="Textfeld 29">
-              <a:extLst>
-                <a:ext uri="{FF2B5EF4-FFF2-40B4-BE49-F238E27FC236}">
-                  <a16:creationId xmlns:a16="http://schemas.microsoft.com/office/drawing/2014/main" id="{FF30B90D-055D-4555-8B4D-F052DD1DC1A6}"/>
-                </a:ext>
-              </a:extLst>
-            </p:cNvPr>
-            <p:cNvSpPr txBox="1"/>
-            <p:nvPr/>
-          </p:nvSpPr>
-          <p:spPr>
-            <a:xfrm>
-              <a:off x="1558969" y="2870205"/>
-              <a:ext cx="978571" cy="369332"/>
-            </a:xfrm>
-            <a:prstGeom prst="rect">
-              <a:avLst/>
-            </a:prstGeom>
-            <a:solidFill>
-              <a:srgbClr val="FFFF00"/>
-            </a:solidFill>
-            <a:ln>
-              <a:solidFill>
-                <a:schemeClr val="tx1"/>
-              </a:solidFill>
-            </a:ln>
-          </p:spPr>
-          <p:txBody>
-            <a:bodyPr wrap="square" rtlCol="0" anchor="ctr">
-              <a:spAutoFit/>
-            </a:bodyPr>
-            <a:lstStyle/>
-            <a:p>
-              <a:pPr algn="ctr"/>
-              <a:r>
-                <a:rPr lang="de-DE" dirty="0"/>
-                <a:t>TCB X</a:t>
-              </a:r>
-            </a:p>
-          </p:txBody>
-        </p:sp>
-        <p:sp>
-          <p:nvSpPr>
-            <p:cNvPr id="31" name="Textfeld 30">
-              <a:extLst>
-                <a:ext uri="{FF2B5EF4-FFF2-40B4-BE49-F238E27FC236}">
-                  <a16:creationId xmlns:a16="http://schemas.microsoft.com/office/drawing/2014/main" id="{7CC6C5F7-D76E-4CD6-8E6D-93EF7D99116B}"/>
-                </a:ext>
-              </a:extLst>
-            </p:cNvPr>
-            <p:cNvSpPr txBox="1"/>
-            <p:nvPr/>
-          </p:nvSpPr>
-          <p:spPr>
-            <a:xfrm>
-              <a:off x="1558964" y="2168275"/>
+              <a:off x="3860453" y="4647025"/>
               <a:ext cx="978571" cy="720000"/>
             </a:xfrm>
             <a:prstGeom prst="rect">
@@ -11256,7 +11350,7 @@
               <a:pPr algn="ctr"/>
               <a:r>
                 <a:rPr lang="de-DE" dirty="0"/>
-                <a:t>Stack X</a:t>
+                <a:t>Stack 1</a:t>
               </a:r>
             </a:p>
           </p:txBody>
@@ -11476,48 +11570,81 @@
       </p:sp>
       <p:sp>
         <p:nvSpPr>
-          <p:cNvPr id="42" name="Textfeld 41">
+          <p:cNvPr id="9" name="Wolke 8">
             <a:extLst>
               <a:ext uri="{FF2B5EF4-FFF2-40B4-BE49-F238E27FC236}">
-                <a16:creationId xmlns:a16="http://schemas.microsoft.com/office/drawing/2014/main" id="{A676F32B-652C-4325-B6B0-7228F008881D}"/>
+                <a16:creationId xmlns:a16="http://schemas.microsoft.com/office/drawing/2014/main" id="{D68FD1F4-7345-403D-B248-244C490896E9}"/>
               </a:ext>
             </a:extLst>
           </p:cNvPr>
-          <p:cNvSpPr txBox="1"/>
+          <p:cNvSpPr/>
           <p:nvPr/>
         </p:nvSpPr>
         <p:spPr>
           <a:xfrm>
-            <a:off x="1811219" y="4470325"/>
-            <a:ext cx="978571" cy="720000"/>
+            <a:off x="3750511" y="4788944"/>
+            <a:ext cx="2345489" cy="1048939"/>
           </a:xfrm>
-          <a:prstGeom prst="rect">
+          <a:prstGeom prst="cloud">
             <a:avLst/>
           </a:prstGeom>
-          <a:solidFill>
-            <a:srgbClr val="FFFF00"/>
-          </a:solidFill>
-          <a:ln>
-            <a:solidFill>
-              <a:schemeClr val="tx1"/>
-            </a:solidFill>
-          </a:ln>
         </p:spPr>
+        <p:style>
+          <a:lnRef idx="2">
+            <a:schemeClr val="accent1">
+              <a:shade val="50000"/>
+            </a:schemeClr>
+          </a:lnRef>
+          <a:fillRef idx="1">
+            <a:schemeClr val="accent1"/>
+          </a:fillRef>
+          <a:effectRef idx="0">
+            <a:schemeClr val="accent1"/>
+          </a:effectRef>
+          <a:fontRef idx="minor">
+            <a:schemeClr val="lt1"/>
+          </a:fontRef>
+        </p:style>
         <p:txBody>
-          <a:bodyPr wrap="square" rtlCol="0" anchor="ctr">
-            <a:spAutoFit/>
-          </a:bodyPr>
+          <a:bodyPr rtlCol="0" anchor="ctr"/>
           <a:lstStyle/>
           <a:p>
             <a:pPr algn="ctr"/>
             <a:r>
-              <a:rPr lang="de-DE" dirty="0"/>
-              <a:t>Stack 1</a:t>
+              <a:rPr lang="de-DE" sz="1600" dirty="0"/>
+              <a:t>Implementiert </a:t>
+            </a:r>
+            <a:r>
+              <a:rPr lang="de-DE" sz="1600" dirty="0" err="1"/>
+              <a:t>z.b.</a:t>
+            </a:r>
+            <a:r>
+              <a:rPr lang="de-DE" sz="1600" dirty="0"/>
+              <a:t> </a:t>
+            </a:r>
+            <a:r>
+              <a:rPr lang="de-DE" sz="1600" dirty="0" err="1"/>
+              <a:t>best</a:t>
+            </a:r>
+            <a:r>
+              <a:rPr lang="de-DE" sz="1600" dirty="0"/>
+              <a:t> fit oder </a:t>
+            </a:r>
+            <a:r>
+              <a:rPr lang="de-DE" sz="1600" dirty="0" err="1"/>
+              <a:t>first</a:t>
+            </a:r>
+            <a:r>
+              <a:rPr lang="de-DE" sz="1600" dirty="0"/>
+              <a:t> fit</a:t>
             </a:r>
           </a:p>
         </p:txBody>
       </p:sp>
     </p:spTree>
+    <p:custDataLst>
+      <p:tags r:id="rId1"/>
+    </p:custDataLst>
     <p:extLst>
       <p:ext uri="{BB962C8B-B14F-4D97-AF65-F5344CB8AC3E}">
         <p14:creationId xmlns:p14="http://schemas.microsoft.com/office/powerpoint/2010/main" val="210037210"/>
@@ -11561,7 +11688,7 @@
                                           </p:stCondLst>
                                         </p:cTn>
                                         <p:tgtEl>
-                                          <p:spTgt spid="22"/>
+                                          <p:spTgt spid="3"/>
                                         </p:tgtEl>
                                         <p:attrNameLst>
                                           <p:attrName>style.visibility</p:attrName>
@@ -11575,7 +11702,7 @@
                                 </p:cTn>
                               </p:par>
                               <p:par>
-                                <p:cTn id="7" presetID="3" presetClass="entr" presetSubtype="10" fill="hold" grpId="1" nodeType="withEffect">
+                                <p:cTn id="7" presetID="1" presetClass="entr" presetSubtype="0" fill="hold" grpId="0" nodeType="withEffect">
                                   <p:stCondLst>
                                     <p:cond delay="0"/>
                                   </p:stCondLst>
@@ -11588,6 +11715,96 @@
                                           </p:stCondLst>
                                         </p:cTn>
                                         <p:tgtEl>
+                                          <p:spTgt spid="14"/>
+                                        </p:tgtEl>
+                                        <p:attrNameLst>
+                                          <p:attrName>style.visibility</p:attrName>
+                                        </p:attrNameLst>
+                                      </p:cBhvr>
+                                      <p:to>
+                                        <p:strVal val="visible"/>
+                                      </p:to>
+                                    </p:set>
+                                  </p:childTnLst>
+                                </p:cTn>
+                              </p:par>
+                            </p:childTnLst>
+                          </p:cTn>
+                        </p:par>
+                      </p:childTnLst>
+                    </p:cTn>
+                  </p:par>
+                  <p:par>
+                    <p:cTn id="9" fill="hold">
+                      <p:stCondLst>
+                        <p:cond delay="indefinite"/>
+                      </p:stCondLst>
+                      <p:childTnLst>
+                        <p:par>
+                          <p:cTn id="10" fill="hold">
+                            <p:stCondLst>
+                              <p:cond delay="0"/>
+                            </p:stCondLst>
+                            <p:childTnLst>
+                              <p:par>
+                                <p:cTn id="11" presetID="1" presetClass="entr" presetSubtype="0" fill="hold" nodeType="clickEffect">
+                                  <p:stCondLst>
+                                    <p:cond delay="0"/>
+                                  </p:stCondLst>
+                                  <p:childTnLst>
+                                    <p:set>
+                                      <p:cBhvr>
+                                        <p:cTn id="12" dur="1" fill="hold">
+                                          <p:stCondLst>
+                                            <p:cond delay="0"/>
+                                          </p:stCondLst>
+                                        </p:cTn>
+                                        <p:tgtEl>
+                                          <p:spTgt spid="8"/>
+                                        </p:tgtEl>
+                                        <p:attrNameLst>
+                                          <p:attrName>style.visibility</p:attrName>
+                                        </p:attrNameLst>
+                                      </p:cBhvr>
+                                      <p:to>
+                                        <p:strVal val="visible"/>
+                                      </p:to>
+                                    </p:set>
+                                  </p:childTnLst>
+                                </p:cTn>
+                              </p:par>
+                            </p:childTnLst>
+                          </p:cTn>
+                        </p:par>
+                      </p:childTnLst>
+                    </p:cTn>
+                  </p:par>
+                  <p:par>
+                    <p:cTn id="13" fill="hold">
+                      <p:stCondLst>
+                        <p:cond delay="indefinite"/>
+                      </p:stCondLst>
+                      <p:childTnLst>
+                        <p:par>
+                          <p:cTn id="14" fill="hold">
+                            <p:stCondLst>
+                              <p:cond delay="0"/>
+                            </p:stCondLst>
+                            <p:childTnLst>
+                              <p:par>
+                                <p:cTn id="15" presetID="3" presetClass="entr" presetSubtype="10" fill="hold" grpId="1" nodeType="clickEffect">
+                                  <p:stCondLst>
+                                    <p:cond delay="0"/>
+                                  </p:stCondLst>
+                                  <p:childTnLst>
+                                    <p:set>
+                                      <p:cBhvr>
+                                        <p:cTn id="16" dur="1" fill="hold">
+                                          <p:stCondLst>
+                                            <p:cond delay="0"/>
+                                          </p:stCondLst>
+                                        </p:cTn>
+                                        <p:tgtEl>
                                           <p:spTgt spid="20"/>
                                         </p:tgtEl>
                                         <p:attrNameLst>
@@ -11600,7 +11817,7 @@
                                     </p:set>
                                     <p:animEffect transition="in" filter="blinds(horizontal)">
                                       <p:cBhvr>
-                                        <p:cTn id="9" dur="500"/>
+                                        <p:cTn id="17" dur="500"/>
                                         <p:tgtEl>
                                           <p:spTgt spid="20"/>
                                         </p:tgtEl>
@@ -11610,14 +11827,14 @@
                                 </p:cTn>
                               </p:par>
                               <p:par>
-                                <p:cTn id="10" presetID="3" presetClass="entr" presetSubtype="10" fill="hold" grpId="0" nodeType="withEffect">
+                                <p:cTn id="18" presetID="3" presetClass="entr" presetSubtype="10" fill="hold" grpId="0" nodeType="withEffect">
                                   <p:stCondLst>
                                     <p:cond delay="0"/>
                                   </p:stCondLst>
                                   <p:childTnLst>
                                     <p:set>
                                       <p:cBhvr>
-                                        <p:cTn id="11" dur="1" fill="hold">
+                                        <p:cTn id="19" dur="1" fill="hold">
                                           <p:stCondLst>
                                             <p:cond delay="0"/>
                                           </p:stCondLst>
@@ -11635,9 +11852,107 @@
                                     </p:set>
                                     <p:animEffect transition="in" filter="blinds(horizontal)">
                                       <p:cBhvr>
-                                        <p:cTn id="12" dur="500"/>
+                                        <p:cTn id="20" dur="500"/>
                                         <p:tgtEl>
                                           <p:spTgt spid="15"/>
+                                        </p:tgtEl>
+                                      </p:cBhvr>
+                                    </p:animEffect>
+                                  </p:childTnLst>
+                                </p:cTn>
+                              </p:par>
+                            </p:childTnLst>
+                          </p:cTn>
+                        </p:par>
+                      </p:childTnLst>
+                    </p:cTn>
+                  </p:par>
+                  <p:par>
+                    <p:cTn id="21" fill="hold">
+                      <p:stCondLst>
+                        <p:cond delay="indefinite"/>
+                      </p:stCondLst>
+                      <p:childTnLst>
+                        <p:par>
+                          <p:cTn id="22" fill="hold">
+                            <p:stCondLst>
+                              <p:cond delay="0"/>
+                            </p:stCondLst>
+                            <p:childTnLst>
+                              <p:par>
+                                <p:cTn id="23" presetID="1" presetClass="entr" presetSubtype="0" fill="hold" nodeType="clickEffect">
+                                  <p:stCondLst>
+                                    <p:cond delay="0"/>
+                                  </p:stCondLst>
+                                  <p:childTnLst>
+                                    <p:set>
+                                      <p:cBhvr>
+                                        <p:cTn id="24" dur="1" fill="hold">
+                                          <p:stCondLst>
+                                            <p:cond delay="0"/>
+                                          </p:stCondLst>
+                                        </p:cTn>
+                                        <p:tgtEl>
+                                          <p:spTgt spid="7"/>
+                                        </p:tgtEl>
+                                        <p:attrNameLst>
+                                          <p:attrName>style.visibility</p:attrName>
+                                        </p:attrNameLst>
+                                      </p:cBhvr>
+                                      <p:to>
+                                        <p:strVal val="visible"/>
+                                      </p:to>
+                                    </p:set>
+                                  </p:childTnLst>
+                                </p:cTn>
+                              </p:par>
+                            </p:childTnLst>
+                          </p:cTn>
+                        </p:par>
+                      </p:childTnLst>
+                    </p:cTn>
+                  </p:par>
+                  <p:par>
+                    <p:cTn id="25" fill="hold">
+                      <p:stCondLst>
+                        <p:cond delay="indefinite"/>
+                      </p:stCondLst>
+                      <p:childTnLst>
+                        <p:par>
+                          <p:cTn id="26" fill="hold">
+                            <p:stCondLst>
+                              <p:cond delay="0"/>
+                            </p:stCondLst>
+                            <p:childTnLst>
+                              <p:par>
+                                <p:cTn id="27" presetID="3" presetClass="entr" presetSubtype="10" fill="hold" grpId="0" nodeType="clickEffect">
+                                  <p:stCondLst>
+                                    <p:cond delay="0"/>
+                                  </p:stCondLst>
+                                  <p:childTnLst>
+                                    <p:set>
+                                      <p:cBhvr>
+                                        <p:cTn id="28" dur="1" fill="hold">
+                                          <p:stCondLst>
+                                            <p:cond delay="0"/>
+                                          </p:stCondLst>
+                                        </p:cTn>
+                                        <p:tgtEl>
+                                          <p:spTgt spid="23"/>
+                                        </p:tgtEl>
+                                        <p:attrNameLst>
+                                          <p:attrName>style.visibility</p:attrName>
+                                        </p:attrNameLst>
+                                      </p:cBhvr>
+                                      <p:to>
+                                        <p:strVal val="visible"/>
+                                      </p:to>
+                                    </p:set>
+                                    <p:animEffect transition="in" filter="blinds(horizontal)">
+                                      <p:cBhvr>
+                                        <p:cTn id="29" dur="500"/>
+                                        <p:tgtEl>
+                                          <p:spTgt spid="23"/>
                                         </p:tgtEl>
                                       </p:cBhvr>
                                     </p:animEffect>
@@ -11645,20 +11960,172 @@
                                 </p:cTn>
                               </p:par>
                               <p:par>
-                                <p:cTn id="13" presetID="1" presetClass="exit" presetSubtype="0" fill="hold" nodeType="withEffect">
+                                <p:cTn id="30" presetID="3" presetClass="entr" presetSubtype="10" fill="hold" grpId="0" nodeType="withEffect">
                                   <p:stCondLst>
                                     <p:cond delay="0"/>
                                   </p:stCondLst>
                                   <p:childTnLst>
                                     <p:set>
                                       <p:cBhvr>
-                                        <p:cTn id="14" dur="1" fill="hold">
+                                        <p:cTn id="31" dur="1" fill="hold">
                                           <p:stCondLst>
                                             <p:cond delay="0"/>
                                           </p:stCondLst>
                                         </p:cTn>
                                         <p:tgtEl>
-                                          <p:spTgt spid="3"/>
+                                          <p:spTgt spid="21"/>
+                                        </p:tgtEl>
+                                        <p:attrNameLst>
+                                          <p:attrName>style.visibility</p:attrName>
+                                        </p:attrNameLst>
+                                      </p:cBhvr>
+                                      <p:to>
+                                        <p:strVal val="visible"/>
+                                      </p:to>
+                                    </p:set>
+                                    <p:animEffect transition="in" filter="blinds(horizontal)">
+                                      <p:cBhvr>
+                                        <p:cTn id="32" dur="500"/>
+                                        <p:tgtEl>
+                                          <p:spTgt spid="21"/>
+                                        </p:tgtEl>
+                                      </p:cBhvr>
+                                    </p:animEffect>
+                                  </p:childTnLst>
+                                </p:cTn>
+                              </p:par>
+                            </p:childTnLst>
+                          </p:cTn>
+                        </p:par>
+                      </p:childTnLst>
+                    </p:cTn>
+                  </p:par>
+                  <p:par>
+                    <p:cTn id="33" fill="hold">
+                      <p:stCondLst>
+                        <p:cond delay="indefinite"/>
+                      </p:stCondLst>
+                      <p:childTnLst>
+                        <p:par>
+                          <p:cTn id="34" fill="hold">
+                            <p:stCondLst>
+                              <p:cond delay="0"/>
+                            </p:stCondLst>
+                            <p:childTnLst>
+                              <p:par>
+                                <p:cTn id="35" presetID="1" presetClass="entr" presetSubtype="0" fill="hold" grpId="0" nodeType="clickEffect">
+                                  <p:stCondLst>
+                                    <p:cond delay="0"/>
+                                  </p:stCondLst>
+                                  <p:childTnLst>
+                                    <p:set>
+                                      <p:cBhvr>
+                                        <p:cTn id="36" dur="1" fill="hold">
+                                          <p:stCondLst>
+                                            <p:cond delay="0"/>
+                                          </p:stCondLst>
+                                        </p:cTn>
+                                        <p:tgtEl>
+                                          <p:spTgt spid="9"/>
+                                        </p:tgtEl>
+                                        <p:attrNameLst>
+                                          <p:attrName>style.visibility</p:attrName>
+                                        </p:attrNameLst>
+                                      </p:cBhvr>
+                                      <p:to>
+                                        <p:strVal val="visible"/>
+                                      </p:to>
+                                    </p:set>
+                                  </p:childTnLst>
+                                </p:cTn>
+                              </p:par>
+                            </p:childTnLst>
+                          </p:cTn>
+                        </p:par>
+                      </p:childTnLst>
+                    </p:cTn>
+                  </p:par>
+                  <p:par>
+                    <p:cTn id="37" fill="hold">
+                      <p:stCondLst>
+                        <p:cond delay="indefinite"/>
+                      </p:stCondLst>
+                      <p:childTnLst>
+                        <p:par>
+                          <p:cTn id="38" fill="hold">
+                            <p:stCondLst>
+                              <p:cond delay="0"/>
+                            </p:stCondLst>
+                            <p:childTnLst>
+                              <p:par>
+                                <p:cTn id="39" presetID="1" presetClass="exit" presetSubtype="0" fill="hold" grpId="1" nodeType="clickEffect">
+                                  <p:stCondLst>
+                                    <p:cond delay="0"/>
+                                  </p:stCondLst>
+                                  <p:childTnLst>
+                                    <p:set>
+                                      <p:cBhvr>
+                                        <p:cTn id="40" dur="1" fill="hold">
+                                          <p:stCondLst>
+                                            <p:cond delay="0"/>
+                                          </p:stCondLst>
+                                        </p:cTn>
+                                        <p:tgtEl>
+                                          <p:spTgt spid="9"/>
+                                        </p:tgtEl>
+                                        <p:attrNameLst>
+                                          <p:attrName>style.visibility</p:attrName>
+                                        </p:attrNameLst>
+                                      </p:cBhvr>
+                                      <p:to>
+                                        <p:strVal val="hidden"/>
+                                      </p:to>
+                                    </p:set>
+                                  </p:childTnLst>
+                                </p:cTn>
+                              </p:par>
+                              <p:par>
+                                <p:cTn id="41" presetID="1" presetClass="exit" presetSubtype="0" fill="hold" grpId="0" nodeType="withEffect">
+                                  <p:stCondLst>
+                                    <p:cond delay="0"/>
+                                  </p:stCondLst>
+                                  <p:childTnLst>
+                                    <p:set>
+                                      <p:cBhvr>
+                                        <p:cTn id="42" dur="1" fill="hold">
+                                          <p:stCondLst>
+                                            <p:cond delay="0"/>
+                                          </p:stCondLst>
+                                        </p:cTn>
+                                        <p:tgtEl>
+                                          <p:spTgt spid="20"/>
+                                        </p:tgtEl>
+                                        <p:attrNameLst>
+                                          <p:attrName>style.visibility</p:attrName>
+                                        </p:attrNameLst>
+                                      </p:cBhvr>
+                                      <p:to>
+                                        <p:strVal val="hidden"/>
+                                      </p:to>
+                                    </p:set>
+                                  </p:childTnLst>
+                                </p:cTn>
+                              </p:par>
+                              <p:par>
+                                <p:cTn id="43" presetID="1" presetClass="exit" presetSubtype="0" fill="hold" grpId="1" nodeType="withEffect">
+                                  <p:stCondLst>
+                                    <p:cond delay="0"/>
+                                  </p:stCondLst>
+                                  <p:childTnLst>
+                                    <p:set>
+                                      <p:cBhvr>
+                                        <p:cTn id="44" dur="1" fill="hold">
+                                          <p:stCondLst>
+                                            <p:cond delay="0"/>
+                                          </p:stCondLst>
+                                        </p:cTn>
+                                        <p:tgtEl>
+                                          <p:spTgt spid="15"/>
                                         </p:tgtEl>
                                         <p:attrNameLst>
                                           <p:attrName>style.visibility</p:attrName>
@@ -11678,183 +12145,32 @@
                     </p:cTn>
                   </p:par>
                   <p:par>
-                    <p:cTn id="15" fill="hold">
+                    <p:cTn id="45" fill="hold">
                       <p:stCondLst>
                         <p:cond delay="indefinite"/>
                       </p:stCondLst>
                       <p:childTnLst>
                         <p:par>
-                          <p:cTn id="16" fill="hold">
+                          <p:cTn id="46" fill="hold">
                             <p:stCondLst>
                               <p:cond delay="0"/>
                             </p:stCondLst>
                             <p:childTnLst>
                               <p:par>
-                                <p:cTn id="17" presetID="3" presetClass="entr" presetSubtype="10" fill="hold" grpId="0" nodeType="clickEffect">
+                                <p:cTn id="47" presetID="1" presetClass="exit" presetSubtype="0" fill="hold" nodeType="clickEffect">
                                   <p:stCondLst>
                                     <p:cond delay="0"/>
                                   </p:stCondLst>
                                   <p:childTnLst>
                                     <p:set>
                                       <p:cBhvr>
-                                        <p:cTn id="18" dur="1" fill="hold">
+                                        <p:cTn id="48" dur="1" fill="hold">
                                           <p:stCondLst>
                                             <p:cond delay="0"/>
                                           </p:stCondLst>
                                         </p:cTn>
                                         <p:tgtEl>
-                                          <p:spTgt spid="23"/>
-                                        </p:tgtEl>
-                                        <p:attrNameLst>
-                                          <p:attrName>style.visibility</p:attrName>
-                                        </p:attrNameLst>
-                                      </p:cBhvr>
-                                      <p:to>
-                                        <p:strVal val="visible"/>
-                                      </p:to>
-                                    </p:set>
-                                    <p:animEffect transition="in" filter="blinds(horizontal)">
-                                      <p:cBhvr>
-                                        <p:cTn id="19" dur="500"/>
-                                        <p:tgtEl>
-                                          <p:spTgt spid="23"/>
-                                        </p:tgtEl>
-                                      </p:cBhvr>
-                                    </p:animEffect>
-                                  </p:childTnLst>
-                                </p:cTn>
-                              </p:par>
-                              <p:par>
-                                <p:cTn id="20" presetID="1" presetClass="exit" presetSubtype="0" fill="hold" grpId="0" nodeType="withEffect">
-                                  <p:stCondLst>
-                                    <p:cond delay="0"/>
-                                  </p:stCondLst>
-                                  <p:childTnLst>
-                                    <p:set>
-                                      <p:cBhvr>
-                                        <p:cTn id="21" dur="1" fill="hold">
-                                          <p:stCondLst>
-                                            <p:cond delay="0"/>
-                                          </p:stCondLst>
-                                        </p:cTn>
-                                        <p:tgtEl>
-                                          <p:spTgt spid="20"/>
-                                        </p:tgtEl>
-                                        <p:attrNameLst>
-                                          <p:attrName>style.visibility</p:attrName>
-                                        </p:attrNameLst>
-                                      </p:cBhvr>
-                                      <p:to>
-                                        <p:strVal val="hidden"/>
-                                      </p:to>
-                                    </p:set>
-                                  </p:childTnLst>
-                                </p:cTn>
-                              </p:par>
-                              <p:par>
-                                <p:cTn id="22" presetID="1" presetClass="exit" presetSubtype="0" fill="hold" grpId="1" nodeType="withEffect">
-                                  <p:stCondLst>
-                                    <p:cond delay="0"/>
-                                  </p:stCondLst>
-                                  <p:childTnLst>
-                                    <p:set>
-                                      <p:cBhvr>
-                                        <p:cTn id="23" dur="1" fill="hold">
-                                          <p:stCondLst>
-                                            <p:cond delay="0"/>
-                                          </p:stCondLst>
-                                        </p:cTn>
-                                        <p:tgtEl>
-                                          <p:spTgt spid="15"/>
-                                        </p:tgtEl>
-                                        <p:attrNameLst>
-                                          <p:attrName>style.visibility</p:attrName>
-                                        </p:attrNameLst>
-                                      </p:cBhvr>
-                                      <p:to>
-                                        <p:strVal val="hidden"/>
-                                      </p:to>
-                                    </p:set>
-                                  </p:childTnLst>
-                                </p:cTn>
-                              </p:par>
-                              <p:par>
-                                <p:cTn id="24" presetID="3" presetClass="entr" presetSubtype="10" fill="hold" grpId="0" nodeType="withEffect">
-                                  <p:stCondLst>
-                                    <p:cond delay="0"/>
-                                  </p:stCondLst>
-                                  <p:childTnLst>
-                                    <p:set>
-                                      <p:cBhvr>
-                                        <p:cTn id="25" dur="1" fill="hold">
-                                          <p:stCondLst>
-                                            <p:cond delay="0"/>
-                                          </p:stCondLst>
-                                        </p:cTn>
-                                        <p:tgtEl>
-                                          <p:spTgt spid="21"/>
-                                        </p:tgtEl>
-                                        <p:attrNameLst>
-                                          <p:attrName>style.visibility</p:attrName>
-                                        </p:attrNameLst>
-                                      </p:cBhvr>
-                                      <p:to>
-                                        <p:strVal val="visible"/>
-                                      </p:to>
-                                    </p:set>
-                                    <p:animEffect transition="in" filter="blinds(horizontal)">
-                                      <p:cBhvr>
-                                        <p:cTn id="26" dur="500"/>
-                                        <p:tgtEl>
-                                          <p:spTgt spid="21"/>
-                                        </p:tgtEl>
-                                      </p:cBhvr>
-                                    </p:animEffect>
-                                  </p:childTnLst>
-                                </p:cTn>
-                              </p:par>
-                              <p:par>
-                                <p:cTn id="27" presetID="1" presetClass="entr" presetSubtype="0" fill="hold" nodeType="withEffect">
-                                  <p:stCondLst>
-                                    <p:cond delay="0"/>
-                                  </p:stCondLst>
-                                  <p:childTnLst>
-                                    <p:set>
-                                      <p:cBhvr>
-                                        <p:cTn id="28" dur="1" fill="hold">
-                                          <p:stCondLst>
-                                            <p:cond delay="0"/>
-                                          </p:stCondLst>
-                                        </p:cTn>
-                                        <p:tgtEl>
-                                          <p:spTgt spid="3"/>
-                                        </p:tgtEl>
-                                        <p:attrNameLst>
-                                          <p:attrName>style.visibility</p:attrName>
-                                        </p:attrNameLst>
-                                      </p:cBhvr>
-                                      <p:to>
-                                        <p:strVal val="visible"/>
-                                      </p:to>
-                                    </p:set>
-                                  </p:childTnLst>
-                                </p:cTn>
-                              </p:par>
-                              <p:par>
-                                <p:cTn id="29" presetID="1" presetClass="exit" presetSubtype="0" fill="hold" nodeType="withEffect">
-                                  <p:stCondLst>
-                                    <p:cond delay="0"/>
-                                  </p:stCondLst>
-                                  <p:childTnLst>
-                                    <p:set>
-                                      <p:cBhvr>
-                                        <p:cTn id="30" dur="1" fill="hold">
-                                          <p:stCondLst>
-                                            <p:cond delay="0"/>
-                                          </p:stCondLst>
-                                        </p:cTn>
-                                        <p:tgtEl>
-                                          <p:spTgt spid="22"/>
+                                          <p:spTgt spid="7"/>
                                         </p:tgtEl>
                                         <p:attrNameLst>
                                           <p:attrName>style.visibility</p:attrName>
@@ -11895,12 +12211,15 @@
       </p:par>
     </p:tnLst>
     <p:bldLst>
+      <p:bldP spid="14" grpId="0"/>
       <p:bldP spid="15" grpId="0" animBg="1"/>
       <p:bldP spid="15" grpId="1" animBg="1"/>
       <p:bldP spid="20" grpId="0" animBg="1"/>
       <p:bldP spid="20" grpId="1" animBg="1"/>
       <p:bldP spid="21" grpId="0" animBg="1"/>
       <p:bldP spid="23" grpId="0" animBg="1"/>
+      <p:bldP spid="9" grpId="0" animBg="1"/>
+      <p:bldP spid="9" grpId="1" animBg="1"/>
     </p:bldLst>
   </p:timing>
 </p:sld>
@@ -12974,6 +13293,9 @@
         </p:txBody>
       </p:sp>
     </p:spTree>
+    <p:custDataLst>
+      <p:tags r:id="rId1"/>
+    </p:custDataLst>
     <p:extLst>
       <p:ext uri="{BB962C8B-B14F-4D97-AF65-F5344CB8AC3E}">
         <p14:creationId xmlns:p14="http://schemas.microsoft.com/office/powerpoint/2010/main" val="1878060479"/>
@@ -13370,7 +13692,7 @@
           <p:nvPr/>
         </p:nvPicPr>
         <p:blipFill>
-          <a:blip r:embed="rId2" cstate="print">
+          <a:blip r:embed="rId3" cstate="print">
             <a:extLst>
               <a:ext uri="{28A0092B-C50C-407E-A947-70E740481C1C}">
                 <a14:useLocalDpi xmlns:a14="http://schemas.microsoft.com/office/drawing/2010/main" val="0"/>
@@ -13406,7 +13728,7 @@
           <p:nvPr/>
         </p:nvPicPr>
         <p:blipFill>
-          <a:blip r:embed="rId3" cstate="print">
+          <a:blip r:embed="rId4" cstate="print">
             <a:extLst>
               <a:ext uri="{28A0092B-C50C-407E-A947-70E740481C1C}">
                 <a14:useLocalDpi xmlns:a14="http://schemas.microsoft.com/office/drawing/2010/main" val="0"/>
@@ -13580,6 +13902,9 @@
         </p:txBody>
       </p:sp>
     </p:spTree>
+    <p:custDataLst>
+      <p:tags r:id="rId1"/>
+    </p:custDataLst>
     <p:extLst>
       <p:ext uri="{BB962C8B-B14F-4D97-AF65-F5344CB8AC3E}">
         <p14:creationId xmlns:p14="http://schemas.microsoft.com/office/powerpoint/2010/main" val="4169362409"/>
@@ -14083,7 +14408,7 @@
           <p:nvPr/>
         </p:nvPicPr>
         <p:blipFill>
-          <a:blip r:embed="rId3" cstate="print">
+          <a:blip r:embed="rId4" cstate="print">
             <a:extLst>
               <a:ext uri="{28A0092B-C50C-407E-A947-70E740481C1C}">
                 <a14:useLocalDpi xmlns:a14="http://schemas.microsoft.com/office/drawing/2010/main" val="0"/>
@@ -14521,6 +14846,9 @@
         </p:style>
       </p:cxnSp>
     </p:spTree>
+    <p:custDataLst>
+      <p:tags r:id="rId1"/>
+    </p:custDataLst>
     <p:extLst>
       <p:ext uri="{BB962C8B-B14F-4D97-AF65-F5344CB8AC3E}">
         <p14:creationId xmlns:p14="http://schemas.microsoft.com/office/powerpoint/2010/main" val="2861433211"/>
@@ -15574,7 +15902,7 @@
           <p:nvPr/>
         </p:nvPicPr>
         <p:blipFill>
-          <a:blip r:embed="rId3" cstate="print">
+          <a:blip r:embed="rId4" cstate="print">
             <a:extLst>
               <a:ext uri="{28A0092B-C50C-407E-A947-70E740481C1C}">
                 <a14:useLocalDpi xmlns:a14="http://schemas.microsoft.com/office/drawing/2010/main" val="0"/>
@@ -15610,7 +15938,7 @@
           <p:nvPr/>
         </p:nvPicPr>
         <p:blipFill>
-          <a:blip r:embed="rId4" cstate="print">
+          <a:blip r:embed="rId5" cstate="print">
             <a:extLst>
               <a:ext uri="{28A0092B-C50C-407E-A947-70E740481C1C}">
                 <a14:useLocalDpi xmlns:a14="http://schemas.microsoft.com/office/drawing/2010/main" val="0"/>
@@ -15632,6 +15960,9 @@
         </p:spPr>
       </p:pic>
     </p:spTree>
+    <p:custDataLst>
+      <p:tags r:id="rId1"/>
+    </p:custDataLst>
     <p:extLst>
       <p:ext uri="{BB962C8B-B14F-4D97-AF65-F5344CB8AC3E}">
         <p14:creationId xmlns:p14="http://schemas.microsoft.com/office/powerpoint/2010/main" val="4266597995"/>
@@ -16132,7 +16463,7 @@
           <p:nvPr/>
         </p:nvPicPr>
         <p:blipFill>
-          <a:blip r:embed="rId2" cstate="print"/>
+          <a:blip r:embed="rId3" cstate="print"/>
           <a:stretch>
             <a:fillRect/>
           </a:stretch>
@@ -16362,6 +16693,9 @@
         </p:txBody>
       </p:sp>
     </p:spTree>
+    <p:custDataLst>
+      <p:tags r:id="rId1"/>
+    </p:custDataLst>
     <p:extLst>
       <p:ext uri="{BB962C8B-B14F-4D97-AF65-F5344CB8AC3E}">
         <p14:creationId xmlns:p14="http://schemas.microsoft.com/office/powerpoint/2010/main" val="2999870621"/>
@@ -16770,8 +17104,13 @@
             </a:r>
             <a:r>
               <a:rPr lang="de-DE" dirty="0"/>
-              <a:t> Mode</a:t>
-            </a:r>
+              <a:t> Mode + Time </a:t>
+            </a:r>
+            <a:r>
+              <a:rPr lang="de-DE" dirty="0" err="1"/>
+              <a:t>Slicing</a:t>
+            </a:r>
+            <a:endParaRPr lang="de-DE" dirty="0"/>
           </a:p>
         </p:txBody>
       </p:sp>
@@ -16803,35 +17142,6 @@
           </a:p>
         </p:txBody>
       </p:sp>
-      <p:pic>
-        <p:nvPicPr>
-          <p:cNvPr id="5" name="Grafik 4">
-            <a:extLst>
-              <a:ext uri="{FF2B5EF4-FFF2-40B4-BE49-F238E27FC236}">
-                <a16:creationId xmlns:a16="http://schemas.microsoft.com/office/drawing/2014/main" id="{E5E9BD3A-4987-4A32-A202-D5460725CD7D}"/>
-              </a:ext>
-            </a:extLst>
-          </p:cNvPr>
-          <p:cNvPicPr>
-            <a:picLocks noChangeAspect="1"/>
-          </p:cNvPicPr>
-          <p:nvPr/>
-        </p:nvPicPr>
-        <p:blipFill rotWithShape="1">
-          <a:blip r:embed="rId2" cstate="print"/>
-          <a:srcRect l="2669"/>
-          <a:stretch/>
-        </p:blipFill>
-        <p:spPr>
-          <a:xfrm>
-            <a:off x="100584" y="2403881"/>
-            <a:ext cx="6592824" cy="2538213"/>
-          </a:xfrm>
-          <a:prstGeom prst="rect">
-            <a:avLst/>
-          </a:prstGeom>
-        </p:spPr>
-      </p:pic>
       <p:sp>
         <p:nvSpPr>
           <p:cNvPr id="6" name="Textfeld 5">
@@ -16846,8 +17156,8 @@
         </p:nvSpPr>
         <p:spPr>
           <a:xfrm>
-            <a:off x="6556248" y="2934324"/>
-            <a:ext cx="5532120" cy="1107996"/>
+            <a:off x="6331505" y="1690688"/>
+            <a:ext cx="5532120" cy="1477328"/>
           </a:xfrm>
           <a:prstGeom prst="rect">
             <a:avLst/>
@@ -16860,6 +17170,14 @@
           </a:bodyPr>
           <a:lstStyle/>
           <a:p>
+            <a:pPr algn="ctr"/>
+            <a:r>
+              <a:rPr lang="de-DE" sz="2400" b="1" dirty="0" err="1"/>
+              <a:t>Preemption</a:t>
+            </a:r>
+            <a:endParaRPr lang="de-DE" sz="2400" b="1" dirty="0"/>
+          </a:p>
+          <a:p>
             <a:pPr marL="285750" indent="-285750">
               <a:buFont typeface="Wingdings" panose="05000000000000000000" pitchFamily="2" charset="2"/>
               <a:buChar char="§"/>
@@ -16903,7 +17221,172 @@
           </a:p>
         </p:txBody>
       </p:sp>
+      <p:sp>
+        <p:nvSpPr>
+          <p:cNvPr id="7" name="Textfeld 6">
+            <a:extLst>
+              <a:ext uri="{FF2B5EF4-FFF2-40B4-BE49-F238E27FC236}">
+                <a16:creationId xmlns:a16="http://schemas.microsoft.com/office/drawing/2014/main" id="{47F8C6E5-56B6-4697-BA48-176F8C4F8B98}"/>
+              </a:ext>
+            </a:extLst>
+          </p:cNvPr>
+          <p:cNvSpPr txBox="1"/>
+          <p:nvPr/>
+        </p:nvSpPr>
+        <p:spPr>
+          <a:xfrm>
+            <a:off x="6443980" y="3074432"/>
+            <a:ext cx="5532120" cy="3323987"/>
+          </a:xfrm>
+          <a:prstGeom prst="rect">
+            <a:avLst/>
+          </a:prstGeom>
+          <a:noFill/>
+        </p:spPr>
+        <p:txBody>
+          <a:bodyPr wrap="square" rtlCol="0">
+            <a:spAutoFit/>
+          </a:bodyPr>
+          <a:lstStyle/>
+          <a:p>
+            <a:pPr algn="ctr"/>
+            <a:r>
+              <a:rPr lang="de-DE" sz="2400" b="1" dirty="0" err="1"/>
+              <a:t>Timeslicing</a:t>
+            </a:r>
+            <a:endParaRPr lang="de-DE" sz="2400" b="1" dirty="0"/>
+          </a:p>
+          <a:p>
+            <a:pPr marL="285750" indent="-285750">
+              <a:buFont typeface="Wingdings" panose="05000000000000000000" pitchFamily="2" charset="2"/>
+              <a:buChar char="§"/>
+            </a:pPr>
+            <a:r>
+              <a:rPr lang="de-DE" sz="2400" dirty="0"/>
+              <a:t>Option für </a:t>
+            </a:r>
+            <a:r>
+              <a:rPr lang="de-DE" sz="2400" dirty="0" err="1"/>
+              <a:t>Preemptive</a:t>
+            </a:r>
+            <a:r>
+              <a:rPr lang="de-DE" sz="2400" dirty="0"/>
+              <a:t> Mode</a:t>
+            </a:r>
+          </a:p>
+          <a:p>
+            <a:pPr marL="285750" indent="-285750">
+              <a:buFont typeface="Wingdings" panose="05000000000000000000" pitchFamily="2" charset="2"/>
+              <a:buChar char="§"/>
+            </a:pPr>
+            <a:r>
+              <a:rPr lang="de-DE" sz="2400" dirty="0"/>
+              <a:t>Task gleicher Priorität wechseln sich ab</a:t>
+            </a:r>
+          </a:p>
+          <a:p>
+            <a:pPr marL="285750" indent="-285750">
+              <a:buFont typeface="Wingdings" panose="05000000000000000000" pitchFamily="2" charset="2"/>
+              <a:buChar char="§"/>
+            </a:pPr>
+            <a:r>
+              <a:rPr lang="de-DE" sz="2400" dirty="0"/>
+              <a:t>Feste </a:t>
+            </a:r>
+            <a:r>
+              <a:rPr lang="de-DE" sz="2400" dirty="0" err="1"/>
+              <a:t>Schedulingintervalle</a:t>
+            </a:r>
+            <a:endParaRPr lang="de-DE" sz="2400" dirty="0"/>
+          </a:p>
+          <a:p>
+            <a:pPr marL="285750" indent="-285750">
+              <a:buFont typeface="Wingdings" panose="05000000000000000000" pitchFamily="2" charset="2"/>
+              <a:buChar char="§"/>
+            </a:pPr>
+            <a:r>
+              <a:rPr lang="de-DE" sz="2400" dirty="0"/>
+              <a:t>Gewöhnlich zwischen 1 und 100 </a:t>
+            </a:r>
+            <a:r>
+              <a:rPr lang="de-DE" sz="2400" dirty="0" err="1"/>
+              <a:t>ms</a:t>
+            </a:r>
+            <a:r>
+              <a:rPr lang="de-DE" sz="2400" dirty="0"/>
+              <a:t> Tick</a:t>
+            </a:r>
+          </a:p>
+          <a:p>
+            <a:pPr marL="285750" indent="-285750">
+              <a:buFont typeface="Wingdings" panose="05000000000000000000" pitchFamily="2" charset="2"/>
+              <a:buChar char="§"/>
+            </a:pPr>
+            <a:r>
+              <a:rPr lang="de-DE" sz="2400" dirty="0"/>
+              <a:t>Timing basieren auf dem </a:t>
+            </a:r>
+            <a:r>
+              <a:rPr lang="de-DE" sz="2400" dirty="0" err="1"/>
+              <a:t>Systick</a:t>
+            </a:r>
+            <a:endParaRPr lang="de-DE" sz="2400" dirty="0"/>
+          </a:p>
+          <a:p>
+            <a:pPr marL="285750" indent="-285750">
+              <a:buFont typeface="Wingdings" panose="05000000000000000000" pitchFamily="2" charset="2"/>
+              <a:buChar char="§"/>
+            </a:pPr>
+            <a:r>
+              <a:rPr lang="de-DE" sz="2400" dirty="0"/>
+              <a:t>Die wohl am häufigsten verwendete Konfiguration</a:t>
+            </a:r>
+          </a:p>
+          <a:p>
+            <a:endParaRPr lang="de-DE" dirty="0"/>
+          </a:p>
+        </p:txBody>
+      </p:sp>
+      <p:pic>
+        <p:nvPicPr>
+          <p:cNvPr id="9" name="Grafik 8">
+            <a:extLst>
+              <a:ext uri="{FF2B5EF4-FFF2-40B4-BE49-F238E27FC236}">
+                <a16:creationId xmlns:a16="http://schemas.microsoft.com/office/drawing/2014/main" id="{47E3291C-5DE2-4D49-ABA6-35227C50AC65}"/>
+              </a:ext>
+            </a:extLst>
+          </p:cNvPr>
+          <p:cNvPicPr>
+            <a:picLocks noChangeAspect="1"/>
+          </p:cNvPicPr>
+          <p:nvPr/>
+        </p:nvPicPr>
+        <p:blipFill>
+          <a:blip r:embed="rId3">
+            <a:extLst>
+              <a:ext uri="{28A0092B-C50C-407E-A947-70E740481C1C}">
+                <a14:useLocalDpi xmlns:a14="http://schemas.microsoft.com/office/drawing/2010/main" val="0"/>
+              </a:ext>
+            </a:extLst>
+          </a:blip>
+          <a:stretch>
+            <a:fillRect/>
+          </a:stretch>
+        </p:blipFill>
+        <p:spPr>
+          <a:xfrm>
+            <a:off x="381714" y="2002971"/>
+            <a:ext cx="5944834" cy="3695705"/>
+          </a:xfrm>
+          <a:prstGeom prst="rect">
+            <a:avLst/>
+          </a:prstGeom>
+        </p:spPr>
+      </p:pic>
     </p:spTree>
+    <p:custDataLst>
+      <p:tags r:id="rId1"/>
+    </p:custDataLst>
     <p:extLst>
       <p:ext uri="{BB962C8B-B14F-4D97-AF65-F5344CB8AC3E}">
         <p14:creationId xmlns:p14="http://schemas.microsoft.com/office/powerpoint/2010/main" val="3699201216"/>
@@ -16934,7 +17417,7 @@
                             </p:stCondLst>
                             <p:childTnLst>
                               <p:par>
-                                <p:cTn id="5" presetID="3" presetClass="entr" presetSubtype="10" fill="hold" nodeType="clickEffect">
+                                <p:cTn id="5" presetID="3" presetClass="entr" presetSubtype="10" fill="hold" grpId="0" nodeType="clickEffect">
                                   <p:stCondLst>
                                     <p:cond delay="0"/>
                                   </p:stCondLst>
@@ -16947,11 +17430,7 @@
                                           </p:stCondLst>
                                         </p:cTn>
                                         <p:tgtEl>
-                                          <p:spTgt spid="6">
-                                            <p:txEl>
-                                              <p:pRg st="0" end="0"/>
-                                            </p:txEl>
-                                          </p:spTgt>
+                                          <p:spTgt spid="6"/>
                                         </p:tgtEl>
                                         <p:attrNameLst>
                                           <p:attrName>style.visibility</p:attrName>
@@ -16965,11 +17444,7 @@
                                       <p:cBhvr>
                                         <p:cTn id="7" dur="500"/>
                                         <p:tgtEl>
-                                          <p:spTgt spid="6">
-                                            <p:txEl>
-                                              <p:pRg st="0" end="0"/>
-                                            </p:txEl>
-                                          </p:spTgt>
+                                          <p:spTgt spid="6"/>
                                         </p:tgtEl>
                                       </p:cBhvr>
                                     </p:animEffect>
@@ -16995,7 +17470,7 @@
                             </p:stCondLst>
                             <p:childTnLst>
                               <p:par>
-                                <p:cTn id="10" presetID="3" presetClass="entr" presetSubtype="10" fill="hold" nodeType="clickEffect">
+                                <p:cTn id="10" presetID="3" presetClass="entr" presetSubtype="10" fill="hold" grpId="0" nodeType="clickEffect">
                                   <p:stCondLst>
                                     <p:cond delay="0"/>
                                   </p:stCondLst>
@@ -17008,7 +17483,7 @@
                                           </p:stCondLst>
                                         </p:cTn>
                                         <p:tgtEl>
-                                          <p:spTgt spid="5"/>
+                                          <p:spTgt spid="7"/>
                                         </p:tgtEl>
                                         <p:attrNameLst>
                                           <p:attrName>style.visibility</p:attrName>
@@ -17022,10 +17497,55 @@
                                       <p:cBhvr>
                                         <p:cTn id="12" dur="500"/>
                                         <p:tgtEl>
-                                          <p:spTgt spid="5"/>
+                                          <p:spTgt spid="7"/>
                                         </p:tgtEl>
                                       </p:cBhvr>
                                     </p:animEffect>
+                                  </p:childTnLst>
+                                </p:cTn>
+                              </p:par>
+                            </p:childTnLst>
+                          </p:cTn>
+                        </p:par>
+                      </p:childTnLst>
+                    </p:cTn>
+                  </p:par>
+                  <p:par>
+                    <p:cTn id="13" fill="hold">
+                      <p:stCondLst>
+                        <p:cond delay="indefinite"/>
+                      </p:stCondLst>
+                      <p:childTnLst>
+                        <p:par>
+                          <p:cTn id="14" fill="hold">
+                            <p:stCondLst>
+                              <p:cond delay="0"/>
+                            </p:stCondLst>
+                            <p:childTnLst>
+                              <p:par>
+                                <p:cTn id="15" presetID="1" presetClass="entr" presetSubtype="0" fill="hold" nodeType="clickEffect">
+                                  <p:stCondLst>
+                                    <p:cond delay="0"/>
+                                  </p:stCondLst>
+                                  <p:childTnLst>
+                                    <p:set>
+                                      <p:cBhvr>
+                                        <p:cTn id="16" dur="1" fill="hold">
+                                          <p:stCondLst>
+                                            <p:cond delay="0"/>
+                                          </p:stCondLst>
+                                        </p:cTn>
+                                        <p:tgtEl>
+                                          <p:spTgt spid="9"/>
+                                        </p:tgtEl>
+                                        <p:attrNameLst>
+                                          <p:attrName>style.visibility</p:attrName>
+                                        </p:attrNameLst>
+                                      </p:cBhvr>
+                                      <p:to>
+                                        <p:strVal val="visible"/>
+                                      </p:to>
+                                    </p:set>
                                   </p:childTnLst>
                                 </p:cTn>
                               </p:par>
@@ -17056,6 +17576,10 @@
         </p:cTn>
       </p:par>
     </p:tnLst>
+    <p:bldLst>
+      <p:bldP spid="6" grpId="0"/>
+      <p:bldP spid="7" grpId="0"/>
+    </p:bldLst>
   </p:timing>
 </p:sld>
 </file>
@@ -17217,400 +17741,6 @@
           <p:cNvPr id="2" name="Titel 1">
             <a:extLst>
               <a:ext uri="{FF2B5EF4-FFF2-40B4-BE49-F238E27FC236}">
-                <a16:creationId xmlns:a16="http://schemas.microsoft.com/office/drawing/2014/main" id="{58ADEC9F-BEB8-403E-B5B2-21FB12CBD397}"/>
-              </a:ext>
-            </a:extLst>
-          </p:cNvPr>
-          <p:cNvSpPr>
-            <a:spLocks noGrp="1"/>
-          </p:cNvSpPr>
-          <p:nvPr>
-            <p:ph type="title"/>
-          </p:nvPr>
-        </p:nvSpPr>
-        <p:spPr/>
-        <p:txBody>
-          <a:bodyPr/>
-          <a:lstStyle/>
-          <a:p>
-            <a:r>
-              <a:rPr lang="de-DE" dirty="0"/>
-              <a:t>Time </a:t>
-            </a:r>
-            <a:r>
-              <a:rPr lang="de-DE" dirty="0" err="1"/>
-              <a:t>Slicing</a:t>
-            </a:r>
-            <a:endParaRPr lang="de-DE" dirty="0"/>
-          </a:p>
-        </p:txBody>
-      </p:sp>
-      <p:sp>
-        <p:nvSpPr>
-          <p:cNvPr id="4" name="Fußzeilenplatzhalter 3">
-            <a:extLst>
-              <a:ext uri="{FF2B5EF4-FFF2-40B4-BE49-F238E27FC236}">
-                <a16:creationId xmlns:a16="http://schemas.microsoft.com/office/drawing/2014/main" id="{0CE2668C-D1E6-4735-8A01-AC8511ED42F9}"/>
-              </a:ext>
-            </a:extLst>
-          </p:cNvPr>
-          <p:cNvSpPr>
-            <a:spLocks noGrp="1"/>
-          </p:cNvSpPr>
-          <p:nvPr>
-            <p:ph type="ftr" sz="quarter" idx="11"/>
-          </p:nvPr>
-        </p:nvSpPr>
-        <p:spPr/>
-        <p:txBody>
-          <a:bodyPr/>
-          <a:lstStyle/>
-          <a:p>
-            <a:r>
-              <a:rPr lang="de-DE" dirty="0"/>
-              <a:t>Scheduling</a:t>
-            </a:r>
-          </a:p>
-        </p:txBody>
-      </p:sp>
-      <p:pic>
-        <p:nvPicPr>
-          <p:cNvPr id="5" name="Grafik 4">
-            <a:extLst>
-              <a:ext uri="{FF2B5EF4-FFF2-40B4-BE49-F238E27FC236}">
-                <a16:creationId xmlns:a16="http://schemas.microsoft.com/office/drawing/2014/main" id="{B9F5065B-2E9D-498C-BA83-A908F5070135}"/>
-              </a:ext>
-            </a:extLst>
-          </p:cNvPr>
-          <p:cNvPicPr>
-            <a:picLocks noChangeAspect="1"/>
-          </p:cNvPicPr>
-          <p:nvPr/>
-        </p:nvPicPr>
-        <p:blipFill rotWithShape="1">
-          <a:blip r:embed="rId2" cstate="print"/>
-          <a:srcRect l="1982" b="27106"/>
-          <a:stretch/>
-        </p:blipFill>
-        <p:spPr>
-          <a:xfrm>
-            <a:off x="0" y="1690688"/>
-            <a:ext cx="6331505" cy="2145334"/>
-          </a:xfrm>
-          <a:prstGeom prst="rect">
-            <a:avLst/>
-          </a:prstGeom>
-        </p:spPr>
-      </p:pic>
-      <p:sp>
-        <p:nvSpPr>
-          <p:cNvPr id="6" name="Textfeld 5">
-            <a:extLst>
-              <a:ext uri="{FF2B5EF4-FFF2-40B4-BE49-F238E27FC236}">
-                <a16:creationId xmlns:a16="http://schemas.microsoft.com/office/drawing/2014/main" id="{31FAE22D-5880-4263-A828-EC45E634728F}"/>
-              </a:ext>
-            </a:extLst>
-          </p:cNvPr>
-          <p:cNvSpPr txBox="1"/>
-          <p:nvPr/>
-        </p:nvSpPr>
-        <p:spPr>
-          <a:xfrm>
-            <a:off x="6331505" y="2439158"/>
-            <a:ext cx="5532120" cy="2954655"/>
-          </a:xfrm>
-          <a:prstGeom prst="rect">
-            <a:avLst/>
-          </a:prstGeom>
-          <a:noFill/>
-        </p:spPr>
-        <p:txBody>
-          <a:bodyPr wrap="square" rtlCol="0">
-            <a:spAutoFit/>
-          </a:bodyPr>
-          <a:lstStyle/>
-          <a:p>
-            <a:pPr marL="285750" indent="-285750">
-              <a:buFont typeface="Wingdings" panose="05000000000000000000" pitchFamily="2" charset="2"/>
-              <a:buChar char="§"/>
-            </a:pPr>
-            <a:r>
-              <a:rPr lang="de-DE" sz="2400" dirty="0"/>
-              <a:t>Option für </a:t>
-            </a:r>
-            <a:r>
-              <a:rPr lang="de-DE" sz="2400" dirty="0" err="1"/>
-              <a:t>Preemptive</a:t>
-            </a:r>
-            <a:r>
-              <a:rPr lang="de-DE" sz="2400" dirty="0"/>
-              <a:t> Mode</a:t>
-            </a:r>
-          </a:p>
-          <a:p>
-            <a:pPr marL="285750" indent="-285750">
-              <a:buFont typeface="Wingdings" panose="05000000000000000000" pitchFamily="2" charset="2"/>
-              <a:buChar char="§"/>
-            </a:pPr>
-            <a:r>
-              <a:rPr lang="de-DE" sz="2400" dirty="0"/>
-              <a:t>Task gleicher Priorität wechseln sich ab</a:t>
-            </a:r>
-          </a:p>
-          <a:p>
-            <a:pPr marL="285750" indent="-285750">
-              <a:buFont typeface="Wingdings" panose="05000000000000000000" pitchFamily="2" charset="2"/>
-              <a:buChar char="§"/>
-            </a:pPr>
-            <a:r>
-              <a:rPr lang="de-DE" sz="2400" dirty="0"/>
-              <a:t>Feste </a:t>
-            </a:r>
-            <a:r>
-              <a:rPr lang="de-DE" sz="2400" dirty="0" err="1"/>
-              <a:t>Schedulingintervalle</a:t>
-            </a:r>
-            <a:endParaRPr lang="de-DE" sz="2400" dirty="0"/>
-          </a:p>
-          <a:p>
-            <a:pPr marL="285750" indent="-285750">
-              <a:buFont typeface="Wingdings" panose="05000000000000000000" pitchFamily="2" charset="2"/>
-              <a:buChar char="§"/>
-            </a:pPr>
-            <a:r>
-              <a:rPr lang="de-DE" sz="2400" dirty="0"/>
-              <a:t>Gewöhnlich zwischen 1 und 100 </a:t>
-            </a:r>
-            <a:r>
-              <a:rPr lang="de-DE" sz="2400" dirty="0" err="1"/>
-              <a:t>ms</a:t>
-            </a:r>
-            <a:r>
-              <a:rPr lang="de-DE" sz="2400" dirty="0"/>
-              <a:t> Tick</a:t>
-            </a:r>
-          </a:p>
-          <a:p>
-            <a:pPr marL="285750" indent="-285750">
-              <a:buFont typeface="Wingdings" panose="05000000000000000000" pitchFamily="2" charset="2"/>
-              <a:buChar char="§"/>
-            </a:pPr>
-            <a:r>
-              <a:rPr lang="de-DE" sz="2400" dirty="0"/>
-              <a:t>Timing basieren auf dem </a:t>
-            </a:r>
-            <a:r>
-              <a:rPr lang="de-DE" sz="2400" dirty="0" err="1"/>
-              <a:t>Systick</a:t>
-            </a:r>
-            <a:endParaRPr lang="de-DE" sz="2400" dirty="0"/>
-          </a:p>
-          <a:p>
-            <a:pPr marL="285750" indent="-285750">
-              <a:buFont typeface="Wingdings" panose="05000000000000000000" pitchFamily="2" charset="2"/>
-              <a:buChar char="§"/>
-            </a:pPr>
-            <a:r>
-              <a:rPr lang="de-DE" sz="2400" dirty="0"/>
-              <a:t>Die wohl am häufigsten verwendete Konfiguration</a:t>
-            </a:r>
-          </a:p>
-          <a:p>
-            <a:endParaRPr lang="de-DE" dirty="0"/>
-          </a:p>
-        </p:txBody>
-      </p:sp>
-      <p:pic>
-        <p:nvPicPr>
-          <p:cNvPr id="7" name="Grafik 6">
-            <a:extLst>
-              <a:ext uri="{FF2B5EF4-FFF2-40B4-BE49-F238E27FC236}">
-                <a16:creationId xmlns:a16="http://schemas.microsoft.com/office/drawing/2014/main" id="{D829BEF9-9AB3-4B0A-A7B1-BCC8900D9E73}"/>
-              </a:ext>
-            </a:extLst>
-          </p:cNvPr>
-          <p:cNvPicPr>
-            <a:picLocks noChangeAspect="1"/>
-          </p:cNvPicPr>
-          <p:nvPr/>
-        </p:nvPicPr>
-        <p:blipFill>
-          <a:blip r:embed="rId3" cstate="print">
-            <a:extLst>
-              <a:ext uri="{28A0092B-C50C-407E-A947-70E740481C1C}">
-                <a14:useLocalDpi xmlns:a14="http://schemas.microsoft.com/office/drawing/2010/main" val="0"/>
-              </a:ext>
-            </a:extLst>
-          </a:blip>
-          <a:stretch>
-            <a:fillRect/>
-          </a:stretch>
-        </p:blipFill>
-        <p:spPr>
-          <a:xfrm>
-            <a:off x="916296" y="4027087"/>
-            <a:ext cx="5037257" cy="1912786"/>
-          </a:xfrm>
-          <a:prstGeom prst="rect">
-            <a:avLst/>
-          </a:prstGeom>
-        </p:spPr>
-      </p:pic>
-    </p:spTree>
-    <p:extLst>
-      <p:ext uri="{BB962C8B-B14F-4D97-AF65-F5344CB8AC3E}">
-        <p14:creationId xmlns:p14="http://schemas.microsoft.com/office/powerpoint/2010/main" val="2493996157"/>
-      </p:ext>
-    </p:extLst>
-  </p:cSld>
-  <p:clrMapOvr>
-    <a:masterClrMapping/>
-  </p:clrMapOvr>
-  <p:timing>
-    <p:tnLst>
-      <p:par>
-        <p:cTn id="1" dur="indefinite" restart="never" nodeType="tmRoot">
-          <p:childTnLst>
-            <p:seq concurrent="1" nextAc="seek">
-              <p:cTn id="2" dur="indefinite" nodeType="mainSeq">
-                <p:childTnLst>
-                  <p:par>
-                    <p:cTn id="3" fill="hold">
-                      <p:stCondLst>
-                        <p:cond delay="indefinite"/>
-                      </p:stCondLst>
-                      <p:childTnLst>
-                        <p:par>
-                          <p:cTn id="4" fill="hold">
-                            <p:stCondLst>
-                              <p:cond delay="0"/>
-                            </p:stCondLst>
-                            <p:childTnLst>
-                              <p:par>
-                                <p:cTn id="5" presetID="1" presetClass="entr" presetSubtype="0" fill="hold" nodeType="clickEffect">
-                                  <p:stCondLst>
-                                    <p:cond delay="0"/>
-                                  </p:stCondLst>
-                                  <p:childTnLst>
-                                    <p:set>
-                                      <p:cBhvr>
-                                        <p:cTn id="6" dur="1" fill="hold">
-                                          <p:stCondLst>
-                                            <p:cond delay="0"/>
-                                          </p:stCondLst>
-                                        </p:cTn>
-                                        <p:tgtEl>
-                                          <p:spTgt spid="5"/>
-                                        </p:tgtEl>
-                                        <p:attrNameLst>
-                                          <p:attrName>style.visibility</p:attrName>
-                                        </p:attrNameLst>
-                                      </p:cBhvr>
-                                      <p:to>
-                                        <p:strVal val="visible"/>
-                                      </p:to>
-                                    </p:set>
-                                  </p:childTnLst>
-                                </p:cTn>
-                              </p:par>
-                            </p:childTnLst>
-                          </p:cTn>
-                        </p:par>
-                      </p:childTnLst>
-                    </p:cTn>
-                  </p:par>
-                  <p:par>
-                    <p:cTn id="7" fill="hold">
-                      <p:stCondLst>
-                        <p:cond delay="indefinite"/>
-                      </p:stCondLst>
-                      <p:childTnLst>
-                        <p:par>
-                          <p:cTn id="8" fill="hold">
-                            <p:stCondLst>
-                              <p:cond delay="0"/>
-                            </p:stCondLst>
-                            <p:childTnLst>
-                              <p:par>
-                                <p:cTn id="9" presetID="1" presetClass="entr" presetSubtype="0" fill="hold" nodeType="clickEffect">
-                                  <p:stCondLst>
-                                    <p:cond delay="0"/>
-                                  </p:stCondLst>
-                                  <p:childTnLst>
-                                    <p:set>
-                                      <p:cBhvr>
-                                        <p:cTn id="10" dur="1" fill="hold">
-                                          <p:stCondLst>
-                                            <p:cond delay="0"/>
-                                          </p:stCondLst>
-                                        </p:cTn>
-                                        <p:tgtEl>
-                                          <p:spTgt spid="7"/>
-                                        </p:tgtEl>
-                                        <p:attrNameLst>
-                                          <p:attrName>style.visibility</p:attrName>
-                                        </p:attrNameLst>
-                                      </p:cBhvr>
-                                      <p:to>
-                                        <p:strVal val="visible"/>
-                                      </p:to>
-                                    </p:set>
-                                  </p:childTnLst>
-                                </p:cTn>
-                              </p:par>
-                            </p:childTnLst>
-                          </p:cTn>
-                        </p:par>
-                      </p:childTnLst>
-                    </p:cTn>
-                  </p:par>
-                </p:childTnLst>
-              </p:cTn>
-              <p:prevCondLst>
-                <p:cond evt="onPrev" delay="0">
-                  <p:tgtEl>
-                    <p:sldTgt/>
-                  </p:tgtEl>
-                </p:cond>
-              </p:prevCondLst>
-              <p:nextCondLst>
-                <p:cond evt="onNext" delay="0">
-                  <p:tgtEl>
-                    <p:sldTgt/>
-                  </p:tgtEl>
-                </p:cond>
-              </p:nextCondLst>
-            </p:seq>
-          </p:childTnLst>
-        </p:cTn>
-      </p:par>
-    </p:tnLst>
-  </p:timing>
-</p:sld>
-</file>
-
-<file path=ppt/slides/slide21.xml><?xml version="1.0" encoding="utf-8"?>
-<p:sld xmlns:a="http://schemas.openxmlformats.org/drawingml/2006/main" xmlns:r="http://schemas.openxmlformats.org/officeDocument/2006/relationships" xmlns:p="http://schemas.openxmlformats.org/presentationml/2006/main">
-  <p:cSld>
-    <p:spTree>
-      <p:nvGrpSpPr>
-        <p:cNvPr id="1" name=""/>
-        <p:cNvGrpSpPr/>
-        <p:nvPr/>
-      </p:nvGrpSpPr>
-      <p:grpSpPr>
-        <a:xfrm>
-          <a:off x="0" y="0"/>
-          <a:ext cx="0" cy="0"/>
-          <a:chOff x="0" y="0"/>
-          <a:chExt cx="0" cy="0"/>
-        </a:xfrm>
-      </p:grpSpPr>
-      <p:sp>
-        <p:nvSpPr>
-          <p:cNvPr id="2" name="Titel 1">
-            <a:extLst>
-              <a:ext uri="{FF2B5EF4-FFF2-40B4-BE49-F238E27FC236}">
                 <a16:creationId xmlns:a16="http://schemas.microsoft.com/office/drawing/2014/main" id="{6084AF4F-AC12-4EDD-9431-0C1B33265C9C}"/>
               </a:ext>
             </a:extLst>
@@ -17741,6 +17871,10 @@
           <a:p>
             <a:pPr lvl="1"/>
             <a:r>
+              <a:rPr lang="de-DE" dirty="0"/>
+              <a:t>Ermittlung </a:t>
+            </a:r>
+            <a:r>
               <a:rPr lang="de-DE" dirty="0" err="1"/>
               <a:t>Worst</a:t>
             </a:r>
@@ -17769,7 +17903,7 @@
             <a:pPr lvl="1"/>
             <a:r>
               <a:rPr lang="de-DE" dirty="0"/>
-              <a:t>RMA / DMA</a:t>
+              <a:t>Prioritätenzuweisung  mittels RMA (Rate Monotonic Analysis) / DMA</a:t>
             </a:r>
           </a:p>
           <a:p>
@@ -17846,6 +17980,9 @@
         </p:txBody>
       </p:sp>
     </p:spTree>
+    <p:custDataLst>
+      <p:tags r:id="rId1"/>
+    </p:custDataLst>
     <p:extLst>
       <p:ext uri="{BB962C8B-B14F-4D97-AF65-F5344CB8AC3E}">
         <p14:creationId xmlns:p14="http://schemas.microsoft.com/office/powerpoint/2010/main" val="2335887233"/>
@@ -18458,8 +18595,8 @@
 </p:sld>
 </file>
 
-<file path=ppt/slides/slide22.xml><?xml version="1.0" encoding="utf-8"?>
-<p:sld xmlns:a="http://schemas.openxmlformats.org/drawingml/2006/main" xmlns:r="http://schemas.openxmlformats.org/officeDocument/2006/relationships" xmlns:p="http://schemas.openxmlformats.org/presentationml/2006/main">
+<file path=ppt/slides/slide21.xml><?xml version="1.0" encoding="utf-8"?>
+<p:sld xmlns:a="http://schemas.openxmlformats.org/drawingml/2006/main" xmlns:r="http://schemas.openxmlformats.org/officeDocument/2006/relationships" xmlns:p="http://schemas.openxmlformats.org/presentationml/2006/main" show="0">
   <p:cSld>
     <p:spTree>
       <p:nvGrpSpPr>
@@ -19437,8 +19574,8 @@
 </p:sld>
 </file>
 
-<file path=ppt/slides/slide23.xml><?xml version="1.0" encoding="utf-8"?>
-<p:sld xmlns:a="http://schemas.openxmlformats.org/drawingml/2006/main" xmlns:r="http://schemas.openxmlformats.org/officeDocument/2006/relationships" xmlns:p="http://schemas.openxmlformats.org/presentationml/2006/main">
+<file path=ppt/slides/slide22.xml><?xml version="1.0" encoding="utf-8"?>
+<p:sld xmlns:a="http://schemas.openxmlformats.org/drawingml/2006/main" xmlns:r="http://schemas.openxmlformats.org/officeDocument/2006/relationships" xmlns:p="http://schemas.openxmlformats.org/presentationml/2006/main" show="0">
   <p:cSld>
     <p:spTree>
       <p:nvGrpSpPr>
@@ -23734,7 +23871,7 @@
 </p:sld>
 </file>
 
-<file path=ppt/slides/slide24.xml><?xml version="1.0" encoding="utf-8"?>
+<file path=ppt/slides/slide23.xml><?xml version="1.0" encoding="utf-8"?>
 <p:sld xmlns:a="http://schemas.openxmlformats.org/drawingml/2006/main" xmlns:r="http://schemas.openxmlformats.org/officeDocument/2006/relationships" xmlns:p="http://schemas.openxmlformats.org/presentationml/2006/main">
   <p:cSld>
     <p:spTree>
@@ -23802,38 +23939,38 @@
           <a:p>
             <a:r>
               <a:rPr lang="de-DE" dirty="0"/>
-              <a:t>Weitere Abstraktionsschicht</a:t>
-            </a:r>
-          </a:p>
-          <a:p>
-            <a:pPr lvl="1"/>
+              <a:t>RTOS wie Middleware weitere Abstraktionsschicht</a:t>
+            </a:r>
+          </a:p>
+          <a:p>
             <a:r>
               <a:rPr lang="de-DE" dirty="0"/>
-              <a:t>RTOS Elemente nicht sichtbar</a:t>
-            </a:r>
-          </a:p>
-          <a:p>
-            <a:pPr lvl="1"/>
-            <a:r>
-              <a:rPr lang="de-DE" dirty="0" err="1"/>
-              <a:t>Timingbeeiflussung</a:t>
-            </a:r>
+              <a:t>Analyse Tools beeinflussen Timings</a:t>
+            </a:r>
+          </a:p>
+          <a:p>
+            <a:r>
+              <a:rPr lang="de-DE" dirty="0"/>
+              <a:t>Fehler treten erst auf nachdem Task ausgelagert wurde</a:t>
+            </a:r>
+          </a:p>
+          <a:p>
+            <a:r>
+              <a:rPr lang="de-DE" dirty="0"/>
+              <a:t>Schwer zu erkennen ohne geeignete Tools</a:t>
+            </a:r>
+          </a:p>
+          <a:p>
             <a:endParaRPr lang="de-DE" dirty="0"/>
           </a:p>
           <a:p>
-            <a:pPr lvl="1"/>
             <a:endParaRPr lang="de-DE" dirty="0"/>
           </a:p>
           <a:p>
-            <a:pPr lvl="1"/>
             <a:endParaRPr lang="de-DE" dirty="0"/>
           </a:p>
           <a:p>
-            <a:pPr lvl="1"/>
-            <a:r>
-              <a:rPr lang="de-DE" dirty="0"/>
-              <a:t>WORK in Progress…</a:t>
-            </a:r>
+            <a:endParaRPr lang="de-DE" dirty="0"/>
           </a:p>
         </p:txBody>
       </p:sp>
@@ -24294,7 +24431,7 @@
 </p:sld>
 </file>
 
-<file path=ppt/slides/slide25.xml><?xml version="1.0" encoding="utf-8"?>
+<file path=ppt/slides/slide24.xml><?xml version="1.0" encoding="utf-8"?>
 <p:sld xmlns:a="http://schemas.openxmlformats.org/drawingml/2006/main" xmlns:r="http://schemas.openxmlformats.org/officeDocument/2006/relationships" xmlns:p="http://schemas.openxmlformats.org/presentationml/2006/main">
   <p:cSld>
     <p:spTree>
@@ -24506,7 +24643,7 @@
           <p:nvPr/>
         </p:nvPicPr>
         <p:blipFill>
-          <a:blip r:embed="rId3" cstate="print">
+          <a:blip r:embed="rId4" cstate="print">
             <a:extLst>
               <a:ext uri="{28A0092B-C50C-407E-A947-70E740481C1C}">
                 <a14:useLocalDpi xmlns:a14="http://schemas.microsoft.com/office/drawing/2010/main" val="0"/>
@@ -24553,7 +24690,7 @@
           <p:nvPr/>
         </p:nvPicPr>
         <p:blipFill>
-          <a:blip r:embed="rId4" cstate="print">
+          <a:blip r:embed="rId5" cstate="print">
             <a:extLst>
               <a:ext uri="{28A0092B-C50C-407E-A947-70E740481C1C}">
                 <a14:useLocalDpi xmlns:a14="http://schemas.microsoft.com/office/drawing/2010/main" val="0"/>
@@ -24600,7 +24737,7 @@
           <p:nvPr/>
         </p:nvPicPr>
         <p:blipFill>
-          <a:blip r:embed="rId5" cstate="print">
+          <a:blip r:embed="rId6" cstate="print">
             <a:extLst>
               <a:ext uri="{28A0092B-C50C-407E-A947-70E740481C1C}">
                 <a14:useLocalDpi xmlns:a14="http://schemas.microsoft.com/office/drawing/2010/main" val="0"/>
@@ -25447,6 +25584,9 @@
         </p:style>
       </p:cxnSp>
     </p:spTree>
+    <p:custDataLst>
+      <p:tags r:id="rId1"/>
+    </p:custDataLst>
     <p:extLst>
       <p:ext uri="{BB962C8B-B14F-4D97-AF65-F5344CB8AC3E}">
         <p14:creationId xmlns:p14="http://schemas.microsoft.com/office/powerpoint/2010/main" val="3574650683"/>
@@ -26513,7 +26653,7 @@
           </p:nvPr>
         </p:nvPicPr>
         <p:blipFill rotWithShape="1">
-          <a:blip r:embed="rId3" cstate="print"/>
+          <a:blip r:embed="rId4" cstate="print"/>
           <a:srcRect t="6105"/>
           <a:stretch/>
         </p:blipFill>
@@ -26570,7 +26710,7 @@
           <p:nvPr/>
         </p:nvPicPr>
         <p:blipFill rotWithShape="1">
-          <a:blip r:embed="rId4" cstate="print"/>
+          <a:blip r:embed="rId5" cstate="print"/>
           <a:srcRect t="8205"/>
           <a:stretch/>
         </p:blipFill>
@@ -26816,6 +26956,9 @@
         </p:txBody>
       </p:sp>
     </p:spTree>
+    <p:custDataLst>
+      <p:tags r:id="rId1"/>
+    </p:custDataLst>
     <p:extLst>
       <p:ext uri="{BB962C8B-B14F-4D97-AF65-F5344CB8AC3E}">
         <p14:creationId xmlns:p14="http://schemas.microsoft.com/office/powerpoint/2010/main" val="4043006265"/>
@@ -27255,7 +27398,7 @@
 </file>
 
 <file path=ppt/slides/slide6.xml><?xml version="1.0" encoding="utf-8"?>
-<p:sld xmlns:a="http://schemas.openxmlformats.org/drawingml/2006/main" xmlns:r="http://schemas.openxmlformats.org/officeDocument/2006/relationships" xmlns:p="http://schemas.openxmlformats.org/presentationml/2006/main">
+<p:sld xmlns:a="http://schemas.openxmlformats.org/drawingml/2006/main" xmlns:r="http://schemas.openxmlformats.org/officeDocument/2006/relationships" xmlns:p="http://schemas.openxmlformats.org/presentationml/2006/main" show="0">
   <p:cSld>
     <p:spTree>
       <p:nvGrpSpPr>
@@ -28029,7 +28172,7 @@
 </file>
 
 <file path=ppt/slides/slide7.xml><?xml version="1.0" encoding="utf-8"?>
-<p:sld xmlns:a="http://schemas.openxmlformats.org/drawingml/2006/main" xmlns:r="http://schemas.openxmlformats.org/officeDocument/2006/relationships" xmlns:p="http://schemas.openxmlformats.org/presentationml/2006/main">
+<p:sld xmlns:a="http://schemas.openxmlformats.org/drawingml/2006/main" xmlns:r="http://schemas.openxmlformats.org/officeDocument/2006/relationships" xmlns:p="http://schemas.openxmlformats.org/presentationml/2006/main" show="0">
   <p:cSld>
     <p:spTree>
       <p:nvGrpSpPr>
@@ -28551,7 +28694,7 @@
 </file>
 
 <file path=ppt/slides/slide8.xml><?xml version="1.0" encoding="utf-8"?>
-<p:sld xmlns:a="http://schemas.openxmlformats.org/drawingml/2006/main" xmlns:r="http://schemas.openxmlformats.org/officeDocument/2006/relationships" xmlns:p="http://schemas.openxmlformats.org/presentationml/2006/main">
+<p:sld xmlns:a="http://schemas.openxmlformats.org/drawingml/2006/main" xmlns:r="http://schemas.openxmlformats.org/officeDocument/2006/relationships" xmlns:p="http://schemas.openxmlformats.org/presentationml/2006/main" show="0">
   <p:cSld>
     <p:spTree>
       <p:nvGrpSpPr>
@@ -29839,7 +29982,7 @@
 </file>
 
 <file path=ppt/slides/slide9.xml><?xml version="1.0" encoding="utf-8"?>
-<p:sld xmlns:a="http://schemas.openxmlformats.org/drawingml/2006/main" xmlns:r="http://schemas.openxmlformats.org/officeDocument/2006/relationships" xmlns:p="http://schemas.openxmlformats.org/presentationml/2006/main">
+<p:sld xmlns:a="http://schemas.openxmlformats.org/drawingml/2006/main" xmlns:r="http://schemas.openxmlformats.org/officeDocument/2006/relationships" xmlns:p="http://schemas.openxmlformats.org/presentationml/2006/main" show="0">
   <p:cSld>
     <p:spTree>
       <p:nvGrpSpPr>
@@ -30712,6 +30855,72 @@
     </p:tnLst>
   </p:timing>
 </p:sld>
+</file>
+
+<file path=ppt/tags/tag1.xml><?xml version="1.0" encoding="utf-8"?>
+<p:tagLst xmlns:a="http://schemas.openxmlformats.org/drawingml/2006/main" xmlns:r="http://schemas.openxmlformats.org/officeDocument/2006/relationships" xmlns:p="http://schemas.openxmlformats.org/presentationml/2006/main">
+  <p:tag name="TIMING" val="|32.6|0.9|0.5|11.7|39|6.9|0.4|22.9"/>
+</p:tagLst>
+</file>
+
+<file path=ppt/tags/tag10.xml><?xml version="1.0" encoding="utf-8"?>
+<p:tagLst xmlns:a="http://schemas.openxmlformats.org/drawingml/2006/main" xmlns:r="http://schemas.openxmlformats.org/officeDocument/2006/relationships" xmlns:p="http://schemas.openxmlformats.org/presentationml/2006/main">
+  <p:tag name="TIMING" val="|1.3|18.4"/>
+</p:tagLst>
+</file>
+
+<file path=ppt/tags/tag11.xml><?xml version="1.0" encoding="utf-8"?>
+<p:tagLst xmlns:a="http://schemas.openxmlformats.org/drawingml/2006/main" xmlns:r="http://schemas.openxmlformats.org/officeDocument/2006/relationships" xmlns:p="http://schemas.openxmlformats.org/presentationml/2006/main">
+  <p:tag name="TIMING" val="|13.9|46.5|56"/>
+</p:tagLst>
+</file>
+
+<file path=ppt/tags/tag2.xml><?xml version="1.0" encoding="utf-8"?>
+<p:tagLst xmlns:a="http://schemas.openxmlformats.org/drawingml/2006/main" xmlns:r="http://schemas.openxmlformats.org/officeDocument/2006/relationships" xmlns:p="http://schemas.openxmlformats.org/presentationml/2006/main">
+  <p:tag name="TIMING" val="|0.8|0.7|0.3|0.2"/>
+</p:tagLst>
+</file>
+
+<file path=ppt/tags/tag3.xml><?xml version="1.0" encoding="utf-8"?>
+<p:tagLst xmlns:a="http://schemas.openxmlformats.org/drawingml/2006/main" xmlns:r="http://schemas.openxmlformats.org/officeDocument/2006/relationships" xmlns:p="http://schemas.openxmlformats.org/presentationml/2006/main">
+  <p:tag name="TIMING" val="|0.7|0.7|0.9|0.9|0.5"/>
+</p:tagLst>
+</file>
+
+<file path=ppt/tags/tag4.xml><?xml version="1.0" encoding="utf-8"?>
+<p:tagLst xmlns:a="http://schemas.openxmlformats.org/drawingml/2006/main" xmlns:r="http://schemas.openxmlformats.org/officeDocument/2006/relationships" xmlns:p="http://schemas.openxmlformats.org/presentationml/2006/main">
+  <p:tag name="TIMING" val="|9.2|35.8"/>
+</p:tagLst>
+</file>
+
+<file path=ppt/tags/tag5.xml><?xml version="1.0" encoding="utf-8"?>
+<p:tagLst xmlns:a="http://schemas.openxmlformats.org/drawingml/2006/main" xmlns:r="http://schemas.openxmlformats.org/officeDocument/2006/relationships" xmlns:p="http://schemas.openxmlformats.org/presentationml/2006/main">
+  <p:tag name="TIMING" val="|5.6|3.6|1.9|47.2"/>
+</p:tagLst>
+</file>
+
+<file path=ppt/tags/tag6.xml><?xml version="1.0" encoding="utf-8"?>
+<p:tagLst xmlns:a="http://schemas.openxmlformats.org/drawingml/2006/main" xmlns:r="http://schemas.openxmlformats.org/officeDocument/2006/relationships" xmlns:p="http://schemas.openxmlformats.org/presentationml/2006/main">
+  <p:tag name="TIMING" val="|0.9|40"/>
+</p:tagLst>
+</file>
+
+<file path=ppt/tags/tag7.xml><?xml version="1.0" encoding="utf-8"?>
+<p:tagLst xmlns:a="http://schemas.openxmlformats.org/drawingml/2006/main" xmlns:r="http://schemas.openxmlformats.org/officeDocument/2006/relationships" xmlns:p="http://schemas.openxmlformats.org/presentationml/2006/main">
+  <p:tag name="TIMING" val="|0.9|18.2|25.7|21.7|13.7|7|23.5"/>
+</p:tagLst>
+</file>
+
+<file path=ppt/tags/tag8.xml><?xml version="1.0" encoding="utf-8"?>
+<p:tagLst xmlns:a="http://schemas.openxmlformats.org/drawingml/2006/main" xmlns:r="http://schemas.openxmlformats.org/officeDocument/2006/relationships" xmlns:p="http://schemas.openxmlformats.org/presentationml/2006/main">
+  <p:tag name="TIMING" val="|7.4|74.9|27.6"/>
+</p:tagLst>
+</file>
+
+<file path=ppt/tags/tag9.xml><?xml version="1.0" encoding="utf-8"?>
+<p:tagLst xmlns:a="http://schemas.openxmlformats.org/drawingml/2006/main" xmlns:r="http://schemas.openxmlformats.org/officeDocument/2006/relationships" xmlns:p="http://schemas.openxmlformats.org/presentationml/2006/main">
+  <p:tag name="TIMING" val="|1.7|2.4|7.3|61.7"/>
+</p:tagLst>
 </file>
 
 <file path=ppt/theme/theme1.xml><?xml version="1.0" encoding="utf-8"?>

</xml_diff>

<commit_message>
small changes to reduce speaktime
</commit_message>
<xml_diff>
--- a/Päsi/Seminar Betriebssysteme.pptx
+++ b/Päsi/Seminar Betriebssysteme.pptx
@@ -136,7 +136,7 @@
   </p:defaultTextStyle>
   <p:extLst>
     <p:ext uri="{EFAFB233-063F-42B5-8137-9DF3F51BA10A}">
-      <p15:sldGuideLst xmlns:p15="http://schemas.microsoft.com/office/powerpoint/2012/main" xmlns="">
+      <p15:sldGuideLst xmlns:p15="http://schemas.microsoft.com/office/powerpoint/2012/main">
         <p15:guide id="1" orient="horz" pos="2160">
           <p15:clr>
             <a:srgbClr val="A4A3A4"/>
@@ -150,7 +150,7 @@
       </p15:sldGuideLst>
     </p:ext>
     <p:ext uri="{2D200454-40CA-4A62-9FC3-DE9A4176ACB9}">
-      <p15:notesGuideLst xmlns:p15="http://schemas.microsoft.com/office/powerpoint/2012/main" xmlns=""/>
+      <p15:notesGuideLst xmlns:p15="http://schemas.microsoft.com/office/powerpoint/2012/main"/>
     </p:ext>
   </p:extLst>
 </p:presentation>
@@ -187,7 +187,7 @@
           <p:cNvPr id="2" name="Kopfzeilenplatzhalter 1">
             <a:extLst>
               <a:ext uri="{FF2B5EF4-FFF2-40B4-BE49-F238E27FC236}">
-                <a16:creationId xmlns:a16="http://schemas.microsoft.com/office/drawing/2014/main" xmlns="" id="{79677087-83A3-4454-81D0-8574E90505DF}"/>
+                <a16:creationId xmlns:a16="http://schemas.microsoft.com/office/drawing/2014/main" id="{79677087-83A3-4454-81D0-8574E90505DF}"/>
               </a:ext>
             </a:extLst>
           </p:cNvPr>
@@ -224,7 +224,7 @@
           <p:cNvPr id="3" name="Datumsplatzhalter 2">
             <a:extLst>
               <a:ext uri="{FF2B5EF4-FFF2-40B4-BE49-F238E27FC236}">
-                <a16:creationId xmlns:a16="http://schemas.microsoft.com/office/drawing/2014/main" xmlns="" id="{544817FC-7EC0-4090-84C4-8F2F13CBD903}"/>
+                <a16:creationId xmlns:a16="http://schemas.microsoft.com/office/drawing/2014/main" id="{544817FC-7EC0-4090-84C4-8F2F13CBD903}"/>
               </a:ext>
             </a:extLst>
           </p:cNvPr>
@@ -255,7 +255,7 @@
             <a:fld id="{4F336489-14E1-462A-B32E-B31B9D8DDB1E}" type="datetimeFigureOut">
               <a:rPr lang="de-DE" smtClean="0"/>
               <a:pPr/>
-              <a:t>04.07.2017</a:t>
+              <a:t>05.07.2017</a:t>
             </a:fld>
             <a:endParaRPr lang="de-DE"/>
           </a:p>
@@ -266,7 +266,7 @@
           <p:cNvPr id="4" name="Fußzeilenplatzhalter 3">
             <a:extLst>
               <a:ext uri="{FF2B5EF4-FFF2-40B4-BE49-F238E27FC236}">
-                <a16:creationId xmlns:a16="http://schemas.microsoft.com/office/drawing/2014/main" xmlns="" id="{BDB34D94-50DC-44DF-8C2B-60940B0DBD32}"/>
+                <a16:creationId xmlns:a16="http://schemas.microsoft.com/office/drawing/2014/main" id="{BDB34D94-50DC-44DF-8C2B-60940B0DBD32}"/>
               </a:ext>
             </a:extLst>
           </p:cNvPr>
@@ -303,7 +303,7 @@
           <p:cNvPr id="5" name="Foliennummernplatzhalter 4">
             <a:extLst>
               <a:ext uri="{FF2B5EF4-FFF2-40B4-BE49-F238E27FC236}">
-                <a16:creationId xmlns:a16="http://schemas.microsoft.com/office/drawing/2014/main" xmlns="" id="{41B3D724-41FE-4065-B0DD-2D6B29A7BDC6}"/>
+                <a16:creationId xmlns:a16="http://schemas.microsoft.com/office/drawing/2014/main" id="{41B3D724-41FE-4065-B0DD-2D6B29A7BDC6}"/>
               </a:ext>
             </a:extLst>
           </p:cNvPr>
@@ -343,7 +343,7 @@
     </p:spTree>
     <p:extLst>
       <p:ext uri="{BB962C8B-B14F-4D97-AF65-F5344CB8AC3E}">
-        <p14:creationId xmlns:p14="http://schemas.microsoft.com/office/powerpoint/2010/main" xmlns="" val="3824691718"/>
+        <p14:creationId xmlns:p14="http://schemas.microsoft.com/office/powerpoint/2010/main" val="3824691718"/>
       </p:ext>
     </p:extLst>
   </p:cSld>
@@ -434,7 +434,7 @@
             <a:fld id="{28A20BDF-6A46-49EA-BE7C-D2960091BE3F}" type="datetimeFigureOut">
               <a:rPr lang="de-DE" smtClean="0"/>
               <a:pPr/>
-              <a:t>04.07.2017</a:t>
+              <a:t>05.07.2017</a:t>
             </a:fld>
             <a:endParaRPr lang="de-DE"/>
           </a:p>
@@ -602,7 +602,7 @@
     </p:spTree>
     <p:extLst>
       <p:ext uri="{BB962C8B-B14F-4D97-AF65-F5344CB8AC3E}">
-        <p14:creationId xmlns:p14="http://schemas.microsoft.com/office/powerpoint/2010/main" xmlns="" val="700791983"/>
+        <p14:creationId xmlns:p14="http://schemas.microsoft.com/office/powerpoint/2010/main" val="700791983"/>
       </p:ext>
     </p:extLst>
   </p:cSld>
@@ -780,7 +780,7 @@
     </p:spTree>
     <p:extLst>
       <p:ext uri="{BB962C8B-B14F-4D97-AF65-F5344CB8AC3E}">
-        <p14:creationId xmlns:p14="http://schemas.microsoft.com/office/powerpoint/2010/main" xmlns="" val="3668134686"/>
+        <p14:creationId xmlns:p14="http://schemas.microsoft.com/office/powerpoint/2010/main" val="3668134686"/>
       </p:ext>
     </p:extLst>
   </p:cSld>
@@ -911,7 +911,7 @@
     </p:spTree>
     <p:extLst>
       <p:ext uri="{BB962C8B-B14F-4D97-AF65-F5344CB8AC3E}">
-        <p14:creationId xmlns:p14="http://schemas.microsoft.com/office/powerpoint/2010/main" xmlns="" val="805831359"/>
+        <p14:creationId xmlns:p14="http://schemas.microsoft.com/office/powerpoint/2010/main" val="805831359"/>
       </p:ext>
     </p:extLst>
   </p:cSld>
@@ -1040,7 +1040,7 @@
     </p:spTree>
     <p:extLst>
       <p:ext uri="{BB962C8B-B14F-4D97-AF65-F5344CB8AC3E}">
-        <p14:creationId xmlns:p14="http://schemas.microsoft.com/office/powerpoint/2010/main" xmlns="" val="758588964"/>
+        <p14:creationId xmlns:p14="http://schemas.microsoft.com/office/powerpoint/2010/main" val="758588964"/>
       </p:ext>
     </p:extLst>
   </p:cSld>
@@ -1128,7 +1128,7 @@
     </p:spTree>
     <p:extLst>
       <p:ext uri="{BB962C8B-B14F-4D97-AF65-F5344CB8AC3E}">
-        <p14:creationId xmlns:p14="http://schemas.microsoft.com/office/powerpoint/2010/main" xmlns="" val="2503663228"/>
+        <p14:creationId xmlns:p14="http://schemas.microsoft.com/office/powerpoint/2010/main" val="2503663228"/>
       </p:ext>
     </p:extLst>
   </p:cSld>
@@ -1224,7 +1224,7 @@
     </p:spTree>
     <p:extLst>
       <p:ext uri="{BB962C8B-B14F-4D97-AF65-F5344CB8AC3E}">
-        <p14:creationId xmlns:p14="http://schemas.microsoft.com/office/powerpoint/2010/main" xmlns="" val="752562685"/>
+        <p14:creationId xmlns:p14="http://schemas.microsoft.com/office/powerpoint/2010/main" val="752562685"/>
       </p:ext>
     </p:extLst>
   </p:cSld>
@@ -1309,7 +1309,7 @@
     </p:spTree>
     <p:extLst>
       <p:ext uri="{BB962C8B-B14F-4D97-AF65-F5344CB8AC3E}">
-        <p14:creationId xmlns:p14="http://schemas.microsoft.com/office/powerpoint/2010/main" xmlns="" val="2431211418"/>
+        <p14:creationId xmlns:p14="http://schemas.microsoft.com/office/powerpoint/2010/main" val="2431211418"/>
       </p:ext>
     </p:extLst>
   </p:cSld>
@@ -1447,7 +1447,7 @@
     </p:spTree>
     <p:extLst>
       <p:ext uri="{BB962C8B-B14F-4D97-AF65-F5344CB8AC3E}">
-        <p14:creationId xmlns:p14="http://schemas.microsoft.com/office/powerpoint/2010/main" xmlns="" val="2883045047"/>
+        <p14:creationId xmlns:p14="http://schemas.microsoft.com/office/powerpoint/2010/main" val="2883045047"/>
       </p:ext>
     </p:extLst>
   </p:cSld>
@@ -1532,7 +1532,7 @@
     </p:spTree>
     <p:extLst>
       <p:ext uri="{BB962C8B-B14F-4D97-AF65-F5344CB8AC3E}">
-        <p14:creationId xmlns:p14="http://schemas.microsoft.com/office/powerpoint/2010/main" xmlns="" val="2671981"/>
+        <p14:creationId xmlns:p14="http://schemas.microsoft.com/office/powerpoint/2010/main" val="2671981"/>
       </p:ext>
     </p:extLst>
   </p:cSld>
@@ -1617,7 +1617,7 @@
     </p:spTree>
     <p:extLst>
       <p:ext uri="{BB962C8B-B14F-4D97-AF65-F5344CB8AC3E}">
-        <p14:creationId xmlns:p14="http://schemas.microsoft.com/office/powerpoint/2010/main" xmlns="" val="3154546045"/>
+        <p14:creationId xmlns:p14="http://schemas.microsoft.com/office/powerpoint/2010/main" val="3154546045"/>
       </p:ext>
     </p:extLst>
   </p:cSld>
@@ -1812,7 +1812,7 @@
     </p:spTree>
     <p:extLst>
       <p:ext uri="{BB962C8B-B14F-4D97-AF65-F5344CB8AC3E}">
-        <p14:creationId xmlns:p14="http://schemas.microsoft.com/office/powerpoint/2010/main" xmlns="" val="2257791673"/>
+        <p14:creationId xmlns:p14="http://schemas.microsoft.com/office/powerpoint/2010/main" val="2257791673"/>
       </p:ext>
     </p:extLst>
   </p:cSld>
@@ -1985,7 +1985,7 @@
     </p:spTree>
     <p:extLst>
       <p:ext uri="{BB962C8B-B14F-4D97-AF65-F5344CB8AC3E}">
-        <p14:creationId xmlns:p14="http://schemas.microsoft.com/office/powerpoint/2010/main" xmlns="" val="2527554667"/>
+        <p14:creationId xmlns:p14="http://schemas.microsoft.com/office/powerpoint/2010/main" val="2527554667"/>
       </p:ext>
     </p:extLst>
   </p:cSld>
@@ -2168,7 +2168,7 @@
     </p:spTree>
     <p:extLst>
       <p:ext uri="{BB962C8B-B14F-4D97-AF65-F5344CB8AC3E}">
-        <p14:creationId xmlns:p14="http://schemas.microsoft.com/office/powerpoint/2010/main" xmlns="" val="621481477"/>
+        <p14:creationId xmlns:p14="http://schemas.microsoft.com/office/powerpoint/2010/main" val="621481477"/>
       </p:ext>
     </p:extLst>
   </p:cSld>
@@ -2363,7 +2363,7 @@
     </p:spTree>
     <p:extLst>
       <p:ext uri="{BB962C8B-B14F-4D97-AF65-F5344CB8AC3E}">
-        <p14:creationId xmlns:p14="http://schemas.microsoft.com/office/powerpoint/2010/main" xmlns="" val="3661508634"/>
+        <p14:creationId xmlns:p14="http://schemas.microsoft.com/office/powerpoint/2010/main" val="3661508634"/>
       </p:ext>
     </p:extLst>
   </p:cSld>
@@ -2536,7 +2536,7 @@
     </p:spTree>
     <p:extLst>
       <p:ext uri="{BB962C8B-B14F-4D97-AF65-F5344CB8AC3E}">
-        <p14:creationId xmlns:p14="http://schemas.microsoft.com/office/powerpoint/2010/main" xmlns="" val="4168060298"/>
+        <p14:creationId xmlns:p14="http://schemas.microsoft.com/office/powerpoint/2010/main" val="4168060298"/>
       </p:ext>
     </p:extLst>
   </p:cSld>
@@ -2763,7 +2763,7 @@
     </p:spTree>
     <p:extLst>
       <p:ext uri="{BB962C8B-B14F-4D97-AF65-F5344CB8AC3E}">
-        <p14:creationId xmlns:p14="http://schemas.microsoft.com/office/powerpoint/2010/main" xmlns="" val="1794010729"/>
+        <p14:creationId xmlns:p14="http://schemas.microsoft.com/office/powerpoint/2010/main" val="1794010729"/>
       </p:ext>
     </p:extLst>
   </p:cSld>
@@ -2997,7 +2997,7 @@
     </p:spTree>
     <p:extLst>
       <p:ext uri="{BB962C8B-B14F-4D97-AF65-F5344CB8AC3E}">
-        <p14:creationId xmlns:p14="http://schemas.microsoft.com/office/powerpoint/2010/main" xmlns="" val="4176995027"/>
+        <p14:creationId xmlns:p14="http://schemas.microsoft.com/office/powerpoint/2010/main" val="4176995027"/>
       </p:ext>
     </p:extLst>
   </p:cSld>
@@ -3366,7 +3366,7 @@
     </p:spTree>
     <p:extLst>
       <p:ext uri="{BB962C8B-B14F-4D97-AF65-F5344CB8AC3E}">
-        <p14:creationId xmlns:p14="http://schemas.microsoft.com/office/powerpoint/2010/main" xmlns="" val="2740364737"/>
+        <p14:creationId xmlns:p14="http://schemas.microsoft.com/office/powerpoint/2010/main" val="2740364737"/>
       </p:ext>
     </p:extLst>
   </p:cSld>
@@ -3488,7 +3488,7 @@
     </p:spTree>
     <p:extLst>
       <p:ext uri="{BB962C8B-B14F-4D97-AF65-F5344CB8AC3E}">
-        <p14:creationId xmlns:p14="http://schemas.microsoft.com/office/powerpoint/2010/main" xmlns="" val="2388727467"/>
+        <p14:creationId xmlns:p14="http://schemas.microsoft.com/office/powerpoint/2010/main" val="2388727467"/>
       </p:ext>
     </p:extLst>
   </p:cSld>
@@ -3588,7 +3588,7 @@
     </p:spTree>
     <p:extLst>
       <p:ext uri="{BB962C8B-B14F-4D97-AF65-F5344CB8AC3E}">
-        <p14:creationId xmlns:p14="http://schemas.microsoft.com/office/powerpoint/2010/main" xmlns="" val="4144591651"/>
+        <p14:creationId xmlns:p14="http://schemas.microsoft.com/office/powerpoint/2010/main" val="4144591651"/>
       </p:ext>
     </p:extLst>
   </p:cSld>
@@ -3868,7 +3868,7 @@
     </p:spTree>
     <p:extLst>
       <p:ext uri="{BB962C8B-B14F-4D97-AF65-F5344CB8AC3E}">
-        <p14:creationId xmlns:p14="http://schemas.microsoft.com/office/powerpoint/2010/main" xmlns="" val="3667714112"/>
+        <p14:creationId xmlns:p14="http://schemas.microsoft.com/office/powerpoint/2010/main" val="3667714112"/>
       </p:ext>
     </p:extLst>
   </p:cSld>
@@ -4041,7 +4041,7 @@
     </p:spTree>
     <p:extLst>
       <p:ext uri="{BB962C8B-B14F-4D97-AF65-F5344CB8AC3E}">
-        <p14:creationId xmlns:p14="http://schemas.microsoft.com/office/powerpoint/2010/main" xmlns="" val="1332049413"/>
+        <p14:creationId xmlns:p14="http://schemas.microsoft.com/office/powerpoint/2010/main" val="1332049413"/>
       </p:ext>
     </p:extLst>
   </p:cSld>
@@ -4298,7 +4298,7 @@
     </p:spTree>
     <p:extLst>
       <p:ext uri="{BB962C8B-B14F-4D97-AF65-F5344CB8AC3E}">
-        <p14:creationId xmlns:p14="http://schemas.microsoft.com/office/powerpoint/2010/main" xmlns="" val="190149329"/>
+        <p14:creationId xmlns:p14="http://schemas.microsoft.com/office/powerpoint/2010/main" val="190149329"/>
       </p:ext>
     </p:extLst>
   </p:cSld>
@@ -4471,7 +4471,7 @@
     </p:spTree>
     <p:extLst>
       <p:ext uri="{BB962C8B-B14F-4D97-AF65-F5344CB8AC3E}">
-        <p14:creationId xmlns:p14="http://schemas.microsoft.com/office/powerpoint/2010/main" xmlns="" val="995635370"/>
+        <p14:creationId xmlns:p14="http://schemas.microsoft.com/office/powerpoint/2010/main" val="995635370"/>
       </p:ext>
     </p:extLst>
   </p:cSld>
@@ -4654,7 +4654,7 @@
     </p:spTree>
     <p:extLst>
       <p:ext uri="{BB962C8B-B14F-4D97-AF65-F5344CB8AC3E}">
-        <p14:creationId xmlns:p14="http://schemas.microsoft.com/office/powerpoint/2010/main" xmlns="" val="655588613"/>
+        <p14:creationId xmlns:p14="http://schemas.microsoft.com/office/powerpoint/2010/main" val="655588613"/>
       </p:ext>
     </p:extLst>
   </p:cSld>
@@ -4881,7 +4881,7 @@
     </p:spTree>
     <p:extLst>
       <p:ext uri="{BB962C8B-B14F-4D97-AF65-F5344CB8AC3E}">
-        <p14:creationId xmlns:p14="http://schemas.microsoft.com/office/powerpoint/2010/main" xmlns="" val="2853574932"/>
+        <p14:creationId xmlns:p14="http://schemas.microsoft.com/office/powerpoint/2010/main" val="2853574932"/>
       </p:ext>
     </p:extLst>
   </p:cSld>
@@ -5115,7 +5115,7 @@
     </p:spTree>
     <p:extLst>
       <p:ext uri="{BB962C8B-B14F-4D97-AF65-F5344CB8AC3E}">
-        <p14:creationId xmlns:p14="http://schemas.microsoft.com/office/powerpoint/2010/main" xmlns="" val="2199095327"/>
+        <p14:creationId xmlns:p14="http://schemas.microsoft.com/office/powerpoint/2010/main" val="2199095327"/>
       </p:ext>
     </p:extLst>
   </p:cSld>
@@ -5484,7 +5484,7 @@
     </p:spTree>
     <p:extLst>
       <p:ext uri="{BB962C8B-B14F-4D97-AF65-F5344CB8AC3E}">
-        <p14:creationId xmlns:p14="http://schemas.microsoft.com/office/powerpoint/2010/main" xmlns="" val="311317856"/>
+        <p14:creationId xmlns:p14="http://schemas.microsoft.com/office/powerpoint/2010/main" val="311317856"/>
       </p:ext>
     </p:extLst>
   </p:cSld>
@@ -5606,7 +5606,7 @@
     </p:spTree>
     <p:extLst>
       <p:ext uri="{BB962C8B-B14F-4D97-AF65-F5344CB8AC3E}">
-        <p14:creationId xmlns:p14="http://schemas.microsoft.com/office/powerpoint/2010/main" xmlns="" val="227337858"/>
+        <p14:creationId xmlns:p14="http://schemas.microsoft.com/office/powerpoint/2010/main" val="227337858"/>
       </p:ext>
     </p:extLst>
   </p:cSld>
@@ -5706,7 +5706,7 @@
     </p:spTree>
     <p:extLst>
       <p:ext uri="{BB962C8B-B14F-4D97-AF65-F5344CB8AC3E}">
-        <p14:creationId xmlns:p14="http://schemas.microsoft.com/office/powerpoint/2010/main" xmlns="" val="3239334008"/>
+        <p14:creationId xmlns:p14="http://schemas.microsoft.com/office/powerpoint/2010/main" val="3239334008"/>
       </p:ext>
     </p:extLst>
   </p:cSld>
@@ -5986,7 +5986,7 @@
     </p:spTree>
     <p:extLst>
       <p:ext uri="{BB962C8B-B14F-4D97-AF65-F5344CB8AC3E}">
-        <p14:creationId xmlns:p14="http://schemas.microsoft.com/office/powerpoint/2010/main" xmlns="" val="466192376"/>
+        <p14:creationId xmlns:p14="http://schemas.microsoft.com/office/powerpoint/2010/main" val="466192376"/>
       </p:ext>
     </p:extLst>
   </p:cSld>
@@ -6243,7 +6243,7 @@
     </p:spTree>
     <p:extLst>
       <p:ext uri="{BB962C8B-B14F-4D97-AF65-F5344CB8AC3E}">
-        <p14:creationId xmlns:p14="http://schemas.microsoft.com/office/powerpoint/2010/main" xmlns="" val="3466473767"/>
+        <p14:creationId xmlns:p14="http://schemas.microsoft.com/office/powerpoint/2010/main" val="3466473767"/>
       </p:ext>
     </p:extLst>
   </p:cSld>
@@ -6592,7 +6592,7 @@
           <a:blip r:embed="rId13" cstate="print">
             <a:extLst>
               <a:ext uri="{28A0092B-C50C-407E-A947-70E740481C1C}">
-                <a14:useLocalDpi xmlns:a14="http://schemas.microsoft.com/office/drawing/2010/main" xmlns="" val="0"/>
+                <a14:useLocalDpi xmlns:a14="http://schemas.microsoft.com/office/drawing/2010/main" val="0"/>
               </a:ext>
             </a:extLst>
           </a:blip>
@@ -6613,7 +6613,7 @@
     </p:spTree>
     <p:extLst>
       <p:ext uri="{BB962C8B-B14F-4D97-AF65-F5344CB8AC3E}">
-        <p14:creationId xmlns:p14="http://schemas.microsoft.com/office/powerpoint/2010/main" xmlns="" val="2300813328"/>
+        <p14:creationId xmlns:p14="http://schemas.microsoft.com/office/powerpoint/2010/main" val="2300813328"/>
       </p:ext>
     </p:extLst>
   </p:cSld>
@@ -7257,7 +7257,7 @@
           <a:blip r:embed="rId13" cstate="print">
             <a:extLst>
               <a:ext uri="{28A0092B-C50C-407E-A947-70E740481C1C}">
-                <a14:useLocalDpi xmlns:a14="http://schemas.microsoft.com/office/drawing/2010/main" xmlns="" val="0"/>
+                <a14:useLocalDpi xmlns:a14="http://schemas.microsoft.com/office/drawing/2010/main" val="0"/>
               </a:ext>
             </a:extLst>
           </a:blip>
@@ -7278,7 +7278,7 @@
     </p:spTree>
     <p:extLst>
       <p:ext uri="{BB962C8B-B14F-4D97-AF65-F5344CB8AC3E}">
-        <p14:creationId xmlns:p14="http://schemas.microsoft.com/office/powerpoint/2010/main" xmlns="" val="3437319758"/>
+        <p14:creationId xmlns:p14="http://schemas.microsoft.com/office/powerpoint/2010/main" val="3437319758"/>
       </p:ext>
     </p:extLst>
   </p:cSld>
@@ -7696,7 +7696,7 @@
     </p:spTree>
     <p:extLst>
       <p:ext uri="{BB962C8B-B14F-4D97-AF65-F5344CB8AC3E}">
-        <p14:creationId xmlns:p14="http://schemas.microsoft.com/office/powerpoint/2010/main" xmlns="" val="1475588890"/>
+        <p14:creationId xmlns:p14="http://schemas.microsoft.com/office/powerpoint/2010/main" val="1475588890"/>
       </p:ext>
     </p:extLst>
   </p:cSld>
@@ -7928,7 +7928,7 @@
     </p:spTree>
     <p:extLst>
       <p:ext uri="{BB962C8B-B14F-4D97-AF65-F5344CB8AC3E}">
-        <p14:creationId xmlns:p14="http://schemas.microsoft.com/office/powerpoint/2010/main" xmlns="" val="148473633"/>
+        <p14:creationId xmlns:p14="http://schemas.microsoft.com/office/powerpoint/2010/main" val="148473633"/>
       </p:ext>
     </p:extLst>
   </p:cSld>
@@ -7960,7 +7960,7 @@
           <p:cNvPr id="2" name="Titel 1">
             <a:extLst>
               <a:ext uri="{FF2B5EF4-FFF2-40B4-BE49-F238E27FC236}">
-                <a16:creationId xmlns:a16="http://schemas.microsoft.com/office/drawing/2014/main" xmlns="" id="{A7AFEDD9-CD28-4FAE-80F4-FE24693A1C4B}"/>
+                <a16:creationId xmlns:a16="http://schemas.microsoft.com/office/drawing/2014/main" id="{A7AFEDD9-CD28-4FAE-80F4-FE24693A1C4B}"/>
               </a:ext>
             </a:extLst>
           </p:cNvPr>
@@ -7988,7 +7988,7 @@
           <p:cNvPr id="4" name="Fußzeilenplatzhalter 3">
             <a:extLst>
               <a:ext uri="{FF2B5EF4-FFF2-40B4-BE49-F238E27FC236}">
-                <a16:creationId xmlns:a16="http://schemas.microsoft.com/office/drawing/2014/main" xmlns="" id="{49FD879F-9FAD-4393-ADC7-6AC52CE6692D}"/>
+                <a16:creationId xmlns:a16="http://schemas.microsoft.com/office/drawing/2014/main" id="{49FD879F-9FAD-4393-ADC7-6AC52CE6692D}"/>
               </a:ext>
             </a:extLst>
           </p:cNvPr>
@@ -8016,7 +8016,7 @@
           <p:cNvPr id="9" name="Textfeld 8">
             <a:extLst>
               <a:ext uri="{FF2B5EF4-FFF2-40B4-BE49-F238E27FC236}">
-                <a16:creationId xmlns:a16="http://schemas.microsoft.com/office/drawing/2014/main" xmlns="" id="{8CDFD2E7-9BE5-48A9-8A34-8124EFDDC387}"/>
+                <a16:creationId xmlns:a16="http://schemas.microsoft.com/office/drawing/2014/main" id="{8CDFD2E7-9BE5-48A9-8A34-8124EFDDC387}"/>
               </a:ext>
             </a:extLst>
           </p:cNvPr>
@@ -8103,7 +8103,7 @@
           <p:cNvPr id="10" name="Textfeld 9">
             <a:extLst>
               <a:ext uri="{FF2B5EF4-FFF2-40B4-BE49-F238E27FC236}">
-                <a16:creationId xmlns:a16="http://schemas.microsoft.com/office/drawing/2014/main" xmlns="" id="{51ABE4D3-BB27-4ACC-84C4-16047217F7CE}"/>
+                <a16:creationId xmlns:a16="http://schemas.microsoft.com/office/drawing/2014/main" id="{51ABE4D3-BB27-4ACC-84C4-16047217F7CE}"/>
               </a:ext>
             </a:extLst>
           </p:cNvPr>
@@ -8187,7 +8187,7 @@
           <p:cNvPr id="11" name="Rechteck: abgerundete Ecken 10">
             <a:extLst>
               <a:ext uri="{FF2B5EF4-FFF2-40B4-BE49-F238E27FC236}">
-                <a16:creationId xmlns:a16="http://schemas.microsoft.com/office/drawing/2014/main" xmlns="" id="{9C2BD50F-2AC7-4AA9-9B0D-2BBFFB49CE70}"/>
+                <a16:creationId xmlns:a16="http://schemas.microsoft.com/office/drawing/2014/main" id="{9C2BD50F-2AC7-4AA9-9B0D-2BBFFB49CE70}"/>
               </a:ext>
             </a:extLst>
           </p:cNvPr>
@@ -8242,7 +8242,7 @@
           <p:cNvPr id="15" name="Gerader Verbinder 14">
             <a:extLst>
               <a:ext uri="{FF2B5EF4-FFF2-40B4-BE49-F238E27FC236}">
-                <a16:creationId xmlns:a16="http://schemas.microsoft.com/office/drawing/2014/main" xmlns="" id="{24E6EF1B-BA0D-4CBA-B55D-2F90C6EB2EB3}"/>
+                <a16:creationId xmlns:a16="http://schemas.microsoft.com/office/drawing/2014/main" id="{24E6EF1B-BA0D-4CBA-B55D-2F90C6EB2EB3}"/>
               </a:ext>
             </a:extLst>
           </p:cNvPr>
@@ -8285,7 +8285,7 @@
           <p:cNvPr id="14" name="Fußzeilenplatzhalter 4">
             <a:extLst>
               <a:ext uri="{FF2B5EF4-FFF2-40B4-BE49-F238E27FC236}">
-                <a16:creationId xmlns:a16="http://schemas.microsoft.com/office/drawing/2014/main" xmlns="" id="{08CC590C-874E-4B76-9273-4EDAE071DA13}"/>
+                <a16:creationId xmlns:a16="http://schemas.microsoft.com/office/drawing/2014/main" id="{08CC590C-874E-4B76-9273-4EDAE071DA13}"/>
               </a:ext>
             </a:extLst>
           </p:cNvPr>
@@ -8665,7 +8665,7 @@
           <p:cNvPr id="16" name="Gerade Verbindung 7">
             <a:extLst>
               <a:ext uri="{FF2B5EF4-FFF2-40B4-BE49-F238E27FC236}">
-                <a16:creationId xmlns:a16="http://schemas.microsoft.com/office/drawing/2014/main" xmlns="" id="{1A32E0AC-1C3B-499C-8BF3-EEB9B045EF38}"/>
+                <a16:creationId xmlns:a16="http://schemas.microsoft.com/office/drawing/2014/main" id="{1A32E0AC-1C3B-499C-8BF3-EEB9B045EF38}"/>
               </a:ext>
             </a:extLst>
           </p:cNvPr>
@@ -8734,7 +8734,7 @@
           <p:cNvPr id="3" name="Gruppieren 2">
             <a:extLst>
               <a:ext uri="{FF2B5EF4-FFF2-40B4-BE49-F238E27FC236}">
-                <a16:creationId xmlns:a16="http://schemas.microsoft.com/office/drawing/2014/main" xmlns="" id="{CDDBFECC-82DF-440D-B88C-7E6C142DA88F}"/>
+                <a16:creationId xmlns:a16="http://schemas.microsoft.com/office/drawing/2014/main" id="{CDDBFECC-82DF-440D-B88C-7E6C142DA88F}"/>
               </a:ext>
             </a:extLst>
           </p:cNvPr>
@@ -8754,7 +8754,7 @@
             <p:cNvPr id="6" name="Textfeld 5">
               <a:extLst>
                 <a:ext uri="{FF2B5EF4-FFF2-40B4-BE49-F238E27FC236}">
-                  <a16:creationId xmlns:a16="http://schemas.microsoft.com/office/drawing/2014/main" xmlns="" id="{3292FCF7-0BF7-4E46-AE45-4C1BC1753637}"/>
+                  <a16:creationId xmlns:a16="http://schemas.microsoft.com/office/drawing/2014/main" id="{3292FCF7-0BF7-4E46-AE45-4C1BC1753637}"/>
                 </a:ext>
               </a:extLst>
             </p:cNvPr>
@@ -8814,7 +8814,7 @@
             <p:cNvPr id="13" name="Textfeld 12">
               <a:extLst>
                 <a:ext uri="{FF2B5EF4-FFF2-40B4-BE49-F238E27FC236}">
-                  <a16:creationId xmlns:a16="http://schemas.microsoft.com/office/drawing/2014/main" xmlns="" id="{5125CB82-FADD-414A-84CA-5B41F4ED476B}"/>
+                  <a16:creationId xmlns:a16="http://schemas.microsoft.com/office/drawing/2014/main" id="{5125CB82-FADD-414A-84CA-5B41F4ED476B}"/>
                 </a:ext>
               </a:extLst>
             </p:cNvPr>
@@ -8916,7 +8916,7 @@
             <p:cNvPr id="17" name="Rechteck: abgerundete Ecken 16">
               <a:extLst>
                 <a:ext uri="{FF2B5EF4-FFF2-40B4-BE49-F238E27FC236}">
-                  <a16:creationId xmlns:a16="http://schemas.microsoft.com/office/drawing/2014/main" xmlns="" id="{A45CB1FD-522F-4CF2-B9FA-B94EF5517E81}"/>
+                  <a16:creationId xmlns:a16="http://schemas.microsoft.com/office/drawing/2014/main" id="{A45CB1FD-522F-4CF2-B9FA-B94EF5517E81}"/>
                 </a:ext>
               </a:extLst>
             </p:cNvPr>
@@ -8971,7 +8971,7 @@
             <p:cNvPr id="5" name="Pfeil: nach rechts 4">
               <a:extLst>
                 <a:ext uri="{FF2B5EF4-FFF2-40B4-BE49-F238E27FC236}">
-                  <a16:creationId xmlns:a16="http://schemas.microsoft.com/office/drawing/2014/main" xmlns="" id="{9B0702B1-7159-4ED2-B7D9-6B9C306A3B62}"/>
+                  <a16:creationId xmlns:a16="http://schemas.microsoft.com/office/drawing/2014/main" id="{9B0702B1-7159-4ED2-B7D9-6B9C306A3B62}"/>
                 </a:ext>
               </a:extLst>
             </p:cNvPr>
@@ -9022,7 +9022,7 @@
     </p:custDataLst>
     <p:extLst>
       <p:ext uri="{BB962C8B-B14F-4D97-AF65-F5344CB8AC3E}">
-        <p14:creationId xmlns:p14="http://schemas.microsoft.com/office/powerpoint/2010/main" xmlns="" val="3444159518"/>
+        <p14:creationId xmlns:p14="http://schemas.microsoft.com/office/powerpoint/2010/main" val="3444159518"/>
       </p:ext>
     </p:extLst>
   </p:cSld>
@@ -9064,33 +9064,6 @@
                                         </p:cTn>
                                         <p:tgtEl>
                                           <p:spTgt spid="15"/>
-                                        </p:tgtEl>
-                                        <p:attrNameLst>
-                                          <p:attrName>style.visibility</p:attrName>
-                                        </p:attrNameLst>
-                                      </p:cBhvr>
-                                      <p:to>
-                                        <p:strVal val="visible"/>
-                                      </p:to>
-                                    </p:set>
-                                  </p:childTnLst>
-                                </p:cTn>
-                              </p:par>
-                              <p:par>
-                                <p:cTn id="7" presetID="1" presetClass="entr" presetSubtype="0" fill="hold" nodeType="withEffect">
-                                  <p:stCondLst>
-                                    <p:cond delay="0"/>
-                                  </p:stCondLst>
-                                  <p:childTnLst>
-                                    <p:set>
-                                      <p:cBhvr>
-                                        <p:cTn id="8" dur="1" fill="hold">
-                                          <p:stCondLst>
-                                            <p:cond delay="0"/>
-                                          </p:stCondLst>
-                                        </p:cTn>
-                                        <p:tgtEl>
-                                          <p:spTgt spid="3"/>
                                         </p:tgtEl>
                                         <p:attrNameLst>
                                           <p:attrName>style.visibility</p:attrName>
@@ -9156,7 +9129,7 @@
           <p:cNvPr id="2" name="Titel 1">
             <a:extLst>
               <a:ext uri="{FF2B5EF4-FFF2-40B4-BE49-F238E27FC236}">
-                <a16:creationId xmlns:a16="http://schemas.microsoft.com/office/drawing/2014/main" xmlns="" id="{C773FAA8-F163-4AD1-8576-9C8F0058A786}"/>
+                <a16:creationId xmlns:a16="http://schemas.microsoft.com/office/drawing/2014/main" id="{C773FAA8-F163-4AD1-8576-9C8F0058A786}"/>
               </a:ext>
             </a:extLst>
           </p:cNvPr>
@@ -9184,7 +9157,7 @@
           <p:cNvPr id="4" name="Fußzeilenplatzhalter 3">
             <a:extLst>
               <a:ext uri="{FF2B5EF4-FFF2-40B4-BE49-F238E27FC236}">
-                <a16:creationId xmlns:a16="http://schemas.microsoft.com/office/drawing/2014/main" xmlns="" id="{21D47380-A749-437A-8E08-FF26679768D9}"/>
+                <a16:creationId xmlns:a16="http://schemas.microsoft.com/office/drawing/2014/main" id="{21D47380-A749-437A-8E08-FF26679768D9}"/>
               </a:ext>
             </a:extLst>
           </p:cNvPr>
@@ -9212,7 +9185,7 @@
           <p:cNvPr id="14" name="Textfeld 13">
             <a:extLst>
               <a:ext uri="{FF2B5EF4-FFF2-40B4-BE49-F238E27FC236}">
-                <a16:creationId xmlns:a16="http://schemas.microsoft.com/office/drawing/2014/main" xmlns="" id="{471CC193-BF67-4D7B-9944-69EF9D5E06CF}"/>
+                <a16:creationId xmlns:a16="http://schemas.microsoft.com/office/drawing/2014/main" id="{471CC193-BF67-4D7B-9944-69EF9D5E06CF}"/>
               </a:ext>
             </a:extLst>
           </p:cNvPr>
@@ -9296,7 +9269,7 @@
           <p:cNvPr id="8" name="Gruppieren 7">
             <a:extLst>
               <a:ext uri="{FF2B5EF4-FFF2-40B4-BE49-F238E27FC236}">
-                <a16:creationId xmlns:a16="http://schemas.microsoft.com/office/drawing/2014/main" xmlns="" id="{5D72CC4B-574F-4332-B8BB-78197CFA5CB2}"/>
+                <a16:creationId xmlns:a16="http://schemas.microsoft.com/office/drawing/2014/main" id="{5D72CC4B-574F-4332-B8BB-78197CFA5CB2}"/>
               </a:ext>
             </a:extLst>
           </p:cNvPr>
@@ -9316,7 +9289,7 @@
             <p:cNvPr id="17" name="Rechteck 16">
               <a:extLst>
                 <a:ext uri="{FF2B5EF4-FFF2-40B4-BE49-F238E27FC236}">
-                  <a16:creationId xmlns:a16="http://schemas.microsoft.com/office/drawing/2014/main" xmlns="" id="{D13F363D-59AE-415D-9A9E-BCF8093C6D7E}"/>
+                  <a16:creationId xmlns:a16="http://schemas.microsoft.com/office/drawing/2014/main" id="{D13F363D-59AE-415D-9A9E-BCF8093C6D7E}"/>
                 </a:ext>
               </a:extLst>
             </p:cNvPr>
@@ -9362,7 +9335,7 @@
             <p:cNvPr id="18" name="Textfeld 17">
               <a:extLst>
                 <a:ext uri="{FF2B5EF4-FFF2-40B4-BE49-F238E27FC236}">
-                  <a16:creationId xmlns:a16="http://schemas.microsoft.com/office/drawing/2014/main" xmlns="" id="{678756D6-B56D-4EF2-9DE1-6E72F551D96E}"/>
+                  <a16:creationId xmlns:a16="http://schemas.microsoft.com/office/drawing/2014/main" id="{678756D6-B56D-4EF2-9DE1-6E72F551D96E}"/>
                 </a:ext>
               </a:extLst>
             </p:cNvPr>
@@ -9405,7 +9378,7 @@
             <p:cNvPr id="16" name="Rechteck 15">
               <a:extLst>
                 <a:ext uri="{FF2B5EF4-FFF2-40B4-BE49-F238E27FC236}">
-                  <a16:creationId xmlns:a16="http://schemas.microsoft.com/office/drawing/2014/main" xmlns="" id="{8D4D5FC0-6002-4CA3-9779-A96C43486676}"/>
+                  <a16:creationId xmlns:a16="http://schemas.microsoft.com/office/drawing/2014/main" id="{8D4D5FC0-6002-4CA3-9779-A96C43486676}"/>
                 </a:ext>
               </a:extLst>
             </p:cNvPr>
@@ -9451,7 +9424,7 @@
             <p:cNvPr id="19" name="Textfeld 18">
               <a:extLst>
                 <a:ext uri="{FF2B5EF4-FFF2-40B4-BE49-F238E27FC236}">
-                  <a16:creationId xmlns:a16="http://schemas.microsoft.com/office/drawing/2014/main" xmlns="" id="{387F2AD1-1CB1-42CD-82DF-027DDFC38308}"/>
+                  <a16:creationId xmlns:a16="http://schemas.microsoft.com/office/drawing/2014/main" id="{387F2AD1-1CB1-42CD-82DF-027DDFC38308}"/>
                 </a:ext>
               </a:extLst>
             </p:cNvPr>
@@ -9491,7 +9464,7 @@
           <p:cNvPr id="3" name="Stack2">
             <a:extLst>
               <a:ext uri="{FF2B5EF4-FFF2-40B4-BE49-F238E27FC236}">
-                <a16:creationId xmlns:a16="http://schemas.microsoft.com/office/drawing/2014/main" xmlns="" id="{18C4F205-192E-45A7-AA4E-564A52280944}"/>
+                <a16:creationId xmlns:a16="http://schemas.microsoft.com/office/drawing/2014/main" id="{18C4F205-192E-45A7-AA4E-564A52280944}"/>
               </a:ext>
             </a:extLst>
           </p:cNvPr>
@@ -9511,7 +9484,7 @@
             <p:cNvPr id="33" name="Flussdiagramm: Dokument 32">
               <a:extLst>
                 <a:ext uri="{FF2B5EF4-FFF2-40B4-BE49-F238E27FC236}">
-                  <a16:creationId xmlns:a16="http://schemas.microsoft.com/office/drawing/2014/main" xmlns="" id="{5D37606C-86D4-400B-8E5B-1E7773E9597E}"/>
+                  <a16:creationId xmlns:a16="http://schemas.microsoft.com/office/drawing/2014/main" id="{5D37606C-86D4-400B-8E5B-1E7773E9597E}"/>
                 </a:ext>
               </a:extLst>
             </p:cNvPr>
@@ -9564,7 +9537,7 @@
             <p:cNvPr id="34" name="Flussdiagramm: Dokument 33">
               <a:extLst>
                 <a:ext uri="{FF2B5EF4-FFF2-40B4-BE49-F238E27FC236}">
-                  <a16:creationId xmlns:a16="http://schemas.microsoft.com/office/drawing/2014/main" xmlns="" id="{4738961D-1BE6-42B2-8490-D5EE6B430DF1}"/>
+                  <a16:creationId xmlns:a16="http://schemas.microsoft.com/office/drawing/2014/main" id="{4738961D-1BE6-42B2-8490-D5EE6B430DF1}"/>
                 </a:ext>
               </a:extLst>
             </p:cNvPr>
@@ -9617,7 +9590,7 @@
             <p:cNvPr id="35" name="Textfeld 34">
               <a:extLst>
                 <a:ext uri="{FF2B5EF4-FFF2-40B4-BE49-F238E27FC236}">
-                  <a16:creationId xmlns:a16="http://schemas.microsoft.com/office/drawing/2014/main" xmlns="" id="{A11A284B-D537-4997-A1CF-D9EE29FD658D}"/>
+                  <a16:creationId xmlns:a16="http://schemas.microsoft.com/office/drawing/2014/main" id="{A11A284B-D537-4997-A1CF-D9EE29FD658D}"/>
                 </a:ext>
               </a:extLst>
             </p:cNvPr>
@@ -9660,7 +9633,7 @@
             <p:cNvPr id="36" name="Textfeld 35">
               <a:extLst>
                 <a:ext uri="{FF2B5EF4-FFF2-40B4-BE49-F238E27FC236}">
-                  <a16:creationId xmlns:a16="http://schemas.microsoft.com/office/drawing/2014/main" xmlns="" id="{F27CD3AA-4659-4879-838E-A38E2068E191}"/>
+                  <a16:creationId xmlns:a16="http://schemas.microsoft.com/office/drawing/2014/main" id="{F27CD3AA-4659-4879-838E-A38E2068E191}"/>
                 </a:ext>
               </a:extLst>
             </p:cNvPr>
@@ -9703,7 +9676,7 @@
             <p:cNvPr id="37" name="Textfeld 36">
               <a:extLst>
                 <a:ext uri="{FF2B5EF4-FFF2-40B4-BE49-F238E27FC236}">
-                  <a16:creationId xmlns:a16="http://schemas.microsoft.com/office/drawing/2014/main" xmlns="" id="{2A582C8B-3193-492E-AA05-5CA958480D7D}"/>
+                  <a16:creationId xmlns:a16="http://schemas.microsoft.com/office/drawing/2014/main" id="{2A582C8B-3193-492E-AA05-5CA958480D7D}"/>
                 </a:ext>
               </a:extLst>
             </p:cNvPr>
@@ -9749,7 +9722,7 @@
             <p:cNvPr id="38" name="Textfeld 37">
               <a:extLst>
                 <a:ext uri="{FF2B5EF4-FFF2-40B4-BE49-F238E27FC236}">
-                  <a16:creationId xmlns:a16="http://schemas.microsoft.com/office/drawing/2014/main" xmlns="" id="{29C10D75-4241-4862-A582-B41B29A6D397}"/>
+                  <a16:creationId xmlns:a16="http://schemas.microsoft.com/office/drawing/2014/main" id="{29C10D75-4241-4862-A582-B41B29A6D397}"/>
                 </a:ext>
               </a:extLst>
             </p:cNvPr>
@@ -9791,7 +9764,7 @@
             <p:cNvPr id="40" name="Textfeld 39">
               <a:extLst>
                 <a:ext uri="{FF2B5EF4-FFF2-40B4-BE49-F238E27FC236}">
-                  <a16:creationId xmlns:a16="http://schemas.microsoft.com/office/drawing/2014/main" xmlns="" id="{918BD300-19F3-4F52-A56B-EAB9FD3B5041}"/>
+                  <a16:creationId xmlns:a16="http://schemas.microsoft.com/office/drawing/2014/main" id="{918BD300-19F3-4F52-A56B-EAB9FD3B5041}"/>
                 </a:ext>
               </a:extLst>
             </p:cNvPr>
@@ -9833,7 +9806,7 @@
             <p:cNvPr id="41" name="Textfeld 40">
               <a:extLst>
                 <a:ext uri="{FF2B5EF4-FFF2-40B4-BE49-F238E27FC236}">
-                  <a16:creationId xmlns:a16="http://schemas.microsoft.com/office/drawing/2014/main" xmlns="" id="{2EE87C73-3E28-4986-BB17-CB576E765C29}"/>
+                  <a16:creationId xmlns:a16="http://schemas.microsoft.com/office/drawing/2014/main" id="{2EE87C73-3E28-4986-BB17-CB576E765C29}"/>
                 </a:ext>
               </a:extLst>
             </p:cNvPr>
@@ -9876,7 +9849,7 @@
           <p:cNvPr id="7" name="Stack 1">
             <a:extLst>
               <a:ext uri="{FF2B5EF4-FFF2-40B4-BE49-F238E27FC236}">
-                <a16:creationId xmlns:a16="http://schemas.microsoft.com/office/drawing/2014/main" xmlns="" id="{396E6619-BDA8-4983-B636-BC38CF2DA7D0}"/>
+                <a16:creationId xmlns:a16="http://schemas.microsoft.com/office/drawing/2014/main" id="{396E6619-BDA8-4983-B636-BC38CF2DA7D0}"/>
               </a:ext>
             </a:extLst>
           </p:cNvPr>
@@ -9896,7 +9869,7 @@
             <p:cNvPr id="6" name="Gruppieren 5">
               <a:extLst>
                 <a:ext uri="{FF2B5EF4-FFF2-40B4-BE49-F238E27FC236}">
-                  <a16:creationId xmlns:a16="http://schemas.microsoft.com/office/drawing/2014/main" xmlns="" id="{64A560FD-BDB8-40F0-ACBF-4FD4A96D5A79}"/>
+                  <a16:creationId xmlns:a16="http://schemas.microsoft.com/office/drawing/2014/main" id="{64A560FD-BDB8-40F0-ACBF-4FD4A96D5A79}"/>
                 </a:ext>
               </a:extLst>
             </p:cNvPr>
@@ -9916,7 +9889,7 @@
               <p:cNvPr id="24" name="Flussdiagramm: Dokument 23">
                 <a:extLst>
                   <a:ext uri="{FF2B5EF4-FFF2-40B4-BE49-F238E27FC236}">
-                    <a16:creationId xmlns:a16="http://schemas.microsoft.com/office/drawing/2014/main" xmlns="" id="{3B0254FD-1241-4D3F-A905-617890D9BDB7}"/>
+                    <a16:creationId xmlns:a16="http://schemas.microsoft.com/office/drawing/2014/main" id="{3B0254FD-1241-4D3F-A905-617890D9BDB7}"/>
                   </a:ext>
                 </a:extLst>
               </p:cNvPr>
@@ -9969,7 +9942,7 @@
               <p:cNvPr id="26" name="Flussdiagramm: Dokument 25">
                 <a:extLst>
                   <a:ext uri="{FF2B5EF4-FFF2-40B4-BE49-F238E27FC236}">
-                    <a16:creationId xmlns:a16="http://schemas.microsoft.com/office/drawing/2014/main" xmlns="" id="{A541AAC5-F7A6-4D45-95FC-B3270014879A}"/>
+                    <a16:creationId xmlns:a16="http://schemas.microsoft.com/office/drawing/2014/main" id="{A541AAC5-F7A6-4D45-95FC-B3270014879A}"/>
                   </a:ext>
                 </a:extLst>
               </p:cNvPr>
@@ -10022,7 +9995,7 @@
               <p:cNvPr id="27" name="Textfeld 26">
                 <a:extLst>
                   <a:ext uri="{FF2B5EF4-FFF2-40B4-BE49-F238E27FC236}">
-                    <a16:creationId xmlns:a16="http://schemas.microsoft.com/office/drawing/2014/main" xmlns="" id="{194F4F25-91D7-4DFB-B7A2-12497EDE933F}"/>
+                    <a16:creationId xmlns:a16="http://schemas.microsoft.com/office/drawing/2014/main" id="{194F4F25-91D7-4DFB-B7A2-12497EDE933F}"/>
                   </a:ext>
                 </a:extLst>
               </p:cNvPr>
@@ -10065,7 +10038,7 @@
               <p:cNvPr id="29" name="Textfeld 28">
                 <a:extLst>
                   <a:ext uri="{FF2B5EF4-FFF2-40B4-BE49-F238E27FC236}">
-                    <a16:creationId xmlns:a16="http://schemas.microsoft.com/office/drawing/2014/main" xmlns="" id="{03C0E7DE-0FEE-415C-86B3-EA813E4ED989}"/>
+                    <a16:creationId xmlns:a16="http://schemas.microsoft.com/office/drawing/2014/main" id="{03C0E7DE-0FEE-415C-86B3-EA813E4ED989}"/>
                   </a:ext>
                 </a:extLst>
               </p:cNvPr>
@@ -10111,7 +10084,7 @@
               <p:cNvPr id="30" name="Textfeld 29">
                 <a:extLst>
                   <a:ext uri="{FF2B5EF4-FFF2-40B4-BE49-F238E27FC236}">
-                    <a16:creationId xmlns:a16="http://schemas.microsoft.com/office/drawing/2014/main" xmlns="" id="{FF30B90D-055D-4555-8B4D-F052DD1DC1A6}"/>
+                    <a16:creationId xmlns:a16="http://schemas.microsoft.com/office/drawing/2014/main" id="{FF30B90D-055D-4555-8B4D-F052DD1DC1A6}"/>
                   </a:ext>
                 </a:extLst>
               </p:cNvPr>
@@ -10154,7 +10127,7 @@
               <p:cNvPr id="31" name="Textfeld 30">
                 <a:extLst>
                   <a:ext uri="{FF2B5EF4-FFF2-40B4-BE49-F238E27FC236}">
-                    <a16:creationId xmlns:a16="http://schemas.microsoft.com/office/drawing/2014/main" xmlns="" id="{7CC6C5F7-D76E-4CD6-8E6D-93EF7D99116B}"/>
+                    <a16:creationId xmlns:a16="http://schemas.microsoft.com/office/drawing/2014/main" id="{7CC6C5F7-D76E-4CD6-8E6D-93EF7D99116B}"/>
                   </a:ext>
                 </a:extLst>
               </p:cNvPr>
@@ -10198,7 +10171,7 @@
             <p:cNvPr id="32" name="Textfeld 31">
               <a:extLst>
                 <a:ext uri="{FF2B5EF4-FFF2-40B4-BE49-F238E27FC236}">
-                  <a16:creationId xmlns:a16="http://schemas.microsoft.com/office/drawing/2014/main" xmlns="" id="{A27BE5DD-FD0D-420A-A079-AC46367F1CC3}"/>
+                  <a16:creationId xmlns:a16="http://schemas.microsoft.com/office/drawing/2014/main" id="{A27BE5DD-FD0D-420A-A079-AC46367F1CC3}"/>
                 </a:ext>
               </a:extLst>
             </p:cNvPr>
@@ -10242,7 +10215,7 @@
           <p:cNvPr id="15" name="Pfeil: nach rechts 14">
             <a:extLst>
               <a:ext uri="{FF2B5EF4-FFF2-40B4-BE49-F238E27FC236}">
-                <a16:creationId xmlns:a16="http://schemas.microsoft.com/office/drawing/2014/main" xmlns="" id="{28FD6023-536B-4507-B186-32031DDCA1CD}"/>
+                <a16:creationId xmlns:a16="http://schemas.microsoft.com/office/drawing/2014/main" id="{28FD6023-536B-4507-B186-32031DDCA1CD}"/>
               </a:ext>
             </a:extLst>
           </p:cNvPr>
@@ -10295,7 +10268,7 @@
           <p:cNvPr id="20" name="Pfeil: nach rechts 19">
             <a:extLst>
               <a:ext uri="{FF2B5EF4-FFF2-40B4-BE49-F238E27FC236}">
-                <a16:creationId xmlns:a16="http://schemas.microsoft.com/office/drawing/2014/main" xmlns="" id="{2BAA150E-DEB2-49F2-9B41-DC2C6658D9D4}"/>
+                <a16:creationId xmlns:a16="http://schemas.microsoft.com/office/drawing/2014/main" id="{2BAA150E-DEB2-49F2-9B41-DC2C6658D9D4}"/>
               </a:ext>
             </a:extLst>
           </p:cNvPr>
@@ -10348,7 +10321,7 @@
           <p:cNvPr id="21" name="Pfeil: delete">
             <a:extLst>
               <a:ext uri="{FF2B5EF4-FFF2-40B4-BE49-F238E27FC236}">
-                <a16:creationId xmlns:a16="http://schemas.microsoft.com/office/drawing/2014/main" xmlns="" id="{ACA347FB-8677-4E22-B4F7-186B44D7F5F6}"/>
+                <a16:creationId xmlns:a16="http://schemas.microsoft.com/office/drawing/2014/main" id="{ACA347FB-8677-4E22-B4F7-186B44D7F5F6}"/>
               </a:ext>
             </a:extLst>
           </p:cNvPr>
@@ -10401,7 +10374,7 @@
           <p:cNvPr id="23" name="Pfeil: free">
             <a:extLst>
               <a:ext uri="{FF2B5EF4-FFF2-40B4-BE49-F238E27FC236}">
-                <a16:creationId xmlns:a16="http://schemas.microsoft.com/office/drawing/2014/main" xmlns="" id="{787D0162-99F6-42D0-B5C2-864ABF802358}"/>
+                <a16:creationId xmlns:a16="http://schemas.microsoft.com/office/drawing/2014/main" id="{787D0162-99F6-42D0-B5C2-864ABF802358}"/>
               </a:ext>
             </a:extLst>
           </p:cNvPr>
@@ -10454,7 +10427,7 @@
           <p:cNvPr id="9" name="Wolke 8">
             <a:extLst>
               <a:ext uri="{FF2B5EF4-FFF2-40B4-BE49-F238E27FC236}">
-                <a16:creationId xmlns:a16="http://schemas.microsoft.com/office/drawing/2014/main" xmlns="" id="{D68FD1F4-7345-403D-B248-244C490896E9}"/>
+                <a16:creationId xmlns:a16="http://schemas.microsoft.com/office/drawing/2014/main" id="{D68FD1F4-7345-403D-B248-244C490896E9}"/>
               </a:ext>
             </a:extLst>
           </p:cNvPr>
@@ -10527,7 +10500,7 @@
           <p:cNvPr id="10" name="Rechteck 9" hidden="1">
             <a:extLst>
               <a:ext uri="{FF2B5EF4-FFF2-40B4-BE49-F238E27FC236}">
-                <a16:creationId xmlns:a16="http://schemas.microsoft.com/office/drawing/2014/main" xmlns="" id="{05DBD7CB-6F0D-4800-8FC8-3DC3EB946F02}"/>
+                <a16:creationId xmlns:a16="http://schemas.microsoft.com/office/drawing/2014/main" id="{05DBD7CB-6F0D-4800-8FC8-3DC3EB946F02}"/>
               </a:ext>
             </a:extLst>
           </p:cNvPr>
@@ -10646,7 +10619,7 @@
     </p:custDataLst>
     <p:extLst>
       <p:ext uri="{BB962C8B-B14F-4D97-AF65-F5344CB8AC3E}">
-        <p14:creationId xmlns:p14="http://schemas.microsoft.com/office/powerpoint/2010/main" xmlns="" val="210037210"/>
+        <p14:creationId xmlns:p14="http://schemas.microsoft.com/office/powerpoint/2010/main" val="210037210"/>
       </p:ext>
     </p:extLst>
   </p:cSld>
@@ -11032,7 +11005,7 @@
           <p:cNvPr id="2" name="Titel 1">
             <a:extLst>
               <a:ext uri="{FF2B5EF4-FFF2-40B4-BE49-F238E27FC236}">
-                <a16:creationId xmlns:a16="http://schemas.microsoft.com/office/drawing/2014/main" xmlns="" id="{D5BDABF4-6A95-439D-8D3A-DA3970FBB573}"/>
+                <a16:creationId xmlns:a16="http://schemas.microsoft.com/office/drawing/2014/main" id="{D5BDABF4-6A95-439D-8D3A-DA3970FBB573}"/>
               </a:ext>
             </a:extLst>
           </p:cNvPr>
@@ -11060,7 +11033,7 @@
           <p:cNvPr id="3" name="Inhaltsplatzhalter 2">
             <a:extLst>
               <a:ext uri="{FF2B5EF4-FFF2-40B4-BE49-F238E27FC236}">
-                <a16:creationId xmlns:a16="http://schemas.microsoft.com/office/drawing/2014/main" xmlns="" id="{1176F6AC-791A-49A7-82E1-DD2C666CAC71}"/>
+                <a16:creationId xmlns:a16="http://schemas.microsoft.com/office/drawing/2014/main" id="{1176F6AC-791A-49A7-82E1-DD2C666CAC71}"/>
               </a:ext>
             </a:extLst>
           </p:cNvPr>
@@ -11071,44 +11044,21 @@
             <p:ph idx="1"/>
           </p:nvPr>
         </p:nvSpPr>
-        <p:spPr/>
+        <p:spPr>
+          <a:xfrm>
+            <a:off x="286657" y="1941914"/>
+            <a:ext cx="10515600" cy="4351338"/>
+          </a:xfrm>
+        </p:spPr>
         <p:txBody>
           <a:bodyPr>
-            <a:normAutofit fontScale="25000" lnSpcReduction="20000"/>
+            <a:normAutofit fontScale="32500" lnSpcReduction="20000"/>
           </a:bodyPr>
           <a:lstStyle/>
           <a:p>
             <a:r>
               <a:rPr lang="de-DE" sz="8000" dirty="0"/>
               <a:t>sind eigenständige Programmeinheiten</a:t>
-            </a:r>
-          </a:p>
-          <a:p>
-            <a:r>
-              <a:rPr lang="de-DE" sz="8000" dirty="0"/>
-              <a:t>werden mit </a:t>
-            </a:r>
-            <a:r>
-              <a:rPr lang="de-DE" sz="8000" dirty="0" err="1"/>
-              <a:t>xTaskCreate</a:t>
-            </a:r>
-            <a:r>
-              <a:rPr lang="de-DE" sz="8000" dirty="0"/>
-              <a:t>() erzeugt</a:t>
-            </a:r>
-          </a:p>
-          <a:p>
-            <a:r>
-              <a:rPr lang="de-DE" sz="8000" dirty="0"/>
-              <a:t>werden mit </a:t>
-            </a:r>
-            <a:r>
-              <a:rPr lang="de-DE" sz="8000" dirty="0" err="1"/>
-              <a:t>xTaskDelete</a:t>
-            </a:r>
-            <a:r>
-              <a:rPr lang="de-DE" sz="8000" dirty="0"/>
-              <a:t>() gelöscht</a:t>
             </a:r>
           </a:p>
           <a:p>
@@ -11211,7 +11161,7 @@
           <p:cNvPr id="4" name="Fußzeilenplatzhalter 3">
             <a:extLst>
               <a:ext uri="{FF2B5EF4-FFF2-40B4-BE49-F238E27FC236}">
-                <a16:creationId xmlns:a16="http://schemas.microsoft.com/office/drawing/2014/main" xmlns="" id="{B464372B-5773-4BFE-BE11-02BCA11506D7}"/>
+                <a16:creationId xmlns:a16="http://schemas.microsoft.com/office/drawing/2014/main" id="{B464372B-5773-4BFE-BE11-02BCA11506D7}"/>
               </a:ext>
             </a:extLst>
           </p:cNvPr>
@@ -11239,7 +11189,7 @@
           <p:cNvPr id="7" name="Grafik 6">
             <a:extLst>
               <a:ext uri="{FF2B5EF4-FFF2-40B4-BE49-F238E27FC236}">
-                <a16:creationId xmlns:a16="http://schemas.microsoft.com/office/drawing/2014/main" xmlns="" id="{FE0623CE-4406-41FF-BA93-CF12837C4CE8}"/>
+                <a16:creationId xmlns:a16="http://schemas.microsoft.com/office/drawing/2014/main" id="{FE0623CE-4406-41FF-BA93-CF12837C4CE8}"/>
               </a:ext>
             </a:extLst>
           </p:cNvPr>
@@ -11252,7 +11202,7 @@
           <a:blip r:embed="rId4" cstate="print">
             <a:extLst>
               <a:ext uri="{28A0092B-C50C-407E-A947-70E740481C1C}">
-                <a14:useLocalDpi xmlns:a14="http://schemas.microsoft.com/office/drawing/2010/main" xmlns="" val="0"/>
+                <a14:useLocalDpi xmlns:a14="http://schemas.microsoft.com/office/drawing/2010/main" val="0"/>
               </a:ext>
             </a:extLst>
           </a:blip>
@@ -11262,7 +11212,7 @@
         </p:blipFill>
         <p:spPr>
           <a:xfrm>
-            <a:off x="5913971" y="1823430"/>
+            <a:off x="6822828" y="1825625"/>
             <a:ext cx="3467584" cy="4353533"/>
           </a:xfrm>
           <a:prstGeom prst="rect">
@@ -11275,7 +11225,7 @@
           <p:cNvPr id="6" name="Fußzeilenplatzhalter 4">
             <a:extLst>
               <a:ext uri="{FF2B5EF4-FFF2-40B4-BE49-F238E27FC236}">
-                <a16:creationId xmlns:a16="http://schemas.microsoft.com/office/drawing/2014/main" xmlns="" id="{54D9A601-C368-4E43-BB5D-767AD05ED3A8}"/>
+                <a16:creationId xmlns:a16="http://schemas.microsoft.com/office/drawing/2014/main" id="{54D9A601-C368-4E43-BB5D-767AD05ED3A8}"/>
               </a:ext>
             </a:extLst>
           </p:cNvPr>
@@ -11622,7 +11572,7 @@
           <p:cNvPr id="8" name="Gerade Verbindung 7">
             <a:extLst>
               <a:ext uri="{FF2B5EF4-FFF2-40B4-BE49-F238E27FC236}">
-                <a16:creationId xmlns:a16="http://schemas.microsoft.com/office/drawing/2014/main" xmlns="" id="{C461B434-F8B8-4802-822E-BFA54862EE43}"/>
+                <a16:creationId xmlns:a16="http://schemas.microsoft.com/office/drawing/2014/main" id="{C461B434-F8B8-4802-822E-BFA54862EE43}"/>
               </a:ext>
             </a:extLst>
           </p:cNvPr>
@@ -11692,7 +11642,7 @@
     </p:custDataLst>
     <p:extLst>
       <p:ext uri="{BB962C8B-B14F-4D97-AF65-F5344CB8AC3E}">
-        <p14:creationId xmlns:p14="http://schemas.microsoft.com/office/powerpoint/2010/main" xmlns="" val="2861433211"/>
+        <p14:creationId xmlns:p14="http://schemas.microsoft.com/office/powerpoint/2010/main" val="2861433211"/>
       </p:ext>
     </p:extLst>
   </p:cSld>
@@ -11724,7 +11674,7 @@
           <p:cNvPr id="2" name="Titel 1">
             <a:extLst>
               <a:ext uri="{FF2B5EF4-FFF2-40B4-BE49-F238E27FC236}">
-                <a16:creationId xmlns:a16="http://schemas.microsoft.com/office/drawing/2014/main" xmlns="" id="{FA538962-AA10-4831-A21F-39427C91FBFE}"/>
+                <a16:creationId xmlns:a16="http://schemas.microsoft.com/office/drawing/2014/main" id="{FA538962-AA10-4831-A21F-39427C91FBFE}"/>
               </a:ext>
             </a:extLst>
           </p:cNvPr>
@@ -11752,7 +11702,7 @@
           <p:cNvPr id="4" name="Fußzeilenplatzhalter 3">
             <a:extLst>
               <a:ext uri="{FF2B5EF4-FFF2-40B4-BE49-F238E27FC236}">
-                <a16:creationId xmlns:a16="http://schemas.microsoft.com/office/drawing/2014/main" xmlns="" id="{D5029D67-7C47-434B-83E3-5F74F5C05DED}"/>
+                <a16:creationId xmlns:a16="http://schemas.microsoft.com/office/drawing/2014/main" id="{D5029D67-7C47-434B-83E3-5F74F5C05DED}"/>
               </a:ext>
             </a:extLst>
           </p:cNvPr>
@@ -11780,7 +11730,7 @@
           <p:cNvPr id="8" name="Textfeld 7">
             <a:extLst>
               <a:ext uri="{FF2B5EF4-FFF2-40B4-BE49-F238E27FC236}">
-                <a16:creationId xmlns:a16="http://schemas.microsoft.com/office/drawing/2014/main" xmlns="" id="{85CE94F3-710B-4ED5-BB05-5AC8534A09D0}"/>
+                <a16:creationId xmlns:a16="http://schemas.microsoft.com/office/drawing/2014/main" id="{85CE94F3-710B-4ED5-BB05-5AC8534A09D0}"/>
               </a:ext>
             </a:extLst>
           </p:cNvPr>
@@ -11789,8 +11739,8 @@
         </p:nvSpPr>
         <p:spPr>
           <a:xfrm>
-            <a:off x="5878441" y="1982933"/>
-            <a:ext cx="6142772" cy="5724644"/>
+            <a:off x="5878441" y="2274791"/>
+            <a:ext cx="5874237" cy="3877985"/>
           </a:xfrm>
           <a:prstGeom prst="rect">
             <a:avLst/>
@@ -11837,8 +11787,63 @@
             </a:pPr>
             <a:r>
               <a:rPr lang="de-DE" sz="2400" dirty="0"/>
-              <a:t>1 CPU Kern = 1 max. Task im Running State</a:t>
-            </a:r>
+              <a:t>3 Scheduling Optionen</a:t>
+            </a:r>
+          </a:p>
+          <a:p>
+            <a:pPr marL="742950" lvl="1" indent="-285750">
+              <a:buFont typeface="Wingdings" panose="05000000000000000000" pitchFamily="2" charset="2"/>
+              <a:buChar char="§"/>
+            </a:pPr>
+            <a:r>
+              <a:rPr lang="de-DE" sz="2400" dirty="0" err="1"/>
+              <a:t>Cooperative</a:t>
+            </a:r>
+            <a:r>
+              <a:rPr lang="de-DE" sz="2400" dirty="0"/>
+              <a:t> Mode</a:t>
+            </a:r>
+          </a:p>
+          <a:p>
+            <a:pPr marL="742950" lvl="1" indent="-285750">
+              <a:buFont typeface="Wingdings" panose="05000000000000000000" pitchFamily="2" charset="2"/>
+              <a:buChar char="§"/>
+            </a:pPr>
+            <a:r>
+              <a:rPr lang="de-DE" sz="2400" dirty="0" err="1"/>
+              <a:t>Preemptive</a:t>
+            </a:r>
+            <a:r>
+              <a:rPr lang="de-DE" sz="2400" dirty="0"/>
+              <a:t> Mode</a:t>
+            </a:r>
+          </a:p>
+          <a:p>
+            <a:pPr marL="742950" lvl="1" indent="-285750">
+              <a:buFont typeface="Wingdings" panose="05000000000000000000" pitchFamily="2" charset="2"/>
+              <a:buChar char="§"/>
+            </a:pPr>
+            <a:r>
+              <a:rPr lang="de-DE" sz="2400" dirty="0" err="1"/>
+              <a:t>Preemptive</a:t>
+            </a:r>
+            <a:r>
+              <a:rPr lang="de-DE" sz="2400" dirty="0"/>
+              <a:t>  Mode </a:t>
+            </a:r>
+            <a:r>
+              <a:rPr lang="de-DE" sz="2400" dirty="0" err="1"/>
+              <a:t>with</a:t>
+            </a:r>
+            <a:r>
+              <a:rPr lang="de-DE" sz="2400" dirty="0"/>
+              <a:t> Time </a:t>
+            </a:r>
+            <a:r>
+              <a:rPr lang="de-DE" sz="2400" dirty="0" err="1"/>
+              <a:t>Slicing</a:t>
+            </a:r>
+            <a:endParaRPr lang="de-DE" sz="2400" dirty="0"/>
           </a:p>
           <a:p>
             <a:pPr marL="285750" indent="-285750">
@@ -11855,111 +11860,6 @@
             <a:endParaRPr lang="de-DE" sz="2400" dirty="0"/>
           </a:p>
           <a:p>
-            <a:endParaRPr lang="de-DE" sz="2400" dirty="0"/>
-          </a:p>
-          <a:p>
-            <a:pPr marL="342900" indent="-342900">
-              <a:buFont typeface="Wingdings" panose="05000000000000000000" pitchFamily="2" charset="2"/>
-              <a:buChar char="§"/>
-            </a:pPr>
-            <a:r>
-              <a:rPr lang="de-DE" sz="2400" dirty="0"/>
-              <a:t>Einfache Konfiguration über </a:t>
-            </a:r>
-            <a:r>
-              <a:rPr lang="de-DE" sz="2400" dirty="0" err="1"/>
-              <a:t>FreeRTOS</a:t>
-            </a:r>
-            <a:r>
-              <a:rPr lang="de-DE" sz="2400" dirty="0"/>
-              <a:t> </a:t>
-            </a:r>
-            <a:r>
-              <a:rPr lang="de-DE" sz="2400" dirty="0" err="1"/>
-              <a:t>Config</a:t>
-            </a:r>
-            <a:endParaRPr lang="de-DE" sz="2400" dirty="0"/>
-          </a:p>
-          <a:p>
-            <a:pPr marL="285750" indent="-285750">
-              <a:buFont typeface="Wingdings" panose="05000000000000000000" pitchFamily="2" charset="2"/>
-              <a:buChar char="§"/>
-            </a:pPr>
-            <a:r>
-              <a:rPr lang="de-DE" sz="2400" dirty="0"/>
-              <a:t>3 Scheduling Optionen</a:t>
-            </a:r>
-          </a:p>
-          <a:p>
-            <a:pPr marL="742950" lvl="1" indent="-285750">
-              <a:buFont typeface="Wingdings" panose="05000000000000000000" pitchFamily="2" charset="2"/>
-              <a:buChar char="§"/>
-            </a:pPr>
-            <a:r>
-              <a:rPr lang="de-DE" sz="2400" dirty="0" err="1"/>
-              <a:t>Cooperative</a:t>
-            </a:r>
-            <a:r>
-              <a:rPr lang="de-DE" sz="2400" dirty="0"/>
-              <a:t> Mode</a:t>
-            </a:r>
-          </a:p>
-          <a:p>
-            <a:pPr marL="742950" lvl="1" indent="-285750">
-              <a:buFont typeface="Wingdings" panose="05000000000000000000" pitchFamily="2" charset="2"/>
-              <a:buChar char="§"/>
-            </a:pPr>
-            <a:r>
-              <a:rPr lang="de-DE" sz="2400" dirty="0" err="1"/>
-              <a:t>Preemptive</a:t>
-            </a:r>
-            <a:r>
-              <a:rPr lang="de-DE" sz="2400" dirty="0"/>
-              <a:t> Mode</a:t>
-            </a:r>
-          </a:p>
-          <a:p>
-            <a:pPr marL="742950" lvl="1" indent="-285750">
-              <a:buFont typeface="Wingdings" panose="05000000000000000000" pitchFamily="2" charset="2"/>
-              <a:buChar char="§"/>
-            </a:pPr>
-            <a:r>
-              <a:rPr lang="de-DE" sz="2400" dirty="0" err="1"/>
-              <a:t>Preemptive</a:t>
-            </a:r>
-            <a:r>
-              <a:rPr lang="de-DE" sz="2400" dirty="0"/>
-              <a:t>  Mode </a:t>
-            </a:r>
-            <a:r>
-              <a:rPr lang="de-DE" sz="2400" dirty="0" err="1"/>
-              <a:t>with</a:t>
-            </a:r>
-            <a:r>
-              <a:rPr lang="de-DE" sz="2400" dirty="0"/>
-              <a:t> Time </a:t>
-            </a:r>
-            <a:r>
-              <a:rPr lang="de-DE" sz="2400" dirty="0" err="1"/>
-              <a:t>Slicing</a:t>
-            </a:r>
-            <a:endParaRPr lang="de-DE" sz="2400" dirty="0"/>
-          </a:p>
-          <a:p>
-            <a:pPr marL="285750" indent="-285750">
-              <a:buFont typeface="Wingdings" panose="05000000000000000000" pitchFamily="2" charset="2"/>
-              <a:buChar char="§"/>
-            </a:pPr>
-            <a:endParaRPr lang="de-DE" sz="2400" dirty="0"/>
-          </a:p>
-          <a:p>
-            <a:pPr marL="285750" indent="-285750">
-              <a:buFont typeface="Wingdings" panose="05000000000000000000" pitchFamily="2" charset="2"/>
-              <a:buChar char="§"/>
-            </a:pPr>
-            <a:endParaRPr lang="de-DE" sz="2400" dirty="0"/>
-          </a:p>
-          <a:p>
             <a:pPr marL="285750" indent="-285750">
               <a:buFont typeface="Wingdings" panose="05000000000000000000" pitchFamily="2" charset="2"/>
               <a:buChar char="§"/>
@@ -11983,7 +11883,7 @@
           <p:cNvPr id="10" name="Grafik 9">
             <a:extLst>
               <a:ext uri="{FF2B5EF4-FFF2-40B4-BE49-F238E27FC236}">
-                <a16:creationId xmlns:a16="http://schemas.microsoft.com/office/drawing/2014/main" xmlns="" id="{B92E8399-6E1E-470E-BBA4-7805A508029F}"/>
+                <a16:creationId xmlns:a16="http://schemas.microsoft.com/office/drawing/2014/main" id="{B92E8399-6E1E-470E-BBA4-7805A508029F}"/>
               </a:ext>
             </a:extLst>
           </p:cNvPr>
@@ -11996,7 +11896,7 @@
           <a:blip r:embed="rId4" cstate="print">
             <a:extLst>
               <a:ext uri="{28A0092B-C50C-407E-A947-70E740481C1C}">
-                <a14:useLocalDpi xmlns:a14="http://schemas.microsoft.com/office/drawing/2010/main" xmlns="" val="0"/>
+                <a14:useLocalDpi xmlns:a14="http://schemas.microsoft.com/office/drawing/2010/main" val="0"/>
               </a:ext>
             </a:extLst>
           </a:blip>
@@ -12014,49 +11914,13 @@
           </a:prstGeom>
         </p:spPr>
       </p:pic>
-      <p:pic>
-        <p:nvPicPr>
-          <p:cNvPr id="9" name="Grafik 8">
-            <a:extLst>
-              <a:ext uri="{FF2B5EF4-FFF2-40B4-BE49-F238E27FC236}">
-                <a16:creationId xmlns:a16="http://schemas.microsoft.com/office/drawing/2014/main" xmlns="" id="{E4EB05B5-0B7D-4339-8E3C-781ADB4506E3}"/>
-              </a:ext>
-            </a:extLst>
-          </p:cNvPr>
-          <p:cNvPicPr>
-            <a:picLocks noChangeAspect="1"/>
-          </p:cNvPicPr>
-          <p:nvPr/>
-        </p:nvPicPr>
-        <p:blipFill>
-          <a:blip r:embed="rId5" cstate="print">
-            <a:extLst>
-              <a:ext uri="{28A0092B-C50C-407E-A947-70E740481C1C}">
-                <a14:useLocalDpi xmlns:a14="http://schemas.microsoft.com/office/drawing/2010/main" xmlns="" val="0"/>
-              </a:ext>
-            </a:extLst>
-          </a:blip>
-          <a:stretch>
-            <a:fillRect/>
-          </a:stretch>
-        </p:blipFill>
-        <p:spPr>
-          <a:xfrm>
-            <a:off x="6521943" y="3348083"/>
-            <a:ext cx="3996653" cy="739106"/>
-          </a:xfrm>
-          <a:prstGeom prst="rect">
-            <a:avLst/>
-          </a:prstGeom>
-        </p:spPr>
-      </p:pic>
     </p:spTree>
     <p:custDataLst>
       <p:tags r:id="rId1"/>
     </p:custDataLst>
     <p:extLst>
       <p:ext uri="{BB962C8B-B14F-4D97-AF65-F5344CB8AC3E}">
-        <p14:creationId xmlns:p14="http://schemas.microsoft.com/office/powerpoint/2010/main" xmlns="" val="4266597995"/>
+        <p14:creationId xmlns:p14="http://schemas.microsoft.com/office/powerpoint/2010/main" val="4266597995"/>
       </p:ext>
     </p:extLst>
   </p:cSld>
@@ -12088,7 +11952,7 @@
           <p:cNvPr id="2" name="Titel 1">
             <a:extLst>
               <a:ext uri="{FF2B5EF4-FFF2-40B4-BE49-F238E27FC236}">
-                <a16:creationId xmlns:a16="http://schemas.microsoft.com/office/drawing/2014/main" xmlns="" id="{1D7DF3BA-93D7-43E7-82CA-DEEB8031D74B}"/>
+                <a16:creationId xmlns:a16="http://schemas.microsoft.com/office/drawing/2014/main" id="{1D7DF3BA-93D7-43E7-82CA-DEEB8031D74B}"/>
               </a:ext>
             </a:extLst>
           </p:cNvPr>
@@ -12116,7 +11980,7 @@
           <p:cNvPr id="4" name="Fußzeilenplatzhalter 3">
             <a:extLst>
               <a:ext uri="{FF2B5EF4-FFF2-40B4-BE49-F238E27FC236}">
-                <a16:creationId xmlns:a16="http://schemas.microsoft.com/office/drawing/2014/main" xmlns="" id="{E8A6171D-17AF-4DB6-972C-AA843CF54D0F}"/>
+                <a16:creationId xmlns:a16="http://schemas.microsoft.com/office/drawing/2014/main" id="{E8A6171D-17AF-4DB6-972C-AA843CF54D0F}"/>
               </a:ext>
             </a:extLst>
           </p:cNvPr>
@@ -12144,7 +12008,7 @@
           <p:cNvPr id="12" name="Cooperative Text">
             <a:extLst>
               <a:ext uri="{FF2B5EF4-FFF2-40B4-BE49-F238E27FC236}">
-                <a16:creationId xmlns:a16="http://schemas.microsoft.com/office/drawing/2014/main" xmlns="" id="{22CC0027-EB22-4F54-A686-52F98ACA376A}"/>
+                <a16:creationId xmlns:a16="http://schemas.microsoft.com/office/drawing/2014/main" id="{22CC0027-EB22-4F54-A686-52F98ACA376A}"/>
               </a:ext>
             </a:extLst>
           </p:cNvPr>
@@ -12260,7 +12124,7 @@
           <p:cNvPr id="8" name="Cooperative">
             <a:extLst>
               <a:ext uri="{FF2B5EF4-FFF2-40B4-BE49-F238E27FC236}">
-                <a16:creationId xmlns:a16="http://schemas.microsoft.com/office/drawing/2014/main" xmlns="" id="{7154A1AA-387D-4AD5-87CA-19CCB8524984}"/>
+                <a16:creationId xmlns:a16="http://schemas.microsoft.com/office/drawing/2014/main" id="{7154A1AA-387D-4AD5-87CA-19CCB8524984}"/>
               </a:ext>
             </a:extLst>
           </p:cNvPr>
@@ -12273,7 +12137,7 @@
           <a:blip r:embed="rId4" cstate="print">
             <a:extLst>
               <a:ext uri="{28A0092B-C50C-407E-A947-70E740481C1C}">
-                <a14:useLocalDpi xmlns:a14="http://schemas.microsoft.com/office/drawing/2010/main" xmlns="" val="0"/>
+                <a14:useLocalDpi xmlns:a14="http://schemas.microsoft.com/office/drawing/2010/main" val="0"/>
               </a:ext>
             </a:extLst>
           </a:blip>
@@ -12296,7 +12160,7 @@
     </p:custDataLst>
     <p:extLst>
       <p:ext uri="{BB962C8B-B14F-4D97-AF65-F5344CB8AC3E}">
-        <p14:creationId xmlns:p14="http://schemas.microsoft.com/office/powerpoint/2010/main" xmlns="" val="2999870621"/>
+        <p14:creationId xmlns:p14="http://schemas.microsoft.com/office/powerpoint/2010/main" val="2999870621"/>
       </p:ext>
     </p:extLst>
   </p:cSld>
@@ -12328,7 +12192,7 @@
           <p:cNvPr id="2" name="Titel 1">
             <a:extLst>
               <a:ext uri="{FF2B5EF4-FFF2-40B4-BE49-F238E27FC236}">
-                <a16:creationId xmlns:a16="http://schemas.microsoft.com/office/drawing/2014/main" xmlns="" id="{1D7DF3BA-93D7-43E7-82CA-DEEB8031D74B}"/>
+                <a16:creationId xmlns:a16="http://schemas.microsoft.com/office/drawing/2014/main" id="{1D7DF3BA-93D7-43E7-82CA-DEEB8031D74B}"/>
               </a:ext>
             </a:extLst>
           </p:cNvPr>
@@ -12356,7 +12220,7 @@
           <p:cNvPr id="4" name="Fußzeilenplatzhalter 3">
             <a:extLst>
               <a:ext uri="{FF2B5EF4-FFF2-40B4-BE49-F238E27FC236}">
-                <a16:creationId xmlns:a16="http://schemas.microsoft.com/office/drawing/2014/main" xmlns="" id="{E8A6171D-17AF-4DB6-972C-AA843CF54D0F}"/>
+                <a16:creationId xmlns:a16="http://schemas.microsoft.com/office/drawing/2014/main" id="{E8A6171D-17AF-4DB6-972C-AA843CF54D0F}"/>
               </a:ext>
             </a:extLst>
           </p:cNvPr>
@@ -12384,7 +12248,7 @@
           <p:cNvPr id="9" name="Preemptive">
             <a:extLst>
               <a:ext uri="{FF2B5EF4-FFF2-40B4-BE49-F238E27FC236}">
-                <a16:creationId xmlns:a16="http://schemas.microsoft.com/office/drawing/2014/main" xmlns="" id="{C6C0787E-FF26-43AD-B9C6-973C4C2403E6}"/>
+                <a16:creationId xmlns:a16="http://schemas.microsoft.com/office/drawing/2014/main" id="{C6C0787E-FF26-43AD-B9C6-973C4C2403E6}"/>
               </a:ext>
             </a:extLst>
           </p:cNvPr>
@@ -12397,7 +12261,7 @@
           <a:blip r:embed="rId3" cstate="print">
             <a:extLst>
               <a:ext uri="{28A0092B-C50C-407E-A947-70E740481C1C}">
-                <a14:useLocalDpi xmlns:a14="http://schemas.microsoft.com/office/drawing/2010/main" xmlns="" val="0"/>
+                <a14:useLocalDpi xmlns:a14="http://schemas.microsoft.com/office/drawing/2010/main" val="0"/>
               </a:ext>
             </a:extLst>
           </a:blip>
@@ -12419,7 +12283,7 @@
           <p:cNvPr id="11" name="Preeptive Text">
             <a:extLst>
               <a:ext uri="{FF2B5EF4-FFF2-40B4-BE49-F238E27FC236}">
-                <a16:creationId xmlns:a16="http://schemas.microsoft.com/office/drawing/2014/main" xmlns="" id="{DAB3B608-CB9A-4795-8A3B-9600E66211EE}"/>
+                <a16:creationId xmlns:a16="http://schemas.microsoft.com/office/drawing/2014/main" id="{DAB3B608-CB9A-4795-8A3B-9600E66211EE}"/>
               </a:ext>
             </a:extLst>
           </p:cNvPr>
@@ -12575,20 +12439,13 @@
     </p:custDataLst>
     <p:extLst>
       <p:ext uri="{BB962C8B-B14F-4D97-AF65-F5344CB8AC3E}">
-        <p14:creationId xmlns:p14="http://schemas.microsoft.com/office/powerpoint/2010/main" xmlns="" val="2237476551"/>
+        <p14:creationId xmlns:p14="http://schemas.microsoft.com/office/powerpoint/2010/main" val="2237476551"/>
       </p:ext>
     </p:extLst>
   </p:cSld>
   <p:clrMapOvr>
     <a:masterClrMapping/>
   </p:clrMapOvr>
-  <p:timing>
-    <p:tnLst>
-      <p:par>
-        <p:cTn id="1" dur="indefinite" restart="never" nodeType="tmRoot"/>
-      </p:par>
-    </p:tnLst>
-  </p:timing>
 </p:sld>
 </file>
 
@@ -12707,21 +12564,21 @@
                 <a:gridCol w="2948045">
                   <a:extLst>
                     <a:ext uri="{9D8B030D-6E8A-4147-A177-3AD203B41FA5}">
-                      <a16:colId xmlns:a16="http://schemas.microsoft.com/office/drawing/2014/main" xmlns="" val="20000"/>
+                      <a16:colId xmlns:a16="http://schemas.microsoft.com/office/drawing/2014/main" val="20000"/>
                     </a:ext>
                   </a:extLst>
                 </a:gridCol>
                 <a:gridCol w="2948045">
                   <a:extLst>
                     <a:ext uri="{9D8B030D-6E8A-4147-A177-3AD203B41FA5}">
-                      <a16:colId xmlns:a16="http://schemas.microsoft.com/office/drawing/2014/main" xmlns="" val="20001"/>
+                      <a16:colId xmlns:a16="http://schemas.microsoft.com/office/drawing/2014/main" val="20001"/>
                     </a:ext>
                   </a:extLst>
                 </a:gridCol>
                 <a:gridCol w="2948045">
                   <a:extLst>
                     <a:ext uri="{9D8B030D-6E8A-4147-A177-3AD203B41FA5}">
-                      <a16:colId xmlns:a16="http://schemas.microsoft.com/office/drawing/2014/main" xmlns="" val="20002"/>
+                      <a16:colId xmlns:a16="http://schemas.microsoft.com/office/drawing/2014/main" val="20002"/>
                     </a:ext>
                   </a:extLst>
                 </a:gridCol>
@@ -12821,7 +12678,7 @@
                 </a:tc>
                 <a:extLst>
                   <a:ext uri="{0D108BD9-81ED-4DB2-BD59-A6C34878D82A}">
-                    <a16:rowId xmlns:a16="http://schemas.microsoft.com/office/drawing/2014/main" xmlns="" val="10000"/>
+                    <a16:rowId xmlns:a16="http://schemas.microsoft.com/office/drawing/2014/main" val="10000"/>
                   </a:ext>
                 </a:extLst>
               </a:tr>
@@ -13051,7 +12908,7 @@
                 </a:tc>
                 <a:extLst>
                   <a:ext uri="{0D108BD9-81ED-4DB2-BD59-A6C34878D82A}">
-                    <a16:rowId xmlns:a16="http://schemas.microsoft.com/office/drawing/2014/main" xmlns="" val="10001"/>
+                    <a16:rowId xmlns:a16="http://schemas.microsoft.com/office/drawing/2014/main" val="10001"/>
                   </a:ext>
                 </a:extLst>
               </a:tr>
@@ -13064,7 +12921,7 @@
           <p:cNvPr id="9" name="Fußzeilenplatzhalter 4">
             <a:extLst>
               <a:ext uri="{FF2B5EF4-FFF2-40B4-BE49-F238E27FC236}">
-                <a16:creationId xmlns:a16="http://schemas.microsoft.com/office/drawing/2014/main" xmlns="" id="{58747079-608B-4AFA-8078-48F04CFA1DE0}"/>
+                <a16:creationId xmlns:a16="http://schemas.microsoft.com/office/drawing/2014/main" id="{58747079-608B-4AFA-8078-48F04CFA1DE0}"/>
               </a:ext>
             </a:extLst>
           </p:cNvPr>
@@ -13411,7 +13268,7 @@
           <p:cNvPr id="10" name="Gerade Verbindung 7">
             <a:extLst>
               <a:ext uri="{FF2B5EF4-FFF2-40B4-BE49-F238E27FC236}">
-                <a16:creationId xmlns:a16="http://schemas.microsoft.com/office/drawing/2014/main" xmlns="" id="{BC63F1A0-1B96-41B0-8879-307260B3DFDF}"/>
+                <a16:creationId xmlns:a16="http://schemas.microsoft.com/office/drawing/2014/main" id="{BC63F1A0-1B96-41B0-8879-307260B3DFDF}"/>
               </a:ext>
             </a:extLst>
           </p:cNvPr>
@@ -13478,20 +13335,13 @@
     </p:spTree>
     <p:extLst>
       <p:ext uri="{BB962C8B-B14F-4D97-AF65-F5344CB8AC3E}">
-        <p14:creationId xmlns:p14="http://schemas.microsoft.com/office/powerpoint/2010/main" xmlns="" val="3377158169"/>
+        <p14:creationId xmlns:p14="http://schemas.microsoft.com/office/powerpoint/2010/main" val="3377158169"/>
       </p:ext>
     </p:extLst>
   </p:cSld>
   <p:clrMapOvr>
     <a:masterClrMapping/>
   </p:clrMapOvr>
-  <p:timing>
-    <p:tnLst>
-      <p:par>
-        <p:cTn id="1" dur="indefinite" restart="never" nodeType="tmRoot"/>
-      </p:par>
-    </p:tnLst>
-  </p:timing>
 </p:sld>
 </file>
 
@@ -13720,28 +13570,28 @@
                 <a:gridCol w="819809">
                   <a:extLst>
                     <a:ext uri="{9D8B030D-6E8A-4147-A177-3AD203B41FA5}">
-                      <a16:colId xmlns:a16="http://schemas.microsoft.com/office/drawing/2014/main" xmlns="" val="20000"/>
+                      <a16:colId xmlns:a16="http://schemas.microsoft.com/office/drawing/2014/main" val="20000"/>
                     </a:ext>
                   </a:extLst>
                 </a:gridCol>
                 <a:gridCol w="809296">
                   <a:extLst>
                     <a:ext uri="{9D8B030D-6E8A-4147-A177-3AD203B41FA5}">
-                      <a16:colId xmlns:a16="http://schemas.microsoft.com/office/drawing/2014/main" xmlns="" val="20001"/>
+                      <a16:colId xmlns:a16="http://schemas.microsoft.com/office/drawing/2014/main" val="20001"/>
                     </a:ext>
                   </a:extLst>
                 </a:gridCol>
                 <a:gridCol w="987973">
                   <a:extLst>
                     <a:ext uri="{9D8B030D-6E8A-4147-A177-3AD203B41FA5}">
-                      <a16:colId xmlns:a16="http://schemas.microsoft.com/office/drawing/2014/main" xmlns="" val="20002"/>
+                      <a16:colId xmlns:a16="http://schemas.microsoft.com/office/drawing/2014/main" val="20002"/>
                     </a:ext>
                   </a:extLst>
                 </a:gridCol>
                 <a:gridCol w="1898866">
                   <a:extLst>
                     <a:ext uri="{9D8B030D-6E8A-4147-A177-3AD203B41FA5}">
-                      <a16:colId xmlns:a16="http://schemas.microsoft.com/office/drawing/2014/main" xmlns="" val="20003"/>
+                      <a16:colId xmlns:a16="http://schemas.microsoft.com/office/drawing/2014/main" val="20003"/>
                     </a:ext>
                   </a:extLst>
                 </a:gridCol>
@@ -13804,7 +13654,7 @@
                 </a:tc>
                 <a:extLst>
                   <a:ext uri="{0D108BD9-81ED-4DB2-BD59-A6C34878D82A}">
-                    <a16:rowId xmlns:a16="http://schemas.microsoft.com/office/drawing/2014/main" xmlns="" val="10000"/>
+                    <a16:rowId xmlns:a16="http://schemas.microsoft.com/office/drawing/2014/main" val="10000"/>
                   </a:ext>
                 </a:extLst>
               </a:tr>
@@ -13854,7 +13704,7 @@
                 </a:tc>
                 <a:extLst>
                   <a:ext uri="{0D108BD9-81ED-4DB2-BD59-A6C34878D82A}">
-                    <a16:rowId xmlns:a16="http://schemas.microsoft.com/office/drawing/2014/main" xmlns="" val="10001"/>
+                    <a16:rowId xmlns:a16="http://schemas.microsoft.com/office/drawing/2014/main" val="10001"/>
                   </a:ext>
                 </a:extLst>
               </a:tr>
@@ -13904,7 +13754,7 @@
                 </a:tc>
                 <a:extLst>
                   <a:ext uri="{0D108BD9-81ED-4DB2-BD59-A6C34878D82A}">
-                    <a16:rowId xmlns:a16="http://schemas.microsoft.com/office/drawing/2014/main" xmlns="" val="10002"/>
+                    <a16:rowId xmlns:a16="http://schemas.microsoft.com/office/drawing/2014/main" val="10002"/>
                   </a:ext>
                 </a:extLst>
               </a:tr>
@@ -13954,7 +13804,7 @@
                 </a:tc>
                 <a:extLst>
                   <a:ext uri="{0D108BD9-81ED-4DB2-BD59-A6C34878D82A}">
-                    <a16:rowId xmlns:a16="http://schemas.microsoft.com/office/drawing/2014/main" xmlns="" val="10003"/>
+                    <a16:rowId xmlns:a16="http://schemas.microsoft.com/office/drawing/2014/main" val="10003"/>
                   </a:ext>
                 </a:extLst>
               </a:tr>
@@ -14283,7 +14133,7 @@
           <p:cNvPr id="33" name="Fußzeilenplatzhalter 4">
             <a:extLst>
               <a:ext uri="{FF2B5EF4-FFF2-40B4-BE49-F238E27FC236}">
-                <a16:creationId xmlns:a16="http://schemas.microsoft.com/office/drawing/2014/main" xmlns="" id="{2E42A4B8-D462-4D24-B630-C4E715160015}"/>
+                <a16:creationId xmlns:a16="http://schemas.microsoft.com/office/drawing/2014/main" id="{2E42A4B8-D462-4D24-B630-C4E715160015}"/>
               </a:ext>
             </a:extLst>
           </p:cNvPr>
@@ -14630,7 +14480,7 @@
           <p:cNvPr id="35" name="Gerade Verbindung 7">
             <a:extLst>
               <a:ext uri="{FF2B5EF4-FFF2-40B4-BE49-F238E27FC236}">
-                <a16:creationId xmlns:a16="http://schemas.microsoft.com/office/drawing/2014/main" xmlns="" id="{B75D970B-D834-48EE-8C58-99CF4EEB87D7}"/>
+                <a16:creationId xmlns:a16="http://schemas.microsoft.com/office/drawing/2014/main" id="{B75D970B-D834-48EE-8C58-99CF4EEB87D7}"/>
               </a:ext>
             </a:extLst>
           </p:cNvPr>
@@ -14697,20 +14547,13 @@
     </p:spTree>
     <p:extLst>
       <p:ext uri="{BB962C8B-B14F-4D97-AF65-F5344CB8AC3E}">
-        <p14:creationId xmlns:p14="http://schemas.microsoft.com/office/powerpoint/2010/main" xmlns="" val="2061272255"/>
+        <p14:creationId xmlns:p14="http://schemas.microsoft.com/office/powerpoint/2010/main" val="2061272255"/>
       </p:ext>
     </p:extLst>
   </p:cSld>
   <p:clrMapOvr>
     <a:masterClrMapping/>
   </p:clrMapOvr>
-  <p:timing>
-    <p:tnLst>
-      <p:par>
-        <p:cTn id="1" dur="indefinite" restart="never" nodeType="tmRoot"/>
-      </p:par>
-    </p:tnLst>
-  </p:timing>
 </p:sld>
 </file>
 
@@ -14939,28 +14782,28 @@
                 <a:gridCol w="819809">
                   <a:extLst>
                     <a:ext uri="{9D8B030D-6E8A-4147-A177-3AD203B41FA5}">
-                      <a16:colId xmlns:a16="http://schemas.microsoft.com/office/drawing/2014/main" xmlns="" val="20000"/>
+                      <a16:colId xmlns:a16="http://schemas.microsoft.com/office/drawing/2014/main" val="20000"/>
                     </a:ext>
                   </a:extLst>
                 </a:gridCol>
                 <a:gridCol w="809296">
                   <a:extLst>
                     <a:ext uri="{9D8B030D-6E8A-4147-A177-3AD203B41FA5}">
-                      <a16:colId xmlns:a16="http://schemas.microsoft.com/office/drawing/2014/main" xmlns="" val="20001"/>
+                      <a16:colId xmlns:a16="http://schemas.microsoft.com/office/drawing/2014/main" val="20001"/>
                     </a:ext>
                   </a:extLst>
                 </a:gridCol>
                 <a:gridCol w="987973">
                   <a:extLst>
                     <a:ext uri="{9D8B030D-6E8A-4147-A177-3AD203B41FA5}">
-                      <a16:colId xmlns:a16="http://schemas.microsoft.com/office/drawing/2014/main" xmlns="" val="20002"/>
+                      <a16:colId xmlns:a16="http://schemas.microsoft.com/office/drawing/2014/main" val="20002"/>
                     </a:ext>
                   </a:extLst>
                 </a:gridCol>
                 <a:gridCol w="1898866">
                   <a:extLst>
                     <a:ext uri="{9D8B030D-6E8A-4147-A177-3AD203B41FA5}">
-                      <a16:colId xmlns:a16="http://schemas.microsoft.com/office/drawing/2014/main" xmlns="" val="20003"/>
+                      <a16:colId xmlns:a16="http://schemas.microsoft.com/office/drawing/2014/main" val="20003"/>
                     </a:ext>
                   </a:extLst>
                 </a:gridCol>
@@ -15023,7 +14866,7 @@
                 </a:tc>
                 <a:extLst>
                   <a:ext uri="{0D108BD9-81ED-4DB2-BD59-A6C34878D82A}">
-                    <a16:rowId xmlns:a16="http://schemas.microsoft.com/office/drawing/2014/main" xmlns="" val="10000"/>
+                    <a16:rowId xmlns:a16="http://schemas.microsoft.com/office/drawing/2014/main" val="10000"/>
                   </a:ext>
                 </a:extLst>
               </a:tr>
@@ -15073,7 +14916,7 @@
                 </a:tc>
                 <a:extLst>
                   <a:ext uri="{0D108BD9-81ED-4DB2-BD59-A6C34878D82A}">
-                    <a16:rowId xmlns:a16="http://schemas.microsoft.com/office/drawing/2014/main" xmlns="" val="10001"/>
+                    <a16:rowId xmlns:a16="http://schemas.microsoft.com/office/drawing/2014/main" val="10001"/>
                   </a:ext>
                 </a:extLst>
               </a:tr>
@@ -15123,7 +14966,7 @@
                 </a:tc>
                 <a:extLst>
                   <a:ext uri="{0D108BD9-81ED-4DB2-BD59-A6C34878D82A}">
-                    <a16:rowId xmlns:a16="http://schemas.microsoft.com/office/drawing/2014/main" xmlns="" val="10002"/>
+                    <a16:rowId xmlns:a16="http://schemas.microsoft.com/office/drawing/2014/main" val="10002"/>
                   </a:ext>
                 </a:extLst>
               </a:tr>
@@ -15173,7 +15016,7 @@
                 </a:tc>
                 <a:extLst>
                   <a:ext uri="{0D108BD9-81ED-4DB2-BD59-A6C34878D82A}">
-                    <a16:rowId xmlns:a16="http://schemas.microsoft.com/office/drawing/2014/main" xmlns="" val="10003"/>
+                    <a16:rowId xmlns:a16="http://schemas.microsoft.com/office/drawing/2014/main" val="10003"/>
                   </a:ext>
                 </a:extLst>
               </a:tr>
@@ -15433,7 +15276,7 @@
           <p:cNvPr id="33" name="Fußzeilenplatzhalter 4">
             <a:extLst>
               <a:ext uri="{FF2B5EF4-FFF2-40B4-BE49-F238E27FC236}">
-                <a16:creationId xmlns:a16="http://schemas.microsoft.com/office/drawing/2014/main" xmlns="" id="{2E42A4B8-D462-4D24-B630-C4E715160015}"/>
+                <a16:creationId xmlns:a16="http://schemas.microsoft.com/office/drawing/2014/main" id="{2E42A4B8-D462-4D24-B630-C4E715160015}"/>
               </a:ext>
             </a:extLst>
           </p:cNvPr>
@@ -15780,7 +15623,7 @@
           <p:cNvPr id="35" name="Gerade Verbindung 7">
             <a:extLst>
               <a:ext uri="{FF2B5EF4-FFF2-40B4-BE49-F238E27FC236}">
-                <a16:creationId xmlns:a16="http://schemas.microsoft.com/office/drawing/2014/main" xmlns="" id="{B75D970B-D834-48EE-8C58-99CF4EEB87D7}"/>
+                <a16:creationId xmlns:a16="http://schemas.microsoft.com/office/drawing/2014/main" id="{B75D970B-D834-48EE-8C58-99CF4EEB87D7}"/>
               </a:ext>
             </a:extLst>
           </p:cNvPr>
@@ -15847,20 +15690,13 @@
     </p:spTree>
     <p:extLst>
       <p:ext uri="{BB962C8B-B14F-4D97-AF65-F5344CB8AC3E}">
-        <p14:creationId xmlns:p14="http://schemas.microsoft.com/office/powerpoint/2010/main" xmlns="" val="2061272255"/>
+        <p14:creationId xmlns:p14="http://schemas.microsoft.com/office/powerpoint/2010/main" val="2061272255"/>
       </p:ext>
     </p:extLst>
   </p:cSld>
   <p:clrMapOvr>
     <a:masterClrMapping/>
   </p:clrMapOvr>
-  <p:timing>
-    <p:tnLst>
-      <p:par>
-        <p:cTn id="1" dur="indefinite" restart="never" nodeType="tmRoot"/>
-      </p:par>
-    </p:tnLst>
-  </p:timing>
 </p:sld>
 </file>
 
@@ -15989,7 +15825,7 @@
     </p:spTree>
     <p:extLst>
       <p:ext uri="{BB962C8B-B14F-4D97-AF65-F5344CB8AC3E}">
-        <p14:creationId xmlns:p14="http://schemas.microsoft.com/office/powerpoint/2010/main" xmlns="" val="36633376"/>
+        <p14:creationId xmlns:p14="http://schemas.microsoft.com/office/powerpoint/2010/main" val="36633376"/>
       </p:ext>
     </p:extLst>
   </p:cSld>
@@ -16224,28 +16060,28 @@
                 <a:gridCol w="819809">
                   <a:extLst>
                     <a:ext uri="{9D8B030D-6E8A-4147-A177-3AD203B41FA5}">
-                      <a16:colId xmlns:a16="http://schemas.microsoft.com/office/drawing/2014/main" xmlns="" val="20000"/>
+                      <a16:colId xmlns:a16="http://schemas.microsoft.com/office/drawing/2014/main" val="20000"/>
                     </a:ext>
                   </a:extLst>
                 </a:gridCol>
                 <a:gridCol w="809296">
                   <a:extLst>
                     <a:ext uri="{9D8B030D-6E8A-4147-A177-3AD203B41FA5}">
-                      <a16:colId xmlns:a16="http://schemas.microsoft.com/office/drawing/2014/main" xmlns="" val="20001"/>
+                      <a16:colId xmlns:a16="http://schemas.microsoft.com/office/drawing/2014/main" val="20001"/>
                     </a:ext>
                   </a:extLst>
                 </a:gridCol>
                 <a:gridCol w="987973">
                   <a:extLst>
                     <a:ext uri="{9D8B030D-6E8A-4147-A177-3AD203B41FA5}">
-                      <a16:colId xmlns:a16="http://schemas.microsoft.com/office/drawing/2014/main" xmlns="" val="20002"/>
+                      <a16:colId xmlns:a16="http://schemas.microsoft.com/office/drawing/2014/main" val="20002"/>
                     </a:ext>
                   </a:extLst>
                 </a:gridCol>
                 <a:gridCol w="1898866">
                   <a:extLst>
                     <a:ext uri="{9D8B030D-6E8A-4147-A177-3AD203B41FA5}">
-                      <a16:colId xmlns:a16="http://schemas.microsoft.com/office/drawing/2014/main" xmlns="" val="20003"/>
+                      <a16:colId xmlns:a16="http://schemas.microsoft.com/office/drawing/2014/main" val="20003"/>
                     </a:ext>
                   </a:extLst>
                 </a:gridCol>
@@ -16308,7 +16144,7 @@
                 </a:tc>
                 <a:extLst>
                   <a:ext uri="{0D108BD9-81ED-4DB2-BD59-A6C34878D82A}">
-                    <a16:rowId xmlns:a16="http://schemas.microsoft.com/office/drawing/2014/main" xmlns="" val="10000"/>
+                    <a16:rowId xmlns:a16="http://schemas.microsoft.com/office/drawing/2014/main" val="10000"/>
                   </a:ext>
                 </a:extLst>
               </a:tr>
@@ -16358,7 +16194,7 @@
                 </a:tc>
                 <a:extLst>
                   <a:ext uri="{0D108BD9-81ED-4DB2-BD59-A6C34878D82A}">
-                    <a16:rowId xmlns:a16="http://schemas.microsoft.com/office/drawing/2014/main" xmlns="" val="10001"/>
+                    <a16:rowId xmlns:a16="http://schemas.microsoft.com/office/drawing/2014/main" val="10001"/>
                   </a:ext>
                 </a:extLst>
               </a:tr>
@@ -16408,7 +16244,7 @@
                 </a:tc>
                 <a:extLst>
                   <a:ext uri="{0D108BD9-81ED-4DB2-BD59-A6C34878D82A}">
-                    <a16:rowId xmlns:a16="http://schemas.microsoft.com/office/drawing/2014/main" xmlns="" val="10002"/>
+                    <a16:rowId xmlns:a16="http://schemas.microsoft.com/office/drawing/2014/main" val="10002"/>
                   </a:ext>
                 </a:extLst>
               </a:tr>
@@ -16458,7 +16294,7 @@
                 </a:tc>
                 <a:extLst>
                   <a:ext uri="{0D108BD9-81ED-4DB2-BD59-A6C34878D82A}">
-                    <a16:rowId xmlns:a16="http://schemas.microsoft.com/office/drawing/2014/main" xmlns="" val="10003"/>
+                    <a16:rowId xmlns:a16="http://schemas.microsoft.com/office/drawing/2014/main" val="10003"/>
                   </a:ext>
                 </a:extLst>
               </a:tr>
@@ -16976,7 +16812,7 @@
           <p:cNvPr id="33" name="Fußzeilenplatzhalter 4">
             <a:extLst>
               <a:ext uri="{FF2B5EF4-FFF2-40B4-BE49-F238E27FC236}">
-                <a16:creationId xmlns:a16="http://schemas.microsoft.com/office/drawing/2014/main" xmlns="" id="{2E42A4B8-D462-4D24-B630-C4E715160015}"/>
+                <a16:creationId xmlns:a16="http://schemas.microsoft.com/office/drawing/2014/main" id="{2E42A4B8-D462-4D24-B630-C4E715160015}"/>
               </a:ext>
             </a:extLst>
           </p:cNvPr>
@@ -17323,7 +17159,7 @@
           <p:cNvPr id="35" name="Gerade Verbindung 7">
             <a:extLst>
               <a:ext uri="{FF2B5EF4-FFF2-40B4-BE49-F238E27FC236}">
-                <a16:creationId xmlns:a16="http://schemas.microsoft.com/office/drawing/2014/main" xmlns="" id="{B75D970B-D834-48EE-8C58-99CF4EEB87D7}"/>
+                <a16:creationId xmlns:a16="http://schemas.microsoft.com/office/drawing/2014/main" id="{B75D970B-D834-48EE-8C58-99CF4EEB87D7}"/>
               </a:ext>
             </a:extLst>
           </p:cNvPr>
@@ -17390,20 +17226,13 @@
     </p:spTree>
     <p:extLst>
       <p:ext uri="{BB962C8B-B14F-4D97-AF65-F5344CB8AC3E}">
-        <p14:creationId xmlns:p14="http://schemas.microsoft.com/office/powerpoint/2010/main" xmlns="" val="2061272255"/>
+        <p14:creationId xmlns:p14="http://schemas.microsoft.com/office/powerpoint/2010/main" val="2061272255"/>
       </p:ext>
     </p:extLst>
   </p:cSld>
   <p:clrMapOvr>
     <a:masterClrMapping/>
   </p:clrMapOvr>
-  <p:timing>
-    <p:tnLst>
-      <p:par>
-        <p:cTn id="1" dur="indefinite" restart="never" nodeType="tmRoot"/>
-      </p:par>
-    </p:tnLst>
-  </p:timing>
 </p:sld>
 </file>
 
@@ -17632,28 +17461,28 @@
                 <a:gridCol w="819809">
                   <a:extLst>
                     <a:ext uri="{9D8B030D-6E8A-4147-A177-3AD203B41FA5}">
-                      <a16:colId xmlns:a16="http://schemas.microsoft.com/office/drawing/2014/main" xmlns="" val="20000"/>
+                      <a16:colId xmlns:a16="http://schemas.microsoft.com/office/drawing/2014/main" val="20000"/>
                     </a:ext>
                   </a:extLst>
                 </a:gridCol>
                 <a:gridCol w="809296">
                   <a:extLst>
                     <a:ext uri="{9D8B030D-6E8A-4147-A177-3AD203B41FA5}">
-                      <a16:colId xmlns:a16="http://schemas.microsoft.com/office/drawing/2014/main" xmlns="" val="20001"/>
+                      <a16:colId xmlns:a16="http://schemas.microsoft.com/office/drawing/2014/main" val="20001"/>
                     </a:ext>
                   </a:extLst>
                 </a:gridCol>
                 <a:gridCol w="987973">
                   <a:extLst>
                     <a:ext uri="{9D8B030D-6E8A-4147-A177-3AD203B41FA5}">
-                      <a16:colId xmlns:a16="http://schemas.microsoft.com/office/drawing/2014/main" xmlns="" val="20002"/>
+                      <a16:colId xmlns:a16="http://schemas.microsoft.com/office/drawing/2014/main" val="20002"/>
                     </a:ext>
                   </a:extLst>
                 </a:gridCol>
                 <a:gridCol w="1898866">
                   <a:extLst>
                     <a:ext uri="{9D8B030D-6E8A-4147-A177-3AD203B41FA5}">
-                      <a16:colId xmlns:a16="http://schemas.microsoft.com/office/drawing/2014/main" xmlns="" val="20003"/>
+                      <a16:colId xmlns:a16="http://schemas.microsoft.com/office/drawing/2014/main" val="20003"/>
                     </a:ext>
                   </a:extLst>
                 </a:gridCol>
@@ -17716,7 +17545,7 @@
                 </a:tc>
                 <a:extLst>
                   <a:ext uri="{0D108BD9-81ED-4DB2-BD59-A6C34878D82A}">
-                    <a16:rowId xmlns:a16="http://schemas.microsoft.com/office/drawing/2014/main" xmlns="" val="10000"/>
+                    <a16:rowId xmlns:a16="http://schemas.microsoft.com/office/drawing/2014/main" val="10000"/>
                   </a:ext>
                 </a:extLst>
               </a:tr>
@@ -17766,7 +17595,7 @@
                 </a:tc>
                 <a:extLst>
                   <a:ext uri="{0D108BD9-81ED-4DB2-BD59-A6C34878D82A}">
-                    <a16:rowId xmlns:a16="http://schemas.microsoft.com/office/drawing/2014/main" xmlns="" val="10001"/>
+                    <a16:rowId xmlns:a16="http://schemas.microsoft.com/office/drawing/2014/main" val="10001"/>
                   </a:ext>
                 </a:extLst>
               </a:tr>
@@ -17816,7 +17645,7 @@
                 </a:tc>
                 <a:extLst>
                   <a:ext uri="{0D108BD9-81ED-4DB2-BD59-A6C34878D82A}">
-                    <a16:rowId xmlns:a16="http://schemas.microsoft.com/office/drawing/2014/main" xmlns="" val="10002"/>
+                    <a16:rowId xmlns:a16="http://schemas.microsoft.com/office/drawing/2014/main" val="10002"/>
                   </a:ext>
                 </a:extLst>
               </a:tr>
@@ -17866,7 +17695,7 @@
                 </a:tc>
                 <a:extLst>
                   <a:ext uri="{0D108BD9-81ED-4DB2-BD59-A6C34878D82A}">
-                    <a16:rowId xmlns:a16="http://schemas.microsoft.com/office/drawing/2014/main" xmlns="" val="10003"/>
+                    <a16:rowId xmlns:a16="http://schemas.microsoft.com/office/drawing/2014/main" val="10003"/>
                   </a:ext>
                 </a:extLst>
               </a:tr>
@@ -18126,7 +17955,7 @@
           <p:cNvPr id="33" name="Fußzeilenplatzhalter 4">
             <a:extLst>
               <a:ext uri="{FF2B5EF4-FFF2-40B4-BE49-F238E27FC236}">
-                <a16:creationId xmlns:a16="http://schemas.microsoft.com/office/drawing/2014/main" xmlns="" id="{2E42A4B8-D462-4D24-B630-C4E715160015}"/>
+                <a16:creationId xmlns:a16="http://schemas.microsoft.com/office/drawing/2014/main" id="{2E42A4B8-D462-4D24-B630-C4E715160015}"/>
               </a:ext>
             </a:extLst>
           </p:cNvPr>
@@ -18473,7 +18302,7 @@
           <p:cNvPr id="35" name="Gerade Verbindung 7">
             <a:extLst>
               <a:ext uri="{FF2B5EF4-FFF2-40B4-BE49-F238E27FC236}">
-                <a16:creationId xmlns:a16="http://schemas.microsoft.com/office/drawing/2014/main" xmlns="" id="{B75D970B-D834-48EE-8C58-99CF4EEB87D7}"/>
+                <a16:creationId xmlns:a16="http://schemas.microsoft.com/office/drawing/2014/main" id="{B75D970B-D834-48EE-8C58-99CF4EEB87D7}"/>
               </a:ext>
             </a:extLst>
           </p:cNvPr>
@@ -18583,20 +18412,13 @@
     </p:spTree>
     <p:extLst>
       <p:ext uri="{BB962C8B-B14F-4D97-AF65-F5344CB8AC3E}">
-        <p14:creationId xmlns:p14="http://schemas.microsoft.com/office/powerpoint/2010/main" xmlns="" val="2061272255"/>
+        <p14:creationId xmlns:p14="http://schemas.microsoft.com/office/powerpoint/2010/main" val="2061272255"/>
       </p:ext>
     </p:extLst>
   </p:cSld>
   <p:clrMapOvr>
     <a:masterClrMapping/>
   </p:clrMapOvr>
-  <p:timing>
-    <p:tnLst>
-      <p:par>
-        <p:cTn id="1" dur="indefinite" restart="never" nodeType="tmRoot"/>
-      </p:par>
-    </p:tnLst>
-  </p:timing>
 </p:sld>
 </file>
 
@@ -18825,28 +18647,28 @@
                 <a:gridCol w="819809">
                   <a:extLst>
                     <a:ext uri="{9D8B030D-6E8A-4147-A177-3AD203B41FA5}">
-                      <a16:colId xmlns:a16="http://schemas.microsoft.com/office/drawing/2014/main" xmlns="" val="20000"/>
+                      <a16:colId xmlns:a16="http://schemas.microsoft.com/office/drawing/2014/main" val="20000"/>
                     </a:ext>
                   </a:extLst>
                 </a:gridCol>
                 <a:gridCol w="809296">
                   <a:extLst>
                     <a:ext uri="{9D8B030D-6E8A-4147-A177-3AD203B41FA5}">
-                      <a16:colId xmlns:a16="http://schemas.microsoft.com/office/drawing/2014/main" xmlns="" val="20001"/>
+                      <a16:colId xmlns:a16="http://schemas.microsoft.com/office/drawing/2014/main" val="20001"/>
                     </a:ext>
                   </a:extLst>
                 </a:gridCol>
                 <a:gridCol w="987973">
                   <a:extLst>
                     <a:ext uri="{9D8B030D-6E8A-4147-A177-3AD203B41FA5}">
-                      <a16:colId xmlns:a16="http://schemas.microsoft.com/office/drawing/2014/main" xmlns="" val="20002"/>
+                      <a16:colId xmlns:a16="http://schemas.microsoft.com/office/drawing/2014/main" val="20002"/>
                     </a:ext>
                   </a:extLst>
                 </a:gridCol>
                 <a:gridCol w="1898866">
                   <a:extLst>
                     <a:ext uri="{9D8B030D-6E8A-4147-A177-3AD203B41FA5}">
-                      <a16:colId xmlns:a16="http://schemas.microsoft.com/office/drawing/2014/main" xmlns="" val="20003"/>
+                      <a16:colId xmlns:a16="http://schemas.microsoft.com/office/drawing/2014/main" val="20003"/>
                     </a:ext>
                   </a:extLst>
                 </a:gridCol>
@@ -18909,7 +18731,7 @@
                 </a:tc>
                 <a:extLst>
                   <a:ext uri="{0D108BD9-81ED-4DB2-BD59-A6C34878D82A}">
-                    <a16:rowId xmlns:a16="http://schemas.microsoft.com/office/drawing/2014/main" xmlns="" val="10000"/>
+                    <a16:rowId xmlns:a16="http://schemas.microsoft.com/office/drawing/2014/main" val="10000"/>
                   </a:ext>
                 </a:extLst>
               </a:tr>
@@ -18959,7 +18781,7 @@
                 </a:tc>
                 <a:extLst>
                   <a:ext uri="{0D108BD9-81ED-4DB2-BD59-A6C34878D82A}">
-                    <a16:rowId xmlns:a16="http://schemas.microsoft.com/office/drawing/2014/main" xmlns="" val="10001"/>
+                    <a16:rowId xmlns:a16="http://schemas.microsoft.com/office/drawing/2014/main" val="10001"/>
                   </a:ext>
                 </a:extLst>
               </a:tr>
@@ -19009,7 +18831,7 @@
                 </a:tc>
                 <a:extLst>
                   <a:ext uri="{0D108BD9-81ED-4DB2-BD59-A6C34878D82A}">
-                    <a16:rowId xmlns:a16="http://schemas.microsoft.com/office/drawing/2014/main" xmlns="" val="10002"/>
+                    <a16:rowId xmlns:a16="http://schemas.microsoft.com/office/drawing/2014/main" val="10002"/>
                   </a:ext>
                 </a:extLst>
               </a:tr>
@@ -19059,7 +18881,7 @@
                 </a:tc>
                 <a:extLst>
                   <a:ext uri="{0D108BD9-81ED-4DB2-BD59-A6C34878D82A}">
-                    <a16:rowId xmlns:a16="http://schemas.microsoft.com/office/drawing/2014/main" xmlns="" val="10003"/>
+                    <a16:rowId xmlns:a16="http://schemas.microsoft.com/office/drawing/2014/main" val="10003"/>
                   </a:ext>
                 </a:extLst>
               </a:tr>
@@ -19505,7 +19327,7 @@
           <p:cNvPr id="33" name="Fußzeilenplatzhalter 4">
             <a:extLst>
               <a:ext uri="{FF2B5EF4-FFF2-40B4-BE49-F238E27FC236}">
-                <a16:creationId xmlns:a16="http://schemas.microsoft.com/office/drawing/2014/main" xmlns="" id="{2E42A4B8-D462-4D24-B630-C4E715160015}"/>
+                <a16:creationId xmlns:a16="http://schemas.microsoft.com/office/drawing/2014/main" id="{2E42A4B8-D462-4D24-B630-C4E715160015}"/>
               </a:ext>
             </a:extLst>
           </p:cNvPr>
@@ -19852,7 +19674,7 @@
           <p:cNvPr id="35" name="Gerade Verbindung 7">
             <a:extLst>
               <a:ext uri="{FF2B5EF4-FFF2-40B4-BE49-F238E27FC236}">
-                <a16:creationId xmlns:a16="http://schemas.microsoft.com/office/drawing/2014/main" xmlns="" id="{B75D970B-D834-48EE-8C58-99CF4EEB87D7}"/>
+                <a16:creationId xmlns:a16="http://schemas.microsoft.com/office/drawing/2014/main" id="{B75D970B-D834-48EE-8C58-99CF4EEB87D7}"/>
               </a:ext>
             </a:extLst>
           </p:cNvPr>
@@ -19919,20 +19741,13 @@
     </p:spTree>
     <p:extLst>
       <p:ext uri="{BB962C8B-B14F-4D97-AF65-F5344CB8AC3E}">
-        <p14:creationId xmlns:p14="http://schemas.microsoft.com/office/powerpoint/2010/main" xmlns="" val="2061272255"/>
+        <p14:creationId xmlns:p14="http://schemas.microsoft.com/office/powerpoint/2010/main" val="2061272255"/>
       </p:ext>
     </p:extLst>
   </p:cSld>
   <p:clrMapOvr>
     <a:masterClrMapping/>
   </p:clrMapOvr>
-  <p:timing>
-    <p:tnLst>
-      <p:par>
-        <p:cTn id="1" dur="indefinite" restart="never" nodeType="tmRoot"/>
-      </p:par>
-    </p:tnLst>
-  </p:timing>
 </p:sld>
 </file>
 
@@ -19958,7 +19773,7 @@
           <p:cNvPr id="2" name="Titel 1">
             <a:extLst>
               <a:ext uri="{FF2B5EF4-FFF2-40B4-BE49-F238E27FC236}">
-                <a16:creationId xmlns:a16="http://schemas.microsoft.com/office/drawing/2014/main" xmlns="" id="{34677269-BD45-472F-A32F-497C999081B0}"/>
+                <a16:creationId xmlns:a16="http://schemas.microsoft.com/office/drawing/2014/main" id="{34677269-BD45-472F-A32F-497C999081B0}"/>
               </a:ext>
             </a:extLst>
           </p:cNvPr>
@@ -19986,7 +19801,7 @@
           <p:cNvPr id="3" name="Inhaltsplatzhalter 2">
             <a:extLst>
               <a:ext uri="{FF2B5EF4-FFF2-40B4-BE49-F238E27FC236}">
-                <a16:creationId xmlns:a16="http://schemas.microsoft.com/office/drawing/2014/main" xmlns="" id="{D4E39441-B7A4-4B71-9B65-C1BD85E49B51}"/>
+                <a16:creationId xmlns:a16="http://schemas.microsoft.com/office/drawing/2014/main" id="{D4E39441-B7A4-4B71-9B65-C1BD85E49B51}"/>
               </a:ext>
             </a:extLst>
           </p:cNvPr>
@@ -20004,25 +19819,33 @@
           <a:p>
             <a:r>
               <a:rPr lang="de-DE" dirty="0"/>
-              <a:t>RTOS wie Middleware weitere Abstraktionsschicht</a:t>
-            </a:r>
-          </a:p>
-          <a:p>
+              <a:t>Problem Abstraktionsschicht</a:t>
+            </a:r>
+          </a:p>
+          <a:p>
+            <a:pPr>
+              <a:buFont typeface="Wingdings" panose="05000000000000000000" pitchFamily="2" charset="2"/>
+              <a:buChar char="Ø"/>
+            </a:pPr>
             <a:r>
               <a:rPr lang="de-DE" dirty="0"/>
-              <a:t>Fehler treten erst auf nachdem Task ausgelagert wurde</a:t>
+              <a:t>Lösung : RTOS Awareness</a:t>
             </a:r>
           </a:p>
           <a:p>
             <a:r>
               <a:rPr lang="de-DE" dirty="0"/>
-              <a:t>Schwer zu erkennen ohne geeignete Tools</a:t>
-            </a:r>
-          </a:p>
-          <a:p>
+              <a:t>Problem Nebenläufigkeit</a:t>
+            </a:r>
+          </a:p>
+          <a:p>
+            <a:pPr>
+              <a:buFont typeface="Wingdings" panose="05000000000000000000" pitchFamily="2" charset="2"/>
+              <a:buChar char="Ø"/>
+            </a:pPr>
             <a:r>
               <a:rPr lang="de-DE" dirty="0"/>
-              <a:t>Analyse Tools beeinflussen Timings</a:t>
+              <a:t>Lösung: Trace Tools</a:t>
             </a:r>
           </a:p>
           <a:p>
@@ -20050,7 +19873,7 @@
           <p:cNvPr id="4" name="Fußzeilenplatzhalter 3">
             <a:extLst>
               <a:ext uri="{FF2B5EF4-FFF2-40B4-BE49-F238E27FC236}">
-                <a16:creationId xmlns:a16="http://schemas.microsoft.com/office/drawing/2014/main" xmlns="" id="{F4052868-27D0-499C-A552-D665E8752DCE}"/>
+                <a16:creationId xmlns:a16="http://schemas.microsoft.com/office/drawing/2014/main" id="{F4052868-27D0-499C-A552-D665E8752DCE}"/>
               </a:ext>
             </a:extLst>
           </p:cNvPr>
@@ -20078,7 +19901,7 @@
           <p:cNvPr id="5" name="Fußzeilenplatzhalter 4">
             <a:extLst>
               <a:ext uri="{FF2B5EF4-FFF2-40B4-BE49-F238E27FC236}">
-                <a16:creationId xmlns:a16="http://schemas.microsoft.com/office/drawing/2014/main" xmlns="" id="{7D74A15B-8566-4918-BDC9-B33BA34E2438}"/>
+                <a16:creationId xmlns:a16="http://schemas.microsoft.com/office/drawing/2014/main" id="{7D74A15B-8566-4918-BDC9-B33BA34E2438}"/>
               </a:ext>
             </a:extLst>
           </p:cNvPr>
@@ -20425,7 +20248,7 @@
           <p:cNvPr id="6" name="Gerade Verbindung 7">
             <a:extLst>
               <a:ext uri="{FF2B5EF4-FFF2-40B4-BE49-F238E27FC236}">
-                <a16:creationId xmlns:a16="http://schemas.microsoft.com/office/drawing/2014/main" xmlns="" id="{7E9DAF63-0285-447B-A3B5-4A8A5ACFD5E7}"/>
+                <a16:creationId xmlns:a16="http://schemas.microsoft.com/office/drawing/2014/main" id="{7E9DAF63-0285-447B-A3B5-4A8A5ACFD5E7}"/>
               </a:ext>
             </a:extLst>
           </p:cNvPr>
@@ -20492,7 +20315,7 @@
     </p:spTree>
     <p:extLst>
       <p:ext uri="{BB962C8B-B14F-4D97-AF65-F5344CB8AC3E}">
-        <p14:creationId xmlns:p14="http://schemas.microsoft.com/office/powerpoint/2010/main" xmlns="" val="4130749313"/>
+        <p14:creationId xmlns:p14="http://schemas.microsoft.com/office/powerpoint/2010/main" val="4130749313"/>
       </p:ext>
     </p:extLst>
   </p:cSld>
@@ -20575,7 +20398,7 @@
     </p:spTree>
     <p:extLst>
       <p:ext uri="{BB962C8B-B14F-4D97-AF65-F5344CB8AC3E}">
-        <p14:creationId xmlns:p14="http://schemas.microsoft.com/office/powerpoint/2010/main" xmlns="" val="3075409766"/>
+        <p14:creationId xmlns:p14="http://schemas.microsoft.com/office/powerpoint/2010/main" val="3075409766"/>
       </p:ext>
     </p:extLst>
   </p:cSld>
@@ -20704,7 +20527,7 @@
           <p:cNvPr id="1026" name="Picture 2" descr="Bildergebnis für cnc maschine">
             <a:extLst>
               <a:ext uri="{FF2B5EF4-FFF2-40B4-BE49-F238E27FC236}">
-                <a16:creationId xmlns:a16="http://schemas.microsoft.com/office/drawing/2014/main" xmlns="" id="{7C297552-9A5C-430F-B7BF-4ECB71FB5555}"/>
+                <a16:creationId xmlns:a16="http://schemas.microsoft.com/office/drawing/2014/main" id="{7C297552-9A5C-430F-B7BF-4ECB71FB5555}"/>
               </a:ext>
             </a:extLst>
           </p:cNvPr>
@@ -20717,7 +20540,7 @@
           <a:blip r:embed="rId4" cstate="print">
             <a:extLst>
               <a:ext uri="{28A0092B-C50C-407E-A947-70E740481C1C}">
-                <a14:useLocalDpi xmlns:a14="http://schemas.microsoft.com/office/drawing/2010/main" xmlns="" val="0"/>
+                <a14:useLocalDpi xmlns:a14="http://schemas.microsoft.com/office/drawing/2010/main" val="0"/>
               </a:ext>
             </a:extLst>
           </a:blip>
@@ -20737,7 +20560,7 @@
           <a:noFill/>
           <a:extLst>
             <a:ext uri="{909E8E84-426E-40DD-AFC4-6F175D3DCCD1}">
-              <a14:hiddenFill xmlns:a14="http://schemas.microsoft.com/office/drawing/2010/main" xmlns="">
+              <a14:hiddenFill xmlns:a14="http://schemas.microsoft.com/office/drawing/2010/main">
                 <a:solidFill>
                   <a:srgbClr val="FFFFFF"/>
                 </a:solidFill>
@@ -20751,7 +20574,7 @@
           <p:cNvPr id="1030" name="Picture 6" descr="Bildergebnis für Tastatur commodore">
             <a:extLst>
               <a:ext uri="{FF2B5EF4-FFF2-40B4-BE49-F238E27FC236}">
-                <a16:creationId xmlns:a16="http://schemas.microsoft.com/office/drawing/2014/main" xmlns="" id="{0661ED3C-9466-48C3-85C7-632E138ADAF6}"/>
+                <a16:creationId xmlns:a16="http://schemas.microsoft.com/office/drawing/2014/main" id="{0661ED3C-9466-48C3-85C7-632E138ADAF6}"/>
               </a:ext>
             </a:extLst>
           </p:cNvPr>
@@ -20764,7 +20587,7 @@
           <a:blip r:embed="rId5" cstate="print">
             <a:extLst>
               <a:ext uri="{28A0092B-C50C-407E-A947-70E740481C1C}">
-                <a14:useLocalDpi xmlns:a14="http://schemas.microsoft.com/office/drawing/2010/main" xmlns="" val="0"/>
+                <a14:useLocalDpi xmlns:a14="http://schemas.microsoft.com/office/drawing/2010/main" val="0"/>
               </a:ext>
             </a:extLst>
           </a:blip>
@@ -20784,7 +20607,7 @@
           <a:noFill/>
           <a:extLst>
             <a:ext uri="{909E8E84-426E-40DD-AFC4-6F175D3DCCD1}">
-              <a14:hiddenFill xmlns:a14="http://schemas.microsoft.com/office/drawing/2010/main" xmlns="">
+              <a14:hiddenFill xmlns:a14="http://schemas.microsoft.com/office/drawing/2010/main">
                 <a:solidFill>
                   <a:srgbClr val="FFFFFF"/>
                 </a:solidFill>
@@ -20798,7 +20621,7 @@
           <p:cNvPr id="1036" name="Picture 12" descr="Bildergebnis für Airbag">
             <a:extLst>
               <a:ext uri="{FF2B5EF4-FFF2-40B4-BE49-F238E27FC236}">
-                <a16:creationId xmlns:a16="http://schemas.microsoft.com/office/drawing/2014/main" xmlns="" id="{F003E738-F5CA-4F6E-856F-942AF1C420BB}"/>
+                <a16:creationId xmlns:a16="http://schemas.microsoft.com/office/drawing/2014/main" id="{F003E738-F5CA-4F6E-856F-942AF1C420BB}"/>
               </a:ext>
             </a:extLst>
           </p:cNvPr>
@@ -20811,7 +20634,7 @@
           <a:blip r:embed="rId6" cstate="print">
             <a:extLst>
               <a:ext uri="{28A0092B-C50C-407E-A947-70E740481C1C}">
-                <a14:useLocalDpi xmlns:a14="http://schemas.microsoft.com/office/drawing/2010/main" xmlns="" val="0"/>
+                <a14:useLocalDpi xmlns:a14="http://schemas.microsoft.com/office/drawing/2010/main" val="0"/>
               </a:ext>
             </a:extLst>
           </a:blip>
@@ -20831,7 +20654,7 @@
           <a:noFill/>
           <a:extLst>
             <a:ext uri="{909E8E84-426E-40DD-AFC4-6F175D3DCCD1}">
-              <a14:hiddenFill xmlns:a14="http://schemas.microsoft.com/office/drawing/2010/main" xmlns="">
+              <a14:hiddenFill xmlns:a14="http://schemas.microsoft.com/office/drawing/2010/main">
                 <a:solidFill>
                   <a:srgbClr val="FFFFFF"/>
                 </a:solidFill>
@@ -20845,7 +20668,7 @@
           <p:cNvPr id="9" name="Tabelle 8">
             <a:extLst>
               <a:ext uri="{FF2B5EF4-FFF2-40B4-BE49-F238E27FC236}">
-                <a16:creationId xmlns:a16="http://schemas.microsoft.com/office/drawing/2014/main" xmlns="" id="{446DB9A0-D12E-420E-852C-6E155F1944D2}"/>
+                <a16:creationId xmlns:a16="http://schemas.microsoft.com/office/drawing/2014/main" id="{446DB9A0-D12E-420E-852C-6E155F1944D2}"/>
               </a:ext>
             </a:extLst>
           </p:cNvPr>
@@ -20855,7 +20678,7 @@
           <p:nvPr>
             <p:extLst>
               <p:ext uri="{D42A27DB-BD31-4B8C-83A1-F6EECF244321}">
-                <p14:modId xmlns:p14="http://schemas.microsoft.com/office/powerpoint/2010/main" xmlns="" val="4205881844"/>
+                <p14:modId xmlns:p14="http://schemas.microsoft.com/office/powerpoint/2010/main" val="4205881844"/>
               </p:ext>
             </p:extLst>
           </p:nvPr>
@@ -20874,14 +20697,14 @@
                 <a:gridCol w="4064000">
                   <a:extLst>
                     <a:ext uri="{9D8B030D-6E8A-4147-A177-3AD203B41FA5}">
-                      <a16:colId xmlns:a16="http://schemas.microsoft.com/office/drawing/2014/main" xmlns="" val="1869085196"/>
+                      <a16:colId xmlns:a16="http://schemas.microsoft.com/office/drawing/2014/main" val="1869085196"/>
                     </a:ext>
                   </a:extLst>
                 </a:gridCol>
                 <a:gridCol w="4064000">
                   <a:extLst>
                     <a:ext uri="{9D8B030D-6E8A-4147-A177-3AD203B41FA5}">
-                      <a16:colId xmlns:a16="http://schemas.microsoft.com/office/drawing/2014/main" xmlns="" val="291479846"/>
+                      <a16:colId xmlns:a16="http://schemas.microsoft.com/office/drawing/2014/main" val="291479846"/>
                     </a:ext>
                   </a:extLst>
                 </a:gridCol>
@@ -20915,7 +20738,7 @@
                 </a:tc>
                 <a:extLst>
                   <a:ext uri="{0D108BD9-81ED-4DB2-BD59-A6C34878D82A}">
-                    <a16:rowId xmlns:a16="http://schemas.microsoft.com/office/drawing/2014/main" xmlns="" val="4185157901"/>
+                    <a16:rowId xmlns:a16="http://schemas.microsoft.com/office/drawing/2014/main" val="4185157901"/>
                   </a:ext>
                 </a:extLst>
               </a:tr>
@@ -20948,7 +20771,7 @@
                 </a:tc>
                 <a:extLst>
                   <a:ext uri="{0D108BD9-81ED-4DB2-BD59-A6C34878D82A}">
-                    <a16:rowId xmlns:a16="http://schemas.microsoft.com/office/drawing/2014/main" xmlns="" val="513013316"/>
+                    <a16:rowId xmlns:a16="http://schemas.microsoft.com/office/drawing/2014/main" val="513013316"/>
                   </a:ext>
                 </a:extLst>
               </a:tr>
@@ -20961,7 +20784,7 @@
           <p:cNvPr id="12" name="Pfeil: gebogen 11">
             <a:extLst>
               <a:ext uri="{FF2B5EF4-FFF2-40B4-BE49-F238E27FC236}">
-                <a16:creationId xmlns:a16="http://schemas.microsoft.com/office/drawing/2014/main" xmlns="" id="{F1C95A13-217D-4152-AFB1-470E8652EFBD}"/>
+                <a16:creationId xmlns:a16="http://schemas.microsoft.com/office/drawing/2014/main" id="{F1C95A13-217D-4152-AFB1-470E8652EFBD}"/>
               </a:ext>
             </a:extLst>
           </p:cNvPr>
@@ -21016,7 +20839,7 @@
           <p:cNvPr id="19" name="Pfeil: gebogen 18">
             <a:extLst>
               <a:ext uri="{FF2B5EF4-FFF2-40B4-BE49-F238E27FC236}">
-                <a16:creationId xmlns:a16="http://schemas.microsoft.com/office/drawing/2014/main" xmlns="" id="{02795F1E-AB43-4E76-848F-6C65791D5B84}"/>
+                <a16:creationId xmlns:a16="http://schemas.microsoft.com/office/drawing/2014/main" id="{02795F1E-AB43-4E76-848F-6C65791D5B84}"/>
               </a:ext>
             </a:extLst>
           </p:cNvPr>
@@ -21071,7 +20894,7 @@
           <p:cNvPr id="20" name="Pfeil: gebogen 19">
             <a:extLst>
               <a:ext uri="{FF2B5EF4-FFF2-40B4-BE49-F238E27FC236}">
-                <a16:creationId xmlns:a16="http://schemas.microsoft.com/office/drawing/2014/main" xmlns="" id="{CC3418D8-C68E-46BF-B1A9-3CEED33A66CA}"/>
+                <a16:creationId xmlns:a16="http://schemas.microsoft.com/office/drawing/2014/main" id="{CC3418D8-C68E-46BF-B1A9-3CEED33A66CA}"/>
               </a:ext>
             </a:extLst>
           </p:cNvPr>
@@ -21126,7 +20949,7 @@
           <p:cNvPr id="13" name="Textfeld 12">
             <a:extLst>
               <a:ext uri="{FF2B5EF4-FFF2-40B4-BE49-F238E27FC236}">
-                <a16:creationId xmlns:a16="http://schemas.microsoft.com/office/drawing/2014/main" xmlns="" id="{8DD7928B-E8B2-4C94-A8A5-213E52E0FB49}"/>
+                <a16:creationId xmlns:a16="http://schemas.microsoft.com/office/drawing/2014/main" id="{8DD7928B-E8B2-4C94-A8A5-213E52E0FB49}"/>
               </a:ext>
             </a:extLst>
           </p:cNvPr>
@@ -21186,7 +21009,7 @@
           <p:cNvPr id="14" name="Fußzeilenplatzhalter 4">
             <a:extLst>
               <a:ext uri="{FF2B5EF4-FFF2-40B4-BE49-F238E27FC236}">
-                <a16:creationId xmlns:a16="http://schemas.microsoft.com/office/drawing/2014/main" xmlns="" id="{7FD7D624-FBCB-480D-9D8B-AF8D994B841C}"/>
+                <a16:creationId xmlns:a16="http://schemas.microsoft.com/office/drawing/2014/main" id="{7FD7D624-FBCB-480D-9D8B-AF8D994B841C}"/>
               </a:ext>
             </a:extLst>
           </p:cNvPr>
@@ -21590,7 +21413,7 @@
           <p:cNvPr id="15" name="Gerade Verbindung 11">
             <a:extLst>
               <a:ext uri="{FF2B5EF4-FFF2-40B4-BE49-F238E27FC236}">
-                <a16:creationId xmlns:a16="http://schemas.microsoft.com/office/drawing/2014/main" xmlns="" id="{65C03E83-5C7D-4D4B-A513-BECC2DC96FAE}"/>
+                <a16:creationId xmlns:a16="http://schemas.microsoft.com/office/drawing/2014/main" id="{65C03E83-5C7D-4D4B-A513-BECC2DC96FAE}"/>
               </a:ext>
             </a:extLst>
           </p:cNvPr>
@@ -21660,7 +21483,7 @@
     </p:custDataLst>
     <p:extLst>
       <p:ext uri="{BB962C8B-B14F-4D97-AF65-F5344CB8AC3E}">
-        <p14:creationId xmlns:p14="http://schemas.microsoft.com/office/powerpoint/2010/main" xmlns="" val="3574650683"/>
+        <p14:creationId xmlns:p14="http://schemas.microsoft.com/office/powerpoint/2010/main" val="3574650683"/>
       </p:ext>
     </p:extLst>
   </p:cSld>
@@ -21692,7 +21515,7 @@
           <p:cNvPr id="17" name="Textfeld 16">
             <a:extLst>
               <a:ext uri="{FF2B5EF4-FFF2-40B4-BE49-F238E27FC236}">
-                <a16:creationId xmlns:a16="http://schemas.microsoft.com/office/drawing/2014/main" xmlns="" id="{507A5837-4FCD-4FFF-87E2-F5C3086BB529}"/>
+                <a16:creationId xmlns:a16="http://schemas.microsoft.com/office/drawing/2014/main" id="{507A5837-4FCD-4FFF-87E2-F5C3086BB529}"/>
               </a:ext>
             </a:extLst>
           </p:cNvPr>
@@ -21858,7 +21681,7 @@
           <p:cNvPr id="18" name="Textfeld 17">
             <a:extLst>
               <a:ext uri="{FF2B5EF4-FFF2-40B4-BE49-F238E27FC236}">
-                <a16:creationId xmlns:a16="http://schemas.microsoft.com/office/drawing/2014/main" xmlns="" id="{BD8BDF0F-1DCC-4293-B702-67BB52F0ADC5}"/>
+                <a16:creationId xmlns:a16="http://schemas.microsoft.com/office/drawing/2014/main" id="{BD8BDF0F-1DCC-4293-B702-67BB52F0ADC5}"/>
               </a:ext>
             </a:extLst>
           </p:cNvPr>
@@ -21868,7 +21691,7 @@
         <p:spPr>
           <a:xfrm>
             <a:off x="6772414" y="2507173"/>
-            <a:ext cx="3971041" cy="3970318"/>
+            <a:ext cx="3971041" cy="3693319"/>
           </a:xfrm>
           <a:prstGeom prst="rect">
             <a:avLst/>
@@ -22007,22 +21830,11 @@
             </a:r>
           </a:p>
           <a:p>
-            <a:pPr marL="285750" indent="-285750">
+            <a:pPr>
               <a:lnSpc>
                 <a:spcPct val="150000"/>
               </a:lnSpc>
-              <a:buFont typeface="Wingdings" panose="05000000000000000000" pitchFamily="2" charset="2"/>
-              <a:buChar char="§"/>
             </a:pPr>
-            <a:r>
-              <a:rPr lang="de-DE" dirty="0">
-                <a:latin typeface="Arial" panose="020B0604020202020204" pitchFamily="34" charset="0"/>
-                <a:cs typeface="Arial" panose="020B0604020202020204" pitchFamily="34" charset="0"/>
-              </a:rPr>
-              <a:t>z.T. schwerer zu debuggen</a:t>
-            </a:r>
-          </a:p>
-          <a:p>
             <a:endParaRPr lang="de-DE" dirty="0"/>
           </a:p>
           <a:p>
@@ -22039,7 +21851,7 @@
           <p:cNvPr id="2" name="Titel 1">
             <a:extLst>
               <a:ext uri="{FF2B5EF4-FFF2-40B4-BE49-F238E27FC236}">
-                <a16:creationId xmlns:a16="http://schemas.microsoft.com/office/drawing/2014/main" xmlns="" id="{34CE8BCC-3048-47F3-90AD-801FD6E5C7F8}"/>
+                <a16:creationId xmlns:a16="http://schemas.microsoft.com/office/drawing/2014/main" id="{34CE8BCC-3048-47F3-90AD-801FD6E5C7F8}"/>
               </a:ext>
             </a:extLst>
           </p:cNvPr>
@@ -22072,7 +21884,7 @@
           <p:cNvPr id="9" name="Inhaltsplatzhalter 8">
             <a:extLst>
               <a:ext uri="{FF2B5EF4-FFF2-40B4-BE49-F238E27FC236}">
-                <a16:creationId xmlns:a16="http://schemas.microsoft.com/office/drawing/2014/main" xmlns="" id="{3E34CD5D-112F-4598-83DD-A1B842D0B98C}"/>
+                <a16:creationId xmlns:a16="http://schemas.microsoft.com/office/drawing/2014/main" id="{3E34CD5D-112F-4598-83DD-A1B842D0B98C}"/>
               </a:ext>
             </a:extLst>
           </p:cNvPr>
@@ -22103,7 +21915,7 @@
           <p:cNvPr id="4" name="Fußzeilenplatzhalter 3">
             <a:extLst>
               <a:ext uri="{FF2B5EF4-FFF2-40B4-BE49-F238E27FC236}">
-                <a16:creationId xmlns:a16="http://schemas.microsoft.com/office/drawing/2014/main" xmlns="" id="{280E2FE0-B75F-4FD9-97B5-135DEFE6A271}"/>
+                <a16:creationId xmlns:a16="http://schemas.microsoft.com/office/drawing/2014/main" id="{280E2FE0-B75F-4FD9-97B5-135DEFE6A271}"/>
               </a:ext>
             </a:extLst>
           </p:cNvPr>
@@ -22131,7 +21943,7 @@
           <p:cNvPr id="8" name="Grafik 7">
             <a:extLst>
               <a:ext uri="{FF2B5EF4-FFF2-40B4-BE49-F238E27FC236}">
-                <a16:creationId xmlns:a16="http://schemas.microsoft.com/office/drawing/2014/main" xmlns="" id="{A47251C5-73A7-4903-A34E-93FEF8FA3CC7}"/>
+                <a16:creationId xmlns:a16="http://schemas.microsoft.com/office/drawing/2014/main" id="{A47251C5-73A7-4903-A34E-93FEF8FA3CC7}"/>
               </a:ext>
             </a:extLst>
           </p:cNvPr>
@@ -22160,7 +21972,7 @@
           <p:cNvPr id="12" name="Rechteck: abgerundete Ecken 11">
             <a:extLst>
               <a:ext uri="{FF2B5EF4-FFF2-40B4-BE49-F238E27FC236}">
-                <a16:creationId xmlns:a16="http://schemas.microsoft.com/office/drawing/2014/main" xmlns="" id="{F5F39E6D-09D6-4D67-B425-274B5D53B1E8}"/>
+                <a16:creationId xmlns:a16="http://schemas.microsoft.com/office/drawing/2014/main" id="{F5F39E6D-09D6-4D67-B425-274B5D53B1E8}"/>
               </a:ext>
             </a:extLst>
           </p:cNvPr>
@@ -22215,7 +22027,7 @@
           <p:cNvPr id="13" name="Rechteck: abgerundete Ecken 12">
             <a:extLst>
               <a:ext uri="{FF2B5EF4-FFF2-40B4-BE49-F238E27FC236}">
-                <a16:creationId xmlns:a16="http://schemas.microsoft.com/office/drawing/2014/main" xmlns="" id="{0D36CC96-73EF-4D79-BC40-AEE569964664}"/>
+                <a16:creationId xmlns:a16="http://schemas.microsoft.com/office/drawing/2014/main" id="{0D36CC96-73EF-4D79-BC40-AEE569964664}"/>
               </a:ext>
             </a:extLst>
           </p:cNvPr>
@@ -22270,7 +22082,7 @@
           <p:cNvPr id="14" name="Textfeld 13">
             <a:extLst>
               <a:ext uri="{FF2B5EF4-FFF2-40B4-BE49-F238E27FC236}">
-                <a16:creationId xmlns:a16="http://schemas.microsoft.com/office/drawing/2014/main" xmlns="" id="{B62CE119-7A38-425E-9A44-739FCCC01AA1}"/>
+                <a16:creationId xmlns:a16="http://schemas.microsoft.com/office/drawing/2014/main" id="{B62CE119-7A38-425E-9A44-739FCCC01AA1}"/>
               </a:ext>
             </a:extLst>
           </p:cNvPr>
@@ -22315,7 +22127,7 @@
           <p:cNvPr id="15" name="Textfeld 14">
             <a:extLst>
               <a:ext uri="{FF2B5EF4-FFF2-40B4-BE49-F238E27FC236}">
-                <a16:creationId xmlns:a16="http://schemas.microsoft.com/office/drawing/2014/main" xmlns="" id="{79F25965-7A5A-4D4B-8D4C-701BCFB5C65B}"/>
+                <a16:creationId xmlns:a16="http://schemas.microsoft.com/office/drawing/2014/main" id="{79F25965-7A5A-4D4B-8D4C-701BCFB5C65B}"/>
               </a:ext>
             </a:extLst>
           </p:cNvPr>
@@ -22353,7 +22165,7 @@
           <p:cNvPr id="16" name="Textfeld 15">
             <a:extLst>
               <a:ext uri="{FF2B5EF4-FFF2-40B4-BE49-F238E27FC236}">
-                <a16:creationId xmlns:a16="http://schemas.microsoft.com/office/drawing/2014/main" xmlns="" id="{E2525275-D888-41A9-B23C-63593F8A837B}"/>
+                <a16:creationId xmlns:a16="http://schemas.microsoft.com/office/drawing/2014/main" id="{E2525275-D888-41A9-B23C-63593F8A837B}"/>
               </a:ext>
             </a:extLst>
           </p:cNvPr>
@@ -22392,7 +22204,7 @@
     </p:custDataLst>
     <p:extLst>
       <p:ext uri="{BB962C8B-B14F-4D97-AF65-F5344CB8AC3E}">
-        <p14:creationId xmlns:p14="http://schemas.microsoft.com/office/powerpoint/2010/main" xmlns="" val="4043006265"/>
+        <p14:creationId xmlns:p14="http://schemas.microsoft.com/office/powerpoint/2010/main" val="4043006265"/>
       </p:ext>
     </p:extLst>
   </p:cSld>
@@ -22515,7 +22327,7 @@
           <p:cNvPr id="9" name="Fußzeilenplatzhalter 4">
             <a:extLst>
               <a:ext uri="{FF2B5EF4-FFF2-40B4-BE49-F238E27FC236}">
-                <a16:creationId xmlns:a16="http://schemas.microsoft.com/office/drawing/2014/main" xmlns="" id="{74D35B47-CC21-43CE-AF04-6505B70667C5}"/>
+                <a16:creationId xmlns:a16="http://schemas.microsoft.com/office/drawing/2014/main" id="{74D35B47-CC21-43CE-AF04-6505B70667C5}"/>
               </a:ext>
             </a:extLst>
           </p:cNvPr>
@@ -22904,7 +22716,7 @@
           <p:cNvPr id="10" name="Gerade Verbindung 11">
             <a:extLst>
               <a:ext uri="{FF2B5EF4-FFF2-40B4-BE49-F238E27FC236}">
-                <a16:creationId xmlns:a16="http://schemas.microsoft.com/office/drawing/2014/main" xmlns="" id="{6FB4D23B-EF86-488F-8772-CBB7EE842FB1}"/>
+                <a16:creationId xmlns:a16="http://schemas.microsoft.com/office/drawing/2014/main" id="{6FB4D23B-EF86-488F-8772-CBB7EE842FB1}"/>
               </a:ext>
             </a:extLst>
           </p:cNvPr>
@@ -22971,7 +22783,7 @@
     </p:spTree>
     <p:extLst>
       <p:ext uri="{BB962C8B-B14F-4D97-AF65-F5344CB8AC3E}">
-        <p14:creationId xmlns:p14="http://schemas.microsoft.com/office/powerpoint/2010/main" xmlns="" val="1386685637"/>
+        <p14:creationId xmlns:p14="http://schemas.microsoft.com/office/powerpoint/2010/main" val="1386685637"/>
       </p:ext>
     </p:extLst>
   </p:cSld>
@@ -23169,7 +22981,7 @@
     </p:spTree>
     <p:extLst>
       <p:ext uri="{BB962C8B-B14F-4D97-AF65-F5344CB8AC3E}">
-        <p14:creationId xmlns:p14="http://schemas.microsoft.com/office/powerpoint/2010/main" xmlns="" val="4224054763"/>
+        <p14:creationId xmlns:p14="http://schemas.microsoft.com/office/powerpoint/2010/main" val="4224054763"/>
       </p:ext>
     </p:extLst>
   </p:cSld>
@@ -23218,10 +23030,6 @@
             <a:r>
               <a:rPr lang="de-DE" dirty="0" err="1"/>
               <a:t>Structure</a:t>
-            </a:r>
-            <a:r>
-              <a:rPr lang="de-DE" dirty="0"/>
-              <a:t/>
             </a:r>
             <a:br>
               <a:rPr lang="de-DE" dirty="0"/>
@@ -23608,7 +23416,7 @@
     </p:spTree>
     <p:extLst>
       <p:ext uri="{BB962C8B-B14F-4D97-AF65-F5344CB8AC3E}">
-        <p14:creationId xmlns:p14="http://schemas.microsoft.com/office/powerpoint/2010/main" xmlns="" val="3394471292"/>
+        <p14:creationId xmlns:p14="http://schemas.microsoft.com/office/powerpoint/2010/main" val="3394471292"/>
       </p:ext>
     </p:extLst>
   </p:cSld>
@@ -25038,7 +24846,7 @@
     </p:spTree>
     <p:extLst>
       <p:ext uri="{BB962C8B-B14F-4D97-AF65-F5344CB8AC3E}">
-        <p14:creationId xmlns:p14="http://schemas.microsoft.com/office/powerpoint/2010/main" xmlns="" val="2925006958"/>
+        <p14:creationId xmlns:p14="http://schemas.microsoft.com/office/powerpoint/2010/main" val="2925006958"/>
       </p:ext>
     </p:extLst>
   </p:cSld>
@@ -25203,7 +25011,7 @@
           <p:cNvPr id="9" name="Fußzeilenplatzhalter 4">
             <a:extLst>
               <a:ext uri="{FF2B5EF4-FFF2-40B4-BE49-F238E27FC236}">
-                <a16:creationId xmlns:a16="http://schemas.microsoft.com/office/drawing/2014/main" xmlns="" id="{3C19E46F-96A4-42F0-9ADE-8A642B595B58}"/>
+                <a16:creationId xmlns:a16="http://schemas.microsoft.com/office/drawing/2014/main" id="{3C19E46F-96A4-42F0-9ADE-8A642B595B58}"/>
               </a:ext>
             </a:extLst>
           </p:cNvPr>
@@ -25234,7 +25042,7 @@
     </p:spTree>
     <p:extLst>
       <p:ext uri="{BB962C8B-B14F-4D97-AF65-F5344CB8AC3E}">
-        <p14:creationId xmlns:p14="http://schemas.microsoft.com/office/powerpoint/2010/main" xmlns="" val="3455316977"/>
+        <p14:creationId xmlns:p14="http://schemas.microsoft.com/office/powerpoint/2010/main" val="3455316977"/>
       </p:ext>
     </p:extLst>
   </p:cSld>
@@ -25547,7 +25355,7 @@
   <a:extraClrSchemeLst/>
   <a:extLst>
     <a:ext uri="{05A4C25C-085E-4340-85A3-A5531E510DB2}">
-      <thm15:themeFamily xmlns:thm15="http://schemas.microsoft.com/office/thememl/2012/main" xmlns="" name="Office Theme" id="{62F939B6-93AF-4DB8-9C6B-D6C7DFDC589F}" vid="{4A3C46E8-61CC-4603-A589-7422A47A8E4A}"/>
+      <thm15:themeFamily xmlns:thm15="http://schemas.microsoft.com/office/thememl/2012/main" name="Office Theme" id="{62F939B6-93AF-4DB8-9C6B-D6C7DFDC589F}" vid="{4A3C46E8-61CC-4603-A589-7422A47A8E4A}"/>
     </a:ext>
   </a:extLst>
 </a:theme>
@@ -25808,7 +25616,7 @@
   <a:extraClrSchemeLst/>
   <a:extLst>
     <a:ext uri="{05A4C25C-085E-4340-85A3-A5531E510DB2}">
-      <thm15:themeFamily xmlns:thm15="http://schemas.microsoft.com/office/thememl/2012/main" xmlns="" name="Office Theme" id="{62F939B6-93AF-4DB8-9C6B-D6C7DFDC589F}" vid="{4A3C46E8-61CC-4603-A589-7422A47A8E4A}"/>
+      <thm15:themeFamily xmlns:thm15="http://schemas.microsoft.com/office/thememl/2012/main" name="Office Theme" id="{62F939B6-93AF-4DB8-9C6B-D6C7DFDC589F}" vid="{4A3C46E8-61CC-4603-A589-7422A47A8E4A}"/>
     </a:ext>
   </a:extLst>
 </a:theme>
@@ -26069,7 +25877,7 @@
   <a:extraClrSchemeLst/>
   <a:extLst>
     <a:ext uri="{05A4C25C-085E-4340-85A3-A5531E510DB2}">
-      <thm15:themeFamily xmlns:thm15="http://schemas.microsoft.com/office/thememl/2012/main" xmlns="" name="Office Theme" id="{62F939B6-93AF-4DB8-9C6B-D6C7DFDC589F}" vid="{4A3C46E8-61CC-4603-A589-7422A47A8E4A}"/>
+      <thm15:themeFamily xmlns:thm15="http://schemas.microsoft.com/office/thememl/2012/main" name="Office Theme" id="{62F939B6-93AF-4DB8-9C6B-D6C7DFDC589F}" vid="{4A3C46E8-61CC-4603-A589-7422A47A8E4A}"/>
     </a:ext>
   </a:extLst>
 </a:theme>
@@ -26364,7 +26172,7 @@
   <a:extraClrSchemeLst/>
   <a:extLst>
     <a:ext uri="{05A4C25C-085E-4340-85A3-A5531E510DB2}">
-      <thm15:themeFamily xmlns:thm15="http://schemas.microsoft.com/office/thememl/2012/main" xmlns="" name="Office Theme" id="{62F939B6-93AF-4DB8-9C6B-D6C7DFDC589F}" vid="{4A3C46E8-61CC-4603-A589-7422A47A8E4A}"/>
+      <thm15:themeFamily xmlns:thm15="http://schemas.microsoft.com/office/thememl/2012/main" name="Office Theme" id="{62F939B6-93AF-4DB8-9C6B-D6C7DFDC589F}" vid="{4A3C46E8-61CC-4603-A589-7422A47A8E4A}"/>
     </a:ext>
   </a:extLst>
 </a:theme>

</xml_diff>